<commit_message>
Work progress document updated.
</commit_message>
<xml_diff>
--- a/doc/firmwaresignWF.pptx
+++ b/doc/firmwaresignWF.pptx
@@ -6,6 +6,7 @@
   </p:sldMasterIdLst>
   <p:sldIdLst>
     <p:sldId id="256" r:id="rId2"/>
+    <p:sldId id="257" r:id="rId3"/>
   </p:sldIdLst>
   <p:sldSz cx="12192000" cy="6858000"/>
   <p:notesSz cx="6858000" cy="9144000"/>
@@ -104,6 +105,11 @@
       </a:defRPr>
     </a:lvl9pPr>
   </p:defaultTextStyle>
+  <p:extLst>
+    <p:ext uri="{EFAFB233-063F-42B5-8137-9DF3F51BA10A}">
+      <p15:sldGuideLst xmlns:p15="http://schemas.microsoft.com/office/powerpoint/2012/main"/>
+    </p:ext>
+  </p:extLst>
 </p:presentation>
 </file>
 
@@ -238,7 +244,7 @@
           <a:p>
             <a:fld id="{168FC4C3-6B25-48E2-93F9-24A255A41CA9}" type="datetimeFigureOut">
               <a:rPr lang="en-SG" smtClean="0"/>
-              <a:t>8/5/2019</a:t>
+              <a:t>14/5/2019</a:t>
             </a:fld>
             <a:endParaRPr lang="en-SG"/>
           </a:p>
@@ -408,7 +414,7 @@
           <a:p>
             <a:fld id="{168FC4C3-6B25-48E2-93F9-24A255A41CA9}" type="datetimeFigureOut">
               <a:rPr lang="en-SG" smtClean="0"/>
-              <a:t>8/5/2019</a:t>
+              <a:t>14/5/2019</a:t>
             </a:fld>
             <a:endParaRPr lang="en-SG"/>
           </a:p>
@@ -588,7 +594,7 @@
           <a:p>
             <a:fld id="{168FC4C3-6B25-48E2-93F9-24A255A41CA9}" type="datetimeFigureOut">
               <a:rPr lang="en-SG" smtClean="0"/>
-              <a:t>8/5/2019</a:t>
+              <a:t>14/5/2019</a:t>
             </a:fld>
             <a:endParaRPr lang="en-SG"/>
           </a:p>
@@ -758,7 +764,7 @@
           <a:p>
             <a:fld id="{168FC4C3-6B25-48E2-93F9-24A255A41CA9}" type="datetimeFigureOut">
               <a:rPr lang="en-SG" smtClean="0"/>
-              <a:t>8/5/2019</a:t>
+              <a:t>14/5/2019</a:t>
             </a:fld>
             <a:endParaRPr lang="en-SG"/>
           </a:p>
@@ -1004,7 +1010,7 @@
           <a:p>
             <a:fld id="{168FC4C3-6B25-48E2-93F9-24A255A41CA9}" type="datetimeFigureOut">
               <a:rPr lang="en-SG" smtClean="0"/>
-              <a:t>8/5/2019</a:t>
+              <a:t>14/5/2019</a:t>
             </a:fld>
             <a:endParaRPr lang="en-SG"/>
           </a:p>
@@ -1236,7 +1242,7 @@
           <a:p>
             <a:fld id="{168FC4C3-6B25-48E2-93F9-24A255A41CA9}" type="datetimeFigureOut">
               <a:rPr lang="en-SG" smtClean="0"/>
-              <a:t>8/5/2019</a:t>
+              <a:t>14/5/2019</a:t>
             </a:fld>
             <a:endParaRPr lang="en-SG"/>
           </a:p>
@@ -1603,7 +1609,7 @@
           <a:p>
             <a:fld id="{168FC4C3-6B25-48E2-93F9-24A255A41CA9}" type="datetimeFigureOut">
               <a:rPr lang="en-SG" smtClean="0"/>
-              <a:t>8/5/2019</a:t>
+              <a:t>14/5/2019</a:t>
             </a:fld>
             <a:endParaRPr lang="en-SG"/>
           </a:p>
@@ -1721,7 +1727,7 @@
           <a:p>
             <a:fld id="{168FC4C3-6B25-48E2-93F9-24A255A41CA9}" type="datetimeFigureOut">
               <a:rPr lang="en-SG" smtClean="0"/>
-              <a:t>8/5/2019</a:t>
+              <a:t>14/5/2019</a:t>
             </a:fld>
             <a:endParaRPr lang="en-SG"/>
           </a:p>
@@ -1816,7 +1822,7 @@
           <a:p>
             <a:fld id="{168FC4C3-6B25-48E2-93F9-24A255A41CA9}" type="datetimeFigureOut">
               <a:rPr lang="en-SG" smtClean="0"/>
-              <a:t>8/5/2019</a:t>
+              <a:t>14/5/2019</a:t>
             </a:fld>
             <a:endParaRPr lang="en-SG"/>
           </a:p>
@@ -2093,7 +2099,7 @@
           <a:p>
             <a:fld id="{168FC4C3-6B25-48E2-93F9-24A255A41CA9}" type="datetimeFigureOut">
               <a:rPr lang="en-SG" smtClean="0"/>
-              <a:t>8/5/2019</a:t>
+              <a:t>14/5/2019</a:t>
             </a:fld>
             <a:endParaRPr lang="en-SG"/>
           </a:p>
@@ -2346,7 +2352,7 @@
           <a:p>
             <a:fld id="{168FC4C3-6B25-48E2-93F9-24A255A41CA9}" type="datetimeFigureOut">
               <a:rPr lang="en-SG" smtClean="0"/>
-              <a:t>8/5/2019</a:t>
+              <a:t>14/5/2019</a:t>
             </a:fld>
             <a:endParaRPr lang="en-SG"/>
           </a:p>
@@ -2559,7 +2565,7 @@
           <a:p>
             <a:fld id="{168FC4C3-6B25-48E2-93F9-24A255A41CA9}" type="datetimeFigureOut">
               <a:rPr lang="en-SG" smtClean="0"/>
-              <a:t>8/5/2019</a:t>
+              <a:t>14/5/2019</a:t>
             </a:fld>
             <a:endParaRPr lang="en-SG"/>
           </a:p>
@@ -3103,8 +3109,8 @@
         </p:nvSpPr>
         <p:spPr>
           <a:xfrm>
-            <a:off x="7930662" y="963598"/>
-            <a:ext cx="1257300" cy="830997"/>
+            <a:off x="7930661" y="963598"/>
+            <a:ext cx="1696916" cy="646331"/>
           </a:xfrm>
           <a:prstGeom prst="rect">
             <a:avLst/>
@@ -3138,33 +3144,33 @@
               <a:rPr lang="en-US" sz="1200" b="1" dirty="0" smtClean="0"/>
               <a:t> </a:t>
             </a:r>
-          </a:p>
-          <a:p>
-            <a:pPr marL="285750" indent="-285750">
-              <a:buFontTx/>
-              <a:buChar char="-"/>
-            </a:pPr>
+            <a:r>
+              <a:rPr lang="en-US" sz="1200" b="1" dirty="0" smtClean="0"/>
+              <a:t>SSL</a:t>
+            </a:r>
+            <a:r>
+              <a:rPr lang="en-US" sz="1200" b="1" dirty="0" smtClean="0"/>
+              <a:t> server(Load </a:t>
+            </a:r>
             <a:r>
               <a:rPr lang="en-US" sz="1200" b="1" dirty="0" err="1" smtClean="0"/>
-              <a:t>Tcp</a:t>
+              <a:t>CA,cert</a:t>
             </a:r>
             <a:r>
               <a:rPr lang="en-US" sz="1200" b="1" dirty="0" smtClean="0"/>
-              <a:t> server </a:t>
-            </a:r>
-          </a:p>
-          <a:p>
-            <a:pPr marL="285750" indent="-285750">
-              <a:buFontTx/>
-              <a:buChar char="-"/>
-            </a:pPr>
-            <a:r>
-              <a:rPr lang="en-US" sz="1200" b="1" dirty="0" smtClean="0"/>
-              <a:t>Load cert + </a:t>
+              <a:t>, key), load sign </a:t>
             </a:r>
             <a:r>
               <a:rPr lang="en-US" sz="1200" b="1" dirty="0" err="1" smtClean="0"/>
-              <a:t>privateKey</a:t>
+              <a:t>sert</a:t>
+            </a:r>
+            <a:r>
+              <a:rPr lang="en-US" sz="1200" b="1" dirty="0"/>
+              <a:t>. RSA </a:t>
+            </a:r>
+            <a:r>
+              <a:rPr lang="en-US" sz="1200" b="1" dirty="0" err="1" smtClean="0"/>
+              <a:t>decrypter</a:t>
             </a:r>
             <a:endParaRPr lang="en-SG" sz="1200" b="1" dirty="0"/>
           </a:p>
@@ -3178,8 +3184,8 @@
         </p:nvCxnSpPr>
         <p:spPr>
           <a:xfrm>
-            <a:off x="8496301" y="1794595"/>
-            <a:ext cx="0" cy="219807"/>
+            <a:off x="8475785" y="1642195"/>
+            <a:ext cx="20516" cy="372207"/>
           </a:xfrm>
           <a:prstGeom prst="straightConnector1">
             <a:avLst/>
@@ -3263,7 +3269,7 @@
         <p:spPr>
           <a:xfrm>
             <a:off x="5168405" y="963598"/>
-            <a:ext cx="1548917" cy="646331"/>
+            <a:ext cx="1812687" cy="646331"/>
           </a:xfrm>
           <a:prstGeom prst="rect">
             <a:avLst/>
@@ -3298,16 +3304,20 @@
               <a:t> : UI, </a:t>
             </a:r>
             <a:r>
+              <a:rPr lang="en-US" sz="1200" b="1" dirty="0" smtClean="0"/>
+              <a:t>SSL</a:t>
+            </a:r>
+            <a:r>
+              <a:rPr lang="en-US" sz="1200" b="1" dirty="0" smtClean="0"/>
+              <a:t> client(load CV cert, key), </a:t>
+            </a:r>
+            <a:r>
+              <a:rPr lang="en-US" sz="1200" b="1" dirty="0" smtClean="0"/>
+              <a:t>SWATT calculator, RSA </a:t>
+            </a:r>
+            <a:r>
               <a:rPr lang="en-US" sz="1200" b="1" dirty="0" err="1" smtClean="0"/>
-              <a:t>Tcp</a:t>
-            </a:r>
-            <a:r>
-              <a:rPr lang="en-US" sz="1200" b="1" dirty="0" smtClean="0"/>
-              <a:t> client, SWATT calculator, RSA </a:t>
-            </a:r>
-            <a:r>
-              <a:rPr lang="en-US" sz="1200" b="1" dirty="0" err="1" smtClean="0"/>
-              <a:t>encryptor</a:t>
+              <a:t>encrypter</a:t>
             </a:r>
             <a:r>
               <a:rPr lang="en-US" sz="1200" b="1" dirty="0" smtClean="0"/>
@@ -3507,7 +3517,7 @@
         <p:spPr>
           <a:xfrm>
             <a:off x="6655776" y="1976692"/>
-            <a:ext cx="1099038" cy="253916"/>
+            <a:ext cx="1099038" cy="230832"/>
           </a:xfrm>
           <a:prstGeom prst="rect">
             <a:avLst/>
@@ -3521,10 +3531,10 @@
           <a:lstStyle/>
           <a:p>
             <a:r>
-              <a:rPr lang="en-US" sz="1050" dirty="0" smtClean="0"/>
+              <a:rPr lang="en-US" sz="900" dirty="0" smtClean="0"/>
               <a:t>Connect request</a:t>
             </a:r>
-            <a:endParaRPr lang="en-SG" sz="1050" dirty="0"/>
+            <a:endParaRPr lang="en-SG" sz="900" dirty="0"/>
           </a:p>
         </p:txBody>
       </p:sp>
@@ -3619,8 +3629,8 @@
         </p:nvSpPr>
         <p:spPr>
           <a:xfrm>
-            <a:off x="6755421" y="2302505"/>
-            <a:ext cx="1099038" cy="253916"/>
+            <a:off x="6755421" y="2372431"/>
+            <a:ext cx="1099038" cy="230832"/>
           </a:xfrm>
           <a:prstGeom prst="rect">
             <a:avLst/>
@@ -3634,10 +3644,1912 @@
           <a:lstStyle/>
           <a:p>
             <a:r>
-              <a:rPr lang="en-US" sz="1050" dirty="0" smtClean="0"/>
+              <a:rPr lang="en-US" sz="900" dirty="0" smtClean="0"/>
               <a:t>Login request</a:t>
             </a:r>
-            <a:endParaRPr lang="en-SG" sz="1050" dirty="0"/>
+            <a:endParaRPr lang="en-SG" sz="900" dirty="0"/>
+          </a:p>
+        </p:txBody>
+      </p:sp>
+      <p:sp>
+        <p:nvSpPr>
+          <p:cNvPr id="5" name="Rectangle 4"/>
+          <p:cNvSpPr/>
+          <p:nvPr/>
+        </p:nvSpPr>
+        <p:spPr>
+          <a:xfrm>
+            <a:off x="6720983" y="1976693"/>
+            <a:ext cx="1033831" cy="696170"/>
+          </a:xfrm>
+          <a:prstGeom prst="rect">
+            <a:avLst/>
+          </a:prstGeom>
+          <a:noFill/>
+          <a:ln>
+            <a:solidFill>
+              <a:schemeClr val="accent2"/>
+            </a:solidFill>
+            <a:prstDash val="dash"/>
+          </a:ln>
+        </p:spPr>
+        <p:style>
+          <a:lnRef idx="2">
+            <a:schemeClr val="accent1">
+              <a:shade val="50000"/>
+            </a:schemeClr>
+          </a:lnRef>
+          <a:fillRef idx="1">
+            <a:schemeClr val="accent1"/>
+          </a:fillRef>
+          <a:effectRef idx="0">
+            <a:schemeClr val="accent1"/>
+          </a:effectRef>
+          <a:fontRef idx="minor">
+            <a:schemeClr val="lt1"/>
+          </a:fontRef>
+        </p:style>
+        <p:txBody>
+          <a:bodyPr rtlCol="0" anchor="ctr"/>
+          <a:lstStyle/>
+          <a:p>
+            <a:pPr algn="ctr"/>
+            <a:endParaRPr lang="en-SG"/>
+          </a:p>
+        </p:txBody>
+      </p:sp>
+      <p:sp>
+        <p:nvSpPr>
+          <p:cNvPr id="6" name="TextBox 5"/>
+          <p:cNvSpPr txBox="1"/>
+          <p:nvPr/>
+        </p:nvSpPr>
+        <p:spPr>
+          <a:xfrm>
+            <a:off x="6633056" y="1782144"/>
+            <a:ext cx="1068270" cy="230832"/>
+          </a:xfrm>
+          <a:prstGeom prst="rect">
+            <a:avLst/>
+          </a:prstGeom>
+          <a:noFill/>
+        </p:spPr>
+        <p:txBody>
+          <a:bodyPr wrap="square" rtlCol="0">
+            <a:spAutoFit/>
+          </a:bodyPr>
+          <a:lstStyle/>
+          <a:p>
+            <a:r>
+              <a:rPr lang="en-US" sz="900" b="1" dirty="0" smtClean="0">
+                <a:solidFill>
+                  <a:schemeClr val="accent2"/>
+                </a:solidFill>
+              </a:rPr>
+              <a:t>SSL verify</a:t>
+            </a:r>
+            <a:endParaRPr lang="en-SG" sz="900" b="1" dirty="0">
+              <a:solidFill>
+                <a:schemeClr val="accent2"/>
+              </a:solidFill>
+            </a:endParaRPr>
+          </a:p>
+        </p:txBody>
+      </p:sp>
+      <p:sp>
+        <p:nvSpPr>
+          <p:cNvPr id="24" name="TextBox 23"/>
+          <p:cNvSpPr txBox="1"/>
+          <p:nvPr/>
+        </p:nvSpPr>
+        <p:spPr>
+          <a:xfrm>
+            <a:off x="7948247" y="2866850"/>
+            <a:ext cx="1257300" cy="276999"/>
+          </a:xfrm>
+          <a:prstGeom prst="rect">
+            <a:avLst/>
+          </a:prstGeom>
+        </p:spPr>
+        <p:style>
+          <a:lnRef idx="2">
+            <a:schemeClr val="accent5"/>
+          </a:lnRef>
+          <a:fillRef idx="1">
+            <a:schemeClr val="lt1"/>
+          </a:fillRef>
+          <a:effectRef idx="0">
+            <a:schemeClr val="accent5"/>
+          </a:effectRef>
+          <a:fontRef idx="minor">
+            <a:schemeClr val="dk1"/>
+          </a:fontRef>
+        </p:style>
+        <p:txBody>
+          <a:bodyPr wrap="square" rtlCol="0">
+            <a:spAutoFit/>
+          </a:bodyPr>
+          <a:lstStyle/>
+          <a:p>
+            <a:r>
+              <a:rPr lang="en-US" sz="1200" b="1" dirty="0" smtClean="0"/>
+              <a:t>Check user</a:t>
+            </a:r>
+            <a:endParaRPr lang="en-SG" sz="1200" b="1" dirty="0"/>
+          </a:p>
+        </p:txBody>
+      </p:sp>
+      <p:cxnSp>
+        <p:nvCxnSpPr>
+          <p:cNvPr id="10" name="Straight Arrow Connector 9"/>
+          <p:cNvCxnSpPr/>
+          <p:nvPr/>
+        </p:nvCxnSpPr>
+        <p:spPr>
+          <a:xfrm>
+            <a:off x="6633056" y="2789243"/>
+            <a:ext cx="1209682" cy="216106"/>
+          </a:xfrm>
+          <a:prstGeom prst="straightConnector1">
+            <a:avLst/>
+          </a:prstGeom>
+          <a:ln>
+            <a:tailEnd type="triangle"/>
+          </a:ln>
+        </p:spPr>
+        <p:style>
+          <a:lnRef idx="1">
+            <a:schemeClr val="accent1"/>
+          </a:lnRef>
+          <a:fillRef idx="0">
+            <a:schemeClr val="accent1"/>
+          </a:fillRef>
+          <a:effectRef idx="0">
+            <a:schemeClr val="accent1"/>
+          </a:effectRef>
+          <a:fontRef idx="minor">
+            <a:schemeClr val="tx1"/>
+          </a:fontRef>
+        </p:style>
+      </p:cxnSp>
+      <p:sp>
+        <p:nvSpPr>
+          <p:cNvPr id="28" name="TextBox 27"/>
+          <p:cNvSpPr txBox="1"/>
+          <p:nvPr/>
+        </p:nvSpPr>
+        <p:spPr>
+          <a:xfrm>
+            <a:off x="6743700" y="2713305"/>
+            <a:ext cx="1099038" cy="230832"/>
+          </a:xfrm>
+          <a:prstGeom prst="rect">
+            <a:avLst/>
+          </a:prstGeom>
+          <a:noFill/>
+        </p:spPr>
+        <p:txBody>
+          <a:bodyPr wrap="square" rtlCol="0">
+            <a:spAutoFit/>
+          </a:bodyPr>
+          <a:lstStyle/>
+          <a:p>
+            <a:r>
+              <a:rPr lang="en-US" sz="900" dirty="0" smtClean="0"/>
+              <a:t>User + random1</a:t>
+            </a:r>
+            <a:endParaRPr lang="en-SG" sz="900" dirty="0"/>
+          </a:p>
+        </p:txBody>
+      </p:sp>
+      <p:sp>
+        <p:nvSpPr>
+          <p:cNvPr id="29" name="Flowchart: Terminator 28"/>
+          <p:cNvSpPr/>
+          <p:nvPr/>
+        </p:nvSpPr>
+        <p:spPr>
+          <a:xfrm>
+            <a:off x="5290757" y="3093301"/>
+            <a:ext cx="1430226" cy="321394"/>
+          </a:xfrm>
+          <a:prstGeom prst="flowChartTerminator">
+            <a:avLst/>
+          </a:prstGeom>
+        </p:spPr>
+        <p:style>
+          <a:lnRef idx="2">
+            <a:schemeClr val="accent1"/>
+          </a:lnRef>
+          <a:fillRef idx="1">
+            <a:schemeClr val="lt1"/>
+          </a:fillRef>
+          <a:effectRef idx="0">
+            <a:schemeClr val="accent1"/>
+          </a:effectRef>
+          <a:fontRef idx="minor">
+            <a:schemeClr val="dk1"/>
+          </a:fontRef>
+        </p:style>
+        <p:txBody>
+          <a:bodyPr rtlCol="0" anchor="ctr"/>
+          <a:lstStyle/>
+          <a:p>
+            <a:pPr algn="ctr"/>
+            <a:r>
+              <a:rPr lang="en-US" sz="900" dirty="0" smtClean="0">
+                <a:solidFill>
+                  <a:schemeClr val="tx1"/>
+                </a:solidFill>
+              </a:rPr>
+              <a:t>Verify server and active password type in</a:t>
+            </a:r>
+            <a:r>
+              <a:rPr lang="en-US" sz="900" dirty="0" smtClean="0">
+                <a:solidFill>
+                  <a:schemeClr val="tx1"/>
+                </a:solidFill>
+              </a:rPr>
+              <a:t> </a:t>
+            </a:r>
+            <a:endParaRPr lang="en-SG" sz="900" dirty="0">
+              <a:solidFill>
+                <a:schemeClr val="tx1"/>
+              </a:solidFill>
+            </a:endParaRPr>
+          </a:p>
+        </p:txBody>
+      </p:sp>
+      <p:cxnSp>
+        <p:nvCxnSpPr>
+          <p:cNvPr id="19" name="Straight Arrow Connector 18"/>
+          <p:cNvCxnSpPr/>
+          <p:nvPr/>
+        </p:nvCxnSpPr>
+        <p:spPr>
+          <a:xfrm flipH="1">
+            <a:off x="6755421" y="3093301"/>
+            <a:ext cx="1099038" cy="133476"/>
+          </a:xfrm>
+          <a:prstGeom prst="straightConnector1">
+            <a:avLst/>
+          </a:prstGeom>
+          <a:ln>
+            <a:tailEnd type="triangle"/>
+          </a:ln>
+        </p:spPr>
+        <p:style>
+          <a:lnRef idx="1">
+            <a:schemeClr val="accent1"/>
+          </a:lnRef>
+          <a:fillRef idx="0">
+            <a:schemeClr val="accent1"/>
+          </a:fillRef>
+          <a:effectRef idx="0">
+            <a:schemeClr val="accent1"/>
+          </a:effectRef>
+          <a:fontRef idx="minor">
+            <a:schemeClr val="tx1"/>
+          </a:fontRef>
+        </p:style>
+      </p:cxnSp>
+      <p:sp>
+        <p:nvSpPr>
+          <p:cNvPr id="35" name="TextBox 34"/>
+          <p:cNvSpPr txBox="1"/>
+          <p:nvPr/>
+        </p:nvSpPr>
+        <p:spPr>
+          <a:xfrm>
+            <a:off x="6814771" y="3043159"/>
+            <a:ext cx="1115890" cy="230832"/>
+          </a:xfrm>
+          <a:prstGeom prst="rect">
+            <a:avLst/>
+          </a:prstGeom>
+          <a:noFill/>
+        </p:spPr>
+        <p:txBody>
+          <a:bodyPr wrap="square" rtlCol="0">
+            <a:spAutoFit/>
+          </a:bodyPr>
+          <a:lstStyle/>
+          <a:p>
+            <a:r>
+              <a:rPr lang="en-US" sz="900" dirty="0" smtClean="0"/>
+              <a:t>Random1+random2</a:t>
+            </a:r>
+            <a:endParaRPr lang="en-SG" sz="900" dirty="0"/>
+          </a:p>
+        </p:txBody>
+      </p:sp>
+      <p:sp>
+        <p:nvSpPr>
+          <p:cNvPr id="36" name="TextBox 35"/>
+          <p:cNvSpPr txBox="1"/>
+          <p:nvPr/>
+        </p:nvSpPr>
+        <p:spPr>
+          <a:xfrm>
+            <a:off x="7957040" y="3414695"/>
+            <a:ext cx="1679331" cy="461665"/>
+          </a:xfrm>
+          <a:prstGeom prst="rect">
+            <a:avLst/>
+          </a:prstGeom>
+        </p:spPr>
+        <p:style>
+          <a:lnRef idx="2">
+            <a:schemeClr val="accent5"/>
+          </a:lnRef>
+          <a:fillRef idx="1">
+            <a:schemeClr val="lt1"/>
+          </a:fillRef>
+          <a:effectRef idx="0">
+            <a:schemeClr val="accent5"/>
+          </a:effectRef>
+          <a:fontRef idx="minor">
+            <a:schemeClr val="dk1"/>
+          </a:fontRef>
+        </p:style>
+        <p:txBody>
+          <a:bodyPr wrap="square" rtlCol="0">
+            <a:spAutoFit/>
+          </a:bodyPr>
+          <a:lstStyle/>
+          <a:p>
+            <a:r>
+              <a:rPr lang="en-US" sz="1200" b="1" dirty="0" smtClean="0"/>
+              <a:t>Verify client, authorize </a:t>
+            </a:r>
+            <a:r>
+              <a:rPr lang="en-US" sz="1200" b="1" dirty="0" err="1" smtClean="0"/>
+              <a:t>usr+pwd</a:t>
+            </a:r>
+            <a:endParaRPr lang="en-SG" sz="1200" b="1" dirty="0"/>
+          </a:p>
+        </p:txBody>
+      </p:sp>
+      <p:cxnSp>
+        <p:nvCxnSpPr>
+          <p:cNvPr id="38" name="Straight Arrow Connector 37"/>
+          <p:cNvCxnSpPr/>
+          <p:nvPr/>
+        </p:nvCxnSpPr>
+        <p:spPr>
+          <a:xfrm>
+            <a:off x="6750288" y="3354885"/>
+            <a:ext cx="1209682" cy="216106"/>
+          </a:xfrm>
+          <a:prstGeom prst="straightConnector1">
+            <a:avLst/>
+          </a:prstGeom>
+          <a:ln>
+            <a:tailEnd type="triangle"/>
+          </a:ln>
+        </p:spPr>
+        <p:style>
+          <a:lnRef idx="1">
+            <a:schemeClr val="accent1"/>
+          </a:lnRef>
+          <a:fillRef idx="0">
+            <a:schemeClr val="accent1"/>
+          </a:fillRef>
+          <a:effectRef idx="0">
+            <a:schemeClr val="accent1"/>
+          </a:effectRef>
+          <a:fontRef idx="minor">
+            <a:schemeClr val="tx1"/>
+          </a:fontRef>
+        </p:style>
+      </p:cxnSp>
+      <p:sp>
+        <p:nvSpPr>
+          <p:cNvPr id="39" name="TextBox 38"/>
+          <p:cNvSpPr txBox="1"/>
+          <p:nvPr/>
+        </p:nvSpPr>
+        <p:spPr>
+          <a:xfrm>
+            <a:off x="6808180" y="3331699"/>
+            <a:ext cx="1192826" cy="230832"/>
+          </a:xfrm>
+          <a:prstGeom prst="rect">
+            <a:avLst/>
+          </a:prstGeom>
+          <a:noFill/>
+        </p:spPr>
+        <p:txBody>
+          <a:bodyPr wrap="square" rtlCol="0">
+            <a:spAutoFit/>
+          </a:bodyPr>
+          <a:lstStyle/>
+          <a:p>
+            <a:r>
+              <a:rPr lang="en-US" sz="900" dirty="0" smtClean="0"/>
+              <a:t>password + random2</a:t>
+            </a:r>
+            <a:endParaRPr lang="en-SG" sz="900" dirty="0"/>
+          </a:p>
+        </p:txBody>
+      </p:sp>
+      <p:sp>
+        <p:nvSpPr>
+          <p:cNvPr id="27" name="Can 26"/>
+          <p:cNvSpPr/>
+          <p:nvPr/>
+        </p:nvSpPr>
+        <p:spPr>
+          <a:xfrm>
+            <a:off x="10515600" y="2392241"/>
+            <a:ext cx="826477" cy="474609"/>
+          </a:xfrm>
+          <a:prstGeom prst="can">
+            <a:avLst/>
+          </a:prstGeom>
+        </p:spPr>
+        <p:style>
+          <a:lnRef idx="2">
+            <a:schemeClr val="accent1"/>
+          </a:lnRef>
+          <a:fillRef idx="1">
+            <a:schemeClr val="lt1"/>
+          </a:fillRef>
+          <a:effectRef idx="0">
+            <a:schemeClr val="accent1"/>
+          </a:effectRef>
+          <a:fontRef idx="minor">
+            <a:schemeClr val="dk1"/>
+          </a:fontRef>
+        </p:style>
+        <p:txBody>
+          <a:bodyPr rtlCol="0" anchor="ctr"/>
+          <a:lstStyle/>
+          <a:p>
+            <a:pPr algn="ctr"/>
+            <a:endParaRPr lang="en-SG"/>
+          </a:p>
+        </p:txBody>
+      </p:sp>
+      <p:cxnSp>
+        <p:nvCxnSpPr>
+          <p:cNvPr id="31" name="Straight Arrow Connector 30"/>
+          <p:cNvCxnSpPr>
+            <a:stCxn id="24" idx="3"/>
+          </p:cNvCxnSpPr>
+          <p:nvPr/>
+        </p:nvCxnSpPr>
+        <p:spPr>
+          <a:xfrm flipV="1">
+            <a:off x="9205547" y="2713305"/>
+            <a:ext cx="1248507" cy="292045"/>
+          </a:xfrm>
+          <a:prstGeom prst="straightConnector1">
+            <a:avLst/>
+          </a:prstGeom>
+          <a:ln>
+            <a:tailEnd type="triangle"/>
+          </a:ln>
+        </p:spPr>
+        <p:style>
+          <a:lnRef idx="1">
+            <a:schemeClr val="accent1"/>
+          </a:lnRef>
+          <a:fillRef idx="0">
+            <a:schemeClr val="accent1"/>
+          </a:fillRef>
+          <a:effectRef idx="0">
+            <a:schemeClr val="accent1"/>
+          </a:effectRef>
+          <a:fontRef idx="minor">
+            <a:schemeClr val="tx1"/>
+          </a:fontRef>
+        </p:style>
+      </p:cxnSp>
+      <p:cxnSp>
+        <p:nvCxnSpPr>
+          <p:cNvPr id="41" name="Straight Arrow Connector 40"/>
+          <p:cNvCxnSpPr/>
+          <p:nvPr/>
+        </p:nvCxnSpPr>
+        <p:spPr>
+          <a:xfrm flipV="1">
+            <a:off x="9636371" y="2944138"/>
+            <a:ext cx="879229" cy="701389"/>
+          </a:xfrm>
+          <a:prstGeom prst="straightConnector1">
+            <a:avLst/>
+          </a:prstGeom>
+          <a:ln>
+            <a:headEnd type="triangle"/>
+            <a:tailEnd type="triangle"/>
+          </a:ln>
+        </p:spPr>
+        <p:style>
+          <a:lnRef idx="1">
+            <a:schemeClr val="accent1"/>
+          </a:lnRef>
+          <a:fillRef idx="0">
+            <a:schemeClr val="accent1"/>
+          </a:fillRef>
+          <a:effectRef idx="0">
+            <a:schemeClr val="accent1"/>
+          </a:effectRef>
+          <a:fontRef idx="minor">
+            <a:schemeClr val="tx1"/>
+          </a:fontRef>
+        </p:style>
+      </p:cxnSp>
+      <p:cxnSp>
+        <p:nvCxnSpPr>
+          <p:cNvPr id="50" name="Straight Arrow Connector 49"/>
+          <p:cNvCxnSpPr>
+            <a:endCxn id="15" idx="2"/>
+          </p:cNvCxnSpPr>
+          <p:nvPr/>
+        </p:nvCxnSpPr>
+        <p:spPr>
+          <a:xfrm flipV="1">
+            <a:off x="8779119" y="1609929"/>
+            <a:ext cx="0" cy="366763"/>
+          </a:xfrm>
+          <a:prstGeom prst="straightConnector1">
+            <a:avLst/>
+          </a:prstGeom>
+          <a:ln>
+            <a:solidFill>
+              <a:schemeClr val="accent2">
+                <a:lumMod val="75000"/>
+              </a:schemeClr>
+            </a:solidFill>
+            <a:prstDash val="dash"/>
+            <a:tailEnd type="triangle"/>
+          </a:ln>
+        </p:spPr>
+        <p:style>
+          <a:lnRef idx="1">
+            <a:schemeClr val="accent1"/>
+          </a:lnRef>
+          <a:fillRef idx="0">
+            <a:schemeClr val="accent1"/>
+          </a:fillRef>
+          <a:effectRef idx="0">
+            <a:schemeClr val="accent1"/>
+          </a:effectRef>
+          <a:fontRef idx="minor">
+            <a:schemeClr val="tx1"/>
+          </a:fontRef>
+        </p:style>
+      </p:cxnSp>
+      <p:cxnSp>
+        <p:nvCxnSpPr>
+          <p:cNvPr id="51" name="Straight Arrow Connector 50"/>
+          <p:cNvCxnSpPr/>
+          <p:nvPr/>
+        </p:nvCxnSpPr>
+        <p:spPr>
+          <a:xfrm flipV="1">
+            <a:off x="8779119" y="2535877"/>
+            <a:ext cx="0" cy="301068"/>
+          </a:xfrm>
+          <a:prstGeom prst="straightConnector1">
+            <a:avLst/>
+          </a:prstGeom>
+          <a:ln>
+            <a:solidFill>
+              <a:schemeClr val="accent2">
+                <a:lumMod val="75000"/>
+              </a:schemeClr>
+            </a:solidFill>
+            <a:prstDash val="dash"/>
+            <a:tailEnd type="triangle"/>
+          </a:ln>
+        </p:spPr>
+        <p:style>
+          <a:lnRef idx="1">
+            <a:schemeClr val="accent1"/>
+          </a:lnRef>
+          <a:fillRef idx="0">
+            <a:schemeClr val="accent1"/>
+          </a:fillRef>
+          <a:effectRef idx="0">
+            <a:schemeClr val="accent1"/>
+          </a:effectRef>
+          <a:fontRef idx="minor">
+            <a:schemeClr val="tx1"/>
+          </a:fontRef>
+        </p:style>
+      </p:cxnSp>
+      <p:cxnSp>
+        <p:nvCxnSpPr>
+          <p:cNvPr id="58" name="Straight Arrow Connector 57"/>
+          <p:cNvCxnSpPr/>
+          <p:nvPr/>
+        </p:nvCxnSpPr>
+        <p:spPr>
+          <a:xfrm>
+            <a:off x="8425960" y="2471141"/>
+            <a:ext cx="0" cy="357580"/>
+          </a:xfrm>
+          <a:prstGeom prst="straightConnector1">
+            <a:avLst/>
+          </a:prstGeom>
+          <a:ln>
+            <a:tailEnd type="triangle"/>
+          </a:ln>
+        </p:spPr>
+        <p:style>
+          <a:lnRef idx="1">
+            <a:schemeClr val="accent1"/>
+          </a:lnRef>
+          <a:fillRef idx="0">
+            <a:schemeClr val="accent1"/>
+          </a:fillRef>
+          <a:effectRef idx="0">
+            <a:schemeClr val="accent1"/>
+          </a:effectRef>
+          <a:fontRef idx="minor">
+            <a:schemeClr val="tx1"/>
+          </a:fontRef>
+        </p:style>
+      </p:cxnSp>
+      <p:cxnSp>
+        <p:nvCxnSpPr>
+          <p:cNvPr id="60" name="Straight Arrow Connector 59"/>
+          <p:cNvCxnSpPr/>
+          <p:nvPr/>
+        </p:nvCxnSpPr>
+        <p:spPr>
+          <a:xfrm>
+            <a:off x="8431825" y="3165233"/>
+            <a:ext cx="0" cy="236161"/>
+          </a:xfrm>
+          <a:prstGeom prst="straightConnector1">
+            <a:avLst/>
+          </a:prstGeom>
+          <a:ln>
+            <a:tailEnd type="triangle"/>
+          </a:ln>
+        </p:spPr>
+        <p:style>
+          <a:lnRef idx="1">
+            <a:schemeClr val="accent1"/>
+          </a:lnRef>
+          <a:fillRef idx="0">
+            <a:schemeClr val="accent1"/>
+          </a:fillRef>
+          <a:effectRef idx="0">
+            <a:schemeClr val="accent1"/>
+          </a:effectRef>
+          <a:fontRef idx="minor">
+            <a:schemeClr val="tx1"/>
+          </a:fontRef>
+        </p:style>
+      </p:cxnSp>
+      <p:cxnSp>
+        <p:nvCxnSpPr>
+          <p:cNvPr id="63" name="Straight Connector 62"/>
+          <p:cNvCxnSpPr/>
+          <p:nvPr/>
+        </p:nvCxnSpPr>
+        <p:spPr>
+          <a:xfrm flipV="1">
+            <a:off x="9486900" y="3263852"/>
+            <a:ext cx="2658" cy="121090"/>
+          </a:xfrm>
+          <a:prstGeom prst="line">
+            <a:avLst/>
+          </a:prstGeom>
+          <a:ln>
+            <a:solidFill>
+              <a:srgbClr val="C00000"/>
+            </a:solidFill>
+            <a:prstDash val="dash"/>
+          </a:ln>
+        </p:spPr>
+        <p:style>
+          <a:lnRef idx="1">
+            <a:schemeClr val="accent1"/>
+          </a:lnRef>
+          <a:fillRef idx="0">
+            <a:schemeClr val="accent1"/>
+          </a:fillRef>
+          <a:effectRef idx="0">
+            <a:schemeClr val="accent1"/>
+          </a:effectRef>
+          <a:fontRef idx="minor">
+            <a:schemeClr val="tx1"/>
+          </a:fontRef>
+        </p:style>
+      </p:cxnSp>
+      <p:cxnSp>
+        <p:nvCxnSpPr>
+          <p:cNvPr id="67" name="Straight Connector 66"/>
+          <p:cNvCxnSpPr/>
+          <p:nvPr/>
+        </p:nvCxnSpPr>
+        <p:spPr>
+          <a:xfrm flipH="1">
+            <a:off x="8963247" y="3253998"/>
+            <a:ext cx="523653" cy="0"/>
+          </a:xfrm>
+          <a:prstGeom prst="line">
+            <a:avLst/>
+          </a:prstGeom>
+          <a:ln>
+            <a:solidFill>
+              <a:srgbClr val="C00000"/>
+            </a:solidFill>
+            <a:prstDash val="dash"/>
+          </a:ln>
+        </p:spPr>
+        <p:style>
+          <a:lnRef idx="1">
+            <a:schemeClr val="accent1"/>
+          </a:lnRef>
+          <a:fillRef idx="0">
+            <a:schemeClr val="accent1"/>
+          </a:fillRef>
+          <a:effectRef idx="0">
+            <a:schemeClr val="accent1"/>
+          </a:effectRef>
+          <a:fontRef idx="minor">
+            <a:schemeClr val="tx1"/>
+          </a:fontRef>
+        </p:style>
+      </p:cxnSp>
+      <p:cxnSp>
+        <p:nvCxnSpPr>
+          <p:cNvPr id="69" name="Straight Arrow Connector 68"/>
+          <p:cNvCxnSpPr/>
+          <p:nvPr/>
+        </p:nvCxnSpPr>
+        <p:spPr>
+          <a:xfrm flipH="1">
+            <a:off x="8920718" y="3273991"/>
+            <a:ext cx="12272" cy="140704"/>
+          </a:xfrm>
+          <a:prstGeom prst="straightConnector1">
+            <a:avLst/>
+          </a:prstGeom>
+          <a:ln>
+            <a:solidFill>
+              <a:srgbClr val="C00000"/>
+            </a:solidFill>
+            <a:tailEnd type="triangle"/>
+          </a:ln>
+        </p:spPr>
+        <p:style>
+          <a:lnRef idx="1">
+            <a:schemeClr val="accent1"/>
+          </a:lnRef>
+          <a:fillRef idx="0">
+            <a:schemeClr val="accent1"/>
+          </a:fillRef>
+          <a:effectRef idx="0">
+            <a:schemeClr val="accent1"/>
+          </a:effectRef>
+          <a:fontRef idx="minor">
+            <a:schemeClr val="tx1"/>
+          </a:fontRef>
+        </p:style>
+      </p:cxnSp>
+      <p:cxnSp>
+        <p:nvCxnSpPr>
+          <p:cNvPr id="73" name="Straight Arrow Connector 72"/>
+          <p:cNvCxnSpPr/>
+          <p:nvPr/>
+        </p:nvCxnSpPr>
+        <p:spPr>
+          <a:xfrm flipH="1">
+            <a:off x="6732924" y="3690814"/>
+            <a:ext cx="1246312" cy="232116"/>
+          </a:xfrm>
+          <a:prstGeom prst="straightConnector1">
+            <a:avLst/>
+          </a:prstGeom>
+          <a:ln>
+            <a:tailEnd type="triangle"/>
+          </a:ln>
+        </p:spPr>
+        <p:style>
+          <a:lnRef idx="1">
+            <a:schemeClr val="accent1"/>
+          </a:lnRef>
+          <a:fillRef idx="0">
+            <a:schemeClr val="accent1"/>
+          </a:fillRef>
+          <a:effectRef idx="0">
+            <a:schemeClr val="accent1"/>
+          </a:effectRef>
+          <a:fontRef idx="minor">
+            <a:schemeClr val="tx1"/>
+          </a:fontRef>
+        </p:style>
+      </p:cxnSp>
+      <p:sp>
+        <p:nvSpPr>
+          <p:cNvPr id="77" name="TextBox 76"/>
+          <p:cNvSpPr txBox="1"/>
+          <p:nvPr/>
+        </p:nvSpPr>
+        <p:spPr>
+          <a:xfrm>
+            <a:off x="6825220" y="3706101"/>
+            <a:ext cx="1192826" cy="507831"/>
+          </a:xfrm>
+          <a:prstGeom prst="rect">
+            <a:avLst/>
+          </a:prstGeom>
+          <a:noFill/>
+        </p:spPr>
+        <p:txBody>
+          <a:bodyPr wrap="square" rtlCol="0">
+            <a:spAutoFit/>
+          </a:bodyPr>
+          <a:lstStyle/>
+          <a:p>
+            <a:r>
+              <a:rPr lang="en-US" sz="900" dirty="0" smtClean="0"/>
+              <a:t> Heart Beat feed back</a:t>
+            </a:r>
+          </a:p>
+          <a:p>
+            <a:r>
+              <a:rPr lang="en-US" sz="900" dirty="0" smtClean="0"/>
+              <a:t>+ random SWATT challenge.</a:t>
+            </a:r>
+            <a:endParaRPr lang="en-SG" sz="900" dirty="0"/>
+          </a:p>
+        </p:txBody>
+      </p:sp>
+      <p:sp>
+        <p:nvSpPr>
+          <p:cNvPr id="78" name="TextBox 77"/>
+          <p:cNvSpPr txBox="1"/>
+          <p:nvPr/>
+        </p:nvSpPr>
+        <p:spPr>
+          <a:xfrm>
+            <a:off x="5286371" y="3818804"/>
+            <a:ext cx="1438643" cy="276999"/>
+          </a:xfrm>
+          <a:prstGeom prst="rect">
+            <a:avLst/>
+          </a:prstGeom>
+        </p:spPr>
+        <p:style>
+          <a:lnRef idx="2">
+            <a:schemeClr val="accent5"/>
+          </a:lnRef>
+          <a:fillRef idx="1">
+            <a:schemeClr val="lt1"/>
+          </a:fillRef>
+          <a:effectRef idx="0">
+            <a:schemeClr val="accent5"/>
+          </a:effectRef>
+          <a:fontRef idx="minor">
+            <a:schemeClr val="dk1"/>
+          </a:fontRef>
+        </p:style>
+        <p:txBody>
+          <a:bodyPr wrap="square" rtlCol="0">
+            <a:spAutoFit/>
+          </a:bodyPr>
+          <a:lstStyle/>
+          <a:p>
+            <a:r>
+              <a:rPr lang="en-US" sz="1200" b="1" dirty="0" smtClean="0"/>
+              <a:t>Select firmware file</a:t>
+            </a:r>
+            <a:endParaRPr lang="en-SG" sz="1200" b="1" dirty="0"/>
+          </a:p>
+        </p:txBody>
+      </p:sp>
+      <p:cxnSp>
+        <p:nvCxnSpPr>
+          <p:cNvPr id="80" name="Straight Arrow Connector 79"/>
+          <p:cNvCxnSpPr/>
+          <p:nvPr/>
+        </p:nvCxnSpPr>
+        <p:spPr>
+          <a:xfrm>
+            <a:off x="5906960" y="4093510"/>
+            <a:ext cx="0" cy="271762"/>
+          </a:xfrm>
+          <a:prstGeom prst="straightConnector1">
+            <a:avLst/>
+          </a:prstGeom>
+          <a:ln>
+            <a:tailEnd type="triangle"/>
+          </a:ln>
+        </p:spPr>
+        <p:style>
+          <a:lnRef idx="1">
+            <a:schemeClr val="accent1"/>
+          </a:lnRef>
+          <a:fillRef idx="0">
+            <a:schemeClr val="accent1"/>
+          </a:fillRef>
+          <a:effectRef idx="0">
+            <a:schemeClr val="accent1"/>
+          </a:effectRef>
+          <a:fontRef idx="minor">
+            <a:schemeClr val="tx1"/>
+          </a:fontRef>
+        </p:style>
+      </p:cxnSp>
+      <p:sp>
+        <p:nvSpPr>
+          <p:cNvPr id="84" name="TextBox 83"/>
+          <p:cNvSpPr txBox="1"/>
+          <p:nvPr/>
+        </p:nvSpPr>
+        <p:spPr>
+          <a:xfrm>
+            <a:off x="5281521" y="4368622"/>
+            <a:ext cx="1607333" cy="276999"/>
+          </a:xfrm>
+          <a:prstGeom prst="rect">
+            <a:avLst/>
+          </a:prstGeom>
+        </p:spPr>
+        <p:style>
+          <a:lnRef idx="2">
+            <a:schemeClr val="accent5"/>
+          </a:lnRef>
+          <a:fillRef idx="1">
+            <a:schemeClr val="lt1"/>
+          </a:fillRef>
+          <a:effectRef idx="0">
+            <a:schemeClr val="accent5"/>
+          </a:effectRef>
+          <a:fontRef idx="minor">
+            <a:schemeClr val="dk1"/>
+          </a:fontRef>
+        </p:style>
+        <p:txBody>
+          <a:bodyPr wrap="square" rtlCol="0">
+            <a:spAutoFit/>
+          </a:bodyPr>
+          <a:lstStyle/>
+          <a:p>
+            <a:r>
+              <a:rPr lang="en-US" sz="1200" b="1" dirty="0" smtClean="0"/>
+              <a:t>User press sign button </a:t>
+            </a:r>
+            <a:endParaRPr lang="en-SG" sz="1200" b="1" dirty="0"/>
+          </a:p>
+        </p:txBody>
+      </p:sp>
+      <p:cxnSp>
+        <p:nvCxnSpPr>
+          <p:cNvPr id="85" name="Straight Arrow Connector 84"/>
+          <p:cNvCxnSpPr/>
+          <p:nvPr/>
+        </p:nvCxnSpPr>
+        <p:spPr>
+          <a:xfrm>
+            <a:off x="6888854" y="4453668"/>
+            <a:ext cx="1209682" cy="216106"/>
+          </a:xfrm>
+          <a:prstGeom prst="straightConnector1">
+            <a:avLst/>
+          </a:prstGeom>
+          <a:ln>
+            <a:tailEnd type="triangle"/>
+          </a:ln>
+        </p:spPr>
+        <p:style>
+          <a:lnRef idx="1">
+            <a:schemeClr val="accent1"/>
+          </a:lnRef>
+          <a:fillRef idx="0">
+            <a:schemeClr val="accent1"/>
+          </a:fillRef>
+          <a:effectRef idx="0">
+            <a:schemeClr val="accent1"/>
+          </a:effectRef>
+          <a:fontRef idx="minor">
+            <a:schemeClr val="tx1"/>
+          </a:fontRef>
+        </p:style>
+      </p:cxnSp>
+      <p:sp>
+        <p:nvSpPr>
+          <p:cNvPr id="87" name="TextBox 86"/>
+          <p:cNvSpPr txBox="1"/>
+          <p:nvPr/>
+        </p:nvSpPr>
+        <p:spPr>
+          <a:xfrm>
+            <a:off x="6825220" y="4409502"/>
+            <a:ext cx="1206204" cy="230832"/>
+          </a:xfrm>
+          <a:prstGeom prst="rect">
+            <a:avLst/>
+          </a:prstGeom>
+          <a:noFill/>
+        </p:spPr>
+        <p:txBody>
+          <a:bodyPr wrap="square" rtlCol="0">
+            <a:spAutoFit/>
+          </a:bodyPr>
+          <a:lstStyle/>
+          <a:p>
+            <a:r>
+              <a:rPr lang="en-US" sz="900" dirty="0" smtClean="0"/>
+              <a:t> Fetch sign certificate </a:t>
+            </a:r>
+            <a:endParaRPr lang="en-SG" sz="900" dirty="0"/>
+          </a:p>
+        </p:txBody>
+      </p:sp>
+      <p:sp>
+        <p:nvSpPr>
+          <p:cNvPr id="88" name="TextBox 87"/>
+          <p:cNvSpPr txBox="1"/>
+          <p:nvPr/>
+        </p:nvSpPr>
+        <p:spPr>
+          <a:xfrm>
+            <a:off x="8117130" y="4561721"/>
+            <a:ext cx="1088418" cy="276999"/>
+          </a:xfrm>
+          <a:prstGeom prst="rect">
+            <a:avLst/>
+          </a:prstGeom>
+        </p:spPr>
+        <p:style>
+          <a:lnRef idx="2">
+            <a:schemeClr val="accent5"/>
+          </a:lnRef>
+          <a:fillRef idx="1">
+            <a:schemeClr val="lt1"/>
+          </a:fillRef>
+          <a:effectRef idx="0">
+            <a:schemeClr val="accent5"/>
+          </a:effectRef>
+          <a:fontRef idx="minor">
+            <a:schemeClr val="dk1"/>
+          </a:fontRef>
+        </p:style>
+        <p:txBody>
+          <a:bodyPr wrap="square" rtlCol="0">
+            <a:spAutoFit/>
+          </a:bodyPr>
+          <a:lstStyle/>
+          <a:p>
+            <a:r>
+              <a:rPr lang="en-US" sz="1200" b="1" dirty="0" smtClean="0"/>
+              <a:t>File translate </a:t>
+            </a:r>
+            <a:endParaRPr lang="en-SG" sz="1200" b="1" dirty="0"/>
+          </a:p>
+        </p:txBody>
+      </p:sp>
+      <p:cxnSp>
+        <p:nvCxnSpPr>
+          <p:cNvPr id="89" name="Straight Arrow Connector 88"/>
+          <p:cNvCxnSpPr/>
+          <p:nvPr/>
+        </p:nvCxnSpPr>
+        <p:spPr>
+          <a:xfrm flipH="1">
+            <a:off x="6888854" y="4775540"/>
+            <a:ext cx="1218878" cy="226766"/>
+          </a:xfrm>
+          <a:prstGeom prst="straightConnector1">
+            <a:avLst/>
+          </a:prstGeom>
+          <a:ln>
+            <a:tailEnd type="triangle"/>
+          </a:ln>
+        </p:spPr>
+        <p:style>
+          <a:lnRef idx="1">
+            <a:schemeClr val="accent1"/>
+          </a:lnRef>
+          <a:fillRef idx="0">
+            <a:schemeClr val="accent1"/>
+          </a:fillRef>
+          <a:effectRef idx="0">
+            <a:schemeClr val="accent1"/>
+          </a:effectRef>
+          <a:fontRef idx="minor">
+            <a:schemeClr val="tx1"/>
+          </a:fontRef>
+        </p:style>
+      </p:cxnSp>
+      <p:sp>
+        <p:nvSpPr>
+          <p:cNvPr id="93" name="TextBox 92"/>
+          <p:cNvSpPr txBox="1"/>
+          <p:nvPr/>
+        </p:nvSpPr>
+        <p:spPr>
+          <a:xfrm>
+            <a:off x="7005026" y="4822110"/>
+            <a:ext cx="1099038" cy="230832"/>
+          </a:xfrm>
+          <a:prstGeom prst="rect">
+            <a:avLst/>
+          </a:prstGeom>
+          <a:noFill/>
+        </p:spPr>
+        <p:txBody>
+          <a:bodyPr wrap="square" rtlCol="0">
+            <a:spAutoFit/>
+          </a:bodyPr>
+          <a:lstStyle/>
+          <a:p>
+            <a:r>
+              <a:rPr lang="en-US" sz="900" dirty="0" smtClean="0"/>
+              <a:t>File buffer data </a:t>
+            </a:r>
+            <a:endParaRPr lang="en-SG" sz="900" dirty="0"/>
+          </a:p>
+        </p:txBody>
+      </p:sp>
+      <p:sp>
+        <p:nvSpPr>
+          <p:cNvPr id="94" name="TextBox 93"/>
+          <p:cNvSpPr txBox="1"/>
+          <p:nvPr/>
+        </p:nvSpPr>
+        <p:spPr>
+          <a:xfrm>
+            <a:off x="5438588" y="4946142"/>
+            <a:ext cx="1459502" cy="276999"/>
+          </a:xfrm>
+          <a:prstGeom prst="rect">
+            <a:avLst/>
+          </a:prstGeom>
+        </p:spPr>
+        <p:style>
+          <a:lnRef idx="2">
+            <a:schemeClr val="accent5"/>
+          </a:lnRef>
+          <a:fillRef idx="1">
+            <a:schemeClr val="lt1"/>
+          </a:fillRef>
+          <a:effectRef idx="0">
+            <a:schemeClr val="accent5"/>
+          </a:effectRef>
+          <a:fontRef idx="minor">
+            <a:schemeClr val="dk1"/>
+          </a:fontRef>
+        </p:style>
+        <p:txBody>
+          <a:bodyPr wrap="square" rtlCol="0">
+            <a:spAutoFit/>
+          </a:bodyPr>
+          <a:lstStyle/>
+          <a:p>
+            <a:r>
+              <a:rPr lang="en-US" sz="1200" b="1" dirty="0" smtClean="0"/>
+              <a:t>Sign the data string</a:t>
+            </a:r>
+            <a:endParaRPr lang="en-SG" sz="1200" b="1" dirty="0"/>
+          </a:p>
+        </p:txBody>
+      </p:sp>
+      <p:cxnSp>
+        <p:nvCxnSpPr>
+          <p:cNvPr id="95" name="Straight Arrow Connector 94"/>
+          <p:cNvCxnSpPr/>
+          <p:nvPr/>
+        </p:nvCxnSpPr>
+        <p:spPr>
+          <a:xfrm>
+            <a:off x="6923033" y="5139029"/>
+            <a:ext cx="1209682" cy="216106"/>
+          </a:xfrm>
+          <a:prstGeom prst="straightConnector1">
+            <a:avLst/>
+          </a:prstGeom>
+          <a:ln>
+            <a:tailEnd type="triangle"/>
+          </a:ln>
+        </p:spPr>
+        <p:style>
+          <a:lnRef idx="1">
+            <a:schemeClr val="accent1"/>
+          </a:lnRef>
+          <a:fillRef idx="0">
+            <a:schemeClr val="accent1"/>
+          </a:fillRef>
+          <a:effectRef idx="0">
+            <a:schemeClr val="accent1"/>
+          </a:effectRef>
+          <a:fontRef idx="minor">
+            <a:schemeClr val="tx1"/>
+          </a:fontRef>
+        </p:style>
+      </p:cxnSp>
+      <p:sp>
+        <p:nvSpPr>
+          <p:cNvPr id="98" name="TextBox 97"/>
+          <p:cNvSpPr txBox="1"/>
+          <p:nvPr/>
+        </p:nvSpPr>
+        <p:spPr>
+          <a:xfrm>
+            <a:off x="7037777" y="5123177"/>
+            <a:ext cx="1099038" cy="230832"/>
+          </a:xfrm>
+          <a:prstGeom prst="rect">
+            <a:avLst/>
+          </a:prstGeom>
+          <a:noFill/>
+        </p:spPr>
+        <p:txBody>
+          <a:bodyPr wrap="square" rtlCol="0">
+            <a:spAutoFit/>
+          </a:bodyPr>
+          <a:lstStyle/>
+          <a:p>
+            <a:r>
+              <a:rPr lang="en-US" sz="900" dirty="0" smtClean="0"/>
+              <a:t>Signed data </a:t>
+            </a:r>
+            <a:endParaRPr lang="en-SG" sz="900" dirty="0"/>
+          </a:p>
+        </p:txBody>
+      </p:sp>
+      <p:sp>
+        <p:nvSpPr>
+          <p:cNvPr id="99" name="TextBox 98"/>
+          <p:cNvSpPr txBox="1"/>
+          <p:nvPr/>
+        </p:nvSpPr>
+        <p:spPr>
+          <a:xfrm>
+            <a:off x="8132715" y="5252150"/>
+            <a:ext cx="940946" cy="276999"/>
+          </a:xfrm>
+          <a:prstGeom prst="rect">
+            <a:avLst/>
+          </a:prstGeom>
+        </p:spPr>
+        <p:style>
+          <a:lnRef idx="2">
+            <a:schemeClr val="accent5"/>
+          </a:lnRef>
+          <a:fillRef idx="1">
+            <a:schemeClr val="lt1"/>
+          </a:fillRef>
+          <a:effectRef idx="0">
+            <a:schemeClr val="accent5"/>
+          </a:effectRef>
+          <a:fontRef idx="minor">
+            <a:schemeClr val="dk1"/>
+          </a:fontRef>
+        </p:style>
+        <p:txBody>
+          <a:bodyPr wrap="square" rtlCol="0">
+            <a:spAutoFit/>
+          </a:bodyPr>
+          <a:lstStyle/>
+          <a:p>
+            <a:r>
+              <a:rPr lang="en-US" sz="1200" b="1" dirty="0" smtClean="0"/>
+              <a:t>Verify data </a:t>
+            </a:r>
+            <a:endParaRPr lang="en-SG" sz="1200" b="1" dirty="0"/>
+          </a:p>
+        </p:txBody>
+      </p:sp>
+      <p:cxnSp>
+        <p:nvCxnSpPr>
+          <p:cNvPr id="101" name="Straight Arrow Connector 100"/>
+          <p:cNvCxnSpPr>
+            <a:endCxn id="27" idx="3"/>
+          </p:cNvCxnSpPr>
+          <p:nvPr/>
+        </p:nvCxnSpPr>
+        <p:spPr>
+          <a:xfrm flipV="1">
+            <a:off x="9073661" y="2866850"/>
+            <a:ext cx="1855178" cy="2487159"/>
+          </a:xfrm>
+          <a:prstGeom prst="straightConnector1">
+            <a:avLst/>
+          </a:prstGeom>
+          <a:ln>
+            <a:tailEnd type="triangle"/>
+          </a:ln>
+        </p:spPr>
+        <p:style>
+          <a:lnRef idx="1">
+            <a:schemeClr val="accent1"/>
+          </a:lnRef>
+          <a:fillRef idx="0">
+            <a:schemeClr val="accent1"/>
+          </a:fillRef>
+          <a:effectRef idx="0">
+            <a:schemeClr val="accent1"/>
+          </a:effectRef>
+          <a:fontRef idx="minor">
+            <a:schemeClr val="tx1"/>
+          </a:fontRef>
+        </p:style>
+      </p:cxnSp>
+      <p:sp>
+        <p:nvSpPr>
+          <p:cNvPr id="102" name="TextBox 101"/>
+          <p:cNvSpPr txBox="1"/>
+          <p:nvPr/>
+        </p:nvSpPr>
+        <p:spPr>
+          <a:xfrm>
+            <a:off x="9416562" y="4338252"/>
+            <a:ext cx="1099038" cy="369332"/>
+          </a:xfrm>
+          <a:prstGeom prst="rect">
+            <a:avLst/>
+          </a:prstGeom>
+          <a:noFill/>
+        </p:spPr>
+        <p:txBody>
+          <a:bodyPr wrap="square" rtlCol="0">
+            <a:spAutoFit/>
+          </a:bodyPr>
+          <a:lstStyle/>
+          <a:p>
+            <a:r>
+              <a:rPr lang="en-US" sz="900" dirty="0" smtClean="0"/>
+              <a:t>Insert data to </a:t>
+            </a:r>
+            <a:r>
+              <a:rPr lang="en-US" sz="900" dirty="0" err="1" smtClean="0"/>
+              <a:t>dataBase</a:t>
+            </a:r>
+            <a:endParaRPr lang="en-SG" sz="900" dirty="0"/>
+          </a:p>
+        </p:txBody>
+      </p:sp>
+      <p:cxnSp>
+        <p:nvCxnSpPr>
+          <p:cNvPr id="104" name="Straight Connector 103"/>
+          <p:cNvCxnSpPr>
+            <a:stCxn id="94" idx="1"/>
+          </p:cNvCxnSpPr>
+          <p:nvPr/>
+        </p:nvCxnSpPr>
+        <p:spPr>
+          <a:xfrm flipH="1" flipV="1">
+            <a:off x="4974243" y="5084641"/>
+            <a:ext cx="464345" cy="1"/>
+          </a:xfrm>
+          <a:prstGeom prst="line">
+            <a:avLst/>
+          </a:prstGeom>
+        </p:spPr>
+        <p:style>
+          <a:lnRef idx="1">
+            <a:schemeClr val="accent1"/>
+          </a:lnRef>
+          <a:fillRef idx="0">
+            <a:schemeClr val="accent1"/>
+          </a:fillRef>
+          <a:effectRef idx="0">
+            <a:schemeClr val="accent1"/>
+          </a:effectRef>
+          <a:fontRef idx="minor">
+            <a:schemeClr val="tx1"/>
+          </a:fontRef>
+        </p:style>
+      </p:cxnSp>
+      <p:cxnSp>
+        <p:nvCxnSpPr>
+          <p:cNvPr id="106" name="Straight Connector 105"/>
+          <p:cNvCxnSpPr/>
+          <p:nvPr/>
+        </p:nvCxnSpPr>
+        <p:spPr>
+          <a:xfrm>
+            <a:off x="4974243" y="3957303"/>
+            <a:ext cx="0" cy="1127338"/>
+          </a:xfrm>
+          <a:prstGeom prst="line">
+            <a:avLst/>
+          </a:prstGeom>
+        </p:spPr>
+        <p:style>
+          <a:lnRef idx="1">
+            <a:schemeClr val="accent1"/>
+          </a:lnRef>
+          <a:fillRef idx="0">
+            <a:schemeClr val="accent1"/>
+          </a:fillRef>
+          <a:effectRef idx="0">
+            <a:schemeClr val="accent1"/>
+          </a:effectRef>
+          <a:fontRef idx="minor">
+            <a:schemeClr val="tx1"/>
+          </a:fontRef>
+        </p:style>
+      </p:cxnSp>
+      <p:cxnSp>
+        <p:nvCxnSpPr>
+          <p:cNvPr id="108" name="Straight Arrow Connector 107"/>
+          <p:cNvCxnSpPr>
+            <a:endCxn id="78" idx="1"/>
+          </p:cNvCxnSpPr>
+          <p:nvPr/>
+        </p:nvCxnSpPr>
+        <p:spPr>
+          <a:xfrm>
+            <a:off x="4974243" y="3957303"/>
+            <a:ext cx="312128" cy="1"/>
+          </a:xfrm>
+          <a:prstGeom prst="straightConnector1">
+            <a:avLst/>
+          </a:prstGeom>
+          <a:ln>
+            <a:tailEnd type="triangle"/>
+          </a:ln>
+        </p:spPr>
+        <p:style>
+          <a:lnRef idx="1">
+            <a:schemeClr val="accent1"/>
+          </a:lnRef>
+          <a:fillRef idx="0">
+            <a:schemeClr val="accent1"/>
+          </a:fillRef>
+          <a:effectRef idx="0">
+            <a:schemeClr val="accent1"/>
+          </a:effectRef>
+          <a:fontRef idx="minor">
+            <a:schemeClr val="tx1"/>
+          </a:fontRef>
+        </p:style>
+      </p:cxnSp>
+      <p:cxnSp>
+        <p:nvCxnSpPr>
+          <p:cNvPr id="110" name="Straight Arrow Connector 109"/>
+          <p:cNvCxnSpPr>
+            <a:stCxn id="94" idx="2"/>
+          </p:cNvCxnSpPr>
+          <p:nvPr/>
+        </p:nvCxnSpPr>
+        <p:spPr>
+          <a:xfrm>
+            <a:off x="6168339" y="5223141"/>
+            <a:ext cx="0" cy="400718"/>
+          </a:xfrm>
+          <a:prstGeom prst="straightConnector1">
+            <a:avLst/>
+          </a:prstGeom>
+          <a:ln>
+            <a:tailEnd type="triangle"/>
+          </a:ln>
+        </p:spPr>
+        <p:style>
+          <a:lnRef idx="1">
+            <a:schemeClr val="accent1"/>
+          </a:lnRef>
+          <a:fillRef idx="0">
+            <a:schemeClr val="accent1"/>
+          </a:fillRef>
+          <a:effectRef idx="0">
+            <a:schemeClr val="accent1"/>
+          </a:effectRef>
+          <a:fontRef idx="minor">
+            <a:schemeClr val="tx1"/>
+          </a:fontRef>
+        </p:style>
+      </p:cxnSp>
+      <p:sp>
+        <p:nvSpPr>
+          <p:cNvPr id="111" name="TextBox 110"/>
+          <p:cNvSpPr txBox="1"/>
+          <p:nvPr/>
+        </p:nvSpPr>
+        <p:spPr>
+          <a:xfrm>
+            <a:off x="5829623" y="5670026"/>
+            <a:ext cx="732365" cy="230832"/>
+          </a:xfrm>
+          <a:prstGeom prst="rect">
+            <a:avLst/>
+          </a:prstGeom>
+          <a:noFill/>
+        </p:spPr>
+        <p:txBody>
+          <a:bodyPr wrap="square" rtlCol="0">
+            <a:spAutoFit/>
+          </a:bodyPr>
+          <a:lstStyle/>
+          <a:p>
+            <a:r>
+              <a:rPr lang="en-US" sz="900" dirty="0" smtClean="0"/>
+              <a:t>Client end </a:t>
+            </a:r>
+            <a:endParaRPr lang="en-SG" sz="900" dirty="0"/>
+          </a:p>
+        </p:txBody>
+      </p:sp>
+      <p:cxnSp>
+        <p:nvCxnSpPr>
+          <p:cNvPr id="113" name="Straight Arrow Connector 112"/>
+          <p:cNvCxnSpPr/>
+          <p:nvPr/>
+        </p:nvCxnSpPr>
+        <p:spPr>
+          <a:xfrm>
+            <a:off x="6195805" y="5390649"/>
+            <a:ext cx="2381092" cy="496502"/>
+          </a:xfrm>
+          <a:prstGeom prst="straightConnector1">
+            <a:avLst/>
+          </a:prstGeom>
+          <a:ln>
+            <a:tailEnd type="triangle"/>
+          </a:ln>
+        </p:spPr>
+        <p:style>
+          <a:lnRef idx="1">
+            <a:schemeClr val="accent1"/>
+          </a:lnRef>
+          <a:fillRef idx="0">
+            <a:schemeClr val="accent1"/>
+          </a:fillRef>
+          <a:effectRef idx="0">
+            <a:schemeClr val="accent1"/>
+          </a:effectRef>
+          <a:fontRef idx="minor">
+            <a:schemeClr val="tx1"/>
+          </a:fontRef>
+        </p:style>
+      </p:cxnSp>
+      <p:sp>
+        <p:nvSpPr>
+          <p:cNvPr id="114" name="TextBox 113"/>
+          <p:cNvSpPr txBox="1"/>
+          <p:nvPr/>
+        </p:nvSpPr>
+        <p:spPr>
+          <a:xfrm>
+            <a:off x="6808180" y="5472629"/>
+            <a:ext cx="1099038" cy="230832"/>
+          </a:xfrm>
+          <a:prstGeom prst="rect">
+            <a:avLst/>
+          </a:prstGeom>
+          <a:noFill/>
+        </p:spPr>
+        <p:txBody>
+          <a:bodyPr wrap="square" rtlCol="0">
+            <a:spAutoFit/>
+          </a:bodyPr>
+          <a:lstStyle/>
+          <a:p>
+            <a:r>
+              <a:rPr lang="en-US" sz="900" dirty="0" smtClean="0"/>
+              <a:t>Client  log out </a:t>
+            </a:r>
+            <a:endParaRPr lang="en-SG" sz="900" dirty="0"/>
+          </a:p>
+        </p:txBody>
+      </p:sp>
+      <p:cxnSp>
+        <p:nvCxnSpPr>
+          <p:cNvPr id="117" name="Straight Connector 116"/>
+          <p:cNvCxnSpPr/>
+          <p:nvPr/>
+        </p:nvCxnSpPr>
+        <p:spPr>
+          <a:xfrm>
+            <a:off x="8603188" y="5588045"/>
+            <a:ext cx="0" cy="466120"/>
+          </a:xfrm>
+          <a:prstGeom prst="line">
+            <a:avLst/>
+          </a:prstGeom>
+        </p:spPr>
+        <p:style>
+          <a:lnRef idx="1">
+            <a:schemeClr val="accent1"/>
+          </a:lnRef>
+          <a:fillRef idx="0">
+            <a:schemeClr val="accent1"/>
+          </a:fillRef>
+          <a:effectRef idx="0">
+            <a:schemeClr val="accent1"/>
+          </a:effectRef>
+          <a:fontRef idx="minor">
+            <a:schemeClr val="tx1"/>
+          </a:fontRef>
+        </p:style>
+      </p:cxnSp>
+      <p:cxnSp>
+        <p:nvCxnSpPr>
+          <p:cNvPr id="119" name="Straight Connector 118"/>
+          <p:cNvCxnSpPr/>
+          <p:nvPr/>
+        </p:nvCxnSpPr>
+        <p:spPr>
+          <a:xfrm>
+            <a:off x="8603188" y="6065940"/>
+            <a:ext cx="1379129" cy="17929"/>
+          </a:xfrm>
+          <a:prstGeom prst="line">
+            <a:avLst/>
+          </a:prstGeom>
+        </p:spPr>
+        <p:style>
+          <a:lnRef idx="1">
+            <a:schemeClr val="accent1"/>
+          </a:lnRef>
+          <a:fillRef idx="0">
+            <a:schemeClr val="accent1"/>
+          </a:fillRef>
+          <a:effectRef idx="0">
+            <a:schemeClr val="accent1"/>
+          </a:effectRef>
+          <a:fontRef idx="minor">
+            <a:schemeClr val="tx1"/>
+          </a:fontRef>
+        </p:style>
+      </p:cxnSp>
+      <p:cxnSp>
+        <p:nvCxnSpPr>
+          <p:cNvPr id="121" name="Straight Arrow Connector 120"/>
+          <p:cNvCxnSpPr/>
+          <p:nvPr/>
+        </p:nvCxnSpPr>
+        <p:spPr>
+          <a:xfrm flipV="1">
+            <a:off x="9982317" y="1793310"/>
+            <a:ext cx="728" cy="4260856"/>
+          </a:xfrm>
+          <a:prstGeom prst="straightConnector1">
+            <a:avLst/>
+          </a:prstGeom>
+          <a:ln>
+            <a:tailEnd type="triangle"/>
+          </a:ln>
+        </p:spPr>
+        <p:style>
+          <a:lnRef idx="1">
+            <a:schemeClr val="accent1"/>
+          </a:lnRef>
+          <a:fillRef idx="0">
+            <a:schemeClr val="accent1"/>
+          </a:fillRef>
+          <a:effectRef idx="0">
+            <a:schemeClr val="accent1"/>
+          </a:effectRef>
+          <a:fontRef idx="minor">
+            <a:schemeClr val="tx1"/>
+          </a:fontRef>
+        </p:style>
+      </p:cxnSp>
+      <p:cxnSp>
+        <p:nvCxnSpPr>
+          <p:cNvPr id="125" name="Straight Arrow Connector 124"/>
+          <p:cNvCxnSpPr/>
+          <p:nvPr/>
+        </p:nvCxnSpPr>
+        <p:spPr>
+          <a:xfrm flipH="1" flipV="1">
+            <a:off x="8496301" y="1789975"/>
+            <a:ext cx="1486016" cy="3335"/>
+          </a:xfrm>
+          <a:prstGeom prst="straightConnector1">
+            <a:avLst/>
+          </a:prstGeom>
+          <a:ln>
+            <a:tailEnd type="triangle"/>
+          </a:ln>
+        </p:spPr>
+        <p:style>
+          <a:lnRef idx="1">
+            <a:schemeClr val="accent1"/>
+          </a:lnRef>
+          <a:fillRef idx="0">
+            <a:schemeClr val="accent1"/>
+          </a:fillRef>
+          <a:effectRef idx="0">
+            <a:schemeClr val="accent1"/>
+          </a:effectRef>
+          <a:fontRef idx="minor">
+            <a:schemeClr val="tx1"/>
+          </a:fontRef>
+        </p:style>
+      </p:cxnSp>
+      <p:sp>
+        <p:nvSpPr>
+          <p:cNvPr id="128" name="TextBox 127"/>
+          <p:cNvSpPr txBox="1"/>
+          <p:nvPr/>
+        </p:nvSpPr>
+        <p:spPr>
+          <a:xfrm>
+            <a:off x="10612316" y="2563140"/>
+            <a:ext cx="1099038" cy="230832"/>
+          </a:xfrm>
+          <a:prstGeom prst="rect">
+            <a:avLst/>
+          </a:prstGeom>
+          <a:noFill/>
+        </p:spPr>
+        <p:txBody>
+          <a:bodyPr wrap="square" rtlCol="0">
+            <a:spAutoFit/>
+          </a:bodyPr>
+          <a:lstStyle/>
+          <a:p>
+            <a:r>
+              <a:rPr lang="en-US" sz="900" dirty="0" smtClean="0"/>
+              <a:t>Data base</a:t>
+            </a:r>
+            <a:endParaRPr lang="en-SG" sz="900" dirty="0"/>
+          </a:p>
+        </p:txBody>
+      </p:sp>
+      <p:sp>
+        <p:nvSpPr>
+          <p:cNvPr id="130" name="TextBox 129"/>
+          <p:cNvSpPr txBox="1"/>
+          <p:nvPr/>
+        </p:nvSpPr>
+        <p:spPr>
+          <a:xfrm>
+            <a:off x="10162079" y="3776447"/>
+            <a:ext cx="1940248" cy="2385268"/>
+          </a:xfrm>
+          <a:prstGeom prst="rect">
+            <a:avLst/>
+          </a:prstGeom>
+          <a:noFill/>
+          <a:ln>
+            <a:solidFill>
+              <a:srgbClr val="FF0000"/>
+            </a:solidFill>
+            <a:prstDash val="dash"/>
+          </a:ln>
+        </p:spPr>
+        <p:txBody>
+          <a:bodyPr wrap="square" rtlCol="0">
+            <a:spAutoFit/>
+          </a:bodyPr>
+          <a:lstStyle/>
+          <a:p>
+            <a:r>
+              <a:rPr lang="en-US" sz="900" dirty="0" smtClean="0"/>
+              <a:t>Message sample: </a:t>
+            </a:r>
+          </a:p>
+          <a:p>
+            <a:r>
+              <a:rPr lang="en-SG" sz="900" dirty="0" smtClean="0"/>
+              <a:t>‘</a:t>
+            </a:r>
+            <a:r>
+              <a:rPr lang="en-SG" sz="900" dirty="0" err="1" smtClean="0"/>
+              <a:t>C</a:t>
+            </a:r>
+            <a:r>
+              <a:rPr lang="en-SG" sz="900" dirty="0" err="1"/>
+              <a:t>'.encode</a:t>
+            </a:r>
+            <a:r>
+              <a:rPr lang="en-SG" sz="900" dirty="0"/>
+              <a:t>('utf-8</a:t>
+            </a:r>
+            <a:r>
+              <a:rPr lang="en-SG" sz="900" dirty="0" smtClean="0"/>
+              <a:t>')+</a:t>
+            </a:r>
+            <a:r>
+              <a:rPr lang="en-SG" sz="900" dirty="0" err="1" smtClean="0"/>
+              <a:t>dict</a:t>
+            </a:r>
+            <a:r>
+              <a:rPr lang="en-SG" sz="900" dirty="0" smtClean="0"/>
+              <a:t>{‘act’: </a:t>
+            </a:r>
+            <a:r>
+              <a:rPr lang="en-SG" sz="900" dirty="0" err="1" smtClean="0"/>
+              <a:t>str</a:t>
+            </a:r>
+            <a:r>
+              <a:rPr lang="en-SG" sz="900" dirty="0" smtClean="0"/>
+              <a:t>, [data]}</a:t>
+            </a:r>
+            <a:endParaRPr lang="en-SG" sz="900" dirty="0"/>
+          </a:p>
+          <a:p>
+            <a:r>
+              <a:rPr lang="en-SG" sz="900" dirty="0" smtClean="0"/>
+              <a:t>'</a:t>
+            </a:r>
+            <a:r>
+              <a:rPr lang="en-SG" sz="900" dirty="0" err="1" smtClean="0"/>
+              <a:t>F</a:t>
+            </a:r>
+            <a:r>
+              <a:rPr lang="en-SG" sz="900" dirty="0" err="1"/>
+              <a:t>'.encode</a:t>
+            </a:r>
+            <a:r>
+              <a:rPr lang="en-SG" sz="900" dirty="0"/>
+              <a:t>('utf-8') </a:t>
+            </a:r>
+            <a:r>
+              <a:rPr lang="en-SG" sz="900" dirty="0" smtClean="0"/>
+              <a:t>+</a:t>
+            </a:r>
+            <a:r>
+              <a:rPr lang="en-SG" sz="900" dirty="0" err="1" smtClean="0"/>
+              <a:t>fileBytes</a:t>
+            </a:r>
+            <a:endParaRPr lang="en-SG" sz="900" dirty="0" smtClean="0"/>
+          </a:p>
+          <a:p>
+            <a:endParaRPr lang="en-US" sz="900" dirty="0"/>
+          </a:p>
+          <a:p>
+            <a:r>
+              <a:rPr lang="en-SG" sz="800" dirty="0"/>
+              <a:t># Action type:</a:t>
+            </a:r>
+          </a:p>
+          <a:p>
+            <a:r>
+              <a:rPr lang="en-SG" sz="800" dirty="0"/>
+              <a:t># CR - Connection request</a:t>
+            </a:r>
+          </a:p>
+          <a:p>
+            <a:r>
+              <a:rPr lang="en-SG" sz="800" dirty="0"/>
+              <a:t># HB - Heart beat (feedback)</a:t>
+            </a:r>
+          </a:p>
+          <a:p>
+            <a:r>
+              <a:rPr lang="en-SG" sz="800" dirty="0"/>
+              <a:t># LI1 - Login request step 1 [Username + random1(client-&gt;sever)]</a:t>
+            </a:r>
+          </a:p>
+          <a:p>
+            <a:r>
+              <a:rPr lang="en-SG" sz="800" dirty="0"/>
+              <a:t># LR1 - Login response 1 [random1 + random2(client&lt;-server)]</a:t>
+            </a:r>
+          </a:p>
+          <a:p>
+            <a:r>
+              <a:rPr lang="en-SG" sz="800" dirty="0"/>
+              <a:t># LI2 - Login request step2 [random2 + password]</a:t>
+            </a:r>
+          </a:p>
+          <a:p>
+            <a:r>
+              <a:rPr lang="en-SG" sz="800" dirty="0"/>
+              <a:t># LR2 - Login response 2 [Challenge for SWATT]</a:t>
+            </a:r>
+          </a:p>
+          <a:p>
+            <a:r>
+              <a:rPr lang="en-SG" sz="800" dirty="0"/>
+              <a:t># CF - Certificate file fetch. </a:t>
+            </a:r>
+          </a:p>
+          <a:p>
+            <a:r>
+              <a:rPr lang="en-SG" sz="800" dirty="0"/>
+              <a:t># SR - Signature </a:t>
+            </a:r>
+            <a:r>
+              <a:rPr lang="en-SG" sz="800" dirty="0" smtClean="0"/>
+              <a:t>response</a:t>
+            </a:r>
+            <a:endParaRPr lang="en-SG" sz="800" dirty="0"/>
           </a:p>
         </p:txBody>
       </p:sp>
@@ -3651,6 +5563,1657 @@
   <p:clrMapOvr>
     <a:masterClrMapping/>
   </p:clrMapOvr>
+</p:sld>
+</file>
+
+<file path=ppt/slides/slide2.xml><?xml version="1.0" encoding="utf-8"?>
+<p:sld xmlns:a="http://schemas.openxmlformats.org/drawingml/2006/main" xmlns:r="http://schemas.openxmlformats.org/officeDocument/2006/relationships" xmlns:p="http://schemas.openxmlformats.org/presentationml/2006/main">
+  <p:cSld>
+    <p:spTree>
+      <p:nvGrpSpPr>
+        <p:cNvPr id="1" name=""/>
+        <p:cNvGrpSpPr/>
+        <p:nvPr/>
+      </p:nvGrpSpPr>
+      <p:grpSpPr>
+        <a:xfrm>
+          <a:off x="0" y="0"/>
+          <a:ext cx="0" cy="0"/>
+          <a:chOff x="0" y="0"/>
+          <a:chExt cx="0" cy="0"/>
+        </a:xfrm>
+      </p:grpSpPr>
+      <p:graphicFrame>
+        <p:nvGraphicFramePr>
+          <p:cNvPr id="4" name="Table 3"/>
+          <p:cNvGraphicFramePr>
+            <a:graphicFrameLocks noGrp="1"/>
+          </p:cNvGraphicFramePr>
+          <p:nvPr>
+            <p:extLst>
+              <p:ext uri="{D42A27DB-BD31-4B8C-83A1-F6EECF244321}">
+                <p14:modId xmlns:p14="http://schemas.microsoft.com/office/powerpoint/2010/main" val="989833207"/>
+              </p:ext>
+            </p:extLst>
+          </p:nvPr>
+        </p:nvGraphicFramePr>
+        <p:xfrm>
+          <a:off x="143689" y="353907"/>
+          <a:ext cx="3814358" cy="4028440"/>
+        </p:xfrm>
+        <a:graphic>
+          <a:graphicData uri="http://schemas.openxmlformats.org/drawingml/2006/table">
+            <a:tbl>
+              <a:tblPr firstRow="1" bandRow="1">
+                <a:tableStyleId>{F2DE63D5-997A-4646-A377-4702673A728D}</a:tableStyleId>
+              </a:tblPr>
+              <a:tblGrid>
+                <a:gridCol w="1907179">
+                  <a:extLst>
+                    <a:ext uri="{9D8B030D-6E8A-4147-A177-3AD203B41FA5}">
+                      <a16:colId xmlns:a16="http://schemas.microsoft.com/office/drawing/2014/main" val="2705675591"/>
+                    </a:ext>
+                  </a:extLst>
+                </a:gridCol>
+                <a:gridCol w="1907179">
+                  <a:extLst>
+                    <a:ext uri="{9D8B030D-6E8A-4147-A177-3AD203B41FA5}">
+                      <a16:colId xmlns:a16="http://schemas.microsoft.com/office/drawing/2014/main" val="580750143"/>
+                    </a:ext>
+                  </a:extLst>
+                </a:gridCol>
+              </a:tblGrid>
+              <a:tr h="370840">
+                <a:tc gridSpan="2">
+                  <a:txBody>
+                    <a:bodyPr/>
+                    <a:lstStyle/>
+                    <a:p>
+                      <a:r>
+                        <a:rPr lang="en-US" dirty="0" err="1" smtClean="0"/>
+                        <a:t>firmwareInfo</a:t>
+                      </a:r>
+                      <a:endParaRPr lang="en-SG" dirty="0"/>
+                    </a:p>
+                  </a:txBody>
+                  <a:tcPr/>
+                </a:tc>
+                <a:tc hMerge="1">
+                  <a:txBody>
+                    <a:bodyPr/>
+                    <a:lstStyle/>
+                    <a:p>
+                      <a:endParaRPr lang="en-SG" dirty="0"/>
+                    </a:p>
+                  </a:txBody>
+                  <a:tcPr/>
+                </a:tc>
+                <a:extLst>
+                  <a:ext uri="{0D108BD9-81ED-4DB2-BD59-A6C34878D82A}">
+                    <a16:rowId xmlns:a16="http://schemas.microsoft.com/office/drawing/2014/main" val="3730332777"/>
+                  </a:ext>
+                </a:extLst>
+              </a:tr>
+              <a:tr h="370840">
+                <a:tc>
+                  <a:txBody>
+                    <a:bodyPr/>
+                    <a:lstStyle/>
+                    <a:p>
+                      <a:pPr marL="0" marR="0" lvl="0" indent="0" algn="l" defTabSz="914400" rtl="0" eaLnBrk="1" fontAlgn="auto" latinLnBrk="0" hangingPunct="1">
+                        <a:lnSpc>
+                          <a:spcPct val="100000"/>
+                        </a:lnSpc>
+                        <a:spcBef>
+                          <a:spcPts val="0"/>
+                        </a:spcBef>
+                        <a:spcAft>
+                          <a:spcPts val="0"/>
+                        </a:spcAft>
+                        <a:buClrTx/>
+                        <a:buSzTx/>
+                        <a:buFontTx/>
+                        <a:buNone/>
+                        <a:tabLst/>
+                        <a:defRPr/>
+                      </a:pPr>
+                      <a:r>
+                        <a:rPr lang="en-US" sz="1800" b="0" kern="1200" dirty="0" smtClean="0">
+                          <a:solidFill>
+                            <a:schemeClr val="tx1"/>
+                          </a:solidFill>
+                          <a:effectLst/>
+                          <a:latin typeface="+mn-lt"/>
+                          <a:ea typeface="+mn-ea"/>
+                          <a:cs typeface="+mn-cs"/>
+                        </a:rPr>
+                        <a:t>Index</a:t>
+                      </a:r>
+                      <a:endParaRPr lang="en-SG" sz="1800" b="0" kern="1200" dirty="0" smtClean="0">
+                        <a:solidFill>
+                          <a:schemeClr val="tx1"/>
+                        </a:solidFill>
+                        <a:effectLst/>
+                        <a:latin typeface="+mn-lt"/>
+                        <a:ea typeface="+mn-ea"/>
+                        <a:cs typeface="+mn-cs"/>
+                      </a:endParaRPr>
+                    </a:p>
+                  </a:txBody>
+                  <a:tcPr/>
+                </a:tc>
+                <a:tc>
+                  <a:txBody>
+                    <a:bodyPr/>
+                    <a:lstStyle/>
+                    <a:p>
+                      <a:pPr marL="0" marR="0" lvl="0" indent="0" algn="l" defTabSz="914400" rtl="0" eaLnBrk="1" fontAlgn="auto" latinLnBrk="0" hangingPunct="1">
+                        <a:lnSpc>
+                          <a:spcPct val="100000"/>
+                        </a:lnSpc>
+                        <a:spcBef>
+                          <a:spcPts val="0"/>
+                        </a:spcBef>
+                        <a:spcAft>
+                          <a:spcPts val="0"/>
+                        </a:spcAft>
+                        <a:buClrTx/>
+                        <a:buSzTx/>
+                        <a:buFontTx/>
+                        <a:buNone/>
+                        <a:tabLst/>
+                        <a:defRPr/>
+                      </a:pPr>
+                      <a:r>
+                        <a:rPr lang="en-SG" sz="1200" b="0" kern="1200" dirty="0" smtClean="0">
+                          <a:solidFill>
+                            <a:schemeClr val="tx1"/>
+                          </a:solidFill>
+                          <a:effectLst/>
+                          <a:latin typeface="+mn-lt"/>
+                          <a:ea typeface="+mn-ea"/>
+                          <a:cs typeface="+mn-cs"/>
+                        </a:rPr>
+                        <a:t>integer PRIMARY KEY</a:t>
+                      </a:r>
+                    </a:p>
+                    <a:p>
+                      <a:pPr marL="0" marR="0" lvl="0" indent="0" algn="l" defTabSz="914400" rtl="0" eaLnBrk="1" fontAlgn="auto" latinLnBrk="0" hangingPunct="1">
+                        <a:lnSpc>
+                          <a:spcPct val="100000"/>
+                        </a:lnSpc>
+                        <a:spcBef>
+                          <a:spcPts val="0"/>
+                        </a:spcBef>
+                        <a:spcAft>
+                          <a:spcPts val="0"/>
+                        </a:spcAft>
+                        <a:buClrTx/>
+                        <a:buSzTx/>
+                        <a:buFontTx/>
+                        <a:buNone/>
+                        <a:tabLst/>
+                        <a:defRPr/>
+                      </a:pPr>
+                      <a:endParaRPr lang="en-SG" sz="1200" b="0" kern="1200" dirty="0" smtClean="0">
+                        <a:solidFill>
+                          <a:schemeClr val="tx1"/>
+                        </a:solidFill>
+                        <a:effectLst/>
+                        <a:latin typeface="+mn-lt"/>
+                        <a:ea typeface="+mn-ea"/>
+                        <a:cs typeface="+mn-cs"/>
+                      </a:endParaRPr>
+                    </a:p>
+                  </a:txBody>
+                  <a:tcPr/>
+                </a:tc>
+                <a:extLst>
+                  <a:ext uri="{0D108BD9-81ED-4DB2-BD59-A6C34878D82A}">
+                    <a16:rowId xmlns:a16="http://schemas.microsoft.com/office/drawing/2014/main" val="2430873435"/>
+                  </a:ext>
+                </a:extLst>
+              </a:tr>
+              <a:tr h="370840">
+                <a:tc>
+                  <a:txBody>
+                    <a:bodyPr/>
+                    <a:lstStyle/>
+                    <a:p>
+                      <a:pPr marL="0" marR="0" lvl="0" indent="0" algn="l" defTabSz="914400" rtl="0" eaLnBrk="1" fontAlgn="auto" latinLnBrk="0" hangingPunct="1">
+                        <a:lnSpc>
+                          <a:spcPct val="100000"/>
+                        </a:lnSpc>
+                        <a:spcBef>
+                          <a:spcPts val="0"/>
+                        </a:spcBef>
+                        <a:spcAft>
+                          <a:spcPts val="0"/>
+                        </a:spcAft>
+                        <a:buClrTx/>
+                        <a:buSzTx/>
+                        <a:buFontTx/>
+                        <a:buNone/>
+                        <a:tabLst/>
+                        <a:defRPr/>
+                      </a:pPr>
+                      <a:r>
+                        <a:rPr lang="en-SG" sz="1800" b="0" kern="1200" dirty="0" err="1" smtClean="0">
+                          <a:solidFill>
+                            <a:schemeClr val="tx1"/>
+                          </a:solidFill>
+                          <a:effectLst/>
+                          <a:latin typeface="+mn-lt"/>
+                          <a:ea typeface="+mn-ea"/>
+                          <a:cs typeface="+mn-cs"/>
+                        </a:rPr>
+                        <a:t>sensorID</a:t>
+                      </a:r>
+                      <a:endParaRPr lang="en-SG" sz="1800" b="0" kern="1200" dirty="0" smtClean="0">
+                        <a:solidFill>
+                          <a:schemeClr val="tx1"/>
+                        </a:solidFill>
+                        <a:effectLst/>
+                        <a:latin typeface="+mn-lt"/>
+                        <a:ea typeface="+mn-ea"/>
+                        <a:cs typeface="+mn-cs"/>
+                      </a:endParaRPr>
+                    </a:p>
+                  </a:txBody>
+                  <a:tcPr/>
+                </a:tc>
+                <a:tc>
+                  <a:txBody>
+                    <a:bodyPr/>
+                    <a:lstStyle/>
+                    <a:p>
+                      <a:r>
+                        <a:rPr lang="en-SG" sz="1200" b="0" kern="1200" dirty="0" smtClean="0">
+                          <a:solidFill>
+                            <a:schemeClr val="tx1"/>
+                          </a:solidFill>
+                          <a:effectLst/>
+                          <a:latin typeface="+mn-lt"/>
+                          <a:ea typeface="+mn-ea"/>
+                          <a:cs typeface="+mn-cs"/>
+                        </a:rPr>
+                        <a:t>integer NOT NULL</a:t>
+                      </a:r>
+                    </a:p>
+                    <a:p>
+                      <a:pPr marL="0" marR="0" lvl="0" indent="0" algn="l" defTabSz="914400" rtl="0" eaLnBrk="1" fontAlgn="auto" latinLnBrk="0" hangingPunct="1">
+                        <a:lnSpc>
+                          <a:spcPct val="100000"/>
+                        </a:lnSpc>
+                        <a:spcBef>
+                          <a:spcPts val="0"/>
+                        </a:spcBef>
+                        <a:spcAft>
+                          <a:spcPts val="0"/>
+                        </a:spcAft>
+                        <a:buClrTx/>
+                        <a:buSzTx/>
+                        <a:buFontTx/>
+                        <a:buNone/>
+                        <a:tabLst/>
+                        <a:defRPr/>
+                      </a:pPr>
+                      <a:endParaRPr lang="en-SG" sz="1200" b="0" kern="1200" dirty="0" smtClean="0">
+                        <a:solidFill>
+                          <a:schemeClr val="tx1"/>
+                        </a:solidFill>
+                        <a:effectLst/>
+                        <a:latin typeface="+mn-lt"/>
+                        <a:ea typeface="+mn-ea"/>
+                        <a:cs typeface="+mn-cs"/>
+                      </a:endParaRPr>
+                    </a:p>
+                  </a:txBody>
+                  <a:tcPr/>
+                </a:tc>
+                <a:extLst>
+                  <a:ext uri="{0D108BD9-81ED-4DB2-BD59-A6C34878D82A}">
+                    <a16:rowId xmlns:a16="http://schemas.microsoft.com/office/drawing/2014/main" val="2642593814"/>
+                  </a:ext>
+                </a:extLst>
+              </a:tr>
+              <a:tr h="370840">
+                <a:tc>
+                  <a:txBody>
+                    <a:bodyPr/>
+                    <a:lstStyle/>
+                    <a:p>
+                      <a:pPr marL="0" marR="0" lvl="0" indent="0" algn="l" defTabSz="914400" rtl="0" eaLnBrk="1" fontAlgn="auto" latinLnBrk="0" hangingPunct="1">
+                        <a:lnSpc>
+                          <a:spcPct val="100000"/>
+                        </a:lnSpc>
+                        <a:spcBef>
+                          <a:spcPts val="0"/>
+                        </a:spcBef>
+                        <a:spcAft>
+                          <a:spcPts val="0"/>
+                        </a:spcAft>
+                        <a:buClrTx/>
+                        <a:buSzTx/>
+                        <a:buFontTx/>
+                        <a:buNone/>
+                        <a:tabLst/>
+                        <a:defRPr/>
+                      </a:pPr>
+                      <a:r>
+                        <a:rPr lang="en-SG" sz="1800" b="0" kern="1200" dirty="0" err="1" smtClean="0">
+                          <a:solidFill>
+                            <a:schemeClr val="tx1"/>
+                          </a:solidFill>
+                          <a:effectLst/>
+                          <a:latin typeface="+mn-lt"/>
+                          <a:ea typeface="+mn-ea"/>
+                          <a:cs typeface="+mn-cs"/>
+                        </a:rPr>
+                        <a:t>Factory_signerID</a:t>
+                      </a:r>
+                      <a:endParaRPr lang="en-SG" sz="1800" b="0" kern="1200" dirty="0" smtClean="0">
+                        <a:solidFill>
+                          <a:schemeClr val="tx1"/>
+                        </a:solidFill>
+                        <a:effectLst/>
+                        <a:latin typeface="+mn-lt"/>
+                        <a:ea typeface="+mn-ea"/>
+                        <a:cs typeface="+mn-cs"/>
+                      </a:endParaRPr>
+                    </a:p>
+                  </a:txBody>
+                  <a:tcPr/>
+                </a:tc>
+                <a:tc>
+                  <a:txBody>
+                    <a:bodyPr/>
+                    <a:lstStyle/>
+                    <a:p>
+                      <a:pPr marL="0" marR="0" lvl="0" indent="0" algn="l" defTabSz="914400" rtl="0" eaLnBrk="1" fontAlgn="auto" latinLnBrk="0" hangingPunct="1">
+                        <a:lnSpc>
+                          <a:spcPct val="100000"/>
+                        </a:lnSpc>
+                        <a:spcBef>
+                          <a:spcPts val="0"/>
+                        </a:spcBef>
+                        <a:spcAft>
+                          <a:spcPts val="0"/>
+                        </a:spcAft>
+                        <a:buClrTx/>
+                        <a:buSzTx/>
+                        <a:buFontTx/>
+                        <a:buNone/>
+                        <a:tabLst/>
+                        <a:defRPr/>
+                      </a:pPr>
+                      <a:r>
+                        <a:rPr lang="en-SG" sz="1200" b="0" kern="1200" dirty="0" smtClean="0">
+                          <a:solidFill>
+                            <a:schemeClr val="tx1"/>
+                          </a:solidFill>
+                          <a:effectLst/>
+                          <a:latin typeface="+mn-lt"/>
+                          <a:ea typeface="+mn-ea"/>
+                          <a:cs typeface="+mn-cs"/>
+                        </a:rPr>
+                        <a:t>integer FOREIGN KEY</a:t>
+                      </a:r>
+                    </a:p>
+                    <a:p>
+                      <a:pPr marL="0" marR="0" lvl="0" indent="0" algn="l" defTabSz="914400" rtl="0" eaLnBrk="1" fontAlgn="auto" latinLnBrk="0" hangingPunct="1">
+                        <a:lnSpc>
+                          <a:spcPct val="100000"/>
+                        </a:lnSpc>
+                        <a:spcBef>
+                          <a:spcPts val="0"/>
+                        </a:spcBef>
+                        <a:spcAft>
+                          <a:spcPts val="0"/>
+                        </a:spcAft>
+                        <a:buClrTx/>
+                        <a:buSzTx/>
+                        <a:buFontTx/>
+                        <a:buNone/>
+                        <a:tabLst/>
+                        <a:defRPr/>
+                      </a:pPr>
+                      <a:endParaRPr lang="en-SG" sz="1200" b="0" kern="1200" dirty="0" smtClean="0">
+                        <a:solidFill>
+                          <a:schemeClr val="tx1"/>
+                        </a:solidFill>
+                        <a:effectLst/>
+                        <a:latin typeface="+mn-lt"/>
+                        <a:ea typeface="+mn-ea"/>
+                        <a:cs typeface="+mn-cs"/>
+                      </a:endParaRPr>
+                    </a:p>
+                  </a:txBody>
+                  <a:tcPr/>
+                </a:tc>
+                <a:extLst>
+                  <a:ext uri="{0D108BD9-81ED-4DB2-BD59-A6C34878D82A}">
+                    <a16:rowId xmlns:a16="http://schemas.microsoft.com/office/drawing/2014/main" val="1610257110"/>
+                  </a:ext>
+                </a:extLst>
+              </a:tr>
+              <a:tr h="370840">
+                <a:tc>
+                  <a:txBody>
+                    <a:bodyPr/>
+                    <a:lstStyle/>
+                    <a:p>
+                      <a:pPr marL="0" marR="0" lvl="0" indent="0" algn="l" defTabSz="914400" rtl="0" eaLnBrk="1" fontAlgn="auto" latinLnBrk="0" hangingPunct="1">
+                        <a:lnSpc>
+                          <a:spcPct val="100000"/>
+                        </a:lnSpc>
+                        <a:spcBef>
+                          <a:spcPts val="0"/>
+                        </a:spcBef>
+                        <a:spcAft>
+                          <a:spcPts val="0"/>
+                        </a:spcAft>
+                        <a:buClrTx/>
+                        <a:buSzTx/>
+                        <a:buFontTx/>
+                        <a:buNone/>
+                        <a:tabLst/>
+                        <a:defRPr/>
+                      </a:pPr>
+                      <a:r>
+                        <a:rPr lang="en-SG" sz="1800" b="0" kern="1200" dirty="0" smtClean="0">
+                          <a:solidFill>
+                            <a:schemeClr val="tx1"/>
+                          </a:solidFill>
+                          <a:effectLst/>
+                          <a:latin typeface="+mn-lt"/>
+                          <a:ea typeface="+mn-ea"/>
+                          <a:cs typeface="+mn-cs"/>
+                        </a:rPr>
+                        <a:t>Challenge</a:t>
+                      </a:r>
+                    </a:p>
+                  </a:txBody>
+                  <a:tcPr/>
+                </a:tc>
+                <a:tc>
+                  <a:txBody>
+                    <a:bodyPr/>
+                    <a:lstStyle/>
+                    <a:p>
+                      <a:pPr marL="0" marR="0" lvl="0" indent="0" algn="l" defTabSz="914400" rtl="0" eaLnBrk="1" fontAlgn="auto" latinLnBrk="0" hangingPunct="1">
+                        <a:lnSpc>
+                          <a:spcPct val="100000"/>
+                        </a:lnSpc>
+                        <a:spcBef>
+                          <a:spcPts val="0"/>
+                        </a:spcBef>
+                        <a:spcAft>
+                          <a:spcPts val="0"/>
+                        </a:spcAft>
+                        <a:buClrTx/>
+                        <a:buSzTx/>
+                        <a:buFontTx/>
+                        <a:buNone/>
+                        <a:tabLst/>
+                        <a:defRPr/>
+                      </a:pPr>
+                      <a:r>
+                        <a:rPr lang="en-SG" sz="1200" b="0" kern="1200" dirty="0" smtClean="0">
+                          <a:solidFill>
+                            <a:schemeClr val="tx1"/>
+                          </a:solidFill>
+                          <a:effectLst/>
+                          <a:latin typeface="+mn-lt"/>
+                          <a:ea typeface="+mn-ea"/>
+                          <a:cs typeface="+mn-cs"/>
+                        </a:rPr>
+                        <a:t>text NOT NULL</a:t>
+                      </a:r>
+                    </a:p>
+                    <a:p>
+                      <a:pPr marL="0" marR="0" lvl="0" indent="0" algn="l" defTabSz="914400" rtl="0" eaLnBrk="1" fontAlgn="auto" latinLnBrk="0" hangingPunct="1">
+                        <a:lnSpc>
+                          <a:spcPct val="100000"/>
+                        </a:lnSpc>
+                        <a:spcBef>
+                          <a:spcPts val="0"/>
+                        </a:spcBef>
+                        <a:spcAft>
+                          <a:spcPts val="0"/>
+                        </a:spcAft>
+                        <a:buClrTx/>
+                        <a:buSzTx/>
+                        <a:buFontTx/>
+                        <a:buNone/>
+                        <a:tabLst/>
+                        <a:defRPr/>
+                      </a:pPr>
+                      <a:endParaRPr lang="en-SG" sz="1200" b="0" kern="1200" dirty="0" smtClean="0">
+                        <a:solidFill>
+                          <a:schemeClr val="tx1"/>
+                        </a:solidFill>
+                        <a:effectLst/>
+                        <a:latin typeface="+mn-lt"/>
+                        <a:ea typeface="+mn-ea"/>
+                        <a:cs typeface="+mn-cs"/>
+                      </a:endParaRPr>
+                    </a:p>
+                  </a:txBody>
+                  <a:tcPr/>
+                </a:tc>
+                <a:extLst>
+                  <a:ext uri="{0D108BD9-81ED-4DB2-BD59-A6C34878D82A}">
+                    <a16:rowId xmlns:a16="http://schemas.microsoft.com/office/drawing/2014/main" val="1493582194"/>
+                  </a:ext>
+                </a:extLst>
+              </a:tr>
+              <a:tr h="370840">
+                <a:tc>
+                  <a:txBody>
+                    <a:bodyPr/>
+                    <a:lstStyle/>
+                    <a:p>
+                      <a:pPr marL="0" marR="0" lvl="0" indent="0" algn="l" defTabSz="914400" rtl="0" eaLnBrk="1" fontAlgn="auto" latinLnBrk="0" hangingPunct="1">
+                        <a:lnSpc>
+                          <a:spcPct val="100000"/>
+                        </a:lnSpc>
+                        <a:spcBef>
+                          <a:spcPts val="0"/>
+                        </a:spcBef>
+                        <a:spcAft>
+                          <a:spcPts val="0"/>
+                        </a:spcAft>
+                        <a:buClrTx/>
+                        <a:buSzTx/>
+                        <a:buFontTx/>
+                        <a:buNone/>
+                        <a:tabLst/>
+                        <a:defRPr/>
+                      </a:pPr>
+                      <a:r>
+                        <a:rPr lang="en-US" sz="1800" b="0" kern="1200" dirty="0" smtClean="0">
+                          <a:solidFill>
+                            <a:schemeClr val="tx1"/>
+                          </a:solidFill>
+                          <a:effectLst/>
+                          <a:latin typeface="+mn-lt"/>
+                          <a:ea typeface="+mn-ea"/>
+                          <a:cs typeface="+mn-cs"/>
+                        </a:rPr>
+                        <a:t>Firmware</a:t>
+                      </a:r>
+                      <a:r>
+                        <a:rPr lang="en-US" sz="1800" b="0" kern="1200" baseline="0" dirty="0" smtClean="0">
+                          <a:solidFill>
+                            <a:schemeClr val="tx1"/>
+                          </a:solidFill>
+                          <a:effectLst/>
+                          <a:latin typeface="+mn-lt"/>
+                          <a:ea typeface="+mn-ea"/>
+                          <a:cs typeface="+mn-cs"/>
+                        </a:rPr>
+                        <a:t> SWATT</a:t>
+                      </a:r>
+                      <a:endParaRPr lang="en-SG" sz="1800" b="0" kern="1200" dirty="0" smtClean="0">
+                        <a:solidFill>
+                          <a:schemeClr val="tx1"/>
+                        </a:solidFill>
+                        <a:effectLst/>
+                        <a:latin typeface="+mn-lt"/>
+                        <a:ea typeface="+mn-ea"/>
+                        <a:cs typeface="+mn-cs"/>
+                      </a:endParaRPr>
+                    </a:p>
+                  </a:txBody>
+                  <a:tcPr/>
+                </a:tc>
+                <a:tc>
+                  <a:txBody>
+                    <a:bodyPr/>
+                    <a:lstStyle/>
+                    <a:p>
+                      <a:pPr marL="0" marR="0" lvl="0" indent="0" algn="l" defTabSz="914400" rtl="0" eaLnBrk="1" fontAlgn="auto" latinLnBrk="0" hangingPunct="1">
+                        <a:lnSpc>
+                          <a:spcPct val="100000"/>
+                        </a:lnSpc>
+                        <a:spcBef>
+                          <a:spcPts val="0"/>
+                        </a:spcBef>
+                        <a:spcAft>
+                          <a:spcPts val="0"/>
+                        </a:spcAft>
+                        <a:buClrTx/>
+                        <a:buSzTx/>
+                        <a:buFontTx/>
+                        <a:buNone/>
+                        <a:tabLst/>
+                        <a:defRPr/>
+                      </a:pPr>
+                      <a:r>
+                        <a:rPr lang="en-SG" sz="1200" b="0" kern="1200" dirty="0" smtClean="0">
+                          <a:solidFill>
+                            <a:schemeClr val="tx1"/>
+                          </a:solidFill>
+                          <a:effectLst/>
+                          <a:latin typeface="+mn-lt"/>
+                          <a:ea typeface="+mn-ea"/>
+                          <a:cs typeface="+mn-cs"/>
+                        </a:rPr>
+                        <a:t>Hex text NOT NULL</a:t>
+                      </a:r>
+                    </a:p>
+                    <a:p>
+                      <a:pPr marL="0" marR="0" lvl="0" indent="0" algn="l" defTabSz="914400" rtl="0" eaLnBrk="1" fontAlgn="auto" latinLnBrk="0" hangingPunct="1">
+                        <a:lnSpc>
+                          <a:spcPct val="100000"/>
+                        </a:lnSpc>
+                        <a:spcBef>
+                          <a:spcPts val="0"/>
+                        </a:spcBef>
+                        <a:spcAft>
+                          <a:spcPts val="0"/>
+                        </a:spcAft>
+                        <a:buClrTx/>
+                        <a:buSzTx/>
+                        <a:buFontTx/>
+                        <a:buNone/>
+                        <a:tabLst/>
+                        <a:defRPr/>
+                      </a:pPr>
+                      <a:endParaRPr lang="en-SG" sz="1200" b="0" kern="1200" dirty="0" smtClean="0">
+                        <a:solidFill>
+                          <a:schemeClr val="tx1"/>
+                        </a:solidFill>
+                        <a:effectLst/>
+                        <a:latin typeface="+mn-lt"/>
+                        <a:ea typeface="+mn-ea"/>
+                        <a:cs typeface="+mn-cs"/>
+                      </a:endParaRPr>
+                    </a:p>
+                  </a:txBody>
+                  <a:tcPr/>
+                </a:tc>
+                <a:extLst>
+                  <a:ext uri="{0D108BD9-81ED-4DB2-BD59-A6C34878D82A}">
+                    <a16:rowId xmlns:a16="http://schemas.microsoft.com/office/drawing/2014/main" val="961531781"/>
+                  </a:ext>
+                </a:extLst>
+              </a:tr>
+              <a:tr h="370840">
+                <a:tc>
+                  <a:txBody>
+                    <a:bodyPr/>
+                    <a:lstStyle/>
+                    <a:p>
+                      <a:pPr marL="0" marR="0" lvl="0" indent="0" algn="l" defTabSz="914400" rtl="0" eaLnBrk="1" fontAlgn="auto" latinLnBrk="0" hangingPunct="1">
+                        <a:lnSpc>
+                          <a:spcPct val="100000"/>
+                        </a:lnSpc>
+                        <a:spcBef>
+                          <a:spcPts val="0"/>
+                        </a:spcBef>
+                        <a:spcAft>
+                          <a:spcPts val="0"/>
+                        </a:spcAft>
+                        <a:buClrTx/>
+                        <a:buSzTx/>
+                        <a:buFontTx/>
+                        <a:buNone/>
+                        <a:tabLst/>
+                        <a:defRPr/>
+                      </a:pPr>
+                      <a:r>
+                        <a:rPr lang="en-SG" sz="1800" b="0" kern="1200" dirty="0" err="1" smtClean="0">
+                          <a:solidFill>
+                            <a:schemeClr val="tx1"/>
+                          </a:solidFill>
+                          <a:effectLst/>
+                          <a:latin typeface="+mn-lt"/>
+                          <a:ea typeface="+mn-ea"/>
+                          <a:cs typeface="+mn-cs"/>
+                        </a:rPr>
+                        <a:t>sensorType</a:t>
+                      </a:r>
+                      <a:endParaRPr lang="en-SG" sz="1800" b="0" kern="1200" dirty="0" smtClean="0">
+                        <a:solidFill>
+                          <a:schemeClr val="tx1"/>
+                        </a:solidFill>
+                        <a:effectLst/>
+                        <a:latin typeface="+mn-lt"/>
+                        <a:ea typeface="+mn-ea"/>
+                        <a:cs typeface="+mn-cs"/>
+                      </a:endParaRPr>
+                    </a:p>
+                  </a:txBody>
+                  <a:tcPr/>
+                </a:tc>
+                <a:tc>
+                  <a:txBody>
+                    <a:bodyPr/>
+                    <a:lstStyle/>
+                    <a:p>
+                      <a:pPr marL="0" marR="0" lvl="0" indent="0" algn="l" defTabSz="914400" rtl="0" eaLnBrk="1" fontAlgn="auto" latinLnBrk="0" hangingPunct="1">
+                        <a:lnSpc>
+                          <a:spcPct val="100000"/>
+                        </a:lnSpc>
+                        <a:spcBef>
+                          <a:spcPts val="0"/>
+                        </a:spcBef>
+                        <a:spcAft>
+                          <a:spcPts val="0"/>
+                        </a:spcAft>
+                        <a:buClrTx/>
+                        <a:buSzTx/>
+                        <a:buFontTx/>
+                        <a:buNone/>
+                        <a:tabLst/>
+                        <a:defRPr/>
+                      </a:pPr>
+                      <a:r>
+                        <a:rPr lang="en-SG" sz="1200" b="0" kern="1200" dirty="0" smtClean="0">
+                          <a:solidFill>
+                            <a:schemeClr val="tx1"/>
+                          </a:solidFill>
+                          <a:effectLst/>
+                          <a:latin typeface="+mn-lt"/>
+                          <a:ea typeface="+mn-ea"/>
+                          <a:cs typeface="+mn-cs"/>
+                        </a:rPr>
+                        <a:t>text NOT NULL</a:t>
+                      </a:r>
+                    </a:p>
+                    <a:p>
+                      <a:pPr marL="0" marR="0" lvl="0" indent="0" algn="l" defTabSz="914400" rtl="0" eaLnBrk="1" fontAlgn="auto" latinLnBrk="0" hangingPunct="1">
+                        <a:lnSpc>
+                          <a:spcPct val="100000"/>
+                        </a:lnSpc>
+                        <a:spcBef>
+                          <a:spcPts val="0"/>
+                        </a:spcBef>
+                        <a:spcAft>
+                          <a:spcPts val="0"/>
+                        </a:spcAft>
+                        <a:buClrTx/>
+                        <a:buSzTx/>
+                        <a:buFontTx/>
+                        <a:buNone/>
+                        <a:tabLst/>
+                        <a:defRPr/>
+                      </a:pPr>
+                      <a:endParaRPr lang="en-SG" sz="1200" b="0" kern="1200" dirty="0" smtClean="0">
+                        <a:solidFill>
+                          <a:schemeClr val="tx1"/>
+                        </a:solidFill>
+                        <a:effectLst/>
+                        <a:latin typeface="+mn-lt"/>
+                        <a:ea typeface="+mn-ea"/>
+                        <a:cs typeface="+mn-cs"/>
+                      </a:endParaRPr>
+                    </a:p>
+                  </a:txBody>
+                  <a:tcPr/>
+                </a:tc>
+                <a:extLst>
+                  <a:ext uri="{0D108BD9-81ED-4DB2-BD59-A6C34878D82A}">
+                    <a16:rowId xmlns:a16="http://schemas.microsoft.com/office/drawing/2014/main" val="3633971153"/>
+                  </a:ext>
+                </a:extLst>
+              </a:tr>
+              <a:tr h="370840">
+                <a:tc>
+                  <a:txBody>
+                    <a:bodyPr/>
+                    <a:lstStyle/>
+                    <a:p>
+                      <a:pPr marL="0" marR="0" lvl="0" indent="0" algn="l" defTabSz="914400" rtl="0" eaLnBrk="1" fontAlgn="auto" latinLnBrk="0" hangingPunct="1">
+                        <a:lnSpc>
+                          <a:spcPct val="100000"/>
+                        </a:lnSpc>
+                        <a:spcBef>
+                          <a:spcPts val="0"/>
+                        </a:spcBef>
+                        <a:spcAft>
+                          <a:spcPts val="0"/>
+                        </a:spcAft>
+                        <a:buClrTx/>
+                        <a:buSzTx/>
+                        <a:buFontTx/>
+                        <a:buNone/>
+                        <a:tabLst/>
+                        <a:defRPr/>
+                      </a:pPr>
+                      <a:r>
+                        <a:rPr lang="en-US" sz="1800" b="0" kern="1200" dirty="0" err="1" smtClean="0">
+                          <a:solidFill>
+                            <a:schemeClr val="tx1"/>
+                          </a:solidFill>
+                          <a:effectLst/>
+                          <a:latin typeface="+mn-lt"/>
+                          <a:ea typeface="+mn-ea"/>
+                          <a:cs typeface="+mn-cs"/>
+                        </a:rPr>
+                        <a:t>firmwareVersion</a:t>
+                      </a:r>
+                      <a:endParaRPr lang="en-SG" sz="1800" b="0" kern="1200" dirty="0" smtClean="0">
+                        <a:solidFill>
+                          <a:schemeClr val="tx1"/>
+                        </a:solidFill>
+                        <a:effectLst/>
+                        <a:latin typeface="+mn-lt"/>
+                        <a:ea typeface="+mn-ea"/>
+                        <a:cs typeface="+mn-cs"/>
+                      </a:endParaRPr>
+                    </a:p>
+                  </a:txBody>
+                  <a:tcPr/>
+                </a:tc>
+                <a:tc>
+                  <a:txBody>
+                    <a:bodyPr/>
+                    <a:lstStyle/>
+                    <a:p>
+                      <a:pPr marL="0" marR="0" lvl="0" indent="0" algn="l" defTabSz="914400" rtl="0" eaLnBrk="1" fontAlgn="auto" latinLnBrk="0" hangingPunct="1">
+                        <a:lnSpc>
+                          <a:spcPct val="100000"/>
+                        </a:lnSpc>
+                        <a:spcBef>
+                          <a:spcPts val="0"/>
+                        </a:spcBef>
+                        <a:spcAft>
+                          <a:spcPts val="0"/>
+                        </a:spcAft>
+                        <a:buClrTx/>
+                        <a:buSzTx/>
+                        <a:buFontTx/>
+                        <a:buNone/>
+                        <a:tabLst/>
+                        <a:defRPr/>
+                      </a:pPr>
+                      <a:r>
+                        <a:rPr lang="en-SG" sz="1200" b="0" kern="1200" dirty="0" smtClean="0">
+                          <a:solidFill>
+                            <a:schemeClr val="tx1"/>
+                          </a:solidFill>
+                          <a:effectLst/>
+                          <a:latin typeface="+mn-lt"/>
+                          <a:ea typeface="+mn-ea"/>
+                          <a:cs typeface="+mn-cs"/>
+                        </a:rPr>
+                        <a:t>text NOT NULL</a:t>
+                      </a:r>
+                    </a:p>
+                    <a:p>
+                      <a:pPr marL="0" marR="0" lvl="0" indent="0" algn="l" defTabSz="914400" rtl="0" eaLnBrk="1" fontAlgn="auto" latinLnBrk="0" hangingPunct="1">
+                        <a:lnSpc>
+                          <a:spcPct val="100000"/>
+                        </a:lnSpc>
+                        <a:spcBef>
+                          <a:spcPts val="0"/>
+                        </a:spcBef>
+                        <a:spcAft>
+                          <a:spcPts val="0"/>
+                        </a:spcAft>
+                        <a:buClrTx/>
+                        <a:buSzTx/>
+                        <a:buFontTx/>
+                        <a:buNone/>
+                        <a:tabLst/>
+                        <a:defRPr/>
+                      </a:pPr>
+                      <a:endParaRPr lang="en-SG" sz="1200" b="0" kern="1200" dirty="0" smtClean="0">
+                        <a:solidFill>
+                          <a:schemeClr val="tx1"/>
+                        </a:solidFill>
+                        <a:effectLst/>
+                        <a:latin typeface="+mn-lt"/>
+                        <a:ea typeface="+mn-ea"/>
+                        <a:cs typeface="+mn-cs"/>
+                      </a:endParaRPr>
+                    </a:p>
+                  </a:txBody>
+                  <a:tcPr/>
+                </a:tc>
+                <a:extLst>
+                  <a:ext uri="{0D108BD9-81ED-4DB2-BD59-A6C34878D82A}">
+                    <a16:rowId xmlns:a16="http://schemas.microsoft.com/office/drawing/2014/main" val="1300515623"/>
+                  </a:ext>
+                </a:extLst>
+              </a:tr>
+              <a:tr h="370840">
+                <a:tc>
+                  <a:txBody>
+                    <a:bodyPr/>
+                    <a:lstStyle/>
+                    <a:p>
+                      <a:pPr marL="0" marR="0" lvl="0" indent="0" algn="l" defTabSz="914400" rtl="0" eaLnBrk="1" fontAlgn="auto" latinLnBrk="0" hangingPunct="1">
+                        <a:lnSpc>
+                          <a:spcPct val="100000"/>
+                        </a:lnSpc>
+                        <a:spcBef>
+                          <a:spcPts val="0"/>
+                        </a:spcBef>
+                        <a:spcAft>
+                          <a:spcPts val="0"/>
+                        </a:spcAft>
+                        <a:buClrTx/>
+                        <a:buSzTx/>
+                        <a:buFontTx/>
+                        <a:buNone/>
+                        <a:tabLst/>
+                        <a:defRPr/>
+                      </a:pPr>
+                      <a:r>
+                        <a:rPr lang="en-SG" sz="1800" b="0" kern="1200" dirty="0" smtClean="0">
+                          <a:solidFill>
+                            <a:schemeClr val="tx1"/>
+                          </a:solidFill>
+                          <a:effectLst/>
+                          <a:latin typeface="+mn-lt"/>
+                          <a:ea typeface="+mn-ea"/>
+                          <a:cs typeface="+mn-cs"/>
+                        </a:rPr>
+                        <a:t>signature</a:t>
+                      </a:r>
+                    </a:p>
+                  </a:txBody>
+                  <a:tcPr/>
+                </a:tc>
+                <a:tc>
+                  <a:txBody>
+                    <a:bodyPr/>
+                    <a:lstStyle/>
+                    <a:p>
+                      <a:pPr marL="0" marR="0" lvl="0" indent="0" algn="l" defTabSz="914400" rtl="0" eaLnBrk="1" fontAlgn="auto" latinLnBrk="0" hangingPunct="1">
+                        <a:lnSpc>
+                          <a:spcPct val="100000"/>
+                        </a:lnSpc>
+                        <a:spcBef>
+                          <a:spcPts val="0"/>
+                        </a:spcBef>
+                        <a:spcAft>
+                          <a:spcPts val="0"/>
+                        </a:spcAft>
+                        <a:buClrTx/>
+                        <a:buSzTx/>
+                        <a:buFontTx/>
+                        <a:buNone/>
+                        <a:tabLst/>
+                        <a:defRPr/>
+                      </a:pPr>
+                      <a:r>
+                        <a:rPr lang="en-SG" sz="1200" b="0" kern="1200" dirty="0" smtClean="0">
+                          <a:solidFill>
+                            <a:schemeClr val="tx1"/>
+                          </a:solidFill>
+                          <a:effectLst/>
+                          <a:latin typeface="+mn-lt"/>
+                          <a:ea typeface="+mn-ea"/>
+                          <a:cs typeface="+mn-cs"/>
+                        </a:rPr>
+                        <a:t>Hex text NOT NULL</a:t>
+                      </a:r>
+                    </a:p>
+                    <a:p>
+                      <a:pPr marL="0" marR="0" lvl="0" indent="0" algn="l" defTabSz="914400" rtl="0" eaLnBrk="1" fontAlgn="auto" latinLnBrk="0" hangingPunct="1">
+                        <a:lnSpc>
+                          <a:spcPct val="100000"/>
+                        </a:lnSpc>
+                        <a:spcBef>
+                          <a:spcPts val="0"/>
+                        </a:spcBef>
+                        <a:spcAft>
+                          <a:spcPts val="0"/>
+                        </a:spcAft>
+                        <a:buClrTx/>
+                        <a:buSzTx/>
+                        <a:buFontTx/>
+                        <a:buNone/>
+                        <a:tabLst/>
+                        <a:defRPr/>
+                      </a:pPr>
+                      <a:endParaRPr lang="en-SG" sz="1200" b="0" kern="1200" dirty="0" smtClean="0">
+                        <a:solidFill>
+                          <a:schemeClr val="tx1"/>
+                        </a:solidFill>
+                        <a:effectLst/>
+                        <a:latin typeface="+mn-lt"/>
+                        <a:ea typeface="+mn-ea"/>
+                        <a:cs typeface="+mn-cs"/>
+                      </a:endParaRPr>
+                    </a:p>
+                  </a:txBody>
+                  <a:tcPr/>
+                </a:tc>
+                <a:extLst>
+                  <a:ext uri="{0D108BD9-81ED-4DB2-BD59-A6C34878D82A}">
+                    <a16:rowId xmlns:a16="http://schemas.microsoft.com/office/drawing/2014/main" val="2217170744"/>
+                  </a:ext>
+                </a:extLst>
+              </a:tr>
+            </a:tbl>
+          </a:graphicData>
+        </a:graphic>
+      </p:graphicFrame>
+      <p:graphicFrame>
+        <p:nvGraphicFramePr>
+          <p:cNvPr id="5" name="Table 4"/>
+          <p:cNvGraphicFramePr>
+            <a:graphicFrameLocks noGrp="1"/>
+          </p:cNvGraphicFramePr>
+          <p:nvPr>
+            <p:extLst>
+              <p:ext uri="{D42A27DB-BD31-4B8C-83A1-F6EECF244321}">
+                <p14:modId xmlns:p14="http://schemas.microsoft.com/office/powerpoint/2010/main" val="4286619237"/>
+              </p:ext>
+            </p:extLst>
+          </p:nvPr>
+        </p:nvGraphicFramePr>
+        <p:xfrm>
+          <a:off x="143689" y="4803502"/>
+          <a:ext cx="3814358" cy="1933304"/>
+        </p:xfrm>
+        <a:graphic>
+          <a:graphicData uri="http://schemas.openxmlformats.org/drawingml/2006/table">
+            <a:tbl>
+              <a:tblPr firstRow="1" bandRow="1">
+                <a:tableStyleId>{F2DE63D5-997A-4646-A377-4702673A728D}</a:tableStyleId>
+              </a:tblPr>
+              <a:tblGrid>
+                <a:gridCol w="1907179">
+                  <a:extLst>
+                    <a:ext uri="{9D8B030D-6E8A-4147-A177-3AD203B41FA5}">
+                      <a16:colId xmlns:a16="http://schemas.microsoft.com/office/drawing/2014/main" val="2705675591"/>
+                    </a:ext>
+                  </a:extLst>
+                </a:gridCol>
+                <a:gridCol w="1907179">
+                  <a:extLst>
+                    <a:ext uri="{9D8B030D-6E8A-4147-A177-3AD203B41FA5}">
+                      <a16:colId xmlns:a16="http://schemas.microsoft.com/office/drawing/2014/main" val="580750143"/>
+                    </a:ext>
+                  </a:extLst>
+                </a:gridCol>
+              </a:tblGrid>
+              <a:tr h="378824">
+                <a:tc gridSpan="2">
+                  <a:txBody>
+                    <a:bodyPr/>
+                    <a:lstStyle/>
+                    <a:p>
+                      <a:r>
+                        <a:rPr lang="en-US" dirty="0" err="1" smtClean="0"/>
+                        <a:t>userInfo</a:t>
+                      </a:r>
+                      <a:endParaRPr lang="en-SG" dirty="0"/>
+                    </a:p>
+                  </a:txBody>
+                  <a:tcPr/>
+                </a:tc>
+                <a:tc hMerge="1">
+                  <a:txBody>
+                    <a:bodyPr/>
+                    <a:lstStyle/>
+                    <a:p>
+                      <a:endParaRPr lang="en-SG" dirty="0"/>
+                    </a:p>
+                  </a:txBody>
+                  <a:tcPr/>
+                </a:tc>
+                <a:extLst>
+                  <a:ext uri="{0D108BD9-81ED-4DB2-BD59-A6C34878D82A}">
+                    <a16:rowId xmlns:a16="http://schemas.microsoft.com/office/drawing/2014/main" val="3730332777"/>
+                  </a:ext>
+                </a:extLst>
+              </a:tr>
+              <a:tr h="370840">
+                <a:tc>
+                  <a:txBody>
+                    <a:bodyPr/>
+                    <a:lstStyle/>
+                    <a:p>
+                      <a:pPr marL="0" marR="0" lvl="0" indent="0" algn="l" defTabSz="914400" rtl="0" eaLnBrk="1" fontAlgn="auto" latinLnBrk="0" hangingPunct="1">
+                        <a:lnSpc>
+                          <a:spcPct val="100000"/>
+                        </a:lnSpc>
+                        <a:spcBef>
+                          <a:spcPts val="0"/>
+                        </a:spcBef>
+                        <a:spcAft>
+                          <a:spcPts val="0"/>
+                        </a:spcAft>
+                        <a:buClrTx/>
+                        <a:buSzTx/>
+                        <a:buFontTx/>
+                        <a:buNone/>
+                        <a:tabLst/>
+                        <a:defRPr/>
+                      </a:pPr>
+                      <a:r>
+                        <a:rPr lang="en-US" sz="1800" b="0" kern="1200" dirty="0" smtClean="0">
+                          <a:solidFill>
+                            <a:schemeClr val="tx1"/>
+                          </a:solidFill>
+                          <a:effectLst/>
+                          <a:latin typeface="+mn-lt"/>
+                          <a:ea typeface="+mn-ea"/>
+                          <a:cs typeface="+mn-cs"/>
+                        </a:rPr>
+                        <a:t>User</a:t>
+                      </a:r>
+                      <a:r>
+                        <a:rPr lang="en-US" sz="1800" b="0" kern="1200" baseline="0" dirty="0" smtClean="0">
+                          <a:solidFill>
+                            <a:schemeClr val="tx1"/>
+                          </a:solidFill>
+                          <a:effectLst/>
+                          <a:latin typeface="+mn-lt"/>
+                          <a:ea typeface="+mn-ea"/>
+                          <a:cs typeface="+mn-cs"/>
+                        </a:rPr>
+                        <a:t> ID </a:t>
+                      </a:r>
+                      <a:endParaRPr lang="en-SG" sz="1800" b="0" kern="1200" dirty="0" smtClean="0">
+                        <a:solidFill>
+                          <a:schemeClr val="tx1"/>
+                        </a:solidFill>
+                        <a:effectLst/>
+                        <a:latin typeface="+mn-lt"/>
+                        <a:ea typeface="+mn-ea"/>
+                        <a:cs typeface="+mn-cs"/>
+                      </a:endParaRPr>
+                    </a:p>
+                  </a:txBody>
+                  <a:tcPr/>
+                </a:tc>
+                <a:tc>
+                  <a:txBody>
+                    <a:bodyPr/>
+                    <a:lstStyle/>
+                    <a:p>
+                      <a:pPr marL="0" marR="0" lvl="0" indent="0" algn="l" defTabSz="914400" rtl="0" eaLnBrk="1" fontAlgn="auto" latinLnBrk="0" hangingPunct="1">
+                        <a:lnSpc>
+                          <a:spcPct val="100000"/>
+                        </a:lnSpc>
+                        <a:spcBef>
+                          <a:spcPts val="0"/>
+                        </a:spcBef>
+                        <a:spcAft>
+                          <a:spcPts val="0"/>
+                        </a:spcAft>
+                        <a:buClrTx/>
+                        <a:buSzTx/>
+                        <a:buFontTx/>
+                        <a:buNone/>
+                        <a:tabLst/>
+                        <a:defRPr/>
+                      </a:pPr>
+                      <a:r>
+                        <a:rPr lang="en-SG" sz="1200" b="0" kern="1200" dirty="0" smtClean="0">
+                          <a:solidFill>
+                            <a:schemeClr val="tx1"/>
+                          </a:solidFill>
+                          <a:effectLst/>
+                          <a:latin typeface="+mn-lt"/>
+                          <a:ea typeface="+mn-ea"/>
+                          <a:cs typeface="+mn-cs"/>
+                        </a:rPr>
+                        <a:t>Text</a:t>
+                      </a:r>
+                      <a:r>
+                        <a:rPr lang="en-SG" sz="1200" b="0" kern="1200" baseline="0" dirty="0" smtClean="0">
+                          <a:solidFill>
+                            <a:schemeClr val="tx1"/>
+                          </a:solidFill>
+                          <a:effectLst/>
+                          <a:latin typeface="+mn-lt"/>
+                          <a:ea typeface="+mn-ea"/>
+                          <a:cs typeface="+mn-cs"/>
+                        </a:rPr>
+                        <a:t> </a:t>
+                      </a:r>
+                      <a:r>
+                        <a:rPr lang="en-SG" sz="1200" b="0" kern="1200" dirty="0" smtClean="0">
+                          <a:solidFill>
+                            <a:schemeClr val="tx1"/>
+                          </a:solidFill>
+                          <a:effectLst/>
+                          <a:latin typeface="+mn-lt"/>
+                          <a:ea typeface="+mn-ea"/>
+                          <a:cs typeface="+mn-cs"/>
+                        </a:rPr>
+                        <a:t>PRIMARY KEY</a:t>
+                      </a:r>
+                    </a:p>
+                    <a:p>
+                      <a:pPr marL="0" marR="0" lvl="0" indent="0" algn="l" defTabSz="914400" rtl="0" eaLnBrk="1" fontAlgn="auto" latinLnBrk="0" hangingPunct="1">
+                        <a:lnSpc>
+                          <a:spcPct val="100000"/>
+                        </a:lnSpc>
+                        <a:spcBef>
+                          <a:spcPts val="0"/>
+                        </a:spcBef>
+                        <a:spcAft>
+                          <a:spcPts val="0"/>
+                        </a:spcAft>
+                        <a:buClrTx/>
+                        <a:buSzTx/>
+                        <a:buFontTx/>
+                        <a:buNone/>
+                        <a:tabLst/>
+                        <a:defRPr/>
+                      </a:pPr>
+                      <a:endParaRPr lang="en-SG" sz="1200" b="0" kern="1200" dirty="0" smtClean="0">
+                        <a:solidFill>
+                          <a:schemeClr val="tx1"/>
+                        </a:solidFill>
+                        <a:effectLst/>
+                        <a:latin typeface="+mn-lt"/>
+                        <a:ea typeface="+mn-ea"/>
+                        <a:cs typeface="+mn-cs"/>
+                      </a:endParaRPr>
+                    </a:p>
+                  </a:txBody>
+                  <a:tcPr/>
+                </a:tc>
+                <a:extLst>
+                  <a:ext uri="{0D108BD9-81ED-4DB2-BD59-A6C34878D82A}">
+                    <a16:rowId xmlns:a16="http://schemas.microsoft.com/office/drawing/2014/main" val="2430873435"/>
+                  </a:ext>
+                </a:extLst>
+              </a:tr>
+              <a:tr h="370840">
+                <a:tc>
+                  <a:txBody>
+                    <a:bodyPr/>
+                    <a:lstStyle/>
+                    <a:p>
+                      <a:pPr marL="0" marR="0" lvl="0" indent="0" algn="l" defTabSz="914400" rtl="0" eaLnBrk="1" fontAlgn="auto" latinLnBrk="0" hangingPunct="1">
+                        <a:lnSpc>
+                          <a:spcPct val="100000"/>
+                        </a:lnSpc>
+                        <a:spcBef>
+                          <a:spcPts val="0"/>
+                        </a:spcBef>
+                        <a:spcAft>
+                          <a:spcPts val="0"/>
+                        </a:spcAft>
+                        <a:buClrTx/>
+                        <a:buSzTx/>
+                        <a:buFontTx/>
+                        <a:buNone/>
+                        <a:tabLst/>
+                        <a:defRPr/>
+                      </a:pPr>
+                      <a:r>
+                        <a:rPr lang="en-US" sz="1800" b="0" kern="1200" dirty="0" smtClean="0">
+                          <a:solidFill>
+                            <a:schemeClr val="tx1"/>
+                          </a:solidFill>
+                          <a:effectLst/>
+                          <a:latin typeface="+mn-lt"/>
+                          <a:ea typeface="+mn-ea"/>
+                          <a:cs typeface="+mn-cs"/>
+                        </a:rPr>
+                        <a:t>SALT(random</a:t>
+                      </a:r>
+                      <a:r>
+                        <a:rPr lang="en-US" sz="1800" b="0" kern="1200" baseline="0" dirty="0" smtClean="0">
+                          <a:solidFill>
+                            <a:schemeClr val="tx1"/>
+                          </a:solidFill>
+                          <a:effectLst/>
+                          <a:latin typeface="+mn-lt"/>
+                          <a:ea typeface="+mn-ea"/>
+                          <a:cs typeface="+mn-cs"/>
+                        </a:rPr>
+                        <a:t> Bx4</a:t>
+                      </a:r>
+                      <a:r>
+                        <a:rPr lang="en-US" sz="1800" b="0" kern="1200" dirty="0" smtClean="0">
+                          <a:solidFill>
+                            <a:schemeClr val="tx1"/>
+                          </a:solidFill>
+                          <a:effectLst/>
+                          <a:latin typeface="+mn-lt"/>
+                          <a:ea typeface="+mn-ea"/>
+                          <a:cs typeface="+mn-cs"/>
+                        </a:rPr>
+                        <a:t>)</a:t>
+                      </a:r>
+                      <a:endParaRPr lang="en-SG" sz="1800" b="0" kern="1200" dirty="0" smtClean="0">
+                        <a:solidFill>
+                          <a:schemeClr val="tx1"/>
+                        </a:solidFill>
+                        <a:effectLst/>
+                        <a:latin typeface="+mn-lt"/>
+                        <a:ea typeface="+mn-ea"/>
+                        <a:cs typeface="+mn-cs"/>
+                      </a:endParaRPr>
+                    </a:p>
+                  </a:txBody>
+                  <a:tcPr/>
+                </a:tc>
+                <a:tc>
+                  <a:txBody>
+                    <a:bodyPr/>
+                    <a:lstStyle/>
+                    <a:p>
+                      <a:pPr marL="0" marR="0" lvl="0" indent="0" algn="l" defTabSz="914400" rtl="0" eaLnBrk="1" fontAlgn="auto" latinLnBrk="0" hangingPunct="1">
+                        <a:lnSpc>
+                          <a:spcPct val="100000"/>
+                        </a:lnSpc>
+                        <a:spcBef>
+                          <a:spcPts val="0"/>
+                        </a:spcBef>
+                        <a:spcAft>
+                          <a:spcPts val="0"/>
+                        </a:spcAft>
+                        <a:buClrTx/>
+                        <a:buSzTx/>
+                        <a:buFontTx/>
+                        <a:buNone/>
+                        <a:tabLst/>
+                        <a:defRPr/>
+                      </a:pPr>
+                      <a:r>
+                        <a:rPr lang="en-SG" sz="1200" b="0" kern="1200" dirty="0" smtClean="0">
+                          <a:solidFill>
+                            <a:schemeClr val="tx1"/>
+                          </a:solidFill>
+                          <a:effectLst/>
+                          <a:latin typeface="+mn-lt"/>
+                          <a:ea typeface="+mn-ea"/>
+                          <a:cs typeface="+mn-cs"/>
+                        </a:rPr>
+                        <a:t>Hex text NOT NULL</a:t>
+                      </a:r>
+                    </a:p>
+                    <a:p>
+                      <a:pPr marL="0" marR="0" lvl="0" indent="0" algn="l" defTabSz="914400" rtl="0" eaLnBrk="1" fontAlgn="auto" latinLnBrk="0" hangingPunct="1">
+                        <a:lnSpc>
+                          <a:spcPct val="100000"/>
+                        </a:lnSpc>
+                        <a:spcBef>
+                          <a:spcPts val="0"/>
+                        </a:spcBef>
+                        <a:spcAft>
+                          <a:spcPts val="0"/>
+                        </a:spcAft>
+                        <a:buClrTx/>
+                        <a:buSzTx/>
+                        <a:buFontTx/>
+                        <a:buNone/>
+                        <a:tabLst/>
+                        <a:defRPr/>
+                      </a:pPr>
+                      <a:endParaRPr lang="en-SG" sz="1200" b="0" kern="1200" dirty="0" smtClean="0">
+                        <a:solidFill>
+                          <a:schemeClr val="tx1"/>
+                        </a:solidFill>
+                        <a:effectLst/>
+                        <a:latin typeface="+mn-lt"/>
+                        <a:ea typeface="+mn-ea"/>
+                        <a:cs typeface="+mn-cs"/>
+                      </a:endParaRPr>
+                    </a:p>
+                  </a:txBody>
+                  <a:tcPr/>
+                </a:tc>
+                <a:extLst>
+                  <a:ext uri="{0D108BD9-81ED-4DB2-BD59-A6C34878D82A}">
+                    <a16:rowId xmlns:a16="http://schemas.microsoft.com/office/drawing/2014/main" val="2642593814"/>
+                  </a:ext>
+                </a:extLst>
+              </a:tr>
+              <a:tr h="370840">
+                <a:tc>
+                  <a:txBody>
+                    <a:bodyPr/>
+                    <a:lstStyle/>
+                    <a:p>
+                      <a:pPr marL="0" marR="0" lvl="0" indent="0" algn="l" defTabSz="914400" rtl="0" eaLnBrk="1" fontAlgn="auto" latinLnBrk="0" hangingPunct="1">
+                        <a:lnSpc>
+                          <a:spcPct val="100000"/>
+                        </a:lnSpc>
+                        <a:spcBef>
+                          <a:spcPts val="0"/>
+                        </a:spcBef>
+                        <a:spcAft>
+                          <a:spcPts val="0"/>
+                        </a:spcAft>
+                        <a:buClrTx/>
+                        <a:buSzTx/>
+                        <a:buFontTx/>
+                        <a:buNone/>
+                        <a:tabLst/>
+                        <a:defRPr/>
+                      </a:pPr>
+                      <a:r>
+                        <a:rPr lang="en-US" sz="1800" b="0" kern="1200" dirty="0" smtClean="0">
+                          <a:solidFill>
+                            <a:schemeClr val="tx1"/>
+                          </a:solidFill>
+                          <a:effectLst/>
+                          <a:latin typeface="+mn-lt"/>
+                          <a:ea typeface="+mn-ea"/>
+                          <a:cs typeface="+mn-cs"/>
+                        </a:rPr>
+                        <a:t>SALT+PWD</a:t>
+                      </a:r>
+                      <a:r>
+                        <a:rPr lang="en-US" sz="1800" b="0" kern="1200" baseline="0" dirty="0" smtClean="0">
+                          <a:solidFill>
+                            <a:schemeClr val="tx1"/>
+                          </a:solidFill>
+                          <a:effectLst/>
+                          <a:latin typeface="+mn-lt"/>
+                          <a:ea typeface="+mn-ea"/>
+                          <a:cs typeface="+mn-cs"/>
+                        </a:rPr>
+                        <a:t> SHA256</a:t>
+                      </a:r>
+                      <a:endParaRPr lang="en-SG" sz="1800" b="0" kern="1200" dirty="0" smtClean="0">
+                        <a:solidFill>
+                          <a:schemeClr val="tx1"/>
+                        </a:solidFill>
+                        <a:effectLst/>
+                        <a:latin typeface="+mn-lt"/>
+                        <a:ea typeface="+mn-ea"/>
+                        <a:cs typeface="+mn-cs"/>
+                      </a:endParaRPr>
+                    </a:p>
+                  </a:txBody>
+                  <a:tcPr/>
+                </a:tc>
+                <a:tc>
+                  <a:txBody>
+                    <a:bodyPr/>
+                    <a:lstStyle/>
+                    <a:p>
+                      <a:pPr marL="0" marR="0" lvl="0" indent="0" algn="l" defTabSz="914400" rtl="0" eaLnBrk="1" fontAlgn="auto" latinLnBrk="0" hangingPunct="1">
+                        <a:lnSpc>
+                          <a:spcPct val="100000"/>
+                        </a:lnSpc>
+                        <a:spcBef>
+                          <a:spcPts val="0"/>
+                        </a:spcBef>
+                        <a:spcAft>
+                          <a:spcPts val="0"/>
+                        </a:spcAft>
+                        <a:buClrTx/>
+                        <a:buSzTx/>
+                        <a:buFontTx/>
+                        <a:buNone/>
+                        <a:tabLst/>
+                        <a:defRPr/>
+                      </a:pPr>
+                      <a:r>
+                        <a:rPr lang="en-SG" sz="1200" b="0" kern="1200" dirty="0" smtClean="0">
+                          <a:solidFill>
+                            <a:schemeClr val="tx1"/>
+                          </a:solidFill>
+                          <a:effectLst/>
+                          <a:latin typeface="+mn-lt"/>
+                          <a:ea typeface="+mn-ea"/>
+                          <a:cs typeface="+mn-cs"/>
+                        </a:rPr>
+                        <a:t>Hex text NOT NULL</a:t>
+                      </a:r>
+                    </a:p>
+                    <a:p>
+                      <a:pPr marL="0" marR="0" lvl="0" indent="0" algn="l" defTabSz="914400" rtl="0" eaLnBrk="1" fontAlgn="auto" latinLnBrk="0" hangingPunct="1">
+                        <a:lnSpc>
+                          <a:spcPct val="100000"/>
+                        </a:lnSpc>
+                        <a:spcBef>
+                          <a:spcPts val="0"/>
+                        </a:spcBef>
+                        <a:spcAft>
+                          <a:spcPts val="0"/>
+                        </a:spcAft>
+                        <a:buClrTx/>
+                        <a:buSzTx/>
+                        <a:buFontTx/>
+                        <a:buNone/>
+                        <a:tabLst/>
+                        <a:defRPr/>
+                      </a:pPr>
+                      <a:endParaRPr lang="en-SG" sz="1200" b="0" kern="1200" dirty="0" smtClean="0">
+                        <a:solidFill>
+                          <a:schemeClr val="tx1"/>
+                        </a:solidFill>
+                        <a:effectLst/>
+                        <a:latin typeface="+mn-lt"/>
+                        <a:ea typeface="+mn-ea"/>
+                        <a:cs typeface="+mn-cs"/>
+                      </a:endParaRPr>
+                    </a:p>
+                  </a:txBody>
+                  <a:tcPr/>
+                </a:tc>
+                <a:extLst>
+                  <a:ext uri="{0D108BD9-81ED-4DB2-BD59-A6C34878D82A}">
+                    <a16:rowId xmlns:a16="http://schemas.microsoft.com/office/drawing/2014/main" val="1610257110"/>
+                  </a:ext>
+                </a:extLst>
+              </a:tr>
+            </a:tbl>
+          </a:graphicData>
+        </a:graphic>
+      </p:graphicFrame>
+      <p:cxnSp>
+        <p:nvCxnSpPr>
+          <p:cNvPr id="15" name="Straight Connector 14"/>
+          <p:cNvCxnSpPr/>
+          <p:nvPr/>
+        </p:nvCxnSpPr>
+        <p:spPr>
+          <a:xfrm flipV="1">
+            <a:off x="3814354" y="1854926"/>
+            <a:ext cx="783772" cy="13063"/>
+          </a:xfrm>
+          <a:prstGeom prst="line">
+            <a:avLst/>
+          </a:prstGeom>
+          <a:ln w="38100"/>
+        </p:spPr>
+        <p:style>
+          <a:lnRef idx="1">
+            <a:schemeClr val="accent1"/>
+          </a:lnRef>
+          <a:fillRef idx="0">
+            <a:schemeClr val="accent1"/>
+          </a:fillRef>
+          <a:effectRef idx="0">
+            <a:schemeClr val="accent1"/>
+          </a:effectRef>
+          <a:fontRef idx="minor">
+            <a:schemeClr val="tx1"/>
+          </a:fontRef>
+        </p:style>
+      </p:cxnSp>
+      <p:cxnSp>
+        <p:nvCxnSpPr>
+          <p:cNvPr id="17" name="Straight Connector 16"/>
+          <p:cNvCxnSpPr/>
+          <p:nvPr/>
+        </p:nvCxnSpPr>
+        <p:spPr>
+          <a:xfrm>
+            <a:off x="4598126" y="1867989"/>
+            <a:ext cx="0" cy="3513908"/>
+          </a:xfrm>
+          <a:prstGeom prst="line">
+            <a:avLst/>
+          </a:prstGeom>
+          <a:ln w="28575"/>
+        </p:spPr>
+        <p:style>
+          <a:lnRef idx="1">
+            <a:schemeClr val="accent1"/>
+          </a:lnRef>
+          <a:fillRef idx="0">
+            <a:schemeClr val="accent1"/>
+          </a:fillRef>
+          <a:effectRef idx="0">
+            <a:schemeClr val="accent1"/>
+          </a:effectRef>
+          <a:fontRef idx="minor">
+            <a:schemeClr val="tx1"/>
+          </a:fontRef>
+        </p:style>
+      </p:cxnSp>
+      <p:cxnSp>
+        <p:nvCxnSpPr>
+          <p:cNvPr id="19" name="Straight Arrow Connector 18"/>
+          <p:cNvCxnSpPr/>
+          <p:nvPr/>
+        </p:nvCxnSpPr>
+        <p:spPr>
+          <a:xfrm flipH="1">
+            <a:off x="3683726" y="5381897"/>
+            <a:ext cx="914400" cy="0"/>
+          </a:xfrm>
+          <a:prstGeom prst="straightConnector1">
+            <a:avLst/>
+          </a:prstGeom>
+          <a:ln w="28575">
+            <a:tailEnd type="triangle"/>
+          </a:ln>
+        </p:spPr>
+        <p:style>
+          <a:lnRef idx="1">
+            <a:schemeClr val="accent1"/>
+          </a:lnRef>
+          <a:fillRef idx="0">
+            <a:schemeClr val="accent1"/>
+          </a:fillRef>
+          <a:effectRef idx="0">
+            <a:schemeClr val="accent1"/>
+          </a:effectRef>
+          <a:fontRef idx="minor">
+            <a:schemeClr val="tx1"/>
+          </a:fontRef>
+        </p:style>
+      </p:cxnSp>
+    </p:spTree>
+    <p:extLst>
+      <p:ext uri="{BB962C8B-B14F-4D97-AF65-F5344CB8AC3E}">
+        <p14:creationId xmlns:p14="http://schemas.microsoft.com/office/powerpoint/2010/main" val="56713115"/>
+      </p:ext>
+    </p:extLst>
+  </p:cSld>
+  <p:clrMapOvr>
+    <a:masterClrMapping/>
+  </p:clrMapOvr>
+  <p:timing>
+    <p:tnLst>
+      <p:par>
+        <p:cTn id="1" dur="indefinite" restart="never" nodeType="tmRoot"/>
+      </p:par>
+    </p:tnLst>
+  </p:timing>
 </p:sld>
 </file>
 

</xml_diff>

<commit_message>
new program work flow diagram.
</commit_message>
<xml_diff>
--- a/doc/firmwaresignWF.pptx
+++ b/doc/firmwaresignWF.pptx
@@ -3084,7 +3084,7 @@
         <p:spPr>
           <a:xfrm>
             <a:off x="4141181" y="409600"/>
-            <a:ext cx="1301257" cy="276999"/>
+            <a:ext cx="2367314" cy="276999"/>
           </a:xfrm>
           <a:prstGeom prst="rect">
             <a:avLst/>
@@ -3105,8 +3105,8 @@
               <a:t>Sign Server </a:t>
             </a:r>
             <a:r>
-              <a:rPr lang="en-US" sz="1200" dirty="0" smtClean="0"/>
-              <a:t>start</a:t>
+              <a:rPr lang="en-US" sz="1200" dirty="0"/>
+              <a:t>start [exeServer.bat]</a:t>
             </a:r>
             <a:endParaRPr lang="en-SG" sz="1200" dirty="0"/>
           </a:p>
@@ -3221,8 +3221,8 @@
         </p:nvSpPr>
         <p:spPr>
           <a:xfrm>
-            <a:off x="4106014" y="2014402"/>
-            <a:ext cx="1257300" cy="461665"/>
+            <a:off x="4106013" y="2014402"/>
+            <a:ext cx="1588487" cy="461665"/>
           </a:xfrm>
           <a:prstGeom prst="rect">
             <a:avLst/>
@@ -3251,11 +3251,19 @@
           <a:p>
             <a:r>
               <a:rPr lang="en-US" sz="1200" b="1" dirty="0" smtClean="0"/>
-              <a:t>Start </a:t>
+              <a:t>Start SSL </a:t>
             </a:r>
             <a:r>
               <a:rPr lang="en-US" sz="1200" b="1" dirty="0" smtClean="0"/>
-              <a:t>SSL server </a:t>
+              <a:t>server(</a:t>
+            </a:r>
+            <a:r>
+              <a:rPr lang="en-US" sz="900" b="1" dirty="0" smtClean="0"/>
+              <a:t>5005</a:t>
+            </a:r>
+            <a:r>
+              <a:rPr lang="en-US" sz="1200" b="1" dirty="0" smtClean="0"/>
+              <a:t>) </a:t>
             </a:r>
             <a:r>
               <a:rPr lang="en-US" sz="1200" b="1" dirty="0" smtClean="0"/>
@@ -3362,7 +3370,7 @@
         <p:spPr>
           <a:xfrm>
             <a:off x="1409700" y="409600"/>
-            <a:ext cx="1236785" cy="276999"/>
+            <a:ext cx="2176100" cy="276999"/>
           </a:xfrm>
           <a:prstGeom prst="rect">
             <a:avLst/>
@@ -3383,8 +3391,12 @@
               <a:t>Sign Client </a:t>
             </a:r>
             <a:r>
+              <a:rPr lang="en-US" sz="1200" dirty="0"/>
+              <a:t>start [</a:t>
+            </a:r>
+            <a:r>
               <a:rPr lang="en-US" sz="1200" dirty="0" smtClean="0"/>
-              <a:t>start</a:t>
+              <a:t>exeSign.bat]</a:t>
             </a:r>
             <a:endParaRPr lang="en-SG" sz="1200" dirty="0"/>
           </a:p>
@@ -3486,7 +3498,7 @@
         <p:spPr>
           <a:xfrm>
             <a:off x="2719755" y="2033962"/>
-            <a:ext cx="1386259" cy="211273"/>
+            <a:ext cx="1386258" cy="211273"/>
           </a:xfrm>
           <a:prstGeom prst="straightConnector1">
             <a:avLst/>
@@ -4097,7 +4109,7 @@
         </p:nvSpPr>
         <p:spPr>
           <a:xfrm>
-            <a:off x="6673367" y="2392241"/>
+            <a:off x="6385440" y="2365958"/>
             <a:ext cx="826477" cy="474609"/>
           </a:xfrm>
           <a:prstGeom prst="can">
@@ -4133,13 +4145,14 @@
           <p:cNvPr id="31" name="Straight Arrow Connector 30"/>
           <p:cNvCxnSpPr>
             <a:stCxn id="24" idx="3"/>
+            <a:endCxn id="27" idx="2"/>
           </p:cNvCxnSpPr>
           <p:nvPr/>
         </p:nvCxnSpPr>
         <p:spPr>
           <a:xfrm flipV="1">
-            <a:off x="5363314" y="2713305"/>
-            <a:ext cx="1248507" cy="292045"/>
+            <a:off x="5363314" y="2603263"/>
+            <a:ext cx="1022126" cy="402087"/>
           </a:xfrm>
           <a:prstGeom prst="straightConnector1">
             <a:avLst/>
@@ -4166,13 +4179,15 @@
       <p:cxnSp>
         <p:nvCxnSpPr>
           <p:cNvPr id="41" name="Straight Arrow Connector 40"/>
-          <p:cNvCxnSpPr/>
+          <p:cNvCxnSpPr>
+            <a:endCxn id="27" idx="3"/>
+          </p:cNvCxnSpPr>
           <p:nvPr/>
         </p:nvCxnSpPr>
         <p:spPr>
           <a:xfrm flipV="1">
-            <a:off x="5794138" y="2944138"/>
-            <a:ext cx="879229" cy="701389"/>
+            <a:off x="5794138" y="2840567"/>
+            <a:ext cx="1004541" cy="793441"/>
           </a:xfrm>
           <a:prstGeom prst="straightConnector1">
             <a:avLst/>
@@ -4978,14 +4993,15 @@
         <p:nvCxnSpPr>
           <p:cNvPr id="101" name="Straight Arrow Connector 100"/>
           <p:cNvCxnSpPr>
+            <a:stCxn id="99" idx="3"/>
             <a:endCxn id="27" idx="3"/>
           </p:cNvCxnSpPr>
           <p:nvPr/>
         </p:nvCxnSpPr>
         <p:spPr>
           <a:xfrm flipV="1">
-            <a:off x="5231428" y="2866850"/>
-            <a:ext cx="1855178" cy="2487159"/>
+            <a:off x="5231428" y="2840567"/>
+            <a:ext cx="1567251" cy="2550083"/>
           </a:xfrm>
           <a:prstGeom prst="straightConnector1">
             <a:avLst/>
@@ -5415,8 +5431,8 @@
         </p:nvSpPr>
         <p:spPr>
           <a:xfrm>
-            <a:off x="6770083" y="2563140"/>
-            <a:ext cx="1099038" cy="230832"/>
+            <a:off x="6462901" y="2518905"/>
+            <a:ext cx="699308" cy="230832"/>
           </a:xfrm>
           <a:prstGeom prst="rect">
             <a:avLst/>
@@ -5442,14 +5458,1477 @@
       </p:sp>
       <p:sp>
         <p:nvSpPr>
-          <p:cNvPr id="130" name="TextBox 129"/>
+          <p:cNvPr id="70" name="TextBox 69"/>
           <p:cNvSpPr txBox="1"/>
           <p:nvPr/>
         </p:nvSpPr>
         <p:spPr>
           <a:xfrm>
-            <a:off x="10018883" y="4233938"/>
-            <a:ext cx="1940248" cy="2385268"/>
+            <a:off x="8705850" y="436267"/>
+            <a:ext cx="2319693" cy="276999"/>
+          </a:xfrm>
+          <a:prstGeom prst="rect">
+            <a:avLst/>
+          </a:prstGeom>
+          <a:noFill/>
+          <a:ln w="19050">
+            <a:noFill/>
+          </a:ln>
+        </p:spPr>
+        <p:txBody>
+          <a:bodyPr wrap="square" rtlCol="0">
+            <a:spAutoFit/>
+          </a:bodyPr>
+          <a:lstStyle/>
+          <a:p>
+            <a:r>
+              <a:rPr lang="en-US" sz="1200" dirty="0" smtClean="0"/>
+              <a:t>Sensor reader</a:t>
+            </a:r>
+            <a:r>
+              <a:rPr lang="en-US" sz="1200" dirty="0"/>
+              <a:t> start[exeSensor.bat]</a:t>
+            </a:r>
+            <a:endParaRPr lang="en-SG" sz="1200" dirty="0"/>
+          </a:p>
+        </p:txBody>
+      </p:sp>
+      <p:sp>
+        <p:nvSpPr>
+          <p:cNvPr id="71" name="TextBox 70"/>
+          <p:cNvSpPr txBox="1"/>
+          <p:nvPr/>
+        </p:nvSpPr>
+        <p:spPr>
+          <a:xfrm>
+            <a:off x="9076595" y="1008252"/>
+            <a:ext cx="1866889" cy="646331"/>
+          </a:xfrm>
+          <a:prstGeom prst="rect">
+            <a:avLst/>
+          </a:prstGeom>
+          <a:ln w="19050"/>
+        </p:spPr>
+        <p:style>
+          <a:lnRef idx="2">
+            <a:schemeClr val="accent5"/>
+          </a:lnRef>
+          <a:fillRef idx="1">
+            <a:schemeClr val="lt1"/>
+          </a:fillRef>
+          <a:effectRef idx="0">
+            <a:schemeClr val="accent5"/>
+          </a:effectRef>
+          <a:fontRef idx="minor">
+            <a:schemeClr val="dk1"/>
+          </a:fontRef>
+        </p:style>
+        <p:txBody>
+          <a:bodyPr wrap="square" rtlCol="0">
+            <a:spAutoFit/>
+          </a:bodyPr>
+          <a:lstStyle/>
+          <a:p>
+            <a:r>
+              <a:rPr lang="en-US" sz="1200" b="1" dirty="0" err="1" smtClean="0"/>
+              <a:t>Init</a:t>
+            </a:r>
+            <a:r>
+              <a:rPr lang="en-US" sz="1200" b="1" dirty="0" smtClean="0"/>
+              <a:t> Sensor </a:t>
+            </a:r>
+            <a:r>
+              <a:rPr lang="en-US" sz="1200" b="1" dirty="0"/>
+              <a:t>UI, client(load CV cert, key</a:t>
+            </a:r>
+            <a:r>
+              <a:rPr lang="en-US" sz="1200" b="1" dirty="0" smtClean="0"/>
+              <a:t>), serial port reader, message manager.  </a:t>
+            </a:r>
+            <a:endParaRPr lang="en-SG" sz="1200" b="1" dirty="0"/>
+          </a:p>
+        </p:txBody>
+      </p:sp>
+      <p:sp>
+        <p:nvSpPr>
+          <p:cNvPr id="72" name="TextBox 71"/>
+          <p:cNvSpPr txBox="1"/>
+          <p:nvPr/>
+        </p:nvSpPr>
+        <p:spPr>
+          <a:xfrm>
+            <a:off x="6611822" y="1660460"/>
+            <a:ext cx="1714493" cy="461665"/>
+          </a:xfrm>
+          <a:prstGeom prst="rect">
+            <a:avLst/>
+          </a:prstGeom>
+          <a:ln w="19050"/>
+        </p:spPr>
+        <p:style>
+          <a:lnRef idx="2">
+            <a:schemeClr val="accent5"/>
+          </a:lnRef>
+          <a:fillRef idx="1">
+            <a:schemeClr val="lt1"/>
+          </a:fillRef>
+          <a:effectRef idx="0">
+            <a:schemeClr val="accent5"/>
+          </a:effectRef>
+          <a:fontRef idx="minor">
+            <a:schemeClr val="dk1"/>
+          </a:fontRef>
+        </p:style>
+        <p:txBody>
+          <a:bodyPr wrap="square" rtlCol="0">
+            <a:spAutoFit/>
+          </a:bodyPr>
+          <a:lstStyle/>
+          <a:p>
+            <a:r>
+              <a:rPr lang="en-US" sz="1200" b="1" dirty="0" err="1" smtClean="0"/>
+              <a:t>Init</a:t>
+            </a:r>
+            <a:r>
+              <a:rPr lang="en-US" sz="1200" b="1" dirty="0"/>
+              <a:t> </a:t>
+            </a:r>
+            <a:r>
+              <a:rPr lang="en-US" sz="1200" b="1" dirty="0" smtClean="0"/>
+              <a:t>sensor registration server thread.</a:t>
+            </a:r>
+            <a:endParaRPr lang="en-SG" sz="1200" b="1" dirty="0"/>
+          </a:p>
+        </p:txBody>
+      </p:sp>
+      <p:cxnSp>
+        <p:nvCxnSpPr>
+          <p:cNvPr id="4" name="Straight Connector 3"/>
+          <p:cNvCxnSpPr/>
+          <p:nvPr/>
+        </p:nvCxnSpPr>
+        <p:spPr>
+          <a:xfrm>
+            <a:off x="5785344" y="1331418"/>
+            <a:ext cx="1693996" cy="8792"/>
+          </a:xfrm>
+          <a:prstGeom prst="line">
+            <a:avLst/>
+          </a:prstGeom>
+          <a:ln w="19050"/>
+        </p:spPr>
+        <p:style>
+          <a:lnRef idx="1">
+            <a:schemeClr val="accent1"/>
+          </a:lnRef>
+          <a:fillRef idx="0">
+            <a:schemeClr val="accent1"/>
+          </a:fillRef>
+          <a:effectRef idx="0">
+            <a:schemeClr val="accent1"/>
+          </a:effectRef>
+          <a:fontRef idx="minor">
+            <a:schemeClr val="tx1"/>
+          </a:fontRef>
+        </p:style>
+      </p:cxnSp>
+      <p:cxnSp>
+        <p:nvCxnSpPr>
+          <p:cNvPr id="12" name="Straight Arrow Connector 11"/>
+          <p:cNvCxnSpPr>
+            <a:endCxn id="72" idx="0"/>
+          </p:cNvCxnSpPr>
+          <p:nvPr/>
+        </p:nvCxnSpPr>
+        <p:spPr>
+          <a:xfrm flipH="1">
+            <a:off x="7469069" y="1340210"/>
+            <a:ext cx="10272" cy="320250"/>
+          </a:xfrm>
+          <a:prstGeom prst="straightConnector1">
+            <a:avLst/>
+          </a:prstGeom>
+          <a:ln w="19050">
+            <a:tailEnd type="triangle"/>
+          </a:ln>
+        </p:spPr>
+        <p:style>
+          <a:lnRef idx="1">
+            <a:schemeClr val="accent1"/>
+          </a:lnRef>
+          <a:fillRef idx="0">
+            <a:schemeClr val="accent1"/>
+          </a:fillRef>
+          <a:effectRef idx="0">
+            <a:schemeClr val="accent1"/>
+          </a:effectRef>
+          <a:fontRef idx="minor">
+            <a:schemeClr val="tx1"/>
+          </a:fontRef>
+        </p:style>
+      </p:cxnSp>
+      <p:sp>
+        <p:nvSpPr>
+          <p:cNvPr id="86" name="TextBox 85"/>
+          <p:cNvSpPr txBox="1"/>
+          <p:nvPr/>
+        </p:nvSpPr>
+        <p:spPr>
+          <a:xfrm>
+            <a:off x="7133340" y="2985421"/>
+            <a:ext cx="1083813" cy="707886"/>
+          </a:xfrm>
+          <a:prstGeom prst="rect">
+            <a:avLst/>
+          </a:prstGeom>
+          <a:ln w="19050"/>
+        </p:spPr>
+        <p:style>
+          <a:lnRef idx="2">
+            <a:schemeClr val="accent5"/>
+          </a:lnRef>
+          <a:fillRef idx="1">
+            <a:schemeClr val="lt1"/>
+          </a:fillRef>
+          <a:effectRef idx="0">
+            <a:schemeClr val="accent5"/>
+          </a:effectRef>
+          <a:fontRef idx="minor">
+            <a:schemeClr val="dk1"/>
+          </a:fontRef>
+        </p:style>
+        <p:txBody>
+          <a:bodyPr wrap="square" rtlCol="0">
+            <a:spAutoFit/>
+          </a:bodyPr>
+          <a:lstStyle/>
+          <a:p>
+            <a:r>
+              <a:rPr lang="en-US" sz="1000" b="1" dirty="0" smtClean="0"/>
+              <a:t>Start SSL server(5006) wait for sensor login request </a:t>
+            </a:r>
+            <a:endParaRPr lang="en-SG" sz="1000" b="1" dirty="0"/>
+          </a:p>
+        </p:txBody>
+      </p:sp>
+      <p:cxnSp>
+        <p:nvCxnSpPr>
+          <p:cNvPr id="46" name="Straight Arrow Connector 45"/>
+          <p:cNvCxnSpPr>
+            <a:endCxn id="86" idx="0"/>
+          </p:cNvCxnSpPr>
+          <p:nvPr/>
+        </p:nvCxnSpPr>
+        <p:spPr>
+          <a:xfrm flipH="1">
+            <a:off x="7675247" y="2122125"/>
+            <a:ext cx="7680" cy="863296"/>
+          </a:xfrm>
+          <a:prstGeom prst="straightConnector1">
+            <a:avLst/>
+          </a:prstGeom>
+          <a:ln w="19050">
+            <a:tailEnd type="triangle"/>
+          </a:ln>
+        </p:spPr>
+        <p:style>
+          <a:lnRef idx="1">
+            <a:schemeClr val="accent1"/>
+          </a:lnRef>
+          <a:fillRef idx="0">
+            <a:schemeClr val="accent1"/>
+          </a:fillRef>
+          <a:effectRef idx="0">
+            <a:schemeClr val="accent1"/>
+          </a:effectRef>
+          <a:fontRef idx="minor">
+            <a:schemeClr val="tx1"/>
+          </a:fontRef>
+        </p:style>
+      </p:cxnSp>
+      <p:cxnSp>
+        <p:nvCxnSpPr>
+          <p:cNvPr id="90" name="Straight Arrow Connector 89"/>
+          <p:cNvCxnSpPr/>
+          <p:nvPr/>
+        </p:nvCxnSpPr>
+        <p:spPr>
+          <a:xfrm>
+            <a:off x="10010038" y="743791"/>
+            <a:ext cx="0" cy="219807"/>
+          </a:xfrm>
+          <a:prstGeom prst="straightConnector1">
+            <a:avLst/>
+          </a:prstGeom>
+          <a:ln w="19050">
+            <a:tailEnd type="triangle"/>
+          </a:ln>
+        </p:spPr>
+        <p:style>
+          <a:lnRef idx="1">
+            <a:schemeClr val="accent1"/>
+          </a:lnRef>
+          <a:fillRef idx="0">
+            <a:schemeClr val="accent1"/>
+          </a:fillRef>
+          <a:effectRef idx="0">
+            <a:schemeClr val="accent1"/>
+          </a:effectRef>
+          <a:fontRef idx="minor">
+            <a:schemeClr val="tx1"/>
+          </a:fontRef>
+        </p:style>
+      </p:cxnSp>
+      <p:sp>
+        <p:nvSpPr>
+          <p:cNvPr id="91" name="TextBox 90"/>
+          <p:cNvSpPr txBox="1"/>
+          <p:nvPr/>
+        </p:nvSpPr>
+        <p:spPr>
+          <a:xfrm>
+            <a:off x="9045818" y="1917001"/>
+            <a:ext cx="1866889" cy="646331"/>
+          </a:xfrm>
+          <a:prstGeom prst="rect">
+            <a:avLst/>
+          </a:prstGeom>
+          <a:ln w="19050"/>
+        </p:spPr>
+        <p:style>
+          <a:lnRef idx="2">
+            <a:schemeClr val="accent5"/>
+          </a:lnRef>
+          <a:fillRef idx="1">
+            <a:schemeClr val="lt1"/>
+          </a:fillRef>
+          <a:effectRef idx="0">
+            <a:schemeClr val="accent5"/>
+          </a:effectRef>
+          <a:fontRef idx="minor">
+            <a:schemeClr val="dk1"/>
+          </a:fontRef>
+        </p:style>
+        <p:txBody>
+          <a:bodyPr wrap="square" rtlCol="0">
+            <a:spAutoFit/>
+          </a:bodyPr>
+          <a:lstStyle/>
+          <a:p>
+            <a:r>
+              <a:rPr lang="en-US" sz="1200" b="1" dirty="0" smtClean="0"/>
+              <a:t>Connected to sensor fetch registration info(</a:t>
+            </a:r>
+            <a:r>
+              <a:rPr lang="en-US" sz="900" b="1" dirty="0" smtClean="0"/>
+              <a:t>id,</a:t>
+            </a:r>
+            <a:r>
+              <a:rPr lang="en-US" sz="1000" b="1" dirty="0" smtClean="0"/>
+              <a:t> type, version, signature</a:t>
+            </a:r>
+            <a:r>
+              <a:rPr lang="en-US" sz="1200" b="1" dirty="0" smtClean="0"/>
+              <a:t>)</a:t>
+            </a:r>
+            <a:endParaRPr lang="en-SG" sz="1200" b="1" dirty="0"/>
+          </a:p>
+        </p:txBody>
+      </p:sp>
+      <p:cxnSp>
+        <p:nvCxnSpPr>
+          <p:cNvPr id="92" name="Straight Arrow Connector 91"/>
+          <p:cNvCxnSpPr/>
+          <p:nvPr/>
+        </p:nvCxnSpPr>
+        <p:spPr>
+          <a:xfrm>
+            <a:off x="9982195" y="1680071"/>
+            <a:ext cx="0" cy="219807"/>
+          </a:xfrm>
+          <a:prstGeom prst="straightConnector1">
+            <a:avLst/>
+          </a:prstGeom>
+          <a:ln w="19050">
+            <a:tailEnd type="triangle"/>
+          </a:ln>
+        </p:spPr>
+        <p:style>
+          <a:lnRef idx="1">
+            <a:schemeClr val="accent1"/>
+          </a:lnRef>
+          <a:fillRef idx="0">
+            <a:schemeClr val="accent1"/>
+          </a:fillRef>
+          <a:effectRef idx="0">
+            <a:schemeClr val="accent1"/>
+          </a:effectRef>
+          <a:fontRef idx="minor">
+            <a:schemeClr val="tx1"/>
+          </a:fontRef>
+        </p:style>
+      </p:cxnSp>
+      <p:cxnSp>
+        <p:nvCxnSpPr>
+          <p:cNvPr id="53" name="Straight Arrow Connector 52"/>
+          <p:cNvCxnSpPr/>
+          <p:nvPr/>
+        </p:nvCxnSpPr>
+        <p:spPr>
+          <a:xfrm flipH="1" flipV="1">
+            <a:off x="10912707" y="2239626"/>
+            <a:ext cx="341447" cy="540"/>
+          </a:xfrm>
+          <a:prstGeom prst="straightConnector1">
+            <a:avLst/>
+          </a:prstGeom>
+          <a:ln w="19050">
+            <a:tailEnd type="triangle"/>
+          </a:ln>
+        </p:spPr>
+        <p:style>
+          <a:lnRef idx="1">
+            <a:schemeClr val="accent1"/>
+          </a:lnRef>
+          <a:fillRef idx="0">
+            <a:schemeClr val="accent1"/>
+          </a:fillRef>
+          <a:effectRef idx="0">
+            <a:schemeClr val="accent1"/>
+          </a:effectRef>
+          <a:fontRef idx="minor">
+            <a:schemeClr val="tx1"/>
+          </a:fontRef>
+        </p:style>
+      </p:cxnSp>
+      <p:sp>
+        <p:nvSpPr>
+          <p:cNvPr id="55" name="Cube 54"/>
+          <p:cNvSpPr/>
+          <p:nvPr/>
+        </p:nvSpPr>
+        <p:spPr>
+          <a:xfrm>
+            <a:off x="11254154" y="2065583"/>
+            <a:ext cx="712177" cy="306848"/>
+          </a:xfrm>
+          <a:prstGeom prst="cube">
+            <a:avLst/>
+          </a:prstGeom>
+        </p:spPr>
+        <p:style>
+          <a:lnRef idx="2">
+            <a:schemeClr val="accent1"/>
+          </a:lnRef>
+          <a:fillRef idx="1">
+            <a:schemeClr val="lt1"/>
+          </a:fillRef>
+          <a:effectRef idx="0">
+            <a:schemeClr val="accent1"/>
+          </a:effectRef>
+          <a:fontRef idx="minor">
+            <a:schemeClr val="dk1"/>
+          </a:fontRef>
+        </p:style>
+        <p:txBody>
+          <a:bodyPr rtlCol="0" anchor="ctr"/>
+          <a:lstStyle/>
+          <a:p>
+            <a:pPr algn="ctr"/>
+            <a:r>
+              <a:rPr lang="en-US" sz="800" dirty="0" smtClean="0"/>
+              <a:t>XAKA sensor</a:t>
+            </a:r>
+            <a:endParaRPr lang="en-SG" sz="800" dirty="0"/>
+          </a:p>
+        </p:txBody>
+      </p:sp>
+      <p:cxnSp>
+        <p:nvCxnSpPr>
+          <p:cNvPr id="97" name="Straight Arrow Connector 96"/>
+          <p:cNvCxnSpPr>
+            <a:stCxn id="105" idx="1"/>
+            <a:endCxn id="86" idx="3"/>
+          </p:cNvCxnSpPr>
+          <p:nvPr/>
+        </p:nvCxnSpPr>
+        <p:spPr>
+          <a:xfrm flipH="1">
+            <a:off x="8217153" y="3042437"/>
+            <a:ext cx="1121870" cy="296927"/>
+          </a:xfrm>
+          <a:prstGeom prst="straightConnector1">
+            <a:avLst/>
+          </a:prstGeom>
+          <a:ln w="19050">
+            <a:tailEnd type="triangle"/>
+          </a:ln>
+        </p:spPr>
+        <p:style>
+          <a:lnRef idx="1">
+            <a:schemeClr val="accent1"/>
+          </a:lnRef>
+          <a:fillRef idx="0">
+            <a:schemeClr val="accent1"/>
+          </a:fillRef>
+          <a:effectRef idx="0">
+            <a:schemeClr val="accent1"/>
+          </a:effectRef>
+          <a:fontRef idx="minor">
+            <a:schemeClr val="tx1"/>
+          </a:fontRef>
+        </p:style>
+      </p:cxnSp>
+      <p:sp>
+        <p:nvSpPr>
+          <p:cNvPr id="105" name="Flowchart: Terminator 104"/>
+          <p:cNvSpPr/>
+          <p:nvPr/>
+        </p:nvSpPr>
+        <p:spPr>
+          <a:xfrm>
+            <a:off x="9339023" y="2881740"/>
+            <a:ext cx="1310055" cy="321394"/>
+          </a:xfrm>
+          <a:prstGeom prst="flowChartTerminator">
+            <a:avLst/>
+          </a:prstGeom>
+          <a:ln w="19050"/>
+        </p:spPr>
+        <p:style>
+          <a:lnRef idx="2">
+            <a:schemeClr val="accent1"/>
+          </a:lnRef>
+          <a:fillRef idx="1">
+            <a:schemeClr val="lt1"/>
+          </a:fillRef>
+          <a:effectRef idx="0">
+            <a:schemeClr val="accent1"/>
+          </a:effectRef>
+          <a:fontRef idx="minor">
+            <a:schemeClr val="dk1"/>
+          </a:fontRef>
+        </p:style>
+        <p:txBody>
+          <a:bodyPr rtlCol="0" anchor="ctr"/>
+          <a:lstStyle/>
+          <a:p>
+            <a:pPr algn="ctr"/>
+            <a:r>
+              <a:rPr lang="en-US" sz="1100" dirty="0" smtClean="0">
+                <a:solidFill>
+                  <a:schemeClr val="tx1"/>
+                </a:solidFill>
+              </a:rPr>
+              <a:t>Select sever and connect</a:t>
+            </a:r>
+            <a:endParaRPr lang="en-SG" sz="1100" dirty="0">
+              <a:solidFill>
+                <a:schemeClr val="tx1"/>
+              </a:solidFill>
+            </a:endParaRPr>
+          </a:p>
+        </p:txBody>
+      </p:sp>
+      <p:cxnSp>
+        <p:nvCxnSpPr>
+          <p:cNvPr id="107" name="Straight Arrow Connector 106"/>
+          <p:cNvCxnSpPr>
+            <a:stCxn id="91" idx="2"/>
+            <a:endCxn id="105" idx="0"/>
+          </p:cNvCxnSpPr>
+          <p:nvPr/>
+        </p:nvCxnSpPr>
+        <p:spPr>
+          <a:xfrm>
+            <a:off x="9979263" y="2563332"/>
+            <a:ext cx="14788" cy="318408"/>
+          </a:xfrm>
+          <a:prstGeom prst="straightConnector1">
+            <a:avLst/>
+          </a:prstGeom>
+          <a:ln w="19050">
+            <a:tailEnd type="triangle"/>
+          </a:ln>
+        </p:spPr>
+        <p:style>
+          <a:lnRef idx="1">
+            <a:schemeClr val="accent1"/>
+          </a:lnRef>
+          <a:fillRef idx="0">
+            <a:schemeClr val="accent1"/>
+          </a:fillRef>
+          <a:effectRef idx="0">
+            <a:schemeClr val="accent1"/>
+          </a:effectRef>
+          <a:fontRef idx="minor">
+            <a:schemeClr val="tx1"/>
+          </a:fontRef>
+        </p:style>
+      </p:cxnSp>
+      <p:sp>
+        <p:nvSpPr>
+          <p:cNvPr id="116" name="TextBox 115"/>
+          <p:cNvSpPr txBox="1"/>
+          <p:nvPr/>
+        </p:nvSpPr>
+        <p:spPr>
+          <a:xfrm>
+            <a:off x="8355040" y="3023166"/>
+            <a:ext cx="1099038" cy="230832"/>
+          </a:xfrm>
+          <a:prstGeom prst="rect">
+            <a:avLst/>
+          </a:prstGeom>
+          <a:noFill/>
+          <a:ln w="19050">
+            <a:noFill/>
+          </a:ln>
+        </p:spPr>
+        <p:txBody>
+          <a:bodyPr wrap="square" rtlCol="0">
+            <a:spAutoFit/>
+          </a:bodyPr>
+          <a:lstStyle/>
+          <a:p>
+            <a:r>
+              <a:rPr lang="en-US" sz="900" dirty="0" smtClean="0"/>
+              <a:t>Connect request</a:t>
+            </a:r>
+            <a:endParaRPr lang="en-SG" sz="900" dirty="0"/>
+          </a:p>
+        </p:txBody>
+      </p:sp>
+      <p:sp>
+        <p:nvSpPr>
+          <p:cNvPr id="118" name="Flowchart: Terminator 117"/>
+          <p:cNvSpPr/>
+          <p:nvPr/>
+        </p:nvSpPr>
+        <p:spPr>
+          <a:xfrm>
+            <a:off x="9444537" y="3553135"/>
+            <a:ext cx="1310055" cy="321394"/>
+          </a:xfrm>
+          <a:prstGeom prst="flowChartTerminator">
+            <a:avLst/>
+          </a:prstGeom>
+          <a:ln w="19050"/>
+        </p:spPr>
+        <p:style>
+          <a:lnRef idx="2">
+            <a:schemeClr val="accent1"/>
+          </a:lnRef>
+          <a:fillRef idx="1">
+            <a:schemeClr val="lt1"/>
+          </a:fillRef>
+          <a:effectRef idx="0">
+            <a:schemeClr val="accent1"/>
+          </a:effectRef>
+          <a:fontRef idx="minor">
+            <a:schemeClr val="dk1"/>
+          </a:fontRef>
+        </p:style>
+        <p:txBody>
+          <a:bodyPr rtlCol="0" anchor="ctr"/>
+          <a:lstStyle/>
+          <a:p>
+            <a:pPr algn="ctr"/>
+            <a:r>
+              <a:rPr lang="en-US" sz="1100" dirty="0" smtClean="0">
+                <a:solidFill>
+                  <a:schemeClr val="tx1"/>
+                </a:solidFill>
+              </a:rPr>
+              <a:t>Generate registration </a:t>
+            </a:r>
+            <a:r>
+              <a:rPr lang="en-US" sz="1100" dirty="0" err="1" smtClean="0">
+                <a:solidFill>
+                  <a:schemeClr val="tx1"/>
+                </a:solidFill>
+              </a:rPr>
+              <a:t>msg</a:t>
+            </a:r>
+            <a:r>
+              <a:rPr lang="en-US" sz="1100" dirty="0" smtClean="0">
+                <a:solidFill>
+                  <a:schemeClr val="tx1"/>
+                </a:solidFill>
+              </a:rPr>
+              <a:t> </a:t>
+            </a:r>
+            <a:endParaRPr lang="en-SG" sz="1100" dirty="0">
+              <a:solidFill>
+                <a:schemeClr val="tx1"/>
+              </a:solidFill>
+            </a:endParaRPr>
+          </a:p>
+        </p:txBody>
+      </p:sp>
+      <p:cxnSp>
+        <p:nvCxnSpPr>
+          <p:cNvPr id="120" name="Straight Arrow Connector 119"/>
+          <p:cNvCxnSpPr>
+            <a:endCxn id="118" idx="1"/>
+          </p:cNvCxnSpPr>
+          <p:nvPr/>
+        </p:nvCxnSpPr>
+        <p:spPr>
+          <a:xfrm>
+            <a:off x="8204099" y="3384942"/>
+            <a:ext cx="1240438" cy="328890"/>
+          </a:xfrm>
+          <a:prstGeom prst="straightConnector1">
+            <a:avLst/>
+          </a:prstGeom>
+          <a:ln w="19050">
+            <a:tailEnd type="triangle"/>
+          </a:ln>
+        </p:spPr>
+        <p:style>
+          <a:lnRef idx="1">
+            <a:schemeClr val="accent1"/>
+          </a:lnRef>
+          <a:fillRef idx="0">
+            <a:schemeClr val="accent1"/>
+          </a:fillRef>
+          <a:effectRef idx="0">
+            <a:schemeClr val="accent1"/>
+          </a:effectRef>
+          <a:fontRef idx="minor">
+            <a:schemeClr val="tx1"/>
+          </a:fontRef>
+        </p:style>
+      </p:cxnSp>
+      <p:sp>
+        <p:nvSpPr>
+          <p:cNvPr id="122" name="TextBox 121"/>
+          <p:cNvSpPr txBox="1"/>
+          <p:nvPr/>
+        </p:nvSpPr>
+        <p:spPr>
+          <a:xfrm>
+            <a:off x="8411319" y="3421586"/>
+            <a:ext cx="1050258" cy="369332"/>
+          </a:xfrm>
+          <a:prstGeom prst="rect">
+            <a:avLst/>
+          </a:prstGeom>
+          <a:noFill/>
+          <a:ln w="19050">
+            <a:noFill/>
+          </a:ln>
+        </p:spPr>
+        <p:txBody>
+          <a:bodyPr wrap="square" rtlCol="0">
+            <a:spAutoFit/>
+          </a:bodyPr>
+          <a:lstStyle/>
+          <a:p>
+            <a:r>
+              <a:rPr lang="en-US" sz="900" dirty="0" smtClean="0"/>
+              <a:t>Connection response</a:t>
+            </a:r>
+            <a:endParaRPr lang="en-SG" sz="900" dirty="0"/>
+          </a:p>
+        </p:txBody>
+      </p:sp>
+      <p:sp>
+        <p:nvSpPr>
+          <p:cNvPr id="123" name="TextBox 122"/>
+          <p:cNvSpPr txBox="1"/>
+          <p:nvPr/>
+        </p:nvSpPr>
+        <p:spPr>
+          <a:xfrm>
+            <a:off x="7102365" y="3848717"/>
+            <a:ext cx="1083813" cy="400110"/>
+          </a:xfrm>
+          <a:prstGeom prst="rect">
+            <a:avLst/>
+          </a:prstGeom>
+          <a:ln w="19050"/>
+        </p:spPr>
+        <p:style>
+          <a:lnRef idx="2">
+            <a:schemeClr val="accent5"/>
+          </a:lnRef>
+          <a:fillRef idx="1">
+            <a:schemeClr val="lt1"/>
+          </a:fillRef>
+          <a:effectRef idx="0">
+            <a:schemeClr val="accent5"/>
+          </a:effectRef>
+          <a:fontRef idx="minor">
+            <a:schemeClr val="dk1"/>
+          </a:fontRef>
+        </p:style>
+        <p:txBody>
+          <a:bodyPr wrap="square" rtlCol="0">
+            <a:spAutoFit/>
+          </a:bodyPr>
+          <a:lstStyle/>
+          <a:p>
+            <a:r>
+              <a:rPr lang="en-US" sz="1000" b="1" dirty="0" smtClean="0"/>
+              <a:t>Registration verify</a:t>
+            </a:r>
+            <a:endParaRPr lang="en-SG" sz="1000" b="1" dirty="0"/>
+          </a:p>
+        </p:txBody>
+      </p:sp>
+      <p:cxnSp>
+        <p:nvCxnSpPr>
+          <p:cNvPr id="124" name="Straight Arrow Connector 123"/>
+          <p:cNvCxnSpPr/>
+          <p:nvPr/>
+        </p:nvCxnSpPr>
+        <p:spPr>
+          <a:xfrm flipH="1">
+            <a:off x="8186178" y="3750323"/>
+            <a:ext cx="1173232" cy="323038"/>
+          </a:xfrm>
+          <a:prstGeom prst="straightConnector1">
+            <a:avLst/>
+          </a:prstGeom>
+          <a:ln w="19050">
+            <a:tailEnd type="triangle"/>
+          </a:ln>
+        </p:spPr>
+        <p:style>
+          <a:lnRef idx="1">
+            <a:schemeClr val="accent1"/>
+          </a:lnRef>
+          <a:fillRef idx="0">
+            <a:schemeClr val="accent1"/>
+          </a:fillRef>
+          <a:effectRef idx="0">
+            <a:schemeClr val="accent1"/>
+          </a:effectRef>
+          <a:fontRef idx="minor">
+            <a:schemeClr val="tx1"/>
+          </a:fontRef>
+        </p:style>
+      </p:cxnSp>
+      <p:sp>
+        <p:nvSpPr>
+          <p:cNvPr id="127" name="TextBox 126"/>
+          <p:cNvSpPr txBox="1"/>
+          <p:nvPr/>
+        </p:nvSpPr>
+        <p:spPr>
+          <a:xfrm>
+            <a:off x="8411319" y="3851967"/>
+            <a:ext cx="1050258" cy="369332"/>
+          </a:xfrm>
+          <a:prstGeom prst="rect">
+            <a:avLst/>
+          </a:prstGeom>
+          <a:noFill/>
+          <a:ln w="19050">
+            <a:noFill/>
+          </a:ln>
+        </p:spPr>
+        <p:txBody>
+          <a:bodyPr wrap="square" rtlCol="0">
+            <a:spAutoFit/>
+          </a:bodyPr>
+          <a:lstStyle/>
+          <a:p>
+            <a:r>
+              <a:rPr lang="en-US" sz="900" dirty="0" smtClean="0"/>
+              <a:t>Registration </a:t>
+            </a:r>
+            <a:r>
+              <a:rPr lang="en-US" sz="900" dirty="0" smtClean="0"/>
+              <a:t> request</a:t>
+            </a:r>
+            <a:endParaRPr lang="en-SG" sz="900" dirty="0"/>
+          </a:p>
+        </p:txBody>
+      </p:sp>
+      <p:cxnSp>
+        <p:nvCxnSpPr>
+          <p:cNvPr id="129" name="Straight Arrow Connector 128"/>
+          <p:cNvCxnSpPr/>
+          <p:nvPr/>
+        </p:nvCxnSpPr>
+        <p:spPr>
+          <a:xfrm>
+            <a:off x="6866708" y="4036633"/>
+            <a:ext cx="235657" cy="0"/>
+          </a:xfrm>
+          <a:prstGeom prst="straightConnector1">
+            <a:avLst/>
+          </a:prstGeom>
+          <a:ln w="19050">
+            <a:tailEnd type="triangle"/>
+          </a:ln>
+        </p:spPr>
+        <p:style>
+          <a:lnRef idx="1">
+            <a:schemeClr val="accent1"/>
+          </a:lnRef>
+          <a:fillRef idx="0">
+            <a:schemeClr val="accent1"/>
+          </a:fillRef>
+          <a:effectRef idx="0">
+            <a:schemeClr val="accent1"/>
+          </a:effectRef>
+          <a:fontRef idx="minor">
+            <a:schemeClr val="tx1"/>
+          </a:fontRef>
+        </p:style>
+      </p:cxnSp>
+      <p:cxnSp>
+        <p:nvCxnSpPr>
+          <p:cNvPr id="131" name="Straight Connector 130"/>
+          <p:cNvCxnSpPr/>
+          <p:nvPr/>
+        </p:nvCxnSpPr>
+        <p:spPr>
+          <a:xfrm>
+            <a:off x="6875579" y="2848709"/>
+            <a:ext cx="7939" cy="1196716"/>
+          </a:xfrm>
+          <a:prstGeom prst="line">
+            <a:avLst/>
+          </a:prstGeom>
+          <a:ln w="19050"/>
+        </p:spPr>
+        <p:style>
+          <a:lnRef idx="1">
+            <a:schemeClr val="accent1"/>
+          </a:lnRef>
+          <a:fillRef idx="0">
+            <a:schemeClr val="accent1"/>
+          </a:fillRef>
+          <a:effectRef idx="0">
+            <a:schemeClr val="accent1"/>
+          </a:effectRef>
+          <a:fontRef idx="minor">
+            <a:schemeClr val="tx1"/>
+          </a:fontRef>
+        </p:style>
+      </p:cxnSp>
+      <p:sp>
+        <p:nvSpPr>
+          <p:cNvPr id="134" name="TextBox 133"/>
+          <p:cNvSpPr txBox="1"/>
+          <p:nvPr/>
+        </p:nvSpPr>
+        <p:spPr>
+          <a:xfrm>
+            <a:off x="9395471" y="4229391"/>
+            <a:ext cx="2031105" cy="461665"/>
+          </a:xfrm>
+          <a:prstGeom prst="rect">
+            <a:avLst/>
+          </a:prstGeom>
+          <a:ln w="19050"/>
+        </p:spPr>
+        <p:style>
+          <a:lnRef idx="2">
+            <a:schemeClr val="accent5"/>
+          </a:lnRef>
+          <a:fillRef idx="1">
+            <a:schemeClr val="lt1"/>
+          </a:fillRef>
+          <a:effectRef idx="0">
+            <a:schemeClr val="accent5"/>
+          </a:effectRef>
+          <a:fontRef idx="minor">
+            <a:schemeClr val="dk1"/>
+          </a:fontRef>
+        </p:style>
+        <p:txBody>
+          <a:bodyPr wrap="square" rtlCol="0">
+            <a:spAutoFit/>
+          </a:bodyPr>
+          <a:lstStyle/>
+          <a:p>
+            <a:r>
+              <a:rPr lang="en-US" sz="1200" b="1" dirty="0" smtClean="0"/>
+              <a:t>Active UI, start to read the data from sensor periodically </a:t>
+            </a:r>
+            <a:endParaRPr lang="en-SG" sz="1200" b="1" dirty="0"/>
+          </a:p>
+        </p:txBody>
+      </p:sp>
+      <p:cxnSp>
+        <p:nvCxnSpPr>
+          <p:cNvPr id="135" name="Straight Arrow Connector 134"/>
+          <p:cNvCxnSpPr>
+            <a:endCxn id="134" idx="1"/>
+          </p:cNvCxnSpPr>
+          <p:nvPr/>
+        </p:nvCxnSpPr>
+        <p:spPr>
+          <a:xfrm>
+            <a:off x="8229723" y="4174310"/>
+            <a:ext cx="1165748" cy="285914"/>
+          </a:xfrm>
+          <a:prstGeom prst="straightConnector1">
+            <a:avLst/>
+          </a:prstGeom>
+          <a:ln w="19050">
+            <a:tailEnd type="triangle"/>
+          </a:ln>
+        </p:spPr>
+        <p:style>
+          <a:lnRef idx="1">
+            <a:schemeClr val="accent1"/>
+          </a:lnRef>
+          <a:fillRef idx="0">
+            <a:schemeClr val="accent1"/>
+          </a:fillRef>
+          <a:effectRef idx="0">
+            <a:schemeClr val="accent1"/>
+          </a:effectRef>
+          <a:fontRef idx="minor">
+            <a:schemeClr val="tx1"/>
+          </a:fontRef>
+        </p:style>
+      </p:cxnSp>
+      <p:sp>
+        <p:nvSpPr>
+          <p:cNvPr id="141" name="TextBox 140"/>
+          <p:cNvSpPr txBox="1"/>
+          <p:nvPr/>
+        </p:nvSpPr>
+        <p:spPr>
+          <a:xfrm>
+            <a:off x="8217153" y="4201851"/>
+            <a:ext cx="1267711" cy="230832"/>
+          </a:xfrm>
+          <a:prstGeom prst="rect">
+            <a:avLst/>
+          </a:prstGeom>
+          <a:noFill/>
+          <a:ln w="19050">
+            <a:noFill/>
+          </a:ln>
+        </p:spPr>
+        <p:txBody>
+          <a:bodyPr wrap="square" rtlCol="0">
+            <a:spAutoFit/>
+          </a:bodyPr>
+          <a:lstStyle/>
+          <a:p>
+            <a:r>
+              <a:rPr lang="en-US" sz="900" dirty="0" smtClean="0"/>
+              <a:t>Registration </a:t>
+            </a:r>
+            <a:r>
+              <a:rPr lang="en-US" sz="900" dirty="0" smtClean="0"/>
+              <a:t> response</a:t>
+            </a:r>
+            <a:endParaRPr lang="en-SG" sz="900" dirty="0"/>
+          </a:p>
+        </p:txBody>
+      </p:sp>
+      <p:cxnSp>
+        <p:nvCxnSpPr>
+          <p:cNvPr id="143" name="Straight Arrow Connector 142"/>
+          <p:cNvCxnSpPr>
+            <a:endCxn id="55" idx="3"/>
+          </p:cNvCxnSpPr>
+          <p:nvPr/>
+        </p:nvCxnSpPr>
+        <p:spPr>
+          <a:xfrm flipH="1" flipV="1">
+            <a:off x="11571887" y="2372431"/>
+            <a:ext cx="29563" cy="2104319"/>
+          </a:xfrm>
+          <a:prstGeom prst="straightConnector1">
+            <a:avLst/>
+          </a:prstGeom>
+          <a:ln w="19050">
+            <a:tailEnd type="triangle"/>
+          </a:ln>
+        </p:spPr>
+        <p:style>
+          <a:lnRef idx="1">
+            <a:schemeClr val="accent1"/>
+          </a:lnRef>
+          <a:fillRef idx="0">
+            <a:schemeClr val="accent1"/>
+          </a:fillRef>
+          <a:effectRef idx="0">
+            <a:schemeClr val="accent1"/>
+          </a:effectRef>
+          <a:fontRef idx="minor">
+            <a:schemeClr val="tx1"/>
+          </a:fontRef>
+        </p:style>
+      </p:cxnSp>
+      <p:cxnSp>
+        <p:nvCxnSpPr>
+          <p:cNvPr id="147" name="Straight Connector 146"/>
+          <p:cNvCxnSpPr/>
+          <p:nvPr/>
+        </p:nvCxnSpPr>
+        <p:spPr>
+          <a:xfrm flipH="1" flipV="1">
+            <a:off x="11435707" y="4453261"/>
+            <a:ext cx="174535" cy="6962"/>
+          </a:xfrm>
+          <a:prstGeom prst="line">
+            <a:avLst/>
+          </a:prstGeom>
+          <a:ln w="19050"/>
+        </p:spPr>
+        <p:style>
+          <a:lnRef idx="1">
+            <a:schemeClr val="accent1"/>
+          </a:lnRef>
+          <a:fillRef idx="0">
+            <a:schemeClr val="accent1"/>
+          </a:fillRef>
+          <a:effectRef idx="0">
+            <a:schemeClr val="accent1"/>
+          </a:effectRef>
+          <a:fontRef idx="minor">
+            <a:schemeClr val="tx1"/>
+          </a:fontRef>
+        </p:style>
+      </p:cxnSp>
+      <p:cxnSp>
+        <p:nvCxnSpPr>
+          <p:cNvPr id="154" name="Straight Arrow Connector 153"/>
+          <p:cNvCxnSpPr/>
+          <p:nvPr/>
+        </p:nvCxnSpPr>
+        <p:spPr>
+          <a:xfrm flipH="1" flipV="1">
+            <a:off x="10912707" y="2603262"/>
+            <a:ext cx="30777" cy="1583905"/>
+          </a:xfrm>
+          <a:prstGeom prst="straightConnector1">
+            <a:avLst/>
+          </a:prstGeom>
+          <a:ln w="19050">
+            <a:solidFill>
+              <a:schemeClr val="accent2">
+                <a:lumMod val="75000"/>
+              </a:schemeClr>
+            </a:solidFill>
+            <a:prstDash val="dash"/>
+            <a:tailEnd type="triangle"/>
+          </a:ln>
+        </p:spPr>
+        <p:style>
+          <a:lnRef idx="1">
+            <a:schemeClr val="accent1"/>
+          </a:lnRef>
+          <a:fillRef idx="0">
+            <a:schemeClr val="accent1"/>
+          </a:fillRef>
+          <a:effectRef idx="0">
+            <a:schemeClr val="accent1"/>
+          </a:effectRef>
+          <a:fontRef idx="minor">
+            <a:schemeClr val="tx1"/>
+          </a:fontRef>
+        </p:style>
+      </p:cxnSp>
+      <p:sp>
+        <p:nvSpPr>
+          <p:cNvPr id="157" name="TextBox 156"/>
+          <p:cNvSpPr txBox="1"/>
+          <p:nvPr/>
+        </p:nvSpPr>
+        <p:spPr>
+          <a:xfrm>
+            <a:off x="10566407" y="3072889"/>
+            <a:ext cx="1050258" cy="230832"/>
+          </a:xfrm>
+          <a:prstGeom prst="rect">
+            <a:avLst/>
+          </a:prstGeom>
+          <a:noFill/>
+          <a:ln w="19050">
+            <a:noFill/>
+          </a:ln>
+        </p:spPr>
+        <p:txBody>
+          <a:bodyPr wrap="square" rtlCol="0">
+            <a:spAutoFit/>
+          </a:bodyPr>
+          <a:lstStyle/>
+          <a:p>
+            <a:r>
+              <a:rPr lang="en-US" sz="900" dirty="0" smtClean="0"/>
+              <a:t>Registration </a:t>
+            </a:r>
+            <a:r>
+              <a:rPr lang="en-US" sz="900" dirty="0" smtClean="0"/>
+              <a:t> fail</a:t>
+            </a:r>
+            <a:endParaRPr lang="en-SG" sz="900" dirty="0"/>
+          </a:p>
+        </p:txBody>
+      </p:sp>
+      <p:cxnSp>
+        <p:nvCxnSpPr>
+          <p:cNvPr id="158" name="Straight Arrow Connector 157"/>
+          <p:cNvCxnSpPr/>
+          <p:nvPr/>
+        </p:nvCxnSpPr>
+        <p:spPr>
+          <a:xfrm>
+            <a:off x="10639612" y="4707584"/>
+            <a:ext cx="0" cy="400718"/>
+          </a:xfrm>
+          <a:prstGeom prst="straightConnector1">
+            <a:avLst/>
+          </a:prstGeom>
+          <a:ln w="19050">
+            <a:tailEnd type="triangle"/>
+          </a:ln>
+        </p:spPr>
+        <p:style>
+          <a:lnRef idx="1">
+            <a:schemeClr val="accent1"/>
+          </a:lnRef>
+          <a:fillRef idx="0">
+            <a:schemeClr val="accent1"/>
+          </a:fillRef>
+          <a:effectRef idx="0">
+            <a:schemeClr val="accent1"/>
+          </a:effectRef>
+          <a:fontRef idx="minor">
+            <a:schemeClr val="tx1"/>
+          </a:fontRef>
+        </p:style>
+      </p:cxnSp>
+      <p:sp>
+        <p:nvSpPr>
+          <p:cNvPr id="159" name="TextBox 158"/>
+          <p:cNvSpPr txBox="1"/>
+          <p:nvPr/>
+        </p:nvSpPr>
+        <p:spPr>
+          <a:xfrm>
+            <a:off x="10184941" y="5116118"/>
+            <a:ext cx="1124825" cy="230832"/>
+          </a:xfrm>
+          <a:prstGeom prst="rect">
+            <a:avLst/>
+          </a:prstGeom>
+          <a:noFill/>
+          <a:ln w="19050">
+            <a:noFill/>
+          </a:ln>
+        </p:spPr>
+        <p:txBody>
+          <a:bodyPr wrap="square" rtlCol="0">
+            <a:spAutoFit/>
+          </a:bodyPr>
+          <a:lstStyle/>
+          <a:p>
+            <a:r>
+              <a:rPr lang="en-US" sz="900" dirty="0" smtClean="0"/>
+              <a:t>User close reader</a:t>
+            </a:r>
+            <a:endParaRPr lang="en-SG" sz="900" dirty="0"/>
+          </a:p>
+        </p:txBody>
+      </p:sp>
+      <p:cxnSp>
+        <p:nvCxnSpPr>
+          <p:cNvPr id="161" name="Straight Arrow Connector 160"/>
+          <p:cNvCxnSpPr>
+            <a:stCxn id="134" idx="1"/>
+          </p:cNvCxnSpPr>
+          <p:nvPr/>
+        </p:nvCxnSpPr>
+        <p:spPr>
+          <a:xfrm flipH="1">
+            <a:off x="8000175" y="4460224"/>
+            <a:ext cx="1395296" cy="261778"/>
+          </a:xfrm>
+          <a:prstGeom prst="straightConnector1">
+            <a:avLst/>
+          </a:prstGeom>
+          <a:ln w="19050">
+            <a:tailEnd type="triangle"/>
+          </a:ln>
+        </p:spPr>
+        <p:style>
+          <a:lnRef idx="1">
+            <a:schemeClr val="accent1"/>
+          </a:lnRef>
+          <a:fillRef idx="0">
+            <a:schemeClr val="accent1"/>
+          </a:fillRef>
+          <a:effectRef idx="0">
+            <a:schemeClr val="accent1"/>
+          </a:effectRef>
+          <a:fontRef idx="minor">
+            <a:schemeClr val="tx1"/>
+          </a:fontRef>
+        </p:style>
+      </p:cxnSp>
+      <p:sp>
+        <p:nvSpPr>
+          <p:cNvPr id="167" name="TextBox 166"/>
+          <p:cNvSpPr txBox="1"/>
+          <p:nvPr/>
+        </p:nvSpPr>
+        <p:spPr>
+          <a:xfrm>
+            <a:off x="8028700" y="4476752"/>
+            <a:ext cx="924687" cy="230832"/>
+          </a:xfrm>
+          <a:prstGeom prst="rect">
+            <a:avLst/>
+          </a:prstGeom>
+          <a:noFill/>
+          <a:ln w="19050">
+            <a:noFill/>
+          </a:ln>
+        </p:spPr>
+        <p:txBody>
+          <a:bodyPr wrap="square" rtlCol="0">
+            <a:spAutoFit/>
+          </a:bodyPr>
+          <a:lstStyle/>
+          <a:p>
+            <a:r>
+              <a:rPr lang="en-US" sz="900" dirty="0" smtClean="0"/>
+              <a:t>Reader  active</a:t>
+            </a:r>
+            <a:endParaRPr lang="en-SG" sz="900" dirty="0"/>
+          </a:p>
+        </p:txBody>
+      </p:sp>
+      <p:sp>
+        <p:nvSpPr>
+          <p:cNvPr id="170" name="Flowchart: Terminator 169"/>
+          <p:cNvSpPr/>
+          <p:nvPr/>
+        </p:nvSpPr>
+        <p:spPr>
+          <a:xfrm>
+            <a:off x="6570613" y="4449052"/>
+            <a:ext cx="1429287" cy="458891"/>
+          </a:xfrm>
+          <a:prstGeom prst="flowChartTerminator">
+            <a:avLst/>
+          </a:prstGeom>
+          <a:ln w="19050"/>
+        </p:spPr>
+        <p:style>
+          <a:lnRef idx="2">
+            <a:schemeClr val="accent1"/>
+          </a:lnRef>
+          <a:fillRef idx="1">
+            <a:schemeClr val="lt1"/>
+          </a:fillRef>
+          <a:effectRef idx="0">
+            <a:schemeClr val="accent1"/>
+          </a:effectRef>
+          <a:fontRef idx="minor">
+            <a:schemeClr val="dk1"/>
+          </a:fontRef>
+        </p:style>
+        <p:txBody>
+          <a:bodyPr rtlCol="0" anchor="ctr"/>
+          <a:lstStyle/>
+          <a:p>
+            <a:pPr algn="ctr"/>
+            <a:r>
+              <a:rPr lang="en-US" sz="1100" dirty="0" smtClean="0">
+                <a:solidFill>
+                  <a:schemeClr val="tx1"/>
+                </a:solidFill>
+              </a:rPr>
+              <a:t>Logout the client wait for new connection </a:t>
+            </a:r>
+            <a:endParaRPr lang="en-SG" sz="1100" dirty="0">
+              <a:solidFill>
+                <a:schemeClr val="tx1"/>
+              </a:solidFill>
+            </a:endParaRPr>
+          </a:p>
+        </p:txBody>
+      </p:sp>
+      <p:cxnSp>
+        <p:nvCxnSpPr>
+          <p:cNvPr id="171" name="Straight Arrow Connector 170"/>
+          <p:cNvCxnSpPr/>
+          <p:nvPr/>
+        </p:nvCxnSpPr>
+        <p:spPr>
+          <a:xfrm>
+            <a:off x="6545600" y="3543337"/>
+            <a:ext cx="569119" cy="1474"/>
+          </a:xfrm>
+          <a:prstGeom prst="straightConnector1">
+            <a:avLst/>
+          </a:prstGeom>
+          <a:ln w="19050">
+            <a:tailEnd type="triangle"/>
+          </a:ln>
+        </p:spPr>
+        <p:style>
+          <a:lnRef idx="1">
+            <a:schemeClr val="accent1"/>
+          </a:lnRef>
+          <a:fillRef idx="0">
+            <a:schemeClr val="accent1"/>
+          </a:fillRef>
+          <a:effectRef idx="0">
+            <a:schemeClr val="accent1"/>
+          </a:effectRef>
+          <a:fontRef idx="minor">
+            <a:schemeClr val="tx1"/>
+          </a:fontRef>
+        </p:style>
+      </p:cxnSp>
+      <p:cxnSp>
+        <p:nvCxnSpPr>
+          <p:cNvPr id="174" name="Straight Connector 173"/>
+          <p:cNvCxnSpPr/>
+          <p:nvPr/>
+        </p:nvCxnSpPr>
+        <p:spPr>
+          <a:xfrm>
+            <a:off x="6540861" y="3521184"/>
+            <a:ext cx="29925" cy="1148590"/>
+          </a:xfrm>
+          <a:prstGeom prst="line">
+            <a:avLst/>
+          </a:prstGeom>
+          <a:ln w="19050"/>
+        </p:spPr>
+        <p:style>
+          <a:lnRef idx="1">
+            <a:schemeClr val="accent1"/>
+          </a:lnRef>
+          <a:fillRef idx="0">
+            <a:schemeClr val="accent1"/>
+          </a:fillRef>
+          <a:effectRef idx="0">
+            <a:schemeClr val="accent1"/>
+          </a:effectRef>
+          <a:fontRef idx="minor">
+            <a:schemeClr val="tx1"/>
+          </a:fontRef>
+        </p:style>
+      </p:cxnSp>
+      <p:sp>
+        <p:nvSpPr>
+          <p:cNvPr id="183" name="TextBox 182"/>
+          <p:cNvSpPr txBox="1"/>
+          <p:nvPr/>
+        </p:nvSpPr>
+        <p:spPr>
+          <a:xfrm>
+            <a:off x="6375171" y="4983154"/>
+            <a:ext cx="3590207" cy="1738938"/>
           </a:xfrm>
           <a:prstGeom prst="rect">
             <a:avLst/>
@@ -5537,9 +7016,6 @@
               <a:rPr lang="en-SG" sz="900" dirty="0" err="1" smtClean="0"/>
               <a:t>fileBytes</a:t>
             </a:r>
-            <a:endParaRPr lang="en-SG" sz="900" dirty="0" smtClean="0"/>
-          </a:p>
-          <a:p>
             <a:endParaRPr lang="en-US" sz="900" dirty="0"/>
           </a:p>
           <a:p>
@@ -5550,15 +7026,35 @@
           </a:p>
           <a:p>
             <a:r>
+              <a:rPr lang="en-SG" sz="800" dirty="0" smtClean="0"/>
+              <a:t># </a:t>
+            </a:r>
+            <a:r>
               <a:rPr lang="en-SG" sz="800" dirty="0"/>
-              <a:t># CR - Connection request</a:t>
-            </a:r>
-          </a:p>
-          <a:p>
+              <a:t>CR - Connection </a:t>
+            </a:r>
             <a:r>
               <a:rPr lang="en-SG" sz="800" dirty="0"/>
-              <a:t># HB - Heart beat (feedback)</a:t>
-            </a:r>
+              <a:t>request	# SR - Signature </a:t>
+            </a:r>
+            <a:r>
+              <a:rPr lang="en-SG" sz="800" dirty="0" smtClean="0"/>
+              <a:t>response</a:t>
+            </a:r>
+            <a:endParaRPr lang="en-SG" sz="800" dirty="0"/>
+          </a:p>
+          <a:p>
+            <a:r>
+              <a:rPr lang="en-SG" sz="800" dirty="0"/>
+              <a:t># HB - Heart beat (feedback</a:t>
+            </a:r>
+            <a:r>
+              <a:rPr lang="en-SG" sz="800" dirty="0"/>
+              <a:t>)	# RG - Sensor Gateway registration. </a:t>
+            </a:r>
+          </a:p>
+          <a:p>
+            <a:endParaRPr lang="en-SG" sz="800" dirty="0"/>
           </a:p>
           <a:p>
             <a:r>
@@ -5581,38 +7077,97 @@
           <a:p>
             <a:r>
               <a:rPr lang="en-SG" sz="800" dirty="0"/>
-              <a:t># LR2 - Login response 2 [Challenge for SWATT]</a:t>
+              <a:t># LR2 - Login response 2 [Challenge for SWATT</a:t>
+            </a:r>
+            <a:r>
+              <a:rPr lang="en-SG" sz="800" dirty="0" smtClean="0"/>
+              <a:t>]</a:t>
             </a:r>
           </a:p>
           <a:p>
             <a:r>
               <a:rPr lang="en-SG" sz="800" dirty="0"/>
-              <a:t># CF - Certificate file fetch. </a:t>
-            </a:r>
-          </a:p>
-          <a:p>
+              <a:t># LO - Logout </a:t>
+            </a:r>
+            <a:r>
+              <a:rPr lang="en-SG" sz="800" dirty="0" err="1"/>
+              <a:t>requst</a:t>
+            </a:r>
+            <a:r>
+              <a:rPr lang="en-SG" sz="800" dirty="0" smtClean="0"/>
+              <a:t>.</a:t>
+            </a:r>
+            <a:endParaRPr lang="en-SG" sz="800" dirty="0" smtClean="0"/>
+          </a:p>
+          <a:p>
+            <a:r>
+              <a:rPr lang="en-SG" sz="800" dirty="0" smtClean="0"/>
+              <a:t># </a:t>
+            </a:r>
             <a:r>
               <a:rPr lang="en-SG" sz="800" dirty="0"/>
-              <a:t># SR - Signature </a:t>
-            </a:r>
-            <a:r>
-              <a:rPr lang="en-SG" sz="800" dirty="0" smtClean="0"/>
-              <a:t>response</a:t>
-            </a:r>
-            <a:endParaRPr lang="en-SG" sz="800" dirty="0"/>
-          </a:p>
-        </p:txBody>
-      </p:sp>
-      <p:sp>
-        <p:nvSpPr>
-          <p:cNvPr id="70" name="TextBox 69"/>
+              <a:t>CF - Certificate file fetch. </a:t>
+            </a:r>
+          </a:p>
+        </p:txBody>
+      </p:sp>
+      <p:sp>
+        <p:nvSpPr>
+          <p:cNvPr id="186" name="Rectangle 185"/>
+          <p:cNvSpPr/>
+          <p:nvPr/>
+        </p:nvSpPr>
+        <p:spPr>
+          <a:xfrm>
+            <a:off x="8289373" y="3016524"/>
+            <a:ext cx="1033831" cy="696170"/>
+          </a:xfrm>
+          <a:prstGeom prst="rect">
+            <a:avLst/>
+          </a:prstGeom>
+          <a:noFill/>
+          <a:ln w="19050">
+            <a:solidFill>
+              <a:schemeClr val="accent2"/>
+            </a:solidFill>
+            <a:prstDash val="dash"/>
+          </a:ln>
+        </p:spPr>
+        <p:style>
+          <a:lnRef idx="2">
+            <a:schemeClr val="accent1">
+              <a:shade val="50000"/>
+            </a:schemeClr>
+          </a:lnRef>
+          <a:fillRef idx="1">
+            <a:schemeClr val="accent1"/>
+          </a:fillRef>
+          <a:effectRef idx="0">
+            <a:schemeClr val="accent1"/>
+          </a:effectRef>
+          <a:fontRef idx="minor">
+            <a:schemeClr val="lt1"/>
+          </a:fontRef>
+        </p:style>
+        <p:txBody>
+          <a:bodyPr rtlCol="0" anchor="ctr"/>
+          <a:lstStyle/>
+          <a:p>
+            <a:pPr algn="ctr"/>
+            <a:endParaRPr lang="en-SG"/>
+          </a:p>
+        </p:txBody>
+      </p:sp>
+      <p:sp>
+        <p:nvSpPr>
+          <p:cNvPr id="187" name="TextBox 186"/>
           <p:cNvSpPr txBox="1"/>
           <p:nvPr/>
         </p:nvSpPr>
         <p:spPr>
           <a:xfrm>
-            <a:off x="8100651" y="409600"/>
-            <a:ext cx="1301257" cy="276999"/>
+            <a:off x="8201446" y="2821975"/>
+            <a:ext cx="1068270" cy="230832"/>
           </a:xfrm>
           <a:prstGeom prst="rect">
             <a:avLst/>
@@ -5629,14 +7184,18 @@
           <a:lstStyle/>
           <a:p>
             <a:r>
-              <a:rPr lang="en-US" sz="1200" dirty="0" smtClean="0"/>
-              <a:t>Sign Server </a:t>
-            </a:r>
-            <a:r>
-              <a:rPr lang="en-US" sz="1200" dirty="0" smtClean="0"/>
-              <a:t>start</a:t>
-            </a:r>
-            <a:endParaRPr lang="en-SG" sz="1200" dirty="0"/>
+              <a:rPr lang="en-US" sz="900" b="1" dirty="0" smtClean="0">
+                <a:solidFill>
+                  <a:schemeClr val="accent2"/>
+                </a:solidFill>
+              </a:rPr>
+              <a:t>SSL verify</a:t>
+            </a:r>
+            <a:endParaRPr lang="en-SG" sz="900" b="1" dirty="0">
+              <a:solidFill>
+                <a:schemeClr val="accent2"/>
+              </a:solidFill>
+            </a:endParaRPr>
           </a:p>
         </p:txBody>
       </p:sp>
@@ -6417,7 +7976,7 @@
                         <a:defRPr/>
                       </a:pPr>
                       <a:r>
-                        <a:rPr lang="en-SG" sz="1200" b="0" kern="1200" smtClean="0">
+                        <a:rPr lang="en-SG" sz="1200" b="0" kern="1200" dirty="0" smtClean="0">
                           <a:solidFill>
                             <a:schemeClr val="tx1"/>
                           </a:solidFill>
@@ -7395,6 +8954,169 @@
           </a:fontRef>
         </p:style>
       </p:cxnSp>
+      <p:sp>
+        <p:nvSpPr>
+          <p:cNvPr id="7" name="TextBox 6"/>
+          <p:cNvSpPr txBox="1"/>
+          <p:nvPr/>
+        </p:nvSpPr>
+        <p:spPr>
+          <a:xfrm>
+            <a:off x="9551263" y="3785333"/>
+            <a:ext cx="1940248" cy="2385268"/>
+          </a:xfrm>
+          <a:prstGeom prst="rect">
+            <a:avLst/>
+          </a:prstGeom>
+          <a:noFill/>
+          <a:ln w="19050">
+            <a:solidFill>
+              <a:srgbClr val="FF0000"/>
+            </a:solidFill>
+            <a:prstDash val="dash"/>
+          </a:ln>
+        </p:spPr>
+        <p:txBody>
+          <a:bodyPr wrap="square" rtlCol="0">
+            <a:spAutoFit/>
+          </a:bodyPr>
+          <a:lstStyle/>
+          <a:p>
+            <a:r>
+              <a:rPr lang="en-US" sz="900" dirty="0" smtClean="0"/>
+              <a:t>Message sample: </a:t>
+            </a:r>
+          </a:p>
+          <a:p>
+            <a:r>
+              <a:rPr lang="en-SG" sz="900" dirty="0" smtClean="0"/>
+              <a:t>‘</a:t>
+            </a:r>
+            <a:r>
+              <a:rPr lang="en-SG" sz="900" dirty="0" err="1" smtClean="0"/>
+              <a:t>C</a:t>
+            </a:r>
+            <a:r>
+              <a:rPr lang="en-SG" sz="900" dirty="0" err="1"/>
+              <a:t>'.encode</a:t>
+            </a:r>
+            <a:r>
+              <a:rPr lang="en-SG" sz="900" dirty="0"/>
+              <a:t>('utf-8</a:t>
+            </a:r>
+            <a:r>
+              <a:rPr lang="en-SG" sz="900" dirty="0" smtClean="0"/>
+              <a:t>')+</a:t>
+            </a:r>
+            <a:r>
+              <a:rPr lang="en-SG" sz="900" dirty="0" err="1" smtClean="0"/>
+              <a:t>dict</a:t>
+            </a:r>
+            <a:r>
+              <a:rPr lang="en-SG" sz="900" dirty="0" smtClean="0"/>
+              <a:t>{‘act’: </a:t>
+            </a:r>
+            <a:r>
+              <a:rPr lang="en-SG" sz="900" dirty="0" err="1" smtClean="0"/>
+              <a:t>str</a:t>
+            </a:r>
+            <a:r>
+              <a:rPr lang="en-SG" sz="900" dirty="0" smtClean="0"/>
+              <a:t>, [data]}</a:t>
+            </a:r>
+            <a:endParaRPr lang="en-SG" sz="900" dirty="0"/>
+          </a:p>
+          <a:p>
+            <a:r>
+              <a:rPr lang="en-SG" sz="900" dirty="0" smtClean="0"/>
+              <a:t>'</a:t>
+            </a:r>
+            <a:r>
+              <a:rPr lang="en-SG" sz="900" dirty="0" err="1" smtClean="0"/>
+              <a:t>F</a:t>
+            </a:r>
+            <a:r>
+              <a:rPr lang="en-SG" sz="900" dirty="0" err="1"/>
+              <a:t>'.encode</a:t>
+            </a:r>
+            <a:r>
+              <a:rPr lang="en-SG" sz="900" dirty="0"/>
+              <a:t>('utf-8') </a:t>
+            </a:r>
+            <a:r>
+              <a:rPr lang="en-SG" sz="900" dirty="0" smtClean="0"/>
+              <a:t>+</a:t>
+            </a:r>
+            <a:r>
+              <a:rPr lang="en-SG" sz="900" dirty="0" err="1" smtClean="0"/>
+              <a:t>fileBytes</a:t>
+            </a:r>
+            <a:endParaRPr lang="en-SG" sz="900" dirty="0" smtClean="0"/>
+          </a:p>
+          <a:p>
+            <a:endParaRPr lang="en-US" sz="900" dirty="0"/>
+          </a:p>
+          <a:p>
+            <a:r>
+              <a:rPr lang="en-SG" sz="800" dirty="0"/>
+              <a:t># Action type:</a:t>
+            </a:r>
+          </a:p>
+          <a:p>
+            <a:r>
+              <a:rPr lang="en-SG" sz="800" dirty="0"/>
+              <a:t># CR - Connection request</a:t>
+            </a:r>
+          </a:p>
+          <a:p>
+            <a:r>
+              <a:rPr lang="en-SG" sz="800" dirty="0"/>
+              <a:t># HB - Heart beat (feedback)</a:t>
+            </a:r>
+          </a:p>
+          <a:p>
+            <a:r>
+              <a:rPr lang="en-SG" sz="800" dirty="0"/>
+              <a:t># LI1 - Login request step 1 [Username + random1(client-&gt;sever)]</a:t>
+            </a:r>
+          </a:p>
+          <a:p>
+            <a:r>
+              <a:rPr lang="en-SG" sz="800" dirty="0"/>
+              <a:t># LR1 - Login response 1 [random1 + random2(client&lt;-server)]</a:t>
+            </a:r>
+          </a:p>
+          <a:p>
+            <a:r>
+              <a:rPr lang="en-SG" sz="800" dirty="0"/>
+              <a:t># LI2 - Login request step2 [random2 + password]</a:t>
+            </a:r>
+          </a:p>
+          <a:p>
+            <a:r>
+              <a:rPr lang="en-SG" sz="800" dirty="0"/>
+              <a:t># LR2 - Login response 2 [Challenge for SWATT]</a:t>
+            </a:r>
+          </a:p>
+          <a:p>
+            <a:r>
+              <a:rPr lang="en-SG" sz="800" dirty="0"/>
+              <a:t># CF - Certificate file fetch. </a:t>
+            </a:r>
+          </a:p>
+          <a:p>
+            <a:r>
+              <a:rPr lang="en-SG" sz="800" dirty="0"/>
+              <a:t># SR - Signature </a:t>
+            </a:r>
+            <a:r>
+              <a:rPr lang="en-SG" sz="800" dirty="0" smtClean="0"/>
+              <a:t>response</a:t>
+            </a:r>
+            <a:endParaRPr lang="en-SG" sz="800" dirty="0"/>
+          </a:p>
+        </p:txBody>
+      </p:sp>
     </p:spTree>
     <p:extLst>
       <p:ext uri="{BB962C8B-B14F-4D97-AF65-F5344CB8AC3E}">

</xml_diff>

<commit_message>
Added  global to hold the parameters.
</commit_message>
<xml_diff>
--- a/doc/firmwaresignWF.pptx
+++ b/doc/firmwaresignWF.pptx
@@ -3315,7 +3315,15 @@
             </a:r>
             <a:r>
               <a:rPr lang="en-US" sz="1200" b="1" dirty="0" smtClean="0"/>
-              <a:t> : UI, SSL client(load CV cert, key), SWATT calculator, RSA </a:t>
+              <a:t> : UI, SSL client(load </a:t>
+            </a:r>
+            <a:r>
+              <a:rPr lang="en-US" sz="1200" b="1" dirty="0" smtClean="0"/>
+              <a:t>CA </a:t>
+            </a:r>
+            <a:r>
+              <a:rPr lang="en-US" sz="1200" b="1" dirty="0" smtClean="0"/>
+              <a:t>cert, key), SWATT calculator, RSA </a:t>
             </a:r>
             <a:r>
               <a:rPr lang="en-US" sz="1200" b="1" dirty="0" err="1" smtClean="0"/>
@@ -5539,7 +5547,15 @@
             </a:r>
             <a:r>
               <a:rPr lang="en-US" sz="1200" b="1" dirty="0"/>
-              <a:t>UI, client(load CV cert, key</a:t>
+              <a:t>UI, client(load </a:t>
+            </a:r>
+            <a:r>
+              <a:rPr lang="en-US" sz="1200" b="1" dirty="0" smtClean="0"/>
+              <a:t>CA </a:t>
+            </a:r>
+            <a:r>
+              <a:rPr lang="en-US" sz="1200" b="1" dirty="0"/>
+              <a:t>cert, key</a:t>
             </a:r>
             <a:r>
               <a:rPr lang="en-US" sz="1200" b="1" dirty="0" smtClean="0"/>
@@ -8962,7 +8978,7 @@
         </p:nvSpPr>
         <p:spPr>
           <a:xfrm>
-            <a:off x="9551263" y="3785333"/>
+            <a:off x="3612826" y="4124873"/>
             <a:ext cx="1940248" cy="2385268"/>
           </a:xfrm>
           <a:prstGeom prst="rect">
@@ -9117,6 +9133,1330 @@
           </a:p>
         </p:txBody>
       </p:sp>
+      <p:graphicFrame>
+        <p:nvGraphicFramePr>
+          <p:cNvPr id="2" name="Table 1"/>
+          <p:cNvGraphicFramePr>
+            <a:graphicFrameLocks noGrp="1"/>
+          </p:cNvGraphicFramePr>
+          <p:nvPr>
+            <p:extLst>
+              <p:ext uri="{D42A27DB-BD31-4B8C-83A1-F6EECF244321}">
+                <p14:modId xmlns:p14="http://schemas.microsoft.com/office/powerpoint/2010/main" val="3803950221"/>
+              </p:ext>
+            </p:extLst>
+          </p:nvPr>
+        </p:nvGraphicFramePr>
+        <p:xfrm>
+          <a:off x="6534150" y="353907"/>
+          <a:ext cx="981075" cy="1046268"/>
+        </p:xfrm>
+        <a:graphic>
+          <a:graphicData uri="http://schemas.openxmlformats.org/drawingml/2006/table">
+            <a:tbl>
+              <a:tblPr firstRow="1" bandRow="1">
+                <a:tableStyleId>{5C22544A-7EE6-4342-B048-85BDC9FD1C3A}</a:tableStyleId>
+              </a:tblPr>
+              <a:tblGrid>
+                <a:gridCol w="981075">
+                  <a:extLst>
+                    <a:ext uri="{9D8B030D-6E8A-4147-A177-3AD203B41FA5}">
+                      <a16:colId xmlns:a16="http://schemas.microsoft.com/office/drawing/2014/main" val="1642479700"/>
+                    </a:ext>
+                  </a:extLst>
+                </a:gridCol>
+              </a:tblGrid>
+              <a:tr h="348756">
+                <a:tc>
+                  <a:txBody>
+                    <a:bodyPr/>
+                    <a:lstStyle/>
+                    <a:p>
+                      <a:r>
+                        <a:rPr lang="en-US" sz="1200" b="1" dirty="0" smtClean="0"/>
+                        <a:t>Class</a:t>
+                      </a:r>
+                      <a:r>
+                        <a:rPr lang="en-US" sz="1200" b="1" baseline="0" dirty="0" smtClean="0"/>
+                        <a:t> </a:t>
+                      </a:r>
+                      <a:r>
+                        <a:rPr lang="en-US" sz="1200" b="1" dirty="0" smtClean="0"/>
+                        <a:t>A</a:t>
+                      </a:r>
+                      <a:endParaRPr lang="en-SG" sz="1200" b="1" dirty="0"/>
+                    </a:p>
+                  </a:txBody>
+                  <a:tcPr/>
+                </a:tc>
+                <a:extLst>
+                  <a:ext uri="{0D108BD9-81ED-4DB2-BD59-A6C34878D82A}">
+                    <a16:rowId xmlns:a16="http://schemas.microsoft.com/office/drawing/2014/main" val="6462244"/>
+                  </a:ext>
+                </a:extLst>
+              </a:tr>
+              <a:tr h="348756">
+                <a:tc>
+                  <a:txBody>
+                    <a:bodyPr/>
+                    <a:lstStyle/>
+                    <a:p>
+                      <a:r>
+                        <a:rPr lang="en-US" sz="1200" b="1" dirty="0" err="1" smtClean="0"/>
+                        <a:t>getVal</a:t>
+                      </a:r>
+                      <a:r>
+                        <a:rPr lang="en-US" sz="1200" b="1" dirty="0" smtClean="0"/>
+                        <a:t>()</a:t>
+                      </a:r>
+                      <a:endParaRPr lang="en-SG" sz="1200" b="1" dirty="0"/>
+                    </a:p>
+                  </a:txBody>
+                  <a:tcPr/>
+                </a:tc>
+                <a:extLst>
+                  <a:ext uri="{0D108BD9-81ED-4DB2-BD59-A6C34878D82A}">
+                    <a16:rowId xmlns:a16="http://schemas.microsoft.com/office/drawing/2014/main" val="3668788205"/>
+                  </a:ext>
+                </a:extLst>
+              </a:tr>
+              <a:tr h="348756">
+                <a:tc>
+                  <a:txBody>
+                    <a:bodyPr/>
+                    <a:lstStyle/>
+                    <a:p>
+                      <a:pPr marL="0" marR="0" lvl="0" indent="0" algn="l" defTabSz="914400" rtl="0" eaLnBrk="1" fontAlgn="auto" latinLnBrk="0" hangingPunct="1">
+                        <a:lnSpc>
+                          <a:spcPct val="100000"/>
+                        </a:lnSpc>
+                        <a:spcBef>
+                          <a:spcPts val="0"/>
+                        </a:spcBef>
+                        <a:spcAft>
+                          <a:spcPts val="0"/>
+                        </a:spcAft>
+                        <a:buClrTx/>
+                        <a:buSzTx/>
+                        <a:buFontTx/>
+                        <a:buNone/>
+                        <a:tabLst/>
+                        <a:defRPr/>
+                      </a:pPr>
+                      <a:r>
+                        <a:rPr lang="en-US" sz="1200" b="1" dirty="0" err="1" smtClean="0">
+                          <a:solidFill>
+                            <a:srgbClr val="FF0000"/>
+                          </a:solidFill>
+                        </a:rPr>
+                        <a:t>SetVal</a:t>
+                      </a:r>
+                      <a:r>
+                        <a:rPr lang="en-US" sz="1200" b="1" dirty="0" smtClean="0">
+                          <a:solidFill>
+                            <a:srgbClr val="FF0000"/>
+                          </a:solidFill>
+                        </a:rPr>
+                        <a:t>()</a:t>
+                      </a:r>
+                      <a:endParaRPr lang="en-SG" sz="1200" b="1" dirty="0" smtClean="0">
+                        <a:solidFill>
+                          <a:srgbClr val="FF0000"/>
+                        </a:solidFill>
+                      </a:endParaRPr>
+                    </a:p>
+                  </a:txBody>
+                  <a:tcPr/>
+                </a:tc>
+                <a:extLst>
+                  <a:ext uri="{0D108BD9-81ED-4DB2-BD59-A6C34878D82A}">
+                    <a16:rowId xmlns:a16="http://schemas.microsoft.com/office/drawing/2014/main" val="2345927148"/>
+                  </a:ext>
+                </a:extLst>
+              </a:tr>
+            </a:tbl>
+          </a:graphicData>
+        </a:graphic>
+      </p:graphicFrame>
+      <p:graphicFrame>
+        <p:nvGraphicFramePr>
+          <p:cNvPr id="9" name="Table 8"/>
+          <p:cNvGraphicFramePr>
+            <a:graphicFrameLocks noGrp="1"/>
+          </p:cNvGraphicFramePr>
+          <p:nvPr>
+            <p:extLst>
+              <p:ext uri="{D42A27DB-BD31-4B8C-83A1-F6EECF244321}">
+                <p14:modId xmlns:p14="http://schemas.microsoft.com/office/powerpoint/2010/main" val="3866394749"/>
+              </p:ext>
+            </p:extLst>
+          </p:nvPr>
+        </p:nvGraphicFramePr>
+        <p:xfrm>
+          <a:off x="5553074" y="1854926"/>
+          <a:ext cx="981075" cy="1046268"/>
+        </p:xfrm>
+        <a:graphic>
+          <a:graphicData uri="http://schemas.openxmlformats.org/drawingml/2006/table">
+            <a:tbl>
+              <a:tblPr firstRow="1" bandRow="1">
+                <a:tableStyleId>{5C22544A-7EE6-4342-B048-85BDC9FD1C3A}</a:tableStyleId>
+              </a:tblPr>
+              <a:tblGrid>
+                <a:gridCol w="981075">
+                  <a:extLst>
+                    <a:ext uri="{9D8B030D-6E8A-4147-A177-3AD203B41FA5}">
+                      <a16:colId xmlns:a16="http://schemas.microsoft.com/office/drawing/2014/main" val="1642479700"/>
+                    </a:ext>
+                  </a:extLst>
+                </a:gridCol>
+              </a:tblGrid>
+              <a:tr h="348756">
+                <a:tc>
+                  <a:txBody>
+                    <a:bodyPr/>
+                    <a:lstStyle/>
+                    <a:p>
+                      <a:r>
+                        <a:rPr lang="en-US" sz="1200" b="1" dirty="0" smtClean="0"/>
+                        <a:t>Class B</a:t>
+                      </a:r>
+                      <a:endParaRPr lang="en-SG" sz="1200" b="1" dirty="0"/>
+                    </a:p>
+                  </a:txBody>
+                  <a:tcPr/>
+                </a:tc>
+                <a:extLst>
+                  <a:ext uri="{0D108BD9-81ED-4DB2-BD59-A6C34878D82A}">
+                    <a16:rowId xmlns:a16="http://schemas.microsoft.com/office/drawing/2014/main" val="6462244"/>
+                  </a:ext>
+                </a:extLst>
+              </a:tr>
+              <a:tr h="348756">
+                <a:tc>
+                  <a:txBody>
+                    <a:bodyPr/>
+                    <a:lstStyle/>
+                    <a:p>
+                      <a:r>
+                        <a:rPr lang="en-US" sz="1200" b="1" dirty="0" err="1" smtClean="0">
+                          <a:solidFill>
+                            <a:srgbClr val="FF0000"/>
+                          </a:solidFill>
+                        </a:rPr>
+                        <a:t>getVal</a:t>
+                      </a:r>
+                      <a:r>
+                        <a:rPr lang="en-US" sz="1200" b="1" dirty="0" smtClean="0">
+                          <a:solidFill>
+                            <a:srgbClr val="FF0000"/>
+                          </a:solidFill>
+                        </a:rPr>
+                        <a:t>()</a:t>
+                      </a:r>
+                      <a:endParaRPr lang="en-SG" sz="1200" b="1" dirty="0">
+                        <a:solidFill>
+                          <a:srgbClr val="FF0000"/>
+                        </a:solidFill>
+                      </a:endParaRPr>
+                    </a:p>
+                  </a:txBody>
+                  <a:tcPr/>
+                </a:tc>
+                <a:extLst>
+                  <a:ext uri="{0D108BD9-81ED-4DB2-BD59-A6C34878D82A}">
+                    <a16:rowId xmlns:a16="http://schemas.microsoft.com/office/drawing/2014/main" val="3668788205"/>
+                  </a:ext>
+                </a:extLst>
+              </a:tr>
+              <a:tr h="348756">
+                <a:tc>
+                  <a:txBody>
+                    <a:bodyPr/>
+                    <a:lstStyle/>
+                    <a:p>
+                      <a:pPr marL="0" marR="0" lvl="0" indent="0" algn="l" defTabSz="914400" rtl="0" eaLnBrk="1" fontAlgn="auto" latinLnBrk="0" hangingPunct="1">
+                        <a:lnSpc>
+                          <a:spcPct val="100000"/>
+                        </a:lnSpc>
+                        <a:spcBef>
+                          <a:spcPts val="0"/>
+                        </a:spcBef>
+                        <a:spcAft>
+                          <a:spcPts val="0"/>
+                        </a:spcAft>
+                        <a:buClrTx/>
+                        <a:buSzTx/>
+                        <a:buFontTx/>
+                        <a:buNone/>
+                        <a:tabLst/>
+                        <a:defRPr/>
+                      </a:pPr>
+                      <a:endParaRPr lang="en-SG" sz="1200" b="1" dirty="0" smtClean="0"/>
+                    </a:p>
+                  </a:txBody>
+                  <a:tcPr/>
+                </a:tc>
+                <a:extLst>
+                  <a:ext uri="{0D108BD9-81ED-4DB2-BD59-A6C34878D82A}">
+                    <a16:rowId xmlns:a16="http://schemas.microsoft.com/office/drawing/2014/main" val="2345927148"/>
+                  </a:ext>
+                </a:extLst>
+              </a:tr>
+            </a:tbl>
+          </a:graphicData>
+        </a:graphic>
+      </p:graphicFrame>
+      <p:graphicFrame>
+        <p:nvGraphicFramePr>
+          <p:cNvPr id="3" name="Table 2"/>
+          <p:cNvGraphicFramePr>
+            <a:graphicFrameLocks noGrp="1"/>
+          </p:cNvGraphicFramePr>
+          <p:nvPr>
+            <p:extLst>
+              <p:ext uri="{D42A27DB-BD31-4B8C-83A1-F6EECF244321}">
+                <p14:modId xmlns:p14="http://schemas.microsoft.com/office/powerpoint/2010/main" val="2977726009"/>
+              </p:ext>
+            </p:extLst>
+          </p:nvPr>
+        </p:nvGraphicFramePr>
+        <p:xfrm>
+          <a:off x="7677150" y="1875065"/>
+          <a:ext cx="981075" cy="1046268"/>
+        </p:xfrm>
+        <a:graphic>
+          <a:graphicData uri="http://schemas.openxmlformats.org/drawingml/2006/table">
+            <a:tbl>
+              <a:tblPr firstRow="1" bandRow="1">
+                <a:tableStyleId>{5C22544A-7EE6-4342-B048-85BDC9FD1C3A}</a:tableStyleId>
+              </a:tblPr>
+              <a:tblGrid>
+                <a:gridCol w="981075">
+                  <a:extLst>
+                    <a:ext uri="{9D8B030D-6E8A-4147-A177-3AD203B41FA5}">
+                      <a16:colId xmlns:a16="http://schemas.microsoft.com/office/drawing/2014/main" val="7596455"/>
+                    </a:ext>
+                  </a:extLst>
+                </a:gridCol>
+              </a:tblGrid>
+              <a:tr h="348756">
+                <a:tc>
+                  <a:txBody>
+                    <a:bodyPr/>
+                    <a:lstStyle/>
+                    <a:p>
+                      <a:r>
+                        <a:rPr lang="en-US" sz="1200" b="1" dirty="0" smtClean="0"/>
+                        <a:t>Class </a:t>
+                      </a:r>
+                      <a:r>
+                        <a:rPr lang="en-US" sz="1200" b="1" dirty="0" smtClean="0"/>
+                        <a:t>C</a:t>
+                      </a:r>
+                      <a:endParaRPr lang="en-SG" sz="1200" b="1" dirty="0"/>
+                    </a:p>
+                  </a:txBody>
+                  <a:tcPr/>
+                </a:tc>
+                <a:extLst>
+                  <a:ext uri="{0D108BD9-81ED-4DB2-BD59-A6C34878D82A}">
+                    <a16:rowId xmlns:a16="http://schemas.microsoft.com/office/drawing/2014/main" val="172362412"/>
+                  </a:ext>
+                </a:extLst>
+              </a:tr>
+              <a:tr h="348756">
+                <a:tc>
+                  <a:txBody>
+                    <a:bodyPr/>
+                    <a:lstStyle/>
+                    <a:p>
+                      <a:r>
+                        <a:rPr lang="en-US" sz="1200" b="1" dirty="0" err="1" smtClean="0"/>
+                        <a:t>getVal</a:t>
+                      </a:r>
+                      <a:r>
+                        <a:rPr lang="en-US" sz="1200" b="1" dirty="0" smtClean="0"/>
+                        <a:t>()</a:t>
+                      </a:r>
+                      <a:endParaRPr lang="en-SG" sz="1200" b="1" dirty="0"/>
+                    </a:p>
+                  </a:txBody>
+                  <a:tcPr/>
+                </a:tc>
+                <a:extLst>
+                  <a:ext uri="{0D108BD9-81ED-4DB2-BD59-A6C34878D82A}">
+                    <a16:rowId xmlns:a16="http://schemas.microsoft.com/office/drawing/2014/main" val="1006087427"/>
+                  </a:ext>
+                </a:extLst>
+              </a:tr>
+              <a:tr h="348756">
+                <a:tc>
+                  <a:txBody>
+                    <a:bodyPr/>
+                    <a:lstStyle/>
+                    <a:p>
+                      <a:pPr marL="0" marR="0" lvl="0" indent="0" algn="l" defTabSz="914400" rtl="0" eaLnBrk="1" fontAlgn="auto" latinLnBrk="0" hangingPunct="1">
+                        <a:lnSpc>
+                          <a:spcPct val="100000"/>
+                        </a:lnSpc>
+                        <a:spcBef>
+                          <a:spcPts val="0"/>
+                        </a:spcBef>
+                        <a:spcAft>
+                          <a:spcPts val="0"/>
+                        </a:spcAft>
+                        <a:buClrTx/>
+                        <a:buSzTx/>
+                        <a:buFontTx/>
+                        <a:buNone/>
+                        <a:tabLst/>
+                        <a:defRPr/>
+                      </a:pPr>
+                      <a:r>
+                        <a:rPr lang="en-US" sz="1200" b="1" dirty="0" err="1" smtClean="0"/>
+                        <a:t>SetVal</a:t>
+                      </a:r>
+                      <a:r>
+                        <a:rPr lang="en-US" sz="1200" b="1" dirty="0" smtClean="0"/>
+                        <a:t>()</a:t>
+                      </a:r>
+                      <a:endParaRPr lang="en-SG" sz="1200" b="1" dirty="0" smtClean="0"/>
+                    </a:p>
+                  </a:txBody>
+                  <a:tcPr/>
+                </a:tc>
+                <a:extLst>
+                  <a:ext uri="{0D108BD9-81ED-4DB2-BD59-A6C34878D82A}">
+                    <a16:rowId xmlns:a16="http://schemas.microsoft.com/office/drawing/2014/main" val="50040475"/>
+                  </a:ext>
+                </a:extLst>
+              </a:tr>
+            </a:tbl>
+          </a:graphicData>
+        </a:graphic>
+      </p:graphicFrame>
+      <p:graphicFrame>
+        <p:nvGraphicFramePr>
+          <p:cNvPr id="11" name="Table 10"/>
+          <p:cNvGraphicFramePr>
+            <a:graphicFrameLocks noGrp="1"/>
+          </p:cNvGraphicFramePr>
+          <p:nvPr>
+            <p:extLst>
+              <p:ext uri="{D42A27DB-BD31-4B8C-83A1-F6EECF244321}">
+                <p14:modId xmlns:p14="http://schemas.microsoft.com/office/powerpoint/2010/main" val="3814255402"/>
+              </p:ext>
+            </p:extLst>
+          </p:nvPr>
+        </p:nvGraphicFramePr>
+        <p:xfrm>
+          <a:off x="6696075" y="3262199"/>
+          <a:ext cx="981075" cy="1046268"/>
+        </p:xfrm>
+        <a:graphic>
+          <a:graphicData uri="http://schemas.openxmlformats.org/drawingml/2006/table">
+            <a:tbl>
+              <a:tblPr firstRow="1" bandRow="1">
+                <a:tableStyleId>{5C22544A-7EE6-4342-B048-85BDC9FD1C3A}</a:tableStyleId>
+              </a:tblPr>
+              <a:tblGrid>
+                <a:gridCol w="981075">
+                  <a:extLst>
+                    <a:ext uri="{9D8B030D-6E8A-4147-A177-3AD203B41FA5}">
+                      <a16:colId xmlns:a16="http://schemas.microsoft.com/office/drawing/2014/main" val="1642479700"/>
+                    </a:ext>
+                  </a:extLst>
+                </a:gridCol>
+              </a:tblGrid>
+              <a:tr h="348756">
+                <a:tc>
+                  <a:txBody>
+                    <a:bodyPr/>
+                    <a:lstStyle/>
+                    <a:p>
+                      <a:r>
+                        <a:rPr lang="en-US" sz="1200" b="1" dirty="0" smtClean="0"/>
+                        <a:t>Class D</a:t>
+                      </a:r>
+                      <a:endParaRPr lang="en-SG" sz="1200" b="1" dirty="0"/>
+                    </a:p>
+                  </a:txBody>
+                  <a:tcPr/>
+                </a:tc>
+                <a:extLst>
+                  <a:ext uri="{0D108BD9-81ED-4DB2-BD59-A6C34878D82A}">
+                    <a16:rowId xmlns:a16="http://schemas.microsoft.com/office/drawing/2014/main" val="6462244"/>
+                  </a:ext>
+                </a:extLst>
+              </a:tr>
+              <a:tr h="348756">
+                <a:tc>
+                  <a:txBody>
+                    <a:bodyPr/>
+                    <a:lstStyle/>
+                    <a:p>
+                      <a:endParaRPr lang="en-SG" sz="1200" b="1" dirty="0"/>
+                    </a:p>
+                  </a:txBody>
+                  <a:tcPr/>
+                </a:tc>
+                <a:extLst>
+                  <a:ext uri="{0D108BD9-81ED-4DB2-BD59-A6C34878D82A}">
+                    <a16:rowId xmlns:a16="http://schemas.microsoft.com/office/drawing/2014/main" val="3668788205"/>
+                  </a:ext>
+                </a:extLst>
+              </a:tr>
+              <a:tr h="348756">
+                <a:tc>
+                  <a:txBody>
+                    <a:bodyPr/>
+                    <a:lstStyle/>
+                    <a:p>
+                      <a:pPr marL="0" marR="0" lvl="0" indent="0" algn="l" defTabSz="914400" rtl="0" eaLnBrk="1" fontAlgn="auto" latinLnBrk="0" hangingPunct="1">
+                        <a:lnSpc>
+                          <a:spcPct val="100000"/>
+                        </a:lnSpc>
+                        <a:spcBef>
+                          <a:spcPts val="0"/>
+                        </a:spcBef>
+                        <a:spcAft>
+                          <a:spcPts val="0"/>
+                        </a:spcAft>
+                        <a:buClrTx/>
+                        <a:buSzTx/>
+                        <a:buFontTx/>
+                        <a:buNone/>
+                        <a:tabLst/>
+                        <a:defRPr/>
+                      </a:pPr>
+                      <a:endParaRPr lang="en-SG" sz="1200" b="1" dirty="0" smtClean="0"/>
+                    </a:p>
+                  </a:txBody>
+                  <a:tcPr/>
+                </a:tc>
+                <a:extLst>
+                  <a:ext uri="{0D108BD9-81ED-4DB2-BD59-A6C34878D82A}">
+                    <a16:rowId xmlns:a16="http://schemas.microsoft.com/office/drawing/2014/main" val="2345927148"/>
+                  </a:ext>
+                </a:extLst>
+              </a:tr>
+            </a:tbl>
+          </a:graphicData>
+        </a:graphic>
+      </p:graphicFrame>
+      <p:cxnSp>
+        <p:nvCxnSpPr>
+          <p:cNvPr id="12" name="Straight Arrow Connector 11"/>
+          <p:cNvCxnSpPr>
+            <a:stCxn id="9" idx="0"/>
+            <a:endCxn id="2" idx="2"/>
+          </p:cNvCxnSpPr>
+          <p:nvPr/>
+        </p:nvCxnSpPr>
+        <p:spPr>
+          <a:xfrm flipV="1">
+            <a:off x="6043611" y="1400175"/>
+            <a:ext cx="981076" cy="454751"/>
+          </a:xfrm>
+          <a:prstGeom prst="straightConnector1">
+            <a:avLst/>
+          </a:prstGeom>
+          <a:ln w="19050">
+            <a:solidFill>
+              <a:srgbClr val="FF0000"/>
+            </a:solidFill>
+            <a:tailEnd type="triangle"/>
+          </a:ln>
+        </p:spPr>
+        <p:style>
+          <a:lnRef idx="1">
+            <a:schemeClr val="accent1"/>
+          </a:lnRef>
+          <a:fillRef idx="0">
+            <a:schemeClr val="accent1"/>
+          </a:fillRef>
+          <a:effectRef idx="0">
+            <a:schemeClr val="accent1"/>
+          </a:effectRef>
+          <a:fontRef idx="minor">
+            <a:schemeClr val="tx1"/>
+          </a:fontRef>
+        </p:style>
+      </p:cxnSp>
+      <p:cxnSp>
+        <p:nvCxnSpPr>
+          <p:cNvPr id="14" name="Straight Arrow Connector 13"/>
+          <p:cNvCxnSpPr>
+            <a:stCxn id="3" idx="0"/>
+            <a:endCxn id="2" idx="2"/>
+          </p:cNvCxnSpPr>
+          <p:nvPr/>
+        </p:nvCxnSpPr>
+        <p:spPr>
+          <a:xfrm flipH="1" flipV="1">
+            <a:off x="7024687" y="1400175"/>
+            <a:ext cx="1143000" cy="474890"/>
+          </a:xfrm>
+          <a:prstGeom prst="straightConnector1">
+            <a:avLst/>
+          </a:prstGeom>
+          <a:ln w="19050">
+            <a:tailEnd type="triangle"/>
+          </a:ln>
+        </p:spPr>
+        <p:style>
+          <a:lnRef idx="1">
+            <a:schemeClr val="accent1"/>
+          </a:lnRef>
+          <a:fillRef idx="0">
+            <a:schemeClr val="accent1"/>
+          </a:fillRef>
+          <a:effectRef idx="0">
+            <a:schemeClr val="accent1"/>
+          </a:effectRef>
+          <a:fontRef idx="minor">
+            <a:schemeClr val="tx1"/>
+          </a:fontRef>
+        </p:style>
+      </p:cxnSp>
+      <p:cxnSp>
+        <p:nvCxnSpPr>
+          <p:cNvPr id="18" name="Straight Arrow Connector 17"/>
+          <p:cNvCxnSpPr>
+            <a:stCxn id="11" idx="0"/>
+            <a:endCxn id="3" idx="2"/>
+          </p:cNvCxnSpPr>
+          <p:nvPr/>
+        </p:nvCxnSpPr>
+        <p:spPr>
+          <a:xfrm flipV="1">
+            <a:off x="7186612" y="2921333"/>
+            <a:ext cx="981075" cy="340866"/>
+          </a:xfrm>
+          <a:prstGeom prst="straightConnector1">
+            <a:avLst/>
+          </a:prstGeom>
+          <a:ln w="19050">
+            <a:tailEnd type="triangle"/>
+          </a:ln>
+        </p:spPr>
+        <p:style>
+          <a:lnRef idx="1">
+            <a:schemeClr val="accent1"/>
+          </a:lnRef>
+          <a:fillRef idx="0">
+            <a:schemeClr val="accent1"/>
+          </a:fillRef>
+          <a:effectRef idx="0">
+            <a:schemeClr val="accent1"/>
+          </a:effectRef>
+          <a:fontRef idx="minor">
+            <a:schemeClr val="tx1"/>
+          </a:fontRef>
+        </p:style>
+      </p:cxnSp>
+      <p:cxnSp>
+        <p:nvCxnSpPr>
+          <p:cNvPr id="20" name="Straight Arrow Connector 19"/>
+          <p:cNvCxnSpPr>
+            <a:stCxn id="11" idx="0"/>
+            <a:endCxn id="9" idx="2"/>
+          </p:cNvCxnSpPr>
+          <p:nvPr/>
+        </p:nvCxnSpPr>
+        <p:spPr>
+          <a:xfrm flipH="1" flipV="1">
+            <a:off x="6043611" y="2901194"/>
+            <a:ext cx="1143001" cy="361005"/>
+          </a:xfrm>
+          <a:prstGeom prst="straightConnector1">
+            <a:avLst/>
+          </a:prstGeom>
+          <a:ln w="19050">
+            <a:solidFill>
+              <a:srgbClr val="FF0000"/>
+            </a:solidFill>
+            <a:tailEnd type="triangle"/>
+          </a:ln>
+        </p:spPr>
+        <p:style>
+          <a:lnRef idx="1">
+            <a:schemeClr val="accent1"/>
+          </a:lnRef>
+          <a:fillRef idx="0">
+            <a:schemeClr val="accent1"/>
+          </a:fillRef>
+          <a:effectRef idx="0">
+            <a:schemeClr val="accent1"/>
+          </a:effectRef>
+          <a:fontRef idx="minor">
+            <a:schemeClr val="tx1"/>
+          </a:fontRef>
+        </p:style>
+      </p:cxnSp>
+      <p:graphicFrame>
+        <p:nvGraphicFramePr>
+          <p:cNvPr id="35" name="Table 34"/>
+          <p:cNvGraphicFramePr>
+            <a:graphicFrameLocks noGrp="1"/>
+          </p:cNvGraphicFramePr>
+          <p:nvPr>
+            <p:extLst>
+              <p:ext uri="{D42A27DB-BD31-4B8C-83A1-F6EECF244321}">
+                <p14:modId xmlns:p14="http://schemas.microsoft.com/office/powerpoint/2010/main" val="2436431707"/>
+              </p:ext>
+            </p:extLst>
+          </p:nvPr>
+        </p:nvGraphicFramePr>
+        <p:xfrm>
+          <a:off x="10027099" y="477732"/>
+          <a:ext cx="981075" cy="1046268"/>
+        </p:xfrm>
+        <a:graphic>
+          <a:graphicData uri="http://schemas.openxmlformats.org/drawingml/2006/table">
+            <a:tbl>
+              <a:tblPr firstRow="1" bandRow="1">
+                <a:tableStyleId>{5C22544A-7EE6-4342-B048-85BDC9FD1C3A}</a:tableStyleId>
+              </a:tblPr>
+              <a:tblGrid>
+                <a:gridCol w="981075">
+                  <a:extLst>
+                    <a:ext uri="{9D8B030D-6E8A-4147-A177-3AD203B41FA5}">
+                      <a16:colId xmlns:a16="http://schemas.microsoft.com/office/drawing/2014/main" val="1642479700"/>
+                    </a:ext>
+                  </a:extLst>
+                </a:gridCol>
+              </a:tblGrid>
+              <a:tr h="348756">
+                <a:tc>
+                  <a:txBody>
+                    <a:bodyPr/>
+                    <a:lstStyle/>
+                    <a:p>
+                      <a:r>
+                        <a:rPr lang="en-US" sz="1200" b="1" dirty="0" smtClean="0"/>
+                        <a:t>Class</a:t>
+                      </a:r>
+                      <a:r>
+                        <a:rPr lang="en-US" sz="1200" b="1" baseline="0" dirty="0" smtClean="0"/>
+                        <a:t> </a:t>
+                      </a:r>
+                      <a:r>
+                        <a:rPr lang="en-US" sz="1200" b="1" dirty="0" smtClean="0"/>
+                        <a:t>A</a:t>
+                      </a:r>
+                      <a:endParaRPr lang="en-SG" sz="1200" b="1" dirty="0"/>
+                    </a:p>
+                  </a:txBody>
+                  <a:tcPr/>
+                </a:tc>
+                <a:extLst>
+                  <a:ext uri="{0D108BD9-81ED-4DB2-BD59-A6C34878D82A}">
+                    <a16:rowId xmlns:a16="http://schemas.microsoft.com/office/drawing/2014/main" val="6462244"/>
+                  </a:ext>
+                </a:extLst>
+              </a:tr>
+              <a:tr h="348756">
+                <a:tc>
+                  <a:txBody>
+                    <a:bodyPr/>
+                    <a:lstStyle/>
+                    <a:p>
+                      <a:r>
+                        <a:rPr lang="en-US" sz="1200" b="1" dirty="0" err="1" smtClean="0"/>
+                        <a:t>getVal</a:t>
+                      </a:r>
+                      <a:r>
+                        <a:rPr lang="en-US" sz="1200" b="1" dirty="0" smtClean="0"/>
+                        <a:t>()</a:t>
+                      </a:r>
+                      <a:endParaRPr lang="en-SG" sz="1200" b="1" dirty="0"/>
+                    </a:p>
+                  </a:txBody>
+                  <a:tcPr/>
+                </a:tc>
+                <a:extLst>
+                  <a:ext uri="{0D108BD9-81ED-4DB2-BD59-A6C34878D82A}">
+                    <a16:rowId xmlns:a16="http://schemas.microsoft.com/office/drawing/2014/main" val="3668788205"/>
+                  </a:ext>
+                </a:extLst>
+              </a:tr>
+              <a:tr h="348756">
+                <a:tc>
+                  <a:txBody>
+                    <a:bodyPr/>
+                    <a:lstStyle/>
+                    <a:p>
+                      <a:pPr marL="0" marR="0" lvl="0" indent="0" algn="l" defTabSz="914400" rtl="0" eaLnBrk="1" fontAlgn="auto" latinLnBrk="0" hangingPunct="1">
+                        <a:lnSpc>
+                          <a:spcPct val="100000"/>
+                        </a:lnSpc>
+                        <a:spcBef>
+                          <a:spcPts val="0"/>
+                        </a:spcBef>
+                        <a:spcAft>
+                          <a:spcPts val="0"/>
+                        </a:spcAft>
+                        <a:buClrTx/>
+                        <a:buSzTx/>
+                        <a:buFontTx/>
+                        <a:buNone/>
+                        <a:tabLst/>
+                        <a:defRPr/>
+                      </a:pPr>
+                      <a:r>
+                        <a:rPr lang="en-US" sz="1200" b="1" dirty="0" err="1" smtClean="0"/>
+                        <a:t>SetVal</a:t>
+                      </a:r>
+                      <a:r>
+                        <a:rPr lang="en-US" sz="1200" b="1" dirty="0" smtClean="0"/>
+                        <a:t>()</a:t>
+                      </a:r>
+                      <a:endParaRPr lang="en-SG" sz="1200" b="1" dirty="0" smtClean="0"/>
+                    </a:p>
+                  </a:txBody>
+                  <a:tcPr/>
+                </a:tc>
+                <a:extLst>
+                  <a:ext uri="{0D108BD9-81ED-4DB2-BD59-A6C34878D82A}">
+                    <a16:rowId xmlns:a16="http://schemas.microsoft.com/office/drawing/2014/main" val="2345927148"/>
+                  </a:ext>
+                </a:extLst>
+              </a:tr>
+            </a:tbl>
+          </a:graphicData>
+        </a:graphic>
+      </p:graphicFrame>
+      <p:graphicFrame>
+        <p:nvGraphicFramePr>
+          <p:cNvPr id="36" name="Table 35"/>
+          <p:cNvGraphicFramePr>
+            <a:graphicFrameLocks noGrp="1"/>
+          </p:cNvGraphicFramePr>
+          <p:nvPr>
+            <p:extLst>
+              <p:ext uri="{D42A27DB-BD31-4B8C-83A1-F6EECF244321}">
+                <p14:modId xmlns:p14="http://schemas.microsoft.com/office/powerpoint/2010/main" val="3259254173"/>
+              </p:ext>
+            </p:extLst>
+          </p:nvPr>
+        </p:nvGraphicFramePr>
+        <p:xfrm>
+          <a:off x="9046023" y="1978751"/>
+          <a:ext cx="981075" cy="1046268"/>
+        </p:xfrm>
+        <a:graphic>
+          <a:graphicData uri="http://schemas.openxmlformats.org/drawingml/2006/table">
+            <a:tbl>
+              <a:tblPr firstRow="1" bandRow="1">
+                <a:tableStyleId>{5C22544A-7EE6-4342-B048-85BDC9FD1C3A}</a:tableStyleId>
+              </a:tblPr>
+              <a:tblGrid>
+                <a:gridCol w="981075">
+                  <a:extLst>
+                    <a:ext uri="{9D8B030D-6E8A-4147-A177-3AD203B41FA5}">
+                      <a16:colId xmlns:a16="http://schemas.microsoft.com/office/drawing/2014/main" val="1642479700"/>
+                    </a:ext>
+                  </a:extLst>
+                </a:gridCol>
+              </a:tblGrid>
+              <a:tr h="348756">
+                <a:tc>
+                  <a:txBody>
+                    <a:bodyPr/>
+                    <a:lstStyle/>
+                    <a:p>
+                      <a:r>
+                        <a:rPr lang="en-US" sz="1200" b="1" dirty="0" smtClean="0"/>
+                        <a:t>Class B</a:t>
+                      </a:r>
+                      <a:endParaRPr lang="en-SG" sz="1200" b="1" dirty="0"/>
+                    </a:p>
+                  </a:txBody>
+                  <a:tcPr/>
+                </a:tc>
+                <a:extLst>
+                  <a:ext uri="{0D108BD9-81ED-4DB2-BD59-A6C34878D82A}">
+                    <a16:rowId xmlns:a16="http://schemas.microsoft.com/office/drawing/2014/main" val="6462244"/>
+                  </a:ext>
+                </a:extLst>
+              </a:tr>
+              <a:tr h="348756">
+                <a:tc>
+                  <a:txBody>
+                    <a:bodyPr/>
+                    <a:lstStyle/>
+                    <a:p>
+                      <a:r>
+                        <a:rPr lang="en-US" sz="1200" b="1" dirty="0" err="1" smtClean="0">
+                          <a:solidFill>
+                            <a:srgbClr val="FF0000"/>
+                          </a:solidFill>
+                        </a:rPr>
+                        <a:t>getVal</a:t>
+                      </a:r>
+                      <a:r>
+                        <a:rPr lang="en-US" sz="1200" b="1" dirty="0" smtClean="0">
+                          <a:solidFill>
+                            <a:srgbClr val="FF0000"/>
+                          </a:solidFill>
+                        </a:rPr>
+                        <a:t>()</a:t>
+                      </a:r>
+                      <a:endParaRPr lang="en-SG" sz="1200" b="1" dirty="0">
+                        <a:solidFill>
+                          <a:srgbClr val="FF0000"/>
+                        </a:solidFill>
+                      </a:endParaRPr>
+                    </a:p>
+                  </a:txBody>
+                  <a:tcPr/>
+                </a:tc>
+                <a:extLst>
+                  <a:ext uri="{0D108BD9-81ED-4DB2-BD59-A6C34878D82A}">
+                    <a16:rowId xmlns:a16="http://schemas.microsoft.com/office/drawing/2014/main" val="3668788205"/>
+                  </a:ext>
+                </a:extLst>
+              </a:tr>
+              <a:tr h="348756">
+                <a:tc>
+                  <a:txBody>
+                    <a:bodyPr/>
+                    <a:lstStyle/>
+                    <a:p>
+                      <a:pPr marL="0" marR="0" lvl="0" indent="0" algn="l" defTabSz="914400" rtl="0" eaLnBrk="1" fontAlgn="auto" latinLnBrk="0" hangingPunct="1">
+                        <a:lnSpc>
+                          <a:spcPct val="100000"/>
+                        </a:lnSpc>
+                        <a:spcBef>
+                          <a:spcPts val="0"/>
+                        </a:spcBef>
+                        <a:spcAft>
+                          <a:spcPts val="0"/>
+                        </a:spcAft>
+                        <a:buClrTx/>
+                        <a:buSzTx/>
+                        <a:buFontTx/>
+                        <a:buNone/>
+                        <a:tabLst/>
+                        <a:defRPr/>
+                      </a:pPr>
+                      <a:endParaRPr lang="en-SG" sz="1200" b="1" dirty="0" smtClean="0"/>
+                    </a:p>
+                  </a:txBody>
+                  <a:tcPr/>
+                </a:tc>
+                <a:extLst>
+                  <a:ext uri="{0D108BD9-81ED-4DB2-BD59-A6C34878D82A}">
+                    <a16:rowId xmlns:a16="http://schemas.microsoft.com/office/drawing/2014/main" val="2345927148"/>
+                  </a:ext>
+                </a:extLst>
+              </a:tr>
+            </a:tbl>
+          </a:graphicData>
+        </a:graphic>
+      </p:graphicFrame>
+      <p:graphicFrame>
+        <p:nvGraphicFramePr>
+          <p:cNvPr id="37" name="Table 36"/>
+          <p:cNvGraphicFramePr>
+            <a:graphicFrameLocks noGrp="1"/>
+          </p:cNvGraphicFramePr>
+          <p:nvPr>
+            <p:extLst>
+              <p:ext uri="{D42A27DB-BD31-4B8C-83A1-F6EECF244321}">
+                <p14:modId xmlns:p14="http://schemas.microsoft.com/office/powerpoint/2010/main" val="2953922991"/>
+              </p:ext>
+            </p:extLst>
+          </p:nvPr>
+        </p:nvGraphicFramePr>
+        <p:xfrm>
+          <a:off x="11170099" y="1998890"/>
+          <a:ext cx="981075" cy="1046268"/>
+        </p:xfrm>
+        <a:graphic>
+          <a:graphicData uri="http://schemas.openxmlformats.org/drawingml/2006/table">
+            <a:tbl>
+              <a:tblPr firstRow="1" bandRow="1">
+                <a:tableStyleId>{5C22544A-7EE6-4342-B048-85BDC9FD1C3A}</a:tableStyleId>
+              </a:tblPr>
+              <a:tblGrid>
+                <a:gridCol w="981075">
+                  <a:extLst>
+                    <a:ext uri="{9D8B030D-6E8A-4147-A177-3AD203B41FA5}">
+                      <a16:colId xmlns:a16="http://schemas.microsoft.com/office/drawing/2014/main" val="7596455"/>
+                    </a:ext>
+                  </a:extLst>
+                </a:gridCol>
+              </a:tblGrid>
+              <a:tr h="348756">
+                <a:tc>
+                  <a:txBody>
+                    <a:bodyPr/>
+                    <a:lstStyle/>
+                    <a:p>
+                      <a:r>
+                        <a:rPr lang="en-US" sz="1200" b="1" dirty="0" smtClean="0"/>
+                        <a:t>Class </a:t>
+                      </a:r>
+                      <a:r>
+                        <a:rPr lang="en-US" sz="1200" b="1" dirty="0" smtClean="0"/>
+                        <a:t>C</a:t>
+                      </a:r>
+                      <a:endParaRPr lang="en-SG" sz="1200" b="1" dirty="0"/>
+                    </a:p>
+                  </a:txBody>
+                  <a:tcPr/>
+                </a:tc>
+                <a:extLst>
+                  <a:ext uri="{0D108BD9-81ED-4DB2-BD59-A6C34878D82A}">
+                    <a16:rowId xmlns:a16="http://schemas.microsoft.com/office/drawing/2014/main" val="172362412"/>
+                  </a:ext>
+                </a:extLst>
+              </a:tr>
+              <a:tr h="348756">
+                <a:tc>
+                  <a:txBody>
+                    <a:bodyPr/>
+                    <a:lstStyle/>
+                    <a:p>
+                      <a:r>
+                        <a:rPr lang="en-US" sz="1200" b="1" dirty="0" err="1" smtClean="0"/>
+                        <a:t>getVal</a:t>
+                      </a:r>
+                      <a:r>
+                        <a:rPr lang="en-US" sz="1200" b="1" dirty="0" smtClean="0"/>
+                        <a:t>()</a:t>
+                      </a:r>
+                      <a:endParaRPr lang="en-SG" sz="1200" b="1" dirty="0"/>
+                    </a:p>
+                  </a:txBody>
+                  <a:tcPr/>
+                </a:tc>
+                <a:extLst>
+                  <a:ext uri="{0D108BD9-81ED-4DB2-BD59-A6C34878D82A}">
+                    <a16:rowId xmlns:a16="http://schemas.microsoft.com/office/drawing/2014/main" val="1006087427"/>
+                  </a:ext>
+                </a:extLst>
+              </a:tr>
+              <a:tr h="348756">
+                <a:tc>
+                  <a:txBody>
+                    <a:bodyPr/>
+                    <a:lstStyle/>
+                    <a:p>
+                      <a:pPr marL="0" marR="0" lvl="0" indent="0" algn="l" defTabSz="914400" rtl="0" eaLnBrk="1" fontAlgn="auto" latinLnBrk="0" hangingPunct="1">
+                        <a:lnSpc>
+                          <a:spcPct val="100000"/>
+                        </a:lnSpc>
+                        <a:spcBef>
+                          <a:spcPts val="0"/>
+                        </a:spcBef>
+                        <a:spcAft>
+                          <a:spcPts val="0"/>
+                        </a:spcAft>
+                        <a:buClrTx/>
+                        <a:buSzTx/>
+                        <a:buFontTx/>
+                        <a:buNone/>
+                        <a:tabLst/>
+                        <a:defRPr/>
+                      </a:pPr>
+                      <a:r>
+                        <a:rPr lang="en-US" sz="1200" b="1" dirty="0" err="1" smtClean="0">
+                          <a:solidFill>
+                            <a:srgbClr val="FF0000"/>
+                          </a:solidFill>
+                        </a:rPr>
+                        <a:t>SetVal</a:t>
+                      </a:r>
+                      <a:r>
+                        <a:rPr lang="en-US" sz="1200" b="1" dirty="0" smtClean="0">
+                          <a:solidFill>
+                            <a:srgbClr val="FF0000"/>
+                          </a:solidFill>
+                        </a:rPr>
+                        <a:t>()</a:t>
+                      </a:r>
+                      <a:endParaRPr lang="en-SG" sz="1200" b="1" dirty="0" smtClean="0">
+                        <a:solidFill>
+                          <a:srgbClr val="FF0000"/>
+                        </a:solidFill>
+                      </a:endParaRPr>
+                    </a:p>
+                  </a:txBody>
+                  <a:tcPr/>
+                </a:tc>
+                <a:extLst>
+                  <a:ext uri="{0D108BD9-81ED-4DB2-BD59-A6C34878D82A}">
+                    <a16:rowId xmlns:a16="http://schemas.microsoft.com/office/drawing/2014/main" val="50040475"/>
+                  </a:ext>
+                </a:extLst>
+              </a:tr>
+            </a:tbl>
+          </a:graphicData>
+        </a:graphic>
+      </p:graphicFrame>
+      <p:graphicFrame>
+        <p:nvGraphicFramePr>
+          <p:cNvPr id="38" name="Table 37"/>
+          <p:cNvGraphicFramePr>
+            <a:graphicFrameLocks noGrp="1"/>
+          </p:cNvGraphicFramePr>
+          <p:nvPr>
+            <p:extLst>
+              <p:ext uri="{D42A27DB-BD31-4B8C-83A1-F6EECF244321}">
+                <p14:modId xmlns:p14="http://schemas.microsoft.com/office/powerpoint/2010/main" val="3977768779"/>
+              </p:ext>
+            </p:extLst>
+          </p:nvPr>
+        </p:nvGraphicFramePr>
+        <p:xfrm>
+          <a:off x="10189024" y="3386024"/>
+          <a:ext cx="981075" cy="1046268"/>
+        </p:xfrm>
+        <a:graphic>
+          <a:graphicData uri="http://schemas.openxmlformats.org/drawingml/2006/table">
+            <a:tbl>
+              <a:tblPr firstRow="1" bandRow="1">
+                <a:tableStyleId>{5C22544A-7EE6-4342-B048-85BDC9FD1C3A}</a:tableStyleId>
+              </a:tblPr>
+              <a:tblGrid>
+                <a:gridCol w="981075">
+                  <a:extLst>
+                    <a:ext uri="{9D8B030D-6E8A-4147-A177-3AD203B41FA5}">
+                      <a16:colId xmlns:a16="http://schemas.microsoft.com/office/drawing/2014/main" val="1642479700"/>
+                    </a:ext>
+                  </a:extLst>
+                </a:gridCol>
+              </a:tblGrid>
+              <a:tr h="348756">
+                <a:tc>
+                  <a:txBody>
+                    <a:bodyPr/>
+                    <a:lstStyle/>
+                    <a:p>
+                      <a:r>
+                        <a:rPr lang="en-US" sz="1200" b="1" dirty="0" smtClean="0"/>
+                        <a:t>Class D</a:t>
+                      </a:r>
+                      <a:endParaRPr lang="en-SG" sz="1200" b="1" dirty="0"/>
+                    </a:p>
+                  </a:txBody>
+                  <a:tcPr/>
+                </a:tc>
+                <a:extLst>
+                  <a:ext uri="{0D108BD9-81ED-4DB2-BD59-A6C34878D82A}">
+                    <a16:rowId xmlns:a16="http://schemas.microsoft.com/office/drawing/2014/main" val="6462244"/>
+                  </a:ext>
+                </a:extLst>
+              </a:tr>
+              <a:tr h="348756">
+                <a:tc>
+                  <a:txBody>
+                    <a:bodyPr/>
+                    <a:lstStyle/>
+                    <a:p>
+                      <a:endParaRPr lang="en-SG" sz="1200" b="1" dirty="0"/>
+                    </a:p>
+                  </a:txBody>
+                  <a:tcPr/>
+                </a:tc>
+                <a:extLst>
+                  <a:ext uri="{0D108BD9-81ED-4DB2-BD59-A6C34878D82A}">
+                    <a16:rowId xmlns:a16="http://schemas.microsoft.com/office/drawing/2014/main" val="3668788205"/>
+                  </a:ext>
+                </a:extLst>
+              </a:tr>
+              <a:tr h="348756">
+                <a:tc>
+                  <a:txBody>
+                    <a:bodyPr/>
+                    <a:lstStyle/>
+                    <a:p>
+                      <a:pPr marL="0" marR="0" lvl="0" indent="0" algn="l" defTabSz="914400" rtl="0" eaLnBrk="1" fontAlgn="auto" latinLnBrk="0" hangingPunct="1">
+                        <a:lnSpc>
+                          <a:spcPct val="100000"/>
+                        </a:lnSpc>
+                        <a:spcBef>
+                          <a:spcPts val="0"/>
+                        </a:spcBef>
+                        <a:spcAft>
+                          <a:spcPts val="0"/>
+                        </a:spcAft>
+                        <a:buClrTx/>
+                        <a:buSzTx/>
+                        <a:buFontTx/>
+                        <a:buNone/>
+                        <a:tabLst/>
+                        <a:defRPr/>
+                      </a:pPr>
+                      <a:endParaRPr lang="en-SG" sz="1200" b="1" dirty="0" smtClean="0"/>
+                    </a:p>
+                  </a:txBody>
+                  <a:tcPr/>
+                </a:tc>
+                <a:extLst>
+                  <a:ext uri="{0D108BD9-81ED-4DB2-BD59-A6C34878D82A}">
+                    <a16:rowId xmlns:a16="http://schemas.microsoft.com/office/drawing/2014/main" val="2345927148"/>
+                  </a:ext>
+                </a:extLst>
+              </a:tr>
+            </a:tbl>
+          </a:graphicData>
+        </a:graphic>
+      </p:graphicFrame>
+      <p:cxnSp>
+        <p:nvCxnSpPr>
+          <p:cNvPr id="39" name="Straight Arrow Connector 38"/>
+          <p:cNvCxnSpPr>
+            <a:stCxn id="36" idx="0"/>
+            <a:endCxn id="35" idx="2"/>
+          </p:cNvCxnSpPr>
+          <p:nvPr/>
+        </p:nvCxnSpPr>
+        <p:spPr>
+          <a:xfrm flipV="1">
+            <a:off x="9536560" y="1524000"/>
+            <a:ext cx="981076" cy="454751"/>
+          </a:xfrm>
+          <a:prstGeom prst="straightConnector1">
+            <a:avLst/>
+          </a:prstGeom>
+          <a:ln w="19050">
+            <a:tailEnd type="triangle"/>
+          </a:ln>
+        </p:spPr>
+        <p:style>
+          <a:lnRef idx="1">
+            <a:schemeClr val="accent1"/>
+          </a:lnRef>
+          <a:fillRef idx="0">
+            <a:schemeClr val="accent1"/>
+          </a:fillRef>
+          <a:effectRef idx="0">
+            <a:schemeClr val="accent1"/>
+          </a:effectRef>
+          <a:fontRef idx="minor">
+            <a:schemeClr val="tx1"/>
+          </a:fontRef>
+        </p:style>
+      </p:cxnSp>
+      <p:cxnSp>
+        <p:nvCxnSpPr>
+          <p:cNvPr id="40" name="Straight Arrow Connector 39"/>
+          <p:cNvCxnSpPr>
+            <a:stCxn id="37" idx="0"/>
+            <a:endCxn id="35" idx="2"/>
+          </p:cNvCxnSpPr>
+          <p:nvPr/>
+        </p:nvCxnSpPr>
+        <p:spPr>
+          <a:xfrm flipH="1" flipV="1">
+            <a:off x="10517636" y="1524000"/>
+            <a:ext cx="1143000" cy="474890"/>
+          </a:xfrm>
+          <a:prstGeom prst="straightConnector1">
+            <a:avLst/>
+          </a:prstGeom>
+          <a:ln w="19050">
+            <a:tailEnd type="triangle"/>
+          </a:ln>
+        </p:spPr>
+        <p:style>
+          <a:lnRef idx="1">
+            <a:schemeClr val="accent1"/>
+          </a:lnRef>
+          <a:fillRef idx="0">
+            <a:schemeClr val="accent1"/>
+          </a:fillRef>
+          <a:effectRef idx="0">
+            <a:schemeClr val="accent1"/>
+          </a:effectRef>
+          <a:fontRef idx="minor">
+            <a:schemeClr val="tx1"/>
+          </a:fontRef>
+        </p:style>
+      </p:cxnSp>
+      <p:cxnSp>
+        <p:nvCxnSpPr>
+          <p:cNvPr id="41" name="Straight Arrow Connector 40"/>
+          <p:cNvCxnSpPr>
+            <a:stCxn id="38" idx="0"/>
+            <a:endCxn id="37" idx="2"/>
+          </p:cNvCxnSpPr>
+          <p:nvPr/>
+        </p:nvCxnSpPr>
+        <p:spPr>
+          <a:xfrm flipV="1">
+            <a:off x="10679561" y="3045158"/>
+            <a:ext cx="981075" cy="340866"/>
+          </a:xfrm>
+          <a:prstGeom prst="straightConnector1">
+            <a:avLst/>
+          </a:prstGeom>
+          <a:ln w="19050">
+            <a:solidFill>
+              <a:srgbClr val="FF0000"/>
+            </a:solidFill>
+            <a:tailEnd type="triangle"/>
+          </a:ln>
+        </p:spPr>
+        <p:style>
+          <a:lnRef idx="1">
+            <a:schemeClr val="accent1"/>
+          </a:lnRef>
+          <a:fillRef idx="0">
+            <a:schemeClr val="accent1"/>
+          </a:fillRef>
+          <a:effectRef idx="0">
+            <a:schemeClr val="accent1"/>
+          </a:effectRef>
+          <a:fontRef idx="minor">
+            <a:schemeClr val="tx1"/>
+          </a:fontRef>
+        </p:style>
+      </p:cxnSp>
+      <p:cxnSp>
+        <p:nvCxnSpPr>
+          <p:cNvPr id="42" name="Straight Arrow Connector 41"/>
+          <p:cNvCxnSpPr>
+            <a:stCxn id="38" idx="0"/>
+            <a:endCxn id="36" idx="2"/>
+          </p:cNvCxnSpPr>
+          <p:nvPr/>
+        </p:nvCxnSpPr>
+        <p:spPr>
+          <a:xfrm flipH="1" flipV="1">
+            <a:off x="9536560" y="3025019"/>
+            <a:ext cx="1143001" cy="361005"/>
+          </a:xfrm>
+          <a:prstGeom prst="straightConnector1">
+            <a:avLst/>
+          </a:prstGeom>
+          <a:ln w="19050">
+            <a:solidFill>
+              <a:srgbClr val="FF0000"/>
+            </a:solidFill>
+            <a:tailEnd type="triangle"/>
+          </a:ln>
+        </p:spPr>
+        <p:style>
+          <a:lnRef idx="1">
+            <a:schemeClr val="accent1"/>
+          </a:lnRef>
+          <a:fillRef idx="0">
+            <a:schemeClr val="accent1"/>
+          </a:fillRef>
+          <a:effectRef idx="0">
+            <a:schemeClr val="accent1"/>
+          </a:effectRef>
+          <a:fontRef idx="minor">
+            <a:schemeClr val="tx1"/>
+          </a:fontRef>
+        </p:style>
+      </p:cxnSp>
     </p:spTree>
     <p:extLst>
       <p:ext uri="{BB962C8B-B14F-4D97-AF65-F5344CB8AC3E}">

</xml_diff>

<commit_message>
Added the message transfer diagram
</commit_message>
<xml_diff>
--- a/doc/firmwaresignWF.pptx
+++ b/doc/firmwaresignWF.pptx
@@ -7,6 +7,7 @@
   <p:sldIdLst>
     <p:sldId id="256" r:id="rId2"/>
     <p:sldId id="257" r:id="rId3"/>
+    <p:sldId id="258" r:id="rId4"/>
   </p:sldIdLst>
   <p:sldSz cx="12192000" cy="6858000"/>
   <p:notesSz cx="6858000" cy="9144000"/>
@@ -244,7 +245,7 @@
           <a:p>
             <a:fld id="{168FC4C3-6B25-48E2-93F9-24A255A41CA9}" type="datetimeFigureOut">
               <a:rPr lang="en-SG" smtClean="0"/>
-              <a:t>17/5/2019</a:t>
+              <a:t>21/5/2019</a:t>
             </a:fld>
             <a:endParaRPr lang="en-SG"/>
           </a:p>
@@ -414,7 +415,7 @@
           <a:p>
             <a:fld id="{168FC4C3-6B25-48E2-93F9-24A255A41CA9}" type="datetimeFigureOut">
               <a:rPr lang="en-SG" smtClean="0"/>
-              <a:t>17/5/2019</a:t>
+              <a:t>21/5/2019</a:t>
             </a:fld>
             <a:endParaRPr lang="en-SG"/>
           </a:p>
@@ -594,7 +595,7 @@
           <a:p>
             <a:fld id="{168FC4C3-6B25-48E2-93F9-24A255A41CA9}" type="datetimeFigureOut">
               <a:rPr lang="en-SG" smtClean="0"/>
-              <a:t>17/5/2019</a:t>
+              <a:t>21/5/2019</a:t>
             </a:fld>
             <a:endParaRPr lang="en-SG"/>
           </a:p>
@@ -764,7 +765,7 @@
           <a:p>
             <a:fld id="{168FC4C3-6B25-48E2-93F9-24A255A41CA9}" type="datetimeFigureOut">
               <a:rPr lang="en-SG" smtClean="0"/>
-              <a:t>17/5/2019</a:t>
+              <a:t>21/5/2019</a:t>
             </a:fld>
             <a:endParaRPr lang="en-SG"/>
           </a:p>
@@ -1010,7 +1011,7 @@
           <a:p>
             <a:fld id="{168FC4C3-6B25-48E2-93F9-24A255A41CA9}" type="datetimeFigureOut">
               <a:rPr lang="en-SG" smtClean="0"/>
-              <a:t>17/5/2019</a:t>
+              <a:t>21/5/2019</a:t>
             </a:fld>
             <a:endParaRPr lang="en-SG"/>
           </a:p>
@@ -1242,7 +1243,7 @@
           <a:p>
             <a:fld id="{168FC4C3-6B25-48E2-93F9-24A255A41CA9}" type="datetimeFigureOut">
               <a:rPr lang="en-SG" smtClean="0"/>
-              <a:t>17/5/2019</a:t>
+              <a:t>21/5/2019</a:t>
             </a:fld>
             <a:endParaRPr lang="en-SG"/>
           </a:p>
@@ -1609,7 +1610,7 @@
           <a:p>
             <a:fld id="{168FC4C3-6B25-48E2-93F9-24A255A41CA9}" type="datetimeFigureOut">
               <a:rPr lang="en-SG" smtClean="0"/>
-              <a:t>17/5/2019</a:t>
+              <a:t>21/5/2019</a:t>
             </a:fld>
             <a:endParaRPr lang="en-SG"/>
           </a:p>
@@ -1727,7 +1728,7 @@
           <a:p>
             <a:fld id="{168FC4C3-6B25-48E2-93F9-24A255A41CA9}" type="datetimeFigureOut">
               <a:rPr lang="en-SG" smtClean="0"/>
-              <a:t>17/5/2019</a:t>
+              <a:t>21/5/2019</a:t>
             </a:fld>
             <a:endParaRPr lang="en-SG"/>
           </a:p>
@@ -1822,7 +1823,7 @@
           <a:p>
             <a:fld id="{168FC4C3-6B25-48E2-93F9-24A255A41CA9}" type="datetimeFigureOut">
               <a:rPr lang="en-SG" smtClean="0"/>
-              <a:t>17/5/2019</a:t>
+              <a:t>21/5/2019</a:t>
             </a:fld>
             <a:endParaRPr lang="en-SG"/>
           </a:p>
@@ -2099,7 +2100,7 @@
           <a:p>
             <a:fld id="{168FC4C3-6B25-48E2-93F9-24A255A41CA9}" type="datetimeFigureOut">
               <a:rPr lang="en-SG" smtClean="0"/>
-              <a:t>17/5/2019</a:t>
+              <a:t>21/5/2019</a:t>
             </a:fld>
             <a:endParaRPr lang="en-SG"/>
           </a:p>
@@ -2352,7 +2353,7 @@
           <a:p>
             <a:fld id="{168FC4C3-6B25-48E2-93F9-24A255A41CA9}" type="datetimeFigureOut">
               <a:rPr lang="en-SG" smtClean="0"/>
-              <a:t>17/5/2019</a:t>
+              <a:t>21/5/2019</a:t>
             </a:fld>
             <a:endParaRPr lang="en-SG"/>
           </a:p>
@@ -2565,7 +2566,7 @@
           <a:p>
             <a:fld id="{168FC4C3-6B25-48E2-93F9-24A255A41CA9}" type="datetimeFigureOut">
               <a:rPr lang="en-SG" smtClean="0"/>
-              <a:t>17/5/2019</a:t>
+              <a:t>21/5/2019</a:t>
             </a:fld>
             <a:endParaRPr lang="en-SG"/>
           </a:p>
@@ -3154,31 +3155,7 @@
             </a:r>
             <a:r>
               <a:rPr lang="en-US" sz="1100" b="1" dirty="0" smtClean="0"/>
-              <a:t>: </a:t>
-            </a:r>
-            <a:r>
-              <a:rPr lang="en-US" sz="1100" b="1" dirty="0" smtClean="0"/>
-              <a:t>SSL </a:t>
-            </a:r>
-            <a:r>
-              <a:rPr lang="en-US" sz="1100" b="1" dirty="0" smtClean="0"/>
-              <a:t>server[5005](</a:t>
-            </a:r>
-            <a:r>
-              <a:rPr lang="en-US" sz="1100" b="1" dirty="0" smtClean="0"/>
-              <a:t>Load CA</a:t>
-            </a:r>
-            <a:r>
-              <a:rPr lang="en-US" sz="1100" b="1" dirty="0" smtClean="0"/>
-              <a:t>, cert</a:t>
-            </a:r>
-            <a:r>
-              <a:rPr lang="en-US" sz="1100" b="1" dirty="0" smtClean="0"/>
-              <a:t>, key), load </a:t>
-            </a:r>
-            <a:r>
-              <a:rPr lang="en-US" sz="1100" b="1" dirty="0" smtClean="0"/>
-              <a:t>sign key. </a:t>
+              <a:t>: SSL server[5005](Load CA, cert, key), load sign key. </a:t>
             </a:r>
             <a:r>
               <a:rPr lang="en-US" sz="1100" b="1" dirty="0" err="1" smtClean="0"/>
@@ -3319,19 +3296,7 @@
             </a:r>
             <a:r>
               <a:rPr lang="en-US" sz="1100" b="1" dirty="0" smtClean="0"/>
-              <a:t> : UI, SSL </a:t>
-            </a:r>
-            <a:r>
-              <a:rPr lang="en-US" sz="1100" b="1" dirty="0" smtClean="0"/>
-              <a:t>client[5005](</a:t>
-            </a:r>
-            <a:r>
-              <a:rPr lang="en-US" sz="1100" b="1" dirty="0" smtClean="0"/>
-              <a:t>load CA cert, key), SWATT calculator</a:t>
-            </a:r>
-            <a:r>
-              <a:rPr lang="en-US" sz="1100" b="1" dirty="0" smtClean="0"/>
-              <a:t>, [RSA </a:t>
+              <a:t> : UI, SSL client[5005](load CA cert, key), SWATT calculator, [RSA </a:t>
             </a:r>
             <a:r>
               <a:rPr lang="en-US" sz="1100" b="1" dirty="0" err="1" smtClean="0"/>
@@ -3345,7 +3310,6 @@
               <a:rPr lang="en-US" sz="1100" b="1" dirty="0" smtClean="0"/>
               <a:t>  </a:t>
             </a:r>
-            <a:endParaRPr lang="en-US" sz="1100" b="1" dirty="0" smtClean="0"/>
           </a:p>
         </p:txBody>
       </p:sp>
@@ -3496,23 +3460,7 @@
                   <a:schemeClr val="tx1"/>
                 </a:solidFill>
               </a:rPr>
-              <a:t>Select </a:t>
-            </a:r>
-            <a:r>
-              <a:rPr lang="en-US" sz="900" dirty="0" smtClean="0">
-                <a:solidFill>
-                  <a:schemeClr val="tx1"/>
-                </a:solidFill>
-              </a:rPr>
-              <a:t>server and try to </a:t>
-            </a:r>
-            <a:r>
-              <a:rPr lang="en-US" sz="900" dirty="0" smtClean="0">
-                <a:solidFill>
-                  <a:schemeClr val="tx1"/>
-                </a:solidFill>
-              </a:rPr>
-              <a:t>connect</a:t>
+              <a:t>Select server and try to connect</a:t>
             </a:r>
             <a:endParaRPr lang="en-SG" sz="900" dirty="0">
               <a:solidFill>
@@ -3631,23 +3579,7 @@
                   <a:schemeClr val="tx1"/>
                 </a:solidFill>
               </a:rPr>
-              <a:t>Active </a:t>
-            </a:r>
-            <a:r>
-              <a:rPr lang="en-US" sz="900" dirty="0" smtClean="0">
-                <a:solidFill>
-                  <a:schemeClr val="tx1"/>
-                </a:solidFill>
-              </a:rPr>
-              <a:t>login </a:t>
-            </a:r>
-            <a:r>
-              <a:rPr lang="en-US" sz="900" dirty="0" smtClean="0">
-                <a:solidFill>
-                  <a:schemeClr val="tx1"/>
-                </a:solidFill>
-              </a:rPr>
-              <a:t>area in UI =&gt; User type in </a:t>
+              <a:t>Active login area in UI =&gt; User type in </a:t>
             </a:r>
             <a:endParaRPr lang="en-SG" sz="900" dirty="0">
               <a:solidFill>
@@ -3857,11 +3789,7 @@
           <a:p>
             <a:r>
               <a:rPr lang="en-US" sz="1100" b="1" dirty="0" smtClean="0"/>
-              <a:t>Check </a:t>
-            </a:r>
-            <a:r>
-              <a:rPr lang="en-US" sz="1100" b="1" dirty="0" smtClean="0"/>
-              <a:t>user [DB]</a:t>
+              <a:t>Check user [DB]</a:t>
             </a:r>
             <a:endParaRPr lang="en-SG" sz="1100" b="1" dirty="0"/>
           </a:p>
@@ -3976,15 +3904,7 @@
                   <a:schemeClr val="tx1"/>
                 </a:solidFill>
               </a:rPr>
-              <a:t>Verify server </a:t>
-            </a:r>
-            <a:r>
-              <a:rPr lang="en-US" sz="900" dirty="0" smtClean="0">
-                <a:solidFill>
-                  <a:schemeClr val="tx1"/>
-                </a:solidFill>
-              </a:rPr>
-              <a:t>and fetch user password</a:t>
+              <a:t>Verify server and fetch user password</a:t>
             </a:r>
             <a:endParaRPr lang="en-SG" sz="900" dirty="0">
               <a:solidFill>
@@ -4101,11 +4021,7 @@
           <a:p>
             <a:r>
               <a:rPr lang="en-US" sz="1100" b="1" dirty="0" smtClean="0"/>
-              <a:t>Verify client, authorize </a:t>
-            </a:r>
-            <a:r>
-              <a:rPr lang="en-US" sz="1100" b="1" dirty="0" smtClean="0"/>
-              <a:t>user +password [DB]</a:t>
+              <a:t>Verify client, authorize user +password [DB]</a:t>
             </a:r>
             <a:endParaRPr lang="en-SG" sz="1100" b="1" dirty="0"/>
           </a:p>
@@ -5465,11 +5381,7 @@
             </a:r>
             <a:r>
               <a:rPr lang="en-US" sz="1100" b="1" dirty="0" smtClean="0"/>
-              <a:t>: </a:t>
-            </a:r>
-            <a:r>
-              <a:rPr lang="en-US" sz="1100" b="1" dirty="0" smtClean="0"/>
-              <a:t>Sensor </a:t>
+              <a:t>: Sensor </a:t>
             </a:r>
             <a:r>
               <a:rPr lang="en-US" sz="1100" b="1" dirty="0"/>
@@ -5493,11 +5405,7 @@
             </a:r>
             <a:r>
               <a:rPr lang="en-US" sz="1100" b="1" dirty="0" smtClean="0"/>
-              <a:t> </a:t>
-            </a:r>
-            <a:r>
-              <a:rPr lang="en-US" sz="1100" b="1" dirty="0" smtClean="0"/>
-              <a:t>manager.  </a:t>
+              <a:t> manager.  </a:t>
             </a:r>
             <a:endParaRPr lang="en-SG" sz="1100" b="1" dirty="0"/>
           </a:p>
@@ -5545,19 +5453,7 @@
             </a:r>
             <a:r>
               <a:rPr lang="en-US" sz="1100" b="1" dirty="0" smtClean="0"/>
-              <a:t>: </a:t>
-            </a:r>
-            <a:r>
-              <a:rPr lang="en-US" sz="1100" b="1" dirty="0" smtClean="0"/>
-              <a:t>S</a:t>
-            </a:r>
-            <a:r>
-              <a:rPr lang="en-US" sz="1100" b="1" dirty="0" smtClean="0"/>
-              <a:t>ensor </a:t>
-            </a:r>
-            <a:r>
-              <a:rPr lang="en-US" sz="1100" b="1" dirty="0" smtClean="0"/>
-              <a:t>registration server thread</a:t>
+              <a:t>: Sensor registration server thread</a:t>
             </a:r>
             <a:r>
               <a:rPr lang="en-US" sz="1100" b="1" dirty="0"/>
@@ -5671,19 +5567,7 @@
           <a:p>
             <a:r>
               <a:rPr lang="en-US" sz="1000" b="1" dirty="0" smtClean="0"/>
-              <a:t>Start SSL </a:t>
-            </a:r>
-            <a:r>
-              <a:rPr lang="en-US" sz="1000" b="1" dirty="0" smtClean="0"/>
-              <a:t>server (</a:t>
-            </a:r>
-            <a:r>
-              <a:rPr lang="en-US" sz="1000" b="1" dirty="0" smtClean="0"/>
-              <a:t>5006) wait for </a:t>
-            </a:r>
-            <a:r>
-              <a:rPr lang="en-US" sz="1000" b="1" dirty="0" smtClean="0"/>
-              <a:t>sensor connection</a:t>
+              <a:t>Start SSL server (5006) wait for sensor connection</a:t>
             </a:r>
             <a:endParaRPr lang="en-SG" sz="1000" b="1" dirty="0"/>
           </a:p>
@@ -5796,15 +5680,7 @@
           <a:p>
             <a:r>
               <a:rPr lang="en-US" sz="1100" b="1" dirty="0" smtClean="0"/>
-              <a:t>Connected to sensor </a:t>
-            </a:r>
-            <a:r>
-              <a:rPr lang="en-US" sz="1100" b="1" dirty="0" smtClean="0"/>
-              <a:t>and fetch </a:t>
-            </a:r>
-            <a:r>
-              <a:rPr lang="en-US" sz="1100" b="1" dirty="0" smtClean="0"/>
-              <a:t>registration info(id, type, version, signature)</a:t>
+              <a:t>Connected to sensor and fetch registration info(id, type, version, signature)</a:t>
             </a:r>
             <a:endParaRPr lang="en-SG" sz="1100" b="1" dirty="0"/>
           </a:p>
@@ -6005,15 +5881,7 @@
                   <a:schemeClr val="tx1"/>
                 </a:solidFill>
               </a:rPr>
-              <a:t>Select sever and </a:t>
-            </a:r>
-            <a:r>
-              <a:rPr lang="en-US" sz="900" dirty="0" smtClean="0">
-                <a:solidFill>
-                  <a:schemeClr val="tx1"/>
-                </a:solidFill>
-              </a:rPr>
-              <a:t>try to connect</a:t>
+              <a:t>Select sever and try to connect</a:t>
             </a:r>
             <a:endParaRPr lang="en-SG" sz="900" dirty="0">
               <a:solidFill>
@@ -6131,15 +5999,7 @@
                   <a:schemeClr val="tx1"/>
                 </a:solidFill>
               </a:rPr>
-              <a:t>Generate registration </a:t>
-            </a:r>
-            <a:r>
-              <a:rPr lang="en-US" sz="900" dirty="0" smtClean="0">
-                <a:solidFill>
-                  <a:schemeClr val="tx1"/>
-                </a:solidFill>
-              </a:rPr>
-              <a:t>message </a:t>
+              <a:t>Generate registration message </a:t>
             </a:r>
             <a:endParaRPr lang="en-SG" sz="900" dirty="0">
               <a:solidFill>
@@ -6957,15 +6817,7 @@
           <a:p>
             <a:r>
               <a:rPr lang="en-US" sz="900" dirty="0" smtClean="0"/>
-              <a:t># Message </a:t>
-            </a:r>
-            <a:r>
-              <a:rPr lang="en-US" sz="900" dirty="0" smtClean="0"/>
-              <a:t>sample</a:t>
-            </a:r>
-            <a:r>
-              <a:rPr lang="en-US" sz="900" dirty="0" smtClean="0"/>
-              <a:t>: </a:t>
+              <a:t># Message sample: </a:t>
             </a:r>
             <a:r>
               <a:rPr lang="en-SG" sz="900" dirty="0" smtClean="0"/>
@@ -11034,6 +10886,1703 @@
 </p:sld>
 </file>
 
+<file path=ppt/slides/slide3.xml><?xml version="1.0" encoding="utf-8"?>
+<p:sld xmlns:a="http://schemas.openxmlformats.org/drawingml/2006/main" xmlns:r="http://schemas.openxmlformats.org/officeDocument/2006/relationships" xmlns:p="http://schemas.openxmlformats.org/presentationml/2006/main">
+  <p:cSld>
+    <p:spTree>
+      <p:nvGrpSpPr>
+        <p:cNvPr id="1" name=""/>
+        <p:cNvGrpSpPr/>
+        <p:nvPr/>
+      </p:nvGrpSpPr>
+      <p:grpSpPr>
+        <a:xfrm>
+          <a:off x="0" y="0"/>
+          <a:ext cx="0" cy="0"/>
+          <a:chOff x="0" y="0"/>
+          <a:chExt cx="0" cy="0"/>
+        </a:xfrm>
+      </p:grpSpPr>
+      <p:sp>
+        <p:nvSpPr>
+          <p:cNvPr id="14" name="TextBox 13"/>
+          <p:cNvSpPr txBox="1"/>
+          <p:nvPr/>
+        </p:nvSpPr>
+        <p:spPr>
+          <a:xfrm>
+            <a:off x="635977" y="646993"/>
+            <a:ext cx="2176100" cy="276999"/>
+          </a:xfrm>
+          <a:prstGeom prst="rect">
+            <a:avLst/>
+          </a:prstGeom>
+          <a:noFill/>
+          <a:ln w="19050">
+            <a:noFill/>
+          </a:ln>
+        </p:spPr>
+        <p:txBody>
+          <a:bodyPr wrap="square" rtlCol="0">
+            <a:spAutoFit/>
+          </a:bodyPr>
+          <a:lstStyle/>
+          <a:p>
+            <a:r>
+              <a:rPr lang="en-US" sz="1200" dirty="0" smtClean="0"/>
+              <a:t>Sign Client  [exeSign.bat]</a:t>
+            </a:r>
+            <a:endParaRPr lang="en-SG" sz="1200" dirty="0"/>
+          </a:p>
+        </p:txBody>
+      </p:sp>
+      <p:sp>
+        <p:nvSpPr>
+          <p:cNvPr id="15" name="TextBox 14"/>
+          <p:cNvSpPr txBox="1"/>
+          <p:nvPr/>
+        </p:nvSpPr>
+        <p:spPr>
+          <a:xfrm>
+            <a:off x="712176" y="1019908"/>
+            <a:ext cx="4572002" cy="261610"/>
+          </a:xfrm>
+          <a:prstGeom prst="rect">
+            <a:avLst/>
+          </a:prstGeom>
+          <a:ln w="19050"/>
+        </p:spPr>
+        <p:style>
+          <a:lnRef idx="2">
+            <a:schemeClr val="accent1"/>
+          </a:lnRef>
+          <a:fillRef idx="1">
+            <a:schemeClr val="lt1"/>
+          </a:fillRef>
+          <a:effectRef idx="0">
+            <a:schemeClr val="accent1"/>
+          </a:effectRef>
+          <a:fontRef idx="minor">
+            <a:schemeClr val="dk1"/>
+          </a:fontRef>
+        </p:style>
+        <p:txBody>
+          <a:bodyPr wrap="square" rtlCol="0">
+            <a:spAutoFit/>
+          </a:bodyPr>
+          <a:lstStyle/>
+          <a:p>
+            <a:r>
+              <a:rPr lang="en-SG" sz="1100" b="1" dirty="0" err="1" smtClean="0"/>
+              <a:t>sensor_id</a:t>
+            </a:r>
+            <a:r>
+              <a:rPr lang="en-SG" sz="1100" b="1" dirty="0"/>
+              <a:t> </a:t>
+            </a:r>
+            <a:r>
+              <a:rPr lang="en-SG" sz="1100" dirty="0" smtClean="0"/>
+              <a:t>+ </a:t>
+            </a:r>
+            <a:r>
+              <a:rPr lang="en-SG" sz="1100" b="1" dirty="0" smtClean="0"/>
+              <a:t> </a:t>
+            </a:r>
+            <a:r>
+              <a:rPr lang="en-SG" sz="1100" b="1" dirty="0" err="1" smtClean="0"/>
+              <a:t>signer_id</a:t>
+            </a:r>
+            <a:r>
+              <a:rPr lang="en-SG" sz="1100" dirty="0" smtClean="0"/>
+              <a:t> + </a:t>
+            </a:r>
+            <a:r>
+              <a:rPr lang="en-SG" sz="1100" b="1" dirty="0" err="1" smtClean="0"/>
+              <a:t>swatt_str</a:t>
+            </a:r>
+            <a:r>
+              <a:rPr lang="en-SG" sz="1100" b="1" dirty="0" smtClean="0"/>
+              <a:t> </a:t>
+            </a:r>
+            <a:r>
+              <a:rPr lang="en-SG" sz="1100" dirty="0" smtClean="0"/>
+              <a:t>+</a:t>
+            </a:r>
+            <a:r>
+              <a:rPr lang="en-SG" sz="1100" b="1" dirty="0" smtClean="0"/>
+              <a:t> </a:t>
+            </a:r>
+            <a:r>
+              <a:rPr lang="en-SG" sz="1100" b="1" dirty="0" err="1" smtClean="0"/>
+              <a:t>time_str</a:t>
+            </a:r>
+            <a:r>
+              <a:rPr lang="en-SG" sz="1100" b="1" dirty="0" smtClean="0"/>
+              <a:t> </a:t>
+            </a:r>
+            <a:r>
+              <a:rPr lang="en-SG" sz="1100" dirty="0" smtClean="0"/>
+              <a:t>+ </a:t>
+            </a:r>
+            <a:r>
+              <a:rPr lang="en-SG" sz="1100" b="1" dirty="0" err="1" smtClean="0"/>
+              <a:t>sensor_type</a:t>
+            </a:r>
+            <a:r>
+              <a:rPr lang="en-SG" sz="1100" b="1" dirty="0"/>
+              <a:t> </a:t>
+            </a:r>
+            <a:r>
+              <a:rPr lang="en-SG" sz="1100" dirty="0" smtClean="0"/>
+              <a:t>+ </a:t>
+            </a:r>
+            <a:r>
+              <a:rPr lang="en-SG" sz="1100" b="1" dirty="0" smtClean="0"/>
+              <a:t>sensor version</a:t>
+            </a:r>
+            <a:endParaRPr lang="en-SG" sz="1100" b="1" dirty="0"/>
+          </a:p>
+        </p:txBody>
+      </p:sp>
+      <p:sp>
+        <p:nvSpPr>
+          <p:cNvPr id="16" name="Rounded Rectangle 15"/>
+          <p:cNvSpPr/>
+          <p:nvPr/>
+        </p:nvSpPr>
+        <p:spPr>
+          <a:xfrm>
+            <a:off x="1604964" y="1626577"/>
+            <a:ext cx="940042" cy="254977"/>
+          </a:xfrm>
+          <a:prstGeom prst="roundRect">
+            <a:avLst/>
+          </a:prstGeom>
+          <a:ln w="19050"/>
+        </p:spPr>
+        <p:style>
+          <a:lnRef idx="2">
+            <a:schemeClr val="accent1"/>
+          </a:lnRef>
+          <a:fillRef idx="1">
+            <a:schemeClr val="lt1"/>
+          </a:fillRef>
+          <a:effectRef idx="0">
+            <a:schemeClr val="accent1"/>
+          </a:effectRef>
+          <a:fontRef idx="minor">
+            <a:schemeClr val="dk1"/>
+          </a:fontRef>
+        </p:style>
+        <p:txBody>
+          <a:bodyPr rtlCol="0" anchor="ctr"/>
+          <a:lstStyle/>
+          <a:p>
+            <a:pPr algn="ctr"/>
+            <a:r>
+              <a:rPr lang="en-US" sz="1100" b="1" dirty="0" smtClean="0"/>
+              <a:t>Sign</a:t>
+            </a:r>
+            <a:endParaRPr lang="en-SG" sz="1100" b="1" dirty="0"/>
+          </a:p>
+        </p:txBody>
+      </p:sp>
+      <p:cxnSp>
+        <p:nvCxnSpPr>
+          <p:cNvPr id="18" name="Straight Arrow Connector 17"/>
+          <p:cNvCxnSpPr/>
+          <p:nvPr/>
+        </p:nvCxnSpPr>
+        <p:spPr>
+          <a:xfrm>
+            <a:off x="2066192" y="1281518"/>
+            <a:ext cx="8793" cy="318682"/>
+          </a:xfrm>
+          <a:prstGeom prst="straightConnector1">
+            <a:avLst/>
+          </a:prstGeom>
+          <a:ln w="12700">
+            <a:tailEnd type="triangle"/>
+          </a:ln>
+        </p:spPr>
+        <p:style>
+          <a:lnRef idx="1">
+            <a:schemeClr val="accent1"/>
+          </a:lnRef>
+          <a:fillRef idx="0">
+            <a:schemeClr val="accent1"/>
+          </a:fillRef>
+          <a:effectRef idx="0">
+            <a:schemeClr val="accent1"/>
+          </a:effectRef>
+          <a:fontRef idx="minor">
+            <a:schemeClr val="tx1"/>
+          </a:fontRef>
+        </p:style>
+      </p:cxnSp>
+      <p:cxnSp>
+        <p:nvCxnSpPr>
+          <p:cNvPr id="20" name="Straight Arrow Connector 19"/>
+          <p:cNvCxnSpPr/>
+          <p:nvPr/>
+        </p:nvCxnSpPr>
+        <p:spPr>
+          <a:xfrm flipH="1" flipV="1">
+            <a:off x="2545006" y="1745505"/>
+            <a:ext cx="815696" cy="6594"/>
+          </a:xfrm>
+          <a:prstGeom prst="straightConnector1">
+            <a:avLst/>
+          </a:prstGeom>
+          <a:ln>
+            <a:tailEnd type="triangle"/>
+          </a:ln>
+        </p:spPr>
+        <p:style>
+          <a:lnRef idx="1">
+            <a:schemeClr val="accent1"/>
+          </a:lnRef>
+          <a:fillRef idx="0">
+            <a:schemeClr val="accent1"/>
+          </a:fillRef>
+          <a:effectRef idx="0">
+            <a:schemeClr val="accent1"/>
+          </a:effectRef>
+          <a:fontRef idx="minor">
+            <a:schemeClr val="tx1"/>
+          </a:fontRef>
+        </p:style>
+      </p:cxnSp>
+      <p:sp>
+        <p:nvSpPr>
+          <p:cNvPr id="25" name="Folded Corner 24"/>
+          <p:cNvSpPr/>
+          <p:nvPr/>
+        </p:nvSpPr>
+        <p:spPr>
+          <a:xfrm>
+            <a:off x="3360702" y="1600201"/>
+            <a:ext cx="768845" cy="281354"/>
+          </a:xfrm>
+          <a:prstGeom prst="foldedCorner">
+            <a:avLst/>
+          </a:prstGeom>
+        </p:spPr>
+        <p:style>
+          <a:lnRef idx="2">
+            <a:schemeClr val="accent1"/>
+          </a:lnRef>
+          <a:fillRef idx="1">
+            <a:schemeClr val="lt1"/>
+          </a:fillRef>
+          <a:effectRef idx="0">
+            <a:schemeClr val="accent1"/>
+          </a:effectRef>
+          <a:fontRef idx="minor">
+            <a:schemeClr val="dk1"/>
+          </a:fontRef>
+        </p:style>
+        <p:txBody>
+          <a:bodyPr rtlCol="0" anchor="ctr"/>
+          <a:lstStyle/>
+          <a:p>
+            <a:pPr algn="ctr"/>
+            <a:r>
+              <a:rPr lang="en-US" sz="800" dirty="0" smtClean="0"/>
+              <a:t>Client private Key[SSL]</a:t>
+            </a:r>
+            <a:endParaRPr lang="en-SG" sz="800" dirty="0"/>
+          </a:p>
+        </p:txBody>
+      </p:sp>
+      <p:cxnSp>
+        <p:nvCxnSpPr>
+          <p:cNvPr id="27" name="Straight Arrow Connector 26"/>
+          <p:cNvCxnSpPr/>
+          <p:nvPr/>
+        </p:nvCxnSpPr>
+        <p:spPr>
+          <a:xfrm>
+            <a:off x="2074985" y="1893183"/>
+            <a:ext cx="8793" cy="318682"/>
+          </a:xfrm>
+          <a:prstGeom prst="straightConnector1">
+            <a:avLst/>
+          </a:prstGeom>
+          <a:ln w="12700">
+            <a:tailEnd type="triangle"/>
+          </a:ln>
+        </p:spPr>
+        <p:style>
+          <a:lnRef idx="1">
+            <a:schemeClr val="accent1"/>
+          </a:lnRef>
+          <a:fillRef idx="0">
+            <a:schemeClr val="accent1"/>
+          </a:fillRef>
+          <a:effectRef idx="0">
+            <a:schemeClr val="accent1"/>
+          </a:effectRef>
+          <a:fontRef idx="minor">
+            <a:schemeClr val="tx1"/>
+          </a:fontRef>
+        </p:style>
+      </p:cxnSp>
+      <p:sp>
+        <p:nvSpPr>
+          <p:cNvPr id="28" name="TextBox 27"/>
+          <p:cNvSpPr txBox="1"/>
+          <p:nvPr/>
+        </p:nvSpPr>
+        <p:spPr>
+          <a:xfrm>
+            <a:off x="1498428" y="2223494"/>
+            <a:ext cx="1170700" cy="261610"/>
+          </a:xfrm>
+          <a:prstGeom prst="rect">
+            <a:avLst/>
+          </a:prstGeom>
+          <a:ln w="19050"/>
+        </p:spPr>
+        <p:style>
+          <a:lnRef idx="2">
+            <a:schemeClr val="accent1"/>
+          </a:lnRef>
+          <a:fillRef idx="1">
+            <a:schemeClr val="lt1"/>
+          </a:fillRef>
+          <a:effectRef idx="0">
+            <a:schemeClr val="accent1"/>
+          </a:effectRef>
+          <a:fontRef idx="minor">
+            <a:schemeClr val="dk1"/>
+          </a:fontRef>
+        </p:style>
+        <p:txBody>
+          <a:bodyPr wrap="square" rtlCol="0">
+            <a:spAutoFit/>
+          </a:bodyPr>
+          <a:lstStyle/>
+          <a:p>
+            <a:r>
+              <a:rPr lang="en-US" sz="1100" b="1" dirty="0" smtClean="0"/>
+              <a:t>Client signature</a:t>
+            </a:r>
+            <a:endParaRPr lang="en-SG" sz="1100" b="1" dirty="0"/>
+          </a:p>
+        </p:txBody>
+      </p:sp>
+      <p:cxnSp>
+        <p:nvCxnSpPr>
+          <p:cNvPr id="29" name="Straight Arrow Connector 28"/>
+          <p:cNvCxnSpPr/>
+          <p:nvPr/>
+        </p:nvCxnSpPr>
+        <p:spPr>
+          <a:xfrm>
+            <a:off x="948839" y="1281518"/>
+            <a:ext cx="2432" cy="930347"/>
+          </a:xfrm>
+          <a:prstGeom prst="straightConnector1">
+            <a:avLst/>
+          </a:prstGeom>
+          <a:ln w="12700">
+            <a:tailEnd type="triangle"/>
+          </a:ln>
+        </p:spPr>
+        <p:style>
+          <a:lnRef idx="1">
+            <a:schemeClr val="accent1"/>
+          </a:lnRef>
+          <a:fillRef idx="0">
+            <a:schemeClr val="accent1"/>
+          </a:fillRef>
+          <a:effectRef idx="0">
+            <a:schemeClr val="accent1"/>
+          </a:effectRef>
+          <a:fontRef idx="minor">
+            <a:schemeClr val="tx1"/>
+          </a:fontRef>
+        </p:style>
+      </p:cxnSp>
+      <p:sp>
+        <p:nvSpPr>
+          <p:cNvPr id="32" name="Rectangle 31"/>
+          <p:cNvSpPr/>
+          <p:nvPr/>
+        </p:nvSpPr>
+        <p:spPr>
+          <a:xfrm>
+            <a:off x="611470" y="2223494"/>
+            <a:ext cx="779867" cy="261610"/>
+          </a:xfrm>
+          <a:prstGeom prst="rect">
+            <a:avLst/>
+          </a:prstGeom>
+          <a:ln w="19050"/>
+        </p:spPr>
+        <p:style>
+          <a:lnRef idx="2">
+            <a:schemeClr val="accent1"/>
+          </a:lnRef>
+          <a:fillRef idx="1">
+            <a:schemeClr val="lt1"/>
+          </a:fillRef>
+          <a:effectRef idx="0">
+            <a:schemeClr val="accent1"/>
+          </a:effectRef>
+          <a:fontRef idx="minor">
+            <a:schemeClr val="dk1"/>
+          </a:fontRef>
+        </p:style>
+        <p:txBody>
+          <a:bodyPr rtlCol="0" anchor="ctr"/>
+          <a:lstStyle/>
+          <a:p>
+            <a:pPr algn="ctr"/>
+            <a:r>
+              <a:rPr lang="en-US" sz="1000" b="1" dirty="0" smtClean="0"/>
+              <a:t>Sensor info</a:t>
+            </a:r>
+            <a:endParaRPr lang="en-SG" sz="1000" b="1" dirty="0"/>
+          </a:p>
+        </p:txBody>
+      </p:sp>
+      <p:sp>
+        <p:nvSpPr>
+          <p:cNvPr id="34" name="Rectangle 33"/>
+          <p:cNvSpPr/>
+          <p:nvPr/>
+        </p:nvSpPr>
+        <p:spPr>
+          <a:xfrm>
+            <a:off x="545690" y="2123768"/>
+            <a:ext cx="2337620" cy="464574"/>
+          </a:xfrm>
+          <a:prstGeom prst="rect">
+            <a:avLst/>
+          </a:prstGeom>
+          <a:noFill/>
+        </p:spPr>
+        <p:style>
+          <a:lnRef idx="2">
+            <a:schemeClr val="accent1"/>
+          </a:lnRef>
+          <a:fillRef idx="1">
+            <a:schemeClr val="lt1"/>
+          </a:fillRef>
+          <a:effectRef idx="0">
+            <a:schemeClr val="accent1"/>
+          </a:effectRef>
+          <a:fontRef idx="minor">
+            <a:schemeClr val="dk1"/>
+          </a:fontRef>
+        </p:style>
+        <p:txBody>
+          <a:bodyPr rtlCol="0" anchor="ctr"/>
+          <a:lstStyle/>
+          <a:p>
+            <a:pPr algn="ctr"/>
+            <a:endParaRPr lang="en-SG"/>
+          </a:p>
+        </p:txBody>
+      </p:sp>
+      <p:cxnSp>
+        <p:nvCxnSpPr>
+          <p:cNvPr id="36" name="Straight Arrow Connector 35"/>
+          <p:cNvCxnSpPr>
+            <a:stCxn id="34" idx="3"/>
+            <a:endCxn id="37" idx="1"/>
+          </p:cNvCxnSpPr>
+          <p:nvPr/>
+        </p:nvCxnSpPr>
+        <p:spPr>
+          <a:xfrm flipV="1">
+            <a:off x="2883310" y="2331886"/>
+            <a:ext cx="3438680" cy="24169"/>
+          </a:xfrm>
+          <a:prstGeom prst="straightConnector1">
+            <a:avLst/>
+          </a:prstGeom>
+          <a:ln>
+            <a:tailEnd type="triangle"/>
+          </a:ln>
+        </p:spPr>
+        <p:style>
+          <a:lnRef idx="1">
+            <a:schemeClr val="accent1"/>
+          </a:lnRef>
+          <a:fillRef idx="0">
+            <a:schemeClr val="accent1"/>
+          </a:fillRef>
+          <a:effectRef idx="0">
+            <a:schemeClr val="accent1"/>
+          </a:effectRef>
+          <a:fontRef idx="minor">
+            <a:schemeClr val="tx1"/>
+          </a:fontRef>
+        </p:style>
+      </p:cxnSp>
+      <p:sp>
+        <p:nvSpPr>
+          <p:cNvPr id="37" name="Rounded Rectangle 36"/>
+          <p:cNvSpPr/>
+          <p:nvPr/>
+        </p:nvSpPr>
+        <p:spPr>
+          <a:xfrm>
+            <a:off x="6321990" y="2209881"/>
+            <a:ext cx="940042" cy="244009"/>
+          </a:xfrm>
+          <a:prstGeom prst="roundRect">
+            <a:avLst/>
+          </a:prstGeom>
+          <a:ln w="19050"/>
+        </p:spPr>
+        <p:style>
+          <a:lnRef idx="2">
+            <a:schemeClr val="accent1"/>
+          </a:lnRef>
+          <a:fillRef idx="1">
+            <a:schemeClr val="lt1"/>
+          </a:fillRef>
+          <a:effectRef idx="0">
+            <a:schemeClr val="accent1"/>
+          </a:effectRef>
+          <a:fontRef idx="minor">
+            <a:schemeClr val="dk1"/>
+          </a:fontRef>
+        </p:style>
+        <p:txBody>
+          <a:bodyPr rtlCol="0" anchor="ctr"/>
+          <a:lstStyle/>
+          <a:p>
+            <a:pPr algn="ctr"/>
+            <a:r>
+              <a:rPr lang="en-US" sz="1100" b="1" dirty="0" smtClean="0"/>
+              <a:t>verify</a:t>
+            </a:r>
+            <a:endParaRPr lang="en-SG" sz="1100" b="1" dirty="0"/>
+          </a:p>
+        </p:txBody>
+      </p:sp>
+      <p:cxnSp>
+        <p:nvCxnSpPr>
+          <p:cNvPr id="39" name="Straight Arrow Connector 38"/>
+          <p:cNvCxnSpPr/>
+          <p:nvPr/>
+        </p:nvCxnSpPr>
+        <p:spPr>
+          <a:xfrm flipH="1" flipV="1">
+            <a:off x="7262032" y="2317840"/>
+            <a:ext cx="815696" cy="6594"/>
+          </a:xfrm>
+          <a:prstGeom prst="straightConnector1">
+            <a:avLst/>
+          </a:prstGeom>
+          <a:ln>
+            <a:tailEnd type="triangle"/>
+          </a:ln>
+        </p:spPr>
+        <p:style>
+          <a:lnRef idx="1">
+            <a:schemeClr val="accent1"/>
+          </a:lnRef>
+          <a:fillRef idx="0">
+            <a:schemeClr val="accent1"/>
+          </a:fillRef>
+          <a:effectRef idx="0">
+            <a:schemeClr val="accent1"/>
+          </a:effectRef>
+          <a:fontRef idx="minor">
+            <a:schemeClr val="tx1"/>
+          </a:fontRef>
+        </p:style>
+      </p:cxnSp>
+      <p:sp>
+        <p:nvSpPr>
+          <p:cNvPr id="40" name="Folded Corner 39"/>
+          <p:cNvSpPr/>
+          <p:nvPr/>
+        </p:nvSpPr>
+        <p:spPr>
+          <a:xfrm>
+            <a:off x="8077728" y="2172536"/>
+            <a:ext cx="940042" cy="281354"/>
+          </a:xfrm>
+          <a:prstGeom prst="foldedCorner">
+            <a:avLst/>
+          </a:prstGeom>
+        </p:spPr>
+        <p:style>
+          <a:lnRef idx="2">
+            <a:schemeClr val="accent1"/>
+          </a:lnRef>
+          <a:fillRef idx="1">
+            <a:schemeClr val="lt1"/>
+          </a:fillRef>
+          <a:effectRef idx="0">
+            <a:schemeClr val="accent1"/>
+          </a:effectRef>
+          <a:fontRef idx="minor">
+            <a:schemeClr val="dk1"/>
+          </a:fontRef>
+        </p:style>
+        <p:txBody>
+          <a:bodyPr rtlCol="0" anchor="ctr"/>
+          <a:lstStyle/>
+          <a:p>
+            <a:pPr algn="ctr"/>
+            <a:r>
+              <a:rPr lang="en-US" sz="800" dirty="0" smtClean="0"/>
+              <a:t>Client certificate [SSL]</a:t>
+            </a:r>
+            <a:endParaRPr lang="en-SG" sz="800" dirty="0"/>
+          </a:p>
+        </p:txBody>
+      </p:sp>
+      <p:sp>
+        <p:nvSpPr>
+          <p:cNvPr id="41" name="TextBox 40"/>
+          <p:cNvSpPr txBox="1"/>
+          <p:nvPr/>
+        </p:nvSpPr>
+        <p:spPr>
+          <a:xfrm>
+            <a:off x="5987183" y="649261"/>
+            <a:ext cx="2176100" cy="276999"/>
+          </a:xfrm>
+          <a:prstGeom prst="rect">
+            <a:avLst/>
+          </a:prstGeom>
+          <a:noFill/>
+          <a:ln w="19050">
+            <a:noFill/>
+          </a:ln>
+        </p:spPr>
+        <p:txBody>
+          <a:bodyPr wrap="square" rtlCol="0">
+            <a:spAutoFit/>
+          </a:bodyPr>
+          <a:lstStyle/>
+          <a:p>
+            <a:r>
+              <a:rPr lang="en-US" sz="1200" dirty="0" smtClean="0"/>
+              <a:t>Server [exeServer.bat]</a:t>
+            </a:r>
+            <a:endParaRPr lang="en-SG" sz="1200" dirty="0"/>
+          </a:p>
+        </p:txBody>
+      </p:sp>
+      <p:sp>
+        <p:nvSpPr>
+          <p:cNvPr id="42" name="TextBox 41"/>
+          <p:cNvSpPr txBox="1"/>
+          <p:nvPr/>
+        </p:nvSpPr>
+        <p:spPr>
+          <a:xfrm>
+            <a:off x="4316230" y="2687144"/>
+            <a:ext cx="5891603" cy="261610"/>
+          </a:xfrm>
+          <a:prstGeom prst="rect">
+            <a:avLst/>
+          </a:prstGeom>
+          <a:ln w="19050"/>
+        </p:spPr>
+        <p:style>
+          <a:lnRef idx="2">
+            <a:schemeClr val="accent1"/>
+          </a:lnRef>
+          <a:fillRef idx="1">
+            <a:schemeClr val="lt1"/>
+          </a:fillRef>
+          <a:effectRef idx="0">
+            <a:schemeClr val="accent1"/>
+          </a:effectRef>
+          <a:fontRef idx="minor">
+            <a:schemeClr val="dk1"/>
+          </a:fontRef>
+        </p:style>
+        <p:txBody>
+          <a:bodyPr wrap="square" rtlCol="0">
+            <a:spAutoFit/>
+          </a:bodyPr>
+          <a:lstStyle/>
+          <a:p>
+            <a:r>
+              <a:rPr lang="en-SG" sz="1100" b="1" dirty="0" err="1" smtClean="0"/>
+              <a:t>sensor_id</a:t>
+            </a:r>
+            <a:r>
+              <a:rPr lang="en-SG" sz="1100" b="1" dirty="0"/>
+              <a:t> </a:t>
+            </a:r>
+            <a:r>
+              <a:rPr lang="en-SG" sz="1100" dirty="0" smtClean="0"/>
+              <a:t>+ </a:t>
+            </a:r>
+            <a:r>
+              <a:rPr lang="en-SG" sz="1100" b="1" dirty="0" smtClean="0"/>
+              <a:t> </a:t>
+            </a:r>
+            <a:r>
+              <a:rPr lang="en-SG" sz="1100" b="1" dirty="0" err="1" smtClean="0"/>
+              <a:t>signer_id</a:t>
+            </a:r>
+            <a:r>
+              <a:rPr lang="en-SG" sz="1100" dirty="0" smtClean="0"/>
+              <a:t> + </a:t>
+            </a:r>
+            <a:r>
+              <a:rPr lang="en-SG" sz="1100" b="1" dirty="0" err="1" smtClean="0"/>
+              <a:t>swatt_str</a:t>
+            </a:r>
+            <a:r>
+              <a:rPr lang="en-SG" sz="1100" b="1" dirty="0" smtClean="0"/>
+              <a:t> </a:t>
+            </a:r>
+            <a:r>
+              <a:rPr lang="en-SG" sz="1100" dirty="0" smtClean="0"/>
+              <a:t>+</a:t>
+            </a:r>
+            <a:r>
+              <a:rPr lang="en-SG" sz="1100" b="1" dirty="0" smtClean="0"/>
+              <a:t> </a:t>
+            </a:r>
+            <a:r>
+              <a:rPr lang="en-SG" sz="1100" b="1" dirty="0" err="1" smtClean="0"/>
+              <a:t>time_str</a:t>
+            </a:r>
+            <a:r>
+              <a:rPr lang="en-SG" sz="1100" b="1" dirty="0" smtClean="0"/>
+              <a:t> </a:t>
+            </a:r>
+            <a:r>
+              <a:rPr lang="en-SG" sz="1100" dirty="0" smtClean="0"/>
+              <a:t>+ </a:t>
+            </a:r>
+            <a:r>
+              <a:rPr lang="en-SG" sz="1100" b="1" dirty="0" err="1" smtClean="0"/>
+              <a:t>sensor_type</a:t>
+            </a:r>
+            <a:r>
+              <a:rPr lang="en-SG" sz="1100" b="1" dirty="0"/>
+              <a:t> </a:t>
+            </a:r>
+            <a:r>
+              <a:rPr lang="en-SG" sz="1100" dirty="0" smtClean="0"/>
+              <a:t>+ </a:t>
+            </a:r>
+            <a:r>
+              <a:rPr lang="en-SG" sz="1100" b="1" dirty="0" smtClean="0"/>
+              <a:t>sensor version + </a:t>
+            </a:r>
+            <a:r>
+              <a:rPr lang="en-US" sz="1100" b="1" dirty="0"/>
+              <a:t>Client </a:t>
+            </a:r>
+            <a:r>
+              <a:rPr lang="en-US" sz="1100" b="1" dirty="0" smtClean="0"/>
+              <a:t>signature</a:t>
+            </a:r>
+            <a:endParaRPr lang="en-SG" sz="1100" b="1" dirty="0"/>
+          </a:p>
+        </p:txBody>
+      </p:sp>
+      <p:sp>
+        <p:nvSpPr>
+          <p:cNvPr id="43" name="Rounded Rectangle 42"/>
+          <p:cNvSpPr/>
+          <p:nvPr/>
+        </p:nvSpPr>
+        <p:spPr>
+          <a:xfrm>
+            <a:off x="6494977" y="3407332"/>
+            <a:ext cx="940042" cy="254977"/>
+          </a:xfrm>
+          <a:prstGeom prst="roundRect">
+            <a:avLst/>
+          </a:prstGeom>
+          <a:ln w="19050"/>
+        </p:spPr>
+        <p:style>
+          <a:lnRef idx="2">
+            <a:schemeClr val="accent1"/>
+          </a:lnRef>
+          <a:fillRef idx="1">
+            <a:schemeClr val="lt1"/>
+          </a:fillRef>
+          <a:effectRef idx="0">
+            <a:schemeClr val="accent1"/>
+          </a:effectRef>
+          <a:fontRef idx="minor">
+            <a:schemeClr val="dk1"/>
+          </a:fontRef>
+        </p:style>
+        <p:txBody>
+          <a:bodyPr rtlCol="0" anchor="ctr"/>
+          <a:lstStyle/>
+          <a:p>
+            <a:pPr algn="ctr"/>
+            <a:r>
+              <a:rPr lang="en-US" sz="1100" b="1" dirty="0" smtClean="0"/>
+              <a:t>Sign</a:t>
+            </a:r>
+            <a:endParaRPr lang="en-SG" sz="1100" b="1" dirty="0"/>
+          </a:p>
+        </p:txBody>
+      </p:sp>
+      <p:cxnSp>
+        <p:nvCxnSpPr>
+          <p:cNvPr id="44" name="Straight Arrow Connector 43"/>
+          <p:cNvCxnSpPr/>
+          <p:nvPr/>
+        </p:nvCxnSpPr>
+        <p:spPr>
+          <a:xfrm flipH="1" flipV="1">
+            <a:off x="7435019" y="3515117"/>
+            <a:ext cx="815696" cy="6594"/>
+          </a:xfrm>
+          <a:prstGeom prst="straightConnector1">
+            <a:avLst/>
+          </a:prstGeom>
+          <a:ln>
+            <a:tailEnd type="triangle"/>
+          </a:ln>
+        </p:spPr>
+        <p:style>
+          <a:lnRef idx="1">
+            <a:schemeClr val="accent1"/>
+          </a:lnRef>
+          <a:fillRef idx="0">
+            <a:schemeClr val="accent1"/>
+          </a:fillRef>
+          <a:effectRef idx="0">
+            <a:schemeClr val="accent1"/>
+          </a:effectRef>
+          <a:fontRef idx="minor">
+            <a:schemeClr val="tx1"/>
+          </a:fontRef>
+        </p:style>
+      </p:cxnSp>
+      <p:sp>
+        <p:nvSpPr>
+          <p:cNvPr id="45" name="Folded Corner 44"/>
+          <p:cNvSpPr/>
+          <p:nvPr/>
+        </p:nvSpPr>
+        <p:spPr>
+          <a:xfrm>
+            <a:off x="8250715" y="3369813"/>
+            <a:ext cx="1140014" cy="281354"/>
+          </a:xfrm>
+          <a:prstGeom prst="foldedCorner">
+            <a:avLst/>
+          </a:prstGeom>
+        </p:spPr>
+        <p:style>
+          <a:lnRef idx="2">
+            <a:schemeClr val="accent1"/>
+          </a:lnRef>
+          <a:fillRef idx="1">
+            <a:schemeClr val="lt1"/>
+          </a:fillRef>
+          <a:effectRef idx="0">
+            <a:schemeClr val="accent1"/>
+          </a:effectRef>
+          <a:fontRef idx="minor">
+            <a:schemeClr val="dk1"/>
+          </a:fontRef>
+        </p:style>
+        <p:txBody>
+          <a:bodyPr rtlCol="0" anchor="ctr"/>
+          <a:lstStyle/>
+          <a:p>
+            <a:pPr algn="ctr"/>
+            <a:r>
+              <a:rPr lang="en-US" sz="800" dirty="0" smtClean="0"/>
+              <a:t>Server sign private Key</a:t>
+            </a:r>
+            <a:endParaRPr lang="en-SG" sz="800" dirty="0"/>
+          </a:p>
+        </p:txBody>
+      </p:sp>
+      <p:cxnSp>
+        <p:nvCxnSpPr>
+          <p:cNvPr id="46" name="Straight Arrow Connector 45"/>
+          <p:cNvCxnSpPr/>
+          <p:nvPr/>
+        </p:nvCxnSpPr>
+        <p:spPr>
+          <a:xfrm>
+            <a:off x="6888003" y="2993841"/>
+            <a:ext cx="8844" cy="375972"/>
+          </a:xfrm>
+          <a:prstGeom prst="straightConnector1">
+            <a:avLst/>
+          </a:prstGeom>
+          <a:ln w="12700">
+            <a:tailEnd type="triangle"/>
+          </a:ln>
+        </p:spPr>
+        <p:style>
+          <a:lnRef idx="1">
+            <a:schemeClr val="accent1"/>
+          </a:lnRef>
+          <a:fillRef idx="0">
+            <a:schemeClr val="accent1"/>
+          </a:fillRef>
+          <a:effectRef idx="0">
+            <a:schemeClr val="accent1"/>
+          </a:effectRef>
+          <a:fontRef idx="minor">
+            <a:schemeClr val="tx1"/>
+          </a:fontRef>
+        </p:style>
+      </p:cxnSp>
+      <p:cxnSp>
+        <p:nvCxnSpPr>
+          <p:cNvPr id="49" name="Straight Arrow Connector 48"/>
+          <p:cNvCxnSpPr/>
+          <p:nvPr/>
+        </p:nvCxnSpPr>
+        <p:spPr>
+          <a:xfrm flipH="1">
+            <a:off x="2952854" y="4082587"/>
+            <a:ext cx="3409448" cy="15280"/>
+          </a:xfrm>
+          <a:prstGeom prst="straightConnector1">
+            <a:avLst/>
+          </a:prstGeom>
+          <a:ln>
+            <a:tailEnd type="triangle"/>
+          </a:ln>
+        </p:spPr>
+        <p:style>
+          <a:lnRef idx="1">
+            <a:schemeClr val="accent1"/>
+          </a:lnRef>
+          <a:fillRef idx="0">
+            <a:schemeClr val="accent1"/>
+          </a:fillRef>
+          <a:effectRef idx="0">
+            <a:schemeClr val="accent1"/>
+          </a:effectRef>
+          <a:fontRef idx="minor">
+            <a:schemeClr val="tx1"/>
+          </a:fontRef>
+        </p:style>
+      </p:cxnSp>
+      <p:sp>
+        <p:nvSpPr>
+          <p:cNvPr id="53" name="TextBox 52"/>
+          <p:cNvSpPr txBox="1"/>
+          <p:nvPr/>
+        </p:nvSpPr>
+        <p:spPr>
+          <a:xfrm>
+            <a:off x="6379648" y="3967062"/>
+            <a:ext cx="1170700" cy="261610"/>
+          </a:xfrm>
+          <a:prstGeom prst="rect">
+            <a:avLst/>
+          </a:prstGeom>
+          <a:ln w="19050"/>
+        </p:spPr>
+        <p:style>
+          <a:lnRef idx="2">
+            <a:schemeClr val="accent1"/>
+          </a:lnRef>
+          <a:fillRef idx="1">
+            <a:schemeClr val="lt1"/>
+          </a:fillRef>
+          <a:effectRef idx="0">
+            <a:schemeClr val="accent1"/>
+          </a:effectRef>
+          <a:fontRef idx="minor">
+            <a:schemeClr val="dk1"/>
+          </a:fontRef>
+        </p:style>
+        <p:txBody>
+          <a:bodyPr wrap="square" rtlCol="0">
+            <a:spAutoFit/>
+          </a:bodyPr>
+          <a:lstStyle/>
+          <a:p>
+            <a:r>
+              <a:rPr lang="en-US" sz="1100" b="1" dirty="0" smtClean="0"/>
+              <a:t>Server signature</a:t>
+            </a:r>
+            <a:endParaRPr lang="en-SG" sz="1100" b="1" dirty="0"/>
+          </a:p>
+        </p:txBody>
+      </p:sp>
+      <p:cxnSp>
+        <p:nvCxnSpPr>
+          <p:cNvPr id="54" name="Straight Arrow Connector 53"/>
+          <p:cNvCxnSpPr>
+            <a:stCxn id="43" idx="2"/>
+            <a:endCxn id="53" idx="0"/>
+          </p:cNvCxnSpPr>
+          <p:nvPr/>
+        </p:nvCxnSpPr>
+        <p:spPr>
+          <a:xfrm>
+            <a:off x="6964998" y="3662309"/>
+            <a:ext cx="0" cy="304753"/>
+          </a:xfrm>
+          <a:prstGeom prst="straightConnector1">
+            <a:avLst/>
+          </a:prstGeom>
+          <a:ln w="12700">
+            <a:tailEnd type="triangle"/>
+          </a:ln>
+        </p:spPr>
+        <p:style>
+          <a:lnRef idx="1">
+            <a:schemeClr val="accent1"/>
+          </a:lnRef>
+          <a:fillRef idx="0">
+            <a:schemeClr val="accent1"/>
+          </a:fillRef>
+          <a:effectRef idx="0">
+            <a:schemeClr val="accent1"/>
+          </a:effectRef>
+          <a:fontRef idx="minor">
+            <a:schemeClr val="tx1"/>
+          </a:fontRef>
+        </p:style>
+      </p:cxnSp>
+      <p:sp>
+        <p:nvSpPr>
+          <p:cNvPr id="66" name="Rounded Rectangle 65"/>
+          <p:cNvSpPr/>
+          <p:nvPr/>
+        </p:nvSpPr>
+        <p:spPr>
+          <a:xfrm>
+            <a:off x="1901728" y="3890731"/>
+            <a:ext cx="1033780" cy="343966"/>
+          </a:xfrm>
+          <a:prstGeom prst="roundRect">
+            <a:avLst/>
+          </a:prstGeom>
+          <a:ln w="19050"/>
+        </p:spPr>
+        <p:style>
+          <a:lnRef idx="2">
+            <a:schemeClr val="accent1"/>
+          </a:lnRef>
+          <a:fillRef idx="1">
+            <a:schemeClr val="lt1"/>
+          </a:fillRef>
+          <a:effectRef idx="0">
+            <a:schemeClr val="accent1"/>
+          </a:effectRef>
+          <a:fontRef idx="minor">
+            <a:schemeClr val="dk1"/>
+          </a:fontRef>
+        </p:style>
+        <p:txBody>
+          <a:bodyPr rtlCol="0" anchor="ctr"/>
+          <a:lstStyle/>
+          <a:p>
+            <a:pPr algn="ctr"/>
+            <a:r>
+              <a:rPr lang="en-US" sz="1100" b="1" dirty="0" smtClean="0"/>
+              <a:t>Load in sensor</a:t>
+            </a:r>
+            <a:endParaRPr lang="en-SG" sz="1100" b="1" dirty="0"/>
+          </a:p>
+        </p:txBody>
+      </p:sp>
+      <p:sp>
+        <p:nvSpPr>
+          <p:cNvPr id="67" name="TextBox 66"/>
+          <p:cNvSpPr txBox="1"/>
+          <p:nvPr/>
+        </p:nvSpPr>
+        <p:spPr>
+          <a:xfrm>
+            <a:off x="1604963" y="5084681"/>
+            <a:ext cx="2417541" cy="600164"/>
+          </a:xfrm>
+          <a:prstGeom prst="rect">
+            <a:avLst/>
+          </a:prstGeom>
+          <a:ln w="19050"/>
+        </p:spPr>
+        <p:style>
+          <a:lnRef idx="2">
+            <a:schemeClr val="accent1"/>
+          </a:lnRef>
+          <a:fillRef idx="1">
+            <a:schemeClr val="lt1"/>
+          </a:fillRef>
+          <a:effectRef idx="0">
+            <a:schemeClr val="accent1"/>
+          </a:effectRef>
+          <a:fontRef idx="minor">
+            <a:schemeClr val="dk1"/>
+          </a:fontRef>
+        </p:style>
+        <p:txBody>
+          <a:bodyPr wrap="square" rtlCol="0">
+            <a:spAutoFit/>
+          </a:bodyPr>
+          <a:lstStyle/>
+          <a:p>
+            <a:r>
+              <a:rPr lang="en-SG" sz="1100" b="1" dirty="0" err="1" smtClean="0"/>
+              <a:t>sensor_id</a:t>
+            </a:r>
+            <a:r>
+              <a:rPr lang="en-SG" sz="1100" b="1" dirty="0"/>
+              <a:t> </a:t>
+            </a:r>
+            <a:r>
+              <a:rPr lang="en-SG" sz="1100" dirty="0" smtClean="0"/>
+              <a:t>+</a:t>
+            </a:r>
+            <a:r>
+              <a:rPr lang="en-SG" sz="1100" b="1" dirty="0" smtClean="0"/>
+              <a:t> </a:t>
+            </a:r>
+            <a:r>
+              <a:rPr lang="en-SG" sz="1100" b="1" dirty="0" err="1" smtClean="0"/>
+              <a:t>time_str</a:t>
+            </a:r>
+            <a:r>
+              <a:rPr lang="en-SG" sz="1100" b="1" dirty="0" smtClean="0"/>
+              <a:t> </a:t>
+            </a:r>
+            <a:r>
+              <a:rPr lang="en-SG" sz="1100" dirty="0" smtClean="0"/>
+              <a:t>+ </a:t>
+            </a:r>
+            <a:r>
+              <a:rPr lang="en-SG" sz="1100" b="1" dirty="0" err="1" smtClean="0"/>
+              <a:t>sensor_type</a:t>
+            </a:r>
+            <a:r>
+              <a:rPr lang="en-SG" sz="1100" b="1" dirty="0" smtClean="0"/>
+              <a:t> </a:t>
+            </a:r>
+            <a:r>
+              <a:rPr lang="en-SG" sz="1100" dirty="0" smtClean="0"/>
+              <a:t>+ </a:t>
+            </a:r>
+            <a:r>
+              <a:rPr lang="en-SG" sz="1100" b="1" dirty="0" smtClean="0"/>
+              <a:t>sensor version + </a:t>
+            </a:r>
+            <a:r>
+              <a:rPr lang="en-US" sz="1100" b="1" dirty="0" smtClean="0"/>
+              <a:t>Server </a:t>
+            </a:r>
+            <a:r>
+              <a:rPr lang="en-US" sz="1100" b="1" dirty="0"/>
+              <a:t>signature</a:t>
+            </a:r>
+            <a:endParaRPr lang="en-SG" sz="1100" b="1" dirty="0"/>
+          </a:p>
+          <a:p>
+            <a:endParaRPr lang="en-SG" sz="1100" b="1" dirty="0"/>
+          </a:p>
+        </p:txBody>
+      </p:sp>
+      <p:cxnSp>
+        <p:nvCxnSpPr>
+          <p:cNvPr id="68" name="Straight Arrow Connector 67"/>
+          <p:cNvCxnSpPr/>
+          <p:nvPr/>
+        </p:nvCxnSpPr>
+        <p:spPr>
+          <a:xfrm>
+            <a:off x="4022504" y="5215486"/>
+            <a:ext cx="2769507" cy="0"/>
+          </a:xfrm>
+          <a:prstGeom prst="straightConnector1">
+            <a:avLst/>
+          </a:prstGeom>
+          <a:ln w="12700">
+            <a:tailEnd type="triangle"/>
+          </a:ln>
+        </p:spPr>
+        <p:style>
+          <a:lnRef idx="1">
+            <a:schemeClr val="accent1"/>
+          </a:lnRef>
+          <a:fillRef idx="0">
+            <a:schemeClr val="accent1"/>
+          </a:fillRef>
+          <a:effectRef idx="0">
+            <a:schemeClr val="accent1"/>
+          </a:effectRef>
+          <a:fontRef idx="minor">
+            <a:schemeClr val="tx1"/>
+          </a:fontRef>
+        </p:style>
+      </p:cxnSp>
+      <p:sp>
+        <p:nvSpPr>
+          <p:cNvPr id="75" name="Rounded Rectangle 74"/>
+          <p:cNvSpPr/>
+          <p:nvPr/>
+        </p:nvSpPr>
+        <p:spPr>
+          <a:xfrm>
+            <a:off x="6792010" y="5092257"/>
+            <a:ext cx="1887415" cy="254977"/>
+          </a:xfrm>
+          <a:prstGeom prst="roundRect">
+            <a:avLst/>
+          </a:prstGeom>
+          <a:ln w="19050"/>
+        </p:spPr>
+        <p:style>
+          <a:lnRef idx="2">
+            <a:schemeClr val="accent1"/>
+          </a:lnRef>
+          <a:fillRef idx="1">
+            <a:schemeClr val="lt1"/>
+          </a:fillRef>
+          <a:effectRef idx="0">
+            <a:schemeClr val="accent1"/>
+          </a:effectRef>
+          <a:fontRef idx="minor">
+            <a:schemeClr val="dk1"/>
+          </a:fontRef>
+        </p:style>
+        <p:txBody>
+          <a:bodyPr rtlCol="0" anchor="ctr"/>
+          <a:lstStyle/>
+          <a:p>
+            <a:pPr algn="ctr"/>
+            <a:r>
+              <a:rPr lang="en-US" sz="1100" b="1" dirty="0" smtClean="0"/>
+              <a:t>Find record from data base </a:t>
+            </a:r>
+            <a:endParaRPr lang="en-SG" sz="1100" b="1" dirty="0"/>
+          </a:p>
+        </p:txBody>
+      </p:sp>
+      <p:sp>
+        <p:nvSpPr>
+          <p:cNvPr id="76" name="Rounded Rectangle 75"/>
+          <p:cNvSpPr/>
+          <p:nvPr/>
+        </p:nvSpPr>
+        <p:spPr>
+          <a:xfrm>
+            <a:off x="6747789" y="5674064"/>
+            <a:ext cx="1975856" cy="254977"/>
+          </a:xfrm>
+          <a:prstGeom prst="roundRect">
+            <a:avLst/>
+          </a:prstGeom>
+          <a:ln w="19050"/>
+        </p:spPr>
+        <p:style>
+          <a:lnRef idx="2">
+            <a:schemeClr val="accent1"/>
+          </a:lnRef>
+          <a:fillRef idx="1">
+            <a:schemeClr val="lt1"/>
+          </a:fillRef>
+          <a:effectRef idx="0">
+            <a:schemeClr val="accent1"/>
+          </a:effectRef>
+          <a:fontRef idx="minor">
+            <a:schemeClr val="dk1"/>
+          </a:fontRef>
+        </p:style>
+        <p:txBody>
+          <a:bodyPr rtlCol="0" anchor="ctr"/>
+          <a:lstStyle/>
+          <a:p>
+            <a:pPr algn="ctr"/>
+            <a:r>
+              <a:rPr lang="en-US" sz="1100" b="1" dirty="0" smtClean="0"/>
+              <a:t>Compare basic information</a:t>
+            </a:r>
+            <a:endParaRPr lang="en-SG" sz="1100" b="1" dirty="0"/>
+          </a:p>
+        </p:txBody>
+      </p:sp>
+      <p:cxnSp>
+        <p:nvCxnSpPr>
+          <p:cNvPr id="78" name="Straight Arrow Connector 77"/>
+          <p:cNvCxnSpPr>
+            <a:stCxn id="75" idx="2"/>
+            <a:endCxn id="76" idx="0"/>
+          </p:cNvCxnSpPr>
+          <p:nvPr/>
+        </p:nvCxnSpPr>
+        <p:spPr>
+          <a:xfrm flipH="1">
+            <a:off x="7735717" y="5347234"/>
+            <a:ext cx="1" cy="326830"/>
+          </a:xfrm>
+          <a:prstGeom prst="straightConnector1">
+            <a:avLst/>
+          </a:prstGeom>
+          <a:ln>
+            <a:tailEnd type="triangle"/>
+          </a:ln>
+        </p:spPr>
+        <p:style>
+          <a:lnRef idx="1">
+            <a:schemeClr val="accent1"/>
+          </a:lnRef>
+          <a:fillRef idx="0">
+            <a:schemeClr val="accent1"/>
+          </a:fillRef>
+          <a:effectRef idx="0">
+            <a:schemeClr val="accent1"/>
+          </a:effectRef>
+          <a:fontRef idx="minor">
+            <a:schemeClr val="tx1"/>
+          </a:fontRef>
+        </p:style>
+      </p:cxnSp>
+      <p:sp>
+        <p:nvSpPr>
+          <p:cNvPr id="80" name="Rounded Rectangle 79"/>
+          <p:cNvSpPr/>
+          <p:nvPr/>
+        </p:nvSpPr>
+        <p:spPr>
+          <a:xfrm>
+            <a:off x="6827827" y="6260129"/>
+            <a:ext cx="1335456" cy="254977"/>
+          </a:xfrm>
+          <a:prstGeom prst="roundRect">
+            <a:avLst/>
+          </a:prstGeom>
+          <a:ln w="19050"/>
+        </p:spPr>
+        <p:style>
+          <a:lnRef idx="2">
+            <a:schemeClr val="accent1"/>
+          </a:lnRef>
+          <a:fillRef idx="1">
+            <a:schemeClr val="lt1"/>
+          </a:fillRef>
+          <a:effectRef idx="0">
+            <a:schemeClr val="accent1"/>
+          </a:effectRef>
+          <a:fontRef idx="minor">
+            <a:schemeClr val="dk1"/>
+          </a:fontRef>
+        </p:style>
+        <p:txBody>
+          <a:bodyPr rtlCol="0" anchor="ctr"/>
+          <a:lstStyle/>
+          <a:p>
+            <a:pPr algn="ctr"/>
+            <a:r>
+              <a:rPr lang="en-US" sz="1100" b="1" dirty="0" err="1" smtClean="0"/>
+              <a:t>Verifiy</a:t>
+            </a:r>
+            <a:r>
+              <a:rPr lang="en-US" sz="1100" b="1" dirty="0" smtClean="0"/>
+              <a:t> </a:t>
+            </a:r>
+            <a:endParaRPr lang="en-SG" sz="1100" b="1" dirty="0"/>
+          </a:p>
+        </p:txBody>
+      </p:sp>
+      <p:sp>
+        <p:nvSpPr>
+          <p:cNvPr id="81" name="TextBox 80"/>
+          <p:cNvSpPr txBox="1"/>
+          <p:nvPr/>
+        </p:nvSpPr>
+        <p:spPr>
+          <a:xfrm>
+            <a:off x="9079958" y="5458620"/>
+            <a:ext cx="2622887" cy="600164"/>
+          </a:xfrm>
+          <a:prstGeom prst="rect">
+            <a:avLst/>
+          </a:prstGeom>
+          <a:ln w="19050"/>
+        </p:spPr>
+        <p:style>
+          <a:lnRef idx="2">
+            <a:schemeClr val="accent1"/>
+          </a:lnRef>
+          <a:fillRef idx="1">
+            <a:schemeClr val="lt1"/>
+          </a:fillRef>
+          <a:effectRef idx="0">
+            <a:schemeClr val="accent1"/>
+          </a:effectRef>
+          <a:fontRef idx="minor">
+            <a:schemeClr val="dk1"/>
+          </a:fontRef>
+        </p:style>
+        <p:txBody>
+          <a:bodyPr wrap="square" rtlCol="0">
+            <a:spAutoFit/>
+          </a:bodyPr>
+          <a:lstStyle/>
+          <a:p>
+            <a:r>
+              <a:rPr lang="en-SG" sz="1100" b="1" dirty="0" smtClean="0"/>
+              <a:t>[From database] </a:t>
+            </a:r>
+            <a:r>
+              <a:rPr lang="en-SG" sz="1100" b="1" dirty="0" err="1" smtClean="0"/>
+              <a:t>sensor_id</a:t>
+            </a:r>
+            <a:r>
+              <a:rPr lang="en-SG" sz="1100" b="1" dirty="0" smtClean="0"/>
+              <a:t> </a:t>
+            </a:r>
+            <a:r>
+              <a:rPr lang="en-SG" sz="1100" dirty="0" smtClean="0"/>
+              <a:t>+ </a:t>
+            </a:r>
+            <a:r>
+              <a:rPr lang="en-SG" sz="1100" b="1" dirty="0" smtClean="0"/>
+              <a:t> </a:t>
+            </a:r>
+            <a:r>
+              <a:rPr lang="en-SG" sz="1100" b="1" dirty="0" err="1" smtClean="0"/>
+              <a:t>signer_id</a:t>
+            </a:r>
+            <a:r>
+              <a:rPr lang="en-SG" sz="1100" dirty="0" smtClean="0"/>
+              <a:t> + </a:t>
+            </a:r>
+            <a:r>
+              <a:rPr lang="en-SG" sz="1100" b="1" dirty="0" err="1" smtClean="0"/>
+              <a:t>swatt_str</a:t>
+            </a:r>
+            <a:r>
+              <a:rPr lang="en-SG" sz="1100" b="1" dirty="0" smtClean="0"/>
+              <a:t> </a:t>
+            </a:r>
+            <a:r>
+              <a:rPr lang="en-SG" sz="1100" dirty="0" smtClean="0"/>
+              <a:t>+</a:t>
+            </a:r>
+            <a:r>
+              <a:rPr lang="en-SG" sz="1100" b="1" dirty="0" smtClean="0"/>
+              <a:t> </a:t>
+            </a:r>
+            <a:r>
+              <a:rPr lang="en-SG" sz="1100" b="1" dirty="0" err="1" smtClean="0"/>
+              <a:t>date_str</a:t>
+            </a:r>
+            <a:r>
+              <a:rPr lang="en-SG" sz="1100" b="1" dirty="0"/>
+              <a:t> </a:t>
+            </a:r>
+            <a:r>
+              <a:rPr lang="en-SG" sz="1100" dirty="0" smtClean="0"/>
+              <a:t>+ </a:t>
+            </a:r>
+            <a:r>
+              <a:rPr lang="en-SG" sz="1100" b="1" dirty="0" err="1" smtClean="0"/>
+              <a:t>sensor_type</a:t>
+            </a:r>
+            <a:r>
+              <a:rPr lang="en-SG" sz="1100" b="1" dirty="0"/>
+              <a:t> </a:t>
+            </a:r>
+            <a:r>
+              <a:rPr lang="en-SG" sz="1100" dirty="0" smtClean="0"/>
+              <a:t>+ </a:t>
+            </a:r>
+            <a:r>
+              <a:rPr lang="en-SG" sz="1100" b="1" dirty="0" smtClean="0"/>
+              <a:t>sensor version  </a:t>
+            </a:r>
+            <a:r>
+              <a:rPr lang="en-SG" sz="1100" b="1" dirty="0"/>
+              <a:t>+ </a:t>
+            </a:r>
+            <a:r>
+              <a:rPr lang="en-US" sz="1100" b="1" dirty="0"/>
+              <a:t>Client signature</a:t>
+            </a:r>
+            <a:endParaRPr lang="en-SG" sz="1100" b="1" dirty="0"/>
+          </a:p>
+        </p:txBody>
+      </p:sp>
+      <p:cxnSp>
+        <p:nvCxnSpPr>
+          <p:cNvPr id="83" name="Straight Arrow Connector 82"/>
+          <p:cNvCxnSpPr>
+            <a:stCxn id="81" idx="1"/>
+            <a:endCxn id="80" idx="3"/>
+          </p:cNvCxnSpPr>
+          <p:nvPr/>
+        </p:nvCxnSpPr>
+        <p:spPr>
+          <a:xfrm flipH="1">
+            <a:off x="8163283" y="5758702"/>
+            <a:ext cx="916675" cy="628916"/>
+          </a:xfrm>
+          <a:prstGeom prst="straightConnector1">
+            <a:avLst/>
+          </a:prstGeom>
+          <a:ln>
+            <a:tailEnd type="triangle"/>
+          </a:ln>
+        </p:spPr>
+        <p:style>
+          <a:lnRef idx="1">
+            <a:schemeClr val="accent1"/>
+          </a:lnRef>
+          <a:fillRef idx="0">
+            <a:schemeClr val="accent1"/>
+          </a:fillRef>
+          <a:effectRef idx="0">
+            <a:schemeClr val="accent1"/>
+          </a:effectRef>
+          <a:fontRef idx="minor">
+            <a:schemeClr val="tx1"/>
+          </a:fontRef>
+        </p:style>
+      </p:cxnSp>
+      <p:sp>
+        <p:nvSpPr>
+          <p:cNvPr id="85" name="Folded Corner 84"/>
+          <p:cNvSpPr/>
+          <p:nvPr/>
+        </p:nvSpPr>
+        <p:spPr>
+          <a:xfrm>
+            <a:off x="9147908" y="6374429"/>
+            <a:ext cx="1140014" cy="281354"/>
+          </a:xfrm>
+          <a:prstGeom prst="foldedCorner">
+            <a:avLst/>
+          </a:prstGeom>
+        </p:spPr>
+        <p:style>
+          <a:lnRef idx="2">
+            <a:schemeClr val="accent1"/>
+          </a:lnRef>
+          <a:fillRef idx="1">
+            <a:schemeClr val="lt1"/>
+          </a:fillRef>
+          <a:effectRef idx="0">
+            <a:schemeClr val="accent1"/>
+          </a:effectRef>
+          <a:fontRef idx="minor">
+            <a:schemeClr val="dk1"/>
+          </a:fontRef>
+        </p:style>
+        <p:txBody>
+          <a:bodyPr rtlCol="0" anchor="ctr"/>
+          <a:lstStyle/>
+          <a:p>
+            <a:pPr algn="ctr"/>
+            <a:r>
+              <a:rPr lang="en-US" sz="800" dirty="0" smtClean="0"/>
+              <a:t>Server sign certificate</a:t>
+            </a:r>
+            <a:endParaRPr lang="en-SG" sz="800" dirty="0"/>
+          </a:p>
+        </p:txBody>
+      </p:sp>
+      <p:cxnSp>
+        <p:nvCxnSpPr>
+          <p:cNvPr id="86" name="Straight Arrow Connector 85"/>
+          <p:cNvCxnSpPr>
+            <a:stCxn id="85" idx="1"/>
+            <a:endCxn id="80" idx="3"/>
+          </p:cNvCxnSpPr>
+          <p:nvPr/>
+        </p:nvCxnSpPr>
+        <p:spPr>
+          <a:xfrm flipH="1" flipV="1">
+            <a:off x="8163283" y="6387618"/>
+            <a:ext cx="984625" cy="127488"/>
+          </a:xfrm>
+          <a:prstGeom prst="straightConnector1">
+            <a:avLst/>
+          </a:prstGeom>
+          <a:ln>
+            <a:tailEnd type="triangle"/>
+          </a:ln>
+        </p:spPr>
+        <p:style>
+          <a:lnRef idx="1">
+            <a:schemeClr val="accent1"/>
+          </a:lnRef>
+          <a:fillRef idx="0">
+            <a:schemeClr val="accent1"/>
+          </a:fillRef>
+          <a:effectRef idx="0">
+            <a:schemeClr val="accent1"/>
+          </a:effectRef>
+          <a:fontRef idx="minor">
+            <a:schemeClr val="tx1"/>
+          </a:fontRef>
+        </p:style>
+      </p:cxnSp>
+      <p:cxnSp>
+        <p:nvCxnSpPr>
+          <p:cNvPr id="91" name="Straight Arrow Connector 90"/>
+          <p:cNvCxnSpPr>
+            <a:stCxn id="76" idx="2"/>
+          </p:cNvCxnSpPr>
+          <p:nvPr/>
+        </p:nvCxnSpPr>
+        <p:spPr>
+          <a:xfrm>
+            <a:off x="7735717" y="5929041"/>
+            <a:ext cx="0" cy="331088"/>
+          </a:xfrm>
+          <a:prstGeom prst="straightConnector1">
+            <a:avLst/>
+          </a:prstGeom>
+          <a:ln>
+            <a:tailEnd type="triangle"/>
+          </a:ln>
+        </p:spPr>
+        <p:style>
+          <a:lnRef idx="1">
+            <a:schemeClr val="accent1"/>
+          </a:lnRef>
+          <a:fillRef idx="0">
+            <a:schemeClr val="accent1"/>
+          </a:fillRef>
+          <a:effectRef idx="0">
+            <a:schemeClr val="accent1"/>
+          </a:effectRef>
+          <a:fontRef idx="minor">
+            <a:schemeClr val="tx1"/>
+          </a:fontRef>
+        </p:style>
+      </p:cxnSp>
+    </p:spTree>
+    <p:extLst>
+      <p:ext uri="{BB962C8B-B14F-4D97-AF65-F5344CB8AC3E}">
+        <p14:creationId xmlns:p14="http://schemas.microsoft.com/office/powerpoint/2010/main" val="3679025041"/>
+      </p:ext>
+    </p:extLst>
+  </p:cSld>
+  <p:clrMapOvr>
+    <a:masterClrMapping/>
+  </p:clrMapOvr>
+  <p:timing>
+    <p:tnLst>
+      <p:par>
+        <p:cTn id="1" dur="indefinite" restart="never" nodeType="tmRoot"/>
+      </p:par>
+    </p:tnLst>
+  </p:timing>
+</p:sld>
+</file>
+
 <file path=ppt/theme/theme1.xml><?xml version="1.0" encoding="utf-8"?>
 <a:theme xmlns:a="http://schemas.openxmlformats.org/drawingml/2006/main" name="Office Theme">
   <a:themeElements>

</xml_diff>

<commit_message>
Added the trust client diagram.
</commit_message>
<xml_diff>
--- a/doc/firmwaresignWF.pptx
+++ b/doc/firmwaresignWF.pptx
@@ -8,6 +8,7 @@
     <p:sldId id="256" r:id="rId2"/>
     <p:sldId id="257" r:id="rId3"/>
     <p:sldId id="258" r:id="rId4"/>
+    <p:sldId id="259" r:id="rId5"/>
   </p:sldIdLst>
   <p:sldSz cx="12192000" cy="6858000"/>
   <p:notesSz cx="6858000" cy="9144000"/>
@@ -245,7 +246,7 @@
           <a:p>
             <a:fld id="{168FC4C3-6B25-48E2-93F9-24A255A41CA9}" type="datetimeFigureOut">
               <a:rPr lang="en-SG" smtClean="0"/>
-              <a:t>21/5/2019</a:t>
+              <a:t>29/5/2019</a:t>
             </a:fld>
             <a:endParaRPr lang="en-SG"/>
           </a:p>
@@ -415,7 +416,7 @@
           <a:p>
             <a:fld id="{168FC4C3-6B25-48E2-93F9-24A255A41CA9}" type="datetimeFigureOut">
               <a:rPr lang="en-SG" smtClean="0"/>
-              <a:t>21/5/2019</a:t>
+              <a:t>29/5/2019</a:t>
             </a:fld>
             <a:endParaRPr lang="en-SG"/>
           </a:p>
@@ -595,7 +596,7 @@
           <a:p>
             <a:fld id="{168FC4C3-6B25-48E2-93F9-24A255A41CA9}" type="datetimeFigureOut">
               <a:rPr lang="en-SG" smtClean="0"/>
-              <a:t>21/5/2019</a:t>
+              <a:t>29/5/2019</a:t>
             </a:fld>
             <a:endParaRPr lang="en-SG"/>
           </a:p>
@@ -765,7 +766,7 @@
           <a:p>
             <a:fld id="{168FC4C3-6B25-48E2-93F9-24A255A41CA9}" type="datetimeFigureOut">
               <a:rPr lang="en-SG" smtClean="0"/>
-              <a:t>21/5/2019</a:t>
+              <a:t>29/5/2019</a:t>
             </a:fld>
             <a:endParaRPr lang="en-SG"/>
           </a:p>
@@ -1011,7 +1012,7 @@
           <a:p>
             <a:fld id="{168FC4C3-6B25-48E2-93F9-24A255A41CA9}" type="datetimeFigureOut">
               <a:rPr lang="en-SG" smtClean="0"/>
-              <a:t>21/5/2019</a:t>
+              <a:t>29/5/2019</a:t>
             </a:fld>
             <a:endParaRPr lang="en-SG"/>
           </a:p>
@@ -1243,7 +1244,7 @@
           <a:p>
             <a:fld id="{168FC4C3-6B25-48E2-93F9-24A255A41CA9}" type="datetimeFigureOut">
               <a:rPr lang="en-SG" smtClean="0"/>
-              <a:t>21/5/2019</a:t>
+              <a:t>29/5/2019</a:t>
             </a:fld>
             <a:endParaRPr lang="en-SG"/>
           </a:p>
@@ -1610,7 +1611,7 @@
           <a:p>
             <a:fld id="{168FC4C3-6B25-48E2-93F9-24A255A41CA9}" type="datetimeFigureOut">
               <a:rPr lang="en-SG" smtClean="0"/>
-              <a:t>21/5/2019</a:t>
+              <a:t>29/5/2019</a:t>
             </a:fld>
             <a:endParaRPr lang="en-SG"/>
           </a:p>
@@ -1728,7 +1729,7 @@
           <a:p>
             <a:fld id="{168FC4C3-6B25-48E2-93F9-24A255A41CA9}" type="datetimeFigureOut">
               <a:rPr lang="en-SG" smtClean="0"/>
-              <a:t>21/5/2019</a:t>
+              <a:t>29/5/2019</a:t>
             </a:fld>
             <a:endParaRPr lang="en-SG"/>
           </a:p>
@@ -1823,7 +1824,7 @@
           <a:p>
             <a:fld id="{168FC4C3-6B25-48E2-93F9-24A255A41CA9}" type="datetimeFigureOut">
               <a:rPr lang="en-SG" smtClean="0"/>
-              <a:t>21/5/2019</a:t>
+              <a:t>29/5/2019</a:t>
             </a:fld>
             <a:endParaRPr lang="en-SG"/>
           </a:p>
@@ -2100,7 +2101,7 @@
           <a:p>
             <a:fld id="{168FC4C3-6B25-48E2-93F9-24A255A41CA9}" type="datetimeFigureOut">
               <a:rPr lang="en-SG" smtClean="0"/>
-              <a:t>21/5/2019</a:t>
+              <a:t>29/5/2019</a:t>
             </a:fld>
             <a:endParaRPr lang="en-SG"/>
           </a:p>
@@ -2353,7 +2354,7 @@
           <a:p>
             <a:fld id="{168FC4C3-6B25-48E2-93F9-24A255A41CA9}" type="datetimeFigureOut">
               <a:rPr lang="en-SG" smtClean="0"/>
-              <a:t>21/5/2019</a:t>
+              <a:t>29/5/2019</a:t>
             </a:fld>
             <a:endParaRPr lang="en-SG"/>
           </a:p>
@@ -2566,7 +2567,7 @@
           <a:p>
             <a:fld id="{168FC4C3-6B25-48E2-93F9-24A255A41CA9}" type="datetimeFigureOut">
               <a:rPr lang="en-SG" smtClean="0"/>
-              <a:t>21/5/2019</a:t>
+              <a:t>29/5/2019</a:t>
             </a:fld>
             <a:endParaRPr lang="en-SG"/>
           </a:p>
@@ -12583,6 +12584,379 @@
 </p:sld>
 </file>
 
+<file path=ppt/slides/slide4.xml><?xml version="1.0" encoding="utf-8"?>
+<p:sld xmlns:a="http://schemas.openxmlformats.org/drawingml/2006/main" xmlns:r="http://schemas.openxmlformats.org/officeDocument/2006/relationships" xmlns:p="http://schemas.openxmlformats.org/presentationml/2006/main">
+  <p:cSld>
+    <p:spTree>
+      <p:nvGrpSpPr>
+        <p:cNvPr id="1" name=""/>
+        <p:cNvGrpSpPr/>
+        <p:nvPr/>
+      </p:nvGrpSpPr>
+      <p:grpSpPr>
+        <a:xfrm>
+          <a:off x="0" y="0"/>
+          <a:ext cx="0" cy="0"/>
+          <a:chOff x="0" y="0"/>
+          <a:chExt cx="0" cy="0"/>
+        </a:xfrm>
+      </p:grpSpPr>
+      <p:sp>
+        <p:nvSpPr>
+          <p:cNvPr id="16" name="Rectangle 15"/>
+          <p:cNvSpPr/>
+          <p:nvPr/>
+        </p:nvSpPr>
+        <p:spPr>
+          <a:xfrm>
+            <a:off x="1098566" y="1265274"/>
+            <a:ext cx="5585900" cy="4901610"/>
+          </a:xfrm>
+          <a:prstGeom prst="rect">
+            <a:avLst/>
+          </a:prstGeom>
+          <a:ln w="19050"/>
+        </p:spPr>
+        <p:style>
+          <a:lnRef idx="2">
+            <a:schemeClr val="accent1"/>
+          </a:lnRef>
+          <a:fillRef idx="1">
+            <a:schemeClr val="lt1"/>
+          </a:fillRef>
+          <a:effectRef idx="0">
+            <a:schemeClr val="accent1"/>
+          </a:effectRef>
+          <a:fontRef idx="minor">
+            <a:schemeClr val="dk1"/>
+          </a:fontRef>
+        </p:style>
+        <p:txBody>
+          <a:bodyPr rtlCol="0" anchor="ctr"/>
+          <a:lstStyle/>
+          <a:p>
+            <a:pPr algn="ctr"/>
+            <a:endParaRPr lang="en-SG"/>
+          </a:p>
+        </p:txBody>
+      </p:sp>
+      <p:sp>
+        <p:nvSpPr>
+          <p:cNvPr id="4" name="TextBox 3"/>
+          <p:cNvSpPr txBox="1"/>
+          <p:nvPr/>
+        </p:nvSpPr>
+        <p:spPr>
+          <a:xfrm>
+            <a:off x="1320799" y="327378"/>
+            <a:ext cx="5328357" cy="369332"/>
+          </a:xfrm>
+          <a:prstGeom prst="rect">
+            <a:avLst/>
+          </a:prstGeom>
+          <a:noFill/>
+        </p:spPr>
+        <p:txBody>
+          <a:bodyPr wrap="square" rtlCol="0">
+            <a:spAutoFit/>
+          </a:bodyPr>
+          <a:lstStyle/>
+          <a:p>
+            <a:r>
+              <a:rPr lang="en-US" dirty="0" smtClean="0"/>
+              <a:t>OPTEE trust application [client &lt;-&gt; server ] design </a:t>
+            </a:r>
+            <a:endParaRPr lang="en-SG" dirty="0"/>
+          </a:p>
+        </p:txBody>
+      </p:sp>
+      <p:cxnSp>
+        <p:nvCxnSpPr>
+          <p:cNvPr id="14" name="Straight Connector 13"/>
+          <p:cNvCxnSpPr/>
+          <p:nvPr/>
+        </p:nvCxnSpPr>
+        <p:spPr>
+          <a:xfrm flipH="1">
+            <a:off x="7478103" y="1063256"/>
+            <a:ext cx="53292" cy="5010166"/>
+          </a:xfrm>
+          <a:prstGeom prst="line">
+            <a:avLst/>
+          </a:prstGeom>
+          <a:ln>
+            <a:prstDash val="dash"/>
+          </a:ln>
+        </p:spPr>
+        <p:style>
+          <a:lnRef idx="1">
+            <a:schemeClr val="accent1"/>
+          </a:lnRef>
+          <a:fillRef idx="0">
+            <a:schemeClr val="accent1"/>
+          </a:fillRef>
+          <a:effectRef idx="0">
+            <a:schemeClr val="accent1"/>
+          </a:effectRef>
+          <a:fontRef idx="minor">
+            <a:schemeClr val="tx1"/>
+          </a:fontRef>
+        </p:style>
+      </p:cxnSp>
+      <p:sp>
+        <p:nvSpPr>
+          <p:cNvPr id="17" name="TextBox 16"/>
+          <p:cNvSpPr txBox="1"/>
+          <p:nvPr/>
+        </p:nvSpPr>
+        <p:spPr>
+          <a:xfrm>
+            <a:off x="1098566" y="988275"/>
+            <a:ext cx="1772225" cy="276999"/>
+          </a:xfrm>
+          <a:prstGeom prst="rect">
+            <a:avLst/>
+          </a:prstGeom>
+          <a:noFill/>
+        </p:spPr>
+        <p:txBody>
+          <a:bodyPr wrap="square" rtlCol="0">
+            <a:spAutoFit/>
+          </a:bodyPr>
+          <a:lstStyle/>
+          <a:p>
+            <a:r>
+              <a:rPr lang="en-US" sz="1200" b="1" dirty="0" smtClean="0"/>
+              <a:t>Raspberry PI mode 3</a:t>
+            </a:r>
+            <a:endParaRPr lang="en-SG" sz="1200" b="1" dirty="0"/>
+          </a:p>
+        </p:txBody>
+      </p:sp>
+      <p:cxnSp>
+        <p:nvCxnSpPr>
+          <p:cNvPr id="19" name="Straight Connector 18"/>
+          <p:cNvCxnSpPr/>
+          <p:nvPr/>
+        </p:nvCxnSpPr>
+        <p:spPr>
+          <a:xfrm>
+            <a:off x="3752112" y="1265274"/>
+            <a:ext cx="0" cy="4901610"/>
+          </a:xfrm>
+          <a:prstGeom prst="line">
+            <a:avLst/>
+          </a:prstGeom>
+          <a:ln w="19050">
+            <a:prstDash val="dash"/>
+          </a:ln>
+        </p:spPr>
+        <p:style>
+          <a:lnRef idx="1">
+            <a:schemeClr val="accent1"/>
+          </a:lnRef>
+          <a:fillRef idx="0">
+            <a:schemeClr val="accent1"/>
+          </a:fillRef>
+          <a:effectRef idx="0">
+            <a:schemeClr val="accent1"/>
+          </a:effectRef>
+          <a:fontRef idx="minor">
+            <a:schemeClr val="tx1"/>
+          </a:fontRef>
+        </p:style>
+      </p:cxnSp>
+      <p:sp>
+        <p:nvSpPr>
+          <p:cNvPr id="27" name="TextBox 26"/>
+          <p:cNvSpPr txBox="1"/>
+          <p:nvPr/>
+        </p:nvSpPr>
+        <p:spPr>
+          <a:xfrm>
+            <a:off x="1186250" y="1403773"/>
+            <a:ext cx="1772225" cy="276999"/>
+          </a:xfrm>
+          <a:prstGeom prst="rect">
+            <a:avLst/>
+          </a:prstGeom>
+          <a:noFill/>
+        </p:spPr>
+        <p:txBody>
+          <a:bodyPr wrap="square" rtlCol="0">
+            <a:spAutoFit/>
+          </a:bodyPr>
+          <a:lstStyle/>
+          <a:p>
+            <a:r>
+              <a:rPr lang="en-US" sz="1200" b="1" dirty="0" smtClean="0"/>
+              <a:t>Secure World [OPTEE]</a:t>
+            </a:r>
+            <a:endParaRPr lang="en-SG" sz="1200" b="1" dirty="0"/>
+          </a:p>
+        </p:txBody>
+      </p:sp>
+      <p:sp>
+        <p:nvSpPr>
+          <p:cNvPr id="28" name="TextBox 27"/>
+          <p:cNvSpPr txBox="1"/>
+          <p:nvPr/>
+        </p:nvSpPr>
+        <p:spPr>
+          <a:xfrm>
+            <a:off x="1186250" y="1860697"/>
+            <a:ext cx="2269331" cy="3139321"/>
+          </a:xfrm>
+          <a:prstGeom prst="rect">
+            <a:avLst/>
+          </a:prstGeom>
+          <a:solidFill>
+            <a:schemeClr val="accent1">
+              <a:lumMod val="20000"/>
+              <a:lumOff val="80000"/>
+            </a:schemeClr>
+          </a:solidFill>
+          <a:ln>
+            <a:solidFill>
+              <a:srgbClr val="002060"/>
+            </a:solidFill>
+          </a:ln>
+        </p:spPr>
+        <p:txBody>
+          <a:bodyPr wrap="square" rtlCol="0">
+            <a:spAutoFit/>
+          </a:bodyPr>
+          <a:lstStyle/>
+          <a:p>
+            <a:r>
+              <a:rPr lang="en-US" dirty="0" smtClean="0"/>
+              <a:t>Trust Application</a:t>
+            </a:r>
+            <a:endParaRPr lang="en-US" dirty="0"/>
+          </a:p>
+          <a:p>
+            <a:r>
+              <a:rPr lang="en-US" sz="800" dirty="0" smtClean="0"/>
+              <a:t>TA-UUID[7aaaf200-2450-11e4-abe2-0002a5d5c51b</a:t>
+            </a:r>
+            <a:r>
+              <a:rPr lang="en-US" sz="800" dirty="0"/>
+              <a:t>]</a:t>
+            </a:r>
+            <a:endParaRPr lang="en-US" sz="800" dirty="0" smtClean="0"/>
+          </a:p>
+          <a:p>
+            <a:pPr marL="285750" indent="-285750">
+              <a:buFontTx/>
+              <a:buChar char="-"/>
+            </a:pPr>
+            <a:r>
+              <a:rPr lang="en-US" sz="1000" dirty="0" smtClean="0"/>
+              <a:t>input: pointer(</a:t>
+            </a:r>
+            <a:r>
+              <a:rPr lang="en-US" sz="1000" dirty="0" err="1" smtClean="0"/>
+              <a:t>int</a:t>
+            </a:r>
+            <a:r>
+              <a:rPr lang="en-US" sz="1000" dirty="0" smtClean="0"/>
+              <a:t>)</a:t>
+            </a:r>
+          </a:p>
+          <a:p>
+            <a:pPr marL="285750" indent="-285750">
+              <a:buFontTx/>
+              <a:buChar char="-"/>
+            </a:pPr>
+            <a:r>
+              <a:rPr lang="en-US" sz="1000" dirty="0" smtClean="0"/>
+              <a:t>Output: TEE_SUCCESS/TEE_ERROR_XX</a:t>
+            </a:r>
+          </a:p>
+          <a:p>
+            <a:endParaRPr lang="en-US" sz="1000" dirty="0"/>
+          </a:p>
+          <a:p>
+            <a:r>
+              <a:rPr lang="en-US" sz="1000" dirty="0" smtClean="0"/>
+              <a:t>Action: </a:t>
+            </a:r>
+          </a:p>
+          <a:p>
+            <a:r>
+              <a:rPr lang="en-US" sz="1000" dirty="0" smtClean="0"/>
+              <a:t>1. Take pointer  </a:t>
+            </a:r>
+            <a:r>
+              <a:rPr lang="en-US" sz="1000" dirty="0" err="1" smtClean="0"/>
+              <a:t>int</a:t>
+            </a:r>
+            <a:r>
+              <a:rPr lang="en-US" sz="1000" dirty="0" smtClean="0"/>
+              <a:t> value a to simulation the SW-ATT input </a:t>
+            </a:r>
+            <a:r>
+              <a:rPr lang="en-US" sz="1000" dirty="0" err="1" smtClean="0"/>
+              <a:t>str</a:t>
+            </a:r>
+            <a:r>
+              <a:rPr lang="en-US" sz="1000" dirty="0" smtClean="0"/>
+              <a:t> value &lt;challenge&gt; </a:t>
+            </a:r>
+          </a:p>
+          <a:p>
+            <a:r>
+              <a:rPr lang="en-US" sz="1000" dirty="0" smtClean="0"/>
+              <a:t>2. </a:t>
+            </a:r>
+            <a:r>
+              <a:rPr lang="en-US" sz="1000" dirty="0" err="1" smtClean="0"/>
+              <a:t>Calcualte</a:t>
+            </a:r>
+            <a:r>
+              <a:rPr lang="en-US" sz="1000" dirty="0" smtClean="0"/>
+              <a:t> a + 100000 to simulation the process to calculate the SW-ATT </a:t>
+            </a:r>
+          </a:p>
+          <a:p>
+            <a:r>
+              <a:rPr lang="en-US" sz="1000" dirty="0" smtClean="0"/>
+              <a:t>3. Feed back normal work action 1 and 2 has </a:t>
+            </a:r>
+            <a:r>
+              <a:rPr lang="en-US" sz="1000" smtClean="0"/>
+              <a:t>been finished. </a:t>
+            </a:r>
+            <a:endParaRPr lang="en-US" sz="1000" dirty="0" smtClean="0"/>
+          </a:p>
+          <a:p>
+            <a:pPr marL="285750" indent="-285750">
+              <a:buFontTx/>
+              <a:buChar char="-"/>
+            </a:pPr>
+            <a:endParaRPr lang="en-US" dirty="0" smtClean="0"/>
+          </a:p>
+          <a:p>
+            <a:endParaRPr lang="en-US" dirty="0"/>
+          </a:p>
+          <a:p>
+            <a:endParaRPr lang="en-SG" dirty="0"/>
+          </a:p>
+        </p:txBody>
+      </p:sp>
+    </p:spTree>
+    <p:extLst>
+      <p:ext uri="{BB962C8B-B14F-4D97-AF65-F5344CB8AC3E}">
+        <p14:creationId xmlns:p14="http://schemas.microsoft.com/office/powerpoint/2010/main" val="317638769"/>
+      </p:ext>
+    </p:extLst>
+  </p:cSld>
+  <p:clrMapOvr>
+    <a:masterClrMapping/>
+  </p:clrMapOvr>
+</p:sld>
+</file>
+
 <file path=ppt/theme/theme1.xml><?xml version="1.0" encoding="utf-8"?>
 <a:theme xmlns:a="http://schemas.openxmlformats.org/drawingml/2006/main" name="Office Theme">
   <a:themeElements>

</xml_diff>

<commit_message>
Added the new design: optee_client_server_2019_06_15
</commit_message>
<xml_diff>
--- a/doc/firmwaresignWF.pptx
+++ b/doc/firmwaresignWF.pptx
@@ -4,12 +4,16 @@
   <p:sldMasterIdLst>
     <p:sldMasterId id="2147483648" r:id="rId1"/>
   </p:sldMasterIdLst>
+  <p:notesMasterIdLst>
+    <p:notesMasterId r:id="rId8"/>
+  </p:notesMasterIdLst>
   <p:sldIdLst>
     <p:sldId id="256" r:id="rId2"/>
     <p:sldId id="257" r:id="rId3"/>
     <p:sldId id="258" r:id="rId4"/>
     <p:sldId id="259" r:id="rId5"/>
     <p:sldId id="260" r:id="rId6"/>
+    <p:sldId id="261" r:id="rId7"/>
   </p:sldIdLst>
   <p:sldSz cx="12192000" cy="6858000"/>
   <p:notesSz cx="6858000" cy="9144000"/>
@@ -116,6 +120,440 @@
 </p:presentation>
 </file>
 
+<file path=ppt/notesMasters/notesMaster1.xml><?xml version="1.0" encoding="utf-8"?>
+<p:notesMaster xmlns:a="http://schemas.openxmlformats.org/drawingml/2006/main" xmlns:r="http://schemas.openxmlformats.org/officeDocument/2006/relationships" xmlns:p="http://schemas.openxmlformats.org/presentationml/2006/main">
+  <p:cSld>
+    <p:bg>
+      <p:bgRef idx="1001">
+        <a:schemeClr val="bg1"/>
+      </p:bgRef>
+    </p:bg>
+    <p:spTree>
+      <p:nvGrpSpPr>
+        <p:cNvPr id="1" name=""/>
+        <p:cNvGrpSpPr/>
+        <p:nvPr/>
+      </p:nvGrpSpPr>
+      <p:grpSpPr>
+        <a:xfrm>
+          <a:off x="0" y="0"/>
+          <a:ext cx="0" cy="0"/>
+          <a:chOff x="0" y="0"/>
+          <a:chExt cx="0" cy="0"/>
+        </a:xfrm>
+      </p:grpSpPr>
+      <p:sp>
+        <p:nvSpPr>
+          <p:cNvPr id="2" name="Header Placeholder 1"/>
+          <p:cNvSpPr>
+            <a:spLocks noGrp="1"/>
+          </p:cNvSpPr>
+          <p:nvPr>
+            <p:ph type="hdr" sz="quarter"/>
+          </p:nvPr>
+        </p:nvSpPr>
+        <p:spPr>
+          <a:xfrm>
+            <a:off x="0" y="0"/>
+            <a:ext cx="2971800" cy="458788"/>
+          </a:xfrm>
+          <a:prstGeom prst="rect">
+            <a:avLst/>
+          </a:prstGeom>
+        </p:spPr>
+        <p:txBody>
+          <a:bodyPr vert="horz" lIns="91440" tIns="45720" rIns="91440" bIns="45720" rtlCol="0"/>
+          <a:lstStyle>
+            <a:lvl1pPr algn="l">
+              <a:defRPr sz="1200"/>
+            </a:lvl1pPr>
+          </a:lstStyle>
+          <a:p>
+            <a:endParaRPr lang="en-SG"/>
+          </a:p>
+        </p:txBody>
+      </p:sp>
+      <p:sp>
+        <p:nvSpPr>
+          <p:cNvPr id="3" name="Date Placeholder 2"/>
+          <p:cNvSpPr>
+            <a:spLocks noGrp="1"/>
+          </p:cNvSpPr>
+          <p:nvPr>
+            <p:ph type="dt" idx="1"/>
+          </p:nvPr>
+        </p:nvSpPr>
+        <p:spPr>
+          <a:xfrm>
+            <a:off x="3884613" y="0"/>
+            <a:ext cx="2971800" cy="458788"/>
+          </a:xfrm>
+          <a:prstGeom prst="rect">
+            <a:avLst/>
+          </a:prstGeom>
+        </p:spPr>
+        <p:txBody>
+          <a:bodyPr vert="horz" lIns="91440" tIns="45720" rIns="91440" bIns="45720" rtlCol="0"/>
+          <a:lstStyle>
+            <a:lvl1pPr algn="r">
+              <a:defRPr sz="1200"/>
+            </a:lvl1pPr>
+          </a:lstStyle>
+          <a:p>
+            <a:fld id="{32DA1F5A-E23E-4D9B-B8D0-40D8909182CC}" type="datetimeFigureOut">
+              <a:rPr lang="en-SG" smtClean="0"/>
+              <a:t>17/6/2019</a:t>
+            </a:fld>
+            <a:endParaRPr lang="en-SG"/>
+          </a:p>
+        </p:txBody>
+      </p:sp>
+      <p:sp>
+        <p:nvSpPr>
+          <p:cNvPr id="4" name="Slide Image Placeholder 3"/>
+          <p:cNvSpPr>
+            <a:spLocks noGrp="1" noRot="1" noChangeAspect="1"/>
+          </p:cNvSpPr>
+          <p:nvPr>
+            <p:ph type="sldImg" idx="2"/>
+          </p:nvPr>
+        </p:nvSpPr>
+        <p:spPr>
+          <a:xfrm>
+            <a:off x="685800" y="1143000"/>
+            <a:ext cx="5486400" cy="3086100"/>
+          </a:xfrm>
+          <a:prstGeom prst="rect">
+            <a:avLst/>
+          </a:prstGeom>
+          <a:noFill/>
+          <a:ln w="12700">
+            <a:solidFill>
+              <a:prstClr val="black"/>
+            </a:solidFill>
+          </a:ln>
+        </p:spPr>
+        <p:txBody>
+          <a:bodyPr vert="horz" lIns="91440" tIns="45720" rIns="91440" bIns="45720" rtlCol="0" anchor="ctr"/>
+          <a:lstStyle/>
+          <a:p>
+            <a:endParaRPr lang="en-SG"/>
+          </a:p>
+        </p:txBody>
+      </p:sp>
+      <p:sp>
+        <p:nvSpPr>
+          <p:cNvPr id="5" name="Notes Placeholder 4"/>
+          <p:cNvSpPr>
+            <a:spLocks noGrp="1"/>
+          </p:cNvSpPr>
+          <p:nvPr>
+            <p:ph type="body" sz="quarter" idx="3"/>
+          </p:nvPr>
+        </p:nvSpPr>
+        <p:spPr>
+          <a:xfrm>
+            <a:off x="685800" y="4400550"/>
+            <a:ext cx="5486400" cy="3600450"/>
+          </a:xfrm>
+          <a:prstGeom prst="rect">
+            <a:avLst/>
+          </a:prstGeom>
+        </p:spPr>
+        <p:txBody>
+          <a:bodyPr vert="horz" lIns="91440" tIns="45720" rIns="91440" bIns="45720" rtlCol="0"/>
+          <a:lstStyle/>
+          <a:p>
+            <a:pPr lvl="0"/>
+            <a:r>
+              <a:rPr lang="en-US" smtClean="0"/>
+              <a:t>Edit Master text styles</a:t>
+            </a:r>
+          </a:p>
+          <a:p>
+            <a:pPr lvl="1"/>
+            <a:r>
+              <a:rPr lang="en-US" smtClean="0"/>
+              <a:t>Second level</a:t>
+            </a:r>
+          </a:p>
+          <a:p>
+            <a:pPr lvl="2"/>
+            <a:r>
+              <a:rPr lang="en-US" smtClean="0"/>
+              <a:t>Third level</a:t>
+            </a:r>
+          </a:p>
+          <a:p>
+            <a:pPr lvl="3"/>
+            <a:r>
+              <a:rPr lang="en-US" smtClean="0"/>
+              <a:t>Fourth level</a:t>
+            </a:r>
+          </a:p>
+          <a:p>
+            <a:pPr lvl="4"/>
+            <a:r>
+              <a:rPr lang="en-US" smtClean="0"/>
+              <a:t>Fifth level</a:t>
+            </a:r>
+            <a:endParaRPr lang="en-SG"/>
+          </a:p>
+        </p:txBody>
+      </p:sp>
+      <p:sp>
+        <p:nvSpPr>
+          <p:cNvPr id="6" name="Footer Placeholder 5"/>
+          <p:cNvSpPr>
+            <a:spLocks noGrp="1"/>
+          </p:cNvSpPr>
+          <p:nvPr>
+            <p:ph type="ftr" sz="quarter" idx="4"/>
+          </p:nvPr>
+        </p:nvSpPr>
+        <p:spPr>
+          <a:xfrm>
+            <a:off x="0" y="8685213"/>
+            <a:ext cx="2971800" cy="458787"/>
+          </a:xfrm>
+          <a:prstGeom prst="rect">
+            <a:avLst/>
+          </a:prstGeom>
+        </p:spPr>
+        <p:txBody>
+          <a:bodyPr vert="horz" lIns="91440" tIns="45720" rIns="91440" bIns="45720" rtlCol="0" anchor="b"/>
+          <a:lstStyle>
+            <a:lvl1pPr algn="l">
+              <a:defRPr sz="1200"/>
+            </a:lvl1pPr>
+          </a:lstStyle>
+          <a:p>
+            <a:endParaRPr lang="en-SG"/>
+          </a:p>
+        </p:txBody>
+      </p:sp>
+      <p:sp>
+        <p:nvSpPr>
+          <p:cNvPr id="7" name="Slide Number Placeholder 6"/>
+          <p:cNvSpPr>
+            <a:spLocks noGrp="1"/>
+          </p:cNvSpPr>
+          <p:nvPr>
+            <p:ph type="sldNum" sz="quarter" idx="5"/>
+          </p:nvPr>
+        </p:nvSpPr>
+        <p:spPr>
+          <a:xfrm>
+            <a:off x="3884613" y="8685213"/>
+            <a:ext cx="2971800" cy="458787"/>
+          </a:xfrm>
+          <a:prstGeom prst="rect">
+            <a:avLst/>
+          </a:prstGeom>
+        </p:spPr>
+        <p:txBody>
+          <a:bodyPr vert="horz" lIns="91440" tIns="45720" rIns="91440" bIns="45720" rtlCol="0" anchor="b"/>
+          <a:lstStyle>
+            <a:lvl1pPr algn="r">
+              <a:defRPr sz="1200"/>
+            </a:lvl1pPr>
+          </a:lstStyle>
+          <a:p>
+            <a:fld id="{620E605A-E658-4718-A0B0-0E0D18691EE8}" type="slidenum">
+              <a:rPr lang="en-SG" smtClean="0"/>
+              <a:t>‹#›</a:t>
+            </a:fld>
+            <a:endParaRPr lang="en-SG"/>
+          </a:p>
+        </p:txBody>
+      </p:sp>
+    </p:spTree>
+    <p:extLst>
+      <p:ext uri="{BB962C8B-B14F-4D97-AF65-F5344CB8AC3E}">
+        <p14:creationId xmlns:p14="http://schemas.microsoft.com/office/powerpoint/2010/main" val="2275085938"/>
+      </p:ext>
+    </p:extLst>
+  </p:cSld>
+  <p:clrMap bg1="lt1" tx1="dk1" bg2="lt2" tx2="dk2" accent1="accent1" accent2="accent2" accent3="accent3" accent4="accent4" accent5="accent5" accent6="accent6" hlink="hlink" folHlink="folHlink"/>
+  <p:notesStyle>
+    <a:lvl1pPr marL="0" algn="l" defTabSz="914400" rtl="0" eaLnBrk="1" latinLnBrk="0" hangingPunct="1">
+      <a:defRPr sz="1200" kern="1200">
+        <a:solidFill>
+          <a:schemeClr val="tx1"/>
+        </a:solidFill>
+        <a:latin typeface="+mn-lt"/>
+        <a:ea typeface="+mn-ea"/>
+        <a:cs typeface="+mn-cs"/>
+      </a:defRPr>
+    </a:lvl1pPr>
+    <a:lvl2pPr marL="457200" algn="l" defTabSz="914400" rtl="0" eaLnBrk="1" latinLnBrk="0" hangingPunct="1">
+      <a:defRPr sz="1200" kern="1200">
+        <a:solidFill>
+          <a:schemeClr val="tx1"/>
+        </a:solidFill>
+        <a:latin typeface="+mn-lt"/>
+        <a:ea typeface="+mn-ea"/>
+        <a:cs typeface="+mn-cs"/>
+      </a:defRPr>
+    </a:lvl2pPr>
+    <a:lvl3pPr marL="914400" algn="l" defTabSz="914400" rtl="0" eaLnBrk="1" latinLnBrk="0" hangingPunct="1">
+      <a:defRPr sz="1200" kern="1200">
+        <a:solidFill>
+          <a:schemeClr val="tx1"/>
+        </a:solidFill>
+        <a:latin typeface="+mn-lt"/>
+        <a:ea typeface="+mn-ea"/>
+        <a:cs typeface="+mn-cs"/>
+      </a:defRPr>
+    </a:lvl3pPr>
+    <a:lvl4pPr marL="1371600" algn="l" defTabSz="914400" rtl="0" eaLnBrk="1" latinLnBrk="0" hangingPunct="1">
+      <a:defRPr sz="1200" kern="1200">
+        <a:solidFill>
+          <a:schemeClr val="tx1"/>
+        </a:solidFill>
+        <a:latin typeface="+mn-lt"/>
+        <a:ea typeface="+mn-ea"/>
+        <a:cs typeface="+mn-cs"/>
+      </a:defRPr>
+    </a:lvl4pPr>
+    <a:lvl5pPr marL="1828800" algn="l" defTabSz="914400" rtl="0" eaLnBrk="1" latinLnBrk="0" hangingPunct="1">
+      <a:defRPr sz="1200" kern="1200">
+        <a:solidFill>
+          <a:schemeClr val="tx1"/>
+        </a:solidFill>
+        <a:latin typeface="+mn-lt"/>
+        <a:ea typeface="+mn-ea"/>
+        <a:cs typeface="+mn-cs"/>
+      </a:defRPr>
+    </a:lvl5pPr>
+    <a:lvl6pPr marL="2286000" algn="l" defTabSz="914400" rtl="0" eaLnBrk="1" latinLnBrk="0" hangingPunct="1">
+      <a:defRPr sz="1200" kern="1200">
+        <a:solidFill>
+          <a:schemeClr val="tx1"/>
+        </a:solidFill>
+        <a:latin typeface="+mn-lt"/>
+        <a:ea typeface="+mn-ea"/>
+        <a:cs typeface="+mn-cs"/>
+      </a:defRPr>
+    </a:lvl6pPr>
+    <a:lvl7pPr marL="2743200" algn="l" defTabSz="914400" rtl="0" eaLnBrk="1" latinLnBrk="0" hangingPunct="1">
+      <a:defRPr sz="1200" kern="1200">
+        <a:solidFill>
+          <a:schemeClr val="tx1"/>
+        </a:solidFill>
+        <a:latin typeface="+mn-lt"/>
+        <a:ea typeface="+mn-ea"/>
+        <a:cs typeface="+mn-cs"/>
+      </a:defRPr>
+    </a:lvl7pPr>
+    <a:lvl8pPr marL="3200400" algn="l" defTabSz="914400" rtl="0" eaLnBrk="1" latinLnBrk="0" hangingPunct="1">
+      <a:defRPr sz="1200" kern="1200">
+        <a:solidFill>
+          <a:schemeClr val="tx1"/>
+        </a:solidFill>
+        <a:latin typeface="+mn-lt"/>
+        <a:ea typeface="+mn-ea"/>
+        <a:cs typeface="+mn-cs"/>
+      </a:defRPr>
+    </a:lvl8pPr>
+    <a:lvl9pPr marL="3657600" algn="l" defTabSz="914400" rtl="0" eaLnBrk="1" latinLnBrk="0" hangingPunct="1">
+      <a:defRPr sz="1200" kern="1200">
+        <a:solidFill>
+          <a:schemeClr val="tx1"/>
+        </a:solidFill>
+        <a:latin typeface="+mn-lt"/>
+        <a:ea typeface="+mn-ea"/>
+        <a:cs typeface="+mn-cs"/>
+      </a:defRPr>
+    </a:lvl9pPr>
+  </p:notesStyle>
+</p:notesMaster>
+</file>
+
+<file path=ppt/notesSlides/notesSlide1.xml><?xml version="1.0" encoding="utf-8"?>
+<p:notes xmlns:a="http://schemas.openxmlformats.org/drawingml/2006/main" xmlns:r="http://schemas.openxmlformats.org/officeDocument/2006/relationships" xmlns:p="http://schemas.openxmlformats.org/presentationml/2006/main">
+  <p:cSld>
+    <p:spTree>
+      <p:nvGrpSpPr>
+        <p:cNvPr id="1" name=""/>
+        <p:cNvGrpSpPr/>
+        <p:nvPr/>
+      </p:nvGrpSpPr>
+      <p:grpSpPr>
+        <a:xfrm>
+          <a:off x="0" y="0"/>
+          <a:ext cx="0" cy="0"/>
+          <a:chOff x="0" y="0"/>
+          <a:chExt cx="0" cy="0"/>
+        </a:xfrm>
+      </p:grpSpPr>
+      <p:sp>
+        <p:nvSpPr>
+          <p:cNvPr id="2" name="Slide Image Placeholder 1"/>
+          <p:cNvSpPr>
+            <a:spLocks noGrp="1" noRot="1" noChangeAspect="1"/>
+          </p:cNvSpPr>
+          <p:nvPr>
+            <p:ph type="sldImg"/>
+          </p:nvPr>
+        </p:nvSpPr>
+        <p:spPr/>
+      </p:sp>
+      <p:sp>
+        <p:nvSpPr>
+          <p:cNvPr id="3" name="Notes Placeholder 2"/>
+          <p:cNvSpPr>
+            <a:spLocks noGrp="1"/>
+          </p:cNvSpPr>
+          <p:nvPr>
+            <p:ph type="body" idx="1"/>
+          </p:nvPr>
+        </p:nvSpPr>
+        <p:spPr/>
+        <p:txBody>
+          <a:bodyPr/>
+          <a:lstStyle/>
+          <a:p>
+            <a:endParaRPr lang="en-SG" dirty="0"/>
+          </a:p>
+        </p:txBody>
+      </p:sp>
+      <p:sp>
+        <p:nvSpPr>
+          <p:cNvPr id="4" name="Slide Number Placeholder 3"/>
+          <p:cNvSpPr>
+            <a:spLocks noGrp="1"/>
+          </p:cNvSpPr>
+          <p:nvPr>
+            <p:ph type="sldNum" sz="quarter" idx="10"/>
+          </p:nvPr>
+        </p:nvSpPr>
+        <p:spPr/>
+        <p:txBody>
+          <a:bodyPr/>
+          <a:lstStyle/>
+          <a:p>
+            <a:fld id="{620E605A-E658-4718-A0B0-0E0D18691EE8}" type="slidenum">
+              <a:rPr lang="en-SG" smtClean="0"/>
+              <a:t>6</a:t>
+            </a:fld>
+            <a:endParaRPr lang="en-SG"/>
+          </a:p>
+        </p:txBody>
+      </p:sp>
+    </p:spTree>
+    <p:extLst>
+      <p:ext uri="{BB962C8B-B14F-4D97-AF65-F5344CB8AC3E}">
+        <p14:creationId xmlns:p14="http://schemas.microsoft.com/office/powerpoint/2010/main" val="1131395066"/>
+      </p:ext>
+    </p:extLst>
+  </p:cSld>
+  <p:clrMapOvr>
+    <a:masterClrMapping/>
+  </p:clrMapOvr>
+</p:notes>
+</file>
+
 <file path=ppt/slideLayouts/slideLayout1.xml><?xml version="1.0" encoding="utf-8"?>
 <p:sldLayout xmlns:a="http://schemas.openxmlformats.org/drawingml/2006/main" xmlns:r="http://schemas.openxmlformats.org/officeDocument/2006/relationships" xmlns:p="http://schemas.openxmlformats.org/presentationml/2006/main" type="title" preserve="1">
   <p:cSld name="Title Slide">
@@ -247,7 +685,7 @@
           <a:p>
             <a:fld id="{168FC4C3-6B25-48E2-93F9-24A255A41CA9}" type="datetimeFigureOut">
               <a:rPr lang="en-SG" smtClean="0"/>
-              <a:t>31/5/2019</a:t>
+              <a:t>17/6/2019</a:t>
             </a:fld>
             <a:endParaRPr lang="en-SG"/>
           </a:p>
@@ -417,7 +855,7 @@
           <a:p>
             <a:fld id="{168FC4C3-6B25-48E2-93F9-24A255A41CA9}" type="datetimeFigureOut">
               <a:rPr lang="en-SG" smtClean="0"/>
-              <a:t>31/5/2019</a:t>
+              <a:t>17/6/2019</a:t>
             </a:fld>
             <a:endParaRPr lang="en-SG"/>
           </a:p>
@@ -597,7 +1035,7 @@
           <a:p>
             <a:fld id="{168FC4C3-6B25-48E2-93F9-24A255A41CA9}" type="datetimeFigureOut">
               <a:rPr lang="en-SG" smtClean="0"/>
-              <a:t>31/5/2019</a:t>
+              <a:t>17/6/2019</a:t>
             </a:fld>
             <a:endParaRPr lang="en-SG"/>
           </a:p>
@@ -767,7 +1205,7 @@
           <a:p>
             <a:fld id="{168FC4C3-6B25-48E2-93F9-24A255A41CA9}" type="datetimeFigureOut">
               <a:rPr lang="en-SG" smtClean="0"/>
-              <a:t>31/5/2019</a:t>
+              <a:t>17/6/2019</a:t>
             </a:fld>
             <a:endParaRPr lang="en-SG"/>
           </a:p>
@@ -1013,7 +1451,7 @@
           <a:p>
             <a:fld id="{168FC4C3-6B25-48E2-93F9-24A255A41CA9}" type="datetimeFigureOut">
               <a:rPr lang="en-SG" smtClean="0"/>
-              <a:t>31/5/2019</a:t>
+              <a:t>17/6/2019</a:t>
             </a:fld>
             <a:endParaRPr lang="en-SG"/>
           </a:p>
@@ -1245,7 +1683,7 @@
           <a:p>
             <a:fld id="{168FC4C3-6B25-48E2-93F9-24A255A41CA9}" type="datetimeFigureOut">
               <a:rPr lang="en-SG" smtClean="0"/>
-              <a:t>31/5/2019</a:t>
+              <a:t>17/6/2019</a:t>
             </a:fld>
             <a:endParaRPr lang="en-SG"/>
           </a:p>
@@ -1612,7 +2050,7 @@
           <a:p>
             <a:fld id="{168FC4C3-6B25-48E2-93F9-24A255A41CA9}" type="datetimeFigureOut">
               <a:rPr lang="en-SG" smtClean="0"/>
-              <a:t>31/5/2019</a:t>
+              <a:t>17/6/2019</a:t>
             </a:fld>
             <a:endParaRPr lang="en-SG"/>
           </a:p>
@@ -1730,7 +2168,7 @@
           <a:p>
             <a:fld id="{168FC4C3-6B25-48E2-93F9-24A255A41CA9}" type="datetimeFigureOut">
               <a:rPr lang="en-SG" smtClean="0"/>
-              <a:t>31/5/2019</a:t>
+              <a:t>17/6/2019</a:t>
             </a:fld>
             <a:endParaRPr lang="en-SG"/>
           </a:p>
@@ -1825,7 +2263,7 @@
           <a:p>
             <a:fld id="{168FC4C3-6B25-48E2-93F9-24A255A41CA9}" type="datetimeFigureOut">
               <a:rPr lang="en-SG" smtClean="0"/>
-              <a:t>31/5/2019</a:t>
+              <a:t>17/6/2019</a:t>
             </a:fld>
             <a:endParaRPr lang="en-SG"/>
           </a:p>
@@ -2102,7 +2540,7 @@
           <a:p>
             <a:fld id="{168FC4C3-6B25-48E2-93F9-24A255A41CA9}" type="datetimeFigureOut">
               <a:rPr lang="en-SG" smtClean="0"/>
-              <a:t>31/5/2019</a:t>
+              <a:t>17/6/2019</a:t>
             </a:fld>
             <a:endParaRPr lang="en-SG"/>
           </a:p>
@@ -2355,7 +2793,7 @@
           <a:p>
             <a:fld id="{168FC4C3-6B25-48E2-93F9-24A255A41CA9}" type="datetimeFigureOut">
               <a:rPr lang="en-SG" smtClean="0"/>
-              <a:t>31/5/2019</a:t>
+              <a:t>17/6/2019</a:t>
             </a:fld>
             <a:endParaRPr lang="en-SG"/>
           </a:p>
@@ -2568,7 +3006,7 @@
           <a:p>
             <a:fld id="{168FC4C3-6B25-48E2-93F9-24A255A41CA9}" type="datetimeFigureOut">
               <a:rPr lang="en-SG" smtClean="0"/>
-              <a:t>31/5/2019</a:t>
+              <a:t>17/6/2019</a:t>
             </a:fld>
             <a:endParaRPr lang="en-SG"/>
           </a:p>
@@ -12701,11 +13139,7 @@
           <a:p>
             <a:r>
               <a:rPr lang="en-US" dirty="0" smtClean="0"/>
-              <a:t>OPTEE trust application [client &lt;-&gt; server ] </a:t>
-            </a:r>
-            <a:r>
-              <a:rPr lang="en-US" dirty="0" smtClean="0"/>
-              <a:t>design(31/05/2019</a:t>
+              <a:t>OPTEE trust application [client &lt;-&gt; server ] design(31/05/2019</a:t>
             </a:r>
             <a:r>
               <a:rPr lang="en-US" dirty="0"/>
@@ -12979,7 +13413,6 @@
               <a:rPr lang="en-US" sz="1000" dirty="0" smtClean="0"/>
               <a:t>]</a:t>
             </a:r>
-            <a:endParaRPr lang="en-US" sz="1000" dirty="0" smtClean="0"/>
           </a:p>
         </p:txBody>
       </p:sp>
@@ -13594,15 +14027,7 @@
           <a:p>
             <a:r>
               <a:rPr lang="en-US" sz="800" b="1" dirty="0" smtClean="0"/>
-              <a:t>2. </a:t>
-            </a:r>
-            <a:r>
-              <a:rPr lang="en-US" sz="800" b="1" dirty="0" smtClean="0"/>
-              <a:t>OPTEE session </a:t>
-            </a:r>
-            <a:r>
-              <a:rPr lang="en-US" sz="800" b="1" dirty="0" smtClean="0"/>
-              <a:t>confirm </a:t>
+              <a:t>2. OPTEE session confirm </a:t>
             </a:r>
             <a:endParaRPr lang="en-SG" sz="800" b="1" dirty="0"/>
           </a:p>
@@ -13682,11 +14107,7 @@
             </a:r>
             <a:r>
               <a:rPr lang="en-US" sz="800" b="1" dirty="0" smtClean="0"/>
-              <a:t>. Start normal TCP </a:t>
-            </a:r>
-            <a:r>
-              <a:rPr lang="en-US" sz="800" b="1" dirty="0" smtClean="0"/>
-              <a:t>client [5007]</a:t>
+              <a:t>. Start normal TCP client [5007]</a:t>
             </a:r>
             <a:endParaRPr lang="en-SG" sz="800" b="1" dirty="0"/>
           </a:p>
@@ -13829,11 +14250,7 @@
             </a:r>
             <a:r>
               <a:rPr lang="en-US" sz="800" b="1" dirty="0" smtClean="0"/>
-              <a:t>. Fetch random SWATT challenge </a:t>
-            </a:r>
-            <a:r>
-              <a:rPr lang="en-US" sz="800" b="1" dirty="0" smtClean="0"/>
-              <a:t>string request </a:t>
+              <a:t>. Fetch random SWATT challenge string request </a:t>
             </a:r>
             <a:endParaRPr lang="en-SG" sz="800" b="1" dirty="0"/>
           </a:p>
@@ -13947,11 +14364,7 @@
           <a:p>
             <a:r>
               <a:rPr lang="en-US" sz="800" b="1" dirty="0" smtClean="0"/>
-              <a:t>6.  Call OPTEE  Invoke </a:t>
-            </a:r>
-            <a:r>
-              <a:rPr lang="en-US" sz="800" b="1" dirty="0" smtClean="0"/>
-              <a:t>AES decrypt request  and get challenge </a:t>
+              <a:t>6.  Call OPTEE  Invoke AES decrypt request  and get challenge </a:t>
             </a:r>
             <a:endParaRPr lang="en-SG" sz="800" b="1" dirty="0"/>
           </a:p>
@@ -14381,11 +14794,7 @@
           <a:p>
             <a:r>
               <a:rPr lang="en-US" sz="800" dirty="0" smtClean="0"/>
-              <a:t>9</a:t>
-            </a:r>
-            <a:r>
-              <a:rPr lang="en-US" sz="800" dirty="0" smtClean="0"/>
-              <a:t>. </a:t>
+              <a:t>9. </a:t>
             </a:r>
             <a:r>
               <a:rPr lang="en-US" sz="800" b="1" dirty="0"/>
@@ -14651,11 +15060,7 @@
           <a:p>
             <a:r>
               <a:rPr lang="en-US" dirty="0" smtClean="0"/>
-              <a:t>OPTEE trust application [client &lt;-&gt; server ] </a:t>
-            </a:r>
-            <a:r>
-              <a:rPr lang="en-US" dirty="0" smtClean="0"/>
-              <a:t>design(29/05/2019) </a:t>
+              <a:t>OPTEE trust application [client &lt;-&gt; server ] design(29/05/2019) </a:t>
             </a:r>
             <a:endParaRPr lang="en-SG" dirty="0"/>
           </a:p>
@@ -15833,11 +16238,7 @@
             </a:r>
             <a:r>
               <a:rPr lang="en-US" sz="800" b="1" dirty="0" smtClean="0"/>
-              <a:t>Created </a:t>
-            </a:r>
-            <a:r>
-              <a:rPr lang="en-US" sz="800" b="1" dirty="0" smtClean="0"/>
-              <a:t>the encrypted bytes</a:t>
+              <a:t>Created the encrypted bytes</a:t>
             </a:r>
             <a:endParaRPr lang="en-SG" sz="800" b="1" dirty="0"/>
           </a:p>
@@ -15913,11 +16314,7 @@
           <a:p>
             <a:r>
               <a:rPr lang="en-US" sz="800" b="1" dirty="0" smtClean="0"/>
-              <a:t>6.  Call OPTEE  Invoke </a:t>
-            </a:r>
-            <a:r>
-              <a:rPr lang="en-US" sz="800" b="1" dirty="0" smtClean="0"/>
-              <a:t>AES decrypt</a:t>
+              <a:t>6.  Call OPTEE  Invoke AES decrypt</a:t>
             </a:r>
             <a:endParaRPr lang="en-SG" sz="800" b="1" dirty="0"/>
           </a:p>
@@ -16280,6 +16677,3175 @@
     <p:extLst>
       <p:ext uri="{BB962C8B-B14F-4D97-AF65-F5344CB8AC3E}">
         <p14:creationId xmlns:p14="http://schemas.microsoft.com/office/powerpoint/2010/main" val="3325793547"/>
+      </p:ext>
+    </p:extLst>
+  </p:cSld>
+  <p:clrMapOvr>
+    <a:masterClrMapping/>
+  </p:clrMapOvr>
+</p:sld>
+</file>
+
+<file path=ppt/slides/slide6.xml><?xml version="1.0" encoding="utf-8"?>
+<p:sld xmlns:a="http://schemas.openxmlformats.org/drawingml/2006/main" xmlns:r="http://schemas.openxmlformats.org/officeDocument/2006/relationships" xmlns:p="http://schemas.openxmlformats.org/presentationml/2006/main">
+  <p:cSld>
+    <p:spTree>
+      <p:nvGrpSpPr>
+        <p:cNvPr id="1" name=""/>
+        <p:cNvGrpSpPr/>
+        <p:nvPr/>
+      </p:nvGrpSpPr>
+      <p:grpSpPr>
+        <a:xfrm>
+          <a:off x="0" y="0"/>
+          <a:ext cx="0" cy="0"/>
+          <a:chOff x="0" y="0"/>
+          <a:chExt cx="0" cy="0"/>
+        </a:xfrm>
+      </p:grpSpPr>
+      <p:sp>
+        <p:nvSpPr>
+          <p:cNvPr id="16" name="Rectangle 15"/>
+          <p:cNvSpPr/>
+          <p:nvPr/>
+        </p:nvSpPr>
+        <p:spPr>
+          <a:xfrm>
+            <a:off x="130683" y="854146"/>
+            <a:ext cx="7857423" cy="5881302"/>
+          </a:xfrm>
+          <a:prstGeom prst="rect">
+            <a:avLst/>
+          </a:prstGeom>
+          <a:ln w="19050"/>
+        </p:spPr>
+        <p:style>
+          <a:lnRef idx="2">
+            <a:schemeClr val="accent1"/>
+          </a:lnRef>
+          <a:fillRef idx="1">
+            <a:schemeClr val="lt1"/>
+          </a:fillRef>
+          <a:effectRef idx="0">
+            <a:schemeClr val="accent1"/>
+          </a:effectRef>
+          <a:fontRef idx="minor">
+            <a:schemeClr val="dk1"/>
+          </a:fontRef>
+        </p:style>
+        <p:txBody>
+          <a:bodyPr rtlCol="0" anchor="ctr"/>
+          <a:lstStyle/>
+          <a:p>
+            <a:endParaRPr lang="en-SG"/>
+          </a:p>
+        </p:txBody>
+      </p:sp>
+      <p:sp>
+        <p:nvSpPr>
+          <p:cNvPr id="54" name="TextBox 53"/>
+          <p:cNvSpPr txBox="1"/>
+          <p:nvPr/>
+        </p:nvSpPr>
+        <p:spPr>
+          <a:xfrm>
+            <a:off x="3565762" y="1240290"/>
+            <a:ext cx="3965633" cy="3508653"/>
+          </a:xfrm>
+          <a:prstGeom prst="rect">
+            <a:avLst/>
+          </a:prstGeom>
+          <a:solidFill>
+            <a:schemeClr val="accent1">
+              <a:lumMod val="20000"/>
+              <a:lumOff val="80000"/>
+            </a:schemeClr>
+          </a:solidFill>
+          <a:ln>
+            <a:solidFill>
+              <a:srgbClr val="002060"/>
+            </a:solidFill>
+          </a:ln>
+        </p:spPr>
+        <p:txBody>
+          <a:bodyPr wrap="square" rtlCol="0">
+            <a:spAutoFit/>
+          </a:bodyPr>
+          <a:lstStyle/>
+          <a:p>
+            <a:r>
+              <a:rPr lang="en-US" sz="1200" b="1" dirty="0" smtClean="0"/>
+              <a:t>Client  Application</a:t>
+            </a:r>
+            <a:endParaRPr lang="en-US" sz="1200" b="1" dirty="0"/>
+          </a:p>
+          <a:p>
+            <a:endParaRPr lang="en-US" sz="1000" dirty="0" smtClean="0"/>
+          </a:p>
+          <a:p>
+            <a:endParaRPr lang="en-US" sz="1000" dirty="0"/>
+          </a:p>
+          <a:p>
+            <a:endParaRPr lang="en-US" sz="1000" dirty="0" smtClean="0"/>
+          </a:p>
+          <a:p>
+            <a:endParaRPr lang="en-US" sz="1000" dirty="0"/>
+          </a:p>
+          <a:p>
+            <a:endParaRPr lang="en-US" sz="1000" dirty="0" smtClean="0"/>
+          </a:p>
+          <a:p>
+            <a:endParaRPr lang="en-US" sz="1000" dirty="0"/>
+          </a:p>
+          <a:p>
+            <a:endParaRPr lang="en-US" sz="1000" dirty="0" smtClean="0"/>
+          </a:p>
+          <a:p>
+            <a:endParaRPr lang="en-US" sz="1000" dirty="0"/>
+          </a:p>
+          <a:p>
+            <a:endParaRPr lang="en-US" sz="1000" dirty="0" smtClean="0"/>
+          </a:p>
+          <a:p>
+            <a:endParaRPr lang="en-US" sz="1000" dirty="0"/>
+          </a:p>
+          <a:p>
+            <a:endParaRPr lang="en-US" sz="1000" dirty="0" smtClean="0"/>
+          </a:p>
+          <a:p>
+            <a:endParaRPr lang="en-US" sz="1000" dirty="0" smtClean="0"/>
+          </a:p>
+          <a:p>
+            <a:endParaRPr lang="en-US" sz="1000" dirty="0"/>
+          </a:p>
+          <a:p>
+            <a:endParaRPr lang="en-US" sz="1000" dirty="0" smtClean="0"/>
+          </a:p>
+          <a:p>
+            <a:endParaRPr lang="en-US" sz="1000" dirty="0"/>
+          </a:p>
+          <a:p>
+            <a:endParaRPr lang="en-US" sz="1000" dirty="0" smtClean="0"/>
+          </a:p>
+          <a:p>
+            <a:endParaRPr lang="en-US" sz="1000" dirty="0"/>
+          </a:p>
+          <a:p>
+            <a:endParaRPr lang="en-US" sz="1000" dirty="0" smtClean="0"/>
+          </a:p>
+          <a:p>
+            <a:endParaRPr lang="en-US" sz="1000" dirty="0" smtClean="0"/>
+          </a:p>
+          <a:p>
+            <a:endParaRPr lang="en-US" sz="1000" dirty="0"/>
+          </a:p>
+          <a:p>
+            <a:endParaRPr lang="en-US" sz="1000" dirty="0"/>
+          </a:p>
+        </p:txBody>
+      </p:sp>
+      <p:sp>
+        <p:nvSpPr>
+          <p:cNvPr id="4" name="TextBox 3"/>
+          <p:cNvSpPr txBox="1"/>
+          <p:nvPr/>
+        </p:nvSpPr>
+        <p:spPr>
+          <a:xfrm>
+            <a:off x="1320799" y="327378"/>
+            <a:ext cx="6470651" cy="369332"/>
+          </a:xfrm>
+          <a:prstGeom prst="rect">
+            <a:avLst/>
+          </a:prstGeom>
+          <a:noFill/>
+        </p:spPr>
+        <p:txBody>
+          <a:bodyPr wrap="square" rtlCol="0">
+            <a:spAutoFit/>
+          </a:bodyPr>
+          <a:lstStyle/>
+          <a:p>
+            <a:r>
+              <a:rPr lang="en-US" dirty="0" smtClean="0"/>
+              <a:t>OPTEE trust application [client &lt;-&gt; server ] </a:t>
+            </a:r>
+            <a:r>
+              <a:rPr lang="en-US" dirty="0" smtClean="0"/>
+              <a:t>design(15/06/2019</a:t>
+            </a:r>
+            <a:r>
+              <a:rPr lang="en-US" dirty="0" smtClean="0"/>
+              <a:t>) </a:t>
+            </a:r>
+            <a:endParaRPr lang="en-SG" dirty="0"/>
+          </a:p>
+        </p:txBody>
+      </p:sp>
+      <p:cxnSp>
+        <p:nvCxnSpPr>
+          <p:cNvPr id="14" name="Straight Connector 13"/>
+          <p:cNvCxnSpPr/>
+          <p:nvPr/>
+        </p:nvCxnSpPr>
+        <p:spPr>
+          <a:xfrm>
+            <a:off x="8411326" y="386262"/>
+            <a:ext cx="54604" cy="6471738"/>
+          </a:xfrm>
+          <a:prstGeom prst="line">
+            <a:avLst/>
+          </a:prstGeom>
+          <a:ln>
+            <a:prstDash val="dash"/>
+          </a:ln>
+        </p:spPr>
+        <p:style>
+          <a:lnRef idx="1">
+            <a:schemeClr val="accent1"/>
+          </a:lnRef>
+          <a:fillRef idx="0">
+            <a:schemeClr val="accent1"/>
+          </a:fillRef>
+          <a:effectRef idx="0">
+            <a:schemeClr val="accent1"/>
+          </a:effectRef>
+          <a:fontRef idx="minor">
+            <a:schemeClr val="tx1"/>
+          </a:fontRef>
+        </p:style>
+      </p:cxnSp>
+      <p:sp>
+        <p:nvSpPr>
+          <p:cNvPr id="17" name="TextBox 16"/>
+          <p:cNvSpPr txBox="1"/>
+          <p:nvPr/>
+        </p:nvSpPr>
+        <p:spPr>
+          <a:xfrm>
+            <a:off x="101822" y="635793"/>
+            <a:ext cx="1772225" cy="276999"/>
+          </a:xfrm>
+          <a:prstGeom prst="rect">
+            <a:avLst/>
+          </a:prstGeom>
+          <a:noFill/>
+        </p:spPr>
+        <p:txBody>
+          <a:bodyPr wrap="square" rtlCol="0">
+            <a:spAutoFit/>
+          </a:bodyPr>
+          <a:lstStyle/>
+          <a:p>
+            <a:r>
+              <a:rPr lang="en-US" sz="1200" b="1" dirty="0" smtClean="0"/>
+              <a:t>Raspberry PI mode 3</a:t>
+            </a:r>
+            <a:endParaRPr lang="en-SG" sz="1200" b="1" dirty="0"/>
+          </a:p>
+        </p:txBody>
+      </p:sp>
+      <p:cxnSp>
+        <p:nvCxnSpPr>
+          <p:cNvPr id="19" name="Straight Connector 18"/>
+          <p:cNvCxnSpPr/>
+          <p:nvPr/>
+        </p:nvCxnSpPr>
+        <p:spPr>
+          <a:xfrm flipH="1">
+            <a:off x="3345776" y="854146"/>
+            <a:ext cx="1" cy="5723866"/>
+          </a:xfrm>
+          <a:prstGeom prst="line">
+            <a:avLst/>
+          </a:prstGeom>
+          <a:ln w="19050">
+            <a:prstDash val="dash"/>
+          </a:ln>
+        </p:spPr>
+        <p:style>
+          <a:lnRef idx="1">
+            <a:schemeClr val="accent1"/>
+          </a:lnRef>
+          <a:fillRef idx="0">
+            <a:schemeClr val="accent1"/>
+          </a:fillRef>
+          <a:effectRef idx="0">
+            <a:schemeClr val="accent1"/>
+          </a:effectRef>
+          <a:fontRef idx="minor">
+            <a:schemeClr val="tx1"/>
+          </a:fontRef>
+        </p:style>
+      </p:cxnSp>
+      <p:sp>
+        <p:nvSpPr>
+          <p:cNvPr id="27" name="TextBox 26"/>
+          <p:cNvSpPr txBox="1"/>
+          <p:nvPr/>
+        </p:nvSpPr>
+        <p:spPr>
+          <a:xfrm>
+            <a:off x="182140" y="899990"/>
+            <a:ext cx="1772225" cy="276999"/>
+          </a:xfrm>
+          <a:prstGeom prst="rect">
+            <a:avLst/>
+          </a:prstGeom>
+          <a:noFill/>
+        </p:spPr>
+        <p:txBody>
+          <a:bodyPr wrap="square" rtlCol="0">
+            <a:spAutoFit/>
+          </a:bodyPr>
+          <a:lstStyle/>
+          <a:p>
+            <a:r>
+              <a:rPr lang="en-US" sz="1200" b="1" dirty="0" smtClean="0"/>
+              <a:t>Secure World [OPTEE]</a:t>
+            </a:r>
+            <a:endParaRPr lang="en-SG" sz="1200" b="1" dirty="0"/>
+          </a:p>
+        </p:txBody>
+      </p:sp>
+      <p:sp>
+        <p:nvSpPr>
+          <p:cNvPr id="28" name="TextBox 27"/>
+          <p:cNvSpPr txBox="1"/>
+          <p:nvPr/>
+        </p:nvSpPr>
+        <p:spPr>
+          <a:xfrm>
+            <a:off x="182140" y="1250100"/>
+            <a:ext cx="2933311" cy="3662541"/>
+          </a:xfrm>
+          <a:prstGeom prst="rect">
+            <a:avLst/>
+          </a:prstGeom>
+          <a:solidFill>
+            <a:schemeClr val="accent1">
+              <a:lumMod val="20000"/>
+              <a:lumOff val="80000"/>
+            </a:schemeClr>
+          </a:solidFill>
+          <a:ln>
+            <a:solidFill>
+              <a:srgbClr val="002060"/>
+            </a:solidFill>
+          </a:ln>
+        </p:spPr>
+        <p:txBody>
+          <a:bodyPr wrap="square" rtlCol="0">
+            <a:spAutoFit/>
+          </a:bodyPr>
+          <a:lstStyle/>
+          <a:p>
+            <a:r>
+              <a:rPr lang="en-US" sz="1200" b="1" dirty="0" smtClean="0"/>
+              <a:t>Trust </a:t>
+            </a:r>
+            <a:r>
+              <a:rPr lang="en-US" sz="1200" b="1" dirty="0" smtClean="0"/>
+              <a:t>Application</a:t>
+            </a:r>
+          </a:p>
+          <a:p>
+            <a:endParaRPr lang="en-US" sz="1000" b="1" dirty="0"/>
+          </a:p>
+          <a:p>
+            <a:r>
+              <a:rPr lang="en-US" sz="1000" dirty="0" smtClean="0"/>
+              <a:t>TA-UUID[7aaaf200-2450-11e4-abe2-0002a5d5c51b</a:t>
+            </a:r>
+            <a:r>
+              <a:rPr lang="en-US" sz="1000" dirty="0" smtClean="0"/>
+              <a:t>]</a:t>
+            </a:r>
+          </a:p>
+          <a:p>
+            <a:endParaRPr lang="en-US" sz="1000" dirty="0" smtClean="0"/>
+          </a:p>
+          <a:p>
+            <a:r>
+              <a:rPr lang="en-US" sz="1000" dirty="0" smtClean="0"/>
+              <a:t>Pre-stored Value: </a:t>
+            </a:r>
+          </a:p>
+          <a:p>
+            <a:pPr marL="171450" indent="-171450">
+              <a:buFontTx/>
+              <a:buChar char="-"/>
+            </a:pPr>
+            <a:r>
+              <a:rPr lang="en-US" sz="1000" dirty="0" smtClean="0"/>
+              <a:t>AES Key, AES IV</a:t>
+            </a:r>
+          </a:p>
+          <a:p>
+            <a:pPr marL="171450" indent="-171450">
+              <a:buFontTx/>
+              <a:buChar char="-"/>
+            </a:pPr>
+            <a:r>
+              <a:rPr lang="en-US" sz="1000" dirty="0" smtClean="0"/>
+              <a:t>Challenge String length</a:t>
+            </a:r>
+          </a:p>
+          <a:p>
+            <a:pPr marL="171450" indent="-171450">
+              <a:buFontTx/>
+              <a:buChar char="-"/>
+            </a:pPr>
+            <a:r>
+              <a:rPr lang="en-US" sz="1000" dirty="0" smtClean="0"/>
+              <a:t>SWATT calculation Iteration time [m]</a:t>
+            </a:r>
+          </a:p>
+          <a:p>
+            <a:pPr marL="171450" indent="-171450">
+              <a:buFontTx/>
+              <a:buChar char="-"/>
+            </a:pPr>
+            <a:r>
+              <a:rPr lang="en-US" sz="1000" dirty="0"/>
+              <a:t>Linear congruential </a:t>
+            </a:r>
+            <a:r>
+              <a:rPr lang="en-US" sz="1000" dirty="0" smtClean="0"/>
+              <a:t>random(BSD rand MAX and  seed offset )</a:t>
+            </a:r>
+          </a:p>
+          <a:p>
+            <a:pPr marL="171450" indent="-171450">
+              <a:buFontTx/>
+              <a:buChar char="-"/>
+            </a:pPr>
+            <a:r>
+              <a:rPr lang="en-US" sz="1000" dirty="0" smtClean="0"/>
+              <a:t>File address block range.</a:t>
+            </a:r>
+          </a:p>
+          <a:p>
+            <a:endParaRPr lang="en-US" sz="1000" dirty="0" smtClean="0"/>
+          </a:p>
+          <a:p>
+            <a:r>
+              <a:rPr lang="en-US" sz="1000" dirty="0" smtClean="0"/>
+              <a:t>Functions: </a:t>
+            </a:r>
+            <a:endParaRPr lang="en-US" sz="1000" dirty="0" smtClean="0"/>
+          </a:p>
+          <a:p>
+            <a:r>
+              <a:rPr lang="en-US" sz="1000" dirty="0" smtClean="0"/>
+              <a:t>1 - Accept the </a:t>
+            </a:r>
+            <a:r>
+              <a:rPr lang="en-US" sz="1000" dirty="0" err="1" smtClean="0"/>
+              <a:t>trustClient</a:t>
+            </a:r>
+            <a:r>
+              <a:rPr lang="en-US" sz="1000" dirty="0" smtClean="0"/>
+              <a:t> connection. </a:t>
+            </a:r>
+          </a:p>
+          <a:p>
+            <a:r>
+              <a:rPr lang="en-US" sz="1000" dirty="0" smtClean="0"/>
+              <a:t>2 - Load AES-Key, decrypt </a:t>
+            </a:r>
+            <a:r>
+              <a:rPr lang="en-US" sz="1000" dirty="0" err="1" smtClean="0"/>
+              <a:t>msg</a:t>
+            </a:r>
+            <a:r>
+              <a:rPr lang="en-US" sz="1000" dirty="0" smtClean="0"/>
+              <a:t>,  get challenge </a:t>
+            </a:r>
+            <a:r>
+              <a:rPr lang="en-US" sz="1000" dirty="0" err="1" smtClean="0"/>
+              <a:t>Str</a:t>
+            </a:r>
+            <a:r>
+              <a:rPr lang="en-US" sz="1000" dirty="0" smtClean="0"/>
+              <a:t> </a:t>
+            </a:r>
+            <a:endParaRPr lang="en-US" sz="1000" dirty="0"/>
+          </a:p>
+          <a:p>
+            <a:r>
+              <a:rPr lang="en-US" sz="1000" dirty="0" smtClean="0"/>
+              <a:t>3 -  </a:t>
+            </a:r>
+            <a:r>
+              <a:rPr lang="en-US" sz="1000" dirty="0" err="1" smtClean="0"/>
+              <a:t>randomSeed</a:t>
+            </a:r>
+            <a:r>
+              <a:rPr lang="en-US" sz="1000" dirty="0" smtClean="0"/>
+              <a:t>(</a:t>
+            </a:r>
+            <a:r>
+              <a:rPr lang="en-US" sz="1000" dirty="0" err="1" smtClean="0"/>
+              <a:t>challengesr</a:t>
+            </a:r>
+            <a:r>
+              <a:rPr lang="en-US" sz="1000" dirty="0" smtClean="0"/>
+              <a:t>/new </a:t>
+            </a:r>
+            <a:r>
+              <a:rPr lang="en-US" sz="1000" dirty="0" err="1" smtClean="0"/>
+              <a:t>Init</a:t>
+            </a:r>
+            <a:r>
+              <a:rPr lang="en-US" sz="1000" dirty="0" smtClean="0"/>
+              <a:t> Seed) =&gt; one random file byte’s Address</a:t>
+            </a:r>
+            <a:endParaRPr lang="en-US" sz="1000" dirty="0"/>
+          </a:p>
+          <a:p>
+            <a:r>
+              <a:rPr lang="en-US" sz="1000" dirty="0" smtClean="0"/>
+              <a:t>4 - Do SWATT calculation for input byte, refresh all the TA parameters </a:t>
+            </a:r>
+          </a:p>
+          <a:p>
+            <a:pPr marL="171450" indent="-171450">
+              <a:buFontTx/>
+              <a:buChar char="-"/>
+            </a:pPr>
+            <a:r>
+              <a:rPr lang="en-US" sz="1000" dirty="0" smtClean="0"/>
+              <a:t>4.1 Return to step 3</a:t>
+            </a:r>
+          </a:p>
+          <a:p>
+            <a:pPr marL="171450" indent="-171450">
+              <a:buFontTx/>
+              <a:buChar char="-"/>
+            </a:pPr>
+            <a:r>
+              <a:rPr lang="en-US" sz="1000" dirty="0" smtClean="0"/>
+              <a:t>4.2 Finished all and ge</a:t>
+            </a:r>
+            <a:r>
+              <a:rPr lang="en-US" sz="1000" dirty="0" smtClean="0"/>
+              <a:t>t the SWATT </a:t>
+            </a:r>
+            <a:r>
+              <a:rPr lang="en-US" sz="1000" dirty="0" err="1" smtClean="0"/>
+              <a:t>int</a:t>
+            </a:r>
+            <a:r>
+              <a:rPr lang="en-US" sz="1000" dirty="0" smtClean="0"/>
+              <a:t>/hex val.</a:t>
+            </a:r>
+            <a:endParaRPr lang="en-US" sz="1000" dirty="0" smtClean="0"/>
+          </a:p>
+          <a:p>
+            <a:r>
+              <a:rPr lang="en-US" sz="1000" dirty="0" smtClean="0"/>
+              <a:t>5 -  Load AES-Key, encrypt SWATT value </a:t>
+            </a:r>
+          </a:p>
+          <a:p>
+            <a:r>
+              <a:rPr lang="en-US" sz="1000" dirty="0"/>
+              <a:t>7</a:t>
+            </a:r>
+            <a:r>
+              <a:rPr lang="en-US" sz="1000" dirty="0" smtClean="0"/>
+              <a:t> </a:t>
+            </a:r>
+            <a:r>
+              <a:rPr lang="en-US" sz="1000" dirty="0"/>
+              <a:t>- </a:t>
+            </a:r>
+            <a:r>
+              <a:rPr lang="en-US" sz="1000" dirty="0" smtClean="0"/>
+              <a:t>-Load </a:t>
+            </a:r>
+            <a:r>
+              <a:rPr lang="en-US" sz="1000" dirty="0"/>
+              <a:t>AES-Key, decrypt </a:t>
+            </a:r>
+            <a:r>
+              <a:rPr lang="en-US" sz="1000" dirty="0" err="1"/>
+              <a:t>msg</a:t>
+            </a:r>
+            <a:r>
+              <a:rPr lang="en-US" sz="1000" dirty="0" smtClean="0"/>
+              <a:t>, get verify result </a:t>
+            </a:r>
+            <a:endParaRPr lang="en-US" sz="1000" dirty="0"/>
+          </a:p>
+        </p:txBody>
+      </p:sp>
+      <p:sp>
+        <p:nvSpPr>
+          <p:cNvPr id="30" name="TextBox 29"/>
+          <p:cNvSpPr txBox="1"/>
+          <p:nvPr/>
+        </p:nvSpPr>
+        <p:spPr>
+          <a:xfrm>
+            <a:off x="9046130" y="3746468"/>
+            <a:ext cx="1276497" cy="369332"/>
+          </a:xfrm>
+          <a:prstGeom prst="rect">
+            <a:avLst/>
+          </a:prstGeom>
+          <a:solidFill>
+            <a:schemeClr val="accent1">
+              <a:lumMod val="20000"/>
+              <a:lumOff val="80000"/>
+            </a:schemeClr>
+          </a:solidFill>
+          <a:ln>
+            <a:solidFill>
+              <a:srgbClr val="002060"/>
+            </a:solidFill>
+          </a:ln>
+        </p:spPr>
+        <p:txBody>
+          <a:bodyPr wrap="square" rtlCol="0">
+            <a:spAutoFit/>
+          </a:bodyPr>
+          <a:lstStyle/>
+          <a:p>
+            <a:r>
+              <a:rPr lang="en-US" dirty="0" smtClean="0"/>
+              <a:t>TEE driver </a:t>
+            </a:r>
+          </a:p>
+        </p:txBody>
+      </p:sp>
+      <p:pic>
+        <p:nvPicPr>
+          <p:cNvPr id="31" name="Picture 30"/>
+          <p:cNvPicPr>
+            <a:picLocks noChangeAspect="1"/>
+          </p:cNvPicPr>
+          <p:nvPr/>
+        </p:nvPicPr>
+        <p:blipFill>
+          <a:blip r:embed="rId3"/>
+          <a:stretch>
+            <a:fillRect/>
+          </a:stretch>
+        </p:blipFill>
+        <p:spPr>
+          <a:xfrm>
+            <a:off x="730583" y="5737196"/>
+            <a:ext cx="1449443" cy="782490"/>
+          </a:xfrm>
+          <a:prstGeom prst="rect">
+            <a:avLst/>
+          </a:prstGeom>
+          <a:ln w="12700">
+            <a:solidFill>
+              <a:schemeClr val="tx1"/>
+            </a:solidFill>
+          </a:ln>
+        </p:spPr>
+      </p:pic>
+      <p:sp>
+        <p:nvSpPr>
+          <p:cNvPr id="35" name="TextBox 34"/>
+          <p:cNvSpPr txBox="1"/>
+          <p:nvPr/>
+        </p:nvSpPr>
+        <p:spPr>
+          <a:xfrm>
+            <a:off x="3597320" y="4956543"/>
+            <a:ext cx="244548" cy="253916"/>
+          </a:xfrm>
+          <a:prstGeom prst="rect">
+            <a:avLst/>
+          </a:prstGeom>
+          <a:noFill/>
+        </p:spPr>
+        <p:txBody>
+          <a:bodyPr wrap="square" rtlCol="0">
+            <a:spAutoFit/>
+          </a:bodyPr>
+          <a:lstStyle/>
+          <a:p>
+            <a:r>
+              <a:rPr lang="en-US" sz="1050" u="sng" dirty="0" smtClean="0"/>
+              <a:t>1</a:t>
+            </a:r>
+            <a:endParaRPr lang="en-SG" sz="1050" u="sng" dirty="0"/>
+          </a:p>
+        </p:txBody>
+      </p:sp>
+      <p:sp>
+        <p:nvSpPr>
+          <p:cNvPr id="39" name="TextBox 38"/>
+          <p:cNvSpPr txBox="1"/>
+          <p:nvPr/>
+        </p:nvSpPr>
+        <p:spPr>
+          <a:xfrm>
+            <a:off x="2338925" y="5988199"/>
+            <a:ext cx="1689221" cy="261610"/>
+          </a:xfrm>
+          <a:prstGeom prst="rect">
+            <a:avLst/>
+          </a:prstGeom>
+          <a:noFill/>
+        </p:spPr>
+        <p:txBody>
+          <a:bodyPr wrap="square" rtlCol="0">
+            <a:spAutoFit/>
+          </a:bodyPr>
+          <a:lstStyle/>
+          <a:p>
+            <a:r>
+              <a:rPr lang="en-US" sz="1100" u="sng" dirty="0" smtClean="0"/>
+              <a:t>1, 2, 3, 4, 5, 7  </a:t>
+            </a:r>
+            <a:endParaRPr lang="en-SG" sz="1100" u="sng" dirty="0"/>
+          </a:p>
+        </p:txBody>
+      </p:sp>
+      <p:sp>
+        <p:nvSpPr>
+          <p:cNvPr id="45" name="TextBox 44"/>
+          <p:cNvSpPr txBox="1"/>
+          <p:nvPr/>
+        </p:nvSpPr>
+        <p:spPr>
+          <a:xfrm>
+            <a:off x="2109071" y="3762963"/>
+            <a:ext cx="244548" cy="369332"/>
+          </a:xfrm>
+          <a:prstGeom prst="rect">
+            <a:avLst/>
+          </a:prstGeom>
+          <a:noFill/>
+        </p:spPr>
+        <p:txBody>
+          <a:bodyPr wrap="square" rtlCol="0">
+            <a:spAutoFit/>
+          </a:bodyPr>
+          <a:lstStyle/>
+          <a:p>
+            <a:endParaRPr lang="en-SG" dirty="0"/>
+          </a:p>
+        </p:txBody>
+      </p:sp>
+      <p:sp>
+        <p:nvSpPr>
+          <p:cNvPr id="53" name="TextBox 52"/>
+          <p:cNvSpPr txBox="1"/>
+          <p:nvPr/>
+        </p:nvSpPr>
+        <p:spPr>
+          <a:xfrm>
+            <a:off x="3324875" y="874815"/>
+            <a:ext cx="1987456" cy="276999"/>
+          </a:xfrm>
+          <a:prstGeom prst="rect">
+            <a:avLst/>
+          </a:prstGeom>
+          <a:noFill/>
+        </p:spPr>
+        <p:txBody>
+          <a:bodyPr wrap="square" rtlCol="0">
+            <a:spAutoFit/>
+          </a:bodyPr>
+          <a:lstStyle/>
+          <a:p>
+            <a:r>
+              <a:rPr lang="en-US" sz="1200" b="1" dirty="0" smtClean="0"/>
+              <a:t>Normal World [</a:t>
+            </a:r>
+            <a:r>
+              <a:rPr lang="en-US" sz="1200" b="1" dirty="0" err="1" smtClean="0"/>
+              <a:t>Raspbian</a:t>
+            </a:r>
+            <a:r>
+              <a:rPr lang="en-US" sz="1200" b="1" dirty="0" smtClean="0"/>
+              <a:t>]</a:t>
+            </a:r>
+            <a:endParaRPr lang="en-SG" sz="1200" b="1" dirty="0"/>
+          </a:p>
+        </p:txBody>
+      </p:sp>
+      <p:sp>
+        <p:nvSpPr>
+          <p:cNvPr id="55" name="TextBox 54"/>
+          <p:cNvSpPr txBox="1"/>
+          <p:nvPr/>
+        </p:nvSpPr>
+        <p:spPr>
+          <a:xfrm>
+            <a:off x="3537235" y="6164586"/>
+            <a:ext cx="4254215" cy="276999"/>
+          </a:xfrm>
+          <a:prstGeom prst="rect">
+            <a:avLst/>
+          </a:prstGeom>
+          <a:solidFill>
+            <a:schemeClr val="accent1">
+              <a:lumMod val="20000"/>
+              <a:lumOff val="80000"/>
+            </a:schemeClr>
+          </a:solidFill>
+          <a:ln>
+            <a:solidFill>
+              <a:srgbClr val="002060"/>
+            </a:solidFill>
+          </a:ln>
+        </p:spPr>
+        <p:txBody>
+          <a:bodyPr wrap="square" rtlCol="0">
+            <a:spAutoFit/>
+          </a:bodyPr>
+          <a:lstStyle/>
+          <a:p>
+            <a:r>
+              <a:rPr lang="en-US" sz="1200" b="1" dirty="0" smtClean="0"/>
+              <a:t>OPTEE driver  &lt;=&gt;  Tee-supplicant </a:t>
+            </a:r>
+            <a:r>
+              <a:rPr lang="en-US" sz="1200" b="1" dirty="0" smtClean="0"/>
+              <a:t>service </a:t>
+            </a:r>
+          </a:p>
+        </p:txBody>
+      </p:sp>
+      <p:sp>
+        <p:nvSpPr>
+          <p:cNvPr id="58" name="Rectangle 57"/>
+          <p:cNvSpPr/>
+          <p:nvPr/>
+        </p:nvSpPr>
+        <p:spPr>
+          <a:xfrm>
+            <a:off x="3813303" y="1601352"/>
+            <a:ext cx="1165595" cy="244238"/>
+          </a:xfrm>
+          <a:prstGeom prst="rect">
+            <a:avLst/>
+          </a:prstGeom>
+        </p:spPr>
+        <p:style>
+          <a:lnRef idx="2">
+            <a:schemeClr val="accent1">
+              <a:shade val="50000"/>
+            </a:schemeClr>
+          </a:lnRef>
+          <a:fillRef idx="1">
+            <a:schemeClr val="accent1"/>
+          </a:fillRef>
+          <a:effectRef idx="0">
+            <a:schemeClr val="accent1"/>
+          </a:effectRef>
+          <a:fontRef idx="minor">
+            <a:schemeClr val="lt1"/>
+          </a:fontRef>
+        </p:style>
+        <p:txBody>
+          <a:bodyPr rtlCol="0" anchor="ctr"/>
+          <a:lstStyle/>
+          <a:p>
+            <a:r>
+              <a:rPr lang="en-US" sz="800" b="1" dirty="0" smtClean="0"/>
+              <a:t>1 - Start </a:t>
+            </a:r>
+            <a:r>
+              <a:rPr lang="en-US" sz="800" b="1" dirty="0" smtClean="0"/>
+              <a:t>OPTEE session </a:t>
+            </a:r>
+            <a:endParaRPr lang="en-SG" sz="800" b="1" dirty="0"/>
+          </a:p>
+        </p:txBody>
+      </p:sp>
+      <p:sp>
+        <p:nvSpPr>
+          <p:cNvPr id="67" name="TextBox 66"/>
+          <p:cNvSpPr txBox="1"/>
+          <p:nvPr/>
+        </p:nvSpPr>
+        <p:spPr>
+          <a:xfrm>
+            <a:off x="9004187" y="995085"/>
+            <a:ext cx="3101781" cy="3754874"/>
+          </a:xfrm>
+          <a:prstGeom prst="rect">
+            <a:avLst/>
+          </a:prstGeom>
+          <a:solidFill>
+            <a:schemeClr val="accent1">
+              <a:lumMod val="20000"/>
+              <a:lumOff val="80000"/>
+            </a:schemeClr>
+          </a:solidFill>
+          <a:ln>
+            <a:solidFill>
+              <a:srgbClr val="002060"/>
+            </a:solidFill>
+          </a:ln>
+        </p:spPr>
+        <p:txBody>
+          <a:bodyPr wrap="square" rtlCol="0">
+            <a:spAutoFit/>
+          </a:bodyPr>
+          <a:lstStyle/>
+          <a:p>
+            <a:r>
+              <a:rPr lang="en-US" sz="1200" b="1" dirty="0" smtClean="0"/>
+              <a:t>Trust Server thread</a:t>
+            </a:r>
+            <a:r>
+              <a:rPr lang="en-US" b="1" dirty="0" smtClean="0"/>
+              <a:t> </a:t>
+            </a:r>
+            <a:endParaRPr lang="en-US" b="1" dirty="0" smtClean="0"/>
+          </a:p>
+          <a:p>
+            <a:endParaRPr lang="en-US" sz="1000" dirty="0" smtClean="0"/>
+          </a:p>
+          <a:p>
+            <a:endParaRPr lang="en-US" sz="1000" dirty="0"/>
+          </a:p>
+          <a:p>
+            <a:endParaRPr lang="en-US" sz="1000" dirty="0" smtClean="0"/>
+          </a:p>
+          <a:p>
+            <a:endParaRPr lang="en-US" sz="1000" dirty="0"/>
+          </a:p>
+          <a:p>
+            <a:endParaRPr lang="en-US" sz="1000" dirty="0" smtClean="0"/>
+          </a:p>
+          <a:p>
+            <a:endParaRPr lang="en-US" sz="1000" dirty="0"/>
+          </a:p>
+          <a:p>
+            <a:endParaRPr lang="en-US" sz="1000" dirty="0" smtClean="0"/>
+          </a:p>
+          <a:p>
+            <a:endParaRPr lang="en-US" sz="1000" dirty="0"/>
+          </a:p>
+          <a:p>
+            <a:endParaRPr lang="en-US" sz="1000" dirty="0" smtClean="0"/>
+          </a:p>
+          <a:p>
+            <a:endParaRPr lang="en-US" sz="1000" dirty="0"/>
+          </a:p>
+          <a:p>
+            <a:endParaRPr lang="en-US" sz="1000" dirty="0" smtClean="0"/>
+          </a:p>
+          <a:p>
+            <a:endParaRPr lang="en-US" sz="1000" dirty="0"/>
+          </a:p>
+          <a:p>
+            <a:endParaRPr lang="en-US" sz="1000" dirty="0" smtClean="0"/>
+          </a:p>
+          <a:p>
+            <a:endParaRPr lang="en-US" sz="1000" dirty="0"/>
+          </a:p>
+          <a:p>
+            <a:endParaRPr lang="en-US" sz="1000" dirty="0" smtClean="0"/>
+          </a:p>
+          <a:p>
+            <a:endParaRPr lang="en-US" sz="1000" dirty="0"/>
+          </a:p>
+          <a:p>
+            <a:endParaRPr lang="en-US" sz="1000" dirty="0" smtClean="0"/>
+          </a:p>
+          <a:p>
+            <a:endParaRPr lang="en-US" sz="1000" dirty="0"/>
+          </a:p>
+          <a:p>
+            <a:endParaRPr lang="en-US" sz="1000" dirty="0" smtClean="0"/>
+          </a:p>
+          <a:p>
+            <a:endParaRPr lang="en-US" sz="1000" dirty="0"/>
+          </a:p>
+          <a:p>
+            <a:endParaRPr lang="en-US" sz="1000" dirty="0" smtClean="0"/>
+          </a:p>
+          <a:p>
+            <a:endParaRPr lang="en-US" sz="1000" dirty="0"/>
+          </a:p>
+        </p:txBody>
+      </p:sp>
+      <p:cxnSp>
+        <p:nvCxnSpPr>
+          <p:cNvPr id="69" name="Straight Arrow Connector 68"/>
+          <p:cNvCxnSpPr/>
+          <p:nvPr/>
+        </p:nvCxnSpPr>
+        <p:spPr>
+          <a:xfrm flipV="1">
+            <a:off x="6336728" y="3070029"/>
+            <a:ext cx="2877903" cy="0"/>
+          </a:xfrm>
+          <a:prstGeom prst="straightConnector1">
+            <a:avLst/>
+          </a:prstGeom>
+          <a:ln>
+            <a:tailEnd type="triangle"/>
+          </a:ln>
+        </p:spPr>
+        <p:style>
+          <a:lnRef idx="1">
+            <a:schemeClr val="accent1"/>
+          </a:lnRef>
+          <a:fillRef idx="0">
+            <a:schemeClr val="accent1"/>
+          </a:fillRef>
+          <a:effectRef idx="0">
+            <a:schemeClr val="accent1"/>
+          </a:effectRef>
+          <a:fontRef idx="minor">
+            <a:schemeClr val="tx1"/>
+          </a:fontRef>
+        </p:style>
+      </p:cxnSp>
+      <p:cxnSp>
+        <p:nvCxnSpPr>
+          <p:cNvPr id="79" name="Straight Arrow Connector 78"/>
+          <p:cNvCxnSpPr/>
+          <p:nvPr/>
+        </p:nvCxnSpPr>
+        <p:spPr>
+          <a:xfrm>
+            <a:off x="7220615" y="2318873"/>
+            <a:ext cx="1" cy="3833320"/>
+          </a:xfrm>
+          <a:prstGeom prst="straightConnector1">
+            <a:avLst/>
+          </a:prstGeom>
+          <a:ln>
+            <a:tailEnd type="triangle"/>
+          </a:ln>
+        </p:spPr>
+        <p:style>
+          <a:lnRef idx="1">
+            <a:schemeClr val="dk1"/>
+          </a:lnRef>
+          <a:fillRef idx="0">
+            <a:schemeClr val="dk1"/>
+          </a:fillRef>
+          <a:effectRef idx="0">
+            <a:schemeClr val="dk1"/>
+          </a:effectRef>
+          <a:fontRef idx="minor">
+            <a:schemeClr val="tx1"/>
+          </a:fontRef>
+        </p:style>
+      </p:cxnSp>
+      <p:cxnSp>
+        <p:nvCxnSpPr>
+          <p:cNvPr id="81" name="Straight Arrow Connector 80"/>
+          <p:cNvCxnSpPr/>
+          <p:nvPr/>
+        </p:nvCxnSpPr>
+        <p:spPr>
+          <a:xfrm flipV="1">
+            <a:off x="5006913" y="1714908"/>
+            <a:ext cx="330843" cy="303"/>
+          </a:xfrm>
+          <a:prstGeom prst="straightConnector1">
+            <a:avLst/>
+          </a:prstGeom>
+          <a:ln>
+            <a:tailEnd type="triangle"/>
+          </a:ln>
+        </p:spPr>
+        <p:style>
+          <a:lnRef idx="1">
+            <a:schemeClr val="accent1"/>
+          </a:lnRef>
+          <a:fillRef idx="0">
+            <a:schemeClr val="accent1"/>
+          </a:fillRef>
+          <a:effectRef idx="0">
+            <a:schemeClr val="accent1"/>
+          </a:effectRef>
+          <a:fontRef idx="minor">
+            <a:schemeClr val="tx1"/>
+          </a:fontRef>
+        </p:style>
+      </p:cxnSp>
+      <p:sp>
+        <p:nvSpPr>
+          <p:cNvPr id="88" name="Rectangle 87"/>
+          <p:cNvSpPr/>
+          <p:nvPr/>
+        </p:nvSpPr>
+        <p:spPr>
+          <a:xfrm>
+            <a:off x="5372377" y="1137625"/>
+            <a:ext cx="1848238" cy="249531"/>
+          </a:xfrm>
+          <a:prstGeom prst="rect">
+            <a:avLst/>
+          </a:prstGeom>
+        </p:spPr>
+        <p:style>
+          <a:lnRef idx="2">
+            <a:schemeClr val="accent1">
+              <a:shade val="50000"/>
+            </a:schemeClr>
+          </a:lnRef>
+          <a:fillRef idx="1">
+            <a:schemeClr val="accent1"/>
+          </a:fillRef>
+          <a:effectRef idx="0">
+            <a:schemeClr val="accent1"/>
+          </a:effectRef>
+          <a:fontRef idx="minor">
+            <a:schemeClr val="lt1"/>
+          </a:fontRef>
+        </p:style>
+        <p:txBody>
+          <a:bodyPr rtlCol="0" anchor="ctr"/>
+          <a:lstStyle/>
+          <a:p>
+            <a:r>
+              <a:rPr lang="en-US" sz="800" b="1" dirty="0" smtClean="0"/>
+              <a:t>0 . </a:t>
+            </a:r>
+            <a:r>
+              <a:rPr lang="en-US" sz="800" b="1" dirty="0" err="1" smtClean="0"/>
+              <a:t>Init</a:t>
+            </a:r>
+            <a:r>
+              <a:rPr lang="en-US" sz="800" b="1" dirty="0" smtClean="0"/>
+              <a:t> TCP client  and </a:t>
+            </a:r>
+            <a:r>
+              <a:rPr lang="en-US" sz="800" b="1" dirty="0" smtClean="0"/>
+              <a:t>Load </a:t>
+            </a:r>
+            <a:r>
+              <a:rPr lang="en-US" sz="800" b="1" dirty="0" err="1" smtClean="0"/>
+              <a:t>Config</a:t>
+            </a:r>
+            <a:r>
+              <a:rPr lang="en-US" sz="800" b="1" dirty="0" smtClean="0"/>
+              <a:t> file</a:t>
+            </a:r>
+            <a:endParaRPr lang="en-SG" sz="800" b="1" dirty="0"/>
+          </a:p>
+        </p:txBody>
+      </p:sp>
+      <p:cxnSp>
+        <p:nvCxnSpPr>
+          <p:cNvPr id="90" name="Straight Arrow Connector 89"/>
+          <p:cNvCxnSpPr/>
+          <p:nvPr/>
+        </p:nvCxnSpPr>
+        <p:spPr>
+          <a:xfrm flipV="1">
+            <a:off x="6745929" y="1666372"/>
+            <a:ext cx="2975442" cy="28576"/>
+          </a:xfrm>
+          <a:prstGeom prst="straightConnector1">
+            <a:avLst/>
+          </a:prstGeom>
+          <a:ln>
+            <a:tailEnd type="triangle"/>
+          </a:ln>
+        </p:spPr>
+        <p:style>
+          <a:lnRef idx="1">
+            <a:schemeClr val="accent1"/>
+          </a:lnRef>
+          <a:fillRef idx="0">
+            <a:schemeClr val="accent1"/>
+          </a:fillRef>
+          <a:effectRef idx="0">
+            <a:schemeClr val="accent1"/>
+          </a:effectRef>
+          <a:fontRef idx="minor">
+            <a:schemeClr val="tx1"/>
+          </a:fontRef>
+        </p:style>
+      </p:cxnSp>
+      <p:sp>
+        <p:nvSpPr>
+          <p:cNvPr id="42" name="Rectangle 41"/>
+          <p:cNvSpPr/>
+          <p:nvPr/>
+        </p:nvSpPr>
+        <p:spPr>
+          <a:xfrm>
+            <a:off x="10456812" y="1870772"/>
+            <a:ext cx="1545133" cy="405544"/>
+          </a:xfrm>
+          <a:prstGeom prst="rect">
+            <a:avLst/>
+          </a:prstGeom>
+        </p:spPr>
+        <p:style>
+          <a:lnRef idx="2">
+            <a:schemeClr val="accent1">
+              <a:shade val="50000"/>
+            </a:schemeClr>
+          </a:lnRef>
+          <a:fillRef idx="1">
+            <a:schemeClr val="accent1"/>
+          </a:fillRef>
+          <a:effectRef idx="0">
+            <a:schemeClr val="accent1"/>
+          </a:effectRef>
+          <a:fontRef idx="minor">
+            <a:schemeClr val="lt1"/>
+          </a:fontRef>
+        </p:style>
+        <p:txBody>
+          <a:bodyPr rtlCol="0" anchor="ctr"/>
+          <a:lstStyle/>
+          <a:p>
+            <a:r>
+              <a:rPr lang="en-US" sz="800" b="1" dirty="0" smtClean="0"/>
+              <a:t>2.2 - Load </a:t>
+            </a:r>
+            <a:r>
+              <a:rPr lang="en-US" sz="800" b="1" dirty="0" smtClean="0"/>
+              <a:t>AES256 key + </a:t>
+            </a:r>
+            <a:r>
+              <a:rPr lang="en-US" sz="800" b="1" dirty="0" smtClean="0"/>
+              <a:t>IV </a:t>
+            </a:r>
+          </a:p>
+          <a:p>
+            <a:r>
+              <a:rPr lang="en-US" sz="800" b="1" dirty="0" smtClean="0"/>
+              <a:t>=&gt; Create random Challenge </a:t>
+            </a:r>
+            <a:r>
+              <a:rPr lang="en-US" sz="800" b="1" dirty="0" err="1" smtClean="0"/>
+              <a:t>str</a:t>
+            </a:r>
+            <a:r>
+              <a:rPr lang="en-US" sz="800" b="1" dirty="0" smtClean="0"/>
+              <a:t> </a:t>
+            </a:r>
+            <a:br>
+              <a:rPr lang="en-US" sz="800" b="1" dirty="0" smtClean="0"/>
+            </a:br>
+            <a:r>
+              <a:rPr lang="en-US" sz="800" b="1" dirty="0" smtClean="0"/>
+              <a:t>=&gt;  </a:t>
+            </a:r>
+            <a:r>
+              <a:rPr lang="en-US" sz="800" b="1" dirty="0"/>
+              <a:t>Encrypt Challenge </a:t>
+            </a:r>
+            <a:r>
+              <a:rPr lang="en-US" sz="800" b="1" dirty="0" err="1"/>
+              <a:t>str</a:t>
+            </a:r>
+            <a:r>
+              <a:rPr lang="en-US" sz="800" b="1" dirty="0"/>
+              <a:t> </a:t>
+            </a:r>
+            <a:endParaRPr lang="en-SG" sz="800" b="1" dirty="0"/>
+          </a:p>
+        </p:txBody>
+      </p:sp>
+      <p:sp>
+        <p:nvSpPr>
+          <p:cNvPr id="43" name="Rectangle 42"/>
+          <p:cNvSpPr/>
+          <p:nvPr/>
+        </p:nvSpPr>
+        <p:spPr>
+          <a:xfrm>
+            <a:off x="10456812" y="2524396"/>
+            <a:ext cx="1249413" cy="257500"/>
+          </a:xfrm>
+          <a:prstGeom prst="rect">
+            <a:avLst/>
+          </a:prstGeom>
+        </p:spPr>
+        <p:style>
+          <a:lnRef idx="2">
+            <a:schemeClr val="accent1">
+              <a:shade val="50000"/>
+            </a:schemeClr>
+          </a:lnRef>
+          <a:fillRef idx="1">
+            <a:schemeClr val="accent1"/>
+          </a:fillRef>
+          <a:effectRef idx="0">
+            <a:schemeClr val="accent1"/>
+          </a:effectRef>
+          <a:fontRef idx="minor">
+            <a:schemeClr val="lt1"/>
+          </a:fontRef>
+        </p:style>
+        <p:txBody>
+          <a:bodyPr rtlCol="0" anchor="ctr"/>
+          <a:lstStyle/>
+          <a:p>
+            <a:r>
+              <a:rPr lang="en-US" sz="800" b="1" dirty="0" smtClean="0"/>
+              <a:t>2.3 Fetch Pre-save</a:t>
+            </a:r>
+            <a:r>
+              <a:rPr lang="en-US" sz="800" b="1" dirty="0" smtClean="0"/>
+              <a:t>d program </a:t>
+            </a:r>
+            <a:endParaRPr lang="en-SG" sz="800" b="1" dirty="0"/>
+          </a:p>
+        </p:txBody>
+      </p:sp>
+      <p:cxnSp>
+        <p:nvCxnSpPr>
+          <p:cNvPr id="47" name="Straight Arrow Connector 46"/>
+          <p:cNvCxnSpPr/>
+          <p:nvPr/>
+        </p:nvCxnSpPr>
+        <p:spPr>
+          <a:xfrm>
+            <a:off x="9920451" y="1723471"/>
+            <a:ext cx="1200" cy="155469"/>
+          </a:xfrm>
+          <a:prstGeom prst="straightConnector1">
+            <a:avLst/>
+          </a:prstGeom>
+          <a:ln>
+            <a:tailEnd type="triangle"/>
+          </a:ln>
+        </p:spPr>
+        <p:style>
+          <a:lnRef idx="1">
+            <a:schemeClr val="accent1"/>
+          </a:lnRef>
+          <a:fillRef idx="0">
+            <a:schemeClr val="accent1"/>
+          </a:fillRef>
+          <a:effectRef idx="0">
+            <a:schemeClr val="accent1"/>
+          </a:effectRef>
+          <a:fontRef idx="minor">
+            <a:schemeClr val="tx1"/>
+          </a:fontRef>
+        </p:style>
+      </p:cxnSp>
+      <p:cxnSp>
+        <p:nvCxnSpPr>
+          <p:cNvPr id="23" name="Straight Arrow Connector 22"/>
+          <p:cNvCxnSpPr/>
+          <p:nvPr/>
+        </p:nvCxnSpPr>
+        <p:spPr>
+          <a:xfrm>
+            <a:off x="2246811" y="6283709"/>
+            <a:ext cx="1290424" cy="0"/>
+          </a:xfrm>
+          <a:prstGeom prst="straightConnector1">
+            <a:avLst/>
+          </a:prstGeom>
+          <a:ln w="38100">
+            <a:headEnd type="triangle"/>
+            <a:tailEnd type="triangle"/>
+          </a:ln>
+        </p:spPr>
+        <p:style>
+          <a:lnRef idx="1">
+            <a:schemeClr val="accent1"/>
+          </a:lnRef>
+          <a:fillRef idx="0">
+            <a:schemeClr val="accent1"/>
+          </a:fillRef>
+          <a:effectRef idx="0">
+            <a:schemeClr val="accent1"/>
+          </a:effectRef>
+          <a:fontRef idx="minor">
+            <a:schemeClr val="tx1"/>
+          </a:fontRef>
+        </p:style>
+      </p:cxnSp>
+      <p:cxnSp>
+        <p:nvCxnSpPr>
+          <p:cNvPr id="25" name="Straight Arrow Connector 24"/>
+          <p:cNvCxnSpPr/>
+          <p:nvPr/>
+        </p:nvCxnSpPr>
+        <p:spPr>
+          <a:xfrm flipH="1">
+            <a:off x="3808654" y="1845590"/>
+            <a:ext cx="0" cy="4295009"/>
+          </a:xfrm>
+          <a:prstGeom prst="straightConnector1">
+            <a:avLst/>
+          </a:prstGeom>
+          <a:ln>
+            <a:headEnd type="triangle"/>
+            <a:tailEnd type="triangle"/>
+          </a:ln>
+        </p:spPr>
+        <p:style>
+          <a:lnRef idx="1">
+            <a:schemeClr val="dk1"/>
+          </a:lnRef>
+          <a:fillRef idx="0">
+            <a:schemeClr val="dk1"/>
+          </a:fillRef>
+          <a:effectRef idx="0">
+            <a:schemeClr val="dk1"/>
+          </a:effectRef>
+          <a:fontRef idx="minor">
+            <a:schemeClr val="tx1"/>
+          </a:fontRef>
+        </p:style>
+      </p:cxnSp>
+      <p:cxnSp>
+        <p:nvCxnSpPr>
+          <p:cNvPr id="66" name="Straight Arrow Connector 65"/>
+          <p:cNvCxnSpPr/>
+          <p:nvPr/>
+        </p:nvCxnSpPr>
+        <p:spPr>
+          <a:xfrm flipH="1">
+            <a:off x="1265162" y="5216312"/>
+            <a:ext cx="0" cy="513016"/>
+          </a:xfrm>
+          <a:prstGeom prst="straightConnector1">
+            <a:avLst/>
+          </a:prstGeom>
+          <a:ln w="38100">
+            <a:headEnd type="triangle"/>
+            <a:tailEnd type="triangle"/>
+          </a:ln>
+        </p:spPr>
+        <p:style>
+          <a:lnRef idx="1">
+            <a:schemeClr val="accent1"/>
+          </a:lnRef>
+          <a:fillRef idx="0">
+            <a:schemeClr val="accent1"/>
+          </a:fillRef>
+          <a:effectRef idx="0">
+            <a:schemeClr val="accent1"/>
+          </a:effectRef>
+          <a:fontRef idx="minor">
+            <a:schemeClr val="tx1"/>
+          </a:fontRef>
+        </p:style>
+      </p:cxnSp>
+      <p:sp>
+        <p:nvSpPr>
+          <p:cNvPr id="68" name="TextBox 67"/>
+          <p:cNvSpPr txBox="1"/>
+          <p:nvPr/>
+        </p:nvSpPr>
+        <p:spPr>
+          <a:xfrm>
+            <a:off x="1289651" y="5270565"/>
+            <a:ext cx="1689221" cy="261610"/>
+          </a:xfrm>
+          <a:prstGeom prst="rect">
+            <a:avLst/>
+          </a:prstGeom>
+          <a:noFill/>
+        </p:spPr>
+        <p:txBody>
+          <a:bodyPr wrap="square" rtlCol="0">
+            <a:spAutoFit/>
+          </a:bodyPr>
+          <a:lstStyle/>
+          <a:p>
+            <a:r>
+              <a:rPr lang="en-US" sz="1100" u="sng" dirty="0" smtClean="0"/>
+              <a:t>1, 2, 3, 4, 5, 7</a:t>
+            </a:r>
+            <a:endParaRPr lang="en-SG" sz="1100" u="sng" dirty="0"/>
+          </a:p>
+        </p:txBody>
+      </p:sp>
+      <p:sp>
+        <p:nvSpPr>
+          <p:cNvPr id="76" name="Rectangle 75"/>
+          <p:cNvSpPr/>
+          <p:nvPr/>
+        </p:nvSpPr>
+        <p:spPr>
+          <a:xfrm>
+            <a:off x="5360039" y="1592388"/>
+            <a:ext cx="1390389" cy="249531"/>
+          </a:xfrm>
+          <a:prstGeom prst="rect">
+            <a:avLst/>
+          </a:prstGeom>
+        </p:spPr>
+        <p:style>
+          <a:lnRef idx="2">
+            <a:schemeClr val="accent1">
+              <a:shade val="50000"/>
+            </a:schemeClr>
+          </a:lnRef>
+          <a:fillRef idx="1">
+            <a:schemeClr val="accent1"/>
+          </a:fillRef>
+          <a:effectRef idx="0">
+            <a:schemeClr val="accent1"/>
+          </a:effectRef>
+          <a:fontRef idx="minor">
+            <a:schemeClr val="lt1"/>
+          </a:fontRef>
+        </p:style>
+        <p:txBody>
+          <a:bodyPr rtlCol="0" anchor="ctr"/>
+          <a:lstStyle/>
+          <a:p>
+            <a:r>
+              <a:rPr lang="en-US" sz="800" b="1" dirty="0" smtClean="0"/>
+              <a:t>2</a:t>
+            </a:r>
+            <a:r>
+              <a:rPr lang="en-US" sz="800" b="1" dirty="0"/>
+              <a:t> </a:t>
+            </a:r>
+            <a:r>
+              <a:rPr lang="en-US" sz="800" b="1" dirty="0" smtClean="0"/>
+              <a:t>–</a:t>
+            </a:r>
+            <a:r>
+              <a:rPr lang="en-US" sz="800" b="1" dirty="0" smtClean="0"/>
+              <a:t> Log in to the  trust server</a:t>
+            </a:r>
+            <a:endParaRPr lang="en-SG" sz="800" b="1" dirty="0"/>
+          </a:p>
+        </p:txBody>
+      </p:sp>
+      <p:sp>
+        <p:nvSpPr>
+          <p:cNvPr id="82" name="Rectangle 81"/>
+          <p:cNvSpPr/>
+          <p:nvPr/>
+        </p:nvSpPr>
+        <p:spPr>
+          <a:xfrm>
+            <a:off x="9484443" y="386262"/>
+            <a:ext cx="936755" cy="249531"/>
+          </a:xfrm>
+          <a:prstGeom prst="rect">
+            <a:avLst/>
+          </a:prstGeom>
+        </p:spPr>
+        <p:style>
+          <a:lnRef idx="2">
+            <a:schemeClr val="accent1">
+              <a:shade val="50000"/>
+            </a:schemeClr>
+          </a:lnRef>
+          <a:fillRef idx="1">
+            <a:schemeClr val="accent1"/>
+          </a:fillRef>
+          <a:effectRef idx="0">
+            <a:schemeClr val="accent1"/>
+          </a:effectRef>
+          <a:fontRef idx="minor">
+            <a:schemeClr val="lt1"/>
+          </a:fontRef>
+        </p:style>
+        <p:txBody>
+          <a:bodyPr rtlCol="0" anchor="ctr"/>
+          <a:lstStyle/>
+          <a:p>
+            <a:r>
+              <a:rPr lang="en-US" sz="800" b="1" dirty="0" smtClean="0"/>
+              <a:t>Main server start </a:t>
+            </a:r>
+            <a:r>
+              <a:rPr lang="en-US" sz="800" b="1" dirty="0" smtClean="0"/>
+              <a:t> </a:t>
+            </a:r>
+            <a:endParaRPr lang="en-SG" sz="800" b="1" dirty="0"/>
+          </a:p>
+        </p:txBody>
+      </p:sp>
+      <p:sp>
+        <p:nvSpPr>
+          <p:cNvPr id="83" name="Rectangle 82"/>
+          <p:cNvSpPr/>
+          <p:nvPr/>
+        </p:nvSpPr>
+        <p:spPr>
+          <a:xfrm>
+            <a:off x="10167871" y="-2631301"/>
+            <a:ext cx="923884" cy="244238"/>
+          </a:xfrm>
+          <a:prstGeom prst="rect">
+            <a:avLst/>
+          </a:prstGeom>
+        </p:spPr>
+        <p:style>
+          <a:lnRef idx="2">
+            <a:schemeClr val="accent1">
+              <a:shade val="50000"/>
+            </a:schemeClr>
+          </a:lnRef>
+          <a:fillRef idx="1">
+            <a:schemeClr val="accent1"/>
+          </a:fillRef>
+          <a:effectRef idx="0">
+            <a:schemeClr val="accent1"/>
+          </a:effectRef>
+          <a:fontRef idx="minor">
+            <a:schemeClr val="lt1"/>
+          </a:fontRef>
+        </p:style>
+        <p:txBody>
+          <a:bodyPr rtlCol="0" anchor="ctr"/>
+          <a:lstStyle/>
+          <a:p>
+            <a:r>
+              <a:rPr lang="en-US" sz="800" b="1" dirty="0" smtClean="0"/>
+              <a:t>Load AES256 key + IV</a:t>
+            </a:r>
+            <a:endParaRPr lang="en-SG" sz="800" b="1" dirty="0"/>
+          </a:p>
+        </p:txBody>
+      </p:sp>
+      <p:cxnSp>
+        <p:nvCxnSpPr>
+          <p:cNvPr id="84" name="Straight Arrow Connector 83"/>
+          <p:cNvCxnSpPr/>
+          <p:nvPr/>
+        </p:nvCxnSpPr>
+        <p:spPr>
+          <a:xfrm>
+            <a:off x="9943839" y="645894"/>
+            <a:ext cx="0" cy="369896"/>
+          </a:xfrm>
+          <a:prstGeom prst="straightConnector1">
+            <a:avLst/>
+          </a:prstGeom>
+          <a:ln w="38100">
+            <a:tailEnd type="triangle"/>
+          </a:ln>
+        </p:spPr>
+        <p:style>
+          <a:lnRef idx="1">
+            <a:schemeClr val="accent1"/>
+          </a:lnRef>
+          <a:fillRef idx="0">
+            <a:schemeClr val="accent1"/>
+          </a:fillRef>
+          <a:effectRef idx="0">
+            <a:schemeClr val="accent1"/>
+          </a:effectRef>
+          <a:fontRef idx="minor">
+            <a:schemeClr val="tx1"/>
+          </a:fontRef>
+        </p:style>
+      </p:cxnSp>
+      <p:sp>
+        <p:nvSpPr>
+          <p:cNvPr id="85" name="TextBox 84"/>
+          <p:cNvSpPr txBox="1"/>
+          <p:nvPr/>
+        </p:nvSpPr>
+        <p:spPr>
+          <a:xfrm>
+            <a:off x="6854242" y="1460992"/>
+            <a:ext cx="2733895" cy="215444"/>
+          </a:xfrm>
+          <a:prstGeom prst="rect">
+            <a:avLst/>
+          </a:prstGeom>
+          <a:noFill/>
+        </p:spPr>
+        <p:txBody>
+          <a:bodyPr wrap="square" rtlCol="0">
+            <a:spAutoFit/>
+          </a:bodyPr>
+          <a:lstStyle/>
+          <a:p>
+            <a:r>
+              <a:rPr lang="en-US" sz="800" dirty="0" smtClean="0"/>
+              <a:t>Login request:  </a:t>
+            </a:r>
+            <a:r>
+              <a:rPr lang="en-US" sz="800" dirty="0" err="1" smtClean="0"/>
+              <a:t>F;Gateway_ID;Program_V;Key_Version;C_Len</a:t>
+            </a:r>
+            <a:r>
+              <a:rPr lang="en-US" sz="800" dirty="0" smtClean="0"/>
+              <a:t>  </a:t>
+            </a:r>
+            <a:endParaRPr lang="en-SG" sz="800" dirty="0"/>
+          </a:p>
+        </p:txBody>
+      </p:sp>
+      <p:sp>
+        <p:nvSpPr>
+          <p:cNvPr id="87" name="Rectangle 86"/>
+          <p:cNvSpPr/>
+          <p:nvPr/>
+        </p:nvSpPr>
+        <p:spPr>
+          <a:xfrm>
+            <a:off x="9733616" y="1512326"/>
+            <a:ext cx="920833" cy="249531"/>
+          </a:xfrm>
+          <a:prstGeom prst="rect">
+            <a:avLst/>
+          </a:prstGeom>
+        </p:spPr>
+        <p:style>
+          <a:lnRef idx="2">
+            <a:schemeClr val="accent1">
+              <a:shade val="50000"/>
+            </a:schemeClr>
+          </a:lnRef>
+          <a:fillRef idx="1">
+            <a:schemeClr val="accent1"/>
+          </a:fillRef>
+          <a:effectRef idx="0">
+            <a:schemeClr val="accent1"/>
+          </a:effectRef>
+          <a:fontRef idx="minor">
+            <a:schemeClr val="lt1"/>
+          </a:fontRef>
+        </p:style>
+        <p:txBody>
+          <a:bodyPr rtlCol="0" anchor="ctr"/>
+          <a:lstStyle/>
+          <a:p>
+            <a:r>
+              <a:rPr lang="en-US" sz="800" b="1" dirty="0" smtClean="0"/>
+              <a:t>2.1 confirm log in </a:t>
+            </a:r>
+            <a:endParaRPr lang="en-SG" sz="800" b="1" dirty="0"/>
+          </a:p>
+        </p:txBody>
+      </p:sp>
+      <p:sp>
+        <p:nvSpPr>
+          <p:cNvPr id="89" name="Rectangle 88"/>
+          <p:cNvSpPr/>
+          <p:nvPr/>
+        </p:nvSpPr>
+        <p:spPr>
+          <a:xfrm>
+            <a:off x="9214631" y="1892242"/>
+            <a:ext cx="1000687" cy="249531"/>
+          </a:xfrm>
+          <a:prstGeom prst="rect">
+            <a:avLst/>
+          </a:prstGeom>
+        </p:spPr>
+        <p:style>
+          <a:lnRef idx="2">
+            <a:schemeClr val="accent1">
+              <a:shade val="50000"/>
+            </a:schemeClr>
+          </a:lnRef>
+          <a:fillRef idx="1">
+            <a:schemeClr val="accent1"/>
+          </a:fillRef>
+          <a:effectRef idx="0">
+            <a:schemeClr val="accent1"/>
+          </a:effectRef>
+          <a:fontRef idx="minor">
+            <a:schemeClr val="lt1"/>
+          </a:fontRef>
+        </p:style>
+        <p:txBody>
+          <a:bodyPr rtlCol="0" anchor="ctr"/>
+          <a:lstStyle/>
+          <a:p>
+            <a:r>
+              <a:rPr lang="en-US" sz="800" b="1" dirty="0" smtClean="0"/>
+              <a:t>2.1.1 Log in reject.</a:t>
+            </a:r>
+            <a:r>
+              <a:rPr lang="en-US" sz="800" b="1" dirty="0" smtClean="0"/>
+              <a:t> </a:t>
+            </a:r>
+            <a:endParaRPr lang="en-SG" sz="800" b="1" dirty="0"/>
+          </a:p>
+        </p:txBody>
+      </p:sp>
+      <p:cxnSp>
+        <p:nvCxnSpPr>
+          <p:cNvPr id="51" name="Elbow Connector 50"/>
+          <p:cNvCxnSpPr>
+            <a:endCxn id="42" idx="0"/>
+          </p:cNvCxnSpPr>
+          <p:nvPr/>
+        </p:nvCxnSpPr>
+        <p:spPr>
+          <a:xfrm>
+            <a:off x="10654449" y="1637091"/>
+            <a:ext cx="574930" cy="233681"/>
+          </a:xfrm>
+          <a:prstGeom prst="bentConnector2">
+            <a:avLst/>
+          </a:prstGeom>
+          <a:ln>
+            <a:tailEnd type="triangle"/>
+          </a:ln>
+        </p:spPr>
+        <p:style>
+          <a:lnRef idx="1">
+            <a:schemeClr val="accent1"/>
+          </a:lnRef>
+          <a:fillRef idx="0">
+            <a:schemeClr val="accent1"/>
+          </a:fillRef>
+          <a:effectRef idx="0">
+            <a:schemeClr val="accent1"/>
+          </a:effectRef>
+          <a:fontRef idx="minor">
+            <a:schemeClr val="tx1"/>
+          </a:fontRef>
+        </p:style>
+      </p:cxnSp>
+      <p:cxnSp>
+        <p:nvCxnSpPr>
+          <p:cNvPr id="61" name="Straight Arrow Connector 60"/>
+          <p:cNvCxnSpPr/>
+          <p:nvPr/>
+        </p:nvCxnSpPr>
+        <p:spPr>
+          <a:xfrm flipH="1" flipV="1">
+            <a:off x="7263306" y="2220685"/>
+            <a:ext cx="3193507" cy="4491"/>
+          </a:xfrm>
+          <a:prstGeom prst="straightConnector1">
+            <a:avLst/>
+          </a:prstGeom>
+          <a:ln>
+            <a:tailEnd type="triangle"/>
+          </a:ln>
+        </p:spPr>
+        <p:style>
+          <a:lnRef idx="1">
+            <a:schemeClr val="accent1"/>
+          </a:lnRef>
+          <a:fillRef idx="0">
+            <a:schemeClr val="accent1"/>
+          </a:fillRef>
+          <a:effectRef idx="0">
+            <a:schemeClr val="accent1"/>
+          </a:effectRef>
+          <a:fontRef idx="minor">
+            <a:schemeClr val="tx1"/>
+          </a:fontRef>
+        </p:style>
+      </p:cxnSp>
+      <p:cxnSp>
+        <p:nvCxnSpPr>
+          <p:cNvPr id="94" name="Elbow Connector 93"/>
+          <p:cNvCxnSpPr/>
+          <p:nvPr/>
+        </p:nvCxnSpPr>
+        <p:spPr>
+          <a:xfrm rot="10800000" flipV="1">
+            <a:off x="8229600" y="1994262"/>
+            <a:ext cx="970268" cy="226423"/>
+          </a:xfrm>
+          <a:prstGeom prst="bentConnector3">
+            <a:avLst/>
+          </a:prstGeom>
+          <a:ln>
+            <a:tailEnd type="triangle"/>
+          </a:ln>
+        </p:spPr>
+        <p:style>
+          <a:lnRef idx="1">
+            <a:schemeClr val="accent1"/>
+          </a:lnRef>
+          <a:fillRef idx="0">
+            <a:schemeClr val="accent1"/>
+          </a:fillRef>
+          <a:effectRef idx="0">
+            <a:schemeClr val="accent1"/>
+          </a:effectRef>
+          <a:fontRef idx="minor">
+            <a:schemeClr val="tx1"/>
+          </a:fontRef>
+        </p:style>
+      </p:cxnSp>
+      <p:sp>
+        <p:nvSpPr>
+          <p:cNvPr id="95" name="Rectangle 94"/>
+          <p:cNvSpPr/>
+          <p:nvPr/>
+        </p:nvSpPr>
+        <p:spPr>
+          <a:xfrm>
+            <a:off x="10456811" y="3070029"/>
+            <a:ext cx="1249413" cy="249531"/>
+          </a:xfrm>
+          <a:prstGeom prst="rect">
+            <a:avLst/>
+          </a:prstGeom>
+        </p:spPr>
+        <p:style>
+          <a:lnRef idx="2">
+            <a:schemeClr val="accent1">
+              <a:shade val="50000"/>
+            </a:schemeClr>
+          </a:lnRef>
+          <a:fillRef idx="1">
+            <a:schemeClr val="accent1"/>
+          </a:fillRef>
+          <a:effectRef idx="0">
+            <a:schemeClr val="accent1"/>
+          </a:effectRef>
+          <a:fontRef idx="minor">
+            <a:schemeClr val="lt1"/>
+          </a:fontRef>
+        </p:style>
+        <p:txBody>
+          <a:bodyPr rtlCol="0" anchor="ctr"/>
+          <a:lstStyle/>
+          <a:p>
+            <a:r>
+              <a:rPr lang="en-US" sz="800" b="1" dirty="0" smtClean="0"/>
+              <a:t>2</a:t>
+            </a:r>
+            <a:r>
+              <a:rPr lang="en-US" sz="800" b="1" dirty="0" smtClean="0"/>
+              <a:t>.4 Calculate the file SWATT </a:t>
+            </a:r>
+            <a:endParaRPr lang="en-SG" sz="800" b="1" dirty="0"/>
+          </a:p>
+        </p:txBody>
+      </p:sp>
+      <p:sp>
+        <p:nvSpPr>
+          <p:cNvPr id="96" name="Flowchart: Magnetic Disk 95"/>
+          <p:cNvSpPr/>
+          <p:nvPr/>
+        </p:nvSpPr>
+        <p:spPr>
+          <a:xfrm>
+            <a:off x="11084659" y="327378"/>
+            <a:ext cx="804154" cy="307756"/>
+          </a:xfrm>
+          <a:prstGeom prst="flowChartMagneticDisk">
+            <a:avLst/>
+          </a:prstGeom>
+        </p:spPr>
+        <p:style>
+          <a:lnRef idx="2">
+            <a:schemeClr val="accent1">
+              <a:shade val="50000"/>
+            </a:schemeClr>
+          </a:lnRef>
+          <a:fillRef idx="1">
+            <a:schemeClr val="accent1"/>
+          </a:fillRef>
+          <a:effectRef idx="0">
+            <a:schemeClr val="accent1"/>
+          </a:effectRef>
+          <a:fontRef idx="minor">
+            <a:schemeClr val="lt1"/>
+          </a:fontRef>
+        </p:style>
+        <p:txBody>
+          <a:bodyPr rtlCol="0" anchor="ctr"/>
+          <a:lstStyle/>
+          <a:p>
+            <a:r>
+              <a:rPr lang="en-US" sz="800" b="1" dirty="0" err="1" smtClean="0"/>
+              <a:t>DataBase</a:t>
+            </a:r>
+            <a:endParaRPr lang="en-SG" sz="800" b="1" dirty="0"/>
+          </a:p>
+        </p:txBody>
+      </p:sp>
+      <p:cxnSp>
+        <p:nvCxnSpPr>
+          <p:cNvPr id="97" name="Straight Arrow Connector 96"/>
+          <p:cNvCxnSpPr/>
+          <p:nvPr/>
+        </p:nvCxnSpPr>
+        <p:spPr>
+          <a:xfrm flipH="1" flipV="1">
+            <a:off x="11377424" y="621315"/>
+            <a:ext cx="4679" cy="1220604"/>
+          </a:xfrm>
+          <a:prstGeom prst="straightConnector1">
+            <a:avLst/>
+          </a:prstGeom>
+          <a:ln>
+            <a:tailEnd type="triangle"/>
+          </a:ln>
+        </p:spPr>
+        <p:style>
+          <a:lnRef idx="1">
+            <a:schemeClr val="accent1"/>
+          </a:lnRef>
+          <a:fillRef idx="0">
+            <a:schemeClr val="accent1"/>
+          </a:fillRef>
+          <a:effectRef idx="0">
+            <a:schemeClr val="accent1"/>
+          </a:effectRef>
+          <a:fontRef idx="minor">
+            <a:schemeClr val="tx1"/>
+          </a:fontRef>
+        </p:style>
+      </p:cxnSp>
+      <p:sp>
+        <p:nvSpPr>
+          <p:cNvPr id="100" name="Rectangle 99"/>
+          <p:cNvSpPr/>
+          <p:nvPr/>
+        </p:nvSpPr>
+        <p:spPr>
+          <a:xfrm>
+            <a:off x="5592227" y="2057748"/>
+            <a:ext cx="1675572" cy="249531"/>
+          </a:xfrm>
+          <a:prstGeom prst="rect">
+            <a:avLst/>
+          </a:prstGeom>
+        </p:spPr>
+        <p:style>
+          <a:lnRef idx="2">
+            <a:schemeClr val="accent1">
+              <a:shade val="50000"/>
+            </a:schemeClr>
+          </a:lnRef>
+          <a:fillRef idx="1">
+            <a:schemeClr val="accent1"/>
+          </a:fillRef>
+          <a:effectRef idx="0">
+            <a:schemeClr val="accent1"/>
+          </a:effectRef>
+          <a:fontRef idx="minor">
+            <a:schemeClr val="lt1"/>
+          </a:fontRef>
+        </p:style>
+        <p:txBody>
+          <a:bodyPr rtlCol="0" anchor="ctr"/>
+          <a:lstStyle/>
+          <a:p>
+            <a:r>
+              <a:rPr lang="en-US" sz="800" b="1" dirty="0" smtClean="0"/>
+              <a:t>2.3 Forward </a:t>
+            </a:r>
+            <a:r>
+              <a:rPr lang="en-US" sz="800" b="1" dirty="0" err="1" smtClean="0"/>
+              <a:t>msg</a:t>
+            </a:r>
+            <a:r>
+              <a:rPr lang="en-US" sz="800" b="1" dirty="0" smtClean="0"/>
+              <a:t> to TA(</a:t>
+            </a:r>
+            <a:r>
+              <a:rPr lang="en-US" sz="800" b="1" dirty="0" err="1" smtClean="0"/>
+              <a:t>TrustZone</a:t>
+            </a:r>
+            <a:r>
+              <a:rPr lang="en-US" sz="800" b="1" dirty="0" smtClean="0"/>
+              <a:t>)</a:t>
+            </a:r>
+            <a:endParaRPr lang="en-SG" sz="800" b="1" dirty="0"/>
+          </a:p>
+        </p:txBody>
+      </p:sp>
+      <p:sp>
+        <p:nvSpPr>
+          <p:cNvPr id="105" name="TextBox 104"/>
+          <p:cNvSpPr txBox="1"/>
+          <p:nvPr/>
+        </p:nvSpPr>
+        <p:spPr>
+          <a:xfrm>
+            <a:off x="7030671" y="5014196"/>
+            <a:ext cx="244548" cy="253916"/>
+          </a:xfrm>
+          <a:prstGeom prst="rect">
+            <a:avLst/>
+          </a:prstGeom>
+          <a:noFill/>
+        </p:spPr>
+        <p:txBody>
+          <a:bodyPr wrap="square" rtlCol="0">
+            <a:spAutoFit/>
+          </a:bodyPr>
+          <a:lstStyle/>
+          <a:p>
+            <a:r>
+              <a:rPr lang="en-US" sz="1050" u="sng" dirty="0"/>
+              <a:t>2</a:t>
+            </a:r>
+            <a:endParaRPr lang="en-SG" sz="1050" u="sng" dirty="0"/>
+          </a:p>
+        </p:txBody>
+      </p:sp>
+      <p:cxnSp>
+        <p:nvCxnSpPr>
+          <p:cNvPr id="106" name="Straight Arrow Connector 105"/>
+          <p:cNvCxnSpPr/>
+          <p:nvPr/>
+        </p:nvCxnSpPr>
+        <p:spPr>
+          <a:xfrm flipV="1">
+            <a:off x="4061027" y="2314594"/>
+            <a:ext cx="0" cy="3826005"/>
+          </a:xfrm>
+          <a:prstGeom prst="straightConnector1">
+            <a:avLst/>
+          </a:prstGeom>
+          <a:ln>
+            <a:tailEnd type="triangle"/>
+          </a:ln>
+        </p:spPr>
+        <p:style>
+          <a:lnRef idx="1">
+            <a:schemeClr val="dk1"/>
+          </a:lnRef>
+          <a:fillRef idx="0">
+            <a:schemeClr val="dk1"/>
+          </a:fillRef>
+          <a:effectRef idx="0">
+            <a:schemeClr val="dk1"/>
+          </a:effectRef>
+          <a:fontRef idx="minor">
+            <a:schemeClr val="tx1"/>
+          </a:fontRef>
+        </p:style>
+      </p:cxnSp>
+      <p:sp>
+        <p:nvSpPr>
+          <p:cNvPr id="112" name="Rectangle 111"/>
+          <p:cNvSpPr/>
+          <p:nvPr/>
+        </p:nvSpPr>
+        <p:spPr>
+          <a:xfrm>
+            <a:off x="3940535" y="2065063"/>
+            <a:ext cx="1448062" cy="249531"/>
+          </a:xfrm>
+          <a:prstGeom prst="rect">
+            <a:avLst/>
+          </a:prstGeom>
+        </p:spPr>
+        <p:style>
+          <a:lnRef idx="2">
+            <a:schemeClr val="accent1">
+              <a:shade val="50000"/>
+            </a:schemeClr>
+          </a:lnRef>
+          <a:fillRef idx="1">
+            <a:schemeClr val="accent1"/>
+          </a:fillRef>
+          <a:effectRef idx="0">
+            <a:schemeClr val="accent1"/>
+          </a:effectRef>
+          <a:fontRef idx="minor">
+            <a:schemeClr val="lt1"/>
+          </a:fontRef>
+        </p:style>
+        <p:txBody>
+          <a:bodyPr rtlCol="0" anchor="ctr"/>
+          <a:lstStyle/>
+          <a:p>
+            <a:r>
+              <a:rPr lang="en-US" sz="800" b="1" dirty="0" smtClean="0"/>
+              <a:t>3.1 Load file in memory and fetch bytes based on the </a:t>
+            </a:r>
+            <a:r>
+              <a:rPr lang="en-US" sz="800" b="1" dirty="0" err="1" smtClean="0"/>
+              <a:t>Addr</a:t>
+            </a:r>
+            <a:endParaRPr lang="en-SG" sz="800" b="1" dirty="0"/>
+          </a:p>
+        </p:txBody>
+      </p:sp>
+      <p:sp>
+        <p:nvSpPr>
+          <p:cNvPr id="113" name="TextBox 112"/>
+          <p:cNvSpPr txBox="1"/>
+          <p:nvPr/>
+        </p:nvSpPr>
+        <p:spPr>
+          <a:xfrm>
+            <a:off x="3874750" y="4956825"/>
+            <a:ext cx="477877" cy="415498"/>
+          </a:xfrm>
+          <a:prstGeom prst="rect">
+            <a:avLst/>
+          </a:prstGeom>
+          <a:noFill/>
+        </p:spPr>
+        <p:txBody>
+          <a:bodyPr wrap="square" rtlCol="0">
+            <a:spAutoFit/>
+          </a:bodyPr>
+          <a:lstStyle/>
+          <a:p>
+            <a:r>
+              <a:rPr lang="en-US" sz="1050" u="sng" dirty="0" smtClean="0"/>
+              <a:t>3 x m </a:t>
+            </a:r>
+          </a:p>
+          <a:p>
+            <a:r>
+              <a:rPr lang="en-US" sz="1050" u="sng" dirty="0" err="1" smtClean="0"/>
+              <a:t>Addr</a:t>
+            </a:r>
+            <a:r>
+              <a:rPr lang="en-US" sz="1050" u="sng" dirty="0" smtClean="0"/>
+              <a:t> </a:t>
+            </a:r>
+            <a:endParaRPr lang="en-SG" sz="1050" u="sng" dirty="0"/>
+          </a:p>
+        </p:txBody>
+      </p:sp>
+      <p:sp>
+        <p:nvSpPr>
+          <p:cNvPr id="120" name="Rectangle 119"/>
+          <p:cNvSpPr/>
+          <p:nvPr/>
+        </p:nvSpPr>
+        <p:spPr>
+          <a:xfrm>
+            <a:off x="4181520" y="2532365"/>
+            <a:ext cx="1655756" cy="249531"/>
+          </a:xfrm>
+          <a:prstGeom prst="rect">
+            <a:avLst/>
+          </a:prstGeom>
+        </p:spPr>
+        <p:style>
+          <a:lnRef idx="2">
+            <a:schemeClr val="accent1">
+              <a:shade val="50000"/>
+            </a:schemeClr>
+          </a:lnRef>
+          <a:fillRef idx="1">
+            <a:schemeClr val="accent1"/>
+          </a:fillRef>
+          <a:effectRef idx="0">
+            <a:schemeClr val="accent1"/>
+          </a:effectRef>
+          <a:fontRef idx="minor">
+            <a:schemeClr val="lt1"/>
+          </a:fontRef>
+        </p:style>
+        <p:txBody>
+          <a:bodyPr rtlCol="0" anchor="ctr"/>
+          <a:lstStyle/>
+          <a:p>
+            <a:r>
+              <a:rPr lang="en-US" sz="800" b="1" dirty="0"/>
+              <a:t>4</a:t>
+            </a:r>
+            <a:r>
+              <a:rPr lang="en-US" sz="800" b="1" dirty="0" smtClean="0"/>
+              <a:t>. Forward new </a:t>
+            </a:r>
+            <a:r>
+              <a:rPr lang="en-US" sz="800" b="1" dirty="0" err="1" smtClean="0"/>
+              <a:t>init</a:t>
+            </a:r>
+            <a:r>
+              <a:rPr lang="en-US" sz="800" b="1" dirty="0" smtClean="0"/>
+              <a:t> seed, swat-seed, state[n], </a:t>
+            </a:r>
+            <a:r>
+              <a:rPr lang="en-US" sz="800" b="1" dirty="0" err="1" smtClean="0"/>
+              <a:t>filebytes</a:t>
+            </a:r>
+            <a:r>
+              <a:rPr lang="en-US" sz="800" b="1" dirty="0" smtClean="0"/>
+              <a:t> to TA </a:t>
+            </a:r>
+            <a:endParaRPr lang="en-SG" sz="800" b="1" dirty="0"/>
+          </a:p>
+        </p:txBody>
+      </p:sp>
+      <p:cxnSp>
+        <p:nvCxnSpPr>
+          <p:cNvPr id="121" name="Straight Arrow Connector 120"/>
+          <p:cNvCxnSpPr/>
+          <p:nvPr/>
+        </p:nvCxnSpPr>
+        <p:spPr>
+          <a:xfrm>
+            <a:off x="4749738" y="2307279"/>
+            <a:ext cx="0" cy="205932"/>
+          </a:xfrm>
+          <a:prstGeom prst="straightConnector1">
+            <a:avLst/>
+          </a:prstGeom>
+          <a:ln>
+            <a:tailEnd type="triangle"/>
+          </a:ln>
+        </p:spPr>
+        <p:style>
+          <a:lnRef idx="1">
+            <a:schemeClr val="accent1"/>
+          </a:lnRef>
+          <a:fillRef idx="0">
+            <a:schemeClr val="accent1"/>
+          </a:fillRef>
+          <a:effectRef idx="0">
+            <a:schemeClr val="accent1"/>
+          </a:effectRef>
+          <a:fontRef idx="minor">
+            <a:schemeClr val="tx1"/>
+          </a:fontRef>
+        </p:style>
+      </p:cxnSp>
+      <p:cxnSp>
+        <p:nvCxnSpPr>
+          <p:cNvPr id="123" name="Straight Arrow Connector 122"/>
+          <p:cNvCxnSpPr/>
+          <p:nvPr/>
+        </p:nvCxnSpPr>
+        <p:spPr>
+          <a:xfrm flipH="1">
+            <a:off x="4423232" y="2801050"/>
+            <a:ext cx="0" cy="3327391"/>
+          </a:xfrm>
+          <a:prstGeom prst="straightConnector1">
+            <a:avLst/>
+          </a:prstGeom>
+          <a:ln>
+            <a:tailEnd type="triangle"/>
+          </a:ln>
+        </p:spPr>
+        <p:style>
+          <a:lnRef idx="1">
+            <a:schemeClr val="dk1"/>
+          </a:lnRef>
+          <a:fillRef idx="0">
+            <a:schemeClr val="dk1"/>
+          </a:fillRef>
+          <a:effectRef idx="0">
+            <a:schemeClr val="dk1"/>
+          </a:effectRef>
+          <a:fontRef idx="minor">
+            <a:schemeClr val="tx1"/>
+          </a:fontRef>
+        </p:style>
+      </p:cxnSp>
+      <p:sp>
+        <p:nvSpPr>
+          <p:cNvPr id="126" name="TextBox 125"/>
+          <p:cNvSpPr txBox="1"/>
+          <p:nvPr/>
+        </p:nvSpPr>
+        <p:spPr>
+          <a:xfrm>
+            <a:off x="4246663" y="4964588"/>
+            <a:ext cx="482453" cy="253916"/>
+          </a:xfrm>
+          <a:prstGeom prst="rect">
+            <a:avLst/>
+          </a:prstGeom>
+          <a:noFill/>
+        </p:spPr>
+        <p:txBody>
+          <a:bodyPr wrap="square" rtlCol="0">
+            <a:spAutoFit/>
+          </a:bodyPr>
+          <a:lstStyle/>
+          <a:p>
+            <a:r>
+              <a:rPr lang="en-US" sz="1050" u="sng" dirty="0" smtClean="0"/>
+              <a:t>4 x m</a:t>
+            </a:r>
+            <a:endParaRPr lang="en-SG" sz="1050" u="sng" dirty="0"/>
+          </a:p>
+        </p:txBody>
+      </p:sp>
+      <p:sp>
+        <p:nvSpPr>
+          <p:cNvPr id="128" name="Rectangle 127"/>
+          <p:cNvSpPr/>
+          <p:nvPr/>
+        </p:nvSpPr>
+        <p:spPr>
+          <a:xfrm>
+            <a:off x="4715534" y="2954126"/>
+            <a:ext cx="1596726" cy="249531"/>
+          </a:xfrm>
+          <a:prstGeom prst="rect">
+            <a:avLst/>
+          </a:prstGeom>
+        </p:spPr>
+        <p:style>
+          <a:lnRef idx="2">
+            <a:schemeClr val="accent1">
+              <a:shade val="50000"/>
+            </a:schemeClr>
+          </a:lnRef>
+          <a:fillRef idx="1">
+            <a:schemeClr val="accent1"/>
+          </a:fillRef>
+          <a:effectRef idx="0">
+            <a:schemeClr val="accent1"/>
+          </a:effectRef>
+          <a:fontRef idx="minor">
+            <a:schemeClr val="lt1"/>
+          </a:fontRef>
+        </p:style>
+        <p:txBody>
+          <a:bodyPr rtlCol="0" anchor="ctr"/>
+          <a:lstStyle/>
+          <a:p>
+            <a:r>
+              <a:rPr lang="en-US" sz="800" b="1" dirty="0"/>
+              <a:t>5</a:t>
+            </a:r>
+            <a:r>
+              <a:rPr lang="en-US" sz="800" b="1" dirty="0" smtClean="0"/>
+              <a:t>. Load the encrypted </a:t>
+            </a:r>
+            <a:r>
+              <a:rPr lang="en-US" sz="800" b="1" dirty="0" err="1" smtClean="0"/>
+              <a:t>swatt</a:t>
+            </a:r>
+            <a:r>
+              <a:rPr lang="en-US" sz="800" b="1" dirty="0" smtClean="0"/>
+              <a:t> </a:t>
+            </a:r>
+            <a:r>
+              <a:rPr lang="en-US" sz="800" b="1" dirty="0" err="1" smtClean="0"/>
+              <a:t>msg</a:t>
+            </a:r>
+            <a:endParaRPr lang="en-SG" sz="800" b="1" dirty="0"/>
+          </a:p>
+        </p:txBody>
+      </p:sp>
+      <p:cxnSp>
+        <p:nvCxnSpPr>
+          <p:cNvPr id="129" name="Straight Arrow Connector 128"/>
+          <p:cNvCxnSpPr/>
+          <p:nvPr/>
+        </p:nvCxnSpPr>
+        <p:spPr>
+          <a:xfrm flipH="1" flipV="1">
+            <a:off x="4853069" y="3235259"/>
+            <a:ext cx="0" cy="2905342"/>
+          </a:xfrm>
+          <a:prstGeom prst="straightConnector1">
+            <a:avLst/>
+          </a:prstGeom>
+          <a:ln>
+            <a:tailEnd type="triangle"/>
+          </a:ln>
+        </p:spPr>
+        <p:style>
+          <a:lnRef idx="1">
+            <a:schemeClr val="dk1"/>
+          </a:lnRef>
+          <a:fillRef idx="0">
+            <a:schemeClr val="dk1"/>
+          </a:fillRef>
+          <a:effectRef idx="0">
+            <a:schemeClr val="dk1"/>
+          </a:effectRef>
+          <a:fontRef idx="minor">
+            <a:schemeClr val="tx1"/>
+          </a:fontRef>
+        </p:style>
+      </p:cxnSp>
+      <p:sp>
+        <p:nvSpPr>
+          <p:cNvPr id="132" name="TextBox 131"/>
+          <p:cNvSpPr txBox="1"/>
+          <p:nvPr/>
+        </p:nvSpPr>
+        <p:spPr>
+          <a:xfrm>
+            <a:off x="4683170" y="4966068"/>
+            <a:ext cx="244548" cy="253916"/>
+          </a:xfrm>
+          <a:prstGeom prst="rect">
+            <a:avLst/>
+          </a:prstGeom>
+          <a:noFill/>
+        </p:spPr>
+        <p:txBody>
+          <a:bodyPr wrap="square" rtlCol="0">
+            <a:spAutoFit/>
+          </a:bodyPr>
+          <a:lstStyle/>
+          <a:p>
+            <a:r>
+              <a:rPr lang="en-US" sz="1050" u="sng" dirty="0"/>
+              <a:t>5</a:t>
+            </a:r>
+            <a:endParaRPr lang="en-SG" sz="1050" u="sng" dirty="0"/>
+          </a:p>
+        </p:txBody>
+      </p:sp>
+      <p:cxnSp>
+        <p:nvCxnSpPr>
+          <p:cNvPr id="133" name="Straight Arrow Connector 132"/>
+          <p:cNvCxnSpPr/>
+          <p:nvPr/>
+        </p:nvCxnSpPr>
+        <p:spPr>
+          <a:xfrm>
+            <a:off x="10991850" y="2307279"/>
+            <a:ext cx="0" cy="200311"/>
+          </a:xfrm>
+          <a:prstGeom prst="straightConnector1">
+            <a:avLst/>
+          </a:prstGeom>
+          <a:ln>
+            <a:tailEnd type="triangle"/>
+          </a:ln>
+        </p:spPr>
+        <p:style>
+          <a:lnRef idx="1">
+            <a:schemeClr val="accent1"/>
+          </a:lnRef>
+          <a:fillRef idx="0">
+            <a:schemeClr val="accent1"/>
+          </a:fillRef>
+          <a:effectRef idx="0">
+            <a:schemeClr val="accent1"/>
+          </a:effectRef>
+          <a:fontRef idx="minor">
+            <a:schemeClr val="tx1"/>
+          </a:fontRef>
+        </p:style>
+      </p:cxnSp>
+      <p:cxnSp>
+        <p:nvCxnSpPr>
+          <p:cNvPr id="137" name="Straight Arrow Connector 136"/>
+          <p:cNvCxnSpPr/>
+          <p:nvPr/>
+        </p:nvCxnSpPr>
+        <p:spPr>
+          <a:xfrm>
+            <a:off x="10991850" y="2801050"/>
+            <a:ext cx="0" cy="268979"/>
+          </a:xfrm>
+          <a:prstGeom prst="straightConnector1">
+            <a:avLst/>
+          </a:prstGeom>
+          <a:ln>
+            <a:tailEnd type="triangle"/>
+          </a:ln>
+        </p:spPr>
+        <p:style>
+          <a:lnRef idx="1">
+            <a:schemeClr val="accent1"/>
+          </a:lnRef>
+          <a:fillRef idx="0">
+            <a:schemeClr val="accent1"/>
+          </a:fillRef>
+          <a:effectRef idx="0">
+            <a:schemeClr val="accent1"/>
+          </a:effectRef>
+          <a:fontRef idx="minor">
+            <a:schemeClr val="tx1"/>
+          </a:fontRef>
+        </p:style>
+      </p:cxnSp>
+      <p:sp>
+        <p:nvSpPr>
+          <p:cNvPr id="143" name="Rectangle 142"/>
+          <p:cNvSpPr/>
+          <p:nvPr/>
+        </p:nvSpPr>
+        <p:spPr>
+          <a:xfrm>
+            <a:off x="9222435" y="2967257"/>
+            <a:ext cx="1157767" cy="244238"/>
+          </a:xfrm>
+          <a:prstGeom prst="rect">
+            <a:avLst/>
+          </a:prstGeom>
+        </p:spPr>
+        <p:style>
+          <a:lnRef idx="2">
+            <a:schemeClr val="accent1">
+              <a:shade val="50000"/>
+            </a:schemeClr>
+          </a:lnRef>
+          <a:fillRef idx="1">
+            <a:schemeClr val="accent1"/>
+          </a:fillRef>
+          <a:effectRef idx="0">
+            <a:schemeClr val="accent1"/>
+          </a:effectRef>
+          <a:fontRef idx="minor">
+            <a:schemeClr val="lt1"/>
+          </a:fontRef>
+        </p:style>
+        <p:txBody>
+          <a:bodyPr rtlCol="0" anchor="ctr"/>
+          <a:lstStyle/>
+          <a:p>
+            <a:r>
+              <a:rPr lang="en-US" sz="800" b="1" dirty="0" smtClean="0"/>
+              <a:t>5</a:t>
+            </a:r>
+            <a:r>
+              <a:rPr lang="en-US" sz="800" b="1" dirty="0" smtClean="0"/>
+              <a:t>.1 Decrypt the SWATT feed back </a:t>
+            </a:r>
+            <a:r>
+              <a:rPr lang="en-US" sz="800" b="1" dirty="0" err="1" smtClean="0"/>
+              <a:t>msg</a:t>
+            </a:r>
+            <a:r>
+              <a:rPr lang="en-US" sz="800" b="1" dirty="0" smtClean="0"/>
+              <a:t> </a:t>
+            </a:r>
+            <a:endParaRPr lang="en-SG" sz="800" b="1" dirty="0"/>
+          </a:p>
+        </p:txBody>
+      </p:sp>
+      <p:sp>
+        <p:nvSpPr>
+          <p:cNvPr id="146" name="Rectangle 145"/>
+          <p:cNvSpPr/>
+          <p:nvPr/>
+        </p:nvSpPr>
+        <p:spPr>
+          <a:xfrm>
+            <a:off x="9634941" y="3857486"/>
+            <a:ext cx="2273718" cy="244238"/>
+          </a:xfrm>
+          <a:prstGeom prst="rect">
+            <a:avLst/>
+          </a:prstGeom>
+        </p:spPr>
+        <p:style>
+          <a:lnRef idx="2">
+            <a:schemeClr val="accent1">
+              <a:shade val="50000"/>
+            </a:schemeClr>
+          </a:lnRef>
+          <a:fillRef idx="1">
+            <a:schemeClr val="accent1"/>
+          </a:fillRef>
+          <a:effectRef idx="0">
+            <a:schemeClr val="accent1"/>
+          </a:effectRef>
+          <a:fontRef idx="minor">
+            <a:schemeClr val="lt1"/>
+          </a:fontRef>
+        </p:style>
+        <p:txBody>
+          <a:bodyPr rtlCol="0" anchor="ctr"/>
+          <a:lstStyle/>
+          <a:p>
+            <a:r>
+              <a:rPr lang="en-US" sz="800" b="1" dirty="0" smtClean="0"/>
+              <a:t>6.  </a:t>
+            </a:r>
+            <a:r>
+              <a:rPr lang="en-US" sz="800" b="1" dirty="0" smtClean="0"/>
+              <a:t>Verify the SWATT  value and create the report  </a:t>
+            </a:r>
+            <a:endParaRPr lang="en-SG" sz="800" b="1" dirty="0"/>
+          </a:p>
+        </p:txBody>
+      </p:sp>
+      <p:cxnSp>
+        <p:nvCxnSpPr>
+          <p:cNvPr id="147" name="Straight Arrow Connector 146"/>
+          <p:cNvCxnSpPr/>
+          <p:nvPr/>
+        </p:nvCxnSpPr>
+        <p:spPr>
+          <a:xfrm>
+            <a:off x="9901401" y="3251944"/>
+            <a:ext cx="0" cy="600898"/>
+          </a:xfrm>
+          <a:prstGeom prst="straightConnector1">
+            <a:avLst/>
+          </a:prstGeom>
+          <a:ln>
+            <a:tailEnd type="triangle"/>
+          </a:ln>
+        </p:spPr>
+        <p:style>
+          <a:lnRef idx="1">
+            <a:schemeClr val="accent1"/>
+          </a:lnRef>
+          <a:fillRef idx="0">
+            <a:schemeClr val="accent1"/>
+          </a:fillRef>
+          <a:effectRef idx="0">
+            <a:schemeClr val="accent1"/>
+          </a:effectRef>
+          <a:fontRef idx="minor">
+            <a:schemeClr val="tx1"/>
+          </a:fontRef>
+        </p:style>
+      </p:cxnSp>
+      <p:cxnSp>
+        <p:nvCxnSpPr>
+          <p:cNvPr id="149" name="Straight Arrow Connector 148"/>
+          <p:cNvCxnSpPr/>
+          <p:nvPr/>
+        </p:nvCxnSpPr>
+        <p:spPr>
+          <a:xfrm>
+            <a:off x="10629813" y="3319560"/>
+            <a:ext cx="0" cy="533282"/>
+          </a:xfrm>
+          <a:prstGeom prst="straightConnector1">
+            <a:avLst/>
+          </a:prstGeom>
+          <a:ln>
+            <a:tailEnd type="triangle"/>
+          </a:ln>
+        </p:spPr>
+        <p:style>
+          <a:lnRef idx="1">
+            <a:schemeClr val="accent1"/>
+          </a:lnRef>
+          <a:fillRef idx="0">
+            <a:schemeClr val="accent1"/>
+          </a:fillRef>
+          <a:effectRef idx="0">
+            <a:schemeClr val="accent1"/>
+          </a:effectRef>
+          <a:fontRef idx="minor">
+            <a:schemeClr val="tx1"/>
+          </a:fontRef>
+        </p:style>
+      </p:cxnSp>
+      <p:sp>
+        <p:nvSpPr>
+          <p:cNvPr id="153" name="Rectangle 152"/>
+          <p:cNvSpPr/>
+          <p:nvPr/>
+        </p:nvSpPr>
+        <p:spPr>
+          <a:xfrm>
+            <a:off x="9618807" y="4370971"/>
+            <a:ext cx="2270006" cy="244238"/>
+          </a:xfrm>
+          <a:prstGeom prst="rect">
+            <a:avLst/>
+          </a:prstGeom>
+        </p:spPr>
+        <p:style>
+          <a:lnRef idx="2">
+            <a:schemeClr val="accent1">
+              <a:shade val="50000"/>
+            </a:schemeClr>
+          </a:lnRef>
+          <a:fillRef idx="1">
+            <a:schemeClr val="accent1"/>
+          </a:fillRef>
+          <a:effectRef idx="0">
+            <a:schemeClr val="accent1"/>
+          </a:effectRef>
+          <a:fontRef idx="minor">
+            <a:schemeClr val="lt1"/>
+          </a:fontRef>
+        </p:style>
+        <p:txBody>
+          <a:bodyPr rtlCol="0" anchor="ctr"/>
+          <a:lstStyle/>
+          <a:p>
+            <a:r>
+              <a:rPr lang="en-US" sz="800" b="1" dirty="0" smtClean="0"/>
+              <a:t>6.1. AES Encrypt  the SWATT  value + verify result  </a:t>
+            </a:r>
+            <a:endParaRPr lang="en-SG" sz="800" b="1" dirty="0"/>
+          </a:p>
+        </p:txBody>
+      </p:sp>
+      <p:cxnSp>
+        <p:nvCxnSpPr>
+          <p:cNvPr id="74" name="Straight Arrow Connector 73"/>
+          <p:cNvCxnSpPr/>
+          <p:nvPr/>
+        </p:nvCxnSpPr>
+        <p:spPr>
+          <a:xfrm flipH="1" flipV="1">
+            <a:off x="11820525" y="635135"/>
+            <a:ext cx="0" cy="3190478"/>
+          </a:xfrm>
+          <a:prstGeom prst="straightConnector1">
+            <a:avLst/>
+          </a:prstGeom>
+          <a:ln>
+            <a:tailEnd type="triangle"/>
+          </a:ln>
+        </p:spPr>
+        <p:style>
+          <a:lnRef idx="1">
+            <a:schemeClr val="dk1"/>
+          </a:lnRef>
+          <a:fillRef idx="0">
+            <a:schemeClr val="dk1"/>
+          </a:fillRef>
+          <a:effectRef idx="0">
+            <a:schemeClr val="dk1"/>
+          </a:effectRef>
+          <a:fontRef idx="minor">
+            <a:schemeClr val="tx1"/>
+          </a:fontRef>
+        </p:style>
+      </p:cxnSp>
+      <p:cxnSp>
+        <p:nvCxnSpPr>
+          <p:cNvPr id="156" name="Straight Arrow Connector 155"/>
+          <p:cNvCxnSpPr/>
+          <p:nvPr/>
+        </p:nvCxnSpPr>
+        <p:spPr>
+          <a:xfrm flipH="1">
+            <a:off x="9943839" y="4108203"/>
+            <a:ext cx="8981" cy="256289"/>
+          </a:xfrm>
+          <a:prstGeom prst="straightConnector1">
+            <a:avLst/>
+          </a:prstGeom>
+          <a:ln>
+            <a:tailEnd type="triangle"/>
+          </a:ln>
+        </p:spPr>
+        <p:style>
+          <a:lnRef idx="1">
+            <a:schemeClr val="accent1"/>
+          </a:lnRef>
+          <a:fillRef idx="0">
+            <a:schemeClr val="accent1"/>
+          </a:fillRef>
+          <a:effectRef idx="0">
+            <a:schemeClr val="accent1"/>
+          </a:effectRef>
+          <a:fontRef idx="minor">
+            <a:schemeClr val="tx1"/>
+          </a:fontRef>
+        </p:style>
+      </p:cxnSp>
+      <p:sp>
+        <p:nvSpPr>
+          <p:cNvPr id="158" name="Rectangle 157"/>
+          <p:cNvSpPr/>
+          <p:nvPr/>
+        </p:nvSpPr>
+        <p:spPr>
+          <a:xfrm>
+            <a:off x="4973622" y="3375887"/>
+            <a:ext cx="1746270" cy="249531"/>
+          </a:xfrm>
+          <a:prstGeom prst="rect">
+            <a:avLst/>
+          </a:prstGeom>
+        </p:spPr>
+        <p:style>
+          <a:lnRef idx="2">
+            <a:schemeClr val="accent1">
+              <a:shade val="50000"/>
+            </a:schemeClr>
+          </a:lnRef>
+          <a:fillRef idx="1">
+            <a:schemeClr val="accent1"/>
+          </a:fillRef>
+          <a:effectRef idx="0">
+            <a:schemeClr val="accent1"/>
+          </a:effectRef>
+          <a:fontRef idx="minor">
+            <a:schemeClr val="lt1"/>
+          </a:fontRef>
+        </p:style>
+        <p:txBody>
+          <a:bodyPr rtlCol="0" anchor="ctr"/>
+          <a:lstStyle/>
+          <a:p>
+            <a:r>
+              <a:rPr lang="en-US" sz="800" b="1" dirty="0" smtClean="0"/>
+              <a:t>7</a:t>
+            </a:r>
+            <a:r>
+              <a:rPr lang="en-US" sz="800" b="1" dirty="0" smtClean="0"/>
+              <a:t>. Forward encrypted feedback  </a:t>
+            </a:r>
+            <a:r>
+              <a:rPr lang="en-US" sz="800" b="1" dirty="0" err="1" smtClean="0"/>
+              <a:t>msg</a:t>
+            </a:r>
+            <a:endParaRPr lang="en-SG" sz="800" b="1" dirty="0"/>
+          </a:p>
+        </p:txBody>
+      </p:sp>
+      <p:cxnSp>
+        <p:nvCxnSpPr>
+          <p:cNvPr id="160" name="Elbow Connector 159"/>
+          <p:cNvCxnSpPr>
+            <a:stCxn id="153" idx="1"/>
+            <a:endCxn id="158" idx="3"/>
+          </p:cNvCxnSpPr>
+          <p:nvPr/>
+        </p:nvCxnSpPr>
+        <p:spPr>
+          <a:xfrm rot="10800000">
+            <a:off x="6719893" y="3500654"/>
+            <a:ext cx="2898915" cy="992437"/>
+          </a:xfrm>
+          <a:prstGeom prst="bentConnector3">
+            <a:avLst/>
+          </a:prstGeom>
+          <a:ln>
+            <a:tailEnd type="triangle"/>
+          </a:ln>
+        </p:spPr>
+        <p:style>
+          <a:lnRef idx="1">
+            <a:schemeClr val="accent1"/>
+          </a:lnRef>
+          <a:fillRef idx="0">
+            <a:schemeClr val="accent1"/>
+          </a:fillRef>
+          <a:effectRef idx="0">
+            <a:schemeClr val="accent1"/>
+          </a:effectRef>
+          <a:fontRef idx="minor">
+            <a:schemeClr val="tx1"/>
+          </a:fontRef>
+        </p:style>
+      </p:cxnSp>
+      <p:cxnSp>
+        <p:nvCxnSpPr>
+          <p:cNvPr id="161" name="Straight Arrow Connector 160"/>
+          <p:cNvCxnSpPr/>
+          <p:nvPr/>
+        </p:nvCxnSpPr>
+        <p:spPr>
+          <a:xfrm flipH="1">
+            <a:off x="5251739" y="3683829"/>
+            <a:ext cx="1" cy="2444612"/>
+          </a:xfrm>
+          <a:prstGeom prst="straightConnector1">
+            <a:avLst/>
+          </a:prstGeom>
+          <a:ln>
+            <a:tailEnd type="triangle"/>
+          </a:ln>
+        </p:spPr>
+        <p:style>
+          <a:lnRef idx="1">
+            <a:schemeClr val="dk1"/>
+          </a:lnRef>
+          <a:fillRef idx="0">
+            <a:schemeClr val="dk1"/>
+          </a:fillRef>
+          <a:effectRef idx="0">
+            <a:schemeClr val="dk1"/>
+          </a:effectRef>
+          <a:fontRef idx="minor">
+            <a:schemeClr val="tx1"/>
+          </a:fontRef>
+        </p:style>
+      </p:cxnSp>
+      <p:sp>
+        <p:nvSpPr>
+          <p:cNvPr id="164" name="TextBox 163"/>
+          <p:cNvSpPr txBox="1"/>
+          <p:nvPr/>
+        </p:nvSpPr>
+        <p:spPr>
+          <a:xfrm>
+            <a:off x="5064944" y="4964588"/>
+            <a:ext cx="244548" cy="253916"/>
+          </a:xfrm>
+          <a:prstGeom prst="rect">
+            <a:avLst/>
+          </a:prstGeom>
+          <a:noFill/>
+        </p:spPr>
+        <p:txBody>
+          <a:bodyPr wrap="square" rtlCol="0">
+            <a:spAutoFit/>
+          </a:bodyPr>
+          <a:lstStyle/>
+          <a:p>
+            <a:r>
+              <a:rPr lang="en-US" sz="1050" u="sng" dirty="0" smtClean="0"/>
+              <a:t>7</a:t>
+            </a:r>
+            <a:endParaRPr lang="en-SG" sz="1050" u="sng" dirty="0"/>
+          </a:p>
+        </p:txBody>
+      </p:sp>
+      <p:sp>
+        <p:nvSpPr>
+          <p:cNvPr id="166" name="Rectangle 165"/>
+          <p:cNvSpPr/>
+          <p:nvPr/>
+        </p:nvSpPr>
+        <p:spPr>
+          <a:xfrm>
+            <a:off x="5398891" y="3866269"/>
+            <a:ext cx="1805591" cy="602836"/>
+          </a:xfrm>
+          <a:prstGeom prst="rect">
+            <a:avLst/>
+          </a:prstGeom>
+        </p:spPr>
+        <p:style>
+          <a:lnRef idx="2">
+            <a:schemeClr val="accent1">
+              <a:shade val="50000"/>
+            </a:schemeClr>
+          </a:lnRef>
+          <a:fillRef idx="1">
+            <a:schemeClr val="accent1"/>
+          </a:fillRef>
+          <a:effectRef idx="0">
+            <a:schemeClr val="accent1"/>
+          </a:effectRef>
+          <a:fontRef idx="minor">
+            <a:schemeClr val="lt1"/>
+          </a:fontRef>
+        </p:style>
+        <p:txBody>
+          <a:bodyPr rtlCol="0" anchor="ctr"/>
+          <a:lstStyle/>
+          <a:p>
+            <a:r>
+              <a:rPr lang="en-US" sz="800" b="1" dirty="0" smtClean="0"/>
+              <a:t>7.1 Load verification result</a:t>
+            </a:r>
+          </a:p>
+          <a:p>
+            <a:r>
+              <a:rPr lang="en-US" sz="800" b="1" dirty="0"/>
+              <a:t> </a:t>
+            </a:r>
+            <a:r>
+              <a:rPr lang="en-US" sz="800" b="1" dirty="0" smtClean="0"/>
+              <a:t>- Verify success =&gt; Terminate </a:t>
+            </a:r>
+          </a:p>
+          <a:p>
+            <a:r>
+              <a:rPr lang="en-US" sz="800" b="1" dirty="0" smtClean="0"/>
+              <a:t>-  Verify </a:t>
+            </a:r>
+            <a:r>
+              <a:rPr lang="en-US" sz="800" b="1" dirty="0" err="1" smtClean="0"/>
+              <a:t>faile</a:t>
+            </a:r>
+            <a:r>
+              <a:rPr lang="en-US" sz="800" b="1" dirty="0" smtClean="0"/>
+              <a:t> =&gt; Remove the checked program. ( or return to step 2 ) </a:t>
+            </a:r>
+          </a:p>
+          <a:p>
+            <a:r>
+              <a:rPr lang="en-US" sz="800" b="1" dirty="0" smtClean="0"/>
+              <a:t> </a:t>
+            </a:r>
+            <a:endParaRPr lang="en-SG" sz="800" b="1" dirty="0"/>
+          </a:p>
+        </p:txBody>
+      </p:sp>
+      <p:cxnSp>
+        <p:nvCxnSpPr>
+          <p:cNvPr id="167" name="Straight Arrow Connector 166"/>
+          <p:cNvCxnSpPr/>
+          <p:nvPr/>
+        </p:nvCxnSpPr>
+        <p:spPr>
+          <a:xfrm flipV="1">
+            <a:off x="5592227" y="4493091"/>
+            <a:ext cx="0" cy="1647509"/>
+          </a:xfrm>
+          <a:prstGeom prst="straightConnector1">
+            <a:avLst/>
+          </a:prstGeom>
+          <a:ln>
+            <a:tailEnd type="triangle"/>
+          </a:ln>
+        </p:spPr>
+        <p:style>
+          <a:lnRef idx="1">
+            <a:schemeClr val="dk1"/>
+          </a:lnRef>
+          <a:fillRef idx="0">
+            <a:schemeClr val="dk1"/>
+          </a:fillRef>
+          <a:effectRef idx="0">
+            <a:schemeClr val="dk1"/>
+          </a:effectRef>
+          <a:fontRef idx="minor">
+            <a:schemeClr val="tx1"/>
+          </a:fontRef>
+        </p:style>
+      </p:cxnSp>
+      <p:sp>
+        <p:nvSpPr>
+          <p:cNvPr id="171" name="TextBox 170"/>
+          <p:cNvSpPr txBox="1"/>
+          <p:nvPr/>
+        </p:nvSpPr>
+        <p:spPr>
+          <a:xfrm>
+            <a:off x="5332492" y="4983638"/>
+            <a:ext cx="405661" cy="253916"/>
+          </a:xfrm>
+          <a:prstGeom prst="rect">
+            <a:avLst/>
+          </a:prstGeom>
+          <a:noFill/>
+        </p:spPr>
+        <p:txBody>
+          <a:bodyPr wrap="square" rtlCol="0">
+            <a:spAutoFit/>
+          </a:bodyPr>
+          <a:lstStyle/>
+          <a:p>
+            <a:r>
+              <a:rPr lang="en-US" sz="1050" u="sng" dirty="0" smtClean="0"/>
+              <a:t>7.1</a:t>
+            </a:r>
+            <a:endParaRPr lang="en-SG" sz="1050" u="sng" dirty="0"/>
+          </a:p>
+        </p:txBody>
+      </p:sp>
+      <p:sp>
+        <p:nvSpPr>
+          <p:cNvPr id="177" name="Rectangle 176"/>
+          <p:cNvSpPr/>
+          <p:nvPr/>
+        </p:nvSpPr>
+        <p:spPr>
+          <a:xfrm>
+            <a:off x="7988106" y="329051"/>
+            <a:ext cx="1026563" cy="369332"/>
+          </a:xfrm>
+          <a:prstGeom prst="rect">
+            <a:avLst/>
+          </a:prstGeom>
+        </p:spPr>
+        <p:txBody>
+          <a:bodyPr wrap="none">
+            <a:spAutoFit/>
+          </a:bodyPr>
+          <a:lstStyle/>
+          <a:p>
+            <a:r>
+              <a:rPr lang="en-US" dirty="0" err="1" smtClean="0"/>
+              <a:t>NetWork</a:t>
+            </a:r>
+            <a:endParaRPr lang="en-SG" dirty="0"/>
+          </a:p>
+        </p:txBody>
+      </p:sp>
+    </p:spTree>
+    <p:extLst>
+      <p:ext uri="{BB962C8B-B14F-4D97-AF65-F5344CB8AC3E}">
+        <p14:creationId xmlns:p14="http://schemas.microsoft.com/office/powerpoint/2010/main" val="290118591"/>
       </p:ext>
     </p:extLst>
   </p:cSld>
@@ -16548,4 +20114,265 @@
     </a:ext>
   </a:extLst>
 </a:theme>
+</file>
+
+<file path=ppt/theme/theme2.xml><?xml version="1.0" encoding="utf-8"?>
+<a:theme xmlns:a="http://schemas.openxmlformats.org/drawingml/2006/main" name="Office Theme">
+  <a:themeElements>
+    <a:clrScheme name="Office">
+      <a:dk1>
+        <a:sysClr val="windowText" lastClr="000000"/>
+      </a:dk1>
+      <a:lt1>
+        <a:sysClr val="window" lastClr="FFFFFF"/>
+      </a:lt1>
+      <a:dk2>
+        <a:srgbClr val="44546A"/>
+      </a:dk2>
+      <a:lt2>
+        <a:srgbClr val="E7E6E6"/>
+      </a:lt2>
+      <a:accent1>
+        <a:srgbClr val="5B9BD5"/>
+      </a:accent1>
+      <a:accent2>
+        <a:srgbClr val="ED7D31"/>
+      </a:accent2>
+      <a:accent3>
+        <a:srgbClr val="A5A5A5"/>
+      </a:accent3>
+      <a:accent4>
+        <a:srgbClr val="FFC000"/>
+      </a:accent4>
+      <a:accent5>
+        <a:srgbClr val="4472C4"/>
+      </a:accent5>
+      <a:accent6>
+        <a:srgbClr val="70AD47"/>
+      </a:accent6>
+      <a:hlink>
+        <a:srgbClr val="0563C1"/>
+      </a:hlink>
+      <a:folHlink>
+        <a:srgbClr val="954F72"/>
+      </a:folHlink>
+    </a:clrScheme>
+    <a:fontScheme name="Office">
+      <a:majorFont>
+        <a:latin typeface="Calibri Light" panose="020F0302020204030204"/>
+        <a:ea typeface=""/>
+        <a:cs typeface=""/>
+        <a:font script="Jpan" typeface="游ゴシック Light"/>
+        <a:font script="Hang" typeface="맑은 고딕"/>
+        <a:font script="Hans" typeface="等线 Light"/>
+        <a:font script="Hant" typeface="新細明體"/>
+        <a:font script="Arab" typeface="Times New Roman"/>
+        <a:font script="Hebr" typeface="Times New Roman"/>
+        <a:font script="Thai" typeface="Angsana New"/>
+        <a:font script="Ethi" typeface="Nyala"/>
+        <a:font script="Beng" typeface="Vrinda"/>
+        <a:font script="Gujr" typeface="Shruti"/>
+        <a:font script="Khmr" typeface="MoolBoran"/>
+        <a:font script="Knda" typeface="Tunga"/>
+        <a:font script="Guru" typeface="Raavi"/>
+        <a:font script="Cans" typeface="Euphemia"/>
+        <a:font script="Cher" typeface="Plantagenet Cherokee"/>
+        <a:font script="Yiii" typeface="Microsoft Yi Baiti"/>
+        <a:font script="Tibt" typeface="Microsoft Himalaya"/>
+        <a:font script="Thaa" typeface="MV Boli"/>
+        <a:font script="Deva" typeface="Mangal"/>
+        <a:font script="Telu" typeface="Gautami"/>
+        <a:font script="Taml" typeface="Latha"/>
+        <a:font script="Syrc" typeface="Estrangelo Edessa"/>
+        <a:font script="Orya" typeface="Kalinga"/>
+        <a:font script="Mlym" typeface="Kartika"/>
+        <a:font script="Laoo" typeface="DokChampa"/>
+        <a:font script="Sinh" typeface="Iskoola Pota"/>
+        <a:font script="Mong" typeface="Mongolian Baiti"/>
+        <a:font script="Viet" typeface="Times New Roman"/>
+        <a:font script="Uigh" typeface="Microsoft Uighur"/>
+        <a:font script="Geor" typeface="Sylfaen"/>
+      </a:majorFont>
+      <a:minorFont>
+        <a:latin typeface="Calibri" panose="020F0502020204030204"/>
+        <a:ea typeface=""/>
+        <a:cs typeface=""/>
+        <a:font script="Jpan" typeface="游ゴシック"/>
+        <a:font script="Hang" typeface="맑은 고딕"/>
+        <a:font script="Hans" typeface="等线"/>
+        <a:font script="Hant" typeface="新細明體"/>
+        <a:font script="Arab" typeface="Arial"/>
+        <a:font script="Hebr" typeface="Arial"/>
+        <a:font script="Thai" typeface="Cordia New"/>
+        <a:font script="Ethi" typeface="Nyala"/>
+        <a:font script="Beng" typeface="Vrinda"/>
+        <a:font script="Gujr" typeface="Shruti"/>
+        <a:font script="Khmr" typeface="DaunPenh"/>
+        <a:font script="Knda" typeface="Tunga"/>
+        <a:font script="Guru" typeface="Raavi"/>
+        <a:font script="Cans" typeface="Euphemia"/>
+        <a:font script="Cher" typeface="Plantagenet Cherokee"/>
+        <a:font script="Yiii" typeface="Microsoft Yi Baiti"/>
+        <a:font script="Tibt" typeface="Microsoft Himalaya"/>
+        <a:font script="Thaa" typeface="MV Boli"/>
+        <a:font script="Deva" typeface="Mangal"/>
+        <a:font script="Telu" typeface="Gautami"/>
+        <a:font script="Taml" typeface="Latha"/>
+        <a:font script="Syrc" typeface="Estrangelo Edessa"/>
+        <a:font script="Orya" typeface="Kalinga"/>
+        <a:font script="Mlym" typeface="Kartika"/>
+        <a:font script="Laoo" typeface="DokChampa"/>
+        <a:font script="Sinh" typeface="Iskoola Pota"/>
+        <a:font script="Mong" typeface="Mongolian Baiti"/>
+        <a:font script="Viet" typeface="Arial"/>
+        <a:font script="Uigh" typeface="Microsoft Uighur"/>
+        <a:font script="Geor" typeface="Sylfaen"/>
+      </a:minorFont>
+    </a:fontScheme>
+    <a:fmtScheme name="Office">
+      <a:fillStyleLst>
+        <a:solidFill>
+          <a:schemeClr val="phClr"/>
+        </a:solidFill>
+        <a:gradFill rotWithShape="1">
+          <a:gsLst>
+            <a:gs pos="0">
+              <a:schemeClr val="phClr">
+                <a:lumMod val="110000"/>
+                <a:satMod val="105000"/>
+                <a:tint val="67000"/>
+              </a:schemeClr>
+            </a:gs>
+            <a:gs pos="50000">
+              <a:schemeClr val="phClr">
+                <a:lumMod val="105000"/>
+                <a:satMod val="103000"/>
+                <a:tint val="73000"/>
+              </a:schemeClr>
+            </a:gs>
+            <a:gs pos="100000">
+              <a:schemeClr val="phClr">
+                <a:lumMod val="105000"/>
+                <a:satMod val="109000"/>
+                <a:tint val="81000"/>
+              </a:schemeClr>
+            </a:gs>
+          </a:gsLst>
+          <a:lin ang="5400000" scaled="0"/>
+        </a:gradFill>
+        <a:gradFill rotWithShape="1">
+          <a:gsLst>
+            <a:gs pos="0">
+              <a:schemeClr val="phClr">
+                <a:satMod val="103000"/>
+                <a:lumMod val="102000"/>
+                <a:tint val="94000"/>
+              </a:schemeClr>
+            </a:gs>
+            <a:gs pos="50000">
+              <a:schemeClr val="phClr">
+                <a:satMod val="110000"/>
+                <a:lumMod val="100000"/>
+                <a:shade val="100000"/>
+              </a:schemeClr>
+            </a:gs>
+            <a:gs pos="100000">
+              <a:schemeClr val="phClr">
+                <a:lumMod val="99000"/>
+                <a:satMod val="120000"/>
+                <a:shade val="78000"/>
+              </a:schemeClr>
+            </a:gs>
+          </a:gsLst>
+          <a:lin ang="5400000" scaled="0"/>
+        </a:gradFill>
+      </a:fillStyleLst>
+      <a:lnStyleLst>
+        <a:ln w="6350" cap="flat" cmpd="sng" algn="ctr">
+          <a:solidFill>
+            <a:schemeClr val="phClr"/>
+          </a:solidFill>
+          <a:prstDash val="solid"/>
+          <a:miter lim="800000"/>
+        </a:ln>
+        <a:ln w="12700" cap="flat" cmpd="sng" algn="ctr">
+          <a:solidFill>
+            <a:schemeClr val="phClr"/>
+          </a:solidFill>
+          <a:prstDash val="solid"/>
+          <a:miter lim="800000"/>
+        </a:ln>
+        <a:ln w="19050" cap="flat" cmpd="sng" algn="ctr">
+          <a:solidFill>
+            <a:schemeClr val="phClr"/>
+          </a:solidFill>
+          <a:prstDash val="solid"/>
+          <a:miter lim="800000"/>
+        </a:ln>
+      </a:lnStyleLst>
+      <a:effectStyleLst>
+        <a:effectStyle>
+          <a:effectLst/>
+        </a:effectStyle>
+        <a:effectStyle>
+          <a:effectLst/>
+        </a:effectStyle>
+        <a:effectStyle>
+          <a:effectLst>
+            <a:outerShdw blurRad="57150" dist="19050" dir="5400000" algn="ctr" rotWithShape="0">
+              <a:srgbClr val="000000">
+                <a:alpha val="63000"/>
+              </a:srgbClr>
+            </a:outerShdw>
+          </a:effectLst>
+        </a:effectStyle>
+      </a:effectStyleLst>
+      <a:bgFillStyleLst>
+        <a:solidFill>
+          <a:schemeClr val="phClr"/>
+        </a:solidFill>
+        <a:solidFill>
+          <a:schemeClr val="phClr">
+            <a:tint val="95000"/>
+            <a:satMod val="170000"/>
+          </a:schemeClr>
+        </a:solidFill>
+        <a:gradFill rotWithShape="1">
+          <a:gsLst>
+            <a:gs pos="0">
+              <a:schemeClr val="phClr">
+                <a:tint val="93000"/>
+                <a:satMod val="150000"/>
+                <a:shade val="98000"/>
+                <a:lumMod val="102000"/>
+              </a:schemeClr>
+            </a:gs>
+            <a:gs pos="50000">
+              <a:schemeClr val="phClr">
+                <a:tint val="98000"/>
+                <a:satMod val="130000"/>
+                <a:shade val="90000"/>
+                <a:lumMod val="103000"/>
+              </a:schemeClr>
+            </a:gs>
+            <a:gs pos="100000">
+              <a:schemeClr val="phClr">
+                <a:shade val="63000"/>
+                <a:satMod val="120000"/>
+              </a:schemeClr>
+            </a:gs>
+          </a:gsLst>
+          <a:lin ang="5400000" scaled="0"/>
+        </a:gradFill>
+      </a:bgFillStyleLst>
+    </a:fmtScheme>
+  </a:themeElements>
+  <a:objectDefaults/>
+  <a:extraClrSchemeLst/>
+  <a:extLst>
+    <a:ext uri="{05A4C25C-085E-4340-85A3-A5531E510DB2}">
+      <thm15:themeFamily xmlns:thm15="http://schemas.microsoft.com/office/thememl/2012/main" name="Office Theme" id="{62F939B6-93AF-4DB8-9C6B-D6C7DFDC589F}" vid="{4A3C46E8-61CC-4603-A589-7422A47A8E4A}"/>
+    </a:ext>
+  </a:extLst>
+</a:theme>
 </file>
</xml_diff>

<commit_message>
Server to connect to trustClient program.
</commit_message>
<xml_diff>
--- a/doc/firmwaresignWF.pptx
+++ b/doc/firmwaresignWF.pptx
@@ -14977,6 +14977,13 @@
   <p:clrMapOvr>
     <a:masterClrMapping/>
   </p:clrMapOvr>
+  <p:timing>
+    <p:tnLst>
+      <p:par>
+        <p:cTn id="1" dur="indefinite" restart="never" nodeType="tmRoot"/>
+      </p:par>
+    </p:tnLst>
+  </p:timing>
 </p:sld>
 </file>
 
@@ -16683,6 +16690,13 @@
   <p:clrMapOvr>
     <a:masterClrMapping/>
   </p:clrMapOvr>
+  <p:timing>
+    <p:tnLst>
+      <p:par>
+        <p:cTn id="1" dur="indefinite" restart="never" nodeType="tmRoot"/>
+      </p:par>
+    </p:tnLst>
+  </p:timing>
 </p:sld>
 </file>
 
@@ -18108,8 +18122,8 @@
         </p:nvCxnSpPr>
         <p:spPr>
           <a:xfrm flipH="1">
-            <a:off x="1265162" y="5216312"/>
-            <a:ext cx="0" cy="513016"/>
+            <a:off x="1265162" y="4912641"/>
+            <a:ext cx="24489" cy="816687"/>
           </a:xfrm>
           <a:prstGeom prst="straightConnector1">
             <a:avLst/>
@@ -19852,6 +19866,13 @@
   <p:clrMapOvr>
     <a:masterClrMapping/>
   </p:clrMapOvr>
+  <p:timing>
+    <p:tnLst>
+      <p:par>
+        <p:cTn id="1" dur="indefinite" restart="never" nodeType="tmRoot"/>
+      </p:par>
+    </p:tnLst>
+  </p:timing>
 </p:sld>
 </file>
 

</xml_diff>

<commit_message>
Add the railway contorl background
</commit_message>
<xml_diff>
--- a/doc/firmwaresignWF.pptx
+++ b/doc/firmwaresignWF.pptx
@@ -5,7 +5,7 @@
     <p:sldMasterId id="2147483648" r:id="rId1"/>
   </p:sldMasterIdLst>
   <p:notesMasterIdLst>
-    <p:notesMasterId r:id="rId8"/>
+    <p:notesMasterId r:id="rId9"/>
   </p:notesMasterIdLst>
   <p:sldIdLst>
     <p:sldId id="256" r:id="rId2"/>
@@ -14,6 +14,7 @@
     <p:sldId id="259" r:id="rId5"/>
     <p:sldId id="260" r:id="rId6"/>
     <p:sldId id="261" r:id="rId7"/>
+    <p:sldId id="262" r:id="rId8"/>
   </p:sldIdLst>
   <p:sldSz cx="12192000" cy="6858000"/>
   <p:notesSz cx="6858000" cy="9144000"/>
@@ -202,7 +203,7 @@
           <a:p>
             <a:fld id="{32DA1F5A-E23E-4D9B-B8D0-40D8909182CC}" type="datetimeFigureOut">
               <a:rPr lang="en-SG" smtClean="0"/>
-              <a:t>20/6/2019</a:t>
+              <a:t>27/6/2019</a:t>
             </a:fld>
             <a:endParaRPr lang="en-SG"/>
           </a:p>
@@ -685,7 +686,7 @@
           <a:p>
             <a:fld id="{168FC4C3-6B25-48E2-93F9-24A255A41CA9}" type="datetimeFigureOut">
               <a:rPr lang="en-SG" smtClean="0"/>
-              <a:t>20/6/2019</a:t>
+              <a:t>27/6/2019</a:t>
             </a:fld>
             <a:endParaRPr lang="en-SG"/>
           </a:p>
@@ -855,7 +856,7 @@
           <a:p>
             <a:fld id="{168FC4C3-6B25-48E2-93F9-24A255A41CA9}" type="datetimeFigureOut">
               <a:rPr lang="en-SG" smtClean="0"/>
-              <a:t>20/6/2019</a:t>
+              <a:t>27/6/2019</a:t>
             </a:fld>
             <a:endParaRPr lang="en-SG"/>
           </a:p>
@@ -1035,7 +1036,7 @@
           <a:p>
             <a:fld id="{168FC4C3-6B25-48E2-93F9-24A255A41CA9}" type="datetimeFigureOut">
               <a:rPr lang="en-SG" smtClean="0"/>
-              <a:t>20/6/2019</a:t>
+              <a:t>27/6/2019</a:t>
             </a:fld>
             <a:endParaRPr lang="en-SG"/>
           </a:p>
@@ -1205,7 +1206,7 @@
           <a:p>
             <a:fld id="{168FC4C3-6B25-48E2-93F9-24A255A41CA9}" type="datetimeFigureOut">
               <a:rPr lang="en-SG" smtClean="0"/>
-              <a:t>20/6/2019</a:t>
+              <a:t>27/6/2019</a:t>
             </a:fld>
             <a:endParaRPr lang="en-SG"/>
           </a:p>
@@ -1451,7 +1452,7 @@
           <a:p>
             <a:fld id="{168FC4C3-6B25-48E2-93F9-24A255A41CA9}" type="datetimeFigureOut">
               <a:rPr lang="en-SG" smtClean="0"/>
-              <a:t>20/6/2019</a:t>
+              <a:t>27/6/2019</a:t>
             </a:fld>
             <a:endParaRPr lang="en-SG"/>
           </a:p>
@@ -1683,7 +1684,7 @@
           <a:p>
             <a:fld id="{168FC4C3-6B25-48E2-93F9-24A255A41CA9}" type="datetimeFigureOut">
               <a:rPr lang="en-SG" smtClean="0"/>
-              <a:t>20/6/2019</a:t>
+              <a:t>27/6/2019</a:t>
             </a:fld>
             <a:endParaRPr lang="en-SG"/>
           </a:p>
@@ -2050,7 +2051,7 @@
           <a:p>
             <a:fld id="{168FC4C3-6B25-48E2-93F9-24A255A41CA9}" type="datetimeFigureOut">
               <a:rPr lang="en-SG" smtClean="0"/>
-              <a:t>20/6/2019</a:t>
+              <a:t>27/6/2019</a:t>
             </a:fld>
             <a:endParaRPr lang="en-SG"/>
           </a:p>
@@ -2168,7 +2169,7 @@
           <a:p>
             <a:fld id="{168FC4C3-6B25-48E2-93F9-24A255A41CA9}" type="datetimeFigureOut">
               <a:rPr lang="en-SG" smtClean="0"/>
-              <a:t>20/6/2019</a:t>
+              <a:t>27/6/2019</a:t>
             </a:fld>
             <a:endParaRPr lang="en-SG"/>
           </a:p>
@@ -2263,7 +2264,7 @@
           <a:p>
             <a:fld id="{168FC4C3-6B25-48E2-93F9-24A255A41CA9}" type="datetimeFigureOut">
               <a:rPr lang="en-SG" smtClean="0"/>
-              <a:t>20/6/2019</a:t>
+              <a:t>27/6/2019</a:t>
             </a:fld>
             <a:endParaRPr lang="en-SG"/>
           </a:p>
@@ -2540,7 +2541,7 @@
           <a:p>
             <a:fld id="{168FC4C3-6B25-48E2-93F9-24A255A41CA9}" type="datetimeFigureOut">
               <a:rPr lang="en-SG" smtClean="0"/>
-              <a:t>20/6/2019</a:t>
+              <a:t>27/6/2019</a:t>
             </a:fld>
             <a:endParaRPr lang="en-SG"/>
           </a:p>
@@ -2793,7 +2794,7 @@
           <a:p>
             <a:fld id="{168FC4C3-6B25-48E2-93F9-24A255A41CA9}" type="datetimeFigureOut">
               <a:rPr lang="en-SG" smtClean="0"/>
-              <a:t>20/6/2019</a:t>
+              <a:t>27/6/2019</a:t>
             </a:fld>
             <a:endParaRPr lang="en-SG"/>
           </a:p>
@@ -3006,7 +3007,7 @@
           <a:p>
             <a:fld id="{168FC4C3-6B25-48E2-93F9-24A255A41CA9}" type="datetimeFigureOut">
               <a:rPr lang="en-SG" smtClean="0"/>
-              <a:t>20/6/2019</a:t>
+              <a:t>27/6/2019</a:t>
             </a:fld>
             <a:endParaRPr lang="en-SG"/>
           </a:p>
@@ -16898,11 +16899,7 @@
             </a:r>
             <a:r>
               <a:rPr lang="en-US" smtClean="0"/>
-              <a:t>] </a:t>
-            </a:r>
-            <a:r>
-              <a:rPr lang="en-US" smtClean="0"/>
-              <a:t>design(20/06/2019</a:t>
+              <a:t>] design(20/06/2019</a:t>
             </a:r>
             <a:r>
               <a:rPr lang="en-US" dirty="0" smtClean="0"/>
@@ -19854,11 +19851,7 @@
           <a:p>
             <a:r>
               <a:rPr lang="en-US" sz="800" b="1" dirty="0" smtClean="0"/>
-              <a:t>8.</a:t>
-            </a:r>
-            <a:r>
-              <a:rPr lang="en-US" sz="800" b="1" dirty="0" smtClean="0"/>
-              <a:t> Check the program running status , System </a:t>
+              <a:t>8. Check the program running status , System </a:t>
             </a:r>
             <a:r>
               <a:rPr lang="en-US" sz="800" b="1" dirty="0" err="1" smtClean="0"/>
@@ -19866,11 +19859,7 @@
             </a:r>
             <a:r>
               <a:rPr lang="en-US" sz="800" b="1" dirty="0" smtClean="0"/>
-              <a:t> </a:t>
-            </a:r>
-            <a:r>
-              <a:rPr lang="en-US" sz="800" b="1" dirty="0" smtClean="0"/>
-              <a:t>usage and (memory usage ), encrypt message </a:t>
+              <a:t> usage and (memory usage ), encrypt message </a:t>
             </a:r>
             <a:endParaRPr lang="en-SG" sz="800" b="1" dirty="0"/>
           </a:p>
@@ -19985,11 +19974,7 @@
             </a:r>
             <a:r>
               <a:rPr lang="en-US" sz="800" b="1" dirty="0" smtClean="0"/>
-              <a:t>.  </a:t>
-            </a:r>
-            <a:r>
-              <a:rPr lang="en-US" sz="800" b="1" dirty="0" smtClean="0"/>
-              <a:t>Decrypt the message  and save the </a:t>
+              <a:t>.  Decrypt the message  and save the </a:t>
             </a:r>
             <a:r>
               <a:rPr lang="en-US" sz="800" b="1" dirty="0"/>
@@ -20117,6 +20102,625 @@
       </p:par>
     </p:tnLst>
   </p:timing>
+</p:sld>
+</file>
+
+<file path=ppt/slides/slide7.xml><?xml version="1.0" encoding="utf-8"?>
+<p:sld xmlns:a="http://schemas.openxmlformats.org/drawingml/2006/main" xmlns:r="http://schemas.openxmlformats.org/officeDocument/2006/relationships" xmlns:p="http://schemas.openxmlformats.org/presentationml/2006/main">
+  <p:cSld>
+    <p:spTree>
+      <p:nvGrpSpPr>
+        <p:cNvPr id="1" name=""/>
+        <p:cNvGrpSpPr/>
+        <p:nvPr/>
+      </p:nvGrpSpPr>
+      <p:grpSpPr>
+        <a:xfrm>
+          <a:off x="0" y="0"/>
+          <a:ext cx="0" cy="0"/>
+          <a:chOff x="0" y="0"/>
+          <a:chExt cx="0" cy="0"/>
+        </a:xfrm>
+      </p:grpSpPr>
+      <p:sp>
+        <p:nvSpPr>
+          <p:cNvPr id="4" name="Rectangle 3"/>
+          <p:cNvSpPr/>
+          <p:nvPr/>
+        </p:nvSpPr>
+        <p:spPr>
+          <a:xfrm>
+            <a:off x="875898" y="269507"/>
+            <a:ext cx="10549288" cy="6246795"/>
+          </a:xfrm>
+          <a:prstGeom prst="rect">
+            <a:avLst/>
+          </a:prstGeom>
+        </p:spPr>
+        <p:style>
+          <a:lnRef idx="2">
+            <a:schemeClr val="dk1">
+              <a:shade val="50000"/>
+            </a:schemeClr>
+          </a:lnRef>
+          <a:fillRef idx="1">
+            <a:schemeClr val="dk1"/>
+          </a:fillRef>
+          <a:effectRef idx="0">
+            <a:schemeClr val="dk1"/>
+          </a:effectRef>
+          <a:fontRef idx="minor">
+            <a:schemeClr val="lt1"/>
+          </a:fontRef>
+        </p:style>
+        <p:txBody>
+          <a:bodyPr rtlCol="0" anchor="ctr"/>
+          <a:lstStyle/>
+          <a:p>
+            <a:pPr algn="ctr"/>
+            <a:endParaRPr lang="en-SG"/>
+          </a:p>
+        </p:txBody>
+      </p:sp>
+      <p:cxnSp>
+        <p:nvCxnSpPr>
+          <p:cNvPr id="6" name="Straight Connector 5"/>
+          <p:cNvCxnSpPr/>
+          <p:nvPr/>
+        </p:nvCxnSpPr>
+        <p:spPr>
+          <a:xfrm flipV="1">
+            <a:off x="2396691" y="1328286"/>
+            <a:ext cx="7007191" cy="0"/>
+          </a:xfrm>
+          <a:prstGeom prst="line">
+            <a:avLst/>
+          </a:prstGeom>
+          <a:ln w="57150">
+            <a:solidFill>
+              <a:srgbClr val="92D050"/>
+            </a:solidFill>
+            <a:prstDash val="dash"/>
+          </a:ln>
+        </p:spPr>
+        <p:style>
+          <a:lnRef idx="1">
+            <a:schemeClr val="accent1"/>
+          </a:lnRef>
+          <a:fillRef idx="0">
+            <a:schemeClr val="accent1"/>
+          </a:fillRef>
+          <a:effectRef idx="0">
+            <a:schemeClr val="accent1"/>
+          </a:effectRef>
+          <a:fontRef idx="minor">
+            <a:schemeClr val="tx1"/>
+          </a:fontRef>
+        </p:style>
+      </p:cxnSp>
+      <p:cxnSp>
+        <p:nvCxnSpPr>
+          <p:cNvPr id="10" name="Straight Connector 9"/>
+          <p:cNvCxnSpPr/>
+          <p:nvPr/>
+        </p:nvCxnSpPr>
+        <p:spPr>
+          <a:xfrm flipH="1">
+            <a:off x="2396691" y="1299411"/>
+            <a:ext cx="0" cy="4129238"/>
+          </a:xfrm>
+          <a:prstGeom prst="line">
+            <a:avLst/>
+          </a:prstGeom>
+          <a:ln w="57150">
+            <a:solidFill>
+              <a:srgbClr val="92D050"/>
+            </a:solidFill>
+            <a:prstDash val="dash"/>
+          </a:ln>
+        </p:spPr>
+        <p:style>
+          <a:lnRef idx="1">
+            <a:schemeClr val="accent1"/>
+          </a:lnRef>
+          <a:fillRef idx="0">
+            <a:schemeClr val="accent1"/>
+          </a:fillRef>
+          <a:effectRef idx="0">
+            <a:schemeClr val="accent1"/>
+          </a:effectRef>
+          <a:fontRef idx="minor">
+            <a:schemeClr val="tx1"/>
+          </a:fontRef>
+        </p:style>
+      </p:cxnSp>
+      <p:cxnSp>
+        <p:nvCxnSpPr>
+          <p:cNvPr id="13" name="Straight Connector 12"/>
+          <p:cNvCxnSpPr/>
+          <p:nvPr/>
+        </p:nvCxnSpPr>
+        <p:spPr>
+          <a:xfrm flipV="1">
+            <a:off x="2375841" y="5407799"/>
+            <a:ext cx="7007191" cy="0"/>
+          </a:xfrm>
+          <a:prstGeom prst="line">
+            <a:avLst/>
+          </a:prstGeom>
+          <a:ln w="57150">
+            <a:solidFill>
+              <a:srgbClr val="92D050"/>
+            </a:solidFill>
+            <a:prstDash val="dash"/>
+          </a:ln>
+        </p:spPr>
+        <p:style>
+          <a:lnRef idx="1">
+            <a:schemeClr val="accent1"/>
+          </a:lnRef>
+          <a:fillRef idx="0">
+            <a:schemeClr val="accent1"/>
+          </a:fillRef>
+          <a:effectRef idx="0">
+            <a:schemeClr val="accent1"/>
+          </a:effectRef>
+          <a:fontRef idx="minor">
+            <a:schemeClr val="tx1"/>
+          </a:fontRef>
+        </p:style>
+      </p:cxnSp>
+      <p:cxnSp>
+        <p:nvCxnSpPr>
+          <p:cNvPr id="14" name="Straight Connector 13"/>
+          <p:cNvCxnSpPr/>
+          <p:nvPr/>
+        </p:nvCxnSpPr>
+        <p:spPr>
+          <a:xfrm flipH="1">
+            <a:off x="9383032" y="1299411"/>
+            <a:ext cx="0" cy="4129238"/>
+          </a:xfrm>
+          <a:prstGeom prst="line">
+            <a:avLst/>
+          </a:prstGeom>
+          <a:ln w="57150">
+            <a:solidFill>
+              <a:srgbClr val="92D050"/>
+            </a:solidFill>
+            <a:prstDash val="dash"/>
+          </a:ln>
+        </p:spPr>
+        <p:style>
+          <a:lnRef idx="1">
+            <a:schemeClr val="accent1"/>
+          </a:lnRef>
+          <a:fillRef idx="0">
+            <a:schemeClr val="accent1"/>
+          </a:fillRef>
+          <a:effectRef idx="0">
+            <a:schemeClr val="accent1"/>
+          </a:effectRef>
+          <a:fontRef idx="minor">
+            <a:schemeClr val="tx1"/>
+          </a:fontRef>
+        </p:style>
+      </p:cxnSp>
+      <p:sp>
+        <p:nvSpPr>
+          <p:cNvPr id="15" name="Rectangle 14"/>
+          <p:cNvSpPr/>
+          <p:nvPr/>
+        </p:nvSpPr>
+        <p:spPr>
+          <a:xfrm>
+            <a:off x="9134375" y="2502568"/>
+            <a:ext cx="471638" cy="1289786"/>
+          </a:xfrm>
+          <a:prstGeom prst="rect">
+            <a:avLst/>
+          </a:prstGeom>
+          <a:ln w="38100">
+            <a:solidFill>
+              <a:srgbClr val="00B050"/>
+            </a:solidFill>
+          </a:ln>
+        </p:spPr>
+        <p:style>
+          <a:lnRef idx="2">
+            <a:schemeClr val="accent4">
+              <a:shade val="50000"/>
+            </a:schemeClr>
+          </a:lnRef>
+          <a:fillRef idx="1">
+            <a:schemeClr val="accent4"/>
+          </a:fillRef>
+          <a:effectRef idx="0">
+            <a:schemeClr val="accent4"/>
+          </a:effectRef>
+          <a:fontRef idx="minor">
+            <a:schemeClr val="lt1"/>
+          </a:fontRef>
+        </p:style>
+        <p:txBody>
+          <a:bodyPr rtlCol="0" anchor="ctr"/>
+          <a:lstStyle/>
+          <a:p>
+            <a:pPr algn="ctr"/>
+            <a:endParaRPr lang="en-SG"/>
+          </a:p>
+        </p:txBody>
+      </p:sp>
+      <p:cxnSp>
+        <p:nvCxnSpPr>
+          <p:cNvPr id="19" name="Straight Arrow Connector 18"/>
+          <p:cNvCxnSpPr/>
+          <p:nvPr/>
+        </p:nvCxnSpPr>
+        <p:spPr>
+          <a:xfrm flipV="1">
+            <a:off x="7525351" y="1434165"/>
+            <a:ext cx="0" cy="385010"/>
+          </a:xfrm>
+          <a:prstGeom prst="straightConnector1">
+            <a:avLst/>
+          </a:prstGeom>
+          <a:ln w="28575">
+            <a:tailEnd type="triangle"/>
+          </a:ln>
+        </p:spPr>
+        <p:style>
+          <a:lnRef idx="1">
+            <a:schemeClr val="accent1"/>
+          </a:lnRef>
+          <a:fillRef idx="0">
+            <a:schemeClr val="accent1"/>
+          </a:fillRef>
+          <a:effectRef idx="0">
+            <a:schemeClr val="accent1"/>
+          </a:effectRef>
+          <a:fontRef idx="minor">
+            <a:schemeClr val="tx1"/>
+          </a:fontRef>
+        </p:style>
+      </p:cxnSp>
+      <p:cxnSp>
+        <p:nvCxnSpPr>
+          <p:cNvPr id="20" name="Straight Arrow Connector 19"/>
+          <p:cNvCxnSpPr/>
+          <p:nvPr/>
+        </p:nvCxnSpPr>
+        <p:spPr>
+          <a:xfrm flipV="1">
+            <a:off x="4020151" y="1434165"/>
+            <a:ext cx="0" cy="385010"/>
+          </a:xfrm>
+          <a:prstGeom prst="straightConnector1">
+            <a:avLst/>
+          </a:prstGeom>
+          <a:ln w="28575">
+            <a:tailEnd type="triangle"/>
+          </a:ln>
+        </p:spPr>
+        <p:style>
+          <a:lnRef idx="1">
+            <a:schemeClr val="accent1"/>
+          </a:lnRef>
+          <a:fillRef idx="0">
+            <a:schemeClr val="accent1"/>
+          </a:fillRef>
+          <a:effectRef idx="0">
+            <a:schemeClr val="accent1"/>
+          </a:effectRef>
+          <a:fontRef idx="minor">
+            <a:schemeClr val="tx1"/>
+          </a:fontRef>
+        </p:style>
+      </p:cxnSp>
+      <p:cxnSp>
+        <p:nvCxnSpPr>
+          <p:cNvPr id="21" name="Straight Arrow Connector 20"/>
+          <p:cNvCxnSpPr/>
+          <p:nvPr/>
+        </p:nvCxnSpPr>
+        <p:spPr>
+          <a:xfrm flipH="1" flipV="1">
+            <a:off x="2492944" y="3359217"/>
+            <a:ext cx="389823" cy="0"/>
+          </a:xfrm>
+          <a:prstGeom prst="straightConnector1">
+            <a:avLst/>
+          </a:prstGeom>
+          <a:ln w="28575">
+            <a:tailEnd type="triangle"/>
+          </a:ln>
+        </p:spPr>
+        <p:style>
+          <a:lnRef idx="1">
+            <a:schemeClr val="accent1"/>
+          </a:lnRef>
+          <a:fillRef idx="0">
+            <a:schemeClr val="accent1"/>
+          </a:fillRef>
+          <a:effectRef idx="0">
+            <a:schemeClr val="accent1"/>
+          </a:effectRef>
+          <a:fontRef idx="minor">
+            <a:schemeClr val="tx1"/>
+          </a:fontRef>
+        </p:style>
+      </p:cxnSp>
+      <p:cxnSp>
+        <p:nvCxnSpPr>
+          <p:cNvPr id="23" name="Straight Arrow Connector 22"/>
+          <p:cNvCxnSpPr/>
+          <p:nvPr/>
+        </p:nvCxnSpPr>
+        <p:spPr>
+          <a:xfrm>
+            <a:off x="4161324" y="4926530"/>
+            <a:ext cx="0" cy="396240"/>
+          </a:xfrm>
+          <a:prstGeom prst="straightConnector1">
+            <a:avLst/>
+          </a:prstGeom>
+          <a:ln w="28575">
+            <a:tailEnd type="triangle"/>
+          </a:ln>
+        </p:spPr>
+        <p:style>
+          <a:lnRef idx="1">
+            <a:schemeClr val="accent1"/>
+          </a:lnRef>
+          <a:fillRef idx="0">
+            <a:schemeClr val="accent1"/>
+          </a:fillRef>
+          <a:effectRef idx="0">
+            <a:schemeClr val="accent1"/>
+          </a:effectRef>
+          <a:fontRef idx="minor">
+            <a:schemeClr val="tx1"/>
+          </a:fontRef>
+        </p:style>
+      </p:cxnSp>
+      <p:cxnSp>
+        <p:nvCxnSpPr>
+          <p:cNvPr id="25" name="Straight Arrow Connector 24"/>
+          <p:cNvCxnSpPr/>
+          <p:nvPr/>
+        </p:nvCxnSpPr>
+        <p:spPr>
+          <a:xfrm>
+            <a:off x="5911517" y="4926530"/>
+            <a:ext cx="0" cy="396240"/>
+          </a:xfrm>
+          <a:prstGeom prst="straightConnector1">
+            <a:avLst/>
+          </a:prstGeom>
+          <a:ln w="28575">
+            <a:tailEnd type="triangle"/>
+          </a:ln>
+        </p:spPr>
+        <p:style>
+          <a:lnRef idx="1">
+            <a:schemeClr val="accent1"/>
+          </a:lnRef>
+          <a:fillRef idx="0">
+            <a:schemeClr val="accent1"/>
+          </a:fillRef>
+          <a:effectRef idx="0">
+            <a:schemeClr val="accent1"/>
+          </a:effectRef>
+          <a:fontRef idx="minor">
+            <a:schemeClr val="tx1"/>
+          </a:fontRef>
+        </p:style>
+      </p:cxnSp>
+      <p:cxnSp>
+        <p:nvCxnSpPr>
+          <p:cNvPr id="26" name="Straight Arrow Connector 25"/>
+          <p:cNvCxnSpPr/>
+          <p:nvPr/>
+        </p:nvCxnSpPr>
+        <p:spPr>
+          <a:xfrm>
+            <a:off x="7554228" y="4926530"/>
+            <a:ext cx="0" cy="396240"/>
+          </a:xfrm>
+          <a:prstGeom prst="straightConnector1">
+            <a:avLst/>
+          </a:prstGeom>
+          <a:ln w="28575">
+            <a:tailEnd type="triangle"/>
+          </a:ln>
+        </p:spPr>
+        <p:style>
+          <a:lnRef idx="1">
+            <a:schemeClr val="accent1"/>
+          </a:lnRef>
+          <a:fillRef idx="0">
+            <a:schemeClr val="accent1"/>
+          </a:fillRef>
+          <a:effectRef idx="0">
+            <a:schemeClr val="accent1"/>
+          </a:effectRef>
+          <a:fontRef idx="minor">
+            <a:schemeClr val="tx1"/>
+          </a:fontRef>
+        </p:style>
+      </p:cxnSp>
+      <p:sp>
+        <p:nvSpPr>
+          <p:cNvPr id="28" name="Right Arrow 27"/>
+          <p:cNvSpPr/>
+          <p:nvPr/>
+        </p:nvSpPr>
+        <p:spPr>
+          <a:xfrm rot="16200000">
+            <a:off x="9000862" y="2913211"/>
+            <a:ext cx="738664" cy="309693"/>
+          </a:xfrm>
+          <a:prstGeom prst="rightArrow">
+            <a:avLst/>
+          </a:prstGeom>
+        </p:spPr>
+        <p:style>
+          <a:lnRef idx="2">
+            <a:schemeClr val="accent1">
+              <a:shade val="50000"/>
+            </a:schemeClr>
+          </a:lnRef>
+          <a:fillRef idx="1">
+            <a:schemeClr val="accent1"/>
+          </a:fillRef>
+          <a:effectRef idx="0">
+            <a:schemeClr val="accent1"/>
+          </a:effectRef>
+          <a:fontRef idx="minor">
+            <a:schemeClr val="lt1"/>
+          </a:fontRef>
+        </p:style>
+        <p:txBody>
+          <a:bodyPr rtlCol="0" anchor="ctr"/>
+          <a:lstStyle/>
+          <a:p>
+            <a:pPr algn="ctr"/>
+            <a:endParaRPr lang="en-SG"/>
+          </a:p>
+        </p:txBody>
+      </p:sp>
+      <p:sp>
+        <p:nvSpPr>
+          <p:cNvPr id="29" name="Line Callout 1 (Border and Accent Bar) 28"/>
+          <p:cNvSpPr/>
+          <p:nvPr/>
+        </p:nvSpPr>
+        <p:spPr>
+          <a:xfrm flipH="1">
+            <a:off x="7034241" y="2525828"/>
+            <a:ext cx="1509966" cy="240631"/>
+          </a:xfrm>
+          <a:prstGeom prst="accentBorderCallout1">
+            <a:avLst/>
+          </a:prstGeom>
+        </p:spPr>
+        <p:style>
+          <a:lnRef idx="1">
+            <a:schemeClr val="accent3"/>
+          </a:lnRef>
+          <a:fillRef idx="2">
+            <a:schemeClr val="accent3"/>
+          </a:fillRef>
+          <a:effectRef idx="1">
+            <a:schemeClr val="accent3"/>
+          </a:effectRef>
+          <a:fontRef idx="minor">
+            <a:schemeClr val="dk1"/>
+          </a:fontRef>
+        </p:style>
+        <p:txBody>
+          <a:bodyPr rtlCol="0" anchor="ctr"/>
+          <a:lstStyle/>
+          <a:p>
+            <a:pPr algn="ctr"/>
+            <a:r>
+              <a:rPr lang="en-US" dirty="0" smtClean="0"/>
+              <a:t>Train station</a:t>
+            </a:r>
+            <a:endParaRPr lang="en-SG" dirty="0"/>
+          </a:p>
+        </p:txBody>
+      </p:sp>
+      <p:sp>
+        <p:nvSpPr>
+          <p:cNvPr id="30" name="Right Arrow 29"/>
+          <p:cNvSpPr/>
+          <p:nvPr/>
+        </p:nvSpPr>
+        <p:spPr>
+          <a:xfrm>
+            <a:off x="9631690" y="2552738"/>
+            <a:ext cx="317634" cy="227355"/>
+          </a:xfrm>
+          <a:prstGeom prst="rightArrow">
+            <a:avLst/>
+          </a:prstGeom>
+        </p:spPr>
+        <p:style>
+          <a:lnRef idx="2">
+            <a:schemeClr val="accent1">
+              <a:shade val="50000"/>
+            </a:schemeClr>
+          </a:lnRef>
+          <a:fillRef idx="1">
+            <a:schemeClr val="accent1"/>
+          </a:fillRef>
+          <a:effectRef idx="0">
+            <a:schemeClr val="accent1"/>
+          </a:effectRef>
+          <a:fontRef idx="minor">
+            <a:schemeClr val="lt1"/>
+          </a:fontRef>
+        </p:style>
+        <p:txBody>
+          <a:bodyPr rtlCol="0" anchor="ctr"/>
+          <a:lstStyle/>
+          <a:p>
+            <a:pPr algn="ctr"/>
+            <a:endParaRPr lang="en-SG"/>
+          </a:p>
+        </p:txBody>
+      </p:sp>
+      <p:sp>
+        <p:nvSpPr>
+          <p:cNvPr id="32" name="Right Arrow 31"/>
+          <p:cNvSpPr/>
+          <p:nvPr/>
+        </p:nvSpPr>
+        <p:spPr>
+          <a:xfrm rot="10800000">
+            <a:off x="9631690" y="3437390"/>
+            <a:ext cx="341511" cy="287587"/>
+          </a:xfrm>
+          <a:prstGeom prst="rightArrow">
+            <a:avLst/>
+          </a:prstGeom>
+        </p:spPr>
+        <p:style>
+          <a:lnRef idx="2">
+            <a:schemeClr val="accent1">
+              <a:shade val="50000"/>
+            </a:schemeClr>
+          </a:lnRef>
+          <a:fillRef idx="1">
+            <a:schemeClr val="accent1"/>
+          </a:fillRef>
+          <a:effectRef idx="0">
+            <a:schemeClr val="accent1"/>
+          </a:effectRef>
+          <a:fontRef idx="minor">
+            <a:schemeClr val="lt1"/>
+          </a:fontRef>
+        </p:style>
+        <p:txBody>
+          <a:bodyPr rtlCol="0" anchor="ctr"/>
+          <a:lstStyle/>
+          <a:p>
+            <a:pPr algn="ctr"/>
+            <a:endParaRPr lang="en-SG"/>
+          </a:p>
+        </p:txBody>
+      </p:sp>
+    </p:spTree>
+    <p:extLst>
+      <p:ext uri="{BB962C8B-B14F-4D97-AF65-F5344CB8AC3E}">
+        <p14:creationId xmlns:p14="http://schemas.microsoft.com/office/powerpoint/2010/main" val="18561099"/>
+      </p:ext>
+    </p:extLst>
+  </p:cSld>
+  <p:clrMapOvr>
+    <a:masterClrMapping/>
+  </p:clrMapOvr>
 </p:sld>
 </file>
 

</xml_diff>

<commit_message>
Changed the OPtee design part.
</commit_message>
<xml_diff>
--- a/doc/firmwaresignWF.pptx
+++ b/doc/firmwaresignWF.pptx
@@ -203,7 +203,7 @@
           <a:p>
             <a:fld id="{32DA1F5A-E23E-4D9B-B8D0-40D8909182CC}" type="datetimeFigureOut">
               <a:rPr lang="en-SG" smtClean="0"/>
-              <a:t>27/6/2019</a:t>
+              <a:t>12/7/2019</a:t>
             </a:fld>
             <a:endParaRPr lang="en-SG"/>
           </a:p>
@@ -686,7 +686,7 @@
           <a:p>
             <a:fld id="{168FC4C3-6B25-48E2-93F9-24A255A41CA9}" type="datetimeFigureOut">
               <a:rPr lang="en-SG" smtClean="0"/>
-              <a:t>27/6/2019</a:t>
+              <a:t>12/7/2019</a:t>
             </a:fld>
             <a:endParaRPr lang="en-SG"/>
           </a:p>
@@ -856,7 +856,7 @@
           <a:p>
             <a:fld id="{168FC4C3-6B25-48E2-93F9-24A255A41CA9}" type="datetimeFigureOut">
               <a:rPr lang="en-SG" smtClean="0"/>
-              <a:t>27/6/2019</a:t>
+              <a:t>12/7/2019</a:t>
             </a:fld>
             <a:endParaRPr lang="en-SG"/>
           </a:p>
@@ -1036,7 +1036,7 @@
           <a:p>
             <a:fld id="{168FC4C3-6B25-48E2-93F9-24A255A41CA9}" type="datetimeFigureOut">
               <a:rPr lang="en-SG" smtClean="0"/>
-              <a:t>27/6/2019</a:t>
+              <a:t>12/7/2019</a:t>
             </a:fld>
             <a:endParaRPr lang="en-SG"/>
           </a:p>
@@ -1206,7 +1206,7 @@
           <a:p>
             <a:fld id="{168FC4C3-6B25-48E2-93F9-24A255A41CA9}" type="datetimeFigureOut">
               <a:rPr lang="en-SG" smtClean="0"/>
-              <a:t>27/6/2019</a:t>
+              <a:t>12/7/2019</a:t>
             </a:fld>
             <a:endParaRPr lang="en-SG"/>
           </a:p>
@@ -1452,7 +1452,7 @@
           <a:p>
             <a:fld id="{168FC4C3-6B25-48E2-93F9-24A255A41CA9}" type="datetimeFigureOut">
               <a:rPr lang="en-SG" smtClean="0"/>
-              <a:t>27/6/2019</a:t>
+              <a:t>12/7/2019</a:t>
             </a:fld>
             <a:endParaRPr lang="en-SG"/>
           </a:p>
@@ -1684,7 +1684,7 @@
           <a:p>
             <a:fld id="{168FC4C3-6B25-48E2-93F9-24A255A41CA9}" type="datetimeFigureOut">
               <a:rPr lang="en-SG" smtClean="0"/>
-              <a:t>27/6/2019</a:t>
+              <a:t>12/7/2019</a:t>
             </a:fld>
             <a:endParaRPr lang="en-SG"/>
           </a:p>
@@ -2051,7 +2051,7 @@
           <a:p>
             <a:fld id="{168FC4C3-6B25-48E2-93F9-24A255A41CA9}" type="datetimeFigureOut">
               <a:rPr lang="en-SG" smtClean="0"/>
-              <a:t>27/6/2019</a:t>
+              <a:t>12/7/2019</a:t>
             </a:fld>
             <a:endParaRPr lang="en-SG"/>
           </a:p>
@@ -2169,7 +2169,7 @@
           <a:p>
             <a:fld id="{168FC4C3-6B25-48E2-93F9-24A255A41CA9}" type="datetimeFigureOut">
               <a:rPr lang="en-SG" smtClean="0"/>
-              <a:t>27/6/2019</a:t>
+              <a:t>12/7/2019</a:t>
             </a:fld>
             <a:endParaRPr lang="en-SG"/>
           </a:p>
@@ -2264,7 +2264,7 @@
           <a:p>
             <a:fld id="{168FC4C3-6B25-48E2-93F9-24A255A41CA9}" type="datetimeFigureOut">
               <a:rPr lang="en-SG" smtClean="0"/>
-              <a:t>27/6/2019</a:t>
+              <a:t>12/7/2019</a:t>
             </a:fld>
             <a:endParaRPr lang="en-SG"/>
           </a:p>
@@ -2541,7 +2541,7 @@
           <a:p>
             <a:fld id="{168FC4C3-6B25-48E2-93F9-24A255A41CA9}" type="datetimeFigureOut">
               <a:rPr lang="en-SG" smtClean="0"/>
-              <a:t>27/6/2019</a:t>
+              <a:t>12/7/2019</a:t>
             </a:fld>
             <a:endParaRPr lang="en-SG"/>
           </a:p>
@@ -2794,7 +2794,7 @@
           <a:p>
             <a:fld id="{168FC4C3-6B25-48E2-93F9-24A255A41CA9}" type="datetimeFigureOut">
               <a:rPr lang="en-SG" smtClean="0"/>
-              <a:t>27/6/2019</a:t>
+              <a:t>12/7/2019</a:t>
             </a:fld>
             <a:endParaRPr lang="en-SG"/>
           </a:p>
@@ -3007,7 +3007,7 @@
           <a:p>
             <a:fld id="{168FC4C3-6B25-48E2-93F9-24A255A41CA9}" type="datetimeFigureOut">
               <a:rPr lang="en-SG" smtClean="0"/>
-              <a:t>27/6/2019</a:t>
+              <a:t>12/7/2019</a:t>
             </a:fld>
             <a:endParaRPr lang="en-SG"/>
           </a:p>
@@ -16765,7 +16765,7 @@
         <p:spPr>
           <a:xfrm>
             <a:off x="3565762" y="1240290"/>
-            <a:ext cx="3965633" cy="4124206"/>
+            <a:ext cx="4236681" cy="4124206"/>
           </a:xfrm>
           <a:prstGeom prst="rect">
             <a:avLst/>
@@ -16899,7 +16899,11 @@
             </a:r>
             <a:r>
               <a:rPr lang="en-US" smtClean="0"/>
-              <a:t>] design(20/06/2019</a:t>
+              <a:t>] </a:t>
+            </a:r>
+            <a:r>
+              <a:rPr lang="en-US" smtClean="0"/>
+              <a:t>design(10/07/2019</a:t>
             </a:r>
             <a:r>
               <a:rPr lang="en-US" dirty="0" smtClean="0"/>
@@ -17044,7 +17048,7 @@
         <p:spPr>
           <a:xfrm>
             <a:off x="182140" y="1250100"/>
-            <a:ext cx="2933311" cy="3662541"/>
+            <a:ext cx="2999573" cy="3677930"/>
           </a:xfrm>
           <a:prstGeom prst="rect">
             <a:avLst/>
@@ -17096,8 +17100,20 @@
               <a:buChar char="-"/>
             </a:pPr>
             <a:r>
-              <a:rPr lang="en-US" sz="1000" dirty="0" smtClean="0"/>
-              <a:t>AES Key, AES IV</a:t>
+              <a:rPr lang="en-US" sz="900" dirty="0" smtClean="0"/>
+              <a:t>AES </a:t>
+            </a:r>
+            <a:r>
+              <a:rPr lang="en-US" sz="900" dirty="0" smtClean="0"/>
+              <a:t>default </a:t>
+            </a:r>
+            <a:r>
+              <a:rPr lang="en-US" sz="900" dirty="0" smtClean="0"/>
+              <a:t>Key</a:t>
+            </a:r>
+            <a:r>
+              <a:rPr lang="en-US" sz="900" dirty="0" smtClean="0"/>
+              <a:t>, AES IV</a:t>
             </a:r>
           </a:p>
           <a:p>
@@ -17106,7 +17122,7 @@
               <a:buChar char="-"/>
             </a:pPr>
             <a:r>
-              <a:rPr lang="en-US" sz="1000" dirty="0" smtClean="0"/>
+              <a:rPr lang="en-US" sz="900" dirty="0" smtClean="0"/>
               <a:t>Challenge String length</a:t>
             </a:r>
           </a:p>
@@ -17116,7 +17132,7 @@
               <a:buChar char="-"/>
             </a:pPr>
             <a:r>
-              <a:rPr lang="en-US" sz="1000" dirty="0" smtClean="0"/>
+              <a:rPr lang="en-US" sz="900" dirty="0" smtClean="0"/>
               <a:t>SWATT calculation Iteration time [m]</a:t>
             </a:r>
           </a:p>
@@ -17126,11 +17142,11 @@
               <a:buChar char="-"/>
             </a:pPr>
             <a:r>
-              <a:rPr lang="en-US" sz="1000" dirty="0"/>
+              <a:rPr lang="en-US" sz="900" dirty="0"/>
               <a:t>Linear congruential </a:t>
             </a:r>
             <a:r>
-              <a:rPr lang="en-US" sz="1000" dirty="0" smtClean="0"/>
+              <a:rPr lang="en-US" sz="900" dirty="0" smtClean="0"/>
               <a:t>random(BSD rand MAX and  seed offset )</a:t>
             </a:r>
           </a:p>
@@ -17140,12 +17156,12 @@
               <a:buChar char="-"/>
             </a:pPr>
             <a:r>
-              <a:rPr lang="en-US" sz="1000" dirty="0" smtClean="0"/>
+              <a:rPr lang="en-US" sz="900" dirty="0" smtClean="0"/>
               <a:t>File address block range.</a:t>
             </a:r>
           </a:p>
           <a:p>
-            <a:endParaRPr lang="en-US" sz="1000" dirty="0" smtClean="0"/>
+            <a:endParaRPr lang="en-US" sz="900" dirty="0" smtClean="0"/>
           </a:p>
           <a:p>
             <a:r>
@@ -17154,143 +17170,234 @@
             </a:r>
           </a:p>
           <a:p>
-            <a:r>
-              <a:rPr lang="en-US" sz="1000" dirty="0" smtClean="0"/>
-              <a:t>1 - Accept the </a:t>
-            </a:r>
-            <a:r>
-              <a:rPr lang="en-US" sz="1000" dirty="0" err="1" smtClean="0"/>
+            <a:pPr marL="228600" indent="-228600">
+              <a:buFont typeface="+mj-lt"/>
+              <a:buAutoNum type="arabicPeriod"/>
+            </a:pPr>
+            <a:r>
+              <a:rPr lang="en-US" sz="900" dirty="0" smtClean="0"/>
+              <a:t>Accept </a:t>
+            </a:r>
+            <a:r>
+              <a:rPr lang="en-US" sz="900" dirty="0" smtClean="0"/>
+              <a:t>the </a:t>
+            </a:r>
+            <a:r>
+              <a:rPr lang="en-US" sz="900" dirty="0" err="1" smtClean="0"/>
               <a:t>trustClient</a:t>
             </a:r>
             <a:r>
-              <a:rPr lang="en-US" sz="1000" dirty="0" smtClean="0"/>
-              <a:t> connection. </a:t>
-            </a:r>
-          </a:p>
-          <a:p>
-            <a:r>
-              <a:rPr lang="en-US" sz="1000" dirty="0" smtClean="0"/>
-              <a:t>2 - Load AES-Key, decrypt </a:t>
-            </a:r>
-            <a:r>
-              <a:rPr lang="en-US" sz="1000" dirty="0" err="1" smtClean="0"/>
+              <a:rPr lang="en-US" sz="900" dirty="0" smtClean="0"/>
+              <a:t>(normal word) </a:t>
+            </a:r>
+            <a:r>
+              <a:rPr lang="en-US" sz="900" dirty="0" smtClean="0"/>
+              <a:t>connection. </a:t>
+            </a:r>
+          </a:p>
+          <a:p>
+            <a:pPr marL="228600" indent="-228600">
+              <a:buFont typeface="+mj-lt"/>
+              <a:buAutoNum type="arabicPeriod"/>
+            </a:pPr>
+            <a:r>
+              <a:rPr lang="en-US" sz="900" dirty="0" smtClean="0"/>
+              <a:t>Load default AES-Key</a:t>
+            </a:r>
+            <a:r>
+              <a:rPr lang="en-US" sz="900" dirty="0" smtClean="0"/>
+              <a:t>, decrypt </a:t>
+            </a:r>
+            <a:r>
+              <a:rPr lang="en-US" sz="900" dirty="0" err="1" smtClean="0"/>
               <a:t>msg</a:t>
             </a:r>
             <a:r>
-              <a:rPr lang="en-US" sz="1000" dirty="0" smtClean="0"/>
-              <a:t>,  get challenge </a:t>
-            </a:r>
-            <a:r>
-              <a:rPr lang="en-US" sz="1000" dirty="0" err="1" smtClean="0"/>
-              <a:t>Str</a:t>
-            </a:r>
-            <a:r>
-              <a:rPr lang="en-US" sz="1000" dirty="0" smtClean="0"/>
-              <a:t> </a:t>
-            </a:r>
-            <a:endParaRPr lang="en-US" sz="1000" dirty="0"/>
-          </a:p>
-          <a:p>
-            <a:r>
-              <a:rPr lang="en-US" sz="1000" dirty="0" smtClean="0"/>
-              <a:t>3 -  </a:t>
-            </a:r>
-            <a:r>
-              <a:rPr lang="en-US" sz="1000" dirty="0" err="1" smtClean="0"/>
+              <a:rPr lang="en-US" sz="900" dirty="0" smtClean="0"/>
+              <a:t>,  </a:t>
+            </a:r>
+            <a:r>
+              <a:rPr lang="en-US" sz="900" dirty="0" smtClean="0"/>
+              <a:t>get session key. </a:t>
+            </a:r>
+            <a:r>
+              <a:rPr lang="en-US" sz="900" dirty="0" smtClean="0"/>
+              <a:t>=&gt; </a:t>
+            </a:r>
+            <a:r>
+              <a:rPr lang="en-US" sz="900" dirty="0" smtClean="0"/>
+              <a:t>Set AES session key, decrypt </a:t>
+            </a:r>
+            <a:r>
+              <a:rPr lang="en-US" sz="900" dirty="0" err="1" smtClean="0"/>
+              <a:t>msg</a:t>
+            </a:r>
+            <a:r>
+              <a:rPr lang="en-US" sz="900" dirty="0" smtClean="0"/>
+              <a:t>  and get challenge str. </a:t>
+            </a:r>
+            <a:endParaRPr lang="en-US" sz="900" dirty="0"/>
+          </a:p>
+          <a:p>
+            <a:pPr marL="228600" indent="-228600">
+              <a:buFont typeface="+mj-lt"/>
+              <a:buAutoNum type="arabicPeriod"/>
+            </a:pPr>
+            <a:r>
+              <a:rPr lang="en-US" sz="900" dirty="0" smtClean="0"/>
+              <a:t>Create first </a:t>
+            </a:r>
+            <a:r>
+              <a:rPr lang="en-US" sz="900" dirty="0" err="1" smtClean="0"/>
               <a:t>randomSeed</a:t>
             </a:r>
             <a:r>
-              <a:rPr lang="en-US" sz="1000" dirty="0" smtClean="0"/>
-              <a:t>(</a:t>
-            </a:r>
-            <a:r>
-              <a:rPr lang="en-US" sz="1000" dirty="0" err="1" smtClean="0"/>
-              <a:t>challengesr</a:t>
-            </a:r>
-            <a:r>
-              <a:rPr lang="en-US" sz="1000" dirty="0" smtClean="0"/>
-              <a:t>/new </a:t>
-            </a:r>
-            <a:r>
-              <a:rPr lang="en-US" sz="1000" dirty="0" err="1" smtClean="0"/>
-              <a:t>Init</a:t>
-            </a:r>
-            <a:r>
-              <a:rPr lang="en-US" sz="1000" dirty="0" smtClean="0"/>
-              <a:t> Seed) =&gt; one random file byte’s Address</a:t>
-            </a:r>
-            <a:endParaRPr lang="en-US" sz="1000" dirty="0"/>
-          </a:p>
-          <a:p>
-            <a:r>
-              <a:rPr lang="en-US" sz="1000" dirty="0" smtClean="0"/>
-              <a:t>4 - Do SWATT calculation for input byte, refresh all the TA parameters </a:t>
-            </a:r>
-          </a:p>
-          <a:p>
-            <a:pPr marL="171450" indent="-171450">
-              <a:buFontTx/>
-              <a:buChar char="-"/>
+              <a:rPr lang="en-US" sz="900" dirty="0" smtClean="0"/>
+              <a:t> and extract challenge string </a:t>
+            </a:r>
+            <a:r>
+              <a:rPr lang="en-US" sz="900" dirty="0" smtClean="0"/>
+              <a:t>=&gt; </a:t>
+            </a:r>
+            <a:r>
+              <a:rPr lang="en-US" sz="900" dirty="0" smtClean="0"/>
+              <a:t>random </a:t>
+            </a:r>
+            <a:r>
+              <a:rPr lang="en-US" sz="900" dirty="0" smtClean="0"/>
+              <a:t>file byte’s </a:t>
+            </a:r>
+            <a:r>
+              <a:rPr lang="en-US" sz="900" dirty="0" smtClean="0"/>
+              <a:t>address + state list.</a:t>
+            </a:r>
+            <a:endParaRPr lang="en-US" sz="900" dirty="0"/>
+          </a:p>
+          <a:p>
+            <a:pPr marL="228600" indent="-228600">
+              <a:buFont typeface="+mj-lt"/>
+              <a:buAutoNum type="arabicPeriod"/>
             </a:pPr>
             <a:r>
-              <a:rPr lang="en-US" sz="1000" dirty="0" smtClean="0"/>
-              <a:t>4.1 Return to step 3</a:t>
-            </a:r>
-          </a:p>
-          <a:p>
-            <a:pPr marL="171450" indent="-171450">
-              <a:buFontTx/>
-              <a:buChar char="-"/>
+              <a:rPr lang="en-US" sz="900" dirty="0" smtClean="0"/>
+              <a:t>Do </a:t>
+            </a:r>
+            <a:r>
+              <a:rPr lang="en-US" sz="900" dirty="0" smtClean="0"/>
+              <a:t>SWATT calculation for input byte, refresh all the </a:t>
+            </a:r>
+            <a:r>
+              <a:rPr lang="en-US" sz="900" dirty="0" smtClean="0"/>
+              <a:t>TA(</a:t>
+            </a:r>
+            <a:r>
+              <a:rPr lang="en-US" sz="900" dirty="0" err="1" smtClean="0"/>
+              <a:t>trustWorld</a:t>
+            </a:r>
+            <a:r>
+              <a:rPr lang="en-US" sz="900" dirty="0" smtClean="0"/>
+              <a:t>) inside parameters. </a:t>
+            </a:r>
+            <a:endParaRPr lang="en-US" sz="900" dirty="0" smtClean="0"/>
+          </a:p>
+          <a:p>
+            <a:pPr marL="228600" indent="-228600">
+              <a:buFont typeface="+mj-lt"/>
+              <a:buAutoNum type="arabicPeriod"/>
             </a:pPr>
             <a:r>
-              <a:rPr lang="en-US" sz="1000" dirty="0" smtClean="0"/>
-              <a:t>4.2 Finished all and get the SWATT </a:t>
-            </a:r>
-            <a:r>
-              <a:rPr lang="en-US" sz="1000" dirty="0" err="1" smtClean="0"/>
+              <a:rPr lang="en-US" sz="900" dirty="0" smtClean="0"/>
+              <a:t>Return </a:t>
+            </a:r>
+            <a:r>
+              <a:rPr lang="en-US" sz="900" dirty="0" smtClean="0"/>
+              <a:t>to step </a:t>
+            </a:r>
+            <a:r>
+              <a:rPr lang="en-US" sz="900" dirty="0" smtClean="0"/>
+              <a:t>3, repeat n times. </a:t>
+            </a:r>
+            <a:endParaRPr lang="en-US" sz="900" dirty="0" smtClean="0"/>
+          </a:p>
+          <a:p>
+            <a:pPr marL="228600" indent="-228600">
+              <a:buFont typeface="+mj-lt"/>
+              <a:buAutoNum type="arabicPeriod"/>
+            </a:pPr>
+            <a:r>
+              <a:rPr lang="en-US" sz="900" dirty="0" smtClean="0"/>
+              <a:t>Finished </a:t>
+            </a:r>
+            <a:r>
+              <a:rPr lang="en-US" sz="900" dirty="0" smtClean="0"/>
+              <a:t>all and get the </a:t>
+            </a:r>
+            <a:r>
+              <a:rPr lang="en-US" sz="900" dirty="0" smtClean="0"/>
+              <a:t>final SWATT </a:t>
+            </a:r>
+            <a:r>
+              <a:rPr lang="en-US" sz="900" dirty="0" err="1" smtClean="0"/>
               <a:t>int</a:t>
             </a:r>
             <a:r>
-              <a:rPr lang="en-US" sz="1000" dirty="0" smtClean="0"/>
+              <a:rPr lang="en-US" sz="900" dirty="0" smtClean="0"/>
               <a:t>/hex val.</a:t>
             </a:r>
           </a:p>
           <a:p>
-            <a:r>
-              <a:rPr lang="en-US" sz="1000" dirty="0" smtClean="0"/>
-              <a:t>5 -  Load AES-Key, encrypt SWATT value </a:t>
-            </a:r>
-          </a:p>
-          <a:p>
-            <a:r>
-              <a:rPr lang="en-US" sz="1000" dirty="0"/>
-              <a:t>7</a:t>
-            </a:r>
-            <a:r>
-              <a:rPr lang="en-US" sz="1000" dirty="0" smtClean="0"/>
-              <a:t> </a:t>
-            </a:r>
-            <a:r>
-              <a:rPr lang="en-US" sz="1000" dirty="0"/>
-              <a:t>- </a:t>
-            </a:r>
-            <a:r>
-              <a:rPr lang="en-US" sz="1000" dirty="0" smtClean="0"/>
-              <a:t>-Load </a:t>
-            </a:r>
-            <a:r>
-              <a:rPr lang="en-US" sz="1000" dirty="0"/>
-              <a:t>AES-Key, decrypt </a:t>
-            </a:r>
-            <a:r>
-              <a:rPr lang="en-US" sz="1000" dirty="0" err="1"/>
+            <a:pPr marL="228600" indent="-228600">
+              <a:buFont typeface="+mj-lt"/>
+              <a:buAutoNum type="arabicPeriod"/>
+            </a:pPr>
+            <a:r>
+              <a:rPr lang="en-US" sz="900" dirty="0" smtClean="0"/>
+              <a:t>Load AES-session Key</a:t>
+            </a:r>
+            <a:r>
+              <a:rPr lang="en-US" sz="900" dirty="0" smtClean="0"/>
+              <a:t>, encrypt SWATT </a:t>
+            </a:r>
+            <a:r>
+              <a:rPr lang="en-US" sz="900" dirty="0" smtClean="0"/>
+              <a:t>value. </a:t>
+            </a:r>
+            <a:endParaRPr lang="en-US" sz="900" dirty="0" smtClean="0"/>
+          </a:p>
+          <a:p>
+            <a:pPr marL="228600" indent="-228600">
+              <a:buFont typeface="+mj-lt"/>
+              <a:buAutoNum type="arabicPeriod"/>
+            </a:pPr>
+            <a:r>
+              <a:rPr lang="en-US" sz="900" dirty="0"/>
+              <a:t>Load AES-session -Key</a:t>
+            </a:r>
+            <a:r>
+              <a:rPr lang="en-US" sz="900" dirty="0"/>
+              <a:t>, decrypt </a:t>
+            </a:r>
+            <a:r>
+              <a:rPr lang="en-US" sz="900" dirty="0" err="1"/>
               <a:t>msg</a:t>
             </a:r>
             <a:r>
-              <a:rPr lang="en-US" sz="1000" dirty="0" smtClean="0"/>
-              <a:t>, get verify result </a:t>
-            </a:r>
-            <a:endParaRPr lang="en-US" sz="1000" dirty="0"/>
+              <a:rPr lang="en-US" sz="900" dirty="0" smtClean="0"/>
+              <a:t>, </a:t>
+            </a:r>
+            <a:r>
+              <a:rPr lang="en-US" sz="900" dirty="0" smtClean="0"/>
+              <a:t>get server </a:t>
+            </a:r>
+            <a:r>
+              <a:rPr lang="en-US" sz="900" dirty="0" smtClean="0"/>
+              <a:t>verify </a:t>
+            </a:r>
+            <a:r>
+              <a:rPr lang="en-US" sz="900" dirty="0" smtClean="0"/>
+              <a:t>result. </a:t>
+            </a:r>
+            <a:endParaRPr lang="en-US" sz="900" dirty="0"/>
           </a:p>
         </p:txBody>
       </p:sp>
@@ -17697,7 +17804,7 @@
         </p:nvCxnSpPr>
         <p:spPr>
           <a:xfrm flipV="1">
-            <a:off x="6336728" y="3070029"/>
+            <a:off x="6253113" y="3411541"/>
             <a:ext cx="2877903" cy="0"/>
           </a:xfrm>
           <a:prstGeom prst="straightConnector1">
@@ -17730,8 +17837,8 @@
         </p:nvCxnSpPr>
         <p:spPr>
           <a:xfrm>
-            <a:off x="7220615" y="2318873"/>
-            <a:ext cx="1" cy="3833320"/>
+            <a:off x="7609448" y="2314594"/>
+            <a:ext cx="0" cy="3837599"/>
           </a:xfrm>
           <a:prstGeom prst="straightConnector1">
             <a:avLst/>
@@ -17797,7 +17904,7 @@
         <p:spPr>
           <a:xfrm>
             <a:off x="5372377" y="1137625"/>
-            <a:ext cx="1848238" cy="249531"/>
+            <a:ext cx="1793635" cy="249531"/>
           </a:xfrm>
           <a:prstGeom prst="rect">
             <a:avLst/>
@@ -17833,15 +17940,27 @@
             </a:r>
             <a:r>
               <a:rPr lang="en-US" sz="800" b="1" dirty="0" smtClean="0"/>
-              <a:t> TCP client  and Load </a:t>
+              <a:t> TCP client  and </a:t>
+            </a:r>
+            <a:r>
+              <a:rPr lang="en-US" sz="800" b="1" dirty="0" smtClean="0"/>
+              <a:t>load </a:t>
+            </a:r>
+            <a:r>
+              <a:rPr lang="en-US" sz="800" b="1" dirty="0" err="1"/>
+              <a:t>c</a:t>
             </a:r>
             <a:r>
               <a:rPr lang="en-US" sz="800" b="1" dirty="0" err="1" smtClean="0"/>
-              <a:t>Config</a:t>
+              <a:t>onfig</a:t>
             </a:r>
             <a:r>
               <a:rPr lang="en-US" sz="800" b="1" dirty="0" smtClean="0"/>
-              <a:t> file</a:t>
+              <a:t> </a:t>
+            </a:r>
+            <a:r>
+              <a:rPr lang="en-US" sz="800" b="1" dirty="0" smtClean="0"/>
+              <a:t>file</a:t>
             </a:r>
             <a:endParaRPr lang="en-SG" sz="800" b="1" dirty="0"/>
           </a:p>
@@ -17889,7 +18008,7 @@
         <p:spPr>
           <a:xfrm>
             <a:off x="10456812" y="1870772"/>
-            <a:ext cx="1545133" cy="405544"/>
+            <a:ext cx="1649156" cy="405544"/>
           </a:xfrm>
           <a:prstGeom prst="rect">
             <a:avLst/>
@@ -17923,15 +18042,19 @@
           <a:p>
             <a:r>
               <a:rPr lang="en-US" sz="800" b="1" dirty="0" smtClean="0"/>
-              <a:t>=&gt; Create random Challenge </a:t>
-            </a:r>
-            <a:r>
-              <a:rPr lang="en-US" sz="800" b="1" dirty="0" err="1" smtClean="0"/>
-              <a:t>str</a:t>
+              <a:t>=&gt; Create random </a:t>
+            </a:r>
+            <a:r>
+              <a:rPr lang="en-US" sz="800" b="1" dirty="0" smtClean="0"/>
+              <a:t>32B session key</a:t>
             </a:r>
             <a:r>
               <a:rPr lang="en-US" sz="800" b="1" dirty="0" smtClean="0"/>
               <a:t> </a:t>
+            </a:r>
+            <a:r>
+              <a:rPr lang="en-US" sz="800" b="1" dirty="0" smtClean="0"/>
+              <a:t/>
             </a:r>
             <a:br>
               <a:rPr lang="en-US" sz="800" b="1" dirty="0" smtClean="0"/>
@@ -17942,15 +18065,11 @@
             </a:r>
             <a:r>
               <a:rPr lang="en-US" sz="800" b="1" dirty="0"/>
-              <a:t>Encrypt Challenge </a:t>
-            </a:r>
-            <a:r>
-              <a:rPr lang="en-US" sz="800" b="1" dirty="0" err="1"/>
-              <a:t>str</a:t>
-            </a:r>
-            <a:r>
-              <a:rPr lang="en-US" sz="800" b="1" dirty="0"/>
-              <a:t> </a:t>
+              <a:t>Encrypt </a:t>
+            </a:r>
+            <a:r>
+              <a:rPr lang="en-US" sz="800" b="1" dirty="0" smtClean="0"/>
+              <a:t>session key  </a:t>
             </a:r>
             <a:endParaRPr lang="en-SG" sz="800" b="1" dirty="0"/>
           </a:p>
@@ -17964,7 +18083,7 @@
         </p:nvSpPr>
         <p:spPr>
           <a:xfrm>
-            <a:off x="10456812" y="2524396"/>
+            <a:off x="10387387" y="2925560"/>
             <a:ext cx="1249413" cy="257500"/>
           </a:xfrm>
           <a:prstGeom prst="rect">
@@ -18108,8 +18227,8 @@
         </p:nvCxnSpPr>
         <p:spPr>
           <a:xfrm flipH="1">
-            <a:off x="1265162" y="4912641"/>
-            <a:ext cx="24489" cy="816687"/>
+            <a:off x="1265163" y="4928030"/>
+            <a:ext cx="0" cy="801298"/>
           </a:xfrm>
           <a:prstGeom prst="straightConnector1">
             <a:avLst/>
@@ -18469,7 +18588,7 @@
         <p:spPr>
           <a:xfrm>
             <a:off x="10654449" y="1637091"/>
-            <a:ext cx="574930" cy="233681"/>
+            <a:ext cx="626941" cy="233681"/>
           </a:xfrm>
           <a:prstGeom prst="bentConnector2">
             <a:avLst/>
@@ -18500,9 +18619,9 @@
           <p:nvPr/>
         </p:nvCxnSpPr>
         <p:spPr>
-          <a:xfrm flipH="1" flipV="1">
-            <a:off x="7263306" y="2220685"/>
-            <a:ext cx="3193507" cy="4491"/>
+          <a:xfrm flipH="1">
+            <a:off x="7661787" y="2220685"/>
+            <a:ext cx="2795028" cy="0"/>
           </a:xfrm>
           <a:prstGeom prst="straightConnector1">
             <a:avLst/>
@@ -18567,7 +18686,7 @@
         </p:nvSpPr>
         <p:spPr>
           <a:xfrm>
-            <a:off x="10456811" y="3070029"/>
+            <a:off x="10413085" y="3356171"/>
             <a:ext cx="1249413" cy="249531"/>
           </a:xfrm>
           <a:prstGeom prst="rect">
@@ -18686,8 +18805,8 @@
         </p:nvSpPr>
         <p:spPr>
           <a:xfrm>
-            <a:off x="5592227" y="2057748"/>
-            <a:ext cx="1675572" cy="249531"/>
+            <a:off x="5498454" y="2049872"/>
+            <a:ext cx="2153050" cy="249531"/>
           </a:xfrm>
           <a:prstGeom prst="rect">
             <a:avLst/>
@@ -18715,7 +18834,11 @@
           <a:p>
             <a:r>
               <a:rPr lang="en-US" sz="800" b="1" dirty="0" smtClean="0"/>
-              <a:t>2.3 Forward </a:t>
+              <a:t>2.3 </a:t>
+            </a:r>
+            <a:r>
+              <a:rPr lang="en-US" sz="800" b="1" dirty="0" smtClean="0"/>
+              <a:t>Forward session key  </a:t>
             </a:r>
             <a:r>
               <a:rPr lang="en-US" sz="800" b="1" dirty="0" err="1" smtClean="0"/>
@@ -18745,7 +18868,7 @@
         </p:nvSpPr>
         <p:spPr>
           <a:xfrm>
-            <a:off x="7030671" y="5639839"/>
+            <a:off x="7447517" y="5590231"/>
             <a:ext cx="244548" cy="253916"/>
           </a:xfrm>
           <a:prstGeom prst="rect">
@@ -19054,7 +19177,7 @@
         </p:nvSpPr>
         <p:spPr>
           <a:xfrm>
-            <a:off x="4715534" y="2954126"/>
+            <a:off x="4744963" y="3195951"/>
             <a:ext cx="1596726" cy="249531"/>
           </a:xfrm>
           <a:prstGeom prst="rect">
@@ -19112,9 +19235,9 @@
           <p:nvPr/>
         </p:nvCxnSpPr>
         <p:spPr>
-          <a:xfrm flipH="1" flipV="1">
-            <a:off x="4853069" y="3235259"/>
-            <a:ext cx="0" cy="2905342"/>
+          <a:xfrm flipV="1">
+            <a:off x="4853069" y="3480936"/>
+            <a:ext cx="0" cy="2659665"/>
           </a:xfrm>
           <a:prstGeom prst="straightConnector1">
             <a:avLst/>
@@ -19176,8 +19299,8 @@
         </p:nvCxnSpPr>
         <p:spPr>
           <a:xfrm>
-            <a:off x="10991850" y="2307279"/>
-            <a:ext cx="0" cy="200311"/>
+            <a:off x="10991850" y="2253743"/>
+            <a:ext cx="0" cy="144000"/>
           </a:xfrm>
           <a:prstGeom prst="straightConnector1">
             <a:avLst/>
@@ -19208,9 +19331,9 @@
           <p:nvPr/>
         </p:nvCxnSpPr>
         <p:spPr>
-          <a:xfrm>
-            <a:off x="10991850" y="2801050"/>
-            <a:ext cx="0" cy="268979"/>
+          <a:xfrm flipH="1">
+            <a:off x="10881237" y="3195951"/>
+            <a:ext cx="3073" cy="141570"/>
           </a:xfrm>
           <a:prstGeom prst="straightConnector1">
             <a:avLst/>
@@ -19242,7 +19365,7 @@
         </p:nvSpPr>
         <p:spPr>
           <a:xfrm>
-            <a:off x="9222435" y="2967257"/>
+            <a:off x="9118750" y="3289422"/>
             <a:ext cx="1157767" cy="244238"/>
           </a:xfrm>
           <a:prstGeom prst="rect">
@@ -19336,8 +19459,8 @@
         </p:nvCxnSpPr>
         <p:spPr>
           <a:xfrm>
-            <a:off x="9901401" y="3251944"/>
-            <a:ext cx="0" cy="600898"/>
+            <a:off x="9866671" y="3475808"/>
+            <a:ext cx="0" cy="377034"/>
           </a:xfrm>
           <a:prstGeom prst="straightConnector1">
             <a:avLst/>
@@ -19369,8 +19492,8 @@
         </p:nvCxnSpPr>
         <p:spPr>
           <a:xfrm>
-            <a:off x="10629813" y="3319560"/>
-            <a:ext cx="0" cy="533282"/>
+            <a:off x="10589342" y="3625418"/>
+            <a:ext cx="0" cy="227424"/>
           </a:xfrm>
           <a:prstGeom prst="straightConnector1">
             <a:avLst/>
@@ -19511,7 +19634,7 @@
         </p:nvSpPr>
         <p:spPr>
           <a:xfrm>
-            <a:off x="4973622" y="3375887"/>
+            <a:off x="5017844" y="3528670"/>
             <a:ext cx="1746270" cy="249531"/>
           </a:xfrm>
           <a:prstGeom prst="rect">
@@ -19561,8 +19684,8 @@
         </p:nvCxnSpPr>
         <p:spPr>
           <a:xfrm rot="10800000">
-            <a:off x="6719893" y="3500654"/>
-            <a:ext cx="2898915" cy="992437"/>
+            <a:off x="6764115" y="3653436"/>
+            <a:ext cx="2854693" cy="839654"/>
           </a:xfrm>
           <a:prstGeom prst="bentConnector3">
             <a:avLst/>
@@ -19594,8 +19717,8 @@
         </p:nvCxnSpPr>
         <p:spPr>
           <a:xfrm flipH="1">
-            <a:off x="5251739" y="3683829"/>
-            <a:ext cx="1" cy="2444612"/>
+            <a:off x="5251740" y="3797869"/>
+            <a:ext cx="0" cy="2330572"/>
           </a:xfrm>
           <a:prstGeom prst="straightConnector1">
             <a:avLst/>
@@ -20080,6 +20203,429 @@
             <a:r>
               <a:rPr lang="en-US" sz="1050" u="sng" dirty="0"/>
               <a:t>8</a:t>
+            </a:r>
+            <a:endParaRPr lang="en-SG" sz="1050" u="sng" dirty="0"/>
+          </a:p>
+        </p:txBody>
+      </p:sp>
+      <p:sp>
+        <p:nvSpPr>
+          <p:cNvPr id="91" name="TextBox 90"/>
+          <p:cNvSpPr txBox="1"/>
+          <p:nvPr/>
+        </p:nvSpPr>
+        <p:spPr>
+          <a:xfrm>
+            <a:off x="9043393" y="2203267"/>
+            <a:ext cx="1303562" cy="215444"/>
+          </a:xfrm>
+          <a:prstGeom prst="rect">
+            <a:avLst/>
+          </a:prstGeom>
+          <a:noFill/>
+        </p:spPr>
+        <p:txBody>
+          <a:bodyPr wrap="square" rtlCol="0">
+            <a:spAutoFit/>
+          </a:bodyPr>
+          <a:lstStyle/>
+          <a:p>
+            <a:r>
+              <a:rPr lang="en-US" sz="800" dirty="0" smtClean="0"/>
+              <a:t>Encrypted AES session key</a:t>
+            </a:r>
+            <a:endParaRPr lang="en-SG" sz="800" dirty="0"/>
+          </a:p>
+        </p:txBody>
+      </p:sp>
+      <p:sp>
+        <p:nvSpPr>
+          <p:cNvPr id="92" name="Rectangle 91"/>
+          <p:cNvSpPr/>
+          <p:nvPr/>
+        </p:nvSpPr>
+        <p:spPr>
+          <a:xfrm>
+            <a:off x="6054369" y="2476026"/>
+            <a:ext cx="1465439" cy="249531"/>
+          </a:xfrm>
+          <a:prstGeom prst="rect">
+            <a:avLst/>
+          </a:prstGeom>
+        </p:spPr>
+        <p:style>
+          <a:lnRef idx="2">
+            <a:schemeClr val="accent1">
+              <a:shade val="50000"/>
+            </a:schemeClr>
+          </a:lnRef>
+          <a:fillRef idx="1">
+            <a:schemeClr val="accent1"/>
+          </a:fillRef>
+          <a:effectRef idx="0">
+            <a:schemeClr val="accent1"/>
+          </a:effectRef>
+          <a:fontRef idx="minor">
+            <a:schemeClr val="lt1"/>
+          </a:fontRef>
+        </p:style>
+        <p:txBody>
+          <a:bodyPr rtlCol="0" anchor="ctr"/>
+          <a:lstStyle/>
+          <a:p>
+            <a:r>
+              <a:rPr lang="en-US" sz="800" b="1" dirty="0" smtClean="0"/>
+              <a:t>2.3 Session key setup confirm</a:t>
+            </a:r>
+            <a:endParaRPr lang="en-SG" sz="800" b="1" dirty="0"/>
+          </a:p>
+        </p:txBody>
+      </p:sp>
+      <p:cxnSp>
+        <p:nvCxnSpPr>
+          <p:cNvPr id="93" name="Straight Arrow Connector 92"/>
+          <p:cNvCxnSpPr/>
+          <p:nvPr/>
+        </p:nvCxnSpPr>
+        <p:spPr>
+          <a:xfrm>
+            <a:off x="7526831" y="2532271"/>
+            <a:ext cx="1808898" cy="94"/>
+          </a:xfrm>
+          <a:prstGeom prst="straightConnector1">
+            <a:avLst/>
+          </a:prstGeom>
+          <a:ln>
+            <a:tailEnd type="triangle"/>
+          </a:ln>
+        </p:spPr>
+        <p:style>
+          <a:lnRef idx="1">
+            <a:schemeClr val="accent1"/>
+          </a:lnRef>
+          <a:fillRef idx="0">
+            <a:schemeClr val="accent1"/>
+          </a:fillRef>
+          <a:effectRef idx="0">
+            <a:schemeClr val="accent1"/>
+          </a:effectRef>
+          <a:fontRef idx="minor">
+            <a:schemeClr val="tx1"/>
+          </a:fontRef>
+        </p:style>
+      </p:cxnSp>
+      <p:sp>
+        <p:nvSpPr>
+          <p:cNvPr id="101" name="Rectangle 100"/>
+          <p:cNvSpPr/>
+          <p:nvPr/>
+        </p:nvSpPr>
+        <p:spPr>
+          <a:xfrm>
+            <a:off x="9354845" y="2454054"/>
+            <a:ext cx="2097278" cy="249215"/>
+          </a:xfrm>
+          <a:prstGeom prst="rect">
+            <a:avLst/>
+          </a:prstGeom>
+        </p:spPr>
+        <p:style>
+          <a:lnRef idx="2">
+            <a:schemeClr val="accent1">
+              <a:shade val="50000"/>
+            </a:schemeClr>
+          </a:lnRef>
+          <a:fillRef idx="1">
+            <a:schemeClr val="accent1"/>
+          </a:fillRef>
+          <a:effectRef idx="0">
+            <a:schemeClr val="accent1"/>
+          </a:effectRef>
+          <a:fontRef idx="minor">
+            <a:schemeClr val="lt1"/>
+          </a:fontRef>
+        </p:style>
+        <p:txBody>
+          <a:bodyPr rtlCol="0" anchor="ctr"/>
+          <a:lstStyle/>
+          <a:p>
+            <a:r>
+              <a:rPr lang="en-US" sz="800" b="1" dirty="0" smtClean="0"/>
+              <a:t>2.3 Create the random </a:t>
+            </a:r>
+            <a:r>
+              <a:rPr lang="en-US" sz="800" b="1" dirty="0" err="1" smtClean="0"/>
+              <a:t>Swatt</a:t>
+            </a:r>
+            <a:r>
+              <a:rPr lang="en-US" sz="800" b="1" dirty="0" smtClean="0"/>
+              <a:t> Challenge string based on the </a:t>
+            </a:r>
+            <a:r>
+              <a:rPr lang="en-US" sz="800" b="1" dirty="0" err="1" smtClean="0"/>
+              <a:t>C_len</a:t>
+            </a:r>
+            <a:r>
+              <a:rPr lang="en-US" sz="800" b="1" dirty="0" smtClean="0"/>
+              <a:t> and encrypted the msg.</a:t>
+            </a:r>
+            <a:endParaRPr lang="en-SG" sz="800" b="1" dirty="0"/>
+          </a:p>
+        </p:txBody>
+      </p:sp>
+      <p:cxnSp>
+        <p:nvCxnSpPr>
+          <p:cNvPr id="102" name="Straight Arrow Connector 101"/>
+          <p:cNvCxnSpPr/>
+          <p:nvPr/>
+        </p:nvCxnSpPr>
+        <p:spPr>
+          <a:xfrm>
+            <a:off x="6747773" y="2310054"/>
+            <a:ext cx="0" cy="144000"/>
+          </a:xfrm>
+          <a:prstGeom prst="straightConnector1">
+            <a:avLst/>
+          </a:prstGeom>
+          <a:ln>
+            <a:tailEnd type="triangle"/>
+          </a:ln>
+        </p:spPr>
+        <p:style>
+          <a:lnRef idx="1">
+            <a:schemeClr val="accent1"/>
+          </a:lnRef>
+          <a:fillRef idx="0">
+            <a:schemeClr val="accent1"/>
+          </a:fillRef>
+          <a:effectRef idx="0">
+            <a:schemeClr val="accent1"/>
+          </a:effectRef>
+          <a:fontRef idx="minor">
+            <a:schemeClr val="tx1"/>
+          </a:fontRef>
+        </p:style>
+      </p:cxnSp>
+      <p:sp>
+        <p:nvSpPr>
+          <p:cNvPr id="103" name="Rectangle 102"/>
+          <p:cNvSpPr/>
+          <p:nvPr/>
+        </p:nvSpPr>
+        <p:spPr>
+          <a:xfrm>
+            <a:off x="9272606" y="5831419"/>
+            <a:ext cx="1465439" cy="249531"/>
+          </a:xfrm>
+          <a:prstGeom prst="rect">
+            <a:avLst/>
+          </a:prstGeom>
+        </p:spPr>
+        <p:style>
+          <a:lnRef idx="2">
+            <a:schemeClr val="accent1">
+              <a:shade val="50000"/>
+            </a:schemeClr>
+          </a:lnRef>
+          <a:fillRef idx="1">
+            <a:schemeClr val="accent1"/>
+          </a:fillRef>
+          <a:effectRef idx="0">
+            <a:schemeClr val="accent1"/>
+          </a:effectRef>
+          <a:fontRef idx="minor">
+            <a:schemeClr val="lt1"/>
+          </a:fontRef>
+        </p:style>
+        <p:txBody>
+          <a:bodyPr rtlCol="0" anchor="ctr"/>
+          <a:lstStyle/>
+          <a:p>
+            <a:r>
+              <a:rPr lang="en-US" sz="800" b="1" dirty="0" smtClean="0"/>
+              <a:t>2.3 Session key setup confirm</a:t>
+            </a:r>
+            <a:endParaRPr lang="en-SG" sz="800" b="1" dirty="0"/>
+          </a:p>
+        </p:txBody>
+      </p:sp>
+      <p:cxnSp>
+        <p:nvCxnSpPr>
+          <p:cNvPr id="104" name="Straight Arrow Connector 103"/>
+          <p:cNvCxnSpPr/>
+          <p:nvPr/>
+        </p:nvCxnSpPr>
+        <p:spPr>
+          <a:xfrm flipH="1">
+            <a:off x="10882456" y="2752449"/>
+            <a:ext cx="3073" cy="141570"/>
+          </a:xfrm>
+          <a:prstGeom prst="straightConnector1">
+            <a:avLst/>
+          </a:prstGeom>
+          <a:ln>
+            <a:tailEnd type="triangle"/>
+          </a:ln>
+        </p:spPr>
+        <p:style>
+          <a:lnRef idx="1">
+            <a:schemeClr val="accent1"/>
+          </a:lnRef>
+          <a:fillRef idx="0">
+            <a:schemeClr val="accent1"/>
+          </a:fillRef>
+          <a:effectRef idx="0">
+            <a:schemeClr val="accent1"/>
+          </a:effectRef>
+          <a:fontRef idx="minor">
+            <a:schemeClr val="tx1"/>
+          </a:fontRef>
+        </p:style>
+      </p:cxnSp>
+      <p:cxnSp>
+        <p:nvCxnSpPr>
+          <p:cNvPr id="26" name="Elbow Connector 25"/>
+          <p:cNvCxnSpPr/>
+          <p:nvPr/>
+        </p:nvCxnSpPr>
+        <p:spPr>
+          <a:xfrm rot="10800000" flipV="1">
+            <a:off x="7388208" y="2701484"/>
+            <a:ext cx="2731767" cy="277612"/>
+          </a:xfrm>
+          <a:prstGeom prst="bentConnector3">
+            <a:avLst>
+              <a:gd name="adj1" fmla="val 8699"/>
+            </a:avLst>
+          </a:prstGeom>
+          <a:ln>
+            <a:tailEnd type="triangle"/>
+          </a:ln>
+        </p:spPr>
+        <p:style>
+          <a:lnRef idx="1">
+            <a:schemeClr val="accent1"/>
+          </a:lnRef>
+          <a:fillRef idx="0">
+            <a:schemeClr val="accent1"/>
+          </a:fillRef>
+          <a:effectRef idx="0">
+            <a:schemeClr val="accent1"/>
+          </a:effectRef>
+          <a:fontRef idx="minor">
+            <a:schemeClr val="tx1"/>
+          </a:fontRef>
+        </p:style>
+      </p:cxnSp>
+      <p:sp>
+        <p:nvSpPr>
+          <p:cNvPr id="107" name="Rectangle 106"/>
+          <p:cNvSpPr/>
+          <p:nvPr/>
+        </p:nvSpPr>
+        <p:spPr>
+          <a:xfrm>
+            <a:off x="5372377" y="2871658"/>
+            <a:ext cx="2014087" cy="249531"/>
+          </a:xfrm>
+          <a:prstGeom prst="rect">
+            <a:avLst/>
+          </a:prstGeom>
+        </p:spPr>
+        <p:style>
+          <a:lnRef idx="2">
+            <a:schemeClr val="accent1">
+              <a:shade val="50000"/>
+            </a:schemeClr>
+          </a:lnRef>
+          <a:fillRef idx="1">
+            <a:schemeClr val="accent1"/>
+          </a:fillRef>
+          <a:effectRef idx="0">
+            <a:schemeClr val="accent1"/>
+          </a:effectRef>
+          <a:fontRef idx="minor">
+            <a:schemeClr val="lt1"/>
+          </a:fontRef>
+        </p:style>
+        <p:txBody>
+          <a:bodyPr rtlCol="0" anchor="ctr"/>
+          <a:lstStyle/>
+          <a:p>
+            <a:r>
+              <a:rPr lang="en-US" sz="800" b="1" dirty="0" smtClean="0"/>
+              <a:t>2.3 Forward challenge string </a:t>
+            </a:r>
+            <a:r>
+              <a:rPr lang="en-US" sz="800" b="1" dirty="0" err="1" smtClean="0"/>
+              <a:t>msg</a:t>
+            </a:r>
+            <a:r>
+              <a:rPr lang="en-US" sz="800" b="1" dirty="0" smtClean="0"/>
+              <a:t> to TA </a:t>
+            </a:r>
+            <a:endParaRPr lang="en-SG" sz="800" b="1" dirty="0"/>
+          </a:p>
+        </p:txBody>
+      </p:sp>
+      <p:cxnSp>
+        <p:nvCxnSpPr>
+          <p:cNvPr id="108" name="Straight Arrow Connector 107"/>
+          <p:cNvCxnSpPr/>
+          <p:nvPr/>
+        </p:nvCxnSpPr>
+        <p:spPr>
+          <a:xfrm>
+            <a:off x="7285703" y="3121189"/>
+            <a:ext cx="0" cy="3028888"/>
+          </a:xfrm>
+          <a:prstGeom prst="straightConnector1">
+            <a:avLst/>
+          </a:prstGeom>
+          <a:ln>
+            <a:tailEnd type="triangle"/>
+          </a:ln>
+        </p:spPr>
+        <p:style>
+          <a:lnRef idx="1">
+            <a:schemeClr val="dk1"/>
+          </a:lnRef>
+          <a:fillRef idx="0">
+            <a:schemeClr val="dk1"/>
+          </a:fillRef>
+          <a:effectRef idx="0">
+            <a:schemeClr val="dk1"/>
+          </a:effectRef>
+          <a:fontRef idx="minor">
+            <a:schemeClr val="tx1"/>
+          </a:fontRef>
+        </p:style>
+      </p:cxnSp>
+      <p:sp>
+        <p:nvSpPr>
+          <p:cNvPr id="114" name="TextBox 113"/>
+          <p:cNvSpPr txBox="1"/>
+          <p:nvPr/>
+        </p:nvSpPr>
+        <p:spPr>
+          <a:xfrm>
+            <a:off x="7075357" y="5625425"/>
+            <a:ext cx="244548" cy="253916"/>
+          </a:xfrm>
+          <a:prstGeom prst="rect">
+            <a:avLst/>
+          </a:prstGeom>
+          <a:noFill/>
+        </p:spPr>
+        <p:txBody>
+          <a:bodyPr wrap="square" rtlCol="0">
+            <a:spAutoFit/>
+          </a:bodyPr>
+          <a:lstStyle/>
+          <a:p>
+            <a:r>
+              <a:rPr lang="en-US" sz="1050" u="sng" dirty="0"/>
+              <a:t>2</a:t>
             </a:r>
             <a:endParaRPr lang="en-SG" sz="1050" u="sng" dirty="0"/>
           </a:p>

</xml_diff>

<commit_message>
Added the progress report.
</commit_message>
<xml_diff>
--- a/doc/firmwaresignWF.pptx
+++ b/doc/firmwaresignWF.pptx
@@ -16895,14 +16895,10 @@
           <a:p>
             <a:r>
               <a:rPr lang="en-US" dirty="0" smtClean="0"/>
-              <a:t>OPTEE trust application [client &lt;-&gt; server </a:t>
-            </a:r>
-            <a:r>
-              <a:rPr lang="en-US" smtClean="0"/>
-              <a:t>] </a:t>
-            </a:r>
-            <a:r>
-              <a:rPr lang="en-US" smtClean="0"/>
+              <a:t>OPTEE trust application [client &lt;-&gt; server ] </a:t>
+            </a:r>
+            <a:r>
+              <a:rPr lang="en-US" dirty="0" smtClean="0"/>
               <a:t>design(10/07/2019</a:t>
             </a:r>
             <a:r>
@@ -17684,7 +17680,7 @@
         <p:spPr>
           <a:xfrm>
             <a:off x="9004187" y="995085"/>
-            <a:ext cx="3101781" cy="4370427"/>
+            <a:ext cx="3149817" cy="4370427"/>
           </a:xfrm>
           <a:prstGeom prst="rect">
             <a:avLst/>
@@ -18461,8 +18457,8 @@
         </p:nvSpPr>
         <p:spPr>
           <a:xfrm>
-            <a:off x="6854242" y="1460992"/>
-            <a:ext cx="2733895" cy="215444"/>
+            <a:off x="6746855" y="1460576"/>
+            <a:ext cx="2964519" cy="215444"/>
           </a:xfrm>
           <a:prstGeom prst="rect">
             <a:avLst/>
@@ -18485,7 +18481,7 @@
             </a:r>
             <a:r>
               <a:rPr lang="en-US" sz="800" dirty="0" smtClean="0"/>
-              <a:t>  </a:t>
+              <a:t>, m, n  </a:t>
             </a:r>
             <a:endParaRPr lang="en-SG" sz="800" dirty="0"/>
           </a:p>
@@ -18757,8 +18753,8 @@
           <a:lstStyle/>
           <a:p>
             <a:r>
-              <a:rPr lang="en-US" sz="800" b="1" dirty="0" err="1" smtClean="0"/>
-              <a:t>DataBase</a:t>
+              <a:rPr lang="en-US" sz="800" b="1" dirty="0" smtClean="0"/>
+              <a:t>Database</a:t>
             </a:r>
             <a:endParaRPr lang="en-SG" sz="800" b="1" dirty="0"/>
           </a:p>
@@ -18773,7 +18769,7 @@
         <p:spPr>
           <a:xfrm flipH="1" flipV="1">
             <a:off x="11377424" y="621315"/>
-            <a:ext cx="4679" cy="1220604"/>
+            <a:ext cx="0" cy="1220604"/>
           </a:xfrm>
           <a:prstGeom prst="straightConnector1">
             <a:avLst/>
@@ -18834,11 +18830,7 @@
           <a:p>
             <a:r>
               <a:rPr lang="en-US" sz="800" b="1" dirty="0" smtClean="0"/>
-              <a:t>2.3 </a:t>
-            </a:r>
-            <a:r>
-              <a:rPr lang="en-US" sz="800" b="1" dirty="0" smtClean="0"/>
-              <a:t>Forward session key  </a:t>
+              <a:t>2.3 Forward session key  </a:t>
             </a:r>
             <a:r>
               <a:rPr lang="en-US" sz="800" b="1" dirty="0" err="1" smtClean="0"/>
@@ -19062,12 +19054,12 @@
               <a:t> seed, swat-seed, state[n], </a:t>
             </a:r>
             <a:r>
-              <a:rPr lang="en-US" sz="800" b="1" dirty="0" err="1" smtClean="0"/>
-              <a:t>filebytes</a:t>
-            </a:r>
-            <a:r>
               <a:rPr lang="en-US" sz="800" b="1" dirty="0" smtClean="0"/>
-              <a:t> to TA </a:t>
+              <a:t>file bytes </a:t>
+            </a:r>
+            <a:r>
+              <a:rPr lang="en-US" sz="800" b="1" dirty="0" smtClean="0"/>
+              <a:t>to TA </a:t>
             </a:r>
             <a:endParaRPr lang="en-SG" sz="800" b="1" dirty="0"/>
           </a:p>
@@ -19828,12 +19820,12 @@
               <a:t>-  Verify </a:t>
             </a:r>
             <a:r>
-              <a:rPr lang="en-US" sz="800" b="1" dirty="0" err="1" smtClean="0"/>
-              <a:t>faile</a:t>
-            </a:r>
-            <a:r>
               <a:rPr lang="en-US" sz="800" b="1" dirty="0" smtClean="0"/>
-              <a:t> =&gt; Remove the checked program. ( or return to step 2 ) </a:t>
+              <a:t>failed </a:t>
+            </a:r>
+            <a:r>
+              <a:rPr lang="en-US" sz="800" b="1" dirty="0" smtClean="0"/>
+              <a:t>=&gt; Remove the checked program. ( or return to step 2 ) </a:t>
             </a:r>
           </a:p>
           <a:p>
@@ -19977,12 +19969,12 @@
               <a:t>8. Check the program running status , System </a:t>
             </a:r>
             <a:r>
-              <a:rPr lang="en-US" sz="800" b="1" dirty="0" err="1" smtClean="0"/>
-              <a:t>liberary</a:t>
-            </a:r>
-            <a:r>
               <a:rPr lang="en-US" sz="800" b="1" dirty="0" smtClean="0"/>
-              <a:t> usage and (memory usage ), encrypt message </a:t>
+              <a:t>library </a:t>
+            </a:r>
+            <a:r>
+              <a:rPr lang="en-US" sz="800" b="1" dirty="0" smtClean="0"/>
+              <a:t>usage and (memory usage ), encrypt message </a:t>
             </a:r>
             <a:endParaRPr lang="en-SG" sz="800" b="1" dirty="0"/>
           </a:p>
@@ -20406,49 +20398,6 @@
           </a:fontRef>
         </p:style>
       </p:cxnSp>
-      <p:sp>
-        <p:nvSpPr>
-          <p:cNvPr id="103" name="Rectangle 102"/>
-          <p:cNvSpPr/>
-          <p:nvPr/>
-        </p:nvSpPr>
-        <p:spPr>
-          <a:xfrm>
-            <a:off x="9272606" y="5831419"/>
-            <a:ext cx="1465439" cy="249531"/>
-          </a:xfrm>
-          <a:prstGeom prst="rect">
-            <a:avLst/>
-          </a:prstGeom>
-        </p:spPr>
-        <p:style>
-          <a:lnRef idx="2">
-            <a:schemeClr val="accent1">
-              <a:shade val="50000"/>
-            </a:schemeClr>
-          </a:lnRef>
-          <a:fillRef idx="1">
-            <a:schemeClr val="accent1"/>
-          </a:fillRef>
-          <a:effectRef idx="0">
-            <a:schemeClr val="accent1"/>
-          </a:effectRef>
-          <a:fontRef idx="minor">
-            <a:schemeClr val="lt1"/>
-          </a:fontRef>
-        </p:style>
-        <p:txBody>
-          <a:bodyPr rtlCol="0" anchor="ctr"/>
-          <a:lstStyle/>
-          <a:p>
-            <a:r>
-              <a:rPr lang="en-US" sz="800" b="1" dirty="0" smtClean="0"/>
-              <a:t>2.3 Session key setup confirm</a:t>
-            </a:r>
-            <a:endParaRPr lang="en-SG" sz="800" b="1" dirty="0"/>
-          </a:p>
-        </p:txBody>
-      </p:sp>
       <p:cxnSp>
         <p:nvCxnSpPr>
           <p:cNvPr id="104" name="Straight Arrow Connector 103"/>

</xml_diff>

<commit_message>
Added the program execution document for the OPtee.
</commit_message>
<xml_diff>
--- a/doc/firmwaresignWF.pptx
+++ b/doc/firmwaresignWF.pptx
@@ -5,7 +5,7 @@
     <p:sldMasterId id="2147483648" r:id="rId1"/>
   </p:sldMasterIdLst>
   <p:notesMasterIdLst>
-    <p:notesMasterId r:id="rId9"/>
+    <p:notesMasterId r:id="rId10"/>
   </p:notesMasterIdLst>
   <p:sldIdLst>
     <p:sldId id="256" r:id="rId2"/>
@@ -15,6 +15,7 @@
     <p:sldId id="260" r:id="rId6"/>
     <p:sldId id="261" r:id="rId7"/>
     <p:sldId id="262" r:id="rId8"/>
+    <p:sldId id="263" r:id="rId9"/>
   </p:sldIdLst>
   <p:sldSz cx="12192000" cy="6858000"/>
   <p:notesSz cx="6858000" cy="9144000"/>
@@ -203,7 +204,7 @@
           <a:p>
             <a:fld id="{32DA1F5A-E23E-4D9B-B8D0-40D8909182CC}" type="datetimeFigureOut">
               <a:rPr lang="en-SG" smtClean="0"/>
-              <a:t>12/7/2019</a:t>
+              <a:t>13/8/2019</a:t>
             </a:fld>
             <a:endParaRPr lang="en-SG"/>
           </a:p>
@@ -686,7 +687,7 @@
           <a:p>
             <a:fld id="{168FC4C3-6B25-48E2-93F9-24A255A41CA9}" type="datetimeFigureOut">
               <a:rPr lang="en-SG" smtClean="0"/>
-              <a:t>12/7/2019</a:t>
+              <a:t>13/8/2019</a:t>
             </a:fld>
             <a:endParaRPr lang="en-SG"/>
           </a:p>
@@ -856,7 +857,7 @@
           <a:p>
             <a:fld id="{168FC4C3-6B25-48E2-93F9-24A255A41CA9}" type="datetimeFigureOut">
               <a:rPr lang="en-SG" smtClean="0"/>
-              <a:t>12/7/2019</a:t>
+              <a:t>13/8/2019</a:t>
             </a:fld>
             <a:endParaRPr lang="en-SG"/>
           </a:p>
@@ -1036,7 +1037,7 @@
           <a:p>
             <a:fld id="{168FC4C3-6B25-48E2-93F9-24A255A41CA9}" type="datetimeFigureOut">
               <a:rPr lang="en-SG" smtClean="0"/>
-              <a:t>12/7/2019</a:t>
+              <a:t>13/8/2019</a:t>
             </a:fld>
             <a:endParaRPr lang="en-SG"/>
           </a:p>
@@ -1206,7 +1207,7 @@
           <a:p>
             <a:fld id="{168FC4C3-6B25-48E2-93F9-24A255A41CA9}" type="datetimeFigureOut">
               <a:rPr lang="en-SG" smtClean="0"/>
-              <a:t>12/7/2019</a:t>
+              <a:t>13/8/2019</a:t>
             </a:fld>
             <a:endParaRPr lang="en-SG"/>
           </a:p>
@@ -1452,7 +1453,7 @@
           <a:p>
             <a:fld id="{168FC4C3-6B25-48E2-93F9-24A255A41CA9}" type="datetimeFigureOut">
               <a:rPr lang="en-SG" smtClean="0"/>
-              <a:t>12/7/2019</a:t>
+              <a:t>13/8/2019</a:t>
             </a:fld>
             <a:endParaRPr lang="en-SG"/>
           </a:p>
@@ -1684,7 +1685,7 @@
           <a:p>
             <a:fld id="{168FC4C3-6B25-48E2-93F9-24A255A41CA9}" type="datetimeFigureOut">
               <a:rPr lang="en-SG" smtClean="0"/>
-              <a:t>12/7/2019</a:t>
+              <a:t>13/8/2019</a:t>
             </a:fld>
             <a:endParaRPr lang="en-SG"/>
           </a:p>
@@ -2051,7 +2052,7 @@
           <a:p>
             <a:fld id="{168FC4C3-6B25-48E2-93F9-24A255A41CA9}" type="datetimeFigureOut">
               <a:rPr lang="en-SG" smtClean="0"/>
-              <a:t>12/7/2019</a:t>
+              <a:t>13/8/2019</a:t>
             </a:fld>
             <a:endParaRPr lang="en-SG"/>
           </a:p>
@@ -2169,7 +2170,7 @@
           <a:p>
             <a:fld id="{168FC4C3-6B25-48E2-93F9-24A255A41CA9}" type="datetimeFigureOut">
               <a:rPr lang="en-SG" smtClean="0"/>
-              <a:t>12/7/2019</a:t>
+              <a:t>13/8/2019</a:t>
             </a:fld>
             <a:endParaRPr lang="en-SG"/>
           </a:p>
@@ -2264,7 +2265,7 @@
           <a:p>
             <a:fld id="{168FC4C3-6B25-48E2-93F9-24A255A41CA9}" type="datetimeFigureOut">
               <a:rPr lang="en-SG" smtClean="0"/>
-              <a:t>12/7/2019</a:t>
+              <a:t>13/8/2019</a:t>
             </a:fld>
             <a:endParaRPr lang="en-SG"/>
           </a:p>
@@ -2541,7 +2542,7 @@
           <a:p>
             <a:fld id="{168FC4C3-6B25-48E2-93F9-24A255A41CA9}" type="datetimeFigureOut">
               <a:rPr lang="en-SG" smtClean="0"/>
-              <a:t>12/7/2019</a:t>
+              <a:t>13/8/2019</a:t>
             </a:fld>
             <a:endParaRPr lang="en-SG"/>
           </a:p>
@@ -2794,7 +2795,7 @@
           <a:p>
             <a:fld id="{168FC4C3-6B25-48E2-93F9-24A255A41CA9}" type="datetimeFigureOut">
               <a:rPr lang="en-SG" smtClean="0"/>
-              <a:t>12/7/2019</a:t>
+              <a:t>13/8/2019</a:t>
             </a:fld>
             <a:endParaRPr lang="en-SG"/>
           </a:p>
@@ -3007,7 +3008,7 @@
           <a:p>
             <a:fld id="{168FC4C3-6B25-48E2-93F9-24A255A41CA9}" type="datetimeFigureOut">
               <a:rPr lang="en-SG" smtClean="0"/>
-              <a:t>12/7/2019</a:t>
+              <a:t>13/8/2019</a:t>
             </a:fld>
             <a:endParaRPr lang="en-SG"/>
           </a:p>
@@ -16895,15 +16896,7 @@
           <a:p>
             <a:r>
               <a:rPr lang="en-US" dirty="0" smtClean="0"/>
-              <a:t>OPTEE trust application [client &lt;-&gt; server ] </a:t>
-            </a:r>
-            <a:r>
-              <a:rPr lang="en-US" dirty="0" smtClean="0"/>
-              <a:t>design(10/07/2019</a:t>
-            </a:r>
-            <a:r>
-              <a:rPr lang="en-US" dirty="0" smtClean="0"/>
-              <a:t>) </a:t>
+              <a:t>OPTEE trust application [client &lt;-&gt; server ] design(10/07/2019) </a:t>
             </a:r>
             <a:endParaRPr lang="en-SG" dirty="0"/>
           </a:p>
@@ -17097,19 +17090,7 @@
             </a:pPr>
             <a:r>
               <a:rPr lang="en-US" sz="900" dirty="0" smtClean="0"/>
-              <a:t>AES </a:t>
-            </a:r>
-            <a:r>
-              <a:rPr lang="en-US" sz="900" dirty="0" smtClean="0"/>
-              <a:t>default </a:t>
-            </a:r>
-            <a:r>
-              <a:rPr lang="en-US" sz="900" dirty="0" smtClean="0"/>
-              <a:t>Key</a:t>
-            </a:r>
-            <a:r>
-              <a:rPr lang="en-US" sz="900" dirty="0" smtClean="0"/>
-              <a:t>, AES IV</a:t>
+              <a:t>AES default Key, AES IV</a:t>
             </a:r>
           </a:p>
           <a:p>
@@ -17172,11 +17153,7 @@
             </a:pPr>
             <a:r>
               <a:rPr lang="en-US" sz="900" dirty="0" smtClean="0"/>
-              <a:t>Accept </a:t>
-            </a:r>
-            <a:r>
-              <a:rPr lang="en-US" sz="900" dirty="0" smtClean="0"/>
-              <a:t>the </a:t>
+              <a:t>Accept the </a:t>
             </a:r>
             <a:r>
               <a:rPr lang="en-US" sz="900" dirty="0" err="1" smtClean="0"/>
@@ -17184,11 +17161,7 @@
             </a:r>
             <a:r>
               <a:rPr lang="en-US" sz="900" dirty="0" smtClean="0"/>
-              <a:t>(normal word) </a:t>
-            </a:r>
-            <a:r>
-              <a:rPr lang="en-US" sz="900" dirty="0" smtClean="0"/>
-              <a:t>connection. </a:t>
+              <a:t>(normal word) connection. </a:t>
             </a:r>
           </a:p>
           <a:p>
@@ -17198,11 +17171,7 @@
             </a:pPr>
             <a:r>
               <a:rPr lang="en-US" sz="900" dirty="0" smtClean="0"/>
-              <a:t>Load default AES-Key</a:t>
-            </a:r>
-            <a:r>
-              <a:rPr lang="en-US" sz="900" dirty="0" smtClean="0"/>
-              <a:t>, decrypt </a:t>
+              <a:t>Load default AES-Key, decrypt </a:t>
             </a:r>
             <a:r>
               <a:rPr lang="en-US" sz="900" dirty="0" err="1" smtClean="0"/>
@@ -17210,19 +17179,7 @@
             </a:r>
             <a:r>
               <a:rPr lang="en-US" sz="900" dirty="0" smtClean="0"/>
-              <a:t>,  </a:t>
-            </a:r>
-            <a:r>
-              <a:rPr lang="en-US" sz="900" dirty="0" smtClean="0"/>
-              <a:t>get session key. </a:t>
-            </a:r>
-            <a:r>
-              <a:rPr lang="en-US" sz="900" dirty="0" smtClean="0"/>
-              <a:t>=&gt; </a:t>
-            </a:r>
-            <a:r>
-              <a:rPr lang="en-US" sz="900" dirty="0" smtClean="0"/>
-              <a:t>Set AES session key, decrypt </a:t>
+              <a:t>,  get session key. =&gt; Set AES session key, decrypt </a:t>
             </a:r>
             <a:r>
               <a:rPr lang="en-US" sz="900" dirty="0" err="1" smtClean="0"/>
@@ -17249,23 +17206,7 @@
             </a:r>
             <a:r>
               <a:rPr lang="en-US" sz="900" dirty="0" smtClean="0"/>
-              <a:t> and extract challenge string </a:t>
-            </a:r>
-            <a:r>
-              <a:rPr lang="en-US" sz="900" dirty="0" smtClean="0"/>
-              <a:t>=&gt; </a:t>
-            </a:r>
-            <a:r>
-              <a:rPr lang="en-US" sz="900" dirty="0" smtClean="0"/>
-              <a:t>random </a:t>
-            </a:r>
-            <a:r>
-              <a:rPr lang="en-US" sz="900" dirty="0" smtClean="0"/>
-              <a:t>file byte’s </a:t>
-            </a:r>
-            <a:r>
-              <a:rPr lang="en-US" sz="900" dirty="0" smtClean="0"/>
-              <a:t>address + state list.</a:t>
+              <a:t> and extract challenge string =&gt; random file byte’s address + state list.</a:t>
             </a:r>
             <a:endParaRPr lang="en-US" sz="900" dirty="0"/>
           </a:p>
@@ -17276,15 +17217,7 @@
             </a:pPr>
             <a:r>
               <a:rPr lang="en-US" sz="900" dirty="0" smtClean="0"/>
-              <a:t>Do </a:t>
-            </a:r>
-            <a:r>
-              <a:rPr lang="en-US" sz="900" dirty="0" smtClean="0"/>
-              <a:t>SWATT calculation for input byte, refresh all the </a:t>
-            </a:r>
-            <a:r>
-              <a:rPr lang="en-US" sz="900" dirty="0" smtClean="0"/>
-              <a:t>TA(</a:t>
+              <a:t>Do SWATT calculation for input byte, refresh all the TA(</a:t>
             </a:r>
             <a:r>
               <a:rPr lang="en-US" sz="900" dirty="0" err="1" smtClean="0"/>
@@ -17294,7 +17227,6 @@
               <a:rPr lang="en-US" sz="900" dirty="0" smtClean="0"/>
               <a:t>) inside parameters. </a:t>
             </a:r>
-            <a:endParaRPr lang="en-US" sz="900" dirty="0" smtClean="0"/>
           </a:p>
           <a:p>
             <a:pPr marL="228600" indent="-228600">
@@ -17303,17 +17235,8 @@
             </a:pPr>
             <a:r>
               <a:rPr lang="en-US" sz="900" dirty="0" smtClean="0"/>
-              <a:t>Return </a:t>
-            </a:r>
-            <a:r>
-              <a:rPr lang="en-US" sz="900" dirty="0" smtClean="0"/>
-              <a:t>to step </a:t>
-            </a:r>
-            <a:r>
-              <a:rPr lang="en-US" sz="900" dirty="0" smtClean="0"/>
-              <a:t>3, repeat n times. </a:t>
-            </a:r>
-            <a:endParaRPr lang="en-US" sz="900" dirty="0" smtClean="0"/>
+              <a:t>Return to step 3, repeat n times. </a:t>
+            </a:r>
           </a:p>
           <a:p>
             <a:pPr marL="228600" indent="-228600">
@@ -17322,15 +17245,7 @@
             </a:pPr>
             <a:r>
               <a:rPr lang="en-US" sz="900" dirty="0" smtClean="0"/>
-              <a:t>Finished </a:t>
-            </a:r>
-            <a:r>
-              <a:rPr lang="en-US" sz="900" dirty="0" smtClean="0"/>
-              <a:t>all and get the </a:t>
-            </a:r>
-            <a:r>
-              <a:rPr lang="en-US" sz="900" dirty="0" smtClean="0"/>
-              <a:t>final SWATT </a:t>
+              <a:t>Finished all and get the final SWATT </a:t>
             </a:r>
             <a:r>
               <a:rPr lang="en-US" sz="900" dirty="0" err="1" smtClean="0"/>
@@ -17348,17 +17263,8 @@
             </a:pPr>
             <a:r>
               <a:rPr lang="en-US" sz="900" dirty="0" smtClean="0"/>
-              <a:t>Load AES-session Key</a:t>
-            </a:r>
-            <a:r>
-              <a:rPr lang="en-US" sz="900" dirty="0" smtClean="0"/>
-              <a:t>, encrypt SWATT </a:t>
-            </a:r>
-            <a:r>
-              <a:rPr lang="en-US" sz="900" dirty="0" smtClean="0"/>
-              <a:t>value. </a:t>
-            </a:r>
-            <a:endParaRPr lang="en-US" sz="900" dirty="0" smtClean="0"/>
+              <a:t>Load AES-session Key, encrypt SWATT value. </a:t>
+            </a:r>
           </a:p>
           <a:p>
             <a:pPr marL="228600" indent="-228600">
@@ -17367,11 +17273,7 @@
             </a:pPr>
             <a:r>
               <a:rPr lang="en-US" sz="900" dirty="0"/>
-              <a:t>Load AES-session -Key</a:t>
-            </a:r>
-            <a:r>
-              <a:rPr lang="en-US" sz="900" dirty="0"/>
-              <a:t>, decrypt </a:t>
+              <a:t>Load AES-session -Key, decrypt </a:t>
             </a:r>
             <a:r>
               <a:rPr lang="en-US" sz="900" dirty="0" err="1"/>
@@ -17379,19 +17281,7 @@
             </a:r>
             <a:r>
               <a:rPr lang="en-US" sz="900" dirty="0" smtClean="0"/>
-              <a:t>, </a:t>
-            </a:r>
-            <a:r>
-              <a:rPr lang="en-US" sz="900" dirty="0" smtClean="0"/>
-              <a:t>get server </a:t>
-            </a:r>
-            <a:r>
-              <a:rPr lang="en-US" sz="900" dirty="0" smtClean="0"/>
-              <a:t>verify </a:t>
-            </a:r>
-            <a:r>
-              <a:rPr lang="en-US" sz="900" dirty="0" smtClean="0"/>
-              <a:t>result. </a:t>
+              <a:t>, get server verify result. </a:t>
             </a:r>
             <a:endParaRPr lang="en-US" sz="900" dirty="0"/>
           </a:p>
@@ -17936,11 +17826,7 @@
             </a:r>
             <a:r>
               <a:rPr lang="en-US" sz="800" b="1" dirty="0" smtClean="0"/>
-              <a:t> TCP client  and </a:t>
-            </a:r>
-            <a:r>
-              <a:rPr lang="en-US" sz="800" b="1" dirty="0" smtClean="0"/>
-              <a:t>load </a:t>
+              <a:t> TCP client  and load </a:t>
             </a:r>
             <a:r>
               <a:rPr lang="en-US" sz="800" b="1" dirty="0" err="1"/>
@@ -17952,11 +17838,7 @@
             </a:r>
             <a:r>
               <a:rPr lang="en-US" sz="800" b="1" dirty="0" smtClean="0"/>
-              <a:t> </a:t>
-            </a:r>
-            <a:r>
-              <a:rPr lang="en-US" sz="800" b="1" dirty="0" smtClean="0"/>
-              <a:t>file</a:t>
+              <a:t> file</a:t>
             </a:r>
             <a:endParaRPr lang="en-SG" sz="800" b="1" dirty="0"/>
           </a:p>
@@ -18038,19 +17920,7 @@
           <a:p>
             <a:r>
               <a:rPr lang="en-US" sz="800" b="1" dirty="0" smtClean="0"/>
-              <a:t>=&gt; Create random </a:t>
-            </a:r>
-            <a:r>
-              <a:rPr lang="en-US" sz="800" b="1" dirty="0" smtClean="0"/>
-              <a:t>32B session key</a:t>
-            </a:r>
-            <a:r>
-              <a:rPr lang="en-US" sz="800" b="1" dirty="0" smtClean="0"/>
-              <a:t> </a:t>
-            </a:r>
-            <a:r>
-              <a:rPr lang="en-US" sz="800" b="1" dirty="0" smtClean="0"/>
-              <a:t/>
+              <a:t>=&gt; Create random 32B session key </a:t>
             </a:r>
             <a:br>
               <a:rPr lang="en-US" sz="800" b="1" dirty="0" smtClean="0"/>
@@ -19051,15 +18921,7 @@
             </a:r>
             <a:r>
               <a:rPr lang="en-US" sz="800" b="1" dirty="0" smtClean="0"/>
-              <a:t> seed, swat-seed, state[n], </a:t>
-            </a:r>
-            <a:r>
-              <a:rPr lang="en-US" sz="800" b="1" dirty="0" smtClean="0"/>
-              <a:t>file bytes </a:t>
-            </a:r>
-            <a:r>
-              <a:rPr lang="en-US" sz="800" b="1" dirty="0" smtClean="0"/>
-              <a:t>to TA </a:t>
+              <a:t> seed, swat-seed, state[n], file bytes to TA </a:t>
             </a:r>
             <a:endParaRPr lang="en-SG" sz="800" b="1" dirty="0"/>
           </a:p>
@@ -19817,15 +19679,7 @@
           <a:p>
             <a:r>
               <a:rPr lang="en-US" sz="800" b="1" dirty="0" smtClean="0"/>
-              <a:t>-  Verify </a:t>
-            </a:r>
-            <a:r>
-              <a:rPr lang="en-US" sz="800" b="1" dirty="0" smtClean="0"/>
-              <a:t>failed </a:t>
-            </a:r>
-            <a:r>
-              <a:rPr lang="en-US" sz="800" b="1" dirty="0" smtClean="0"/>
-              <a:t>=&gt; Remove the checked program. ( or return to step 2 ) </a:t>
+              <a:t>-  Verify failed =&gt; Remove the checked program. ( or return to step 2 ) </a:t>
             </a:r>
           </a:p>
           <a:p>
@@ -19966,15 +19820,7 @@
           <a:p>
             <a:r>
               <a:rPr lang="en-US" sz="800" b="1" dirty="0" smtClean="0"/>
-              <a:t>8. Check the program running status , System </a:t>
-            </a:r>
-            <a:r>
-              <a:rPr lang="en-US" sz="800" b="1" dirty="0" smtClean="0"/>
-              <a:t>library </a:t>
-            </a:r>
-            <a:r>
-              <a:rPr lang="en-US" sz="800" b="1" dirty="0" smtClean="0"/>
-              <a:t>usage and (memory usage ), encrypt message </a:t>
+              <a:t>8. Check the program running status , System library usage and (memory usage ), encrypt message </a:t>
             </a:r>
             <a:endParaRPr lang="en-SG" sz="800" b="1" dirty="0"/>
           </a:p>
@@ -21210,6 +21056,36 @@
     <p:extLst>
       <p:ext uri="{BB962C8B-B14F-4D97-AF65-F5344CB8AC3E}">
         <p14:creationId xmlns:p14="http://schemas.microsoft.com/office/powerpoint/2010/main" val="18561099"/>
+      </p:ext>
+    </p:extLst>
+  </p:cSld>
+  <p:clrMapOvr>
+    <a:masterClrMapping/>
+  </p:clrMapOvr>
+</p:sld>
+</file>
+
+<file path=ppt/slides/slide8.xml><?xml version="1.0" encoding="utf-8"?>
+<p:sld xmlns:a="http://schemas.openxmlformats.org/drawingml/2006/main" xmlns:r="http://schemas.openxmlformats.org/officeDocument/2006/relationships" xmlns:p="http://schemas.openxmlformats.org/presentationml/2006/main">
+  <p:cSld>
+    <p:spTree>
+      <p:nvGrpSpPr>
+        <p:cNvPr id="1" name=""/>
+        <p:cNvGrpSpPr/>
+        <p:nvPr/>
+      </p:nvGrpSpPr>
+      <p:grpSpPr>
+        <a:xfrm>
+          <a:off x="0" y="0"/>
+          <a:ext cx="0" cy="0"/>
+          <a:chOff x="0" y="0"/>
+          <a:chExt cx="0" cy="0"/>
+        </a:xfrm>
+      </p:grpSpPr>
+    </p:spTree>
+    <p:extLst>
+      <p:ext uri="{BB962C8B-B14F-4D97-AF65-F5344CB8AC3E}">
+        <p14:creationId xmlns:p14="http://schemas.microsoft.com/office/powerpoint/2010/main" val="2947900542"/>
       </p:ext>
     </p:extLst>
   </p:cSld>

</xml_diff>

<commit_message>
Added the init document.
</commit_message>
<xml_diff>
--- a/doc/firmwaresignWF.pptx
+++ b/doc/firmwaresignWF.pptx
@@ -5,7 +5,7 @@
     <p:sldMasterId id="2147483648" r:id="rId1"/>
   </p:sldMasterIdLst>
   <p:notesMasterIdLst>
-    <p:notesMasterId r:id="rId10"/>
+    <p:notesMasterId r:id="rId11"/>
   </p:notesMasterIdLst>
   <p:sldIdLst>
     <p:sldId id="256" r:id="rId2"/>
@@ -16,6 +16,7 @@
     <p:sldId id="261" r:id="rId7"/>
     <p:sldId id="262" r:id="rId8"/>
     <p:sldId id="263" r:id="rId9"/>
+    <p:sldId id="264" r:id="rId10"/>
   </p:sldIdLst>
   <p:sldSz cx="12192000" cy="6858000"/>
   <p:notesSz cx="6858000" cy="9144000"/>
@@ -17829,16 +17830,12 @@
               <a:t> TCP client  and load </a:t>
             </a:r>
             <a:r>
-              <a:rPr lang="en-US" sz="800" b="1" dirty="0" err="1"/>
+              <a:rPr lang="en-US" sz="800" b="1" dirty="0"/>
               <a:t>c</a:t>
             </a:r>
             <a:r>
-              <a:rPr lang="en-US" sz="800" b="1" dirty="0" err="1" smtClean="0"/>
-              <a:t>onfig</a:t>
-            </a:r>
-            <a:r>
               <a:rPr lang="en-US" sz="800" b="1" dirty="0" smtClean="0"/>
-              <a:t> file</a:t>
+              <a:t>onfig file</a:t>
             </a:r>
             <a:endParaRPr lang="en-SG" sz="800" b="1" dirty="0"/>
           </a:p>
@@ -21082,10 +21079,1379 @@
           <a:chExt cx="0" cy="0"/>
         </a:xfrm>
       </p:grpSpPr>
+      <p:sp>
+        <p:nvSpPr>
+          <p:cNvPr id="3" name="Rectangle 2"/>
+          <p:cNvSpPr/>
+          <p:nvPr/>
+        </p:nvSpPr>
+        <p:spPr>
+          <a:xfrm>
+            <a:off x="676979" y="614235"/>
+            <a:ext cx="1719098" cy="2359971"/>
+          </a:xfrm>
+          <a:prstGeom prst="rect">
+            <a:avLst/>
+          </a:prstGeom>
+          <a:ln>
+            <a:prstDash val="sysDot"/>
+          </a:ln>
+        </p:spPr>
+        <p:style>
+          <a:lnRef idx="2">
+            <a:schemeClr val="dk1"/>
+          </a:lnRef>
+          <a:fillRef idx="1">
+            <a:schemeClr val="lt1"/>
+          </a:fillRef>
+          <a:effectRef idx="0">
+            <a:schemeClr val="dk1"/>
+          </a:effectRef>
+          <a:fontRef idx="minor">
+            <a:schemeClr val="dk1"/>
+          </a:fontRef>
+        </p:style>
+        <p:txBody>
+          <a:bodyPr rtlCol="0" anchor="ctr"/>
+          <a:lstStyle/>
+          <a:p>
+            <a:pPr algn="ctr"/>
+            <a:endParaRPr lang="en-SG"/>
+          </a:p>
+        </p:txBody>
+      </p:sp>
+      <p:sp>
+        <p:nvSpPr>
+          <p:cNvPr id="4" name="Rectangle 3"/>
+          <p:cNvSpPr/>
+          <p:nvPr/>
+        </p:nvSpPr>
+        <p:spPr>
+          <a:xfrm>
+            <a:off x="2786513" y="614235"/>
+            <a:ext cx="2608446" cy="2359971"/>
+          </a:xfrm>
+          <a:prstGeom prst="rect">
+            <a:avLst/>
+          </a:prstGeom>
+          <a:ln>
+            <a:prstDash val="sysDot"/>
+          </a:ln>
+        </p:spPr>
+        <p:style>
+          <a:lnRef idx="2">
+            <a:schemeClr val="dk1"/>
+          </a:lnRef>
+          <a:fillRef idx="1">
+            <a:schemeClr val="lt1"/>
+          </a:fillRef>
+          <a:effectRef idx="0">
+            <a:schemeClr val="dk1"/>
+          </a:effectRef>
+          <a:fontRef idx="minor">
+            <a:schemeClr val="dk1"/>
+          </a:fontRef>
+        </p:style>
+        <p:txBody>
+          <a:bodyPr rtlCol="0" anchor="ctr"/>
+          <a:lstStyle/>
+          <a:p>
+            <a:pPr algn="ctr"/>
+            <a:endParaRPr lang="en-SG"/>
+          </a:p>
+        </p:txBody>
+      </p:sp>
+      <p:cxnSp>
+        <p:nvCxnSpPr>
+          <p:cNvPr id="7" name="Straight Connector 6"/>
+          <p:cNvCxnSpPr/>
+          <p:nvPr/>
+        </p:nvCxnSpPr>
+        <p:spPr>
+          <a:xfrm>
+            <a:off x="6001351" y="105878"/>
+            <a:ext cx="0" cy="3570973"/>
+          </a:xfrm>
+          <a:prstGeom prst="line">
+            <a:avLst/>
+          </a:prstGeom>
+          <a:ln>
+            <a:prstDash val="dash"/>
+          </a:ln>
+        </p:spPr>
+        <p:style>
+          <a:lnRef idx="1">
+            <a:schemeClr val="dk1"/>
+          </a:lnRef>
+          <a:fillRef idx="0">
+            <a:schemeClr val="dk1"/>
+          </a:fillRef>
+          <a:effectRef idx="0">
+            <a:schemeClr val="dk1"/>
+          </a:effectRef>
+          <a:fontRef idx="minor">
+            <a:schemeClr val="tx1"/>
+          </a:fontRef>
+        </p:style>
+      </p:cxnSp>
+      <p:sp>
+        <p:nvSpPr>
+          <p:cNvPr id="9" name="TextBox 8"/>
+          <p:cNvSpPr txBox="1"/>
+          <p:nvPr/>
+        </p:nvSpPr>
+        <p:spPr>
+          <a:xfrm>
+            <a:off x="5529713" y="3107745"/>
+            <a:ext cx="1087655" cy="369332"/>
+          </a:xfrm>
+          <a:prstGeom prst="rect">
+            <a:avLst/>
+          </a:prstGeom>
+          <a:noFill/>
+        </p:spPr>
+        <p:txBody>
+          <a:bodyPr wrap="square" rtlCol="0">
+            <a:spAutoFit/>
+          </a:bodyPr>
+          <a:lstStyle/>
+          <a:p>
+            <a:r>
+              <a:rPr lang="en-US" dirty="0" smtClean="0"/>
+              <a:t>Internet</a:t>
+            </a:r>
+            <a:endParaRPr lang="en-SG" dirty="0"/>
+          </a:p>
+        </p:txBody>
+      </p:sp>
+      <p:sp>
+        <p:nvSpPr>
+          <p:cNvPr id="10" name="Rectangle 9"/>
+          <p:cNvSpPr/>
+          <p:nvPr/>
+        </p:nvSpPr>
+        <p:spPr>
+          <a:xfrm>
+            <a:off x="6651057" y="614235"/>
+            <a:ext cx="2128787" cy="2359971"/>
+          </a:xfrm>
+          <a:prstGeom prst="rect">
+            <a:avLst/>
+          </a:prstGeom>
+          <a:ln>
+            <a:prstDash val="sysDot"/>
+          </a:ln>
+        </p:spPr>
+        <p:style>
+          <a:lnRef idx="2">
+            <a:schemeClr val="dk1"/>
+          </a:lnRef>
+          <a:fillRef idx="1">
+            <a:schemeClr val="lt1"/>
+          </a:fillRef>
+          <a:effectRef idx="0">
+            <a:schemeClr val="dk1"/>
+          </a:effectRef>
+          <a:fontRef idx="minor">
+            <a:schemeClr val="dk1"/>
+          </a:fontRef>
+        </p:style>
+        <p:txBody>
+          <a:bodyPr rtlCol="0" anchor="ctr"/>
+          <a:lstStyle/>
+          <a:p>
+            <a:pPr algn="ctr"/>
+            <a:endParaRPr lang="en-SG"/>
+          </a:p>
+        </p:txBody>
+      </p:sp>
+      <p:sp>
+        <p:nvSpPr>
+          <p:cNvPr id="11" name="TextBox 10"/>
+          <p:cNvSpPr txBox="1"/>
+          <p:nvPr/>
+        </p:nvSpPr>
+        <p:spPr>
+          <a:xfrm>
+            <a:off x="676979" y="705934"/>
+            <a:ext cx="1809552" cy="307777"/>
+          </a:xfrm>
+          <a:prstGeom prst="rect">
+            <a:avLst/>
+          </a:prstGeom>
+          <a:noFill/>
+        </p:spPr>
+        <p:txBody>
+          <a:bodyPr wrap="square" rtlCol="0">
+            <a:spAutoFit/>
+          </a:bodyPr>
+          <a:lstStyle/>
+          <a:p>
+            <a:r>
+              <a:rPr lang="en-US" sz="1400" dirty="0" smtClean="0"/>
+              <a:t>Trust App [Trust Zone]</a:t>
+            </a:r>
+            <a:endParaRPr lang="en-SG" sz="1400" dirty="0"/>
+          </a:p>
+        </p:txBody>
+      </p:sp>
+      <p:sp>
+        <p:nvSpPr>
+          <p:cNvPr id="12" name="TextBox 11"/>
+          <p:cNvSpPr txBox="1"/>
+          <p:nvPr/>
+        </p:nvSpPr>
+        <p:spPr>
+          <a:xfrm>
+            <a:off x="2824403" y="703840"/>
+            <a:ext cx="2157663" cy="307777"/>
+          </a:xfrm>
+          <a:prstGeom prst="rect">
+            <a:avLst/>
+          </a:prstGeom>
+          <a:noFill/>
+        </p:spPr>
+        <p:txBody>
+          <a:bodyPr wrap="square" rtlCol="0">
+            <a:spAutoFit/>
+          </a:bodyPr>
+          <a:lstStyle/>
+          <a:p>
+            <a:r>
+              <a:rPr lang="en-US" sz="1400" dirty="0" smtClean="0"/>
+              <a:t>Trust Client [Normal world]</a:t>
+            </a:r>
+            <a:endParaRPr lang="en-SG" sz="1400" dirty="0"/>
+          </a:p>
+        </p:txBody>
+      </p:sp>
+      <p:sp>
+        <p:nvSpPr>
+          <p:cNvPr id="13" name="TextBox 12"/>
+          <p:cNvSpPr txBox="1"/>
+          <p:nvPr/>
+        </p:nvSpPr>
+        <p:spPr>
+          <a:xfrm>
+            <a:off x="6651057" y="703840"/>
+            <a:ext cx="2157663" cy="307777"/>
+          </a:xfrm>
+          <a:prstGeom prst="rect">
+            <a:avLst/>
+          </a:prstGeom>
+          <a:noFill/>
+        </p:spPr>
+        <p:txBody>
+          <a:bodyPr wrap="square" rtlCol="0">
+            <a:spAutoFit/>
+          </a:bodyPr>
+          <a:lstStyle/>
+          <a:p>
+            <a:r>
+              <a:rPr lang="en-US" sz="1400" dirty="0" smtClean="0"/>
+              <a:t>Server program</a:t>
+            </a:r>
+            <a:endParaRPr lang="en-SG" sz="1400" dirty="0"/>
+          </a:p>
+        </p:txBody>
+      </p:sp>
+      <p:sp>
+        <p:nvSpPr>
+          <p:cNvPr id="2" name="Rectangle 1"/>
+          <p:cNvSpPr/>
+          <p:nvPr/>
+        </p:nvSpPr>
+        <p:spPr>
+          <a:xfrm>
+            <a:off x="3320716" y="1140593"/>
+            <a:ext cx="1183907" cy="225781"/>
+          </a:xfrm>
+          <a:prstGeom prst="rect">
+            <a:avLst/>
+          </a:prstGeom>
+          <a:ln w="19050"/>
+        </p:spPr>
+        <p:style>
+          <a:lnRef idx="2">
+            <a:schemeClr val="dk1"/>
+          </a:lnRef>
+          <a:fillRef idx="1">
+            <a:schemeClr val="lt1"/>
+          </a:fillRef>
+          <a:effectRef idx="0">
+            <a:schemeClr val="dk1"/>
+          </a:effectRef>
+          <a:fontRef idx="minor">
+            <a:schemeClr val="dk1"/>
+          </a:fontRef>
+        </p:style>
+        <p:txBody>
+          <a:bodyPr rtlCol="0" anchor="ctr"/>
+          <a:lstStyle/>
+          <a:p>
+            <a:pPr algn="ctr"/>
+            <a:r>
+              <a:rPr lang="en-US" sz="1100" dirty="0" smtClean="0"/>
+              <a:t>0. Load config file </a:t>
+            </a:r>
+            <a:endParaRPr lang="en-SG" sz="1100" dirty="0"/>
+          </a:p>
+        </p:txBody>
+      </p:sp>
+      <p:cxnSp>
+        <p:nvCxnSpPr>
+          <p:cNvPr id="16" name="Straight Arrow Connector 15"/>
+          <p:cNvCxnSpPr/>
+          <p:nvPr/>
+        </p:nvCxnSpPr>
+        <p:spPr>
+          <a:xfrm flipH="1">
+            <a:off x="4504623" y="1251284"/>
+            <a:ext cx="259882" cy="0"/>
+          </a:xfrm>
+          <a:prstGeom prst="straightConnector1">
+            <a:avLst/>
+          </a:prstGeom>
+          <a:ln>
+            <a:tailEnd type="triangle"/>
+          </a:ln>
+        </p:spPr>
+        <p:style>
+          <a:lnRef idx="1">
+            <a:schemeClr val="dk1"/>
+          </a:lnRef>
+          <a:fillRef idx="0">
+            <a:schemeClr val="dk1"/>
+          </a:fillRef>
+          <a:effectRef idx="0">
+            <a:schemeClr val="dk1"/>
+          </a:effectRef>
+          <a:fontRef idx="minor">
+            <a:schemeClr val="tx1"/>
+          </a:fontRef>
+        </p:style>
+      </p:cxnSp>
+      <p:pic>
+        <p:nvPicPr>
+          <p:cNvPr id="19" name="Picture 18"/>
+          <p:cNvPicPr>
+            <a:picLocks noChangeAspect="1"/>
+          </p:cNvPicPr>
+          <p:nvPr/>
+        </p:nvPicPr>
+        <p:blipFill rotWithShape="1">
+          <a:blip r:embed="rId2" cstate="print">
+            <a:extLst>
+              <a:ext uri="{28A0092B-C50C-407E-A947-70E740481C1C}">
+                <a14:useLocalDpi xmlns:a14="http://schemas.microsoft.com/office/drawing/2010/main" val="0"/>
+              </a:ext>
+            </a:extLst>
+          </a:blip>
+          <a:srcRect l="10749" r="11155"/>
+          <a:stretch/>
+        </p:blipFill>
+        <p:spPr>
+          <a:xfrm>
+            <a:off x="4755045" y="1068288"/>
+            <a:ext cx="293405" cy="365992"/>
+          </a:xfrm>
+          <a:prstGeom prst="rect">
+            <a:avLst/>
+          </a:prstGeom>
+        </p:spPr>
+      </p:pic>
+      <p:cxnSp>
+        <p:nvCxnSpPr>
+          <p:cNvPr id="21" name="Straight Arrow Connector 20"/>
+          <p:cNvCxnSpPr/>
+          <p:nvPr/>
+        </p:nvCxnSpPr>
+        <p:spPr>
+          <a:xfrm>
+            <a:off x="3455471" y="1665173"/>
+            <a:ext cx="0" cy="298266"/>
+          </a:xfrm>
+          <a:prstGeom prst="straightConnector1">
+            <a:avLst/>
+          </a:prstGeom>
+          <a:ln>
+            <a:tailEnd type="triangle"/>
+          </a:ln>
+        </p:spPr>
+        <p:style>
+          <a:lnRef idx="1">
+            <a:schemeClr val="dk1"/>
+          </a:lnRef>
+          <a:fillRef idx="0">
+            <a:schemeClr val="dk1"/>
+          </a:fillRef>
+          <a:effectRef idx="0">
+            <a:schemeClr val="dk1"/>
+          </a:effectRef>
+          <a:fontRef idx="minor">
+            <a:schemeClr val="tx1"/>
+          </a:fontRef>
+        </p:style>
+      </p:cxnSp>
+      <p:cxnSp>
+        <p:nvCxnSpPr>
+          <p:cNvPr id="22" name="Straight Arrow Connector 21"/>
+          <p:cNvCxnSpPr/>
+          <p:nvPr/>
+        </p:nvCxnSpPr>
+        <p:spPr>
+          <a:xfrm>
+            <a:off x="4697130" y="1665173"/>
+            <a:ext cx="0" cy="298800"/>
+          </a:xfrm>
+          <a:prstGeom prst="straightConnector1">
+            <a:avLst/>
+          </a:prstGeom>
+          <a:ln>
+            <a:tailEnd type="triangle"/>
+          </a:ln>
+        </p:spPr>
+        <p:style>
+          <a:lnRef idx="1">
+            <a:schemeClr val="dk1"/>
+          </a:lnRef>
+          <a:fillRef idx="0">
+            <a:schemeClr val="dk1"/>
+          </a:fillRef>
+          <a:effectRef idx="0">
+            <a:schemeClr val="dk1"/>
+          </a:effectRef>
+          <a:fontRef idx="minor">
+            <a:schemeClr val="tx1"/>
+          </a:fontRef>
+        </p:style>
+      </p:cxnSp>
+      <p:cxnSp>
+        <p:nvCxnSpPr>
+          <p:cNvPr id="26" name="Straight Connector 25"/>
+          <p:cNvCxnSpPr/>
+          <p:nvPr/>
+        </p:nvCxnSpPr>
+        <p:spPr>
+          <a:xfrm>
+            <a:off x="3455471" y="1665173"/>
+            <a:ext cx="1241659" cy="0"/>
+          </a:xfrm>
+          <a:prstGeom prst="line">
+            <a:avLst/>
+          </a:prstGeom>
+        </p:spPr>
+        <p:style>
+          <a:lnRef idx="1">
+            <a:schemeClr val="dk1"/>
+          </a:lnRef>
+          <a:fillRef idx="0">
+            <a:schemeClr val="dk1"/>
+          </a:fillRef>
+          <a:effectRef idx="0">
+            <a:schemeClr val="dk1"/>
+          </a:effectRef>
+          <a:fontRef idx="minor">
+            <a:schemeClr val="tx1"/>
+          </a:fontRef>
+        </p:style>
+      </p:cxnSp>
+      <p:cxnSp>
+        <p:nvCxnSpPr>
+          <p:cNvPr id="28" name="Straight Arrow Connector 27"/>
+          <p:cNvCxnSpPr/>
+          <p:nvPr/>
+        </p:nvCxnSpPr>
+        <p:spPr>
+          <a:xfrm>
+            <a:off x="3983856" y="1366903"/>
+            <a:ext cx="0" cy="298266"/>
+          </a:xfrm>
+          <a:prstGeom prst="straightConnector1">
+            <a:avLst/>
+          </a:prstGeom>
+          <a:ln>
+            <a:tailEnd type="triangle"/>
+          </a:ln>
+        </p:spPr>
+        <p:style>
+          <a:lnRef idx="1">
+            <a:schemeClr val="dk1"/>
+          </a:lnRef>
+          <a:fillRef idx="0">
+            <a:schemeClr val="dk1"/>
+          </a:fillRef>
+          <a:effectRef idx="0">
+            <a:schemeClr val="dk1"/>
+          </a:effectRef>
+          <a:fontRef idx="minor">
+            <a:schemeClr val="tx1"/>
+          </a:fontRef>
+        </p:style>
+      </p:cxnSp>
+      <p:sp>
+        <p:nvSpPr>
+          <p:cNvPr id="29" name="Rectangle 28"/>
+          <p:cNvSpPr/>
+          <p:nvPr/>
+        </p:nvSpPr>
+        <p:spPr>
+          <a:xfrm>
+            <a:off x="2863708" y="1991808"/>
+            <a:ext cx="1135592" cy="234394"/>
+          </a:xfrm>
+          <a:prstGeom prst="rect">
+            <a:avLst/>
+          </a:prstGeom>
+          <a:ln w="19050"/>
+        </p:spPr>
+        <p:style>
+          <a:lnRef idx="2">
+            <a:schemeClr val="dk1"/>
+          </a:lnRef>
+          <a:fillRef idx="1">
+            <a:schemeClr val="lt1"/>
+          </a:fillRef>
+          <a:effectRef idx="0">
+            <a:schemeClr val="dk1"/>
+          </a:effectRef>
+          <a:fontRef idx="minor">
+            <a:schemeClr val="dk1"/>
+          </a:fontRef>
+        </p:style>
+        <p:txBody>
+          <a:bodyPr rtlCol="0" anchor="ctr"/>
+          <a:lstStyle/>
+          <a:p>
+            <a:pPr algn="ctr"/>
+            <a:r>
+              <a:rPr lang="en-US" sz="1100" dirty="0" smtClean="0"/>
+              <a:t>1. OPTEE session</a:t>
+            </a:r>
+            <a:endParaRPr lang="en-SG" sz="1100" dirty="0"/>
+          </a:p>
+        </p:txBody>
+      </p:sp>
+      <p:sp>
+        <p:nvSpPr>
+          <p:cNvPr id="30" name="Rectangle 29"/>
+          <p:cNvSpPr/>
+          <p:nvPr/>
+        </p:nvSpPr>
+        <p:spPr>
+          <a:xfrm>
+            <a:off x="4168340" y="2000009"/>
+            <a:ext cx="1057579" cy="226193"/>
+          </a:xfrm>
+          <a:prstGeom prst="rect">
+            <a:avLst/>
+          </a:prstGeom>
+          <a:ln w="19050"/>
+        </p:spPr>
+        <p:style>
+          <a:lnRef idx="2">
+            <a:schemeClr val="dk1"/>
+          </a:lnRef>
+          <a:fillRef idx="1">
+            <a:schemeClr val="lt1"/>
+          </a:fillRef>
+          <a:effectRef idx="0">
+            <a:schemeClr val="dk1"/>
+          </a:effectRef>
+          <a:fontRef idx="minor">
+            <a:schemeClr val="dk1"/>
+          </a:fontRef>
+        </p:style>
+        <p:txBody>
+          <a:bodyPr rtlCol="0" anchor="ctr"/>
+          <a:lstStyle/>
+          <a:p>
+            <a:pPr algn="ctr"/>
+            <a:r>
+              <a:rPr lang="en-US" sz="1100" dirty="0" smtClean="0"/>
+              <a:t>TCP Client</a:t>
+            </a:r>
+            <a:endParaRPr lang="en-SG" sz="1100" dirty="0"/>
+          </a:p>
+        </p:txBody>
+      </p:sp>
+      <p:cxnSp>
+        <p:nvCxnSpPr>
+          <p:cNvPr id="31" name="Straight Arrow Connector 30"/>
+          <p:cNvCxnSpPr/>
+          <p:nvPr/>
+        </p:nvCxnSpPr>
+        <p:spPr>
+          <a:xfrm>
+            <a:off x="3455471" y="2226202"/>
+            <a:ext cx="0" cy="299434"/>
+          </a:xfrm>
+          <a:prstGeom prst="straightConnector1">
+            <a:avLst/>
+          </a:prstGeom>
+          <a:ln>
+            <a:tailEnd type="triangle"/>
+          </a:ln>
+        </p:spPr>
+        <p:style>
+          <a:lnRef idx="1">
+            <a:schemeClr val="dk1"/>
+          </a:lnRef>
+          <a:fillRef idx="0">
+            <a:schemeClr val="dk1"/>
+          </a:fillRef>
+          <a:effectRef idx="0">
+            <a:schemeClr val="dk1"/>
+          </a:effectRef>
+          <a:fontRef idx="minor">
+            <a:schemeClr val="tx1"/>
+          </a:fontRef>
+        </p:style>
+      </p:cxnSp>
+      <p:sp>
+        <p:nvSpPr>
+          <p:cNvPr id="34" name="Rectangle 33"/>
+          <p:cNvSpPr/>
+          <p:nvPr/>
+        </p:nvSpPr>
+        <p:spPr>
+          <a:xfrm>
+            <a:off x="2853279" y="2535978"/>
+            <a:ext cx="1448410" cy="234394"/>
+          </a:xfrm>
+          <a:prstGeom prst="rect">
+            <a:avLst/>
+          </a:prstGeom>
+          <a:ln w="19050"/>
+        </p:spPr>
+        <p:style>
+          <a:lnRef idx="2">
+            <a:schemeClr val="dk1"/>
+          </a:lnRef>
+          <a:fillRef idx="1">
+            <a:schemeClr val="lt1"/>
+          </a:fillRef>
+          <a:effectRef idx="0">
+            <a:schemeClr val="dk1"/>
+          </a:effectRef>
+          <a:fontRef idx="minor">
+            <a:schemeClr val="dk1"/>
+          </a:fontRef>
+        </p:style>
+        <p:txBody>
+          <a:bodyPr rtlCol="0" anchor="ctr"/>
+          <a:lstStyle/>
+          <a:p>
+            <a:pPr algn="ctr"/>
+            <a:r>
+              <a:rPr lang="en-US" sz="1100" dirty="0"/>
+              <a:t>Tee-supplicant service</a:t>
+            </a:r>
+            <a:endParaRPr lang="en-SG" sz="1100" dirty="0"/>
+          </a:p>
+        </p:txBody>
+      </p:sp>
+      <p:sp>
+        <p:nvSpPr>
+          <p:cNvPr id="35" name="Rectangle 34"/>
+          <p:cNvSpPr/>
+          <p:nvPr/>
+        </p:nvSpPr>
+        <p:spPr>
+          <a:xfrm>
+            <a:off x="2863514" y="3175214"/>
+            <a:ext cx="1168468" cy="234394"/>
+          </a:xfrm>
+          <a:prstGeom prst="rect">
+            <a:avLst/>
+          </a:prstGeom>
+          <a:ln w="19050"/>
+        </p:spPr>
+        <p:style>
+          <a:lnRef idx="2">
+            <a:schemeClr val="dk1"/>
+          </a:lnRef>
+          <a:fillRef idx="1">
+            <a:schemeClr val="lt1"/>
+          </a:fillRef>
+          <a:effectRef idx="0">
+            <a:schemeClr val="dk1"/>
+          </a:effectRef>
+          <a:fontRef idx="minor">
+            <a:schemeClr val="dk1"/>
+          </a:fontRef>
+        </p:style>
+        <p:txBody>
+          <a:bodyPr rtlCol="0" anchor="ctr"/>
+          <a:lstStyle/>
+          <a:p>
+            <a:pPr algn="ctr"/>
+            <a:r>
+              <a:rPr lang="en-US" sz="1100" dirty="0"/>
+              <a:t>OPTEE driver</a:t>
+            </a:r>
+            <a:endParaRPr lang="en-SG" sz="1100" dirty="0"/>
+          </a:p>
+        </p:txBody>
+      </p:sp>
+      <p:cxnSp>
+        <p:nvCxnSpPr>
+          <p:cNvPr id="36" name="Straight Arrow Connector 35"/>
+          <p:cNvCxnSpPr/>
+          <p:nvPr/>
+        </p:nvCxnSpPr>
+        <p:spPr>
+          <a:xfrm>
+            <a:off x="3455471" y="2770372"/>
+            <a:ext cx="0" cy="404842"/>
+          </a:xfrm>
+          <a:prstGeom prst="straightConnector1">
+            <a:avLst/>
+          </a:prstGeom>
+          <a:ln>
+            <a:tailEnd type="triangle"/>
+          </a:ln>
+        </p:spPr>
+        <p:style>
+          <a:lnRef idx="1">
+            <a:schemeClr val="dk1"/>
+          </a:lnRef>
+          <a:fillRef idx="0">
+            <a:schemeClr val="dk1"/>
+          </a:fillRef>
+          <a:effectRef idx="0">
+            <a:schemeClr val="dk1"/>
+          </a:effectRef>
+          <a:fontRef idx="minor">
+            <a:schemeClr val="tx1"/>
+          </a:fontRef>
+        </p:style>
+      </p:cxnSp>
+      <p:sp>
+        <p:nvSpPr>
+          <p:cNvPr id="38" name="Rectangle 37"/>
+          <p:cNvSpPr/>
+          <p:nvPr/>
+        </p:nvSpPr>
+        <p:spPr>
+          <a:xfrm>
+            <a:off x="818147" y="1068288"/>
+            <a:ext cx="1424539" cy="365992"/>
+          </a:xfrm>
+          <a:prstGeom prst="rect">
+            <a:avLst/>
+          </a:prstGeom>
+          <a:ln w="19050"/>
+        </p:spPr>
+        <p:style>
+          <a:lnRef idx="2">
+            <a:schemeClr val="dk1"/>
+          </a:lnRef>
+          <a:fillRef idx="1">
+            <a:schemeClr val="lt1"/>
+          </a:fillRef>
+          <a:effectRef idx="0">
+            <a:schemeClr val="dk1"/>
+          </a:effectRef>
+          <a:fontRef idx="minor">
+            <a:schemeClr val="dk1"/>
+          </a:fontRef>
+        </p:style>
+        <p:txBody>
+          <a:bodyPr rtlCol="0" anchor="ctr"/>
+          <a:lstStyle/>
+          <a:p>
+            <a:pPr algn="ctr"/>
+            <a:r>
+              <a:rPr lang="en-US" sz="1100" dirty="0" smtClean="0"/>
+              <a:t>2. Accept OPTEE connection</a:t>
+            </a:r>
+            <a:endParaRPr lang="en-SG" sz="1100" dirty="0"/>
+          </a:p>
+        </p:txBody>
+      </p:sp>
+      <p:cxnSp>
+        <p:nvCxnSpPr>
+          <p:cNvPr id="40" name="Elbow Connector 39"/>
+          <p:cNvCxnSpPr>
+            <a:stCxn id="35" idx="1"/>
+            <a:endCxn id="38" idx="3"/>
+          </p:cNvCxnSpPr>
+          <p:nvPr/>
+        </p:nvCxnSpPr>
+        <p:spPr>
+          <a:xfrm rot="10800000">
+            <a:off x="2242686" y="1251285"/>
+            <a:ext cx="620828" cy="2041127"/>
+          </a:xfrm>
+          <a:prstGeom prst="bentConnector3">
+            <a:avLst/>
+          </a:prstGeom>
+          <a:ln>
+            <a:tailEnd type="triangle"/>
+          </a:ln>
+        </p:spPr>
+        <p:style>
+          <a:lnRef idx="1">
+            <a:schemeClr val="dk1"/>
+          </a:lnRef>
+          <a:fillRef idx="0">
+            <a:schemeClr val="dk1"/>
+          </a:fillRef>
+          <a:effectRef idx="0">
+            <a:schemeClr val="dk1"/>
+          </a:effectRef>
+          <a:fontRef idx="minor">
+            <a:schemeClr val="tx1"/>
+          </a:fontRef>
+        </p:style>
+      </p:cxnSp>
+      <p:sp>
+        <p:nvSpPr>
+          <p:cNvPr id="44" name="TextBox 43"/>
+          <p:cNvSpPr txBox="1"/>
+          <p:nvPr/>
+        </p:nvSpPr>
+        <p:spPr>
+          <a:xfrm>
+            <a:off x="652109" y="111143"/>
+            <a:ext cx="1590576" cy="369332"/>
+          </a:xfrm>
+          <a:prstGeom prst="rect">
+            <a:avLst/>
+          </a:prstGeom>
+          <a:noFill/>
+        </p:spPr>
+        <p:txBody>
+          <a:bodyPr wrap="square" rtlCol="0">
+            <a:spAutoFit/>
+          </a:bodyPr>
+          <a:lstStyle/>
+          <a:p>
+            <a:r>
+              <a:rPr lang="en-US" dirty="0" smtClean="0"/>
+              <a:t>Raspberry PI </a:t>
+            </a:r>
+            <a:endParaRPr lang="en-SG" dirty="0"/>
+          </a:p>
+        </p:txBody>
+      </p:sp>
+      <p:sp>
+        <p:nvSpPr>
+          <p:cNvPr id="45" name="TextBox 44"/>
+          <p:cNvSpPr txBox="1"/>
+          <p:nvPr/>
+        </p:nvSpPr>
+        <p:spPr>
+          <a:xfrm>
+            <a:off x="6380144" y="105878"/>
+            <a:ext cx="1878331" cy="369332"/>
+          </a:xfrm>
+          <a:prstGeom prst="rect">
+            <a:avLst/>
+          </a:prstGeom>
+          <a:noFill/>
+        </p:spPr>
+        <p:txBody>
+          <a:bodyPr wrap="square" rtlCol="0">
+            <a:spAutoFit/>
+          </a:bodyPr>
+          <a:lstStyle/>
+          <a:p>
+            <a:r>
+              <a:rPr lang="en-US" dirty="0" smtClean="0"/>
+              <a:t>Server Computer</a:t>
+            </a:r>
+            <a:endParaRPr lang="en-SG" dirty="0"/>
+          </a:p>
+        </p:txBody>
+      </p:sp>
+      <p:sp>
+        <p:nvSpPr>
+          <p:cNvPr id="48" name="Rectangle 47"/>
+          <p:cNvSpPr/>
+          <p:nvPr/>
+        </p:nvSpPr>
+        <p:spPr>
+          <a:xfrm>
+            <a:off x="6786814" y="1068288"/>
+            <a:ext cx="1866298" cy="298086"/>
+          </a:xfrm>
+          <a:prstGeom prst="rect">
+            <a:avLst/>
+          </a:prstGeom>
+          <a:ln w="19050"/>
+        </p:spPr>
+        <p:style>
+          <a:lnRef idx="2">
+            <a:schemeClr val="dk1"/>
+          </a:lnRef>
+          <a:fillRef idx="1">
+            <a:schemeClr val="lt1"/>
+          </a:fillRef>
+          <a:effectRef idx="0">
+            <a:schemeClr val="dk1"/>
+          </a:effectRef>
+          <a:fontRef idx="minor">
+            <a:schemeClr val="dk1"/>
+          </a:fontRef>
+        </p:style>
+        <p:txBody>
+          <a:bodyPr rtlCol="0" anchor="ctr"/>
+          <a:lstStyle/>
+          <a:p>
+            <a:pPr algn="ctr"/>
+            <a:r>
+              <a:rPr lang="en-US" sz="1100" dirty="0" smtClean="0"/>
+              <a:t>3. Accept the TCP connection  </a:t>
+            </a:r>
+            <a:endParaRPr lang="en-SG" sz="1100" dirty="0"/>
+          </a:p>
+        </p:txBody>
+      </p:sp>
+      <p:cxnSp>
+        <p:nvCxnSpPr>
+          <p:cNvPr id="50" name="Elbow Connector 49"/>
+          <p:cNvCxnSpPr>
+            <a:stCxn id="30" idx="3"/>
+            <a:endCxn id="48" idx="1"/>
+          </p:cNvCxnSpPr>
+          <p:nvPr/>
+        </p:nvCxnSpPr>
+        <p:spPr>
+          <a:xfrm flipV="1">
+            <a:off x="5225919" y="1217331"/>
+            <a:ext cx="1560895" cy="895775"/>
+          </a:xfrm>
+          <a:prstGeom prst="bentConnector3">
+            <a:avLst>
+              <a:gd name="adj1" fmla="val 37050"/>
+            </a:avLst>
+          </a:prstGeom>
+          <a:ln>
+            <a:tailEnd type="triangle"/>
+          </a:ln>
+        </p:spPr>
+        <p:style>
+          <a:lnRef idx="1">
+            <a:schemeClr val="dk1"/>
+          </a:lnRef>
+          <a:fillRef idx="0">
+            <a:schemeClr val="dk1"/>
+          </a:fillRef>
+          <a:effectRef idx="0">
+            <a:schemeClr val="dk1"/>
+          </a:effectRef>
+          <a:fontRef idx="minor">
+            <a:schemeClr val="tx1"/>
+          </a:fontRef>
+        </p:style>
+      </p:cxnSp>
     </p:spTree>
     <p:extLst>
       <p:ext uri="{BB962C8B-B14F-4D97-AF65-F5344CB8AC3E}">
         <p14:creationId xmlns:p14="http://schemas.microsoft.com/office/powerpoint/2010/main" val="2947900542"/>
+      </p:ext>
+    </p:extLst>
+  </p:cSld>
+  <p:clrMapOvr>
+    <a:masterClrMapping/>
+  </p:clrMapOvr>
+</p:sld>
+</file>
+
+<file path=ppt/slides/slide9.xml><?xml version="1.0" encoding="utf-8"?>
+<p:sld xmlns:a="http://schemas.openxmlformats.org/drawingml/2006/main" xmlns:r="http://schemas.openxmlformats.org/officeDocument/2006/relationships" xmlns:p="http://schemas.openxmlformats.org/presentationml/2006/main">
+  <p:cSld>
+    <p:spTree>
+      <p:nvGrpSpPr>
+        <p:cNvPr id="1" name=""/>
+        <p:cNvGrpSpPr/>
+        <p:nvPr/>
+      </p:nvGrpSpPr>
+      <p:grpSpPr>
+        <a:xfrm>
+          <a:off x="0" y="0"/>
+          <a:ext cx="0" cy="0"/>
+          <a:chOff x="0" y="0"/>
+          <a:chExt cx="0" cy="0"/>
+        </a:xfrm>
+      </p:grpSpPr>
+      <p:sp>
+        <p:nvSpPr>
+          <p:cNvPr id="4" name="Rectangle 3"/>
+          <p:cNvSpPr/>
+          <p:nvPr/>
+        </p:nvSpPr>
+        <p:spPr>
+          <a:xfrm>
+            <a:off x="1649132" y="797110"/>
+            <a:ext cx="1719098" cy="2359971"/>
+          </a:xfrm>
+          <a:prstGeom prst="rect">
+            <a:avLst/>
+          </a:prstGeom>
+          <a:ln>
+            <a:prstDash val="sysDot"/>
+          </a:ln>
+        </p:spPr>
+        <p:style>
+          <a:lnRef idx="2">
+            <a:schemeClr val="dk1"/>
+          </a:lnRef>
+          <a:fillRef idx="1">
+            <a:schemeClr val="lt1"/>
+          </a:fillRef>
+          <a:effectRef idx="0">
+            <a:schemeClr val="dk1"/>
+          </a:effectRef>
+          <a:fontRef idx="minor">
+            <a:schemeClr val="dk1"/>
+          </a:fontRef>
+        </p:style>
+        <p:txBody>
+          <a:bodyPr rtlCol="0" anchor="ctr"/>
+          <a:lstStyle/>
+          <a:p>
+            <a:pPr algn="ctr"/>
+            <a:endParaRPr lang="en-SG"/>
+          </a:p>
+        </p:txBody>
+      </p:sp>
+      <p:sp>
+        <p:nvSpPr>
+          <p:cNvPr id="5" name="Rectangle 4"/>
+          <p:cNvSpPr/>
+          <p:nvPr/>
+        </p:nvSpPr>
+        <p:spPr>
+          <a:xfrm>
+            <a:off x="3758666" y="797110"/>
+            <a:ext cx="2608446" cy="2359971"/>
+          </a:xfrm>
+          <a:prstGeom prst="rect">
+            <a:avLst/>
+          </a:prstGeom>
+          <a:ln>
+            <a:prstDash val="sysDot"/>
+          </a:ln>
+        </p:spPr>
+        <p:style>
+          <a:lnRef idx="2">
+            <a:schemeClr val="dk1"/>
+          </a:lnRef>
+          <a:fillRef idx="1">
+            <a:schemeClr val="lt1"/>
+          </a:fillRef>
+          <a:effectRef idx="0">
+            <a:schemeClr val="dk1"/>
+          </a:effectRef>
+          <a:fontRef idx="minor">
+            <a:schemeClr val="dk1"/>
+          </a:fontRef>
+        </p:style>
+        <p:txBody>
+          <a:bodyPr rtlCol="0" anchor="ctr"/>
+          <a:lstStyle/>
+          <a:p>
+            <a:pPr algn="ctr"/>
+            <a:endParaRPr lang="en-SG"/>
+          </a:p>
+        </p:txBody>
+      </p:sp>
+      <p:cxnSp>
+        <p:nvCxnSpPr>
+          <p:cNvPr id="6" name="Straight Connector 5"/>
+          <p:cNvCxnSpPr/>
+          <p:nvPr/>
+        </p:nvCxnSpPr>
+        <p:spPr>
+          <a:xfrm>
+            <a:off x="6973504" y="288753"/>
+            <a:ext cx="0" cy="3570973"/>
+          </a:xfrm>
+          <a:prstGeom prst="line">
+            <a:avLst/>
+          </a:prstGeom>
+          <a:ln>
+            <a:prstDash val="dash"/>
+          </a:ln>
+        </p:spPr>
+        <p:style>
+          <a:lnRef idx="1">
+            <a:schemeClr val="dk1"/>
+          </a:lnRef>
+          <a:fillRef idx="0">
+            <a:schemeClr val="dk1"/>
+          </a:fillRef>
+          <a:effectRef idx="0">
+            <a:schemeClr val="dk1"/>
+          </a:effectRef>
+          <a:fontRef idx="minor">
+            <a:schemeClr val="tx1"/>
+          </a:fontRef>
+        </p:style>
+      </p:cxnSp>
+      <p:sp>
+        <p:nvSpPr>
+          <p:cNvPr id="7" name="TextBox 6"/>
+          <p:cNvSpPr txBox="1"/>
+          <p:nvPr/>
+        </p:nvSpPr>
+        <p:spPr>
+          <a:xfrm>
+            <a:off x="6501866" y="3290620"/>
+            <a:ext cx="1087655" cy="369332"/>
+          </a:xfrm>
+          <a:prstGeom prst="rect">
+            <a:avLst/>
+          </a:prstGeom>
+          <a:noFill/>
+        </p:spPr>
+        <p:txBody>
+          <a:bodyPr wrap="square" rtlCol="0">
+            <a:spAutoFit/>
+          </a:bodyPr>
+          <a:lstStyle/>
+          <a:p>
+            <a:r>
+              <a:rPr lang="en-US" dirty="0" smtClean="0"/>
+              <a:t>Internet</a:t>
+            </a:r>
+            <a:endParaRPr lang="en-SG" dirty="0"/>
+          </a:p>
+        </p:txBody>
+      </p:sp>
+      <p:sp>
+        <p:nvSpPr>
+          <p:cNvPr id="8" name="Rectangle 7"/>
+          <p:cNvSpPr/>
+          <p:nvPr/>
+        </p:nvSpPr>
+        <p:spPr>
+          <a:xfrm>
+            <a:off x="7623210" y="797110"/>
+            <a:ext cx="2128787" cy="2359971"/>
+          </a:xfrm>
+          <a:prstGeom prst="rect">
+            <a:avLst/>
+          </a:prstGeom>
+          <a:ln>
+            <a:prstDash val="sysDot"/>
+          </a:ln>
+        </p:spPr>
+        <p:style>
+          <a:lnRef idx="2">
+            <a:schemeClr val="dk1"/>
+          </a:lnRef>
+          <a:fillRef idx="1">
+            <a:schemeClr val="lt1"/>
+          </a:fillRef>
+          <a:effectRef idx="0">
+            <a:schemeClr val="dk1"/>
+          </a:effectRef>
+          <a:fontRef idx="minor">
+            <a:schemeClr val="dk1"/>
+          </a:fontRef>
+        </p:style>
+        <p:txBody>
+          <a:bodyPr rtlCol="0" anchor="ctr"/>
+          <a:lstStyle/>
+          <a:p>
+            <a:pPr algn="ctr"/>
+            <a:endParaRPr lang="en-SG"/>
+          </a:p>
+        </p:txBody>
+      </p:sp>
+      <p:sp>
+        <p:nvSpPr>
+          <p:cNvPr id="9" name="TextBox 8"/>
+          <p:cNvSpPr txBox="1"/>
+          <p:nvPr/>
+        </p:nvSpPr>
+        <p:spPr>
+          <a:xfrm>
+            <a:off x="1649132" y="888809"/>
+            <a:ext cx="1809552" cy="307777"/>
+          </a:xfrm>
+          <a:prstGeom prst="rect">
+            <a:avLst/>
+          </a:prstGeom>
+          <a:noFill/>
+        </p:spPr>
+        <p:txBody>
+          <a:bodyPr wrap="square" rtlCol="0">
+            <a:spAutoFit/>
+          </a:bodyPr>
+          <a:lstStyle/>
+          <a:p>
+            <a:r>
+              <a:rPr lang="en-US" sz="1400" dirty="0" smtClean="0"/>
+              <a:t>Trust App [Trust Zone]</a:t>
+            </a:r>
+            <a:endParaRPr lang="en-SG" sz="1400" dirty="0"/>
+          </a:p>
+        </p:txBody>
+      </p:sp>
+      <p:sp>
+        <p:nvSpPr>
+          <p:cNvPr id="10" name="TextBox 9"/>
+          <p:cNvSpPr txBox="1"/>
+          <p:nvPr/>
+        </p:nvSpPr>
+        <p:spPr>
+          <a:xfrm>
+            <a:off x="3796556" y="886715"/>
+            <a:ext cx="2157663" cy="307777"/>
+          </a:xfrm>
+          <a:prstGeom prst="rect">
+            <a:avLst/>
+          </a:prstGeom>
+          <a:noFill/>
+        </p:spPr>
+        <p:txBody>
+          <a:bodyPr wrap="square" rtlCol="0">
+            <a:spAutoFit/>
+          </a:bodyPr>
+          <a:lstStyle/>
+          <a:p>
+            <a:r>
+              <a:rPr lang="en-US" sz="1400" dirty="0" smtClean="0"/>
+              <a:t>Trust Client [Normal world]</a:t>
+            </a:r>
+            <a:endParaRPr lang="en-SG" sz="1400" dirty="0"/>
+          </a:p>
+        </p:txBody>
+      </p:sp>
+      <p:sp>
+        <p:nvSpPr>
+          <p:cNvPr id="11" name="TextBox 10"/>
+          <p:cNvSpPr txBox="1"/>
+          <p:nvPr/>
+        </p:nvSpPr>
+        <p:spPr>
+          <a:xfrm>
+            <a:off x="7623210" y="886715"/>
+            <a:ext cx="2157663" cy="307777"/>
+          </a:xfrm>
+          <a:prstGeom prst="rect">
+            <a:avLst/>
+          </a:prstGeom>
+          <a:noFill/>
+        </p:spPr>
+        <p:txBody>
+          <a:bodyPr wrap="square" rtlCol="0">
+            <a:spAutoFit/>
+          </a:bodyPr>
+          <a:lstStyle/>
+          <a:p>
+            <a:r>
+              <a:rPr lang="en-US" sz="1400" dirty="0" smtClean="0"/>
+              <a:t>Server program</a:t>
+            </a:r>
+            <a:endParaRPr lang="en-SG" sz="1400" dirty="0"/>
+          </a:p>
+        </p:txBody>
+      </p:sp>
+      <p:sp>
+        <p:nvSpPr>
+          <p:cNvPr id="27" name="TextBox 26"/>
+          <p:cNvSpPr txBox="1"/>
+          <p:nvPr/>
+        </p:nvSpPr>
+        <p:spPr>
+          <a:xfrm>
+            <a:off x="1624262" y="294018"/>
+            <a:ext cx="1590576" cy="369332"/>
+          </a:xfrm>
+          <a:prstGeom prst="rect">
+            <a:avLst/>
+          </a:prstGeom>
+          <a:noFill/>
+        </p:spPr>
+        <p:txBody>
+          <a:bodyPr wrap="square" rtlCol="0">
+            <a:spAutoFit/>
+          </a:bodyPr>
+          <a:lstStyle/>
+          <a:p>
+            <a:r>
+              <a:rPr lang="en-US" dirty="0" smtClean="0"/>
+              <a:t>Raspberry PI </a:t>
+            </a:r>
+            <a:endParaRPr lang="en-SG" dirty="0"/>
+          </a:p>
+        </p:txBody>
+      </p:sp>
+      <p:sp>
+        <p:nvSpPr>
+          <p:cNvPr id="28" name="TextBox 27"/>
+          <p:cNvSpPr txBox="1"/>
+          <p:nvPr/>
+        </p:nvSpPr>
+        <p:spPr>
+          <a:xfrm>
+            <a:off x="7352297" y="288753"/>
+            <a:ext cx="1878331" cy="369332"/>
+          </a:xfrm>
+          <a:prstGeom prst="rect">
+            <a:avLst/>
+          </a:prstGeom>
+          <a:noFill/>
+        </p:spPr>
+        <p:txBody>
+          <a:bodyPr wrap="square" rtlCol="0">
+            <a:spAutoFit/>
+          </a:bodyPr>
+          <a:lstStyle/>
+          <a:p>
+            <a:r>
+              <a:rPr lang="en-US" dirty="0" smtClean="0"/>
+              <a:t>Server Computer</a:t>
+            </a:r>
+            <a:endParaRPr lang="en-SG" dirty="0"/>
+          </a:p>
+        </p:txBody>
+      </p:sp>
+      <p:cxnSp>
+        <p:nvCxnSpPr>
+          <p:cNvPr id="30" name="Elbow Connector 29"/>
+          <p:cNvCxnSpPr/>
+          <p:nvPr/>
+        </p:nvCxnSpPr>
+        <p:spPr>
+          <a:xfrm flipV="1">
+            <a:off x="6198072" y="1400206"/>
+            <a:ext cx="1560895" cy="895775"/>
+          </a:xfrm>
+          <a:prstGeom prst="bentConnector3">
+            <a:avLst>
+              <a:gd name="adj1" fmla="val 37050"/>
+            </a:avLst>
+          </a:prstGeom>
+          <a:ln>
+            <a:tailEnd type="triangle"/>
+          </a:ln>
+        </p:spPr>
+        <p:style>
+          <a:lnRef idx="1">
+            <a:schemeClr val="dk1"/>
+          </a:lnRef>
+          <a:fillRef idx="0">
+            <a:schemeClr val="dk1"/>
+          </a:fillRef>
+          <a:effectRef idx="0">
+            <a:schemeClr val="dk1"/>
+          </a:effectRef>
+          <a:fontRef idx="minor">
+            <a:schemeClr val="tx1"/>
+          </a:fontRef>
+        </p:style>
+      </p:cxnSp>
+    </p:spTree>
+    <p:extLst>
+      <p:ext uri="{BB962C8B-B14F-4D97-AF65-F5344CB8AC3E}">
+        <p14:creationId xmlns:p14="http://schemas.microsoft.com/office/powerpoint/2010/main" val="400317418"/>
       </p:ext>
     </p:extLst>
   </p:cSld>

</xml_diff>

<commit_message>
Added the key change step.
</commit_message>
<xml_diff>
--- a/doc/firmwaresignWF.pptx
+++ b/doc/firmwaresignWF.pptx
@@ -5,7 +5,7 @@
     <p:sldMasterId id="2147483648" r:id="rId1"/>
   </p:sldMasterIdLst>
   <p:notesMasterIdLst>
-    <p:notesMasterId r:id="rId11"/>
+    <p:notesMasterId r:id="rId12"/>
   </p:notesMasterIdLst>
   <p:sldIdLst>
     <p:sldId id="256" r:id="rId2"/>
@@ -17,6 +17,7 @@
     <p:sldId id="262" r:id="rId8"/>
     <p:sldId id="263" r:id="rId9"/>
     <p:sldId id="264" r:id="rId10"/>
+    <p:sldId id="265" r:id="rId11"/>
   </p:sldIdLst>
   <p:sldSz cx="12192000" cy="6858000"/>
   <p:notesSz cx="6858000" cy="9144000"/>
@@ -7979,6 +7980,479 @@
       </p:par>
     </p:tnLst>
   </p:timing>
+</p:sld>
+</file>
+
+<file path=ppt/slides/slide10.xml><?xml version="1.0" encoding="utf-8"?>
+<p:sld xmlns:a="http://schemas.openxmlformats.org/drawingml/2006/main" xmlns:r="http://schemas.openxmlformats.org/officeDocument/2006/relationships" xmlns:p="http://schemas.openxmlformats.org/presentationml/2006/main">
+  <p:cSld>
+    <p:spTree>
+      <p:nvGrpSpPr>
+        <p:cNvPr id="1" name=""/>
+        <p:cNvGrpSpPr/>
+        <p:nvPr/>
+      </p:nvGrpSpPr>
+      <p:grpSpPr>
+        <a:xfrm>
+          <a:off x="0" y="0"/>
+          <a:ext cx="0" cy="0"/>
+          <a:chOff x="0" y="0"/>
+          <a:chExt cx="0" cy="0"/>
+        </a:xfrm>
+      </p:grpSpPr>
+      <p:sp>
+        <p:nvSpPr>
+          <p:cNvPr id="4" name="Rectangle 3"/>
+          <p:cNvSpPr/>
+          <p:nvPr/>
+        </p:nvSpPr>
+        <p:spPr>
+          <a:xfrm>
+            <a:off x="1222408" y="797110"/>
+            <a:ext cx="2281188" cy="2359971"/>
+          </a:xfrm>
+          <a:prstGeom prst="rect">
+            <a:avLst/>
+          </a:prstGeom>
+          <a:ln>
+            <a:prstDash val="sysDot"/>
+          </a:ln>
+        </p:spPr>
+        <p:style>
+          <a:lnRef idx="2">
+            <a:schemeClr val="dk1"/>
+          </a:lnRef>
+          <a:fillRef idx="1">
+            <a:schemeClr val="lt1"/>
+          </a:fillRef>
+          <a:effectRef idx="0">
+            <a:schemeClr val="dk1"/>
+          </a:effectRef>
+          <a:fontRef idx="minor">
+            <a:schemeClr val="dk1"/>
+          </a:fontRef>
+        </p:style>
+        <p:txBody>
+          <a:bodyPr rtlCol="0" anchor="ctr"/>
+          <a:lstStyle/>
+          <a:p>
+            <a:pPr algn="ctr"/>
+            <a:endParaRPr lang="en-SG"/>
+          </a:p>
+        </p:txBody>
+      </p:sp>
+      <p:sp>
+        <p:nvSpPr>
+          <p:cNvPr id="5" name="Rectangle 4"/>
+          <p:cNvSpPr/>
+          <p:nvPr/>
+        </p:nvSpPr>
+        <p:spPr>
+          <a:xfrm>
+            <a:off x="3758666" y="797110"/>
+            <a:ext cx="2608446" cy="2359971"/>
+          </a:xfrm>
+          <a:prstGeom prst="rect">
+            <a:avLst/>
+          </a:prstGeom>
+          <a:ln>
+            <a:prstDash val="sysDot"/>
+          </a:ln>
+        </p:spPr>
+        <p:style>
+          <a:lnRef idx="2">
+            <a:schemeClr val="dk1"/>
+          </a:lnRef>
+          <a:fillRef idx="1">
+            <a:schemeClr val="lt1"/>
+          </a:fillRef>
+          <a:effectRef idx="0">
+            <a:schemeClr val="dk1"/>
+          </a:effectRef>
+          <a:fontRef idx="minor">
+            <a:schemeClr val="dk1"/>
+          </a:fontRef>
+        </p:style>
+        <p:txBody>
+          <a:bodyPr rtlCol="0" anchor="ctr"/>
+          <a:lstStyle/>
+          <a:p>
+            <a:pPr algn="ctr"/>
+            <a:endParaRPr lang="en-SG"/>
+          </a:p>
+        </p:txBody>
+      </p:sp>
+      <p:cxnSp>
+        <p:nvCxnSpPr>
+          <p:cNvPr id="6" name="Straight Connector 5"/>
+          <p:cNvCxnSpPr/>
+          <p:nvPr/>
+        </p:nvCxnSpPr>
+        <p:spPr>
+          <a:xfrm>
+            <a:off x="6973504" y="288753"/>
+            <a:ext cx="0" cy="3570973"/>
+          </a:xfrm>
+          <a:prstGeom prst="line">
+            <a:avLst/>
+          </a:prstGeom>
+          <a:ln>
+            <a:prstDash val="dash"/>
+          </a:ln>
+        </p:spPr>
+        <p:style>
+          <a:lnRef idx="1">
+            <a:schemeClr val="dk1"/>
+          </a:lnRef>
+          <a:fillRef idx="0">
+            <a:schemeClr val="dk1"/>
+          </a:fillRef>
+          <a:effectRef idx="0">
+            <a:schemeClr val="dk1"/>
+          </a:effectRef>
+          <a:fontRef idx="minor">
+            <a:schemeClr val="tx1"/>
+          </a:fontRef>
+        </p:style>
+      </p:cxnSp>
+      <p:sp>
+        <p:nvSpPr>
+          <p:cNvPr id="7" name="TextBox 6"/>
+          <p:cNvSpPr txBox="1"/>
+          <p:nvPr/>
+        </p:nvSpPr>
+        <p:spPr>
+          <a:xfrm>
+            <a:off x="6501866" y="3290620"/>
+            <a:ext cx="1087655" cy="369332"/>
+          </a:xfrm>
+          <a:prstGeom prst="rect">
+            <a:avLst/>
+          </a:prstGeom>
+          <a:noFill/>
+        </p:spPr>
+        <p:txBody>
+          <a:bodyPr wrap="square" rtlCol="0">
+            <a:spAutoFit/>
+          </a:bodyPr>
+          <a:lstStyle/>
+          <a:p>
+            <a:r>
+              <a:rPr lang="en-US" dirty="0" smtClean="0"/>
+              <a:t>Internet</a:t>
+            </a:r>
+            <a:endParaRPr lang="en-SG" dirty="0"/>
+          </a:p>
+        </p:txBody>
+      </p:sp>
+      <p:sp>
+        <p:nvSpPr>
+          <p:cNvPr id="8" name="Rectangle 7"/>
+          <p:cNvSpPr/>
+          <p:nvPr/>
+        </p:nvSpPr>
+        <p:spPr>
+          <a:xfrm>
+            <a:off x="7623210" y="797110"/>
+            <a:ext cx="2128787" cy="2359971"/>
+          </a:xfrm>
+          <a:prstGeom prst="rect">
+            <a:avLst/>
+          </a:prstGeom>
+          <a:ln>
+            <a:prstDash val="sysDot"/>
+          </a:ln>
+        </p:spPr>
+        <p:style>
+          <a:lnRef idx="2">
+            <a:schemeClr val="dk1"/>
+          </a:lnRef>
+          <a:fillRef idx="1">
+            <a:schemeClr val="lt1"/>
+          </a:fillRef>
+          <a:effectRef idx="0">
+            <a:schemeClr val="dk1"/>
+          </a:effectRef>
+          <a:fontRef idx="minor">
+            <a:schemeClr val="dk1"/>
+          </a:fontRef>
+        </p:style>
+        <p:txBody>
+          <a:bodyPr rtlCol="0" anchor="ctr"/>
+          <a:lstStyle/>
+          <a:p>
+            <a:pPr algn="ctr"/>
+            <a:endParaRPr lang="en-SG"/>
+          </a:p>
+        </p:txBody>
+      </p:sp>
+      <p:sp>
+        <p:nvSpPr>
+          <p:cNvPr id="9" name="TextBox 8"/>
+          <p:cNvSpPr txBox="1"/>
+          <p:nvPr/>
+        </p:nvSpPr>
+        <p:spPr>
+          <a:xfrm>
+            <a:off x="1333098" y="798301"/>
+            <a:ext cx="1809552" cy="307777"/>
+          </a:xfrm>
+          <a:prstGeom prst="rect">
+            <a:avLst/>
+          </a:prstGeom>
+          <a:noFill/>
+        </p:spPr>
+        <p:txBody>
+          <a:bodyPr wrap="square" rtlCol="0">
+            <a:spAutoFit/>
+          </a:bodyPr>
+          <a:lstStyle/>
+          <a:p>
+            <a:r>
+              <a:rPr lang="en-US" sz="1400" dirty="0" smtClean="0"/>
+              <a:t>Trust App [Trust Zone]</a:t>
+            </a:r>
+            <a:endParaRPr lang="en-SG" sz="1400" dirty="0"/>
+          </a:p>
+        </p:txBody>
+      </p:sp>
+      <p:sp>
+        <p:nvSpPr>
+          <p:cNvPr id="10" name="TextBox 9"/>
+          <p:cNvSpPr txBox="1"/>
+          <p:nvPr/>
+        </p:nvSpPr>
+        <p:spPr>
+          <a:xfrm>
+            <a:off x="3796556" y="886715"/>
+            <a:ext cx="2157663" cy="307777"/>
+          </a:xfrm>
+          <a:prstGeom prst="rect">
+            <a:avLst/>
+          </a:prstGeom>
+          <a:noFill/>
+        </p:spPr>
+        <p:txBody>
+          <a:bodyPr wrap="square" rtlCol="0">
+            <a:spAutoFit/>
+          </a:bodyPr>
+          <a:lstStyle/>
+          <a:p>
+            <a:r>
+              <a:rPr lang="en-US" sz="1400" dirty="0" smtClean="0"/>
+              <a:t>Trust Client [Normal world]</a:t>
+            </a:r>
+            <a:endParaRPr lang="en-SG" sz="1400" dirty="0"/>
+          </a:p>
+        </p:txBody>
+      </p:sp>
+      <p:sp>
+        <p:nvSpPr>
+          <p:cNvPr id="11" name="TextBox 10"/>
+          <p:cNvSpPr txBox="1"/>
+          <p:nvPr/>
+        </p:nvSpPr>
+        <p:spPr>
+          <a:xfrm>
+            <a:off x="7623210" y="886715"/>
+            <a:ext cx="2157663" cy="307777"/>
+          </a:xfrm>
+          <a:prstGeom prst="rect">
+            <a:avLst/>
+          </a:prstGeom>
+          <a:noFill/>
+        </p:spPr>
+        <p:txBody>
+          <a:bodyPr wrap="square" rtlCol="0">
+            <a:spAutoFit/>
+          </a:bodyPr>
+          <a:lstStyle/>
+          <a:p>
+            <a:r>
+              <a:rPr lang="en-US" sz="1400" dirty="0" smtClean="0"/>
+              <a:t>Server program</a:t>
+            </a:r>
+            <a:endParaRPr lang="en-SG" sz="1400" dirty="0"/>
+          </a:p>
+        </p:txBody>
+      </p:sp>
+      <p:sp>
+        <p:nvSpPr>
+          <p:cNvPr id="27" name="TextBox 26"/>
+          <p:cNvSpPr txBox="1"/>
+          <p:nvPr/>
+        </p:nvSpPr>
+        <p:spPr>
+          <a:xfrm>
+            <a:off x="1624262" y="294018"/>
+            <a:ext cx="1590576" cy="369332"/>
+          </a:xfrm>
+          <a:prstGeom prst="rect">
+            <a:avLst/>
+          </a:prstGeom>
+          <a:noFill/>
+        </p:spPr>
+        <p:txBody>
+          <a:bodyPr wrap="square" rtlCol="0">
+            <a:spAutoFit/>
+          </a:bodyPr>
+          <a:lstStyle/>
+          <a:p>
+            <a:r>
+              <a:rPr lang="en-US" dirty="0" smtClean="0"/>
+              <a:t>Raspberry PI </a:t>
+            </a:r>
+            <a:endParaRPr lang="en-SG" dirty="0"/>
+          </a:p>
+        </p:txBody>
+      </p:sp>
+      <p:sp>
+        <p:nvSpPr>
+          <p:cNvPr id="28" name="TextBox 27"/>
+          <p:cNvSpPr txBox="1"/>
+          <p:nvPr/>
+        </p:nvSpPr>
+        <p:spPr>
+          <a:xfrm>
+            <a:off x="7352297" y="288753"/>
+            <a:ext cx="1878331" cy="369332"/>
+          </a:xfrm>
+          <a:prstGeom prst="rect">
+            <a:avLst/>
+          </a:prstGeom>
+          <a:noFill/>
+        </p:spPr>
+        <p:txBody>
+          <a:bodyPr wrap="square" rtlCol="0">
+            <a:spAutoFit/>
+          </a:bodyPr>
+          <a:lstStyle/>
+          <a:p>
+            <a:r>
+              <a:rPr lang="en-US" dirty="0" smtClean="0"/>
+              <a:t>Server Computer</a:t>
+            </a:r>
+            <a:endParaRPr lang="en-SG" dirty="0"/>
+          </a:p>
+        </p:txBody>
+      </p:sp>
+      <p:cxnSp>
+        <p:nvCxnSpPr>
+          <p:cNvPr id="30" name="Elbow Connector 29"/>
+          <p:cNvCxnSpPr/>
+          <p:nvPr/>
+        </p:nvCxnSpPr>
+        <p:spPr>
+          <a:xfrm flipV="1">
+            <a:off x="6198072" y="1400206"/>
+            <a:ext cx="1560895" cy="895775"/>
+          </a:xfrm>
+          <a:prstGeom prst="bentConnector3">
+            <a:avLst>
+              <a:gd name="adj1" fmla="val 37050"/>
+            </a:avLst>
+          </a:prstGeom>
+          <a:ln>
+            <a:tailEnd type="triangle"/>
+          </a:ln>
+        </p:spPr>
+        <p:style>
+          <a:lnRef idx="1">
+            <a:schemeClr val="dk1"/>
+          </a:lnRef>
+          <a:fillRef idx="0">
+            <a:schemeClr val="dk1"/>
+          </a:fillRef>
+          <a:effectRef idx="0">
+            <a:schemeClr val="dk1"/>
+          </a:effectRef>
+          <a:fontRef idx="minor">
+            <a:schemeClr val="tx1"/>
+          </a:fontRef>
+        </p:style>
+      </p:cxnSp>
+      <p:sp>
+        <p:nvSpPr>
+          <p:cNvPr id="31" name="Rectangle 30"/>
+          <p:cNvSpPr/>
+          <p:nvPr/>
+        </p:nvSpPr>
+        <p:spPr>
+          <a:xfrm>
+            <a:off x="1867301" y="1217210"/>
+            <a:ext cx="1566512" cy="365992"/>
+          </a:xfrm>
+          <a:prstGeom prst="rect">
+            <a:avLst/>
+          </a:prstGeom>
+          <a:ln w="19050"/>
+        </p:spPr>
+        <p:style>
+          <a:lnRef idx="2">
+            <a:schemeClr val="dk1"/>
+          </a:lnRef>
+          <a:fillRef idx="1">
+            <a:schemeClr val="lt1"/>
+          </a:fillRef>
+          <a:effectRef idx="0">
+            <a:schemeClr val="dk1"/>
+          </a:effectRef>
+          <a:fontRef idx="minor">
+            <a:schemeClr val="dk1"/>
+          </a:fontRef>
+        </p:style>
+        <p:txBody>
+          <a:bodyPr rtlCol="0" anchor="ctr"/>
+          <a:lstStyle/>
+          <a:p>
+            <a:r>
+              <a:rPr lang="en-US" sz="1100" dirty="0" smtClean="0"/>
+              <a:t>Random fetch a AES256 key from key list in TA</a:t>
+            </a:r>
+            <a:endParaRPr lang="en-SG" sz="1100" dirty="0"/>
+          </a:p>
+        </p:txBody>
+      </p:sp>
+      <p:pic>
+        <p:nvPicPr>
+          <p:cNvPr id="32" name="Picture 31"/>
+          <p:cNvPicPr>
+            <a:picLocks noChangeAspect="1"/>
+          </p:cNvPicPr>
+          <p:nvPr/>
+        </p:nvPicPr>
+        <p:blipFill>
+          <a:blip r:embed="rId2" cstate="print">
+            <a:extLst>
+              <a:ext uri="{28A0092B-C50C-407E-A947-70E740481C1C}">
+                <a14:useLocalDpi xmlns:a14="http://schemas.microsoft.com/office/drawing/2010/main" val="0"/>
+              </a:ext>
+            </a:extLst>
+          </a:blip>
+          <a:stretch>
+            <a:fillRect/>
+          </a:stretch>
+        </p:blipFill>
+        <p:spPr>
+          <a:xfrm>
+            <a:off x="1294251" y="1217210"/>
+            <a:ext cx="365992" cy="365992"/>
+          </a:xfrm>
+          <a:prstGeom prst="rect">
+            <a:avLst/>
+          </a:prstGeom>
+        </p:spPr>
+      </p:pic>
+    </p:spTree>
+    <p:extLst>
+      <p:ext uri="{BB962C8B-B14F-4D97-AF65-F5344CB8AC3E}">
+        <p14:creationId xmlns:p14="http://schemas.microsoft.com/office/powerpoint/2010/main" val="2432581292"/>
+      </p:ext>
+    </p:extLst>
+  </p:cSld>
+  <p:clrMapOvr>
+    <a:masterClrMapping/>
+  </p:clrMapOvr>
 </p:sld>
 </file>
 
@@ -22079,14 +22553,60 @@
       </p:grpSpPr>
       <p:sp>
         <p:nvSpPr>
+          <p:cNvPr id="37" name="Rectangle 36"/>
+          <p:cNvSpPr/>
+          <p:nvPr/>
+        </p:nvSpPr>
+        <p:spPr>
+          <a:xfrm>
+            <a:off x="3108961" y="413886"/>
+            <a:ext cx="399443" cy="2797488"/>
+          </a:xfrm>
+          <a:prstGeom prst="rect">
+            <a:avLst/>
+          </a:prstGeom>
+          <a:ln>
+            <a:solidFill>
+              <a:schemeClr val="bg1">
+                <a:lumMod val="65000"/>
+              </a:schemeClr>
+            </a:solidFill>
+            <a:prstDash val="dash"/>
+          </a:ln>
+        </p:spPr>
+        <p:style>
+          <a:lnRef idx="2">
+            <a:schemeClr val="dk1"/>
+          </a:lnRef>
+          <a:fillRef idx="1">
+            <a:schemeClr val="lt1"/>
+          </a:fillRef>
+          <a:effectRef idx="0">
+            <a:schemeClr val="dk1"/>
+          </a:effectRef>
+          <a:fontRef idx="minor">
+            <a:schemeClr val="dk1"/>
+          </a:fontRef>
+        </p:style>
+        <p:txBody>
+          <a:bodyPr rtlCol="0" anchor="ctr"/>
+          <a:lstStyle/>
+          <a:p>
+            <a:pPr algn="ctr"/>
+            <a:endParaRPr lang="en-SG"/>
+          </a:p>
+        </p:txBody>
+      </p:sp>
+      <p:sp>
+        <p:nvSpPr>
           <p:cNvPr id="4" name="Rectangle 3"/>
           <p:cNvSpPr/>
           <p:nvPr/>
         </p:nvSpPr>
         <p:spPr>
           <a:xfrm>
-            <a:off x="1649132" y="797110"/>
-            <a:ext cx="1719098" cy="2359971"/>
+            <a:off x="500509" y="797110"/>
+            <a:ext cx="2358190" cy="2112751"/>
           </a:xfrm>
           <a:prstGeom prst="rect">
             <a:avLst/>
@@ -22126,8 +22646,8 @@
         </p:nvSpPr>
         <p:spPr>
           <a:xfrm>
-            <a:off x="3758666" y="797110"/>
-            <a:ext cx="2608446" cy="2359971"/>
+            <a:off x="3758666" y="797111"/>
+            <a:ext cx="2608446" cy="1940144"/>
           </a:xfrm>
           <a:prstGeom prst="rect">
             <a:avLst/>
@@ -22168,7 +22688,7 @@
         <p:spPr>
           <a:xfrm>
             <a:off x="6973504" y="288753"/>
-            <a:ext cx="0" cy="3570973"/>
+            <a:ext cx="27371" cy="3001867"/>
           </a:xfrm>
           <a:prstGeom prst="line">
             <a:avLst/>
@@ -22200,8 +22720,8 @@
         </p:nvSpPr>
         <p:spPr>
           <a:xfrm>
-            <a:off x="6501866" y="3290620"/>
-            <a:ext cx="1087655" cy="369332"/>
+            <a:off x="6529086" y="3246576"/>
+            <a:ext cx="733174" cy="276999"/>
           </a:xfrm>
           <a:prstGeom prst="rect">
             <a:avLst/>
@@ -22215,10 +22735,10 @@
           <a:lstStyle/>
           <a:p>
             <a:r>
-              <a:rPr lang="en-US" dirty="0" smtClean="0"/>
+              <a:rPr lang="en-US" sz="1200" b="1" dirty="0" smtClean="0"/>
               <a:t>Internet</a:t>
             </a:r>
-            <a:endParaRPr lang="en-SG" dirty="0"/>
+            <a:endParaRPr lang="en-SG" sz="1200" b="1" dirty="0"/>
           </a:p>
         </p:txBody>
       </p:sp>
@@ -22230,8 +22750,8 @@
         </p:nvSpPr>
         <p:spPr>
           <a:xfrm>
-            <a:off x="7623210" y="797110"/>
-            <a:ext cx="2128787" cy="2359971"/>
+            <a:off x="7262261" y="797110"/>
+            <a:ext cx="2569951" cy="2689040"/>
           </a:xfrm>
           <a:prstGeom prst="rect">
             <a:avLst/>
@@ -22271,7 +22791,7 @@
         </p:nvSpPr>
         <p:spPr>
           <a:xfrm>
-            <a:off x="1649132" y="888809"/>
+            <a:off x="611199" y="798301"/>
             <a:ext cx="1809552" cy="307777"/>
           </a:xfrm>
           <a:prstGeom prst="rect">
@@ -22361,7 +22881,7 @@
         </p:nvSpPr>
         <p:spPr>
           <a:xfrm>
-            <a:off x="1624262" y="294018"/>
+            <a:off x="902363" y="294018"/>
             <a:ext cx="1590576" cy="369332"/>
           </a:xfrm>
           <a:prstGeom prst="rect">
@@ -22413,21 +22933,91 @@
           </a:p>
         </p:txBody>
       </p:sp>
+      <p:sp>
+        <p:nvSpPr>
+          <p:cNvPr id="31" name="Rectangle 30"/>
+          <p:cNvSpPr/>
+          <p:nvPr/>
+        </p:nvSpPr>
+        <p:spPr>
+          <a:xfrm>
+            <a:off x="1159838" y="1217210"/>
+            <a:ext cx="1621859" cy="365992"/>
+          </a:xfrm>
+          <a:prstGeom prst="rect">
+            <a:avLst/>
+          </a:prstGeom>
+          <a:ln w="19050"/>
+        </p:spPr>
+        <p:style>
+          <a:lnRef idx="2">
+            <a:schemeClr val="dk1"/>
+          </a:lnRef>
+          <a:fillRef idx="1">
+            <a:schemeClr val="lt1"/>
+          </a:fillRef>
+          <a:effectRef idx="0">
+            <a:schemeClr val="dk1"/>
+          </a:effectRef>
+          <a:fontRef idx="minor">
+            <a:schemeClr val="dk1"/>
+          </a:fontRef>
+        </p:style>
+        <p:txBody>
+          <a:bodyPr rtlCol="0" anchor="ctr"/>
+          <a:lstStyle/>
+          <a:p>
+            <a:r>
+              <a:rPr lang="en-US" sz="1100" dirty="0" smtClean="0"/>
+              <a:t>Random fetch a AES256 key[A] from key list in TA</a:t>
+            </a:r>
+            <a:endParaRPr lang="en-SG" sz="1100" dirty="0"/>
+          </a:p>
+        </p:txBody>
+      </p:sp>
+      <p:pic>
+        <p:nvPicPr>
+          <p:cNvPr id="32" name="Picture 31"/>
+          <p:cNvPicPr>
+            <a:picLocks noChangeAspect="1"/>
+          </p:cNvPicPr>
+          <p:nvPr/>
+        </p:nvPicPr>
+        <p:blipFill>
+          <a:blip r:embed="rId2" cstate="print">
+            <a:extLst>
+              <a:ext uri="{28A0092B-C50C-407E-A947-70E740481C1C}">
+                <a14:useLocalDpi xmlns:a14="http://schemas.microsoft.com/office/drawing/2010/main" val="0"/>
+              </a:ext>
+            </a:extLst>
+          </a:blip>
+          <a:stretch>
+            <a:fillRect/>
+          </a:stretch>
+        </p:blipFill>
+        <p:spPr>
+          <a:xfrm>
+            <a:off x="572352" y="1217210"/>
+            <a:ext cx="365992" cy="365992"/>
+          </a:xfrm>
+          <a:prstGeom prst="rect">
+            <a:avLst/>
+          </a:prstGeom>
+        </p:spPr>
+      </p:pic>
       <p:cxnSp>
         <p:nvCxnSpPr>
-          <p:cNvPr id="30" name="Elbow Connector 29"/>
+          <p:cNvPr id="33" name="Straight Arrow Connector 32"/>
           <p:cNvCxnSpPr/>
           <p:nvPr/>
         </p:nvCxnSpPr>
         <p:spPr>
-          <a:xfrm flipV="1">
-            <a:off x="6198072" y="1400206"/>
-            <a:ext cx="1560895" cy="895775"/>
-          </a:xfrm>
-          <a:prstGeom prst="bentConnector3">
-            <a:avLst>
-              <a:gd name="adj1" fmla="val 37050"/>
-            </a:avLst>
+          <a:xfrm>
+            <a:off x="909468" y="1400206"/>
+            <a:ext cx="207058" cy="1"/>
+          </a:xfrm>
+          <a:prstGeom prst="straightConnector1">
+            <a:avLst/>
           </a:prstGeom>
           <a:ln>
             <a:tailEnd type="triangle"/>
@@ -22448,6 +23038,900 @@
           </a:fontRef>
         </p:style>
       </p:cxnSp>
+      <p:cxnSp>
+        <p:nvCxnSpPr>
+          <p:cNvPr id="36" name="Straight Arrow Connector 35"/>
+          <p:cNvCxnSpPr/>
+          <p:nvPr/>
+        </p:nvCxnSpPr>
+        <p:spPr>
+          <a:xfrm>
+            <a:off x="2781697" y="1400206"/>
+            <a:ext cx="452391" cy="0"/>
+          </a:xfrm>
+          <a:prstGeom prst="straightConnector1">
+            <a:avLst/>
+          </a:prstGeom>
+          <a:ln>
+            <a:tailEnd type="triangle"/>
+          </a:ln>
+        </p:spPr>
+        <p:style>
+          <a:lnRef idx="1">
+            <a:schemeClr val="dk1"/>
+          </a:lnRef>
+          <a:fillRef idx="0">
+            <a:schemeClr val="dk1"/>
+          </a:fillRef>
+          <a:effectRef idx="0">
+            <a:schemeClr val="dk1"/>
+          </a:effectRef>
+          <a:fontRef idx="minor">
+            <a:schemeClr val="tx1"/>
+          </a:fontRef>
+        </p:style>
+      </p:cxnSp>
+      <p:sp>
+        <p:nvSpPr>
+          <p:cNvPr id="38" name="TextBox 37"/>
+          <p:cNvSpPr txBox="1"/>
+          <p:nvPr/>
+        </p:nvSpPr>
+        <p:spPr>
+          <a:xfrm>
+            <a:off x="1837218" y="3211374"/>
+            <a:ext cx="3222060" cy="276999"/>
+          </a:xfrm>
+          <a:prstGeom prst="rect">
+            <a:avLst/>
+          </a:prstGeom>
+          <a:noFill/>
+        </p:spPr>
+        <p:txBody>
+          <a:bodyPr wrap="square" rtlCol="0">
+            <a:spAutoFit/>
+          </a:bodyPr>
+          <a:lstStyle/>
+          <a:p>
+            <a:r>
+              <a:rPr lang="en-US" sz="1200" b="1" dirty="0">
+                <a:solidFill>
+                  <a:schemeClr val="bg1">
+                    <a:lumMod val="50000"/>
+                  </a:schemeClr>
+                </a:solidFill>
+              </a:rPr>
+              <a:t>OPTEE driver  &lt;=&gt;  Tee-supplicant service </a:t>
+            </a:r>
+          </a:p>
+        </p:txBody>
+      </p:sp>
+      <p:cxnSp>
+        <p:nvCxnSpPr>
+          <p:cNvPr id="41" name="Straight Arrow Connector 40"/>
+          <p:cNvCxnSpPr/>
+          <p:nvPr/>
+        </p:nvCxnSpPr>
+        <p:spPr>
+          <a:xfrm>
+            <a:off x="3386484" y="1400810"/>
+            <a:ext cx="704253" cy="0"/>
+          </a:xfrm>
+          <a:prstGeom prst="straightConnector1">
+            <a:avLst/>
+          </a:prstGeom>
+          <a:ln>
+            <a:tailEnd type="triangle"/>
+          </a:ln>
+        </p:spPr>
+        <p:style>
+          <a:lnRef idx="1">
+            <a:schemeClr val="dk1"/>
+          </a:lnRef>
+          <a:fillRef idx="0">
+            <a:schemeClr val="dk1"/>
+          </a:fillRef>
+          <a:effectRef idx="0">
+            <a:schemeClr val="dk1"/>
+          </a:effectRef>
+          <a:fontRef idx="minor">
+            <a:schemeClr val="tx1"/>
+          </a:fontRef>
+        </p:style>
+      </p:cxnSp>
+      <p:sp>
+        <p:nvSpPr>
+          <p:cNvPr id="46" name="TextBox 45"/>
+          <p:cNvSpPr txBox="1"/>
+          <p:nvPr/>
+        </p:nvSpPr>
+        <p:spPr>
+          <a:xfrm>
+            <a:off x="3053737" y="1123207"/>
+            <a:ext cx="604057" cy="276999"/>
+          </a:xfrm>
+          <a:prstGeom prst="rect">
+            <a:avLst/>
+          </a:prstGeom>
+          <a:noFill/>
+        </p:spPr>
+        <p:txBody>
+          <a:bodyPr wrap="square" rtlCol="0">
+            <a:spAutoFit/>
+          </a:bodyPr>
+          <a:lstStyle/>
+          <a:p>
+            <a:r>
+              <a:rPr lang="en-US" sz="1200" b="1" dirty="0" smtClean="0"/>
+              <a:t>Key ID</a:t>
+            </a:r>
+            <a:endParaRPr lang="en-US" sz="1200" b="1" dirty="0"/>
+          </a:p>
+        </p:txBody>
+      </p:sp>
+      <p:sp>
+        <p:nvSpPr>
+          <p:cNvPr id="47" name="Rectangle 46"/>
+          <p:cNvSpPr/>
+          <p:nvPr/>
+        </p:nvSpPr>
+        <p:spPr>
+          <a:xfrm>
+            <a:off x="4124426" y="1271424"/>
+            <a:ext cx="1433571" cy="257564"/>
+          </a:xfrm>
+          <a:prstGeom prst="rect">
+            <a:avLst/>
+          </a:prstGeom>
+          <a:ln w="19050"/>
+        </p:spPr>
+        <p:style>
+          <a:lnRef idx="2">
+            <a:schemeClr val="dk1"/>
+          </a:lnRef>
+          <a:fillRef idx="1">
+            <a:schemeClr val="lt1"/>
+          </a:fillRef>
+          <a:effectRef idx="0">
+            <a:schemeClr val="dk1"/>
+          </a:effectRef>
+          <a:fontRef idx="minor">
+            <a:schemeClr val="dk1"/>
+          </a:fontRef>
+        </p:style>
+        <p:txBody>
+          <a:bodyPr rtlCol="0" anchor="ctr"/>
+          <a:lstStyle/>
+          <a:p>
+            <a:r>
+              <a:rPr lang="en-US" sz="1100" dirty="0" smtClean="0"/>
+              <a:t>Create Login message </a:t>
+            </a:r>
+            <a:endParaRPr lang="en-SG" sz="1100" dirty="0"/>
+          </a:p>
+        </p:txBody>
+      </p:sp>
+      <p:cxnSp>
+        <p:nvCxnSpPr>
+          <p:cNvPr id="48" name="Straight Arrow Connector 47"/>
+          <p:cNvCxnSpPr/>
+          <p:nvPr/>
+        </p:nvCxnSpPr>
+        <p:spPr>
+          <a:xfrm>
+            <a:off x="5548367" y="1379058"/>
+            <a:ext cx="2347278" cy="0"/>
+          </a:xfrm>
+          <a:prstGeom prst="straightConnector1">
+            <a:avLst/>
+          </a:prstGeom>
+          <a:ln>
+            <a:tailEnd type="triangle"/>
+          </a:ln>
+        </p:spPr>
+        <p:style>
+          <a:lnRef idx="1">
+            <a:schemeClr val="dk1"/>
+          </a:lnRef>
+          <a:fillRef idx="0">
+            <a:schemeClr val="dk1"/>
+          </a:fillRef>
+          <a:effectRef idx="0">
+            <a:schemeClr val="dk1"/>
+          </a:effectRef>
+          <a:fontRef idx="minor">
+            <a:schemeClr val="tx1"/>
+          </a:fontRef>
+        </p:style>
+      </p:cxnSp>
+      <p:sp>
+        <p:nvSpPr>
+          <p:cNvPr id="50" name="Rectangle 49"/>
+          <p:cNvSpPr/>
+          <p:nvPr/>
+        </p:nvSpPr>
+        <p:spPr>
+          <a:xfrm>
+            <a:off x="7919704" y="1271424"/>
+            <a:ext cx="1054461" cy="217357"/>
+          </a:xfrm>
+          <a:prstGeom prst="rect">
+            <a:avLst/>
+          </a:prstGeom>
+          <a:ln w="19050"/>
+        </p:spPr>
+        <p:style>
+          <a:lnRef idx="2">
+            <a:schemeClr val="dk1"/>
+          </a:lnRef>
+          <a:fillRef idx="1">
+            <a:schemeClr val="lt1"/>
+          </a:fillRef>
+          <a:effectRef idx="0">
+            <a:schemeClr val="dk1"/>
+          </a:effectRef>
+          <a:fontRef idx="minor">
+            <a:schemeClr val="dk1"/>
+          </a:fontRef>
+        </p:style>
+        <p:txBody>
+          <a:bodyPr rtlCol="0" anchor="ctr"/>
+          <a:lstStyle/>
+          <a:p>
+            <a:r>
+              <a:rPr lang="en-US" sz="1100" dirty="0" smtClean="0"/>
+              <a:t>Parse message </a:t>
+            </a:r>
+            <a:endParaRPr lang="en-SG" sz="1100" dirty="0"/>
+          </a:p>
+        </p:txBody>
+      </p:sp>
+      <p:sp>
+        <p:nvSpPr>
+          <p:cNvPr id="51" name="Rectangle 50"/>
+          <p:cNvSpPr/>
+          <p:nvPr/>
+        </p:nvSpPr>
+        <p:spPr>
+          <a:xfrm>
+            <a:off x="5524308" y="1196405"/>
+            <a:ext cx="2092239" cy="215444"/>
+          </a:xfrm>
+          <a:prstGeom prst="rect">
+            <a:avLst/>
+          </a:prstGeom>
+        </p:spPr>
+        <p:txBody>
+          <a:bodyPr wrap="none">
+            <a:spAutoFit/>
+          </a:bodyPr>
+          <a:lstStyle/>
+          <a:p>
+            <a:r>
+              <a:rPr lang="en-US" sz="800" dirty="0" smtClean="0"/>
+              <a:t>F;Gateway_ID;Program_V;Key_ID;C_Len</a:t>
+            </a:r>
+            <a:r>
+              <a:rPr lang="en-US" sz="800" dirty="0"/>
+              <a:t>, m, n</a:t>
+            </a:r>
+            <a:endParaRPr lang="en-SG" sz="800" dirty="0"/>
+          </a:p>
+        </p:txBody>
+      </p:sp>
+      <p:sp>
+        <p:nvSpPr>
+          <p:cNvPr id="52" name="Rectangle 51"/>
+          <p:cNvSpPr/>
+          <p:nvPr/>
+        </p:nvSpPr>
+        <p:spPr>
+          <a:xfrm>
+            <a:off x="7339264" y="1702743"/>
+            <a:ext cx="1634901" cy="380759"/>
+          </a:xfrm>
+          <a:prstGeom prst="rect">
+            <a:avLst/>
+          </a:prstGeom>
+          <a:ln w="19050"/>
+        </p:spPr>
+        <p:style>
+          <a:lnRef idx="2">
+            <a:schemeClr val="dk1"/>
+          </a:lnRef>
+          <a:fillRef idx="1">
+            <a:schemeClr val="lt1"/>
+          </a:fillRef>
+          <a:effectRef idx="0">
+            <a:schemeClr val="dk1"/>
+          </a:effectRef>
+          <a:fontRef idx="minor">
+            <a:schemeClr val="dk1"/>
+          </a:fontRef>
+        </p:style>
+        <p:txBody>
+          <a:bodyPr rtlCol="0" anchor="ctr"/>
+          <a:lstStyle/>
+          <a:p>
+            <a:r>
+              <a:rPr lang="en-US" sz="1100" dirty="0" smtClean="0"/>
+              <a:t>Fetch AES56Key [A] based on </a:t>
+            </a:r>
+            <a:r>
+              <a:rPr lang="en-US" sz="1100" dirty="0" err="1" smtClean="0"/>
+              <a:t>KeyID</a:t>
+            </a:r>
+            <a:r>
+              <a:rPr lang="en-US" sz="1100" dirty="0" smtClean="0"/>
+              <a:t> form DB</a:t>
+            </a:r>
+            <a:endParaRPr lang="en-SG" sz="1100" dirty="0"/>
+          </a:p>
+        </p:txBody>
+      </p:sp>
+      <p:cxnSp>
+        <p:nvCxnSpPr>
+          <p:cNvPr id="53" name="Straight Arrow Connector 52"/>
+          <p:cNvCxnSpPr/>
+          <p:nvPr/>
+        </p:nvCxnSpPr>
+        <p:spPr>
+          <a:xfrm flipH="1">
+            <a:off x="8117706" y="1491653"/>
+            <a:ext cx="0" cy="203347"/>
+          </a:xfrm>
+          <a:prstGeom prst="straightConnector1">
+            <a:avLst/>
+          </a:prstGeom>
+          <a:ln>
+            <a:tailEnd type="triangle"/>
+          </a:ln>
+        </p:spPr>
+        <p:style>
+          <a:lnRef idx="1">
+            <a:schemeClr val="dk1"/>
+          </a:lnRef>
+          <a:fillRef idx="0">
+            <a:schemeClr val="dk1"/>
+          </a:fillRef>
+          <a:effectRef idx="0">
+            <a:schemeClr val="dk1"/>
+          </a:effectRef>
+          <a:fontRef idx="minor">
+            <a:schemeClr val="tx1"/>
+          </a:fontRef>
+        </p:style>
+      </p:cxnSp>
+      <p:sp>
+        <p:nvSpPr>
+          <p:cNvPr id="55" name="Rectangle 54"/>
+          <p:cNvSpPr/>
+          <p:nvPr/>
+        </p:nvSpPr>
+        <p:spPr>
+          <a:xfrm>
+            <a:off x="7339264" y="2295180"/>
+            <a:ext cx="2270860" cy="380759"/>
+          </a:xfrm>
+          <a:prstGeom prst="rect">
+            <a:avLst/>
+          </a:prstGeom>
+          <a:ln w="19050"/>
+        </p:spPr>
+        <p:style>
+          <a:lnRef idx="2">
+            <a:schemeClr val="dk1"/>
+          </a:lnRef>
+          <a:fillRef idx="1">
+            <a:schemeClr val="lt1"/>
+          </a:fillRef>
+          <a:effectRef idx="0">
+            <a:schemeClr val="dk1"/>
+          </a:effectRef>
+          <a:fontRef idx="minor">
+            <a:schemeClr val="dk1"/>
+          </a:fontRef>
+        </p:style>
+        <p:txBody>
+          <a:bodyPr rtlCol="0" anchor="ctr"/>
+          <a:lstStyle/>
+          <a:p>
+            <a:r>
+              <a:rPr lang="en-US" sz="1100" dirty="0" smtClean="0"/>
+              <a:t>Create  random session AES56Key[B] and encrypted the key [B] by [A]</a:t>
+            </a:r>
+            <a:endParaRPr lang="en-SG" sz="1100" dirty="0"/>
+          </a:p>
+        </p:txBody>
+      </p:sp>
+      <p:cxnSp>
+        <p:nvCxnSpPr>
+          <p:cNvPr id="56" name="Straight Arrow Connector 55"/>
+          <p:cNvCxnSpPr/>
+          <p:nvPr/>
+        </p:nvCxnSpPr>
+        <p:spPr>
+          <a:xfrm flipH="1">
+            <a:off x="8117706" y="2091833"/>
+            <a:ext cx="0" cy="203347"/>
+          </a:xfrm>
+          <a:prstGeom prst="straightConnector1">
+            <a:avLst/>
+          </a:prstGeom>
+          <a:ln>
+            <a:tailEnd type="triangle"/>
+          </a:ln>
+        </p:spPr>
+        <p:style>
+          <a:lnRef idx="1">
+            <a:schemeClr val="dk1"/>
+          </a:lnRef>
+          <a:fillRef idx="0">
+            <a:schemeClr val="dk1"/>
+          </a:fillRef>
+          <a:effectRef idx="0">
+            <a:schemeClr val="dk1"/>
+          </a:effectRef>
+          <a:fontRef idx="minor">
+            <a:schemeClr val="tx1"/>
+          </a:fontRef>
+        </p:style>
+      </p:cxnSp>
+      <p:sp>
+        <p:nvSpPr>
+          <p:cNvPr id="57" name="Rectangle 56"/>
+          <p:cNvSpPr/>
+          <p:nvPr/>
+        </p:nvSpPr>
+        <p:spPr>
+          <a:xfrm>
+            <a:off x="4114796" y="1702743"/>
+            <a:ext cx="1552579" cy="257564"/>
+          </a:xfrm>
+          <a:prstGeom prst="rect">
+            <a:avLst/>
+          </a:prstGeom>
+          <a:ln w="19050"/>
+        </p:spPr>
+        <p:style>
+          <a:lnRef idx="2">
+            <a:schemeClr val="dk1"/>
+          </a:lnRef>
+          <a:fillRef idx="1">
+            <a:schemeClr val="lt1"/>
+          </a:fillRef>
+          <a:effectRef idx="0">
+            <a:schemeClr val="dk1"/>
+          </a:effectRef>
+          <a:fontRef idx="minor">
+            <a:schemeClr val="dk1"/>
+          </a:fontRef>
+        </p:style>
+        <p:txBody>
+          <a:bodyPr rtlCol="0" anchor="ctr"/>
+          <a:lstStyle/>
+          <a:p>
+            <a:r>
+              <a:rPr lang="en-US" sz="1100" dirty="0" smtClean="0"/>
+              <a:t>Forward message to TA</a:t>
+            </a:r>
+            <a:endParaRPr lang="en-SG" sz="1100" dirty="0"/>
+          </a:p>
+        </p:txBody>
+      </p:sp>
+      <p:cxnSp>
+        <p:nvCxnSpPr>
+          <p:cNvPr id="59" name="Elbow Connector 58"/>
+          <p:cNvCxnSpPr>
+            <a:stCxn id="55" idx="1"/>
+          </p:cNvCxnSpPr>
+          <p:nvPr/>
+        </p:nvCxnSpPr>
+        <p:spPr>
+          <a:xfrm rot="10800000">
+            <a:off x="5667376" y="1828800"/>
+            <a:ext cx="1671889" cy="656760"/>
+          </a:xfrm>
+          <a:prstGeom prst="bentConnector3">
+            <a:avLst>
+              <a:gd name="adj1" fmla="val 34048"/>
+            </a:avLst>
+          </a:prstGeom>
+          <a:ln>
+            <a:tailEnd type="triangle"/>
+          </a:ln>
+        </p:spPr>
+        <p:style>
+          <a:lnRef idx="1">
+            <a:schemeClr val="dk1"/>
+          </a:lnRef>
+          <a:fillRef idx="0">
+            <a:schemeClr val="dk1"/>
+          </a:fillRef>
+          <a:effectRef idx="0">
+            <a:schemeClr val="dk1"/>
+          </a:effectRef>
+          <a:fontRef idx="minor">
+            <a:schemeClr val="tx1"/>
+          </a:fontRef>
+        </p:style>
+      </p:cxnSp>
+      <p:cxnSp>
+        <p:nvCxnSpPr>
+          <p:cNvPr id="62" name="Straight Arrow Connector 61"/>
+          <p:cNvCxnSpPr>
+            <a:stCxn id="57" idx="1"/>
+          </p:cNvCxnSpPr>
+          <p:nvPr/>
+        </p:nvCxnSpPr>
+        <p:spPr>
+          <a:xfrm flipH="1" flipV="1">
+            <a:off x="2619375" y="1828799"/>
+            <a:ext cx="1495421" cy="2726"/>
+          </a:xfrm>
+          <a:prstGeom prst="straightConnector1">
+            <a:avLst/>
+          </a:prstGeom>
+          <a:ln>
+            <a:tailEnd type="triangle"/>
+          </a:ln>
+        </p:spPr>
+        <p:style>
+          <a:lnRef idx="1">
+            <a:schemeClr val="dk1"/>
+          </a:lnRef>
+          <a:fillRef idx="0">
+            <a:schemeClr val="dk1"/>
+          </a:fillRef>
+          <a:effectRef idx="0">
+            <a:schemeClr val="dk1"/>
+          </a:effectRef>
+          <a:fontRef idx="minor">
+            <a:schemeClr val="tx1"/>
+          </a:fontRef>
+        </p:style>
+      </p:cxnSp>
+      <p:sp>
+        <p:nvSpPr>
+          <p:cNvPr id="63" name="Rectangle 62"/>
+          <p:cNvSpPr/>
+          <p:nvPr/>
+        </p:nvSpPr>
+        <p:spPr>
+          <a:xfrm>
+            <a:off x="631058" y="1694334"/>
+            <a:ext cx="1982642" cy="454664"/>
+          </a:xfrm>
+          <a:prstGeom prst="rect">
+            <a:avLst/>
+          </a:prstGeom>
+          <a:ln w="19050"/>
+        </p:spPr>
+        <p:style>
+          <a:lnRef idx="2">
+            <a:schemeClr val="dk1"/>
+          </a:lnRef>
+          <a:fillRef idx="1">
+            <a:schemeClr val="lt1"/>
+          </a:fillRef>
+          <a:effectRef idx="0">
+            <a:schemeClr val="dk1"/>
+          </a:effectRef>
+          <a:fontRef idx="minor">
+            <a:schemeClr val="dk1"/>
+          </a:fontRef>
+        </p:style>
+        <p:txBody>
+          <a:bodyPr rtlCol="0" anchor="ctr"/>
+          <a:lstStyle/>
+          <a:p>
+            <a:r>
+              <a:rPr lang="en-US" sz="1100" dirty="0" smtClean="0"/>
+              <a:t>Decrypt the message by Key [A] and get the session key [B]</a:t>
+            </a:r>
+            <a:endParaRPr lang="en-SG" sz="1100" dirty="0"/>
+          </a:p>
+        </p:txBody>
+      </p:sp>
+      <p:sp>
+        <p:nvSpPr>
+          <p:cNvPr id="64" name="Rectangle 63"/>
+          <p:cNvSpPr/>
+          <p:nvPr/>
+        </p:nvSpPr>
+        <p:spPr>
+          <a:xfrm>
+            <a:off x="7339264" y="2909861"/>
+            <a:ext cx="2270860" cy="380759"/>
+          </a:xfrm>
+          <a:prstGeom prst="rect">
+            <a:avLst/>
+          </a:prstGeom>
+          <a:ln w="19050"/>
+        </p:spPr>
+        <p:style>
+          <a:lnRef idx="2">
+            <a:schemeClr val="dk1"/>
+          </a:lnRef>
+          <a:fillRef idx="1">
+            <a:schemeClr val="lt1"/>
+          </a:fillRef>
+          <a:effectRef idx="0">
+            <a:schemeClr val="dk1"/>
+          </a:effectRef>
+          <a:fontRef idx="minor">
+            <a:schemeClr val="dk1"/>
+          </a:fontRef>
+        </p:style>
+        <p:txBody>
+          <a:bodyPr rtlCol="0" anchor="ctr"/>
+          <a:lstStyle/>
+          <a:p>
+            <a:r>
+              <a:rPr lang="en-US" sz="1100" dirty="0" smtClean="0"/>
+              <a:t>Create  random SWATT challenge string and encrypt by session key[B]</a:t>
+            </a:r>
+            <a:endParaRPr lang="en-SG" sz="1100" dirty="0"/>
+          </a:p>
+        </p:txBody>
+      </p:sp>
+      <p:cxnSp>
+        <p:nvCxnSpPr>
+          <p:cNvPr id="65" name="Straight Arrow Connector 64"/>
+          <p:cNvCxnSpPr/>
+          <p:nvPr/>
+        </p:nvCxnSpPr>
+        <p:spPr>
+          <a:xfrm flipH="1">
+            <a:off x="8117706" y="2675939"/>
+            <a:ext cx="0" cy="203347"/>
+          </a:xfrm>
+          <a:prstGeom prst="straightConnector1">
+            <a:avLst/>
+          </a:prstGeom>
+          <a:ln>
+            <a:tailEnd type="triangle"/>
+          </a:ln>
+        </p:spPr>
+        <p:style>
+          <a:lnRef idx="1">
+            <a:schemeClr val="dk1"/>
+          </a:lnRef>
+          <a:fillRef idx="0">
+            <a:schemeClr val="dk1"/>
+          </a:fillRef>
+          <a:effectRef idx="0">
+            <a:schemeClr val="dk1"/>
+          </a:effectRef>
+          <a:fontRef idx="minor">
+            <a:schemeClr val="tx1"/>
+          </a:fontRef>
+        </p:style>
+      </p:cxnSp>
+      <p:sp>
+        <p:nvSpPr>
+          <p:cNvPr id="66" name="Flowchart: Magnetic Disk 65"/>
+          <p:cNvSpPr/>
+          <p:nvPr/>
+        </p:nvSpPr>
+        <p:spPr>
+          <a:xfrm>
+            <a:off x="9331844" y="1693480"/>
+            <a:ext cx="392782" cy="380759"/>
+          </a:xfrm>
+          <a:prstGeom prst="flowChartMagneticDisk">
+            <a:avLst/>
+          </a:prstGeom>
+        </p:spPr>
+        <p:style>
+          <a:lnRef idx="2">
+            <a:schemeClr val="dk1"/>
+          </a:lnRef>
+          <a:fillRef idx="1">
+            <a:schemeClr val="lt1"/>
+          </a:fillRef>
+          <a:effectRef idx="0">
+            <a:schemeClr val="dk1"/>
+          </a:effectRef>
+          <a:fontRef idx="minor">
+            <a:schemeClr val="dk1"/>
+          </a:fontRef>
+        </p:style>
+        <p:txBody>
+          <a:bodyPr rtlCol="0" anchor="ctr"/>
+          <a:lstStyle/>
+          <a:p>
+            <a:pPr algn="ctr"/>
+            <a:endParaRPr lang="en-SG"/>
+          </a:p>
+        </p:txBody>
+      </p:sp>
+      <p:cxnSp>
+        <p:nvCxnSpPr>
+          <p:cNvPr id="67" name="Straight Arrow Connector 66"/>
+          <p:cNvCxnSpPr/>
+          <p:nvPr/>
+        </p:nvCxnSpPr>
+        <p:spPr>
+          <a:xfrm flipH="1">
+            <a:off x="8997923" y="1893122"/>
+            <a:ext cx="333921" cy="3613"/>
+          </a:xfrm>
+          <a:prstGeom prst="straightConnector1">
+            <a:avLst/>
+          </a:prstGeom>
+          <a:ln>
+            <a:tailEnd type="triangle"/>
+          </a:ln>
+        </p:spPr>
+        <p:style>
+          <a:lnRef idx="1">
+            <a:schemeClr val="dk1"/>
+          </a:lnRef>
+          <a:fillRef idx="0">
+            <a:schemeClr val="dk1"/>
+          </a:fillRef>
+          <a:effectRef idx="0">
+            <a:schemeClr val="dk1"/>
+          </a:effectRef>
+          <a:fontRef idx="minor">
+            <a:schemeClr val="tx1"/>
+          </a:fontRef>
+        </p:style>
+      </p:cxnSp>
+      <p:sp>
+        <p:nvSpPr>
+          <p:cNvPr id="70" name="Rectangle 69"/>
+          <p:cNvSpPr/>
+          <p:nvPr/>
+        </p:nvSpPr>
+        <p:spPr>
+          <a:xfrm>
+            <a:off x="4104624" y="2312732"/>
+            <a:ext cx="1552579" cy="257564"/>
+          </a:xfrm>
+          <a:prstGeom prst="rect">
+            <a:avLst/>
+          </a:prstGeom>
+          <a:ln w="19050"/>
+        </p:spPr>
+        <p:style>
+          <a:lnRef idx="2">
+            <a:schemeClr val="dk1"/>
+          </a:lnRef>
+          <a:fillRef idx="1">
+            <a:schemeClr val="lt1"/>
+          </a:fillRef>
+          <a:effectRef idx="0">
+            <a:schemeClr val="dk1"/>
+          </a:effectRef>
+          <a:fontRef idx="minor">
+            <a:schemeClr val="dk1"/>
+          </a:fontRef>
+        </p:style>
+        <p:txBody>
+          <a:bodyPr rtlCol="0" anchor="ctr"/>
+          <a:lstStyle/>
+          <a:p>
+            <a:r>
+              <a:rPr lang="en-US" sz="1100" dirty="0" smtClean="0"/>
+              <a:t>Forward message to TA</a:t>
+            </a:r>
+            <a:endParaRPr lang="en-SG" sz="1100" dirty="0"/>
+          </a:p>
+        </p:txBody>
+      </p:sp>
+      <p:cxnSp>
+        <p:nvCxnSpPr>
+          <p:cNvPr id="72" name="Elbow Connector 71"/>
+          <p:cNvCxnSpPr>
+            <a:stCxn id="64" idx="1"/>
+            <a:endCxn id="70" idx="3"/>
+          </p:cNvCxnSpPr>
+          <p:nvPr/>
+        </p:nvCxnSpPr>
+        <p:spPr>
+          <a:xfrm rot="10800000">
+            <a:off x="5657204" y="2441515"/>
+            <a:ext cx="1682061" cy="658727"/>
+          </a:xfrm>
+          <a:prstGeom prst="bentConnector3">
+            <a:avLst/>
+          </a:prstGeom>
+          <a:ln>
+            <a:tailEnd type="triangle"/>
+          </a:ln>
+        </p:spPr>
+        <p:style>
+          <a:lnRef idx="1">
+            <a:schemeClr val="dk1"/>
+          </a:lnRef>
+          <a:fillRef idx="0">
+            <a:schemeClr val="dk1"/>
+          </a:fillRef>
+          <a:effectRef idx="0">
+            <a:schemeClr val="dk1"/>
+          </a:effectRef>
+          <a:fontRef idx="minor">
+            <a:schemeClr val="tx1"/>
+          </a:fontRef>
+        </p:style>
+      </p:cxnSp>
+      <p:cxnSp>
+        <p:nvCxnSpPr>
+          <p:cNvPr id="74" name="Straight Arrow Connector 73"/>
+          <p:cNvCxnSpPr/>
+          <p:nvPr/>
+        </p:nvCxnSpPr>
+        <p:spPr>
+          <a:xfrm flipH="1" flipV="1">
+            <a:off x="2578472" y="2438443"/>
+            <a:ext cx="1495421" cy="2726"/>
+          </a:xfrm>
+          <a:prstGeom prst="straightConnector1">
+            <a:avLst/>
+          </a:prstGeom>
+          <a:ln>
+            <a:tailEnd type="triangle"/>
+          </a:ln>
+        </p:spPr>
+        <p:style>
+          <a:lnRef idx="1">
+            <a:schemeClr val="dk1"/>
+          </a:lnRef>
+          <a:fillRef idx="0">
+            <a:schemeClr val="dk1"/>
+          </a:fillRef>
+          <a:effectRef idx="0">
+            <a:schemeClr val="dk1"/>
+          </a:effectRef>
+          <a:fontRef idx="minor">
+            <a:schemeClr val="tx1"/>
+          </a:fontRef>
+        </p:style>
+      </p:cxnSp>
+      <p:sp>
+        <p:nvSpPr>
+          <p:cNvPr id="76" name="Rectangle 75"/>
+          <p:cNvSpPr/>
+          <p:nvPr/>
+        </p:nvSpPr>
+        <p:spPr>
+          <a:xfrm>
+            <a:off x="620356" y="2238500"/>
+            <a:ext cx="1982642" cy="498754"/>
+          </a:xfrm>
+          <a:prstGeom prst="rect">
+            <a:avLst/>
+          </a:prstGeom>
+          <a:ln w="19050"/>
+        </p:spPr>
+        <p:style>
+          <a:lnRef idx="2">
+            <a:schemeClr val="dk1"/>
+          </a:lnRef>
+          <a:fillRef idx="1">
+            <a:schemeClr val="lt1"/>
+          </a:fillRef>
+          <a:effectRef idx="0">
+            <a:schemeClr val="dk1"/>
+          </a:effectRef>
+          <a:fontRef idx="minor">
+            <a:schemeClr val="dk1"/>
+          </a:fontRef>
+        </p:style>
+        <p:txBody>
+          <a:bodyPr rtlCol="0" anchor="ctr"/>
+          <a:lstStyle/>
+          <a:p>
+            <a:r>
+              <a:rPr lang="en-US" sz="1100" dirty="0" smtClean="0"/>
+              <a:t>Decrypt the SWATT challenge by Key [B] and store in trust app buffer.</a:t>
+            </a:r>
+            <a:endParaRPr lang="en-SG" sz="1100" dirty="0"/>
+          </a:p>
+        </p:txBody>
+      </p:sp>
     </p:spTree>
     <p:extLst>
       <p:ext uri="{BB962C8B-B14F-4D97-AF65-F5344CB8AC3E}">

</xml_diff>

<commit_message>
Added the attack float diagram.
</commit_message>
<xml_diff>
--- a/doc/firmwaresignWF.pptx
+++ b/doc/firmwaresignWF.pptx
@@ -5,7 +5,7 @@
     <p:sldMasterId id="2147483648" r:id="rId1"/>
   </p:sldMasterIdLst>
   <p:notesMasterIdLst>
-    <p:notesMasterId r:id="rId14"/>
+    <p:notesMasterId r:id="rId15"/>
   </p:notesMasterIdLst>
   <p:sldIdLst>
     <p:sldId id="256" r:id="rId2"/>
@@ -20,6 +20,7 @@
     <p:sldId id="266" r:id="rId11"/>
     <p:sldId id="267" r:id="rId12"/>
     <p:sldId id="265" r:id="rId13"/>
+    <p:sldId id="268" r:id="rId14"/>
   </p:sldIdLst>
   <p:sldSz cx="12192000" cy="6858000"/>
   <p:notesSz cx="6858000" cy="9144000"/>
@@ -208,7 +209,7 @@
           <a:p>
             <a:fld id="{32DA1F5A-E23E-4D9B-B8D0-40D8909182CC}" type="datetimeFigureOut">
               <a:rPr lang="en-SG" smtClean="0"/>
-              <a:t>15/8/2019</a:t>
+              <a:t>13/9/2019</a:t>
             </a:fld>
             <a:endParaRPr lang="en-SG"/>
           </a:p>
@@ -691,7 +692,7 @@
           <a:p>
             <a:fld id="{168FC4C3-6B25-48E2-93F9-24A255A41CA9}" type="datetimeFigureOut">
               <a:rPr lang="en-SG" smtClean="0"/>
-              <a:t>15/8/2019</a:t>
+              <a:t>13/9/2019</a:t>
             </a:fld>
             <a:endParaRPr lang="en-SG"/>
           </a:p>
@@ -861,7 +862,7 @@
           <a:p>
             <a:fld id="{168FC4C3-6B25-48E2-93F9-24A255A41CA9}" type="datetimeFigureOut">
               <a:rPr lang="en-SG" smtClean="0"/>
-              <a:t>15/8/2019</a:t>
+              <a:t>13/9/2019</a:t>
             </a:fld>
             <a:endParaRPr lang="en-SG"/>
           </a:p>
@@ -1041,7 +1042,7 @@
           <a:p>
             <a:fld id="{168FC4C3-6B25-48E2-93F9-24A255A41CA9}" type="datetimeFigureOut">
               <a:rPr lang="en-SG" smtClean="0"/>
-              <a:t>15/8/2019</a:t>
+              <a:t>13/9/2019</a:t>
             </a:fld>
             <a:endParaRPr lang="en-SG"/>
           </a:p>
@@ -1211,7 +1212,7 @@
           <a:p>
             <a:fld id="{168FC4C3-6B25-48E2-93F9-24A255A41CA9}" type="datetimeFigureOut">
               <a:rPr lang="en-SG" smtClean="0"/>
-              <a:t>15/8/2019</a:t>
+              <a:t>13/9/2019</a:t>
             </a:fld>
             <a:endParaRPr lang="en-SG"/>
           </a:p>
@@ -1457,7 +1458,7 @@
           <a:p>
             <a:fld id="{168FC4C3-6B25-48E2-93F9-24A255A41CA9}" type="datetimeFigureOut">
               <a:rPr lang="en-SG" smtClean="0"/>
-              <a:t>15/8/2019</a:t>
+              <a:t>13/9/2019</a:t>
             </a:fld>
             <a:endParaRPr lang="en-SG"/>
           </a:p>
@@ -1689,7 +1690,7 @@
           <a:p>
             <a:fld id="{168FC4C3-6B25-48E2-93F9-24A255A41CA9}" type="datetimeFigureOut">
               <a:rPr lang="en-SG" smtClean="0"/>
-              <a:t>15/8/2019</a:t>
+              <a:t>13/9/2019</a:t>
             </a:fld>
             <a:endParaRPr lang="en-SG"/>
           </a:p>
@@ -2056,7 +2057,7 @@
           <a:p>
             <a:fld id="{168FC4C3-6B25-48E2-93F9-24A255A41CA9}" type="datetimeFigureOut">
               <a:rPr lang="en-SG" smtClean="0"/>
-              <a:t>15/8/2019</a:t>
+              <a:t>13/9/2019</a:t>
             </a:fld>
             <a:endParaRPr lang="en-SG"/>
           </a:p>
@@ -2174,7 +2175,7 @@
           <a:p>
             <a:fld id="{168FC4C3-6B25-48E2-93F9-24A255A41CA9}" type="datetimeFigureOut">
               <a:rPr lang="en-SG" smtClean="0"/>
-              <a:t>15/8/2019</a:t>
+              <a:t>13/9/2019</a:t>
             </a:fld>
             <a:endParaRPr lang="en-SG"/>
           </a:p>
@@ -2269,7 +2270,7 @@
           <a:p>
             <a:fld id="{168FC4C3-6B25-48E2-93F9-24A255A41CA9}" type="datetimeFigureOut">
               <a:rPr lang="en-SG" smtClean="0"/>
-              <a:t>15/8/2019</a:t>
+              <a:t>13/9/2019</a:t>
             </a:fld>
             <a:endParaRPr lang="en-SG"/>
           </a:p>
@@ -2546,7 +2547,7 @@
           <a:p>
             <a:fld id="{168FC4C3-6B25-48E2-93F9-24A255A41CA9}" type="datetimeFigureOut">
               <a:rPr lang="en-SG" smtClean="0"/>
-              <a:t>15/8/2019</a:t>
+              <a:t>13/9/2019</a:t>
             </a:fld>
             <a:endParaRPr lang="en-SG"/>
           </a:p>
@@ -2799,7 +2800,7 @@
           <a:p>
             <a:fld id="{168FC4C3-6B25-48E2-93F9-24A255A41CA9}" type="datetimeFigureOut">
               <a:rPr lang="en-SG" smtClean="0"/>
-              <a:t>15/8/2019</a:t>
+              <a:t>13/9/2019</a:t>
             </a:fld>
             <a:endParaRPr lang="en-SG"/>
           </a:p>
@@ -3012,7 +3013,7 @@
           <a:p>
             <a:fld id="{168FC4C3-6B25-48E2-93F9-24A255A41CA9}" type="datetimeFigureOut">
               <a:rPr lang="en-SG" smtClean="0"/>
-              <a:t>15/8/2019</a:t>
+              <a:t>13/9/2019</a:t>
             </a:fld>
             <a:endParaRPr lang="en-SG"/>
           </a:p>
@@ -8422,11 +8423,7 @@
           <a:p>
             <a:r>
               <a:rPr lang="en-US" sz="1100" dirty="0" smtClean="0"/>
-              <a:t>Use the SWATT challenge string get the random block/bytes memory address</a:t>
-            </a:r>
-            <a:r>
-              <a:rPr lang="en-US" sz="1100" dirty="0" smtClean="0"/>
-              <a:t>/file position.</a:t>
+              <a:t>Use the SWATT challenge string get the random block/bytes memory address/file position.</a:t>
             </a:r>
             <a:endParaRPr lang="en-SG" sz="1100" dirty="0"/>
           </a:p>
@@ -8799,11 +8796,7 @@
             </a:r>
             <a:r>
               <a:rPr lang="en-US" sz="1100" dirty="0" smtClean="0"/>
-              <a:t>calcu</a:t>
-            </a:r>
-            <a:r>
-              <a:rPr lang="en-US" sz="1100" dirty="0" smtClean="0"/>
-              <a:t>lation</a:t>
+              <a:t>calculation</a:t>
             </a:r>
             <a:endParaRPr lang="en-SG" sz="1100" dirty="0"/>
           </a:p>
@@ -8958,11 +8951,7 @@
           <a:p>
             <a:r>
               <a:rPr lang="en-US" sz="1100" dirty="0" smtClean="0"/>
-              <a:t>Forward message to </a:t>
-            </a:r>
-            <a:r>
-              <a:rPr lang="en-US" sz="1100" dirty="0" smtClean="0"/>
-              <a:t>Trust-Server</a:t>
+              <a:t>Forward message to Trust-Server</a:t>
             </a:r>
             <a:endParaRPr lang="en-SG" sz="1100" dirty="0"/>
           </a:p>
@@ -10135,11 +10124,7 @@
           <a:p>
             <a:r>
               <a:rPr lang="en-US" sz="1100" dirty="0" smtClean="0"/>
-              <a:t>Forward message to </a:t>
-            </a:r>
-            <a:r>
-              <a:rPr lang="en-US" sz="1100" dirty="0" smtClean="0"/>
-              <a:t>TA.</a:t>
+              <a:t>Forward message to TA.</a:t>
             </a:r>
             <a:endParaRPr lang="en-SG" sz="1100" dirty="0"/>
           </a:p>
@@ -10214,11 +10199,7 @@
           <a:p>
             <a:r>
               <a:rPr lang="en-US" sz="1100" dirty="0" smtClean="0"/>
-              <a:t>Decrypt the message by </a:t>
-            </a:r>
-            <a:r>
-              <a:rPr lang="en-US" sz="1100" dirty="0" smtClean="0"/>
-              <a:t>Key[B], compare the SWATT value and get </a:t>
+              <a:t>Decrypt the message by Key[B], compare the SWATT value and get </a:t>
             </a:r>
             <a:r>
               <a:rPr lang="en-US" sz="1100" dirty="0"/>
@@ -11257,6 +11238,939 @@
     <p:extLst>
       <p:ext uri="{BB962C8B-B14F-4D97-AF65-F5344CB8AC3E}">
         <p14:creationId xmlns:p14="http://schemas.microsoft.com/office/powerpoint/2010/main" val="2432581292"/>
+      </p:ext>
+    </p:extLst>
+  </p:cSld>
+  <p:clrMapOvr>
+    <a:masterClrMapping/>
+  </p:clrMapOvr>
+</p:sld>
+</file>
+
+<file path=ppt/slides/slide13.xml><?xml version="1.0" encoding="utf-8"?>
+<p:sld xmlns:a="http://schemas.openxmlformats.org/drawingml/2006/main" xmlns:r="http://schemas.openxmlformats.org/officeDocument/2006/relationships" xmlns:p="http://schemas.openxmlformats.org/presentationml/2006/main">
+  <p:cSld>
+    <p:spTree>
+      <p:nvGrpSpPr>
+        <p:cNvPr id="1" name=""/>
+        <p:cNvGrpSpPr/>
+        <p:nvPr/>
+      </p:nvGrpSpPr>
+      <p:grpSpPr>
+        <a:xfrm>
+          <a:off x="0" y="0"/>
+          <a:ext cx="0" cy="0"/>
+          <a:chOff x="0" y="0"/>
+          <a:chExt cx="0" cy="0"/>
+        </a:xfrm>
+      </p:grpSpPr>
+      <p:sp>
+        <p:nvSpPr>
+          <p:cNvPr id="4" name="Rectangle 3"/>
+          <p:cNvSpPr/>
+          <p:nvPr/>
+        </p:nvSpPr>
+        <p:spPr>
+          <a:xfrm>
+            <a:off x="1222408" y="797110"/>
+            <a:ext cx="1655546" cy="1108691"/>
+          </a:xfrm>
+          <a:prstGeom prst="rect">
+            <a:avLst/>
+          </a:prstGeom>
+          <a:ln>
+            <a:prstDash val="sysDot"/>
+          </a:ln>
+        </p:spPr>
+        <p:style>
+          <a:lnRef idx="2">
+            <a:schemeClr val="dk1"/>
+          </a:lnRef>
+          <a:fillRef idx="1">
+            <a:schemeClr val="lt1"/>
+          </a:fillRef>
+          <a:effectRef idx="0">
+            <a:schemeClr val="dk1"/>
+          </a:effectRef>
+          <a:fontRef idx="minor">
+            <a:schemeClr val="dk1"/>
+          </a:fontRef>
+        </p:style>
+        <p:txBody>
+          <a:bodyPr rtlCol="0" anchor="ctr"/>
+          <a:lstStyle/>
+          <a:p>
+            <a:pPr algn="ctr"/>
+            <a:endParaRPr lang="en-SG" dirty="0"/>
+          </a:p>
+        </p:txBody>
+      </p:sp>
+      <p:sp>
+        <p:nvSpPr>
+          <p:cNvPr id="5" name="TextBox 4"/>
+          <p:cNvSpPr txBox="1"/>
+          <p:nvPr/>
+        </p:nvSpPr>
+        <p:spPr>
+          <a:xfrm>
+            <a:off x="1333098" y="798301"/>
+            <a:ext cx="1809552" cy="523220"/>
+          </a:xfrm>
+          <a:prstGeom prst="rect">
+            <a:avLst/>
+          </a:prstGeom>
+          <a:noFill/>
+        </p:spPr>
+        <p:txBody>
+          <a:bodyPr wrap="square" rtlCol="0">
+            <a:spAutoFit/>
+          </a:bodyPr>
+          <a:lstStyle/>
+          <a:p>
+            <a:r>
+              <a:rPr lang="en-US" sz="1400" dirty="0" smtClean="0"/>
+              <a:t>HMI computer 192.168.10.21</a:t>
+            </a:r>
+            <a:endParaRPr lang="en-SG" sz="1400" dirty="0"/>
+          </a:p>
+        </p:txBody>
+      </p:sp>
+      <p:cxnSp>
+        <p:nvCxnSpPr>
+          <p:cNvPr id="7" name="Straight Arrow Connector 6"/>
+          <p:cNvCxnSpPr/>
+          <p:nvPr/>
+        </p:nvCxnSpPr>
+        <p:spPr>
+          <a:xfrm flipV="1">
+            <a:off x="2877954" y="962526"/>
+            <a:ext cx="2165684" cy="0"/>
+          </a:xfrm>
+          <a:prstGeom prst="straightConnector1">
+            <a:avLst/>
+          </a:prstGeom>
+          <a:ln>
+            <a:tailEnd type="triangle"/>
+          </a:ln>
+        </p:spPr>
+        <p:style>
+          <a:lnRef idx="1">
+            <a:schemeClr val="dk1"/>
+          </a:lnRef>
+          <a:fillRef idx="0">
+            <a:schemeClr val="dk1"/>
+          </a:fillRef>
+          <a:effectRef idx="0">
+            <a:schemeClr val="dk1"/>
+          </a:effectRef>
+          <a:fontRef idx="minor">
+            <a:schemeClr val="tx1"/>
+          </a:fontRef>
+        </p:style>
+      </p:cxnSp>
+      <p:sp>
+        <p:nvSpPr>
+          <p:cNvPr id="8" name="Rectangle 7"/>
+          <p:cNvSpPr/>
+          <p:nvPr/>
+        </p:nvSpPr>
+        <p:spPr>
+          <a:xfrm>
+            <a:off x="5128660" y="797110"/>
+            <a:ext cx="1459834" cy="1108691"/>
+          </a:xfrm>
+          <a:prstGeom prst="rect">
+            <a:avLst/>
+          </a:prstGeom>
+          <a:ln>
+            <a:prstDash val="sysDot"/>
+          </a:ln>
+        </p:spPr>
+        <p:style>
+          <a:lnRef idx="2">
+            <a:schemeClr val="dk1"/>
+          </a:lnRef>
+          <a:fillRef idx="1">
+            <a:schemeClr val="lt1"/>
+          </a:fillRef>
+          <a:effectRef idx="0">
+            <a:schemeClr val="dk1"/>
+          </a:effectRef>
+          <a:fontRef idx="minor">
+            <a:schemeClr val="dk1"/>
+          </a:fontRef>
+        </p:style>
+        <p:txBody>
+          <a:bodyPr rtlCol="0" anchor="ctr"/>
+          <a:lstStyle/>
+          <a:p>
+            <a:pPr algn="ctr"/>
+            <a:endParaRPr lang="en-SG" dirty="0"/>
+          </a:p>
+        </p:txBody>
+      </p:sp>
+      <p:sp>
+        <p:nvSpPr>
+          <p:cNvPr id="9" name="TextBox 8"/>
+          <p:cNvSpPr txBox="1"/>
+          <p:nvPr/>
+        </p:nvSpPr>
+        <p:spPr>
+          <a:xfrm>
+            <a:off x="5239350" y="798301"/>
+            <a:ext cx="1809552" cy="523220"/>
+          </a:xfrm>
+          <a:prstGeom prst="rect">
+            <a:avLst/>
+          </a:prstGeom>
+          <a:noFill/>
+        </p:spPr>
+        <p:txBody>
+          <a:bodyPr wrap="square" rtlCol="0">
+            <a:spAutoFit/>
+          </a:bodyPr>
+          <a:lstStyle/>
+          <a:p>
+            <a:r>
+              <a:rPr lang="en-US" sz="1400" dirty="0" smtClean="0"/>
+              <a:t>PLC 1</a:t>
+            </a:r>
+          </a:p>
+          <a:p>
+            <a:r>
+              <a:rPr lang="en-US" sz="1400" dirty="0" smtClean="0"/>
+              <a:t>192.168.10.72</a:t>
+            </a:r>
+            <a:endParaRPr lang="en-SG" sz="1400" dirty="0"/>
+          </a:p>
+        </p:txBody>
+      </p:sp>
+      <p:cxnSp>
+        <p:nvCxnSpPr>
+          <p:cNvPr id="11" name="Straight Arrow Connector 10"/>
+          <p:cNvCxnSpPr/>
+          <p:nvPr/>
+        </p:nvCxnSpPr>
+        <p:spPr>
+          <a:xfrm flipH="1" flipV="1">
+            <a:off x="2916455" y="1294300"/>
+            <a:ext cx="2088682" cy="0"/>
+          </a:xfrm>
+          <a:prstGeom prst="straightConnector1">
+            <a:avLst/>
+          </a:prstGeom>
+          <a:ln>
+            <a:tailEnd type="triangle"/>
+          </a:ln>
+        </p:spPr>
+        <p:style>
+          <a:lnRef idx="1">
+            <a:schemeClr val="dk1"/>
+          </a:lnRef>
+          <a:fillRef idx="0">
+            <a:schemeClr val="dk1"/>
+          </a:fillRef>
+          <a:effectRef idx="0">
+            <a:schemeClr val="dk1"/>
+          </a:effectRef>
+          <a:fontRef idx="minor">
+            <a:schemeClr val="tx1"/>
+          </a:fontRef>
+        </p:style>
+      </p:cxnSp>
+      <p:sp>
+        <p:nvSpPr>
+          <p:cNvPr id="12" name="TextBox 11"/>
+          <p:cNvSpPr txBox="1"/>
+          <p:nvPr/>
+        </p:nvSpPr>
+        <p:spPr>
+          <a:xfrm>
+            <a:off x="3142650" y="688112"/>
+            <a:ext cx="2157663" cy="261610"/>
+          </a:xfrm>
+          <a:prstGeom prst="rect">
+            <a:avLst/>
+          </a:prstGeom>
+          <a:noFill/>
+        </p:spPr>
+        <p:txBody>
+          <a:bodyPr wrap="square" rtlCol="0">
+            <a:spAutoFit/>
+          </a:bodyPr>
+          <a:lstStyle/>
+          <a:p>
+            <a:r>
+              <a:rPr lang="en-US" sz="1100" dirty="0" smtClean="0"/>
+              <a:t>1. Plc coil change </a:t>
+            </a:r>
+            <a:r>
+              <a:rPr lang="en-US" sz="1100" dirty="0" err="1" smtClean="0"/>
+              <a:t>cmd</a:t>
+            </a:r>
+            <a:endParaRPr lang="en-SG" sz="1100" dirty="0"/>
+          </a:p>
+        </p:txBody>
+      </p:sp>
+      <p:sp>
+        <p:nvSpPr>
+          <p:cNvPr id="13" name="TextBox 12"/>
+          <p:cNvSpPr txBox="1"/>
+          <p:nvPr/>
+        </p:nvSpPr>
+        <p:spPr>
+          <a:xfrm>
+            <a:off x="3142650" y="1019885"/>
+            <a:ext cx="2157663" cy="261610"/>
+          </a:xfrm>
+          <a:prstGeom prst="rect">
+            <a:avLst/>
+          </a:prstGeom>
+          <a:noFill/>
+        </p:spPr>
+        <p:txBody>
+          <a:bodyPr wrap="square" rtlCol="0">
+            <a:spAutoFit/>
+          </a:bodyPr>
+          <a:lstStyle/>
+          <a:p>
+            <a:r>
+              <a:rPr lang="en-US" sz="1100" dirty="0" smtClean="0"/>
+              <a:t>2. Plc coil change feed back</a:t>
+            </a:r>
+            <a:endParaRPr lang="en-SG" sz="1100" dirty="0"/>
+          </a:p>
+        </p:txBody>
+      </p:sp>
+      <p:sp>
+        <p:nvSpPr>
+          <p:cNvPr id="14" name="TextBox 13"/>
+          <p:cNvSpPr txBox="1"/>
+          <p:nvPr/>
+        </p:nvSpPr>
+        <p:spPr>
+          <a:xfrm>
+            <a:off x="3142649" y="1333519"/>
+            <a:ext cx="2157663" cy="261610"/>
+          </a:xfrm>
+          <a:prstGeom prst="rect">
+            <a:avLst/>
+          </a:prstGeom>
+          <a:noFill/>
+        </p:spPr>
+        <p:txBody>
+          <a:bodyPr wrap="square" rtlCol="0">
+            <a:spAutoFit/>
+          </a:bodyPr>
+          <a:lstStyle/>
+          <a:p>
+            <a:r>
+              <a:rPr lang="en-US" sz="1100" dirty="0" smtClean="0"/>
+              <a:t>3. Plc state read </a:t>
+            </a:r>
+            <a:r>
+              <a:rPr lang="en-US" sz="1100" dirty="0" err="1" smtClean="0"/>
+              <a:t>cmd</a:t>
+            </a:r>
+            <a:endParaRPr lang="en-SG" sz="1100" dirty="0"/>
+          </a:p>
+        </p:txBody>
+      </p:sp>
+      <p:cxnSp>
+        <p:nvCxnSpPr>
+          <p:cNvPr id="15" name="Straight Arrow Connector 14"/>
+          <p:cNvCxnSpPr/>
+          <p:nvPr/>
+        </p:nvCxnSpPr>
+        <p:spPr>
+          <a:xfrm flipV="1">
+            <a:off x="2916455" y="1571652"/>
+            <a:ext cx="2165684" cy="0"/>
+          </a:xfrm>
+          <a:prstGeom prst="straightConnector1">
+            <a:avLst/>
+          </a:prstGeom>
+          <a:ln>
+            <a:tailEnd type="triangle"/>
+          </a:ln>
+        </p:spPr>
+        <p:style>
+          <a:lnRef idx="1">
+            <a:schemeClr val="dk1"/>
+          </a:lnRef>
+          <a:fillRef idx="0">
+            <a:schemeClr val="dk1"/>
+          </a:fillRef>
+          <a:effectRef idx="0">
+            <a:schemeClr val="dk1"/>
+          </a:effectRef>
+          <a:fontRef idx="minor">
+            <a:schemeClr val="tx1"/>
+          </a:fontRef>
+        </p:style>
+      </p:cxnSp>
+      <p:cxnSp>
+        <p:nvCxnSpPr>
+          <p:cNvPr id="16" name="Straight Arrow Connector 15"/>
+          <p:cNvCxnSpPr/>
+          <p:nvPr/>
+        </p:nvCxnSpPr>
+        <p:spPr>
+          <a:xfrm flipH="1" flipV="1">
+            <a:off x="2889180" y="1900489"/>
+            <a:ext cx="2088682" cy="0"/>
+          </a:xfrm>
+          <a:prstGeom prst="straightConnector1">
+            <a:avLst/>
+          </a:prstGeom>
+          <a:ln>
+            <a:tailEnd type="triangle"/>
+          </a:ln>
+        </p:spPr>
+        <p:style>
+          <a:lnRef idx="1">
+            <a:schemeClr val="dk1"/>
+          </a:lnRef>
+          <a:fillRef idx="0">
+            <a:schemeClr val="dk1"/>
+          </a:fillRef>
+          <a:effectRef idx="0">
+            <a:schemeClr val="dk1"/>
+          </a:effectRef>
+          <a:fontRef idx="minor">
+            <a:schemeClr val="tx1"/>
+          </a:fontRef>
+        </p:style>
+      </p:cxnSp>
+      <p:sp>
+        <p:nvSpPr>
+          <p:cNvPr id="17" name="TextBox 16"/>
+          <p:cNvSpPr txBox="1"/>
+          <p:nvPr/>
+        </p:nvSpPr>
+        <p:spPr>
+          <a:xfrm>
+            <a:off x="3115375" y="1626074"/>
+            <a:ext cx="2157663" cy="261610"/>
+          </a:xfrm>
+          <a:prstGeom prst="rect">
+            <a:avLst/>
+          </a:prstGeom>
+          <a:noFill/>
+        </p:spPr>
+        <p:txBody>
+          <a:bodyPr wrap="square" rtlCol="0">
+            <a:spAutoFit/>
+          </a:bodyPr>
+          <a:lstStyle/>
+          <a:p>
+            <a:r>
+              <a:rPr lang="en-US" sz="1100" dirty="0" smtClean="0"/>
+              <a:t> 4. Plc state feed back</a:t>
+            </a:r>
+            <a:endParaRPr lang="en-SG" sz="1100" dirty="0"/>
+          </a:p>
+        </p:txBody>
+      </p:sp>
+      <p:sp>
+        <p:nvSpPr>
+          <p:cNvPr id="18" name="Rectangle 17"/>
+          <p:cNvSpPr/>
+          <p:nvPr/>
+        </p:nvSpPr>
+        <p:spPr>
+          <a:xfrm>
+            <a:off x="1374808" y="2932317"/>
+            <a:ext cx="1655546" cy="1108691"/>
+          </a:xfrm>
+          <a:prstGeom prst="rect">
+            <a:avLst/>
+          </a:prstGeom>
+          <a:ln>
+            <a:prstDash val="sysDot"/>
+          </a:ln>
+        </p:spPr>
+        <p:style>
+          <a:lnRef idx="2">
+            <a:schemeClr val="dk1"/>
+          </a:lnRef>
+          <a:fillRef idx="1">
+            <a:schemeClr val="lt1"/>
+          </a:fillRef>
+          <a:effectRef idx="0">
+            <a:schemeClr val="dk1"/>
+          </a:effectRef>
+          <a:fontRef idx="minor">
+            <a:schemeClr val="dk1"/>
+          </a:fontRef>
+        </p:style>
+        <p:txBody>
+          <a:bodyPr rtlCol="0" anchor="ctr"/>
+          <a:lstStyle/>
+          <a:p>
+            <a:pPr algn="ctr"/>
+            <a:endParaRPr lang="en-SG" dirty="0"/>
+          </a:p>
+        </p:txBody>
+      </p:sp>
+      <p:sp>
+        <p:nvSpPr>
+          <p:cNvPr id="19" name="TextBox 18"/>
+          <p:cNvSpPr txBox="1"/>
+          <p:nvPr/>
+        </p:nvSpPr>
+        <p:spPr>
+          <a:xfrm>
+            <a:off x="1485498" y="2933508"/>
+            <a:ext cx="1809552" cy="523220"/>
+          </a:xfrm>
+          <a:prstGeom prst="rect">
+            <a:avLst/>
+          </a:prstGeom>
+          <a:noFill/>
+        </p:spPr>
+        <p:txBody>
+          <a:bodyPr wrap="square" rtlCol="0">
+            <a:spAutoFit/>
+          </a:bodyPr>
+          <a:lstStyle/>
+          <a:p>
+            <a:r>
+              <a:rPr lang="en-US" sz="1400" dirty="0" smtClean="0"/>
+              <a:t>HMI computer 192.168.10.21</a:t>
+            </a:r>
+            <a:endParaRPr lang="en-SG" sz="1400" dirty="0"/>
+          </a:p>
+        </p:txBody>
+      </p:sp>
+      <p:sp>
+        <p:nvSpPr>
+          <p:cNvPr id="21" name="Rectangle 20"/>
+          <p:cNvSpPr/>
+          <p:nvPr/>
+        </p:nvSpPr>
+        <p:spPr>
+          <a:xfrm>
+            <a:off x="8410876" y="2926173"/>
+            <a:ext cx="1459834" cy="1108691"/>
+          </a:xfrm>
+          <a:prstGeom prst="rect">
+            <a:avLst/>
+          </a:prstGeom>
+          <a:ln>
+            <a:prstDash val="sysDot"/>
+          </a:ln>
+        </p:spPr>
+        <p:style>
+          <a:lnRef idx="2">
+            <a:schemeClr val="dk1"/>
+          </a:lnRef>
+          <a:fillRef idx="1">
+            <a:schemeClr val="lt1"/>
+          </a:fillRef>
+          <a:effectRef idx="0">
+            <a:schemeClr val="dk1"/>
+          </a:effectRef>
+          <a:fontRef idx="minor">
+            <a:schemeClr val="dk1"/>
+          </a:fontRef>
+        </p:style>
+        <p:txBody>
+          <a:bodyPr rtlCol="0" anchor="ctr"/>
+          <a:lstStyle/>
+          <a:p>
+            <a:pPr algn="ctr"/>
+            <a:endParaRPr lang="en-SG" dirty="0"/>
+          </a:p>
+        </p:txBody>
+      </p:sp>
+      <p:sp>
+        <p:nvSpPr>
+          <p:cNvPr id="22" name="TextBox 21"/>
+          <p:cNvSpPr txBox="1"/>
+          <p:nvPr/>
+        </p:nvSpPr>
+        <p:spPr>
+          <a:xfrm>
+            <a:off x="8410876" y="2888145"/>
+            <a:ext cx="1809552" cy="523220"/>
+          </a:xfrm>
+          <a:prstGeom prst="rect">
+            <a:avLst/>
+          </a:prstGeom>
+          <a:noFill/>
+        </p:spPr>
+        <p:txBody>
+          <a:bodyPr wrap="square" rtlCol="0">
+            <a:spAutoFit/>
+          </a:bodyPr>
+          <a:lstStyle/>
+          <a:p>
+            <a:r>
+              <a:rPr lang="en-US" sz="1400" dirty="0" smtClean="0"/>
+              <a:t>PLC 1</a:t>
+            </a:r>
+          </a:p>
+          <a:p>
+            <a:r>
+              <a:rPr lang="en-US" sz="1400" dirty="0" smtClean="0"/>
+              <a:t>192.168.10.72</a:t>
+            </a:r>
+            <a:endParaRPr lang="en-SG" sz="1400" dirty="0"/>
+          </a:p>
+        </p:txBody>
+      </p:sp>
+      <p:cxnSp>
+        <p:nvCxnSpPr>
+          <p:cNvPr id="23" name="Straight Arrow Connector 22"/>
+          <p:cNvCxnSpPr/>
+          <p:nvPr/>
+        </p:nvCxnSpPr>
+        <p:spPr>
+          <a:xfrm flipH="1" flipV="1">
+            <a:off x="3068855" y="3429507"/>
+            <a:ext cx="2088682" cy="0"/>
+          </a:xfrm>
+          <a:prstGeom prst="straightConnector1">
+            <a:avLst/>
+          </a:prstGeom>
+          <a:ln>
+            <a:tailEnd type="triangle"/>
+          </a:ln>
+        </p:spPr>
+        <p:style>
+          <a:lnRef idx="1">
+            <a:schemeClr val="dk1"/>
+          </a:lnRef>
+          <a:fillRef idx="0">
+            <a:schemeClr val="dk1"/>
+          </a:fillRef>
+          <a:effectRef idx="0">
+            <a:schemeClr val="dk1"/>
+          </a:effectRef>
+          <a:fontRef idx="minor">
+            <a:schemeClr val="tx1"/>
+          </a:fontRef>
+        </p:style>
+      </p:cxnSp>
+      <p:sp>
+        <p:nvSpPr>
+          <p:cNvPr id="24" name="TextBox 23"/>
+          <p:cNvSpPr txBox="1"/>
+          <p:nvPr/>
+        </p:nvSpPr>
+        <p:spPr>
+          <a:xfrm>
+            <a:off x="3295050" y="2823319"/>
+            <a:ext cx="2157663" cy="261610"/>
+          </a:xfrm>
+          <a:prstGeom prst="rect">
+            <a:avLst/>
+          </a:prstGeom>
+          <a:noFill/>
+        </p:spPr>
+        <p:txBody>
+          <a:bodyPr wrap="square" rtlCol="0">
+            <a:spAutoFit/>
+          </a:bodyPr>
+          <a:lstStyle/>
+          <a:p>
+            <a:r>
+              <a:rPr lang="en-US" sz="1100" dirty="0" smtClean="0"/>
+              <a:t>1. Plc coil change </a:t>
+            </a:r>
+            <a:r>
+              <a:rPr lang="en-US" sz="1100" dirty="0" err="1" smtClean="0"/>
+              <a:t>cmd</a:t>
+            </a:r>
+            <a:r>
+              <a:rPr lang="en-US" sz="1100" smtClean="0"/>
+              <a:t> </a:t>
+            </a:r>
+            <a:endParaRPr lang="en-SG" sz="1100" dirty="0"/>
+          </a:p>
+        </p:txBody>
+      </p:sp>
+      <p:sp>
+        <p:nvSpPr>
+          <p:cNvPr id="25" name="TextBox 24"/>
+          <p:cNvSpPr txBox="1"/>
+          <p:nvPr/>
+        </p:nvSpPr>
+        <p:spPr>
+          <a:xfrm>
+            <a:off x="3295050" y="3155092"/>
+            <a:ext cx="2157663" cy="261610"/>
+          </a:xfrm>
+          <a:prstGeom prst="rect">
+            <a:avLst/>
+          </a:prstGeom>
+          <a:noFill/>
+        </p:spPr>
+        <p:txBody>
+          <a:bodyPr wrap="square" rtlCol="0">
+            <a:spAutoFit/>
+          </a:bodyPr>
+          <a:lstStyle/>
+          <a:p>
+            <a:r>
+              <a:rPr lang="en-US" sz="1100" dirty="0" smtClean="0"/>
+              <a:t>2. Plc coil change feed back</a:t>
+            </a:r>
+            <a:endParaRPr lang="en-SG" sz="1100" dirty="0"/>
+          </a:p>
+        </p:txBody>
+      </p:sp>
+      <p:sp>
+        <p:nvSpPr>
+          <p:cNvPr id="26" name="TextBox 25"/>
+          <p:cNvSpPr txBox="1"/>
+          <p:nvPr/>
+        </p:nvSpPr>
+        <p:spPr>
+          <a:xfrm>
+            <a:off x="3295049" y="3468726"/>
+            <a:ext cx="2157663" cy="261610"/>
+          </a:xfrm>
+          <a:prstGeom prst="rect">
+            <a:avLst/>
+          </a:prstGeom>
+          <a:noFill/>
+        </p:spPr>
+        <p:txBody>
+          <a:bodyPr wrap="square" rtlCol="0">
+            <a:spAutoFit/>
+          </a:bodyPr>
+          <a:lstStyle/>
+          <a:p>
+            <a:r>
+              <a:rPr lang="en-US" sz="1100" dirty="0" smtClean="0"/>
+              <a:t>3. Plc state read </a:t>
+            </a:r>
+            <a:r>
+              <a:rPr lang="en-US" sz="1100" dirty="0" err="1" smtClean="0"/>
+              <a:t>cmd</a:t>
+            </a:r>
+            <a:endParaRPr lang="en-SG" sz="1100" dirty="0"/>
+          </a:p>
+        </p:txBody>
+      </p:sp>
+      <p:cxnSp>
+        <p:nvCxnSpPr>
+          <p:cNvPr id="27" name="Straight Arrow Connector 26"/>
+          <p:cNvCxnSpPr/>
+          <p:nvPr/>
+        </p:nvCxnSpPr>
+        <p:spPr>
+          <a:xfrm flipV="1">
+            <a:off x="3068855" y="3706859"/>
+            <a:ext cx="2165684" cy="0"/>
+          </a:xfrm>
+          <a:prstGeom prst="straightConnector1">
+            <a:avLst/>
+          </a:prstGeom>
+          <a:ln>
+            <a:tailEnd type="triangle"/>
+          </a:ln>
+        </p:spPr>
+        <p:style>
+          <a:lnRef idx="1">
+            <a:schemeClr val="dk1"/>
+          </a:lnRef>
+          <a:fillRef idx="0">
+            <a:schemeClr val="dk1"/>
+          </a:fillRef>
+          <a:effectRef idx="0">
+            <a:schemeClr val="dk1"/>
+          </a:effectRef>
+          <a:fontRef idx="minor">
+            <a:schemeClr val="tx1"/>
+          </a:fontRef>
+        </p:style>
+      </p:cxnSp>
+      <p:cxnSp>
+        <p:nvCxnSpPr>
+          <p:cNvPr id="28" name="Straight Arrow Connector 27"/>
+          <p:cNvCxnSpPr/>
+          <p:nvPr/>
+        </p:nvCxnSpPr>
+        <p:spPr>
+          <a:xfrm flipH="1" flipV="1">
+            <a:off x="3041580" y="4035696"/>
+            <a:ext cx="2088682" cy="0"/>
+          </a:xfrm>
+          <a:prstGeom prst="straightConnector1">
+            <a:avLst/>
+          </a:prstGeom>
+          <a:ln>
+            <a:tailEnd type="triangle"/>
+          </a:ln>
+        </p:spPr>
+        <p:style>
+          <a:lnRef idx="1">
+            <a:schemeClr val="dk1"/>
+          </a:lnRef>
+          <a:fillRef idx="0">
+            <a:schemeClr val="dk1"/>
+          </a:fillRef>
+          <a:effectRef idx="0">
+            <a:schemeClr val="dk1"/>
+          </a:effectRef>
+          <a:fontRef idx="minor">
+            <a:schemeClr val="tx1"/>
+          </a:fontRef>
+        </p:style>
+      </p:cxnSp>
+      <p:sp>
+        <p:nvSpPr>
+          <p:cNvPr id="29" name="TextBox 28"/>
+          <p:cNvSpPr txBox="1"/>
+          <p:nvPr/>
+        </p:nvSpPr>
+        <p:spPr>
+          <a:xfrm>
+            <a:off x="3267775" y="3761281"/>
+            <a:ext cx="2157663" cy="261610"/>
+          </a:xfrm>
+          <a:prstGeom prst="rect">
+            <a:avLst/>
+          </a:prstGeom>
+          <a:noFill/>
+        </p:spPr>
+        <p:txBody>
+          <a:bodyPr wrap="square" rtlCol="0">
+            <a:spAutoFit/>
+          </a:bodyPr>
+          <a:lstStyle/>
+          <a:p>
+            <a:r>
+              <a:rPr lang="en-US" sz="1100" dirty="0" smtClean="0"/>
+              <a:t> 4. Plc state feed back</a:t>
+            </a:r>
+            <a:endParaRPr lang="en-SG" sz="1100" dirty="0"/>
+          </a:p>
+        </p:txBody>
+      </p:sp>
+      <p:sp>
+        <p:nvSpPr>
+          <p:cNvPr id="32" name="Rectangle 31"/>
+          <p:cNvSpPr/>
+          <p:nvPr/>
+        </p:nvSpPr>
+        <p:spPr>
+          <a:xfrm>
+            <a:off x="5005137" y="4655881"/>
+            <a:ext cx="1459834" cy="1108691"/>
+          </a:xfrm>
+          <a:prstGeom prst="rect">
+            <a:avLst/>
+          </a:prstGeom>
+          <a:ln>
+            <a:prstDash val="sysDot"/>
+          </a:ln>
+        </p:spPr>
+        <p:style>
+          <a:lnRef idx="2">
+            <a:schemeClr val="dk1"/>
+          </a:lnRef>
+          <a:fillRef idx="1">
+            <a:schemeClr val="lt1"/>
+          </a:fillRef>
+          <a:effectRef idx="0">
+            <a:schemeClr val="dk1"/>
+          </a:effectRef>
+          <a:fontRef idx="minor">
+            <a:schemeClr val="dk1"/>
+          </a:fontRef>
+        </p:style>
+        <p:txBody>
+          <a:bodyPr rtlCol="0" anchor="ctr"/>
+          <a:lstStyle/>
+          <a:p>
+            <a:pPr algn="ctr"/>
+            <a:endParaRPr lang="en-SG" dirty="0"/>
+          </a:p>
+        </p:txBody>
+      </p:sp>
+      <p:sp>
+        <p:nvSpPr>
+          <p:cNvPr id="33" name="TextBox 32"/>
+          <p:cNvSpPr txBox="1"/>
+          <p:nvPr/>
+        </p:nvSpPr>
+        <p:spPr>
+          <a:xfrm>
+            <a:off x="5022785" y="4726043"/>
+            <a:ext cx="1809552" cy="523220"/>
+          </a:xfrm>
+          <a:prstGeom prst="rect">
+            <a:avLst/>
+          </a:prstGeom>
+          <a:noFill/>
+        </p:spPr>
+        <p:txBody>
+          <a:bodyPr wrap="square" rtlCol="0">
+            <a:spAutoFit/>
+          </a:bodyPr>
+          <a:lstStyle/>
+          <a:p>
+            <a:r>
+              <a:rPr lang="en-US" sz="1400" dirty="0" err="1" smtClean="0"/>
+              <a:t>Respbarry</a:t>
+            </a:r>
+            <a:r>
+              <a:rPr lang="en-US" sz="1400" dirty="0" smtClean="0"/>
+              <a:t> PI</a:t>
+            </a:r>
+          </a:p>
+          <a:p>
+            <a:r>
+              <a:rPr lang="en-US" sz="1400" dirty="0" smtClean="0"/>
+              <a:t>192.168.10.234</a:t>
+            </a:r>
+            <a:endParaRPr lang="en-SG" sz="1400" dirty="0"/>
+          </a:p>
+        </p:txBody>
+      </p:sp>
+      <p:cxnSp>
+        <p:nvCxnSpPr>
+          <p:cNvPr id="35" name="Elbow Connector 34"/>
+          <p:cNvCxnSpPr>
+            <a:endCxn id="32" idx="0"/>
+          </p:cNvCxnSpPr>
+          <p:nvPr/>
+        </p:nvCxnSpPr>
+        <p:spPr>
+          <a:xfrm>
+            <a:off x="3030354" y="3084929"/>
+            <a:ext cx="2704700" cy="1570952"/>
+          </a:xfrm>
+          <a:prstGeom prst="bentConnector2">
+            <a:avLst/>
+          </a:prstGeom>
+          <a:ln>
+            <a:tailEnd type="triangle"/>
+          </a:ln>
+        </p:spPr>
+        <p:style>
+          <a:lnRef idx="1">
+            <a:schemeClr val="accent1"/>
+          </a:lnRef>
+          <a:fillRef idx="0">
+            <a:schemeClr val="accent1"/>
+          </a:fillRef>
+          <a:effectRef idx="0">
+            <a:schemeClr val="accent1"/>
+          </a:effectRef>
+          <a:fontRef idx="minor">
+            <a:schemeClr val="tx1"/>
+          </a:fontRef>
+        </p:style>
+      </p:cxnSp>
+    </p:spTree>
+    <p:extLst>
+      <p:ext uri="{BB962C8B-B14F-4D97-AF65-F5344CB8AC3E}">
+        <p14:creationId xmlns:p14="http://schemas.microsoft.com/office/powerpoint/2010/main" val="3033895605"/>
       </p:ext>
     </p:extLst>
   </p:cSld>

</xml_diff>

<commit_message>
Added the firmware flashing check part.
</commit_message>
<xml_diff>
--- a/doc/firmwaresignWF.pptx
+++ b/doc/firmwaresignWF.pptx
@@ -209,7 +209,7 @@
           <a:p>
             <a:fld id="{32DA1F5A-E23E-4D9B-B8D0-40D8909182CC}" type="datetimeFigureOut">
               <a:rPr lang="en-SG" smtClean="0"/>
-              <a:t>13/9/2019</a:t>
+              <a:t>17/9/2019</a:t>
             </a:fld>
             <a:endParaRPr lang="en-SG"/>
           </a:p>
@@ -692,7 +692,7 @@
           <a:p>
             <a:fld id="{168FC4C3-6B25-48E2-93F9-24A255A41CA9}" type="datetimeFigureOut">
               <a:rPr lang="en-SG" smtClean="0"/>
-              <a:t>13/9/2019</a:t>
+              <a:t>17/9/2019</a:t>
             </a:fld>
             <a:endParaRPr lang="en-SG"/>
           </a:p>
@@ -862,7 +862,7 @@
           <a:p>
             <a:fld id="{168FC4C3-6B25-48E2-93F9-24A255A41CA9}" type="datetimeFigureOut">
               <a:rPr lang="en-SG" smtClean="0"/>
-              <a:t>13/9/2019</a:t>
+              <a:t>17/9/2019</a:t>
             </a:fld>
             <a:endParaRPr lang="en-SG"/>
           </a:p>
@@ -1042,7 +1042,7 @@
           <a:p>
             <a:fld id="{168FC4C3-6B25-48E2-93F9-24A255A41CA9}" type="datetimeFigureOut">
               <a:rPr lang="en-SG" smtClean="0"/>
-              <a:t>13/9/2019</a:t>
+              <a:t>17/9/2019</a:t>
             </a:fld>
             <a:endParaRPr lang="en-SG"/>
           </a:p>
@@ -1212,7 +1212,7 @@
           <a:p>
             <a:fld id="{168FC4C3-6B25-48E2-93F9-24A255A41CA9}" type="datetimeFigureOut">
               <a:rPr lang="en-SG" smtClean="0"/>
-              <a:t>13/9/2019</a:t>
+              <a:t>17/9/2019</a:t>
             </a:fld>
             <a:endParaRPr lang="en-SG"/>
           </a:p>
@@ -1458,7 +1458,7 @@
           <a:p>
             <a:fld id="{168FC4C3-6B25-48E2-93F9-24A255A41CA9}" type="datetimeFigureOut">
               <a:rPr lang="en-SG" smtClean="0"/>
-              <a:t>13/9/2019</a:t>
+              <a:t>17/9/2019</a:t>
             </a:fld>
             <a:endParaRPr lang="en-SG"/>
           </a:p>
@@ -1690,7 +1690,7 @@
           <a:p>
             <a:fld id="{168FC4C3-6B25-48E2-93F9-24A255A41CA9}" type="datetimeFigureOut">
               <a:rPr lang="en-SG" smtClean="0"/>
-              <a:t>13/9/2019</a:t>
+              <a:t>17/9/2019</a:t>
             </a:fld>
             <a:endParaRPr lang="en-SG"/>
           </a:p>
@@ -2057,7 +2057,7 @@
           <a:p>
             <a:fld id="{168FC4C3-6B25-48E2-93F9-24A255A41CA9}" type="datetimeFigureOut">
               <a:rPr lang="en-SG" smtClean="0"/>
-              <a:t>13/9/2019</a:t>
+              <a:t>17/9/2019</a:t>
             </a:fld>
             <a:endParaRPr lang="en-SG"/>
           </a:p>
@@ -2175,7 +2175,7 @@
           <a:p>
             <a:fld id="{168FC4C3-6B25-48E2-93F9-24A255A41CA9}" type="datetimeFigureOut">
               <a:rPr lang="en-SG" smtClean="0"/>
-              <a:t>13/9/2019</a:t>
+              <a:t>17/9/2019</a:t>
             </a:fld>
             <a:endParaRPr lang="en-SG"/>
           </a:p>
@@ -2270,7 +2270,7 @@
           <a:p>
             <a:fld id="{168FC4C3-6B25-48E2-93F9-24A255A41CA9}" type="datetimeFigureOut">
               <a:rPr lang="en-SG" smtClean="0"/>
-              <a:t>13/9/2019</a:t>
+              <a:t>17/9/2019</a:t>
             </a:fld>
             <a:endParaRPr lang="en-SG"/>
           </a:p>
@@ -2547,7 +2547,7 @@
           <a:p>
             <a:fld id="{168FC4C3-6B25-48E2-93F9-24A255A41CA9}" type="datetimeFigureOut">
               <a:rPr lang="en-SG" smtClean="0"/>
-              <a:t>13/9/2019</a:t>
+              <a:t>17/9/2019</a:t>
             </a:fld>
             <a:endParaRPr lang="en-SG"/>
           </a:p>
@@ -2800,7 +2800,7 @@
           <a:p>
             <a:fld id="{168FC4C3-6B25-48E2-93F9-24A255A41CA9}" type="datetimeFigureOut">
               <a:rPr lang="en-SG" smtClean="0"/>
-              <a:t>13/9/2019</a:t>
+              <a:t>17/9/2019</a:t>
             </a:fld>
             <a:endParaRPr lang="en-SG"/>
           </a:p>
@@ -3013,7 +3013,7 @@
           <a:p>
             <a:fld id="{168FC4C3-6B25-48E2-93F9-24A255A41CA9}" type="datetimeFigureOut">
               <a:rPr lang="en-SG" smtClean="0"/>
-              <a:t>13/9/2019</a:t>
+              <a:t>17/9/2019</a:t>
             </a:fld>
             <a:endParaRPr lang="en-SG"/>
           </a:p>
@@ -12004,8 +12004,8 @@
         </p:nvSpPr>
         <p:spPr>
           <a:xfrm>
-            <a:off x="5005137" y="4655881"/>
-            <a:ext cx="1459834" cy="1108691"/>
+            <a:off x="5005137" y="4655882"/>
+            <a:ext cx="1459834" cy="792018"/>
           </a:xfrm>
           <a:prstGeom prst="rect">
             <a:avLst/>
@@ -12046,7 +12046,7 @@
         <p:spPr>
           <a:xfrm>
             <a:off x="5022785" y="4726043"/>
-            <a:ext cx="1809552" cy="523220"/>
+            <a:ext cx="2494546" cy="738664"/>
           </a:xfrm>
           <a:prstGeom prst="rect">
             <a:avLst/>
@@ -12061,8 +12061,19 @@
           <a:p>
             <a:r>
               <a:rPr lang="en-US" sz="1400" dirty="0" smtClean="0"/>
-              <a:t>Raspberry PI</a:t>
-            </a:r>
+              <a:t>Raspberry </a:t>
+            </a:r>
+            <a:r>
+              <a:rPr lang="en-US" sz="1400" dirty="0" smtClean="0"/>
+              <a:t>PI</a:t>
+            </a:r>
+          </a:p>
+          <a:p>
+            <a:r>
+              <a:rPr lang="en-US" sz="1400" dirty="0" smtClean="0"/>
+              <a:t>(attack device)</a:t>
+            </a:r>
+            <a:endParaRPr lang="en-US" sz="1400" dirty="0" smtClean="0"/>
           </a:p>
           <a:p>
             <a:r>
@@ -12084,7 +12095,7 @@
         <p:spPr>
           <a:xfrm>
             <a:off x="3030354" y="3084929"/>
-            <a:ext cx="2704700" cy="1570952"/>
+            <a:ext cx="2704700" cy="1570953"/>
           </a:xfrm>
           <a:prstGeom prst="bentConnector2">
             <a:avLst/>

</xml_diff>

<commit_message>
added the attack diagram.
</commit_message>
<xml_diff>
--- a/doc/firmwaresignWF.pptx
+++ b/doc/firmwaresignWF.pptx
@@ -5,7 +5,7 @@
     <p:sldMasterId id="2147483648" r:id="rId1"/>
   </p:sldMasterIdLst>
   <p:notesMasterIdLst>
-    <p:notesMasterId r:id="rId16"/>
+    <p:notesMasterId r:id="rId17"/>
   </p:notesMasterIdLst>
   <p:sldIdLst>
     <p:sldId id="256" r:id="rId2"/>
@@ -22,6 +22,7 @@
     <p:sldId id="269" r:id="rId13"/>
     <p:sldId id="265" r:id="rId14"/>
     <p:sldId id="268" r:id="rId15"/>
+    <p:sldId id="271" r:id="rId16"/>
   </p:sldIdLst>
   <p:sldSz cx="12192000" cy="6858000"/>
   <p:notesSz cx="6858000" cy="9144000"/>
@@ -210,7 +211,7 @@
           <a:p>
             <a:fld id="{32DA1F5A-E23E-4D9B-B8D0-40D8909182CC}" type="datetimeFigureOut">
               <a:rPr lang="en-SG" smtClean="0"/>
-              <a:t>17/9/2019</a:t>
+              <a:t>23/9/2019</a:t>
             </a:fld>
             <a:endParaRPr lang="en-SG"/>
           </a:p>
@@ -693,7 +694,7 @@
           <a:p>
             <a:fld id="{168FC4C3-6B25-48E2-93F9-24A255A41CA9}" type="datetimeFigureOut">
               <a:rPr lang="en-SG" smtClean="0"/>
-              <a:t>17/9/2019</a:t>
+              <a:t>23/9/2019</a:t>
             </a:fld>
             <a:endParaRPr lang="en-SG"/>
           </a:p>
@@ -863,7 +864,7 @@
           <a:p>
             <a:fld id="{168FC4C3-6B25-48E2-93F9-24A255A41CA9}" type="datetimeFigureOut">
               <a:rPr lang="en-SG" smtClean="0"/>
-              <a:t>17/9/2019</a:t>
+              <a:t>23/9/2019</a:t>
             </a:fld>
             <a:endParaRPr lang="en-SG"/>
           </a:p>
@@ -1043,7 +1044,7 @@
           <a:p>
             <a:fld id="{168FC4C3-6B25-48E2-93F9-24A255A41CA9}" type="datetimeFigureOut">
               <a:rPr lang="en-SG" smtClean="0"/>
-              <a:t>17/9/2019</a:t>
+              <a:t>23/9/2019</a:t>
             </a:fld>
             <a:endParaRPr lang="en-SG"/>
           </a:p>
@@ -1213,7 +1214,7 @@
           <a:p>
             <a:fld id="{168FC4C3-6B25-48E2-93F9-24A255A41CA9}" type="datetimeFigureOut">
               <a:rPr lang="en-SG" smtClean="0"/>
-              <a:t>17/9/2019</a:t>
+              <a:t>23/9/2019</a:t>
             </a:fld>
             <a:endParaRPr lang="en-SG"/>
           </a:p>
@@ -1459,7 +1460,7 @@
           <a:p>
             <a:fld id="{168FC4C3-6B25-48E2-93F9-24A255A41CA9}" type="datetimeFigureOut">
               <a:rPr lang="en-SG" smtClean="0"/>
-              <a:t>17/9/2019</a:t>
+              <a:t>23/9/2019</a:t>
             </a:fld>
             <a:endParaRPr lang="en-SG"/>
           </a:p>
@@ -1691,7 +1692,7 @@
           <a:p>
             <a:fld id="{168FC4C3-6B25-48E2-93F9-24A255A41CA9}" type="datetimeFigureOut">
               <a:rPr lang="en-SG" smtClean="0"/>
-              <a:t>17/9/2019</a:t>
+              <a:t>23/9/2019</a:t>
             </a:fld>
             <a:endParaRPr lang="en-SG"/>
           </a:p>
@@ -2058,7 +2059,7 @@
           <a:p>
             <a:fld id="{168FC4C3-6B25-48E2-93F9-24A255A41CA9}" type="datetimeFigureOut">
               <a:rPr lang="en-SG" smtClean="0"/>
-              <a:t>17/9/2019</a:t>
+              <a:t>23/9/2019</a:t>
             </a:fld>
             <a:endParaRPr lang="en-SG"/>
           </a:p>
@@ -2176,7 +2177,7 @@
           <a:p>
             <a:fld id="{168FC4C3-6B25-48E2-93F9-24A255A41CA9}" type="datetimeFigureOut">
               <a:rPr lang="en-SG" smtClean="0"/>
-              <a:t>17/9/2019</a:t>
+              <a:t>23/9/2019</a:t>
             </a:fld>
             <a:endParaRPr lang="en-SG"/>
           </a:p>
@@ -2271,7 +2272,7 @@
           <a:p>
             <a:fld id="{168FC4C3-6B25-48E2-93F9-24A255A41CA9}" type="datetimeFigureOut">
               <a:rPr lang="en-SG" smtClean="0"/>
-              <a:t>17/9/2019</a:t>
+              <a:t>23/9/2019</a:t>
             </a:fld>
             <a:endParaRPr lang="en-SG"/>
           </a:p>
@@ -2548,7 +2549,7 @@
           <a:p>
             <a:fld id="{168FC4C3-6B25-48E2-93F9-24A255A41CA9}" type="datetimeFigureOut">
               <a:rPr lang="en-SG" smtClean="0"/>
-              <a:t>17/9/2019</a:t>
+              <a:t>23/9/2019</a:t>
             </a:fld>
             <a:endParaRPr lang="en-SG"/>
           </a:p>
@@ -2801,7 +2802,7 @@
           <a:p>
             <a:fld id="{168FC4C3-6B25-48E2-93F9-24A255A41CA9}" type="datetimeFigureOut">
               <a:rPr lang="en-SG" smtClean="0"/>
-              <a:t>17/9/2019</a:t>
+              <a:t>23/9/2019</a:t>
             </a:fld>
             <a:endParaRPr lang="en-SG"/>
           </a:p>
@@ -3014,7 +3015,7 @@
           <a:p>
             <a:fld id="{168FC4C3-6B25-48E2-93F9-24A255A41CA9}" type="datetimeFigureOut">
               <a:rPr lang="en-SG" smtClean="0"/>
-              <a:t>17/9/2019</a:t>
+              <a:t>23/9/2019</a:t>
             </a:fld>
             <a:endParaRPr lang="en-SG"/>
           </a:p>
@@ -11795,7 +11796,7 @@
         <p:spPr>
           <a:xfrm>
             <a:off x="1333098" y="798301"/>
-            <a:ext cx="1809552" cy="523220"/>
+            <a:ext cx="1809552" cy="738664"/>
           </a:xfrm>
           <a:prstGeom prst="rect">
             <a:avLst/>
@@ -11810,7 +11811,23 @@
           <a:p>
             <a:r>
               <a:rPr lang="en-US" sz="1400" dirty="0" smtClean="0"/>
-              <a:t>HMI computer 192.168.10.21</a:t>
+              <a:t>HMI </a:t>
+            </a:r>
+            <a:r>
+              <a:rPr lang="en-US" sz="1400" dirty="0" smtClean="0"/>
+              <a:t>computer</a:t>
+            </a:r>
+          </a:p>
+          <a:p>
+            <a:r>
+              <a:rPr lang="en-US" sz="1400" dirty="0" smtClean="0"/>
+              <a:t>IP: 192.168.10.21</a:t>
+            </a:r>
+          </a:p>
+          <a:p>
+            <a:r>
+              <a:rPr lang="en-US" sz="1400" dirty="0" smtClean="0"/>
+              <a:t>Port: 502</a:t>
             </a:r>
             <a:endParaRPr lang="en-SG" sz="1400" dirty="0"/>
           </a:p>
@@ -11898,8 +11915,8 @@
         </p:nvSpPr>
         <p:spPr>
           <a:xfrm>
-            <a:off x="5239350" y="798301"/>
-            <a:ext cx="1809552" cy="523220"/>
+            <a:off x="5125453" y="788598"/>
+            <a:ext cx="1809552" cy="954107"/>
           </a:xfrm>
           <a:prstGeom prst="rect">
             <a:avLst/>
@@ -11914,13 +11931,30 @@
           <a:p>
             <a:r>
               <a:rPr lang="en-US" sz="1400" dirty="0" smtClean="0"/>
-              <a:t>PLC 1</a:t>
-            </a:r>
-          </a:p>
-          <a:p>
+              <a:t>PLC </a:t>
+            </a:r>
             <a:r>
               <a:rPr lang="en-US" sz="1400" dirty="0" smtClean="0"/>
-              <a:t>192.168.10.72</a:t>
+              <a:t>1</a:t>
+            </a:r>
+          </a:p>
+          <a:p>
+            <a:r>
+              <a:rPr lang="en-US" sz="1400" dirty="0" smtClean="0"/>
+              <a:t>(Schneider M221)</a:t>
+            </a:r>
+            <a:endParaRPr lang="en-US" sz="1400" dirty="0" smtClean="0"/>
+          </a:p>
+          <a:p>
+            <a:r>
+              <a:rPr lang="en-US" sz="1400" dirty="0" smtClean="0"/>
+              <a:t>IP: 192.168.10.72</a:t>
+            </a:r>
+          </a:p>
+          <a:p>
+            <a:r>
+              <a:rPr lang="en-US" sz="1400" dirty="0" smtClean="0"/>
+              <a:t>Port: 502</a:t>
             </a:r>
             <a:endParaRPr lang="en-SG" sz="1400" dirty="0"/>
           </a:p>
@@ -11934,7 +11968,7 @@
         </p:nvCxnSpPr>
         <p:spPr>
           <a:xfrm flipH="1" flipV="1">
-            <a:off x="2916455" y="1294300"/>
+            <a:off x="2916455" y="1252299"/>
             <a:ext cx="2088682" cy="0"/>
           </a:xfrm>
           <a:prstGeom prst="straightConnector1">
@@ -12001,7 +12035,7 @@
         </p:nvSpPr>
         <p:spPr>
           <a:xfrm>
-            <a:off x="3142650" y="1019885"/>
+            <a:off x="3142649" y="990689"/>
             <a:ext cx="2157663" cy="261610"/>
           </a:xfrm>
           <a:prstGeom prst="rect">
@@ -12031,7 +12065,7 @@
         </p:nvSpPr>
         <p:spPr>
           <a:xfrm>
-            <a:off x="3142649" y="1333519"/>
+            <a:off x="3142649" y="1295790"/>
             <a:ext cx="2157663" cy="261610"/>
           </a:xfrm>
           <a:prstGeom prst="rect">
@@ -12065,7 +12099,7 @@
         </p:nvCxnSpPr>
         <p:spPr>
           <a:xfrm flipV="1">
-            <a:off x="2916455" y="1571652"/>
+            <a:off x="2921267" y="1536965"/>
             <a:ext cx="2165684" cy="0"/>
           </a:xfrm>
           <a:prstGeom prst="straightConnector1">
@@ -12098,7 +12132,7 @@
         </p:nvCxnSpPr>
         <p:spPr>
           <a:xfrm flipH="1" flipV="1">
-            <a:off x="2889180" y="1900489"/>
+            <a:off x="2934103" y="1832494"/>
             <a:ext cx="2088682" cy="0"/>
           </a:xfrm>
           <a:prstGeom prst="straightConnector1">
@@ -12131,7 +12165,7 @@
         </p:nvSpPr>
         <p:spPr>
           <a:xfrm>
-            <a:off x="3115375" y="1626074"/>
+            <a:off x="3077881" y="1566572"/>
             <a:ext cx="2157663" cy="261610"/>
           </a:xfrm>
           <a:prstGeom prst="rect">
@@ -12196,36 +12230,6 @@
       </p:sp>
       <p:sp>
         <p:nvSpPr>
-          <p:cNvPr id="19" name="TextBox 18"/>
-          <p:cNvSpPr txBox="1"/>
-          <p:nvPr/>
-        </p:nvSpPr>
-        <p:spPr>
-          <a:xfrm>
-            <a:off x="1485498" y="2933508"/>
-            <a:ext cx="1809552" cy="523220"/>
-          </a:xfrm>
-          <a:prstGeom prst="rect">
-            <a:avLst/>
-          </a:prstGeom>
-          <a:noFill/>
-        </p:spPr>
-        <p:txBody>
-          <a:bodyPr wrap="square" rtlCol="0">
-            <a:spAutoFit/>
-          </a:bodyPr>
-          <a:lstStyle/>
-          <a:p>
-            <a:r>
-              <a:rPr lang="en-US" sz="1400" dirty="0" smtClean="0"/>
-              <a:t>HMI computer 192.168.10.21</a:t>
-            </a:r>
-            <a:endParaRPr lang="en-SG" sz="1400" dirty="0"/>
-          </a:p>
-        </p:txBody>
-      </p:sp>
-      <p:sp>
-        <p:nvSpPr>
           <p:cNvPr id="21" name="Rectangle 20"/>
           <p:cNvSpPr/>
           <p:nvPr/>
@@ -12262,42 +12266,6 @@
           <a:p>
             <a:pPr algn="ctr"/>
             <a:endParaRPr lang="en-SG" dirty="0"/>
-          </a:p>
-        </p:txBody>
-      </p:sp>
-      <p:sp>
-        <p:nvSpPr>
-          <p:cNvPr id="22" name="TextBox 21"/>
-          <p:cNvSpPr txBox="1"/>
-          <p:nvPr/>
-        </p:nvSpPr>
-        <p:spPr>
-          <a:xfrm>
-            <a:off x="9861083" y="3028172"/>
-            <a:ext cx="1809552" cy="523220"/>
-          </a:xfrm>
-          <a:prstGeom prst="rect">
-            <a:avLst/>
-          </a:prstGeom>
-          <a:noFill/>
-        </p:spPr>
-        <p:txBody>
-          <a:bodyPr wrap="square" rtlCol="0">
-            <a:spAutoFit/>
-          </a:bodyPr>
-          <a:lstStyle/>
-          <a:p>
-            <a:r>
-              <a:rPr lang="en-US" sz="1400" dirty="0" smtClean="0"/>
-              <a:t>PLC 1</a:t>
-            </a:r>
-          </a:p>
-          <a:p>
-            <a:r>
-              <a:rPr lang="en-US" sz="1400" dirty="0" smtClean="0"/>
-              <a:t>192.168.10.72</a:t>
-            </a:r>
-            <a:endParaRPr lang="en-SG" sz="1400" dirty="0"/>
           </a:p>
         </p:txBody>
       </p:sp>
@@ -12477,94 +12445,6 @@
           </a:fontRef>
         </p:style>
       </p:cxnSp>
-      <p:sp>
-        <p:nvSpPr>
-          <p:cNvPr id="32" name="Rectangle 31"/>
-          <p:cNvSpPr/>
-          <p:nvPr/>
-        </p:nvSpPr>
-        <p:spPr>
-          <a:xfrm>
-            <a:off x="5005137" y="4655882"/>
-            <a:ext cx="1459834" cy="792018"/>
-          </a:xfrm>
-          <a:prstGeom prst="rect">
-            <a:avLst/>
-          </a:prstGeom>
-          <a:ln>
-            <a:prstDash val="sysDot"/>
-          </a:ln>
-        </p:spPr>
-        <p:style>
-          <a:lnRef idx="2">
-            <a:schemeClr val="dk1"/>
-          </a:lnRef>
-          <a:fillRef idx="1">
-            <a:schemeClr val="lt1"/>
-          </a:fillRef>
-          <a:effectRef idx="0">
-            <a:schemeClr val="dk1"/>
-          </a:effectRef>
-          <a:fontRef idx="minor">
-            <a:schemeClr val="dk1"/>
-          </a:fontRef>
-        </p:style>
-        <p:txBody>
-          <a:bodyPr rtlCol="0" anchor="ctr"/>
-          <a:lstStyle/>
-          <a:p>
-            <a:pPr algn="ctr"/>
-            <a:endParaRPr lang="en-SG" dirty="0"/>
-          </a:p>
-        </p:txBody>
-      </p:sp>
-      <p:sp>
-        <p:nvSpPr>
-          <p:cNvPr id="33" name="TextBox 32"/>
-          <p:cNvSpPr txBox="1"/>
-          <p:nvPr/>
-        </p:nvSpPr>
-        <p:spPr>
-          <a:xfrm>
-            <a:off x="5022785" y="4726043"/>
-            <a:ext cx="2494546" cy="738664"/>
-          </a:xfrm>
-          <a:prstGeom prst="rect">
-            <a:avLst/>
-          </a:prstGeom>
-          <a:noFill/>
-        </p:spPr>
-        <p:txBody>
-          <a:bodyPr wrap="square" rtlCol="0">
-            <a:spAutoFit/>
-          </a:bodyPr>
-          <a:lstStyle/>
-          <a:p>
-            <a:r>
-              <a:rPr lang="en-US" sz="1400" dirty="0" smtClean="0"/>
-              <a:t>Raspberry </a:t>
-            </a:r>
-            <a:r>
-              <a:rPr lang="en-US" sz="1400" dirty="0" smtClean="0"/>
-              <a:t>PI</a:t>
-            </a:r>
-          </a:p>
-          <a:p>
-            <a:r>
-              <a:rPr lang="en-US" sz="1400" dirty="0" smtClean="0"/>
-              <a:t>(attack device)</a:t>
-            </a:r>
-            <a:endParaRPr lang="en-US" sz="1400" dirty="0" smtClean="0"/>
-          </a:p>
-          <a:p>
-            <a:r>
-              <a:rPr lang="en-US" sz="1400" dirty="0" smtClean="0"/>
-              <a:t>192.168.10.234</a:t>
-            </a:r>
-            <a:endParaRPr lang="en-SG" sz="1400" dirty="0"/>
-          </a:p>
-        </p:txBody>
-      </p:sp>
       <p:cxnSp>
         <p:nvCxnSpPr>
           <p:cNvPr id="35" name="Elbow Connector 34"/>
@@ -12576,7 +12456,7 @@
         <p:spPr>
           <a:xfrm>
             <a:off x="3030354" y="3084929"/>
-            <a:ext cx="2704700" cy="1570953"/>
+            <a:ext cx="2704700" cy="1553929"/>
           </a:xfrm>
           <a:prstGeom prst="bentConnector2">
             <a:avLst/>
@@ -12649,8 +12529,8 @@
         </p:nvSpPr>
         <p:spPr>
           <a:xfrm>
-            <a:off x="6439303" y="2814808"/>
-            <a:ext cx="3447450" cy="261610"/>
+            <a:off x="6144126" y="2814808"/>
+            <a:ext cx="3742627" cy="261610"/>
           </a:xfrm>
           <a:prstGeom prst="rect">
             <a:avLst/>
@@ -12665,7 +12545,15 @@
           <a:p>
             <a:r>
               <a:rPr lang="en-US" sz="1100" dirty="0" smtClean="0"/>
-              <a:t>1. Plc coil change </a:t>
+              <a:t>1. </a:t>
+            </a:r>
+            <a:r>
+              <a:rPr lang="en-US" sz="1100" dirty="0" smtClean="0"/>
+              <a:t> False Plc </a:t>
+            </a:r>
+            <a:r>
+              <a:rPr lang="en-US" sz="1100" dirty="0" smtClean="0"/>
+              <a:t>coil change </a:t>
             </a:r>
             <a:r>
               <a:rPr lang="en-US" sz="1100" dirty="0" err="1" smtClean="0"/>
@@ -12738,7 +12626,7 @@
         </p:nvSpPr>
         <p:spPr>
           <a:xfrm>
-            <a:off x="6381546" y="4001963"/>
+            <a:off x="6120465" y="3963740"/>
             <a:ext cx="3766288" cy="261610"/>
           </a:xfrm>
           <a:prstGeom prst="rect">
@@ -12781,7 +12669,7 @@
           </a:xfrm>
           <a:prstGeom prst="bentConnector3">
             <a:avLst>
-              <a:gd name="adj1" fmla="val 661"/>
+              <a:gd name="adj1" fmla="val -13436"/>
             </a:avLst>
           </a:prstGeom>
           <a:ln>
@@ -12827,7 +12715,15 @@
           <a:p>
             <a:r>
               <a:rPr lang="en-US" sz="1100" dirty="0" smtClean="0"/>
-              <a:t> 4. Plc state </a:t>
+              <a:t> 4. </a:t>
+            </a:r>
+            <a:r>
+              <a:rPr lang="en-US" sz="1100" dirty="0" smtClean="0"/>
+              <a:t>False Plc </a:t>
+            </a:r>
+            <a:r>
+              <a:rPr lang="en-US" sz="1100" dirty="0" smtClean="0"/>
+              <a:t>state </a:t>
             </a:r>
             <a:r>
               <a:rPr lang="en-US" sz="1100" dirty="0"/>
@@ -12871,8 +12767,8 @@
         </p:nvSpPr>
         <p:spPr>
           <a:xfrm>
-            <a:off x="1133374" y="263302"/>
-            <a:ext cx="1590576" cy="369332"/>
+            <a:off x="1133373" y="263302"/>
+            <a:ext cx="3871764" cy="369332"/>
           </a:xfrm>
           <a:prstGeom prst="rect">
             <a:avLst/>
@@ -12887,7 +12783,11 @@
           <a:p>
             <a:r>
               <a:rPr lang="en-US" dirty="0" smtClean="0"/>
-              <a:t>Normal control</a:t>
+              <a:t>Normal </a:t>
+            </a:r>
+            <a:r>
+              <a:rPr lang="en-US" dirty="0" smtClean="0"/>
+              <a:t>HMI-PLC control sequence </a:t>
             </a:r>
             <a:endParaRPr lang="en-SG" dirty="0"/>
           </a:p>
@@ -12917,9 +12817,206 @@
           <a:p>
             <a:r>
               <a:rPr lang="en-US" dirty="0" smtClean="0"/>
-              <a:t>After man in the mid attack</a:t>
+              <a:t>After </a:t>
+            </a:r>
+            <a:r>
+              <a:rPr lang="en-US" dirty="0" smtClean="0"/>
+              <a:t>false data </a:t>
+            </a:r>
+            <a:r>
+              <a:rPr lang="en-US" dirty="0" smtClean="0"/>
+              <a:t>injection </a:t>
+            </a:r>
+            <a:r>
+              <a:rPr lang="en-US" dirty="0" smtClean="0"/>
+              <a:t>attack</a:t>
             </a:r>
             <a:endParaRPr lang="en-SG" dirty="0"/>
+          </a:p>
+        </p:txBody>
+      </p:sp>
+      <p:sp>
+        <p:nvSpPr>
+          <p:cNvPr id="36" name="TextBox 35"/>
+          <p:cNvSpPr txBox="1"/>
+          <p:nvPr/>
+        </p:nvSpPr>
+        <p:spPr>
+          <a:xfrm>
+            <a:off x="1369996" y="2945613"/>
+            <a:ext cx="1809552" cy="738664"/>
+          </a:xfrm>
+          <a:prstGeom prst="rect">
+            <a:avLst/>
+          </a:prstGeom>
+          <a:noFill/>
+        </p:spPr>
+        <p:txBody>
+          <a:bodyPr wrap="square" rtlCol="0">
+            <a:spAutoFit/>
+          </a:bodyPr>
+          <a:lstStyle/>
+          <a:p>
+            <a:r>
+              <a:rPr lang="en-US" sz="1400" dirty="0" smtClean="0"/>
+              <a:t>HMI </a:t>
+            </a:r>
+            <a:r>
+              <a:rPr lang="en-US" sz="1400" dirty="0" smtClean="0"/>
+              <a:t>computer</a:t>
+            </a:r>
+          </a:p>
+          <a:p>
+            <a:r>
+              <a:rPr lang="en-US" sz="1400" dirty="0" smtClean="0"/>
+              <a:t>IP: 192.168.10.21</a:t>
+            </a:r>
+          </a:p>
+          <a:p>
+            <a:r>
+              <a:rPr lang="en-US" sz="1400" dirty="0" smtClean="0"/>
+              <a:t>Port: 502</a:t>
+            </a:r>
+            <a:endParaRPr lang="en-SG" sz="1400" dirty="0"/>
+          </a:p>
+        </p:txBody>
+      </p:sp>
+      <p:sp>
+        <p:nvSpPr>
+          <p:cNvPr id="38" name="TextBox 37"/>
+          <p:cNvSpPr txBox="1"/>
+          <p:nvPr/>
+        </p:nvSpPr>
+        <p:spPr>
+          <a:xfrm>
+            <a:off x="9886753" y="2939648"/>
+            <a:ext cx="1809552" cy="954107"/>
+          </a:xfrm>
+          <a:prstGeom prst="rect">
+            <a:avLst/>
+          </a:prstGeom>
+          <a:noFill/>
+        </p:spPr>
+        <p:txBody>
+          <a:bodyPr wrap="square" rtlCol="0">
+            <a:spAutoFit/>
+          </a:bodyPr>
+          <a:lstStyle/>
+          <a:p>
+            <a:r>
+              <a:rPr lang="en-US" sz="1400" dirty="0" smtClean="0"/>
+              <a:t>PLC </a:t>
+            </a:r>
+            <a:r>
+              <a:rPr lang="en-US" sz="1400" dirty="0" smtClean="0"/>
+              <a:t>1</a:t>
+            </a:r>
+          </a:p>
+          <a:p>
+            <a:r>
+              <a:rPr lang="en-US" sz="1400" dirty="0" smtClean="0"/>
+              <a:t>(Schneider M221)</a:t>
+            </a:r>
+            <a:endParaRPr lang="en-US" sz="1400" dirty="0" smtClean="0"/>
+          </a:p>
+          <a:p>
+            <a:r>
+              <a:rPr lang="en-US" sz="1400" dirty="0" smtClean="0"/>
+              <a:t>IP: 192.168.10.72</a:t>
+            </a:r>
+          </a:p>
+          <a:p>
+            <a:r>
+              <a:rPr lang="en-US" sz="1400" dirty="0" smtClean="0"/>
+              <a:t>Port: 502</a:t>
+            </a:r>
+            <a:endParaRPr lang="en-SG" sz="1400" dirty="0"/>
+          </a:p>
+        </p:txBody>
+      </p:sp>
+      <p:sp>
+        <p:nvSpPr>
+          <p:cNvPr id="32" name="Rectangle 31"/>
+          <p:cNvSpPr/>
+          <p:nvPr/>
+        </p:nvSpPr>
+        <p:spPr>
+          <a:xfrm>
+            <a:off x="5005137" y="4638858"/>
+            <a:ext cx="1459834" cy="809042"/>
+          </a:xfrm>
+          <a:prstGeom prst="rect">
+            <a:avLst/>
+          </a:prstGeom>
+          <a:solidFill>
+            <a:schemeClr val="bg1"/>
+          </a:solidFill>
+          <a:ln>
+            <a:prstDash val="sysDot"/>
+          </a:ln>
+        </p:spPr>
+        <p:style>
+          <a:lnRef idx="2">
+            <a:schemeClr val="dk1"/>
+          </a:lnRef>
+          <a:fillRef idx="1">
+            <a:schemeClr val="lt1"/>
+          </a:fillRef>
+          <a:effectRef idx="0">
+            <a:schemeClr val="dk1"/>
+          </a:effectRef>
+          <a:fontRef idx="minor">
+            <a:schemeClr val="dk1"/>
+          </a:fontRef>
+        </p:style>
+        <p:txBody>
+          <a:bodyPr rtlCol="0" anchor="ctr"/>
+          <a:lstStyle/>
+          <a:p>
+            <a:pPr algn="ctr"/>
+            <a:endParaRPr lang="en-SG" dirty="0"/>
+          </a:p>
+        </p:txBody>
+      </p:sp>
+      <p:sp>
+        <p:nvSpPr>
+          <p:cNvPr id="33" name="TextBox 32"/>
+          <p:cNvSpPr txBox="1"/>
+          <p:nvPr/>
+        </p:nvSpPr>
+        <p:spPr>
+          <a:xfrm>
+            <a:off x="5104599" y="4705099"/>
+            <a:ext cx="2494546" cy="738664"/>
+          </a:xfrm>
+          <a:prstGeom prst="rect">
+            <a:avLst/>
+          </a:prstGeom>
+          <a:noFill/>
+        </p:spPr>
+        <p:txBody>
+          <a:bodyPr wrap="square" rtlCol="0">
+            <a:spAutoFit/>
+          </a:bodyPr>
+          <a:lstStyle/>
+          <a:p>
+            <a:r>
+              <a:rPr lang="en-US" sz="1400" dirty="0" smtClean="0"/>
+              <a:t>Raspberry PI</a:t>
+            </a:r>
+          </a:p>
+          <a:p>
+            <a:r>
+              <a:rPr lang="en-US" sz="1400" dirty="0" smtClean="0"/>
+              <a:t>(attack device)</a:t>
+            </a:r>
+          </a:p>
+          <a:p>
+            <a:r>
+              <a:rPr lang="en-US" sz="1400" dirty="0" smtClean="0"/>
+              <a:t>192.168.10.234</a:t>
+            </a:r>
+            <a:endParaRPr lang="en-SG" sz="1400" dirty="0"/>
           </a:p>
         </p:txBody>
       </p:sp>
@@ -12927,6 +13024,1396 @@
     <p:extLst>
       <p:ext uri="{BB962C8B-B14F-4D97-AF65-F5344CB8AC3E}">
         <p14:creationId xmlns:p14="http://schemas.microsoft.com/office/powerpoint/2010/main" val="3033895605"/>
+      </p:ext>
+    </p:extLst>
+  </p:cSld>
+  <p:clrMapOvr>
+    <a:masterClrMapping/>
+  </p:clrMapOvr>
+</p:sld>
+</file>
+
+<file path=ppt/slides/slide15.xml><?xml version="1.0" encoding="utf-8"?>
+<p:sld xmlns:a="http://schemas.openxmlformats.org/drawingml/2006/main" xmlns:r="http://schemas.openxmlformats.org/officeDocument/2006/relationships" xmlns:p="http://schemas.openxmlformats.org/presentationml/2006/main">
+  <p:cSld>
+    <p:spTree>
+      <p:nvGrpSpPr>
+        <p:cNvPr id="1" name=""/>
+        <p:cNvGrpSpPr/>
+        <p:nvPr/>
+      </p:nvGrpSpPr>
+      <p:grpSpPr>
+        <a:xfrm>
+          <a:off x="0" y="0"/>
+          <a:ext cx="0" cy="0"/>
+          <a:chOff x="0" y="0"/>
+          <a:chExt cx="0" cy="0"/>
+        </a:xfrm>
+      </p:grpSpPr>
+      <p:sp>
+        <p:nvSpPr>
+          <p:cNvPr id="4" name="Rectangle 3"/>
+          <p:cNvSpPr/>
+          <p:nvPr/>
+        </p:nvSpPr>
+        <p:spPr>
+          <a:xfrm>
+            <a:off x="1222408" y="797110"/>
+            <a:ext cx="1655546" cy="1108691"/>
+          </a:xfrm>
+          <a:prstGeom prst="rect">
+            <a:avLst/>
+          </a:prstGeom>
+          <a:ln>
+            <a:prstDash val="sysDot"/>
+          </a:ln>
+        </p:spPr>
+        <p:style>
+          <a:lnRef idx="2">
+            <a:schemeClr val="dk1"/>
+          </a:lnRef>
+          <a:fillRef idx="1">
+            <a:schemeClr val="lt1"/>
+          </a:fillRef>
+          <a:effectRef idx="0">
+            <a:schemeClr val="dk1"/>
+          </a:effectRef>
+          <a:fontRef idx="minor">
+            <a:schemeClr val="dk1"/>
+          </a:fontRef>
+        </p:style>
+        <p:txBody>
+          <a:bodyPr rtlCol="0" anchor="ctr"/>
+          <a:lstStyle/>
+          <a:p>
+            <a:pPr algn="ctr"/>
+            <a:endParaRPr lang="en-SG" dirty="0"/>
+          </a:p>
+        </p:txBody>
+      </p:sp>
+      <p:sp>
+        <p:nvSpPr>
+          <p:cNvPr id="5" name="TextBox 4"/>
+          <p:cNvSpPr txBox="1"/>
+          <p:nvPr/>
+        </p:nvSpPr>
+        <p:spPr>
+          <a:xfrm>
+            <a:off x="1333098" y="798301"/>
+            <a:ext cx="1809552" cy="738664"/>
+          </a:xfrm>
+          <a:prstGeom prst="rect">
+            <a:avLst/>
+          </a:prstGeom>
+          <a:noFill/>
+        </p:spPr>
+        <p:txBody>
+          <a:bodyPr wrap="square" rtlCol="0">
+            <a:spAutoFit/>
+          </a:bodyPr>
+          <a:lstStyle/>
+          <a:p>
+            <a:r>
+              <a:rPr lang="en-US" sz="1400" dirty="0" smtClean="0"/>
+              <a:t>HMI </a:t>
+            </a:r>
+            <a:r>
+              <a:rPr lang="en-US" sz="1400" dirty="0" smtClean="0"/>
+              <a:t>computer</a:t>
+            </a:r>
+          </a:p>
+          <a:p>
+            <a:r>
+              <a:rPr lang="en-US" sz="1400" dirty="0" smtClean="0"/>
+              <a:t>IP: 192.168.10.21</a:t>
+            </a:r>
+          </a:p>
+          <a:p>
+            <a:r>
+              <a:rPr lang="en-US" sz="1400" dirty="0" smtClean="0"/>
+              <a:t>Port: 502</a:t>
+            </a:r>
+            <a:endParaRPr lang="en-SG" sz="1400" dirty="0"/>
+          </a:p>
+        </p:txBody>
+      </p:sp>
+      <p:cxnSp>
+        <p:nvCxnSpPr>
+          <p:cNvPr id="7" name="Straight Arrow Connector 6"/>
+          <p:cNvCxnSpPr/>
+          <p:nvPr/>
+        </p:nvCxnSpPr>
+        <p:spPr>
+          <a:xfrm flipV="1">
+            <a:off x="2877954" y="962526"/>
+            <a:ext cx="2165684" cy="0"/>
+          </a:xfrm>
+          <a:prstGeom prst="straightConnector1">
+            <a:avLst/>
+          </a:prstGeom>
+          <a:ln>
+            <a:tailEnd type="triangle"/>
+          </a:ln>
+        </p:spPr>
+        <p:style>
+          <a:lnRef idx="1">
+            <a:schemeClr val="dk1"/>
+          </a:lnRef>
+          <a:fillRef idx="0">
+            <a:schemeClr val="dk1"/>
+          </a:fillRef>
+          <a:effectRef idx="0">
+            <a:schemeClr val="dk1"/>
+          </a:effectRef>
+          <a:fontRef idx="minor">
+            <a:schemeClr val="tx1"/>
+          </a:fontRef>
+        </p:style>
+      </p:cxnSp>
+      <p:sp>
+        <p:nvSpPr>
+          <p:cNvPr id="8" name="Rectangle 7"/>
+          <p:cNvSpPr/>
+          <p:nvPr/>
+        </p:nvSpPr>
+        <p:spPr>
+          <a:xfrm>
+            <a:off x="5128660" y="797110"/>
+            <a:ext cx="1459834" cy="1108691"/>
+          </a:xfrm>
+          <a:prstGeom prst="rect">
+            <a:avLst/>
+          </a:prstGeom>
+          <a:ln>
+            <a:prstDash val="sysDot"/>
+          </a:ln>
+        </p:spPr>
+        <p:style>
+          <a:lnRef idx="2">
+            <a:schemeClr val="dk1"/>
+          </a:lnRef>
+          <a:fillRef idx="1">
+            <a:schemeClr val="lt1"/>
+          </a:fillRef>
+          <a:effectRef idx="0">
+            <a:schemeClr val="dk1"/>
+          </a:effectRef>
+          <a:fontRef idx="minor">
+            <a:schemeClr val="dk1"/>
+          </a:fontRef>
+        </p:style>
+        <p:txBody>
+          <a:bodyPr rtlCol="0" anchor="ctr"/>
+          <a:lstStyle/>
+          <a:p>
+            <a:pPr algn="ctr"/>
+            <a:endParaRPr lang="en-SG" dirty="0"/>
+          </a:p>
+        </p:txBody>
+      </p:sp>
+      <p:sp>
+        <p:nvSpPr>
+          <p:cNvPr id="9" name="TextBox 8"/>
+          <p:cNvSpPr txBox="1"/>
+          <p:nvPr/>
+        </p:nvSpPr>
+        <p:spPr>
+          <a:xfrm>
+            <a:off x="5125453" y="788598"/>
+            <a:ext cx="1809552" cy="954107"/>
+          </a:xfrm>
+          <a:prstGeom prst="rect">
+            <a:avLst/>
+          </a:prstGeom>
+          <a:noFill/>
+        </p:spPr>
+        <p:txBody>
+          <a:bodyPr wrap="square" rtlCol="0">
+            <a:spAutoFit/>
+          </a:bodyPr>
+          <a:lstStyle/>
+          <a:p>
+            <a:r>
+              <a:rPr lang="en-US" sz="1400" dirty="0" smtClean="0"/>
+              <a:t>PLC </a:t>
+            </a:r>
+            <a:r>
+              <a:rPr lang="en-US" sz="1400" dirty="0" smtClean="0"/>
+              <a:t>1</a:t>
+            </a:r>
+          </a:p>
+          <a:p>
+            <a:r>
+              <a:rPr lang="en-US" sz="1400" dirty="0" smtClean="0"/>
+              <a:t>(Schneider M221)</a:t>
+            </a:r>
+            <a:endParaRPr lang="en-US" sz="1400" dirty="0" smtClean="0"/>
+          </a:p>
+          <a:p>
+            <a:r>
+              <a:rPr lang="en-US" sz="1400" dirty="0" smtClean="0"/>
+              <a:t>IP: 192.168.10.72</a:t>
+            </a:r>
+          </a:p>
+          <a:p>
+            <a:r>
+              <a:rPr lang="en-US" sz="1400" dirty="0" smtClean="0"/>
+              <a:t>Port: 502</a:t>
+            </a:r>
+            <a:endParaRPr lang="en-SG" sz="1400" dirty="0"/>
+          </a:p>
+        </p:txBody>
+      </p:sp>
+      <p:cxnSp>
+        <p:nvCxnSpPr>
+          <p:cNvPr id="11" name="Straight Arrow Connector 10"/>
+          <p:cNvCxnSpPr/>
+          <p:nvPr/>
+        </p:nvCxnSpPr>
+        <p:spPr>
+          <a:xfrm flipH="1" flipV="1">
+            <a:off x="2916455" y="1252299"/>
+            <a:ext cx="2088682" cy="0"/>
+          </a:xfrm>
+          <a:prstGeom prst="straightConnector1">
+            <a:avLst/>
+          </a:prstGeom>
+          <a:ln>
+            <a:tailEnd type="triangle"/>
+          </a:ln>
+        </p:spPr>
+        <p:style>
+          <a:lnRef idx="1">
+            <a:schemeClr val="dk1"/>
+          </a:lnRef>
+          <a:fillRef idx="0">
+            <a:schemeClr val="dk1"/>
+          </a:fillRef>
+          <a:effectRef idx="0">
+            <a:schemeClr val="dk1"/>
+          </a:effectRef>
+          <a:fontRef idx="minor">
+            <a:schemeClr val="tx1"/>
+          </a:fontRef>
+        </p:style>
+      </p:cxnSp>
+      <p:sp>
+        <p:nvSpPr>
+          <p:cNvPr id="12" name="TextBox 11"/>
+          <p:cNvSpPr txBox="1"/>
+          <p:nvPr/>
+        </p:nvSpPr>
+        <p:spPr>
+          <a:xfrm>
+            <a:off x="3142650" y="688112"/>
+            <a:ext cx="2157663" cy="261610"/>
+          </a:xfrm>
+          <a:prstGeom prst="rect">
+            <a:avLst/>
+          </a:prstGeom>
+          <a:noFill/>
+        </p:spPr>
+        <p:txBody>
+          <a:bodyPr wrap="square" rtlCol="0">
+            <a:spAutoFit/>
+          </a:bodyPr>
+          <a:lstStyle/>
+          <a:p>
+            <a:r>
+              <a:rPr lang="en-US" sz="1100" dirty="0" smtClean="0"/>
+              <a:t>1. Plc coil change </a:t>
+            </a:r>
+            <a:r>
+              <a:rPr lang="en-US" sz="1100" dirty="0" err="1" smtClean="0"/>
+              <a:t>cmd</a:t>
+            </a:r>
+            <a:endParaRPr lang="en-SG" sz="1100" dirty="0"/>
+          </a:p>
+        </p:txBody>
+      </p:sp>
+      <p:sp>
+        <p:nvSpPr>
+          <p:cNvPr id="13" name="TextBox 12"/>
+          <p:cNvSpPr txBox="1"/>
+          <p:nvPr/>
+        </p:nvSpPr>
+        <p:spPr>
+          <a:xfrm>
+            <a:off x="3142649" y="990689"/>
+            <a:ext cx="2157663" cy="261610"/>
+          </a:xfrm>
+          <a:prstGeom prst="rect">
+            <a:avLst/>
+          </a:prstGeom>
+          <a:noFill/>
+        </p:spPr>
+        <p:txBody>
+          <a:bodyPr wrap="square" rtlCol="0">
+            <a:spAutoFit/>
+          </a:bodyPr>
+          <a:lstStyle/>
+          <a:p>
+            <a:r>
+              <a:rPr lang="en-US" sz="1100" dirty="0" smtClean="0"/>
+              <a:t>2. Plc coil change feed back</a:t>
+            </a:r>
+            <a:endParaRPr lang="en-SG" sz="1100" dirty="0"/>
+          </a:p>
+        </p:txBody>
+      </p:sp>
+      <p:sp>
+        <p:nvSpPr>
+          <p:cNvPr id="14" name="TextBox 13"/>
+          <p:cNvSpPr txBox="1"/>
+          <p:nvPr/>
+        </p:nvSpPr>
+        <p:spPr>
+          <a:xfrm>
+            <a:off x="3142649" y="1295790"/>
+            <a:ext cx="2157663" cy="261610"/>
+          </a:xfrm>
+          <a:prstGeom prst="rect">
+            <a:avLst/>
+          </a:prstGeom>
+          <a:noFill/>
+        </p:spPr>
+        <p:txBody>
+          <a:bodyPr wrap="square" rtlCol="0">
+            <a:spAutoFit/>
+          </a:bodyPr>
+          <a:lstStyle/>
+          <a:p>
+            <a:r>
+              <a:rPr lang="en-US" sz="1100" dirty="0" smtClean="0"/>
+              <a:t>3. Plc state read </a:t>
+            </a:r>
+            <a:r>
+              <a:rPr lang="en-US" sz="1100" dirty="0" err="1" smtClean="0"/>
+              <a:t>cmd</a:t>
+            </a:r>
+            <a:endParaRPr lang="en-SG" sz="1100" dirty="0"/>
+          </a:p>
+        </p:txBody>
+      </p:sp>
+      <p:cxnSp>
+        <p:nvCxnSpPr>
+          <p:cNvPr id="15" name="Straight Arrow Connector 14"/>
+          <p:cNvCxnSpPr/>
+          <p:nvPr/>
+        </p:nvCxnSpPr>
+        <p:spPr>
+          <a:xfrm flipV="1">
+            <a:off x="2921267" y="1536965"/>
+            <a:ext cx="2165684" cy="0"/>
+          </a:xfrm>
+          <a:prstGeom prst="straightConnector1">
+            <a:avLst/>
+          </a:prstGeom>
+          <a:ln>
+            <a:tailEnd type="triangle"/>
+          </a:ln>
+        </p:spPr>
+        <p:style>
+          <a:lnRef idx="1">
+            <a:schemeClr val="dk1"/>
+          </a:lnRef>
+          <a:fillRef idx="0">
+            <a:schemeClr val="dk1"/>
+          </a:fillRef>
+          <a:effectRef idx="0">
+            <a:schemeClr val="dk1"/>
+          </a:effectRef>
+          <a:fontRef idx="minor">
+            <a:schemeClr val="tx1"/>
+          </a:fontRef>
+        </p:style>
+      </p:cxnSp>
+      <p:cxnSp>
+        <p:nvCxnSpPr>
+          <p:cNvPr id="16" name="Straight Arrow Connector 15"/>
+          <p:cNvCxnSpPr/>
+          <p:nvPr/>
+        </p:nvCxnSpPr>
+        <p:spPr>
+          <a:xfrm flipH="1" flipV="1">
+            <a:off x="2934103" y="1832494"/>
+            <a:ext cx="2088682" cy="0"/>
+          </a:xfrm>
+          <a:prstGeom prst="straightConnector1">
+            <a:avLst/>
+          </a:prstGeom>
+          <a:ln>
+            <a:tailEnd type="triangle"/>
+          </a:ln>
+        </p:spPr>
+        <p:style>
+          <a:lnRef idx="1">
+            <a:schemeClr val="dk1"/>
+          </a:lnRef>
+          <a:fillRef idx="0">
+            <a:schemeClr val="dk1"/>
+          </a:fillRef>
+          <a:effectRef idx="0">
+            <a:schemeClr val="dk1"/>
+          </a:effectRef>
+          <a:fontRef idx="minor">
+            <a:schemeClr val="tx1"/>
+          </a:fontRef>
+        </p:style>
+      </p:cxnSp>
+      <p:sp>
+        <p:nvSpPr>
+          <p:cNvPr id="17" name="TextBox 16"/>
+          <p:cNvSpPr txBox="1"/>
+          <p:nvPr/>
+        </p:nvSpPr>
+        <p:spPr>
+          <a:xfrm>
+            <a:off x="3077881" y="1566572"/>
+            <a:ext cx="2157663" cy="261610"/>
+          </a:xfrm>
+          <a:prstGeom prst="rect">
+            <a:avLst/>
+          </a:prstGeom>
+          <a:noFill/>
+        </p:spPr>
+        <p:txBody>
+          <a:bodyPr wrap="square" rtlCol="0">
+            <a:spAutoFit/>
+          </a:bodyPr>
+          <a:lstStyle/>
+          <a:p>
+            <a:r>
+              <a:rPr lang="en-US" sz="1100" dirty="0" smtClean="0"/>
+              <a:t> 4. Plc state feed back</a:t>
+            </a:r>
+            <a:endParaRPr lang="en-SG" sz="1100" dirty="0"/>
+          </a:p>
+        </p:txBody>
+      </p:sp>
+      <p:sp>
+        <p:nvSpPr>
+          <p:cNvPr id="18" name="Rectangle 17"/>
+          <p:cNvSpPr/>
+          <p:nvPr/>
+        </p:nvSpPr>
+        <p:spPr>
+          <a:xfrm>
+            <a:off x="1374808" y="2932317"/>
+            <a:ext cx="1655546" cy="1108691"/>
+          </a:xfrm>
+          <a:prstGeom prst="rect">
+            <a:avLst/>
+          </a:prstGeom>
+          <a:ln>
+            <a:prstDash val="sysDot"/>
+          </a:ln>
+        </p:spPr>
+        <p:style>
+          <a:lnRef idx="2">
+            <a:schemeClr val="dk1"/>
+          </a:lnRef>
+          <a:fillRef idx="1">
+            <a:schemeClr val="lt1"/>
+          </a:fillRef>
+          <a:effectRef idx="0">
+            <a:schemeClr val="dk1"/>
+          </a:effectRef>
+          <a:fontRef idx="minor">
+            <a:schemeClr val="dk1"/>
+          </a:fontRef>
+        </p:style>
+        <p:txBody>
+          <a:bodyPr rtlCol="0" anchor="ctr"/>
+          <a:lstStyle/>
+          <a:p>
+            <a:pPr algn="ctr"/>
+            <a:endParaRPr lang="en-SG" dirty="0"/>
+          </a:p>
+        </p:txBody>
+      </p:sp>
+      <p:sp>
+        <p:nvSpPr>
+          <p:cNvPr id="21" name="Rectangle 20"/>
+          <p:cNvSpPr/>
+          <p:nvPr/>
+        </p:nvSpPr>
+        <p:spPr>
+          <a:xfrm>
+            <a:off x="9873916" y="2927005"/>
+            <a:ext cx="1459834" cy="1640475"/>
+          </a:xfrm>
+          <a:prstGeom prst="rect">
+            <a:avLst/>
+          </a:prstGeom>
+          <a:ln>
+            <a:prstDash val="sysDot"/>
+          </a:ln>
+        </p:spPr>
+        <p:style>
+          <a:lnRef idx="2">
+            <a:schemeClr val="dk1"/>
+          </a:lnRef>
+          <a:fillRef idx="1">
+            <a:schemeClr val="lt1"/>
+          </a:fillRef>
+          <a:effectRef idx="0">
+            <a:schemeClr val="dk1"/>
+          </a:effectRef>
+          <a:fontRef idx="minor">
+            <a:schemeClr val="dk1"/>
+          </a:fontRef>
+        </p:style>
+        <p:txBody>
+          <a:bodyPr rtlCol="0" anchor="ctr"/>
+          <a:lstStyle/>
+          <a:p>
+            <a:pPr algn="ctr"/>
+            <a:endParaRPr lang="en-SG" dirty="0"/>
+          </a:p>
+        </p:txBody>
+      </p:sp>
+      <p:cxnSp>
+        <p:nvCxnSpPr>
+          <p:cNvPr id="23" name="Straight Arrow Connector 22"/>
+          <p:cNvCxnSpPr/>
+          <p:nvPr/>
+        </p:nvCxnSpPr>
+        <p:spPr>
+          <a:xfrm flipH="1">
+            <a:off x="3068855" y="3416702"/>
+            <a:ext cx="6710412" cy="0"/>
+          </a:xfrm>
+          <a:prstGeom prst="straightConnector1">
+            <a:avLst/>
+          </a:prstGeom>
+          <a:ln>
+            <a:tailEnd type="triangle"/>
+          </a:ln>
+        </p:spPr>
+        <p:style>
+          <a:lnRef idx="1">
+            <a:schemeClr val="dk1"/>
+          </a:lnRef>
+          <a:fillRef idx="0">
+            <a:schemeClr val="dk1"/>
+          </a:fillRef>
+          <a:effectRef idx="0">
+            <a:schemeClr val="dk1"/>
+          </a:effectRef>
+          <a:fontRef idx="minor">
+            <a:schemeClr val="tx1"/>
+          </a:fontRef>
+        </p:style>
+      </p:cxnSp>
+      <p:sp>
+        <p:nvSpPr>
+          <p:cNvPr id="24" name="TextBox 23"/>
+          <p:cNvSpPr txBox="1"/>
+          <p:nvPr/>
+        </p:nvSpPr>
+        <p:spPr>
+          <a:xfrm>
+            <a:off x="3079282" y="2827468"/>
+            <a:ext cx="3041183" cy="261610"/>
+          </a:xfrm>
+          <a:prstGeom prst="rect">
+            <a:avLst/>
+          </a:prstGeom>
+          <a:noFill/>
+        </p:spPr>
+        <p:txBody>
+          <a:bodyPr wrap="square" rtlCol="0">
+            <a:spAutoFit/>
+          </a:bodyPr>
+          <a:lstStyle/>
+          <a:p>
+            <a:r>
+              <a:rPr lang="en-US" sz="1100" dirty="0" smtClean="0"/>
+              <a:t>1. Plc coil change </a:t>
+            </a:r>
+            <a:r>
+              <a:rPr lang="en-US" sz="1100" dirty="0" err="1" smtClean="0"/>
+              <a:t>cmd</a:t>
+            </a:r>
+            <a:r>
+              <a:rPr lang="en-US" sz="1100" dirty="0"/>
+              <a:t> </a:t>
+            </a:r>
+            <a:r>
+              <a:rPr lang="en-US" sz="1100" dirty="0" smtClean="0"/>
+              <a:t>[</a:t>
+            </a:r>
+            <a:r>
+              <a:rPr lang="en-US" sz="800" dirty="0" smtClean="0"/>
+              <a:t>***\x0f\x00\x0a\x00\x01\x01\x00]</a:t>
+            </a:r>
+            <a:endParaRPr lang="en-SG" sz="800" dirty="0"/>
+          </a:p>
+        </p:txBody>
+      </p:sp>
+      <p:sp>
+        <p:nvSpPr>
+          <p:cNvPr id="25" name="TextBox 24"/>
+          <p:cNvSpPr txBox="1"/>
+          <p:nvPr/>
+        </p:nvSpPr>
+        <p:spPr>
+          <a:xfrm>
+            <a:off x="3142648" y="3146310"/>
+            <a:ext cx="3113773" cy="261610"/>
+          </a:xfrm>
+          <a:prstGeom prst="rect">
+            <a:avLst/>
+          </a:prstGeom>
+          <a:noFill/>
+        </p:spPr>
+        <p:txBody>
+          <a:bodyPr wrap="square" rtlCol="0">
+            <a:spAutoFit/>
+          </a:bodyPr>
+          <a:lstStyle/>
+          <a:p>
+            <a:r>
+              <a:rPr lang="en-US" sz="1100" dirty="0" smtClean="0"/>
+              <a:t>2. Plc coil </a:t>
+            </a:r>
+            <a:r>
+              <a:rPr lang="en-US" sz="1100" dirty="0" smtClean="0"/>
+              <a:t>changed </a:t>
+            </a:r>
+            <a:r>
+              <a:rPr lang="en-US" sz="1100" dirty="0" err="1" smtClean="0"/>
+              <a:t>cmd</a:t>
+            </a:r>
+            <a:r>
+              <a:rPr lang="en-US" sz="1100" dirty="0" smtClean="0"/>
+              <a:t> executed </a:t>
+            </a:r>
+            <a:r>
+              <a:rPr lang="en-US" sz="1100" dirty="0" smtClean="0"/>
+              <a:t>feed back</a:t>
+            </a:r>
+            <a:endParaRPr lang="en-SG" sz="1100" dirty="0"/>
+          </a:p>
+        </p:txBody>
+      </p:sp>
+      <p:sp>
+        <p:nvSpPr>
+          <p:cNvPr id="26" name="TextBox 25"/>
+          <p:cNvSpPr txBox="1"/>
+          <p:nvPr/>
+        </p:nvSpPr>
+        <p:spPr>
+          <a:xfrm>
+            <a:off x="3165508" y="3429986"/>
+            <a:ext cx="2157663" cy="261610"/>
+          </a:xfrm>
+          <a:prstGeom prst="rect">
+            <a:avLst/>
+          </a:prstGeom>
+          <a:noFill/>
+        </p:spPr>
+        <p:txBody>
+          <a:bodyPr wrap="square" rtlCol="0">
+            <a:spAutoFit/>
+          </a:bodyPr>
+          <a:lstStyle/>
+          <a:p>
+            <a:r>
+              <a:rPr lang="en-US" sz="1100" dirty="0" smtClean="0"/>
+              <a:t>3. Plc state read </a:t>
+            </a:r>
+            <a:r>
+              <a:rPr lang="en-US" sz="1100" dirty="0" err="1" smtClean="0"/>
+              <a:t>cmd</a:t>
+            </a:r>
+            <a:endParaRPr lang="en-SG" sz="1100" dirty="0"/>
+          </a:p>
+        </p:txBody>
+      </p:sp>
+      <p:cxnSp>
+        <p:nvCxnSpPr>
+          <p:cNvPr id="27" name="Straight Arrow Connector 26"/>
+          <p:cNvCxnSpPr/>
+          <p:nvPr/>
+        </p:nvCxnSpPr>
+        <p:spPr>
+          <a:xfrm>
+            <a:off x="3068855" y="3675784"/>
+            <a:ext cx="6710412" cy="0"/>
+          </a:xfrm>
+          <a:prstGeom prst="straightConnector1">
+            <a:avLst/>
+          </a:prstGeom>
+          <a:ln>
+            <a:tailEnd type="triangle"/>
+          </a:ln>
+        </p:spPr>
+        <p:style>
+          <a:lnRef idx="1">
+            <a:schemeClr val="dk1"/>
+          </a:lnRef>
+          <a:fillRef idx="0">
+            <a:schemeClr val="dk1"/>
+          </a:fillRef>
+          <a:effectRef idx="0">
+            <a:schemeClr val="dk1"/>
+          </a:effectRef>
+          <a:fontRef idx="minor">
+            <a:schemeClr val="tx1"/>
+          </a:fontRef>
+        </p:style>
+      </p:cxnSp>
+      <p:sp>
+        <p:nvSpPr>
+          <p:cNvPr id="55" name="TextBox 54"/>
+          <p:cNvSpPr txBox="1"/>
+          <p:nvPr/>
+        </p:nvSpPr>
+        <p:spPr>
+          <a:xfrm>
+            <a:off x="5005137" y="3920201"/>
+            <a:ext cx="3766288" cy="261610"/>
+          </a:xfrm>
+          <a:prstGeom prst="rect">
+            <a:avLst/>
+          </a:prstGeom>
+          <a:noFill/>
+        </p:spPr>
+        <p:txBody>
+          <a:bodyPr wrap="square" rtlCol="0">
+            <a:spAutoFit/>
+          </a:bodyPr>
+          <a:lstStyle/>
+          <a:p>
+            <a:r>
+              <a:rPr lang="en-US" sz="1100" dirty="0" smtClean="0"/>
+              <a:t> 4. Plc state </a:t>
+            </a:r>
+            <a:r>
+              <a:rPr lang="en-US" sz="1100" dirty="0"/>
+              <a:t>feed back </a:t>
+            </a:r>
+            <a:r>
+              <a:rPr lang="en-US" sz="800" dirty="0" smtClean="0"/>
+              <a:t>[***x08\x01\x01\x00\x00\x00\x00\x00\x00*** ]</a:t>
+            </a:r>
+            <a:endParaRPr lang="en-SG" sz="800" dirty="0"/>
+          </a:p>
+        </p:txBody>
+      </p:sp>
+      <p:sp>
+        <p:nvSpPr>
+          <p:cNvPr id="61" name="TextBox 60"/>
+          <p:cNvSpPr txBox="1"/>
+          <p:nvPr/>
+        </p:nvSpPr>
+        <p:spPr>
+          <a:xfrm>
+            <a:off x="1133373" y="263302"/>
+            <a:ext cx="3871764" cy="369332"/>
+          </a:xfrm>
+          <a:prstGeom prst="rect">
+            <a:avLst/>
+          </a:prstGeom>
+          <a:noFill/>
+        </p:spPr>
+        <p:txBody>
+          <a:bodyPr wrap="square" rtlCol="0">
+            <a:spAutoFit/>
+          </a:bodyPr>
+          <a:lstStyle/>
+          <a:p>
+            <a:r>
+              <a:rPr lang="en-US" dirty="0" smtClean="0"/>
+              <a:t>Normal </a:t>
+            </a:r>
+            <a:r>
+              <a:rPr lang="en-US" dirty="0" smtClean="0"/>
+              <a:t>HMI-PLC control sequence </a:t>
+            </a:r>
+            <a:endParaRPr lang="en-SG" dirty="0"/>
+          </a:p>
+        </p:txBody>
+      </p:sp>
+      <p:sp>
+        <p:nvSpPr>
+          <p:cNvPr id="62" name="TextBox 61"/>
+          <p:cNvSpPr txBox="1"/>
+          <p:nvPr/>
+        </p:nvSpPr>
+        <p:spPr>
+          <a:xfrm>
+            <a:off x="1133374" y="2375852"/>
+            <a:ext cx="3544505" cy="369332"/>
+          </a:xfrm>
+          <a:prstGeom prst="rect">
+            <a:avLst/>
+          </a:prstGeom>
+          <a:noFill/>
+        </p:spPr>
+        <p:txBody>
+          <a:bodyPr wrap="square" rtlCol="0">
+            <a:spAutoFit/>
+          </a:bodyPr>
+          <a:lstStyle/>
+          <a:p>
+            <a:r>
+              <a:rPr lang="en-US"/>
+              <a:t>After </a:t>
+            </a:r>
+            <a:r>
+              <a:rPr lang="en-US" smtClean="0"/>
+              <a:t>man </a:t>
+            </a:r>
+            <a:r>
+              <a:rPr lang="en-US" dirty="0"/>
+              <a:t>in the middle attack</a:t>
+            </a:r>
+            <a:endParaRPr lang="en-SG" dirty="0"/>
+          </a:p>
+        </p:txBody>
+      </p:sp>
+      <p:sp>
+        <p:nvSpPr>
+          <p:cNvPr id="36" name="TextBox 35"/>
+          <p:cNvSpPr txBox="1"/>
+          <p:nvPr/>
+        </p:nvSpPr>
+        <p:spPr>
+          <a:xfrm>
+            <a:off x="1369996" y="2945613"/>
+            <a:ext cx="1809552" cy="738664"/>
+          </a:xfrm>
+          <a:prstGeom prst="rect">
+            <a:avLst/>
+          </a:prstGeom>
+          <a:noFill/>
+        </p:spPr>
+        <p:txBody>
+          <a:bodyPr wrap="square" rtlCol="0">
+            <a:spAutoFit/>
+          </a:bodyPr>
+          <a:lstStyle/>
+          <a:p>
+            <a:r>
+              <a:rPr lang="en-US" sz="1400" dirty="0" smtClean="0"/>
+              <a:t>HMI </a:t>
+            </a:r>
+            <a:r>
+              <a:rPr lang="en-US" sz="1400" dirty="0" smtClean="0"/>
+              <a:t>computer</a:t>
+            </a:r>
+          </a:p>
+          <a:p>
+            <a:r>
+              <a:rPr lang="en-US" sz="1400" dirty="0" smtClean="0"/>
+              <a:t>IP: 192.168.10.21</a:t>
+            </a:r>
+          </a:p>
+          <a:p>
+            <a:r>
+              <a:rPr lang="en-US" sz="1400" dirty="0" smtClean="0"/>
+              <a:t>Port: 502</a:t>
+            </a:r>
+            <a:endParaRPr lang="en-SG" sz="1400" dirty="0"/>
+          </a:p>
+        </p:txBody>
+      </p:sp>
+      <p:sp>
+        <p:nvSpPr>
+          <p:cNvPr id="38" name="TextBox 37"/>
+          <p:cNvSpPr txBox="1"/>
+          <p:nvPr/>
+        </p:nvSpPr>
+        <p:spPr>
+          <a:xfrm>
+            <a:off x="9886753" y="2939648"/>
+            <a:ext cx="1809552" cy="954107"/>
+          </a:xfrm>
+          <a:prstGeom prst="rect">
+            <a:avLst/>
+          </a:prstGeom>
+          <a:noFill/>
+        </p:spPr>
+        <p:txBody>
+          <a:bodyPr wrap="square" rtlCol="0">
+            <a:spAutoFit/>
+          </a:bodyPr>
+          <a:lstStyle/>
+          <a:p>
+            <a:r>
+              <a:rPr lang="en-US" sz="1400" dirty="0" smtClean="0"/>
+              <a:t>PLC </a:t>
+            </a:r>
+            <a:r>
+              <a:rPr lang="en-US" sz="1400" dirty="0" smtClean="0"/>
+              <a:t>1</a:t>
+            </a:r>
+          </a:p>
+          <a:p>
+            <a:r>
+              <a:rPr lang="en-US" sz="1400" dirty="0" smtClean="0"/>
+              <a:t>(Schneider M221)</a:t>
+            </a:r>
+            <a:endParaRPr lang="en-US" sz="1400" dirty="0" smtClean="0"/>
+          </a:p>
+          <a:p>
+            <a:r>
+              <a:rPr lang="en-US" sz="1400" dirty="0" smtClean="0"/>
+              <a:t>IP: 192.168.10.72</a:t>
+            </a:r>
+          </a:p>
+          <a:p>
+            <a:r>
+              <a:rPr lang="en-US" sz="1400" dirty="0" smtClean="0"/>
+              <a:t>Port: 502</a:t>
+            </a:r>
+            <a:endParaRPr lang="en-SG" sz="1400" dirty="0"/>
+          </a:p>
+        </p:txBody>
+      </p:sp>
+      <p:sp>
+        <p:nvSpPr>
+          <p:cNvPr id="32" name="Rectangle 31"/>
+          <p:cNvSpPr/>
+          <p:nvPr/>
+        </p:nvSpPr>
+        <p:spPr>
+          <a:xfrm>
+            <a:off x="4292868" y="4501465"/>
+            <a:ext cx="1459834" cy="809042"/>
+          </a:xfrm>
+          <a:prstGeom prst="rect">
+            <a:avLst/>
+          </a:prstGeom>
+          <a:solidFill>
+            <a:schemeClr val="bg1"/>
+          </a:solidFill>
+          <a:ln>
+            <a:prstDash val="sysDot"/>
+          </a:ln>
+        </p:spPr>
+        <p:style>
+          <a:lnRef idx="2">
+            <a:schemeClr val="dk1"/>
+          </a:lnRef>
+          <a:fillRef idx="1">
+            <a:schemeClr val="lt1"/>
+          </a:fillRef>
+          <a:effectRef idx="0">
+            <a:schemeClr val="dk1"/>
+          </a:effectRef>
+          <a:fontRef idx="minor">
+            <a:schemeClr val="dk1"/>
+          </a:fontRef>
+        </p:style>
+        <p:txBody>
+          <a:bodyPr rtlCol="0" anchor="ctr"/>
+          <a:lstStyle/>
+          <a:p>
+            <a:pPr algn="ctr"/>
+            <a:endParaRPr lang="en-SG" dirty="0"/>
+          </a:p>
+        </p:txBody>
+      </p:sp>
+      <p:sp>
+        <p:nvSpPr>
+          <p:cNvPr id="33" name="TextBox 32"/>
+          <p:cNvSpPr txBox="1"/>
+          <p:nvPr/>
+        </p:nvSpPr>
+        <p:spPr>
+          <a:xfrm>
+            <a:off x="4346411" y="4567480"/>
+            <a:ext cx="1406291" cy="738664"/>
+          </a:xfrm>
+          <a:prstGeom prst="rect">
+            <a:avLst/>
+          </a:prstGeom>
+          <a:noFill/>
+        </p:spPr>
+        <p:txBody>
+          <a:bodyPr wrap="square" rtlCol="0">
+            <a:spAutoFit/>
+          </a:bodyPr>
+          <a:lstStyle/>
+          <a:p>
+            <a:r>
+              <a:rPr lang="en-US" sz="1400" dirty="0" smtClean="0"/>
+              <a:t>Raspberry PI</a:t>
+            </a:r>
+          </a:p>
+          <a:p>
+            <a:r>
+              <a:rPr lang="en-US" sz="1400" dirty="0" smtClean="0"/>
+              <a:t>(attack device)</a:t>
+            </a:r>
+          </a:p>
+          <a:p>
+            <a:r>
+              <a:rPr lang="en-US" sz="1400" dirty="0" smtClean="0"/>
+              <a:t>192.168.10.234</a:t>
+            </a:r>
+            <a:endParaRPr lang="en-SG" sz="1400" dirty="0"/>
+          </a:p>
+        </p:txBody>
+      </p:sp>
+      <p:cxnSp>
+        <p:nvCxnSpPr>
+          <p:cNvPr id="34" name="Straight Arrow Connector 33"/>
+          <p:cNvCxnSpPr/>
+          <p:nvPr/>
+        </p:nvCxnSpPr>
+        <p:spPr>
+          <a:xfrm flipV="1">
+            <a:off x="3077881" y="3146310"/>
+            <a:ext cx="6701386" cy="8782"/>
+          </a:xfrm>
+          <a:prstGeom prst="straightConnector1">
+            <a:avLst/>
+          </a:prstGeom>
+          <a:ln>
+            <a:tailEnd type="triangle"/>
+          </a:ln>
+        </p:spPr>
+        <p:style>
+          <a:lnRef idx="1">
+            <a:schemeClr val="dk1"/>
+          </a:lnRef>
+          <a:fillRef idx="0">
+            <a:schemeClr val="dk1"/>
+          </a:fillRef>
+          <a:effectRef idx="0">
+            <a:schemeClr val="dk1"/>
+          </a:effectRef>
+          <a:fontRef idx="minor">
+            <a:schemeClr val="tx1"/>
+          </a:fontRef>
+        </p:style>
+      </p:cxnSp>
+      <p:cxnSp>
+        <p:nvCxnSpPr>
+          <p:cNvPr id="10" name="Elbow Connector 9"/>
+          <p:cNvCxnSpPr>
+            <a:endCxn id="32" idx="0"/>
+          </p:cNvCxnSpPr>
+          <p:nvPr/>
+        </p:nvCxnSpPr>
+        <p:spPr>
+          <a:xfrm rot="10800000" flipV="1">
+            <a:off x="5022785" y="3898947"/>
+            <a:ext cx="4756482" cy="602518"/>
+          </a:xfrm>
+          <a:prstGeom prst="bentConnector2">
+            <a:avLst/>
+          </a:prstGeom>
+          <a:ln>
+            <a:tailEnd type="triangle"/>
+          </a:ln>
+        </p:spPr>
+        <p:style>
+          <a:lnRef idx="1">
+            <a:schemeClr val="accent1"/>
+          </a:lnRef>
+          <a:fillRef idx="0">
+            <a:schemeClr val="accent1"/>
+          </a:fillRef>
+          <a:effectRef idx="0">
+            <a:schemeClr val="accent1"/>
+          </a:effectRef>
+          <a:fontRef idx="minor">
+            <a:schemeClr val="tx1"/>
+          </a:fontRef>
+        </p:style>
+      </p:cxnSp>
+      <p:cxnSp>
+        <p:nvCxnSpPr>
+          <p:cNvPr id="20" name="Straight Arrow Connector 19"/>
+          <p:cNvCxnSpPr/>
+          <p:nvPr/>
+        </p:nvCxnSpPr>
+        <p:spPr>
+          <a:xfrm flipH="1">
+            <a:off x="3077882" y="3893755"/>
+            <a:ext cx="1927255" cy="0"/>
+          </a:xfrm>
+          <a:prstGeom prst="straightConnector1">
+            <a:avLst/>
+          </a:prstGeom>
+          <a:ln>
+            <a:solidFill>
+              <a:srgbClr val="FF0000"/>
+            </a:solidFill>
+            <a:prstDash val="dash"/>
+            <a:tailEnd type="triangle"/>
+          </a:ln>
+        </p:spPr>
+        <p:style>
+          <a:lnRef idx="1">
+            <a:schemeClr val="accent1"/>
+          </a:lnRef>
+          <a:fillRef idx="0">
+            <a:schemeClr val="accent1"/>
+          </a:fillRef>
+          <a:effectRef idx="0">
+            <a:schemeClr val="accent1"/>
+          </a:effectRef>
+          <a:fontRef idx="minor">
+            <a:schemeClr val="tx1"/>
+          </a:fontRef>
+        </p:style>
+      </p:cxnSp>
+      <p:sp>
+        <p:nvSpPr>
+          <p:cNvPr id="28" name="Multiply 27"/>
+          <p:cNvSpPr/>
+          <p:nvPr/>
+        </p:nvSpPr>
+        <p:spPr>
+          <a:xfrm>
+            <a:off x="4292868" y="3658884"/>
+            <a:ext cx="519765" cy="522388"/>
+          </a:xfrm>
+          <a:prstGeom prst="mathMultiply">
+            <a:avLst/>
+          </a:prstGeom>
+          <a:noFill/>
+          <a:ln w="19050">
+            <a:solidFill>
+              <a:srgbClr val="FF0000"/>
+            </a:solidFill>
+          </a:ln>
+        </p:spPr>
+        <p:style>
+          <a:lnRef idx="2">
+            <a:schemeClr val="accent1">
+              <a:shade val="50000"/>
+            </a:schemeClr>
+          </a:lnRef>
+          <a:fillRef idx="1">
+            <a:schemeClr val="accent1"/>
+          </a:fillRef>
+          <a:effectRef idx="0">
+            <a:schemeClr val="accent1"/>
+          </a:effectRef>
+          <a:fontRef idx="minor">
+            <a:schemeClr val="lt1"/>
+          </a:fontRef>
+        </p:style>
+        <p:txBody>
+          <a:bodyPr rtlCol="0" anchor="ctr"/>
+          <a:lstStyle/>
+          <a:p>
+            <a:pPr algn="ctr"/>
+            <a:endParaRPr lang="en-SG"/>
+          </a:p>
+        </p:txBody>
+      </p:sp>
+      <p:sp>
+        <p:nvSpPr>
+          <p:cNvPr id="44" name="Rectangle 43"/>
+          <p:cNvSpPr/>
+          <p:nvPr/>
+        </p:nvSpPr>
+        <p:spPr>
+          <a:xfrm>
+            <a:off x="6321192" y="4497102"/>
+            <a:ext cx="1544052" cy="809042"/>
+          </a:xfrm>
+          <a:prstGeom prst="rect">
+            <a:avLst/>
+          </a:prstGeom>
+          <a:solidFill>
+            <a:schemeClr val="bg1"/>
+          </a:solidFill>
+          <a:ln>
+            <a:prstDash val="sysDot"/>
+          </a:ln>
+        </p:spPr>
+        <p:style>
+          <a:lnRef idx="2">
+            <a:schemeClr val="dk1"/>
+          </a:lnRef>
+          <a:fillRef idx="1">
+            <a:schemeClr val="lt1"/>
+          </a:fillRef>
+          <a:effectRef idx="0">
+            <a:schemeClr val="dk1"/>
+          </a:effectRef>
+          <a:fontRef idx="minor">
+            <a:schemeClr val="dk1"/>
+          </a:fontRef>
+        </p:style>
+        <p:txBody>
+          <a:bodyPr rtlCol="0" anchor="ctr"/>
+          <a:lstStyle/>
+          <a:p>
+            <a:pPr algn="ctr"/>
+            <a:endParaRPr lang="en-SG" dirty="0"/>
+          </a:p>
+        </p:txBody>
+      </p:sp>
+      <p:sp>
+        <p:nvSpPr>
+          <p:cNvPr id="46" name="TextBox 45"/>
+          <p:cNvSpPr txBox="1"/>
+          <p:nvPr/>
+        </p:nvSpPr>
+        <p:spPr>
+          <a:xfrm>
+            <a:off x="6321192" y="4532291"/>
+            <a:ext cx="1610025" cy="738664"/>
+          </a:xfrm>
+          <a:prstGeom prst="rect">
+            <a:avLst/>
+          </a:prstGeom>
+          <a:noFill/>
+        </p:spPr>
+        <p:txBody>
+          <a:bodyPr wrap="square" rtlCol="0">
+            <a:spAutoFit/>
+          </a:bodyPr>
+          <a:lstStyle/>
+          <a:p>
+            <a:r>
+              <a:rPr lang="en-US" sz="1400" dirty="0" smtClean="0"/>
+              <a:t>Attack remote HMI IP: 192.168.10.233</a:t>
+            </a:r>
+          </a:p>
+          <a:p>
+            <a:r>
+              <a:rPr lang="en-US" sz="1400" dirty="0" smtClean="0"/>
+              <a:t>Port 502</a:t>
+            </a:r>
+            <a:endParaRPr lang="en-SG" sz="1400" dirty="0"/>
+          </a:p>
+        </p:txBody>
+      </p:sp>
+      <p:cxnSp>
+        <p:nvCxnSpPr>
+          <p:cNvPr id="31" name="Elbow Connector 30"/>
+          <p:cNvCxnSpPr>
+            <a:stCxn id="44" idx="0"/>
+          </p:cNvCxnSpPr>
+          <p:nvPr/>
+        </p:nvCxnSpPr>
+        <p:spPr>
+          <a:xfrm rot="5400000" flipH="1" flipV="1">
+            <a:off x="8287153" y="2987339"/>
+            <a:ext cx="315829" cy="2703698"/>
+          </a:xfrm>
+          <a:prstGeom prst="bentConnector2">
+            <a:avLst/>
+          </a:prstGeom>
+          <a:ln>
+            <a:tailEnd type="triangle"/>
+          </a:ln>
+        </p:spPr>
+        <p:style>
+          <a:lnRef idx="1">
+            <a:schemeClr val="dk1"/>
+          </a:lnRef>
+          <a:fillRef idx="0">
+            <a:schemeClr val="dk1"/>
+          </a:fillRef>
+          <a:effectRef idx="0">
+            <a:schemeClr val="dk1"/>
+          </a:effectRef>
+          <a:fontRef idx="minor">
+            <a:schemeClr val="tx1"/>
+          </a:fontRef>
+        </p:style>
+      </p:cxnSp>
+      <p:sp>
+        <p:nvSpPr>
+          <p:cNvPr id="49" name="TextBox 48"/>
+          <p:cNvSpPr txBox="1"/>
+          <p:nvPr/>
+        </p:nvSpPr>
+        <p:spPr>
+          <a:xfrm>
+            <a:off x="7082892" y="4220080"/>
+            <a:ext cx="2157663" cy="261610"/>
+          </a:xfrm>
+          <a:prstGeom prst="rect">
+            <a:avLst/>
+          </a:prstGeom>
+          <a:noFill/>
+        </p:spPr>
+        <p:txBody>
+          <a:bodyPr wrap="square" rtlCol="0">
+            <a:spAutoFit/>
+          </a:bodyPr>
+          <a:lstStyle/>
+          <a:p>
+            <a:r>
+              <a:rPr lang="en-US" sz="1100" dirty="0"/>
+              <a:t>6</a:t>
+            </a:r>
+            <a:r>
+              <a:rPr lang="en-US" sz="1100" dirty="0" smtClean="0"/>
+              <a:t>. </a:t>
+            </a:r>
+            <a:r>
+              <a:rPr lang="en-US" sz="1100" dirty="0" smtClean="0"/>
+              <a:t>Plc coil change </a:t>
+            </a:r>
+            <a:r>
+              <a:rPr lang="en-US" sz="1100" dirty="0" err="1" smtClean="0"/>
+              <a:t>cmd</a:t>
+            </a:r>
+            <a:endParaRPr lang="en-SG" sz="1100" dirty="0"/>
+          </a:p>
+        </p:txBody>
+      </p:sp>
+      <p:sp>
+        <p:nvSpPr>
+          <p:cNvPr id="51" name="TextBox 50"/>
+          <p:cNvSpPr txBox="1"/>
+          <p:nvPr/>
+        </p:nvSpPr>
+        <p:spPr>
+          <a:xfrm>
+            <a:off x="3077881" y="4076043"/>
+            <a:ext cx="2282594" cy="261610"/>
+          </a:xfrm>
+          <a:prstGeom prst="rect">
+            <a:avLst/>
+          </a:prstGeom>
+          <a:noFill/>
+        </p:spPr>
+        <p:txBody>
+          <a:bodyPr wrap="square" rtlCol="0">
+            <a:spAutoFit/>
+          </a:bodyPr>
+          <a:lstStyle/>
+          <a:p>
+            <a:r>
+              <a:rPr lang="en-US" sz="1100" dirty="0" smtClean="0"/>
+              <a:t>5</a:t>
+            </a:r>
+            <a:r>
+              <a:rPr lang="en-US" sz="1100" dirty="0" smtClean="0"/>
+              <a:t>. Mod bus TCP </a:t>
+            </a:r>
+            <a:r>
+              <a:rPr lang="en-US" sz="1100" dirty="0"/>
+              <a:t>m</a:t>
+            </a:r>
+            <a:r>
+              <a:rPr lang="en-US" sz="1100" dirty="0" smtClean="0"/>
+              <a:t>essage drop</a:t>
+            </a:r>
+            <a:endParaRPr lang="en-SG" sz="1100" dirty="0"/>
+          </a:p>
+        </p:txBody>
+      </p:sp>
+    </p:spTree>
+    <p:extLst>
+      <p:ext uri="{BB962C8B-B14F-4D97-AF65-F5344CB8AC3E}">
+        <p14:creationId xmlns:p14="http://schemas.microsoft.com/office/powerpoint/2010/main" val="2934468971"/>
       </p:ext>
     </p:extLst>
   </p:cSld>

</xml_diff>

<commit_message>
Added the firmware sign step1.
</commit_message>
<xml_diff>
--- a/doc/firmwaresignWF.pptx
+++ b/doc/firmwaresignWF.pptx
@@ -211,7 +211,7 @@
           <a:p>
             <a:fld id="{32DA1F5A-E23E-4D9B-B8D0-40D8909182CC}" type="datetimeFigureOut">
               <a:rPr lang="en-SG" smtClean="0"/>
-              <a:t>23/9/2019</a:t>
+              <a:t>24/9/2019</a:t>
             </a:fld>
             <a:endParaRPr lang="en-SG"/>
           </a:p>
@@ -694,7 +694,7 @@
           <a:p>
             <a:fld id="{168FC4C3-6B25-48E2-93F9-24A255A41CA9}" type="datetimeFigureOut">
               <a:rPr lang="en-SG" smtClean="0"/>
-              <a:t>23/9/2019</a:t>
+              <a:t>24/9/2019</a:t>
             </a:fld>
             <a:endParaRPr lang="en-SG"/>
           </a:p>
@@ -864,7 +864,7 @@
           <a:p>
             <a:fld id="{168FC4C3-6B25-48E2-93F9-24A255A41CA9}" type="datetimeFigureOut">
               <a:rPr lang="en-SG" smtClean="0"/>
-              <a:t>23/9/2019</a:t>
+              <a:t>24/9/2019</a:t>
             </a:fld>
             <a:endParaRPr lang="en-SG"/>
           </a:p>
@@ -1044,7 +1044,7 @@
           <a:p>
             <a:fld id="{168FC4C3-6B25-48E2-93F9-24A255A41CA9}" type="datetimeFigureOut">
               <a:rPr lang="en-SG" smtClean="0"/>
-              <a:t>23/9/2019</a:t>
+              <a:t>24/9/2019</a:t>
             </a:fld>
             <a:endParaRPr lang="en-SG"/>
           </a:p>
@@ -1214,7 +1214,7 @@
           <a:p>
             <a:fld id="{168FC4C3-6B25-48E2-93F9-24A255A41CA9}" type="datetimeFigureOut">
               <a:rPr lang="en-SG" smtClean="0"/>
-              <a:t>23/9/2019</a:t>
+              <a:t>24/9/2019</a:t>
             </a:fld>
             <a:endParaRPr lang="en-SG"/>
           </a:p>
@@ -1460,7 +1460,7 @@
           <a:p>
             <a:fld id="{168FC4C3-6B25-48E2-93F9-24A255A41CA9}" type="datetimeFigureOut">
               <a:rPr lang="en-SG" smtClean="0"/>
-              <a:t>23/9/2019</a:t>
+              <a:t>24/9/2019</a:t>
             </a:fld>
             <a:endParaRPr lang="en-SG"/>
           </a:p>
@@ -1692,7 +1692,7 @@
           <a:p>
             <a:fld id="{168FC4C3-6B25-48E2-93F9-24A255A41CA9}" type="datetimeFigureOut">
               <a:rPr lang="en-SG" smtClean="0"/>
-              <a:t>23/9/2019</a:t>
+              <a:t>24/9/2019</a:t>
             </a:fld>
             <a:endParaRPr lang="en-SG"/>
           </a:p>
@@ -2059,7 +2059,7 @@
           <a:p>
             <a:fld id="{168FC4C3-6B25-48E2-93F9-24A255A41CA9}" type="datetimeFigureOut">
               <a:rPr lang="en-SG" smtClean="0"/>
-              <a:t>23/9/2019</a:t>
+              <a:t>24/9/2019</a:t>
             </a:fld>
             <a:endParaRPr lang="en-SG"/>
           </a:p>
@@ -2177,7 +2177,7 @@
           <a:p>
             <a:fld id="{168FC4C3-6B25-48E2-93F9-24A255A41CA9}" type="datetimeFigureOut">
               <a:rPr lang="en-SG" smtClean="0"/>
-              <a:t>23/9/2019</a:t>
+              <a:t>24/9/2019</a:t>
             </a:fld>
             <a:endParaRPr lang="en-SG"/>
           </a:p>
@@ -2272,7 +2272,7 @@
           <a:p>
             <a:fld id="{168FC4C3-6B25-48E2-93F9-24A255A41CA9}" type="datetimeFigureOut">
               <a:rPr lang="en-SG" smtClean="0"/>
-              <a:t>23/9/2019</a:t>
+              <a:t>24/9/2019</a:t>
             </a:fld>
             <a:endParaRPr lang="en-SG"/>
           </a:p>
@@ -2549,7 +2549,7 @@
           <a:p>
             <a:fld id="{168FC4C3-6B25-48E2-93F9-24A255A41CA9}" type="datetimeFigureOut">
               <a:rPr lang="en-SG" smtClean="0"/>
-              <a:t>23/9/2019</a:t>
+              <a:t>24/9/2019</a:t>
             </a:fld>
             <a:endParaRPr lang="en-SG"/>
           </a:p>
@@ -2802,7 +2802,7 @@
           <a:p>
             <a:fld id="{168FC4C3-6B25-48E2-93F9-24A255A41CA9}" type="datetimeFigureOut">
               <a:rPr lang="en-SG" smtClean="0"/>
-              <a:t>23/9/2019</a:t>
+              <a:t>24/9/2019</a:t>
             </a:fld>
             <a:endParaRPr lang="en-SG"/>
           </a:p>
@@ -3015,7 +3015,7 @@
           <a:p>
             <a:fld id="{168FC4C3-6B25-48E2-93F9-24A255A41CA9}" type="datetimeFigureOut">
               <a:rPr lang="en-SG" smtClean="0"/>
-              <a:t>23/9/2019</a:t>
+              <a:t>24/9/2019</a:t>
             </a:fld>
             <a:endParaRPr lang="en-SG"/>
           </a:p>
@@ -3599,12 +3599,8 @@
           <a:lstStyle/>
           <a:p>
             <a:r>
-              <a:rPr lang="en-US" sz="1100" b="1" dirty="0" err="1" smtClean="0"/>
-              <a:t>Init</a:t>
-            </a:r>
-            <a:r>
               <a:rPr lang="en-US" sz="1100" b="1" dirty="0" smtClean="0"/>
-              <a:t>: SSL server[5005](Load CA, cert, key), load sign key. </a:t>
+              <a:t>Init: SSL server[5005](Load CA, cert, key), load sign key. </a:t>
             </a:r>
             <a:r>
               <a:rPr lang="en-US" sz="1100" b="1" dirty="0" err="1" smtClean="0"/>
@@ -3740,12 +3736,8 @@
           <a:lstStyle/>
           <a:p>
             <a:r>
-              <a:rPr lang="en-US" sz="1100" b="1" dirty="0" err="1" smtClean="0"/>
-              <a:t>Init</a:t>
-            </a:r>
-            <a:r>
               <a:rPr lang="en-US" sz="1100" b="1" dirty="0" smtClean="0"/>
-              <a:t> : UI, SSL client[5005](load CA cert, key), SWATT calculator, [RSA </a:t>
+              <a:t>Init : UI, SSL client[5005](load CA cert, key), SWATT calculator, [RSA </a:t>
             </a:r>
             <a:r>
               <a:rPr lang="en-US" sz="1100" b="1" dirty="0" err="1" smtClean="0"/>
@@ -5825,12 +5817,8 @@
           <a:lstStyle/>
           <a:p>
             <a:r>
-              <a:rPr lang="en-US" sz="1100" b="1" dirty="0" err="1" smtClean="0"/>
-              <a:t>Init</a:t>
-            </a:r>
-            <a:r>
               <a:rPr lang="en-US" sz="1100" b="1" dirty="0" smtClean="0"/>
-              <a:t>: Sensor </a:t>
+              <a:t>Init: Sensor </a:t>
             </a:r>
             <a:r>
               <a:rPr lang="en-US" sz="1100" b="1" dirty="0"/>
@@ -5897,12 +5885,8 @@
           <a:lstStyle/>
           <a:p>
             <a:r>
-              <a:rPr lang="en-US" sz="1100" b="1" dirty="0" err="1" smtClean="0"/>
-              <a:t>Init</a:t>
-            </a:r>
-            <a:r>
               <a:rPr lang="en-US" sz="1100" b="1" dirty="0" smtClean="0"/>
-              <a:t>: Sensor registration server thread</a:t>
+              <a:t>Init: Sensor registration server thread</a:t>
             </a:r>
             <a:r>
               <a:rPr lang="en-US" sz="1100" b="1" dirty="0"/>
@@ -11274,49 +11258,8 @@
         </p:nvSpPr>
         <p:spPr>
           <a:xfrm>
-            <a:off x="1222408" y="797110"/>
-            <a:ext cx="2281188" cy="2359971"/>
-          </a:xfrm>
-          <a:prstGeom prst="rect">
-            <a:avLst/>
-          </a:prstGeom>
-          <a:ln>
-            <a:prstDash val="sysDot"/>
-          </a:ln>
-        </p:spPr>
-        <p:style>
-          <a:lnRef idx="2">
-            <a:schemeClr val="dk1"/>
-          </a:lnRef>
-          <a:fillRef idx="1">
-            <a:schemeClr val="lt1"/>
-          </a:fillRef>
-          <a:effectRef idx="0">
-            <a:schemeClr val="dk1"/>
-          </a:effectRef>
-          <a:fontRef idx="minor">
-            <a:schemeClr val="dk1"/>
-          </a:fontRef>
-        </p:style>
-        <p:txBody>
-          <a:bodyPr rtlCol="0" anchor="ctr"/>
-          <a:lstStyle/>
-          <a:p>
-            <a:pPr algn="ctr"/>
-            <a:endParaRPr lang="en-SG"/>
-          </a:p>
-        </p:txBody>
-      </p:sp>
-      <p:sp>
-        <p:nvSpPr>
-          <p:cNvPr id="5" name="Rectangle 4"/>
-          <p:cNvSpPr/>
-          <p:nvPr/>
-        </p:nvSpPr>
-        <p:spPr>
-          <a:xfrm>
-            <a:off x="3758666" y="797110"/>
-            <a:ext cx="2608446" cy="2359971"/>
+            <a:off x="1474573" y="658083"/>
+            <a:ext cx="3476419" cy="2524731"/>
           </a:xfrm>
           <a:prstGeom prst="rect">
             <a:avLst/>
@@ -11356,7 +11299,7 @@
         </p:nvCxnSpPr>
         <p:spPr>
           <a:xfrm>
-            <a:off x="6973504" y="288753"/>
+            <a:off x="5678216" y="227206"/>
             <a:ext cx="0" cy="3570973"/>
           </a:xfrm>
           <a:prstGeom prst="line">
@@ -11389,7 +11332,7 @@
         </p:nvSpPr>
         <p:spPr>
           <a:xfrm>
-            <a:off x="6501866" y="3290620"/>
+            <a:off x="5134388" y="3479966"/>
             <a:ext cx="1087655" cy="369332"/>
           </a:xfrm>
           <a:prstGeom prst="rect">
@@ -11419,8 +11362,8 @@
         </p:nvSpPr>
         <p:spPr>
           <a:xfrm>
-            <a:off x="7623210" y="797110"/>
-            <a:ext cx="2128787" cy="2359971"/>
+            <a:off x="6244137" y="663349"/>
+            <a:ext cx="3673903" cy="2519466"/>
           </a:xfrm>
           <a:prstGeom prst="rect">
             <a:avLst/>
@@ -11454,14 +11397,14 @@
       </p:sp>
       <p:sp>
         <p:nvSpPr>
-          <p:cNvPr id="9" name="TextBox 8"/>
+          <p:cNvPr id="27" name="TextBox 26"/>
           <p:cNvSpPr txBox="1"/>
           <p:nvPr/>
         </p:nvSpPr>
         <p:spPr>
           <a:xfrm>
-            <a:off x="1333098" y="798301"/>
-            <a:ext cx="1809552" cy="307777"/>
+            <a:off x="1624262" y="294018"/>
+            <a:ext cx="2894984" cy="369332"/>
           </a:xfrm>
           <a:prstGeom prst="rect">
             <a:avLst/>
@@ -11475,23 +11418,35 @@
           <a:lstStyle/>
           <a:p>
             <a:r>
-              <a:rPr lang="en-US" sz="1400" dirty="0" smtClean="0"/>
-              <a:t>Trust App [Trust Zone]</a:t>
-            </a:r>
-            <a:endParaRPr lang="en-SG" sz="1400" dirty="0"/>
-          </a:p>
-        </p:txBody>
-      </p:sp>
-      <p:sp>
-        <p:nvSpPr>
-          <p:cNvPr id="10" name="TextBox 9"/>
+              <a:rPr lang="en-US" dirty="0" smtClean="0"/>
+              <a:t>Firmware Flashing </a:t>
+            </a:r>
+            <a:r>
+              <a:rPr lang="en-US" dirty="0"/>
+              <a:t>C</a:t>
+            </a:r>
+            <a:r>
+              <a:rPr lang="en-US" dirty="0" smtClean="0"/>
+              <a:t>omputer</a:t>
+            </a:r>
+            <a:r>
+              <a:rPr lang="en-US" dirty="0" smtClean="0"/>
+              <a:t> </a:t>
+            </a:r>
+            <a:endParaRPr lang="en-SG" dirty="0"/>
+          </a:p>
+        </p:txBody>
+      </p:sp>
+      <p:sp>
+        <p:nvSpPr>
+          <p:cNvPr id="28" name="TextBox 27"/>
           <p:cNvSpPr txBox="1"/>
           <p:nvPr/>
         </p:nvSpPr>
         <p:spPr>
           <a:xfrm>
-            <a:off x="3796556" y="886715"/>
-            <a:ext cx="2157663" cy="307777"/>
+            <a:off x="6443377" y="294018"/>
+            <a:ext cx="1878331" cy="369332"/>
           </a:xfrm>
           <a:prstGeom prst="rect">
             <a:avLst/>
@@ -11505,142 +11460,10 @@
           <a:lstStyle/>
           <a:p>
             <a:r>
-              <a:rPr lang="en-US" sz="1400" dirty="0" smtClean="0"/>
-              <a:t>Trust Client [Normal world]</a:t>
-            </a:r>
-            <a:endParaRPr lang="en-SG" sz="1400" dirty="0"/>
-          </a:p>
-        </p:txBody>
-      </p:sp>
-      <p:sp>
-        <p:nvSpPr>
-          <p:cNvPr id="11" name="TextBox 10"/>
-          <p:cNvSpPr txBox="1"/>
-          <p:nvPr/>
-        </p:nvSpPr>
-        <p:spPr>
-          <a:xfrm>
-            <a:off x="7623210" y="886715"/>
-            <a:ext cx="2157663" cy="307777"/>
-          </a:xfrm>
-          <a:prstGeom prst="rect">
-            <a:avLst/>
-          </a:prstGeom>
-          <a:noFill/>
-        </p:spPr>
-        <p:txBody>
-          <a:bodyPr wrap="square" rtlCol="0">
-            <a:spAutoFit/>
-          </a:bodyPr>
-          <a:lstStyle/>
-          <a:p>
-            <a:r>
-              <a:rPr lang="en-US" sz="1400" dirty="0" smtClean="0"/>
-              <a:t>Server program</a:t>
-            </a:r>
-            <a:endParaRPr lang="en-SG" sz="1400" dirty="0"/>
-          </a:p>
-        </p:txBody>
-      </p:sp>
-      <p:sp>
-        <p:nvSpPr>
-          <p:cNvPr id="27" name="TextBox 26"/>
-          <p:cNvSpPr txBox="1"/>
-          <p:nvPr/>
-        </p:nvSpPr>
-        <p:spPr>
-          <a:xfrm>
-            <a:off x="1624262" y="294018"/>
-            <a:ext cx="1590576" cy="369332"/>
-          </a:xfrm>
-          <a:prstGeom prst="rect">
-            <a:avLst/>
-          </a:prstGeom>
-          <a:noFill/>
-        </p:spPr>
-        <p:txBody>
-          <a:bodyPr wrap="square" rtlCol="0">
-            <a:spAutoFit/>
-          </a:bodyPr>
-          <a:lstStyle/>
-          <a:p>
-            <a:r>
-              <a:rPr lang="en-US" dirty="0" smtClean="0"/>
-              <a:t>Raspberry PI </a:t>
-            </a:r>
-            <a:endParaRPr lang="en-SG" dirty="0"/>
-          </a:p>
-        </p:txBody>
-      </p:sp>
-      <p:sp>
-        <p:nvSpPr>
-          <p:cNvPr id="28" name="TextBox 27"/>
-          <p:cNvSpPr txBox="1"/>
-          <p:nvPr/>
-        </p:nvSpPr>
-        <p:spPr>
-          <a:xfrm>
-            <a:off x="7352297" y="288753"/>
-            <a:ext cx="1878331" cy="369332"/>
-          </a:xfrm>
-          <a:prstGeom prst="rect">
-            <a:avLst/>
-          </a:prstGeom>
-          <a:noFill/>
-        </p:spPr>
-        <p:txBody>
-          <a:bodyPr wrap="square" rtlCol="0">
-            <a:spAutoFit/>
-          </a:bodyPr>
-          <a:lstStyle/>
-          <a:p>
-            <a:r>
               <a:rPr lang="en-US" dirty="0" smtClean="0"/>
               <a:t>Server Computer</a:t>
             </a:r>
             <a:endParaRPr lang="en-SG" dirty="0"/>
-          </a:p>
-        </p:txBody>
-      </p:sp>
-      <p:sp>
-        <p:nvSpPr>
-          <p:cNvPr id="31" name="Rectangle 30"/>
-          <p:cNvSpPr/>
-          <p:nvPr/>
-        </p:nvSpPr>
-        <p:spPr>
-          <a:xfrm>
-            <a:off x="1867301" y="1217210"/>
-            <a:ext cx="1566512" cy="365992"/>
-          </a:xfrm>
-          <a:prstGeom prst="rect">
-            <a:avLst/>
-          </a:prstGeom>
-          <a:ln w="19050"/>
-        </p:spPr>
-        <p:style>
-          <a:lnRef idx="2">
-            <a:schemeClr val="dk1"/>
-          </a:lnRef>
-          <a:fillRef idx="1">
-            <a:schemeClr val="lt1"/>
-          </a:fillRef>
-          <a:effectRef idx="0">
-            <a:schemeClr val="dk1"/>
-          </a:effectRef>
-          <a:fontRef idx="minor">
-            <a:schemeClr val="dk1"/>
-          </a:fontRef>
-        </p:style>
-        <p:txBody>
-          <a:bodyPr rtlCol="0" anchor="ctr"/>
-          <a:lstStyle/>
-          <a:p>
-            <a:r>
-              <a:rPr lang="en-US" sz="1100" dirty="0" smtClean="0"/>
-              <a:t>Random fetch a AES256 key from key list in TA</a:t>
-            </a:r>
-            <a:endParaRPr lang="en-SG" sz="1100" dirty="0"/>
           </a:p>
         </p:txBody>
       </p:sp>
@@ -11666,8 +11489,8 @@
         </p:blipFill>
         <p:spPr>
           <a:xfrm>
-            <a:off x="1294251" y="1217210"/>
-            <a:ext cx="365992" cy="365992"/>
+            <a:off x="1735375" y="771126"/>
+            <a:ext cx="334183" cy="334183"/>
           </a:xfrm>
           <a:prstGeom prst="rect">
             <a:avLst/>
@@ -11682,8 +11505,8 @@
         </p:nvSpPr>
         <p:spPr>
           <a:xfrm>
-            <a:off x="2019701" y="1369610"/>
-            <a:ext cx="1566512" cy="365992"/>
+            <a:off x="3447916" y="861186"/>
+            <a:ext cx="1305437" cy="297092"/>
           </a:xfrm>
           <a:prstGeom prst="rect">
             <a:avLst/>
@@ -11710,12 +11533,929 @@
           <a:p>
             <a:r>
               <a:rPr lang="en-US" sz="1100" dirty="0" smtClean="0"/>
-              <a:t>Random fetch a AES256 key from key list in TA</a:t>
+              <a:t>Client program init </a:t>
             </a:r>
             <a:endParaRPr lang="en-SG" sz="1100" dirty="0"/>
           </a:p>
         </p:txBody>
       </p:sp>
+      <p:sp>
+        <p:nvSpPr>
+          <p:cNvPr id="2" name="TextBox 1"/>
+          <p:cNvSpPr txBox="1"/>
+          <p:nvPr/>
+        </p:nvSpPr>
+        <p:spPr>
+          <a:xfrm>
+            <a:off x="1521429" y="1107140"/>
+            <a:ext cx="986821" cy="230832"/>
+          </a:xfrm>
+          <a:prstGeom prst="rect">
+            <a:avLst/>
+          </a:prstGeom>
+          <a:noFill/>
+        </p:spPr>
+        <p:txBody>
+          <a:bodyPr wrap="square" rtlCol="0">
+            <a:spAutoFit/>
+          </a:bodyPr>
+          <a:lstStyle/>
+          <a:p>
+            <a:r>
+              <a:rPr lang="en-SG" sz="900" dirty="0" smtClean="0"/>
+              <a:t>SSL </a:t>
+            </a:r>
+            <a:r>
+              <a:rPr lang="en-SG" sz="900" dirty="0"/>
+              <a:t>certificate</a:t>
+            </a:r>
+          </a:p>
+        </p:txBody>
+      </p:sp>
+      <p:pic>
+        <p:nvPicPr>
+          <p:cNvPr id="19" name="Picture 18"/>
+          <p:cNvPicPr>
+            <a:picLocks noChangeAspect="1"/>
+          </p:cNvPicPr>
+          <p:nvPr/>
+        </p:nvPicPr>
+        <p:blipFill>
+          <a:blip r:embed="rId2" cstate="print">
+            <a:extLst>
+              <a:ext uri="{28A0092B-C50C-407E-A947-70E740481C1C}">
+                <a14:useLocalDpi xmlns:a14="http://schemas.microsoft.com/office/drawing/2010/main" val="0"/>
+              </a:ext>
+            </a:extLst>
+          </a:blip>
+          <a:stretch>
+            <a:fillRect/>
+          </a:stretch>
+        </p:blipFill>
+        <p:spPr>
+          <a:xfrm>
+            <a:off x="2507842" y="757568"/>
+            <a:ext cx="334183" cy="334183"/>
+          </a:xfrm>
+          <a:prstGeom prst="rect">
+            <a:avLst/>
+          </a:prstGeom>
+        </p:spPr>
+      </p:pic>
+      <p:sp>
+        <p:nvSpPr>
+          <p:cNvPr id="20" name="TextBox 19"/>
+          <p:cNvSpPr txBox="1"/>
+          <p:nvPr/>
+        </p:nvSpPr>
+        <p:spPr>
+          <a:xfrm>
+            <a:off x="2295126" y="1108645"/>
+            <a:ext cx="986821" cy="230832"/>
+          </a:xfrm>
+          <a:prstGeom prst="rect">
+            <a:avLst/>
+          </a:prstGeom>
+          <a:noFill/>
+        </p:spPr>
+        <p:txBody>
+          <a:bodyPr wrap="square" rtlCol="0">
+            <a:spAutoFit/>
+          </a:bodyPr>
+          <a:lstStyle/>
+          <a:p>
+            <a:r>
+              <a:rPr lang="en-SG" sz="900" dirty="0" smtClean="0"/>
+              <a:t>SSL client key</a:t>
+            </a:r>
+            <a:endParaRPr lang="en-SG" sz="900" dirty="0"/>
+          </a:p>
+        </p:txBody>
+      </p:sp>
+      <p:sp>
+        <p:nvSpPr>
+          <p:cNvPr id="22" name="Rectangle 21"/>
+          <p:cNvSpPr/>
+          <p:nvPr/>
+        </p:nvSpPr>
+        <p:spPr>
+          <a:xfrm>
+            <a:off x="1582567" y="1452198"/>
+            <a:ext cx="1489187" cy="297092"/>
+          </a:xfrm>
+          <a:prstGeom prst="rect">
+            <a:avLst/>
+          </a:prstGeom>
+          <a:ln w="19050"/>
+        </p:spPr>
+        <p:style>
+          <a:lnRef idx="2">
+            <a:schemeClr val="dk1"/>
+          </a:lnRef>
+          <a:fillRef idx="1">
+            <a:schemeClr val="lt1"/>
+          </a:fillRef>
+          <a:effectRef idx="0">
+            <a:schemeClr val="dk1"/>
+          </a:effectRef>
+          <a:fontRef idx="minor">
+            <a:schemeClr val="dk1"/>
+          </a:fontRef>
+        </p:style>
+        <p:txBody>
+          <a:bodyPr rtlCol="0" anchor="ctr"/>
+          <a:lstStyle/>
+          <a:p>
+            <a:r>
+              <a:rPr lang="en-US" sz="1100" dirty="0" smtClean="0"/>
+              <a:t>User name + password</a:t>
+            </a:r>
+            <a:endParaRPr lang="en-SG" sz="1100" dirty="0"/>
+          </a:p>
+        </p:txBody>
+      </p:sp>
+      <p:sp>
+        <p:nvSpPr>
+          <p:cNvPr id="23" name="Rectangle 22"/>
+          <p:cNvSpPr/>
+          <p:nvPr/>
+        </p:nvSpPr>
+        <p:spPr>
+          <a:xfrm>
+            <a:off x="6481553" y="851934"/>
+            <a:ext cx="1358521" cy="297092"/>
+          </a:xfrm>
+          <a:prstGeom prst="rect">
+            <a:avLst/>
+          </a:prstGeom>
+          <a:ln w="19050"/>
+        </p:spPr>
+        <p:style>
+          <a:lnRef idx="2">
+            <a:schemeClr val="dk1"/>
+          </a:lnRef>
+          <a:fillRef idx="1">
+            <a:schemeClr val="lt1"/>
+          </a:fillRef>
+          <a:effectRef idx="0">
+            <a:schemeClr val="dk1"/>
+          </a:effectRef>
+          <a:fontRef idx="minor">
+            <a:schemeClr val="dk1"/>
+          </a:fontRef>
+        </p:style>
+        <p:txBody>
+          <a:bodyPr rtlCol="0" anchor="ctr"/>
+          <a:lstStyle/>
+          <a:p>
+            <a:r>
+              <a:rPr lang="en-US" sz="1100" dirty="0" smtClean="0"/>
+              <a:t>Server </a:t>
+            </a:r>
+            <a:r>
+              <a:rPr lang="en-US" sz="1100" dirty="0" smtClean="0"/>
+              <a:t> program init </a:t>
+            </a:r>
+            <a:endParaRPr lang="en-SG" sz="1100" dirty="0"/>
+          </a:p>
+        </p:txBody>
+      </p:sp>
+      <p:pic>
+        <p:nvPicPr>
+          <p:cNvPr id="34" name="Picture 33"/>
+          <p:cNvPicPr>
+            <a:picLocks noChangeAspect="1"/>
+          </p:cNvPicPr>
+          <p:nvPr/>
+        </p:nvPicPr>
+        <p:blipFill>
+          <a:blip r:embed="rId2" cstate="print">
+            <a:extLst>
+              <a:ext uri="{28A0092B-C50C-407E-A947-70E740481C1C}">
+                <a14:useLocalDpi xmlns:a14="http://schemas.microsoft.com/office/drawing/2010/main" val="0"/>
+              </a:ext>
+            </a:extLst>
+          </a:blip>
+          <a:stretch>
+            <a:fillRect/>
+          </a:stretch>
+        </p:blipFill>
+        <p:spPr>
+          <a:xfrm>
+            <a:off x="8301087" y="771125"/>
+            <a:ext cx="334183" cy="334183"/>
+          </a:xfrm>
+          <a:prstGeom prst="rect">
+            <a:avLst/>
+          </a:prstGeom>
+        </p:spPr>
+      </p:pic>
+      <p:sp>
+        <p:nvSpPr>
+          <p:cNvPr id="35" name="TextBox 34"/>
+          <p:cNvSpPr txBox="1"/>
+          <p:nvPr/>
+        </p:nvSpPr>
+        <p:spPr>
+          <a:xfrm>
+            <a:off x="8077489" y="1107499"/>
+            <a:ext cx="986821" cy="230832"/>
+          </a:xfrm>
+          <a:prstGeom prst="rect">
+            <a:avLst/>
+          </a:prstGeom>
+          <a:noFill/>
+        </p:spPr>
+        <p:txBody>
+          <a:bodyPr wrap="square" rtlCol="0">
+            <a:spAutoFit/>
+          </a:bodyPr>
+          <a:lstStyle/>
+          <a:p>
+            <a:r>
+              <a:rPr lang="en-SG" sz="900" dirty="0" smtClean="0"/>
+              <a:t>SSL </a:t>
+            </a:r>
+            <a:r>
+              <a:rPr lang="en-SG" sz="900" dirty="0"/>
+              <a:t>certificate</a:t>
+            </a:r>
+          </a:p>
+        </p:txBody>
+      </p:sp>
+      <p:pic>
+        <p:nvPicPr>
+          <p:cNvPr id="36" name="Picture 35"/>
+          <p:cNvPicPr>
+            <a:picLocks noChangeAspect="1"/>
+          </p:cNvPicPr>
+          <p:nvPr/>
+        </p:nvPicPr>
+        <p:blipFill>
+          <a:blip r:embed="rId2" cstate="print">
+            <a:extLst>
+              <a:ext uri="{28A0092B-C50C-407E-A947-70E740481C1C}">
+                <a14:useLocalDpi xmlns:a14="http://schemas.microsoft.com/office/drawing/2010/main" val="0"/>
+              </a:ext>
+            </a:extLst>
+          </a:blip>
+          <a:stretch>
+            <a:fillRect/>
+          </a:stretch>
+        </p:blipFill>
+        <p:spPr>
+          <a:xfrm>
+            <a:off x="9109563" y="768500"/>
+            <a:ext cx="334183" cy="334183"/>
+          </a:xfrm>
+          <a:prstGeom prst="rect">
+            <a:avLst/>
+          </a:prstGeom>
+        </p:spPr>
+      </p:pic>
+      <p:sp>
+        <p:nvSpPr>
+          <p:cNvPr id="37" name="TextBox 36"/>
+          <p:cNvSpPr txBox="1"/>
+          <p:nvPr/>
+        </p:nvSpPr>
+        <p:spPr>
+          <a:xfrm>
+            <a:off x="8885496" y="1107140"/>
+            <a:ext cx="986821" cy="230832"/>
+          </a:xfrm>
+          <a:prstGeom prst="rect">
+            <a:avLst/>
+          </a:prstGeom>
+          <a:noFill/>
+        </p:spPr>
+        <p:txBody>
+          <a:bodyPr wrap="square" rtlCol="0">
+            <a:spAutoFit/>
+          </a:bodyPr>
+          <a:lstStyle/>
+          <a:p>
+            <a:r>
+              <a:rPr lang="en-SG" sz="900" dirty="0" smtClean="0"/>
+              <a:t>SSL server key</a:t>
+            </a:r>
+            <a:endParaRPr lang="en-SG" sz="900" dirty="0"/>
+          </a:p>
+        </p:txBody>
+      </p:sp>
+      <p:cxnSp>
+        <p:nvCxnSpPr>
+          <p:cNvPr id="12" name="Straight Arrow Connector 11"/>
+          <p:cNvCxnSpPr/>
+          <p:nvPr/>
+        </p:nvCxnSpPr>
+        <p:spPr>
+          <a:xfrm flipV="1">
+            <a:off x="4815368" y="1009732"/>
+            <a:ext cx="1628009" cy="1"/>
+          </a:xfrm>
+          <a:prstGeom prst="straightConnector1">
+            <a:avLst/>
+          </a:prstGeom>
+          <a:ln>
+            <a:tailEnd type="triangle"/>
+          </a:ln>
+        </p:spPr>
+        <p:style>
+          <a:lnRef idx="1">
+            <a:schemeClr val="dk1"/>
+          </a:lnRef>
+          <a:fillRef idx="0">
+            <a:schemeClr val="dk1"/>
+          </a:fillRef>
+          <a:effectRef idx="0">
+            <a:schemeClr val="dk1"/>
+          </a:effectRef>
+          <a:fontRef idx="minor">
+            <a:schemeClr val="tx1"/>
+          </a:fontRef>
+        </p:style>
+      </p:cxnSp>
+      <p:sp>
+        <p:nvSpPr>
+          <p:cNvPr id="40" name="TextBox 39"/>
+          <p:cNvSpPr txBox="1"/>
+          <p:nvPr/>
+        </p:nvSpPr>
+        <p:spPr>
+          <a:xfrm>
+            <a:off x="4936230" y="778900"/>
+            <a:ext cx="1187045" cy="230832"/>
+          </a:xfrm>
+          <a:prstGeom prst="rect">
+            <a:avLst/>
+          </a:prstGeom>
+          <a:noFill/>
+        </p:spPr>
+        <p:txBody>
+          <a:bodyPr wrap="square" rtlCol="0">
+            <a:spAutoFit/>
+          </a:bodyPr>
+          <a:lstStyle/>
+          <a:p>
+            <a:r>
+              <a:rPr lang="en-US" sz="900" dirty="0" smtClean="0"/>
+              <a:t>Connection request</a:t>
+            </a:r>
+            <a:endParaRPr lang="en-SG" sz="900" dirty="0"/>
+          </a:p>
+        </p:txBody>
+      </p:sp>
+      <p:sp>
+        <p:nvSpPr>
+          <p:cNvPr id="41" name="Plus 40"/>
+          <p:cNvSpPr/>
+          <p:nvPr/>
+        </p:nvSpPr>
+        <p:spPr>
+          <a:xfrm>
+            <a:off x="2172266" y="829317"/>
+            <a:ext cx="218672" cy="236692"/>
+          </a:xfrm>
+          <a:prstGeom prst="mathPlus">
+            <a:avLst/>
+          </a:prstGeom>
+          <a:noFill/>
+          <a:ln w="9525" cap="flat" cmpd="sng" algn="ctr">
+            <a:solidFill>
+              <a:schemeClr val="dk1"/>
+            </a:solidFill>
+            <a:prstDash val="solid"/>
+            <a:round/>
+            <a:headEnd type="none" w="med" len="med"/>
+            <a:tailEnd type="none" w="med" len="med"/>
+          </a:ln>
+        </p:spPr>
+        <p:style>
+          <a:lnRef idx="0">
+            <a:scrgbClr r="0" g="0" b="0"/>
+          </a:lnRef>
+          <a:fillRef idx="0">
+            <a:scrgbClr r="0" g="0" b="0"/>
+          </a:fillRef>
+          <a:effectRef idx="0">
+            <a:scrgbClr r="0" g="0" b="0"/>
+          </a:effectRef>
+          <a:fontRef idx="minor">
+            <a:schemeClr val="dk1"/>
+          </a:fontRef>
+        </p:style>
+        <p:txBody>
+          <a:bodyPr rtlCol="0" anchor="ctr"/>
+          <a:lstStyle/>
+          <a:p>
+            <a:pPr algn="ctr"/>
+            <a:endParaRPr lang="en-SG"/>
+          </a:p>
+        </p:txBody>
+      </p:sp>
+      <p:sp>
+        <p:nvSpPr>
+          <p:cNvPr id="42" name="Plus 41"/>
+          <p:cNvSpPr/>
+          <p:nvPr/>
+        </p:nvSpPr>
+        <p:spPr>
+          <a:xfrm>
+            <a:off x="8766788" y="849433"/>
+            <a:ext cx="218672" cy="236692"/>
+          </a:xfrm>
+          <a:prstGeom prst="mathPlus">
+            <a:avLst/>
+          </a:prstGeom>
+          <a:noFill/>
+          <a:ln w="9525" cap="flat" cmpd="sng" algn="ctr">
+            <a:solidFill>
+              <a:schemeClr val="dk1"/>
+            </a:solidFill>
+            <a:prstDash val="solid"/>
+            <a:round/>
+            <a:headEnd type="none" w="med" len="med"/>
+            <a:tailEnd type="none" w="med" len="med"/>
+          </a:ln>
+        </p:spPr>
+        <p:style>
+          <a:lnRef idx="0">
+            <a:scrgbClr r="0" g="0" b="0"/>
+          </a:lnRef>
+          <a:fillRef idx="0">
+            <a:scrgbClr r="0" g="0" b="0"/>
+          </a:fillRef>
+          <a:effectRef idx="0">
+            <a:scrgbClr r="0" g="0" b="0"/>
+          </a:effectRef>
+          <a:fontRef idx="minor">
+            <a:schemeClr val="dk1"/>
+          </a:fontRef>
+        </p:style>
+        <p:txBody>
+          <a:bodyPr rtlCol="0" anchor="ctr"/>
+          <a:lstStyle/>
+          <a:p>
+            <a:pPr algn="ctr"/>
+            <a:endParaRPr lang="en-SG"/>
+          </a:p>
+        </p:txBody>
+      </p:sp>
+      <p:cxnSp>
+        <p:nvCxnSpPr>
+          <p:cNvPr id="44" name="Straight Arrow Connector 43"/>
+          <p:cNvCxnSpPr/>
+          <p:nvPr/>
+        </p:nvCxnSpPr>
+        <p:spPr>
+          <a:xfrm>
+            <a:off x="2989385" y="967779"/>
+            <a:ext cx="422919" cy="0"/>
+          </a:xfrm>
+          <a:prstGeom prst="straightConnector1">
+            <a:avLst/>
+          </a:prstGeom>
+          <a:ln>
+            <a:tailEnd type="triangle"/>
+          </a:ln>
+        </p:spPr>
+        <p:style>
+          <a:lnRef idx="1">
+            <a:schemeClr val="dk1"/>
+          </a:lnRef>
+          <a:fillRef idx="0">
+            <a:schemeClr val="dk1"/>
+          </a:fillRef>
+          <a:effectRef idx="0">
+            <a:schemeClr val="dk1"/>
+          </a:effectRef>
+          <a:fontRef idx="minor">
+            <a:schemeClr val="tx1"/>
+          </a:fontRef>
+        </p:style>
+      </p:cxnSp>
+      <p:cxnSp>
+        <p:nvCxnSpPr>
+          <p:cNvPr id="46" name="Straight Arrow Connector 45"/>
+          <p:cNvCxnSpPr/>
+          <p:nvPr/>
+        </p:nvCxnSpPr>
+        <p:spPr>
+          <a:xfrm flipH="1">
+            <a:off x="7840075" y="967779"/>
+            <a:ext cx="461012" cy="0"/>
+          </a:xfrm>
+          <a:prstGeom prst="straightConnector1">
+            <a:avLst/>
+          </a:prstGeom>
+          <a:ln>
+            <a:tailEnd type="triangle"/>
+          </a:ln>
+        </p:spPr>
+        <p:style>
+          <a:lnRef idx="1">
+            <a:schemeClr val="dk1"/>
+          </a:lnRef>
+          <a:fillRef idx="0">
+            <a:schemeClr val="dk1"/>
+          </a:fillRef>
+          <a:effectRef idx="0">
+            <a:schemeClr val="dk1"/>
+          </a:effectRef>
+          <a:fontRef idx="minor">
+            <a:schemeClr val="tx1"/>
+          </a:fontRef>
+        </p:style>
+      </p:cxnSp>
+      <p:sp>
+        <p:nvSpPr>
+          <p:cNvPr id="50" name="TextBox 49"/>
+          <p:cNvSpPr txBox="1"/>
+          <p:nvPr/>
+        </p:nvSpPr>
+        <p:spPr>
+          <a:xfrm>
+            <a:off x="7907450" y="757568"/>
+            <a:ext cx="414258" cy="230832"/>
+          </a:xfrm>
+          <a:prstGeom prst="rect">
+            <a:avLst/>
+          </a:prstGeom>
+          <a:noFill/>
+        </p:spPr>
+        <p:txBody>
+          <a:bodyPr wrap="square" rtlCol="0">
+            <a:spAutoFit/>
+          </a:bodyPr>
+          <a:lstStyle/>
+          <a:p>
+            <a:r>
+              <a:rPr lang="en-US" sz="900" dirty="0" smtClean="0"/>
+              <a:t>load</a:t>
+            </a:r>
+            <a:endParaRPr lang="en-SG" sz="900" dirty="0"/>
+          </a:p>
+        </p:txBody>
+      </p:sp>
+      <p:sp>
+        <p:nvSpPr>
+          <p:cNvPr id="51" name="TextBox 50"/>
+          <p:cNvSpPr txBox="1"/>
+          <p:nvPr/>
+        </p:nvSpPr>
+        <p:spPr>
+          <a:xfrm>
+            <a:off x="2990561" y="736195"/>
+            <a:ext cx="414258" cy="230832"/>
+          </a:xfrm>
+          <a:prstGeom prst="rect">
+            <a:avLst/>
+          </a:prstGeom>
+          <a:noFill/>
+        </p:spPr>
+        <p:txBody>
+          <a:bodyPr wrap="square" rtlCol="0">
+            <a:spAutoFit/>
+          </a:bodyPr>
+          <a:lstStyle/>
+          <a:p>
+            <a:r>
+              <a:rPr lang="en-US" sz="900" dirty="0" smtClean="0"/>
+              <a:t>load</a:t>
+            </a:r>
+            <a:endParaRPr lang="en-SG" sz="900" dirty="0"/>
+          </a:p>
+        </p:txBody>
+      </p:sp>
+      <p:sp>
+        <p:nvSpPr>
+          <p:cNvPr id="52" name="Rectangle 51"/>
+          <p:cNvSpPr/>
+          <p:nvPr/>
+        </p:nvSpPr>
+        <p:spPr>
+          <a:xfrm>
+            <a:off x="3447916" y="1452199"/>
+            <a:ext cx="1305437" cy="297092"/>
+          </a:xfrm>
+          <a:prstGeom prst="rect">
+            <a:avLst/>
+          </a:prstGeom>
+          <a:ln w="19050"/>
+        </p:spPr>
+        <p:style>
+          <a:lnRef idx="2">
+            <a:schemeClr val="dk1"/>
+          </a:lnRef>
+          <a:fillRef idx="1">
+            <a:schemeClr val="lt1"/>
+          </a:fillRef>
+          <a:effectRef idx="0">
+            <a:schemeClr val="dk1"/>
+          </a:effectRef>
+          <a:fontRef idx="minor">
+            <a:schemeClr val="dk1"/>
+          </a:fontRef>
+        </p:style>
+        <p:txBody>
+          <a:bodyPr rtlCol="0" anchor="ctr"/>
+          <a:lstStyle/>
+          <a:p>
+            <a:r>
+              <a:rPr lang="en-US" sz="1100" dirty="0" smtClean="0"/>
+              <a:t>Collect login data</a:t>
+            </a:r>
+            <a:endParaRPr lang="en-SG" sz="1100" dirty="0"/>
+          </a:p>
+        </p:txBody>
+      </p:sp>
+      <p:cxnSp>
+        <p:nvCxnSpPr>
+          <p:cNvPr id="54" name="Elbow Connector 53"/>
+          <p:cNvCxnSpPr/>
+          <p:nvPr/>
+        </p:nvCxnSpPr>
+        <p:spPr>
+          <a:xfrm rot="10800000" flipV="1">
+            <a:off x="4753353" y="1158277"/>
+            <a:ext cx="2407460" cy="442467"/>
+          </a:xfrm>
+          <a:prstGeom prst="bentConnector3">
+            <a:avLst>
+              <a:gd name="adj1" fmla="val 331"/>
+            </a:avLst>
+          </a:prstGeom>
+          <a:ln>
+            <a:tailEnd type="triangle"/>
+          </a:ln>
+        </p:spPr>
+        <p:style>
+          <a:lnRef idx="1">
+            <a:schemeClr val="dk1"/>
+          </a:lnRef>
+          <a:fillRef idx="0">
+            <a:schemeClr val="dk1"/>
+          </a:fillRef>
+          <a:effectRef idx="0">
+            <a:schemeClr val="dk1"/>
+          </a:effectRef>
+          <a:fontRef idx="minor">
+            <a:schemeClr val="tx1"/>
+          </a:fontRef>
+        </p:style>
+      </p:cxnSp>
+      <p:sp>
+        <p:nvSpPr>
+          <p:cNvPr id="56" name="TextBox 55"/>
+          <p:cNvSpPr txBox="1"/>
+          <p:nvPr/>
+        </p:nvSpPr>
+        <p:spPr>
+          <a:xfrm>
+            <a:off x="4950992" y="1356114"/>
+            <a:ext cx="1187045" cy="230832"/>
+          </a:xfrm>
+          <a:prstGeom prst="rect">
+            <a:avLst/>
+          </a:prstGeom>
+          <a:noFill/>
+        </p:spPr>
+        <p:txBody>
+          <a:bodyPr wrap="square" rtlCol="0">
+            <a:spAutoFit/>
+          </a:bodyPr>
+          <a:lstStyle/>
+          <a:p>
+            <a:r>
+              <a:rPr lang="en-US" sz="900" dirty="0" smtClean="0"/>
+              <a:t>Connection confirm</a:t>
+            </a:r>
+            <a:endParaRPr lang="en-SG" sz="900" dirty="0"/>
+          </a:p>
+        </p:txBody>
+      </p:sp>
+      <p:cxnSp>
+        <p:nvCxnSpPr>
+          <p:cNvPr id="58" name="Straight Arrow Connector 57"/>
+          <p:cNvCxnSpPr>
+            <a:stCxn id="22" idx="3"/>
+            <a:endCxn id="52" idx="1"/>
+          </p:cNvCxnSpPr>
+          <p:nvPr/>
+        </p:nvCxnSpPr>
+        <p:spPr>
+          <a:xfrm>
+            <a:off x="3071754" y="1600744"/>
+            <a:ext cx="376162" cy="1"/>
+          </a:xfrm>
+          <a:prstGeom prst="straightConnector1">
+            <a:avLst/>
+          </a:prstGeom>
+          <a:ln>
+            <a:tailEnd type="triangle"/>
+          </a:ln>
+        </p:spPr>
+        <p:style>
+          <a:lnRef idx="1">
+            <a:schemeClr val="dk1"/>
+          </a:lnRef>
+          <a:fillRef idx="0">
+            <a:schemeClr val="dk1"/>
+          </a:fillRef>
+          <a:effectRef idx="0">
+            <a:schemeClr val="dk1"/>
+          </a:effectRef>
+          <a:fontRef idx="minor">
+            <a:schemeClr val="tx1"/>
+          </a:fontRef>
+        </p:style>
+      </p:cxnSp>
+      <p:sp>
+        <p:nvSpPr>
+          <p:cNvPr id="62" name="Flowchart: Magnetic Disk 61"/>
+          <p:cNvSpPr/>
+          <p:nvPr/>
+        </p:nvSpPr>
+        <p:spPr>
+          <a:xfrm>
+            <a:off x="8449630" y="1379510"/>
+            <a:ext cx="392782" cy="380759"/>
+          </a:xfrm>
+          <a:prstGeom prst="flowChartMagneticDisk">
+            <a:avLst/>
+          </a:prstGeom>
+        </p:spPr>
+        <p:style>
+          <a:lnRef idx="2">
+            <a:schemeClr val="dk1"/>
+          </a:lnRef>
+          <a:fillRef idx="1">
+            <a:schemeClr val="lt1"/>
+          </a:fillRef>
+          <a:effectRef idx="0">
+            <a:schemeClr val="dk1"/>
+          </a:effectRef>
+          <a:fontRef idx="minor">
+            <a:schemeClr val="dk1"/>
+          </a:fontRef>
+        </p:style>
+        <p:txBody>
+          <a:bodyPr rtlCol="0" anchor="ctr"/>
+          <a:lstStyle/>
+          <a:p>
+            <a:pPr algn="ctr"/>
+            <a:endParaRPr lang="en-SG"/>
+          </a:p>
+        </p:txBody>
+      </p:sp>
+      <p:cxnSp>
+        <p:nvCxnSpPr>
+          <p:cNvPr id="64" name="Elbow Connector 63"/>
+          <p:cNvCxnSpPr/>
+          <p:nvPr/>
+        </p:nvCxnSpPr>
+        <p:spPr>
+          <a:xfrm>
+            <a:off x="4024993" y="1749291"/>
+            <a:ext cx="2701703" cy="389214"/>
+          </a:xfrm>
+          <a:prstGeom prst="bentConnector3">
+            <a:avLst>
+              <a:gd name="adj1" fmla="val 208"/>
+            </a:avLst>
+          </a:prstGeom>
+          <a:ln>
+            <a:tailEnd type="triangle"/>
+          </a:ln>
+        </p:spPr>
+        <p:style>
+          <a:lnRef idx="1">
+            <a:schemeClr val="dk1"/>
+          </a:lnRef>
+          <a:fillRef idx="0">
+            <a:schemeClr val="dk1"/>
+          </a:fillRef>
+          <a:effectRef idx="0">
+            <a:schemeClr val="dk1"/>
+          </a:effectRef>
+          <a:fontRef idx="minor">
+            <a:schemeClr val="tx1"/>
+          </a:fontRef>
+        </p:style>
+      </p:cxnSp>
+      <p:cxnSp>
+        <p:nvCxnSpPr>
+          <p:cNvPr id="70" name="Elbow Connector 69"/>
+          <p:cNvCxnSpPr/>
+          <p:nvPr/>
+        </p:nvCxnSpPr>
+        <p:spPr>
+          <a:xfrm rot="10800000" flipV="1">
+            <a:off x="7515114" y="1568265"/>
+            <a:ext cx="891149" cy="351569"/>
+          </a:xfrm>
+          <a:prstGeom prst="bentConnector3">
+            <a:avLst>
+              <a:gd name="adj1" fmla="val 99331"/>
+            </a:avLst>
+          </a:prstGeom>
+          <a:ln>
+            <a:tailEnd type="triangle"/>
+          </a:ln>
+        </p:spPr>
+        <p:style>
+          <a:lnRef idx="1">
+            <a:schemeClr val="dk1"/>
+          </a:lnRef>
+          <a:fillRef idx="0">
+            <a:schemeClr val="dk1"/>
+          </a:fillRef>
+          <a:effectRef idx="0">
+            <a:schemeClr val="dk1"/>
+          </a:effectRef>
+          <a:fontRef idx="minor">
+            <a:schemeClr val="tx1"/>
+          </a:fontRef>
+        </p:style>
+      </p:cxnSp>
+      <p:sp>
+        <p:nvSpPr>
+          <p:cNvPr id="72" name="Diamond 71"/>
+          <p:cNvSpPr/>
+          <p:nvPr/>
+        </p:nvSpPr>
+        <p:spPr>
+          <a:xfrm>
+            <a:off x="6738437" y="1918196"/>
+            <a:ext cx="1667826" cy="440618"/>
+          </a:xfrm>
+          <a:prstGeom prst="diamond">
+            <a:avLst/>
+          </a:prstGeom>
+        </p:spPr>
+        <p:style>
+          <a:lnRef idx="2">
+            <a:schemeClr val="dk1"/>
+          </a:lnRef>
+          <a:fillRef idx="1">
+            <a:schemeClr val="lt1"/>
+          </a:fillRef>
+          <a:effectRef idx="0">
+            <a:schemeClr val="dk1"/>
+          </a:effectRef>
+          <a:fontRef idx="minor">
+            <a:schemeClr val="dk1"/>
+          </a:fontRef>
+        </p:style>
+        <p:txBody>
+          <a:bodyPr rtlCol="0" anchor="ctr"/>
+          <a:lstStyle/>
+          <a:p>
+            <a:pPr algn="ctr"/>
+            <a:r>
+              <a:rPr lang="en-US" sz="900" dirty="0" smtClean="0"/>
+              <a:t>Authorization user ?</a:t>
+            </a:r>
+            <a:endParaRPr lang="en-SG" sz="900" dirty="0"/>
+          </a:p>
+        </p:txBody>
+      </p:sp>
+      <p:cxnSp>
+        <p:nvCxnSpPr>
+          <p:cNvPr id="76" name="Straight Arrow Connector 75"/>
+          <p:cNvCxnSpPr>
+            <a:stCxn id="72" idx="2"/>
+          </p:cNvCxnSpPr>
+          <p:nvPr/>
+        </p:nvCxnSpPr>
+        <p:spPr>
+          <a:xfrm>
+            <a:off x="7572350" y="2358814"/>
+            <a:ext cx="6619" cy="270086"/>
+          </a:xfrm>
+          <a:prstGeom prst="straightConnector1">
+            <a:avLst/>
+          </a:prstGeom>
+          <a:ln>
+            <a:tailEnd type="triangle"/>
+          </a:ln>
+        </p:spPr>
+        <p:style>
+          <a:lnRef idx="1">
+            <a:schemeClr val="accent1"/>
+          </a:lnRef>
+          <a:fillRef idx="0">
+            <a:schemeClr val="accent1"/>
+          </a:fillRef>
+          <a:effectRef idx="0">
+            <a:schemeClr val="accent1"/>
+          </a:effectRef>
+          <a:fontRef idx="minor">
+            <a:schemeClr val="tx1"/>
+          </a:fontRef>
+        </p:style>
+      </p:cxnSp>
     </p:spTree>
     <p:extLst>
       <p:ext uri="{BB962C8B-B14F-4D97-AF65-F5344CB8AC3E}">
@@ -11811,11 +12551,7 @@
           <a:p>
             <a:r>
               <a:rPr lang="en-US" sz="1400" dirty="0" smtClean="0"/>
-              <a:t>HMI </a:t>
-            </a:r>
-            <a:r>
-              <a:rPr lang="en-US" sz="1400" dirty="0" smtClean="0"/>
-              <a:t>computer</a:t>
+              <a:t>HMI computer</a:t>
             </a:r>
           </a:p>
           <a:p>
@@ -11931,11 +12667,7 @@
           <a:p>
             <a:r>
               <a:rPr lang="en-US" sz="1400" dirty="0" smtClean="0"/>
-              <a:t>PLC </a:t>
-            </a:r>
-            <a:r>
-              <a:rPr lang="en-US" sz="1400" dirty="0" smtClean="0"/>
-              <a:t>1</a:t>
+              <a:t>PLC 1</a:t>
             </a:r>
           </a:p>
           <a:p>
@@ -11943,7 +12675,6 @@
               <a:rPr lang="en-US" sz="1400" dirty="0" smtClean="0"/>
               <a:t>(Schneider M221)</a:t>
             </a:r>
-            <a:endParaRPr lang="en-US" sz="1400" dirty="0" smtClean="0"/>
           </a:p>
           <a:p>
             <a:r>
@@ -12545,15 +13276,7 @@
           <a:p>
             <a:r>
               <a:rPr lang="en-US" sz="1100" dirty="0" smtClean="0"/>
-              <a:t>1. </a:t>
-            </a:r>
-            <a:r>
-              <a:rPr lang="en-US" sz="1100" dirty="0" smtClean="0"/>
-              <a:t> False Plc </a:t>
-            </a:r>
-            <a:r>
-              <a:rPr lang="en-US" sz="1100" dirty="0" smtClean="0"/>
-              <a:t>coil change </a:t>
+              <a:t>1.  False Plc coil change </a:t>
             </a:r>
             <a:r>
               <a:rPr lang="en-US" sz="1100" dirty="0" err="1" smtClean="0"/>
@@ -12715,15 +13438,7 @@
           <a:p>
             <a:r>
               <a:rPr lang="en-US" sz="1100" dirty="0" smtClean="0"/>
-              <a:t> 4. </a:t>
-            </a:r>
-            <a:r>
-              <a:rPr lang="en-US" sz="1100" dirty="0" smtClean="0"/>
-              <a:t>False Plc </a:t>
-            </a:r>
-            <a:r>
-              <a:rPr lang="en-US" sz="1100" dirty="0" smtClean="0"/>
-              <a:t>state </a:t>
+              <a:t> 4. False Plc state </a:t>
             </a:r>
             <a:r>
               <a:rPr lang="en-US" sz="1100" dirty="0"/>
@@ -12783,11 +13498,7 @@
           <a:p>
             <a:r>
               <a:rPr lang="en-US" dirty="0" smtClean="0"/>
-              <a:t>Normal </a:t>
-            </a:r>
-            <a:r>
-              <a:rPr lang="en-US" dirty="0" smtClean="0"/>
-              <a:t>HMI-PLC control sequence </a:t>
+              <a:t>Normal HMI-PLC control sequence </a:t>
             </a:r>
             <a:endParaRPr lang="en-SG" dirty="0"/>
           </a:p>
@@ -12817,19 +13528,7 @@
           <a:p>
             <a:r>
               <a:rPr lang="en-US" dirty="0" smtClean="0"/>
-              <a:t>After </a:t>
-            </a:r>
-            <a:r>
-              <a:rPr lang="en-US" dirty="0" smtClean="0"/>
-              <a:t>false data </a:t>
-            </a:r>
-            <a:r>
-              <a:rPr lang="en-US" dirty="0" smtClean="0"/>
-              <a:t>injection </a:t>
-            </a:r>
-            <a:r>
-              <a:rPr lang="en-US" dirty="0" smtClean="0"/>
-              <a:t>attack</a:t>
+              <a:t>After false data injection attack</a:t>
             </a:r>
             <a:endParaRPr lang="en-SG" dirty="0"/>
           </a:p>
@@ -12859,11 +13558,7 @@
           <a:p>
             <a:r>
               <a:rPr lang="en-US" sz="1400" dirty="0" smtClean="0"/>
-              <a:t>HMI </a:t>
-            </a:r>
-            <a:r>
-              <a:rPr lang="en-US" sz="1400" dirty="0" smtClean="0"/>
-              <a:t>computer</a:t>
+              <a:t>HMI computer</a:t>
             </a:r>
           </a:p>
           <a:p>
@@ -12905,11 +13600,7 @@
           <a:p>
             <a:r>
               <a:rPr lang="en-US" sz="1400" dirty="0" smtClean="0"/>
-              <a:t>PLC </a:t>
-            </a:r>
-            <a:r>
-              <a:rPr lang="en-US" sz="1400" dirty="0" smtClean="0"/>
-              <a:t>1</a:t>
+              <a:t>PLC 1</a:t>
             </a:r>
           </a:p>
           <a:p>
@@ -12917,7 +13608,6 @@
               <a:rPr lang="en-US" sz="1400" dirty="0" smtClean="0"/>
               <a:t>(Schneider M221)</a:t>
             </a:r>
-            <a:endParaRPr lang="en-US" sz="1400" dirty="0" smtClean="0"/>
           </a:p>
           <a:p>
             <a:r>
@@ -13115,11 +13805,7 @@
           <a:p>
             <a:r>
               <a:rPr lang="en-US" sz="1400" dirty="0" smtClean="0"/>
-              <a:t>HMI </a:t>
-            </a:r>
-            <a:r>
-              <a:rPr lang="en-US" sz="1400" dirty="0" smtClean="0"/>
-              <a:t>computer</a:t>
+              <a:t>HMI computer</a:t>
             </a:r>
           </a:p>
           <a:p>
@@ -13235,11 +13921,7 @@
           <a:p>
             <a:r>
               <a:rPr lang="en-US" sz="1400" dirty="0" smtClean="0"/>
-              <a:t>PLC </a:t>
-            </a:r>
-            <a:r>
-              <a:rPr lang="en-US" sz="1400" dirty="0" smtClean="0"/>
-              <a:t>1</a:t>
+              <a:t>PLC 1</a:t>
             </a:r>
           </a:p>
           <a:p>
@@ -13247,7 +13929,6 @@
               <a:rPr lang="en-US" sz="1400" dirty="0" smtClean="0"/>
               <a:t>(Schneider M221)</a:t>
             </a:r>
-            <a:endParaRPr lang="en-US" sz="1400" dirty="0" smtClean="0"/>
           </a:p>
           <a:p>
             <a:r>
@@ -13676,11 +14357,7 @@
           <a:p>
             <a:r>
               <a:rPr lang="en-US" sz="1100" dirty="0" smtClean="0"/>
-              <a:t>2. Plc coil </a:t>
-            </a:r>
-            <a:r>
-              <a:rPr lang="en-US" sz="1100" dirty="0" smtClean="0"/>
-              <a:t>changed </a:t>
+              <a:t>2. Plc coil changed </a:t>
             </a:r>
             <a:r>
               <a:rPr lang="en-US" sz="1100" dirty="0" err="1" smtClean="0"/>
@@ -13688,11 +14365,7 @@
             </a:r>
             <a:r>
               <a:rPr lang="en-US" sz="1100" dirty="0" smtClean="0"/>
-              <a:t> executed </a:t>
-            </a:r>
-            <a:r>
-              <a:rPr lang="en-US" sz="1100" dirty="0" smtClean="0"/>
-              <a:t>feed back</a:t>
+              <a:t> executed feed back</a:t>
             </a:r>
             <a:endParaRPr lang="en-SG" sz="1100" dirty="0"/>
           </a:p>
@@ -13827,11 +14500,7 @@
           <a:p>
             <a:r>
               <a:rPr lang="en-US" dirty="0" smtClean="0"/>
-              <a:t>Normal </a:t>
-            </a:r>
-            <a:r>
-              <a:rPr lang="en-US" dirty="0" smtClean="0"/>
-              <a:t>HMI-PLC control sequence </a:t>
+              <a:t>Normal HMI-PLC control sequence </a:t>
             </a:r>
             <a:endParaRPr lang="en-SG" dirty="0"/>
           </a:p>
@@ -13899,11 +14568,7 @@
           <a:p>
             <a:r>
               <a:rPr lang="en-US" sz="1400" dirty="0" smtClean="0"/>
-              <a:t>HMI </a:t>
-            </a:r>
-            <a:r>
-              <a:rPr lang="en-US" sz="1400" dirty="0" smtClean="0"/>
-              <a:t>computer</a:t>
+              <a:t>HMI computer</a:t>
             </a:r>
           </a:p>
           <a:p>
@@ -13945,11 +14610,7 @@
           <a:p>
             <a:r>
               <a:rPr lang="en-US" sz="1400" dirty="0" smtClean="0"/>
-              <a:t>PLC </a:t>
-            </a:r>
-            <a:r>
-              <a:rPr lang="en-US" sz="1400" dirty="0" smtClean="0"/>
-              <a:t>1</a:t>
+              <a:t>PLC 1</a:t>
             </a:r>
           </a:p>
           <a:p>
@@ -13957,7 +14618,6 @@
               <a:rPr lang="en-US" sz="1400" dirty="0" smtClean="0"/>
               <a:t>(Schneider M221)</a:t>
             </a:r>
-            <a:endParaRPr lang="en-US" sz="1400" dirty="0" smtClean="0"/>
           </a:p>
           <a:p>
             <a:r>
@@ -14354,11 +15014,7 @@
             </a:r>
             <a:r>
               <a:rPr lang="en-US" sz="1100" dirty="0" smtClean="0"/>
-              <a:t>. </a:t>
-            </a:r>
-            <a:r>
-              <a:rPr lang="en-US" sz="1100" dirty="0" smtClean="0"/>
-              <a:t>Plc coil change </a:t>
+              <a:t>. Plc coil change </a:t>
             </a:r>
             <a:r>
               <a:rPr lang="en-US" sz="1100" dirty="0" err="1" smtClean="0"/>
@@ -14392,11 +15048,7 @@
           <a:p>
             <a:r>
               <a:rPr lang="en-US" sz="1100" dirty="0" smtClean="0"/>
-              <a:t>5</a:t>
-            </a:r>
-            <a:r>
-              <a:rPr lang="en-US" sz="1100" dirty="0" smtClean="0"/>
-              <a:t>. Mod bus TCP </a:t>
+              <a:t>5. Mod bus TCP </a:t>
             </a:r>
             <a:r>
               <a:rPr lang="en-US" sz="1100" dirty="0"/>
@@ -24260,15 +24912,7 @@
           <a:p>
             <a:r>
               <a:rPr lang="en-US" sz="800" b="1" dirty="0" smtClean="0"/>
-              <a:t>0 . </a:t>
-            </a:r>
-            <a:r>
-              <a:rPr lang="en-US" sz="800" b="1" dirty="0" err="1" smtClean="0"/>
-              <a:t>Init</a:t>
-            </a:r>
-            <a:r>
-              <a:rPr lang="en-US" sz="800" b="1" dirty="0" smtClean="0"/>
-              <a:t> TCP client  and load </a:t>
+              <a:t>0 . Init TCP client  and load </a:t>
             </a:r>
             <a:r>
               <a:rPr lang="en-US" sz="800" b="1" dirty="0"/>
@@ -25351,15 +25995,7 @@
             </a:r>
             <a:r>
               <a:rPr lang="en-US" sz="800" b="1" dirty="0" smtClean="0"/>
-              <a:t>. Forward new </a:t>
-            </a:r>
-            <a:r>
-              <a:rPr lang="en-US" sz="800" b="1" dirty="0" err="1" smtClean="0"/>
-              <a:t>init</a:t>
-            </a:r>
-            <a:r>
-              <a:rPr lang="en-US" sz="800" b="1" dirty="0" smtClean="0"/>
-              <a:t> seed, swat-seed, state[n], file bytes to TA </a:t>
+              <a:t>. Forward new init seed, swat-seed, state[n], file bytes to TA </a:t>
             </a:r>
             <a:endParaRPr lang="en-SG" sz="800" b="1" dirty="0"/>
           </a:p>

</xml_diff>

<commit_message>
Added the signature generation steps.
</commit_message>
<xml_diff>
--- a/doc/firmwaresignWF.pptx
+++ b/doc/firmwaresignWF.pptx
@@ -5,7 +5,7 @@
     <p:sldMasterId id="2147483648" r:id="rId1"/>
   </p:sldMasterIdLst>
   <p:notesMasterIdLst>
-    <p:notesMasterId r:id="rId17"/>
+    <p:notesMasterId r:id="rId18"/>
   </p:notesMasterIdLst>
   <p:sldIdLst>
     <p:sldId id="256" r:id="rId2"/>
@@ -21,8 +21,9 @@
     <p:sldId id="267" r:id="rId12"/>
     <p:sldId id="269" r:id="rId13"/>
     <p:sldId id="265" r:id="rId14"/>
-    <p:sldId id="268" r:id="rId15"/>
-    <p:sldId id="271" r:id="rId16"/>
+    <p:sldId id="272" r:id="rId15"/>
+    <p:sldId id="268" r:id="rId16"/>
+    <p:sldId id="271" r:id="rId17"/>
   </p:sldIdLst>
   <p:sldSz cx="12192000" cy="6858000"/>
   <p:notesSz cx="6858000" cy="9144000"/>
@@ -11259,7 +11260,7 @@
         <p:spPr>
           <a:xfrm>
             <a:off x="1474573" y="658083"/>
-            <a:ext cx="3476419" cy="2524731"/>
+            <a:ext cx="3476419" cy="2524732"/>
           </a:xfrm>
           <a:prstGeom prst="rect">
             <a:avLst/>
@@ -12352,7 +12353,7 @@
         </p:nvCxnSpPr>
         <p:spPr>
           <a:xfrm rot="10800000" flipV="1">
-            <a:off x="7515114" y="1568265"/>
+            <a:off x="7572350" y="1538452"/>
             <a:ext cx="891149" cy="351569"/>
           </a:xfrm>
           <a:prstGeom prst="bentConnector3">
@@ -12424,15 +12425,13 @@
       <p:cxnSp>
         <p:nvCxnSpPr>
           <p:cNvPr id="76" name="Straight Arrow Connector 75"/>
-          <p:cNvCxnSpPr>
-            <a:stCxn id="72" idx="2"/>
-          </p:cNvCxnSpPr>
+          <p:cNvCxnSpPr/>
           <p:nvPr/>
         </p:nvCxnSpPr>
         <p:spPr>
           <a:xfrm>
-            <a:off x="7572350" y="2358814"/>
-            <a:ext cx="6619" cy="270086"/>
+            <a:off x="8411385" y="2127982"/>
+            <a:ext cx="6619" cy="531209"/>
           </a:xfrm>
           <a:prstGeom prst="straightConnector1">
             <a:avLst/>
@@ -12443,19 +12442,234 @@
         </p:spPr>
         <p:style>
           <a:lnRef idx="1">
-            <a:schemeClr val="accent1"/>
+            <a:schemeClr val="dk1"/>
           </a:lnRef>
           <a:fillRef idx="0">
-            <a:schemeClr val="accent1"/>
-          </a:fillRef>
-          <a:effectRef idx="0">
-            <a:schemeClr val="accent1"/>
+            <a:schemeClr val="dk1"/>
+          </a:fillRef>
+          <a:effectRef idx="0">
+            <a:schemeClr val="dk1"/>
           </a:effectRef>
           <a:fontRef idx="minor">
             <a:schemeClr val="tx1"/>
           </a:fontRef>
         </p:style>
       </p:cxnSp>
+      <p:sp>
+        <p:nvSpPr>
+          <p:cNvPr id="77" name="TextBox 76"/>
+          <p:cNvSpPr txBox="1"/>
+          <p:nvPr/>
+        </p:nvSpPr>
+        <p:spPr>
+          <a:xfrm>
+            <a:off x="8438892" y="2278170"/>
+            <a:ext cx="414258" cy="230832"/>
+          </a:xfrm>
+          <a:prstGeom prst="rect">
+            <a:avLst/>
+          </a:prstGeom>
+          <a:noFill/>
+        </p:spPr>
+        <p:txBody>
+          <a:bodyPr wrap="square" rtlCol="0">
+            <a:spAutoFit/>
+          </a:bodyPr>
+          <a:lstStyle/>
+          <a:p>
+            <a:r>
+              <a:rPr lang="en-US" sz="900" dirty="0" smtClean="0"/>
+              <a:t>Yes</a:t>
+            </a:r>
+            <a:endParaRPr lang="en-SG" sz="900" dirty="0"/>
+          </a:p>
+        </p:txBody>
+      </p:sp>
+      <p:sp>
+        <p:nvSpPr>
+          <p:cNvPr id="79" name="Rectangle 78"/>
+          <p:cNvSpPr/>
+          <p:nvPr/>
+        </p:nvSpPr>
+        <p:spPr>
+          <a:xfrm>
+            <a:off x="6580703" y="2676266"/>
+            <a:ext cx="2483607" cy="297092"/>
+          </a:xfrm>
+          <a:prstGeom prst="rect">
+            <a:avLst/>
+          </a:prstGeom>
+          <a:ln w="19050"/>
+        </p:spPr>
+        <p:style>
+          <a:lnRef idx="2">
+            <a:schemeClr val="dk1"/>
+          </a:lnRef>
+          <a:fillRef idx="1">
+            <a:schemeClr val="lt1"/>
+          </a:fillRef>
+          <a:effectRef idx="0">
+            <a:schemeClr val="dk1"/>
+          </a:effectRef>
+          <a:fontRef idx="minor">
+            <a:schemeClr val="dk1"/>
+          </a:fontRef>
+        </p:style>
+        <p:txBody>
+          <a:bodyPr rtlCol="0" anchor="ctr"/>
+          <a:lstStyle/>
+          <a:p>
+            <a:r>
+              <a:rPr lang="en-US" sz="1100" dirty="0" smtClean="0"/>
+              <a:t>Generate random SWATT challenge Str</a:t>
+            </a:r>
+            <a:endParaRPr lang="en-SG" sz="1100" dirty="0"/>
+          </a:p>
+        </p:txBody>
+      </p:sp>
+      <p:cxnSp>
+        <p:nvCxnSpPr>
+          <p:cNvPr id="81" name="Straight Arrow Connector 80"/>
+          <p:cNvCxnSpPr>
+            <a:stCxn id="79" idx="1"/>
+          </p:cNvCxnSpPr>
+          <p:nvPr/>
+        </p:nvCxnSpPr>
+        <p:spPr>
+          <a:xfrm flipH="1" flipV="1">
+            <a:off x="3185962" y="2820202"/>
+            <a:ext cx="3394741" cy="4610"/>
+          </a:xfrm>
+          <a:prstGeom prst="straightConnector1">
+            <a:avLst/>
+          </a:prstGeom>
+          <a:ln>
+            <a:tailEnd type="triangle"/>
+          </a:ln>
+        </p:spPr>
+        <p:style>
+          <a:lnRef idx="1">
+            <a:schemeClr val="dk1"/>
+          </a:lnRef>
+          <a:fillRef idx="0">
+            <a:schemeClr val="dk1"/>
+          </a:fillRef>
+          <a:effectRef idx="0">
+            <a:schemeClr val="dk1"/>
+          </a:effectRef>
+          <a:fontRef idx="minor">
+            <a:schemeClr val="tx1"/>
+          </a:fontRef>
+        </p:style>
+      </p:cxnSp>
+      <p:cxnSp>
+        <p:nvCxnSpPr>
+          <p:cNvPr id="84" name="Elbow Connector 83"/>
+          <p:cNvCxnSpPr/>
+          <p:nvPr/>
+        </p:nvCxnSpPr>
+        <p:spPr>
+          <a:xfrm rot="5400000" flipH="1">
+            <a:off x="5257060" y="56182"/>
+            <a:ext cx="545383" cy="4059882"/>
+          </a:xfrm>
+          <a:prstGeom prst="bentConnector4">
+            <a:avLst>
+              <a:gd name="adj1" fmla="val -31326"/>
+              <a:gd name="adj2" fmla="val 100100"/>
+            </a:avLst>
+          </a:prstGeom>
+          <a:ln>
+            <a:tailEnd type="triangle"/>
+          </a:ln>
+        </p:spPr>
+        <p:style>
+          <a:lnRef idx="1">
+            <a:schemeClr val="dk1"/>
+          </a:lnRef>
+          <a:fillRef idx="0">
+            <a:schemeClr val="dk1"/>
+          </a:fillRef>
+          <a:effectRef idx="0">
+            <a:schemeClr val="dk1"/>
+          </a:effectRef>
+          <a:fontRef idx="minor">
+            <a:schemeClr val="tx1"/>
+          </a:fontRef>
+        </p:style>
+      </p:cxnSp>
+      <p:sp>
+        <p:nvSpPr>
+          <p:cNvPr id="89" name="TextBox 88"/>
+          <p:cNvSpPr txBox="1"/>
+          <p:nvPr/>
+        </p:nvSpPr>
+        <p:spPr>
+          <a:xfrm>
+            <a:off x="7072648" y="2307539"/>
+            <a:ext cx="414258" cy="230832"/>
+          </a:xfrm>
+          <a:prstGeom prst="rect">
+            <a:avLst/>
+          </a:prstGeom>
+          <a:noFill/>
+        </p:spPr>
+        <p:txBody>
+          <a:bodyPr wrap="square" rtlCol="0">
+            <a:spAutoFit/>
+          </a:bodyPr>
+          <a:lstStyle/>
+          <a:p>
+            <a:r>
+              <a:rPr lang="en-US" sz="900" dirty="0" smtClean="0"/>
+              <a:t>No</a:t>
+            </a:r>
+            <a:endParaRPr lang="en-SG" sz="900" dirty="0"/>
+          </a:p>
+        </p:txBody>
+      </p:sp>
+      <p:sp>
+        <p:nvSpPr>
+          <p:cNvPr id="90" name="Rectangle 89"/>
+          <p:cNvSpPr/>
+          <p:nvPr/>
+        </p:nvSpPr>
+        <p:spPr>
+          <a:xfrm>
+            <a:off x="1622108" y="2659191"/>
+            <a:ext cx="1489187" cy="297092"/>
+          </a:xfrm>
+          <a:prstGeom prst="rect">
+            <a:avLst/>
+          </a:prstGeom>
+          <a:ln w="19050"/>
+        </p:spPr>
+        <p:style>
+          <a:lnRef idx="2">
+            <a:schemeClr val="dk1"/>
+          </a:lnRef>
+          <a:fillRef idx="1">
+            <a:schemeClr val="lt1"/>
+          </a:fillRef>
+          <a:effectRef idx="0">
+            <a:schemeClr val="dk1"/>
+          </a:effectRef>
+          <a:fontRef idx="minor">
+            <a:schemeClr val="dk1"/>
+          </a:fontRef>
+        </p:style>
+        <p:txBody>
+          <a:bodyPr rtlCol="0" anchor="ctr"/>
+          <a:lstStyle/>
+          <a:p>
+            <a:r>
+              <a:rPr lang="en-US" sz="1100" dirty="0" smtClean="0"/>
+              <a:t>Select firmware file</a:t>
+            </a:r>
+            <a:endParaRPr lang="en-SG" sz="1100" dirty="0"/>
+          </a:p>
+        </p:txBody>
+      </p:sp>
     </p:spTree>
     <p:extLst>
       <p:ext uri="{BB962C8B-B14F-4D97-AF65-F5344CB8AC3E}">
@@ -12488,6 +12702,1844 @@
       </p:grpSpPr>
       <p:sp>
         <p:nvSpPr>
+          <p:cNvPr id="85" name="Rectangle 84"/>
+          <p:cNvSpPr/>
+          <p:nvPr/>
+        </p:nvSpPr>
+        <p:spPr>
+          <a:xfrm>
+            <a:off x="320050" y="719204"/>
+            <a:ext cx="4831559" cy="2489796"/>
+          </a:xfrm>
+          <a:prstGeom prst="rect">
+            <a:avLst/>
+          </a:prstGeom>
+          <a:ln>
+            <a:prstDash val="sysDot"/>
+          </a:ln>
+        </p:spPr>
+        <p:style>
+          <a:lnRef idx="2">
+            <a:schemeClr val="dk1"/>
+          </a:lnRef>
+          <a:fillRef idx="1">
+            <a:schemeClr val="lt1"/>
+          </a:fillRef>
+          <a:effectRef idx="0">
+            <a:schemeClr val="dk1"/>
+          </a:effectRef>
+          <a:fontRef idx="minor">
+            <a:schemeClr val="dk1"/>
+          </a:fontRef>
+        </p:style>
+        <p:txBody>
+          <a:bodyPr rtlCol="0" anchor="ctr"/>
+          <a:lstStyle/>
+          <a:p>
+            <a:pPr algn="ctr"/>
+            <a:endParaRPr lang="en-SG"/>
+          </a:p>
+        </p:txBody>
+      </p:sp>
+      <p:sp>
+        <p:nvSpPr>
+          <p:cNvPr id="86" name="TextBox 85"/>
+          <p:cNvSpPr txBox="1"/>
+          <p:nvPr/>
+        </p:nvSpPr>
+        <p:spPr>
+          <a:xfrm>
+            <a:off x="757007" y="299128"/>
+            <a:ext cx="3762239" cy="369332"/>
+          </a:xfrm>
+          <a:prstGeom prst="rect">
+            <a:avLst/>
+          </a:prstGeom>
+          <a:noFill/>
+        </p:spPr>
+        <p:txBody>
+          <a:bodyPr wrap="square" rtlCol="0">
+            <a:spAutoFit/>
+          </a:bodyPr>
+          <a:lstStyle/>
+          <a:p>
+            <a:r>
+              <a:rPr lang="en-US" dirty="0" smtClean="0"/>
+              <a:t>Firmware Flashing </a:t>
+            </a:r>
+            <a:r>
+              <a:rPr lang="en-US" dirty="0"/>
+              <a:t>C</a:t>
+            </a:r>
+            <a:r>
+              <a:rPr lang="en-US" dirty="0" smtClean="0"/>
+              <a:t>omputer</a:t>
+            </a:r>
+            <a:r>
+              <a:rPr lang="en-US" dirty="0" smtClean="0"/>
+              <a:t> </a:t>
+            </a:r>
+            <a:endParaRPr lang="en-SG" dirty="0"/>
+          </a:p>
+        </p:txBody>
+      </p:sp>
+      <p:sp>
+        <p:nvSpPr>
+          <p:cNvPr id="45" name="TextBox 44"/>
+          <p:cNvSpPr txBox="1"/>
+          <p:nvPr/>
+        </p:nvSpPr>
+        <p:spPr>
+          <a:xfrm>
+            <a:off x="693654" y="1417071"/>
+            <a:ext cx="4272982" cy="261610"/>
+          </a:xfrm>
+          <a:prstGeom prst="rect">
+            <a:avLst/>
+          </a:prstGeom>
+          <a:ln w="19050">
+            <a:solidFill>
+              <a:schemeClr val="tx1"/>
+            </a:solidFill>
+          </a:ln>
+        </p:spPr>
+        <p:style>
+          <a:lnRef idx="2">
+            <a:schemeClr val="accent1"/>
+          </a:lnRef>
+          <a:fillRef idx="1">
+            <a:schemeClr val="lt1"/>
+          </a:fillRef>
+          <a:effectRef idx="0">
+            <a:schemeClr val="accent1"/>
+          </a:effectRef>
+          <a:fontRef idx="minor">
+            <a:schemeClr val="dk1"/>
+          </a:fontRef>
+        </p:style>
+        <p:txBody>
+          <a:bodyPr wrap="square" rtlCol="0">
+            <a:spAutoFit/>
+          </a:bodyPr>
+          <a:lstStyle/>
+          <a:p>
+            <a:r>
+              <a:rPr lang="en-SG" sz="1100" dirty="0" smtClean="0"/>
+              <a:t>IOT</a:t>
+            </a:r>
+            <a:r>
+              <a:rPr lang="en-SG" sz="1100" dirty="0" smtClean="0"/>
+              <a:t>_id + </a:t>
+            </a:r>
+            <a:r>
+              <a:rPr lang="en-SG" sz="1100" dirty="0" smtClean="0"/>
+              <a:t>S</a:t>
+            </a:r>
+            <a:r>
+              <a:rPr lang="en-SG" sz="1100" dirty="0" smtClean="0"/>
+              <a:t>igner_id + </a:t>
+            </a:r>
+            <a:r>
+              <a:rPr lang="en-SG" sz="1100" dirty="0"/>
+              <a:t>S</a:t>
+            </a:r>
+            <a:r>
+              <a:rPr lang="en-SG" sz="1100" dirty="0" smtClean="0"/>
+              <a:t>watt_str </a:t>
+            </a:r>
+            <a:r>
+              <a:rPr lang="en-SG" sz="1100" dirty="0" smtClean="0"/>
+              <a:t>+ </a:t>
+            </a:r>
+            <a:r>
+              <a:rPr lang="en-SG" sz="1100" dirty="0" smtClean="0"/>
+              <a:t>T</a:t>
+            </a:r>
+            <a:r>
+              <a:rPr lang="en-SG" sz="1100" dirty="0" smtClean="0"/>
+              <a:t>ime </a:t>
+            </a:r>
+            <a:r>
+              <a:rPr lang="en-SG" sz="1100" dirty="0" smtClean="0"/>
+              <a:t>+ </a:t>
+            </a:r>
+            <a:r>
+              <a:rPr lang="en-SG" sz="1100" dirty="0" smtClean="0"/>
+              <a:t>IOT dev type</a:t>
+            </a:r>
+            <a:r>
+              <a:rPr lang="en-SG" sz="1100" dirty="0" smtClean="0"/>
+              <a:t> </a:t>
+            </a:r>
+            <a:r>
+              <a:rPr lang="en-SG" sz="1100" dirty="0" smtClean="0"/>
+              <a:t>+ </a:t>
+            </a:r>
+            <a:r>
+              <a:rPr lang="en-SG" sz="1100" dirty="0" smtClean="0"/>
+              <a:t>firmware </a:t>
+            </a:r>
+            <a:r>
+              <a:rPr lang="en-SG" sz="1100" dirty="0" smtClean="0"/>
+              <a:t>version</a:t>
+            </a:r>
+            <a:endParaRPr lang="en-SG" sz="1100" dirty="0"/>
+          </a:p>
+        </p:txBody>
+      </p:sp>
+      <p:sp>
+        <p:nvSpPr>
+          <p:cNvPr id="47" name="Rounded Rectangle 46"/>
+          <p:cNvSpPr/>
+          <p:nvPr/>
+        </p:nvSpPr>
+        <p:spPr>
+          <a:xfrm>
+            <a:off x="1568054" y="1906483"/>
+            <a:ext cx="976817" cy="254977"/>
+          </a:xfrm>
+          <a:prstGeom prst="roundRect">
+            <a:avLst/>
+          </a:prstGeom>
+          <a:ln w="19050">
+            <a:solidFill>
+              <a:schemeClr val="tx1"/>
+            </a:solidFill>
+          </a:ln>
+        </p:spPr>
+        <p:style>
+          <a:lnRef idx="2">
+            <a:schemeClr val="accent1"/>
+          </a:lnRef>
+          <a:fillRef idx="1">
+            <a:schemeClr val="lt1"/>
+          </a:fillRef>
+          <a:effectRef idx="0">
+            <a:schemeClr val="accent1"/>
+          </a:effectRef>
+          <a:fontRef idx="minor">
+            <a:schemeClr val="dk1"/>
+          </a:fontRef>
+        </p:style>
+        <p:txBody>
+          <a:bodyPr rtlCol="0" anchor="ctr"/>
+          <a:lstStyle/>
+          <a:p>
+            <a:pPr algn="ctr"/>
+            <a:r>
+              <a:rPr lang="en-SG" sz="1000" dirty="0" smtClean="0"/>
+              <a:t>SHA256 </a:t>
+            </a:r>
+            <a:r>
+              <a:rPr lang="en-US" sz="1000" dirty="0" smtClean="0"/>
+              <a:t>Sign</a:t>
+            </a:r>
+            <a:endParaRPr lang="en-SG" sz="1000" dirty="0"/>
+          </a:p>
+        </p:txBody>
+      </p:sp>
+      <p:cxnSp>
+        <p:nvCxnSpPr>
+          <p:cNvPr id="48" name="Straight Arrow Connector 47"/>
+          <p:cNvCxnSpPr/>
+          <p:nvPr/>
+        </p:nvCxnSpPr>
+        <p:spPr>
+          <a:xfrm>
+            <a:off x="2047670" y="1678681"/>
+            <a:ext cx="0" cy="217496"/>
+          </a:xfrm>
+          <a:prstGeom prst="straightConnector1">
+            <a:avLst/>
+          </a:prstGeom>
+          <a:ln w="12700">
+            <a:solidFill>
+              <a:schemeClr val="tx1"/>
+            </a:solidFill>
+            <a:tailEnd type="triangle"/>
+          </a:ln>
+        </p:spPr>
+        <p:style>
+          <a:lnRef idx="1">
+            <a:schemeClr val="accent1"/>
+          </a:lnRef>
+          <a:fillRef idx="0">
+            <a:schemeClr val="accent1"/>
+          </a:fillRef>
+          <a:effectRef idx="0">
+            <a:schemeClr val="accent1"/>
+          </a:effectRef>
+          <a:fontRef idx="minor">
+            <a:schemeClr val="tx1"/>
+          </a:fontRef>
+        </p:style>
+      </p:cxnSp>
+      <p:cxnSp>
+        <p:nvCxnSpPr>
+          <p:cNvPr id="49" name="Straight Arrow Connector 48"/>
+          <p:cNvCxnSpPr/>
+          <p:nvPr/>
+        </p:nvCxnSpPr>
+        <p:spPr>
+          <a:xfrm flipH="1" flipV="1">
+            <a:off x="2545006" y="2027377"/>
+            <a:ext cx="815696" cy="0"/>
+          </a:xfrm>
+          <a:prstGeom prst="straightConnector1">
+            <a:avLst/>
+          </a:prstGeom>
+          <a:ln>
+            <a:solidFill>
+              <a:schemeClr val="tx1"/>
+            </a:solidFill>
+            <a:tailEnd type="triangle"/>
+          </a:ln>
+        </p:spPr>
+        <p:style>
+          <a:lnRef idx="1">
+            <a:schemeClr val="accent1"/>
+          </a:lnRef>
+          <a:fillRef idx="0">
+            <a:schemeClr val="accent1"/>
+          </a:fillRef>
+          <a:effectRef idx="0">
+            <a:schemeClr val="accent1"/>
+          </a:effectRef>
+          <a:fontRef idx="minor">
+            <a:schemeClr val="tx1"/>
+          </a:fontRef>
+        </p:style>
+      </p:cxnSp>
+      <p:cxnSp>
+        <p:nvCxnSpPr>
+          <p:cNvPr id="55" name="Straight Arrow Connector 54"/>
+          <p:cNvCxnSpPr/>
+          <p:nvPr/>
+        </p:nvCxnSpPr>
+        <p:spPr>
+          <a:xfrm>
+            <a:off x="2047670" y="2159369"/>
+            <a:ext cx="0" cy="318682"/>
+          </a:xfrm>
+          <a:prstGeom prst="straightConnector1">
+            <a:avLst/>
+          </a:prstGeom>
+          <a:ln w="12700">
+            <a:solidFill>
+              <a:schemeClr val="tx1"/>
+            </a:solidFill>
+            <a:tailEnd type="triangle"/>
+          </a:ln>
+        </p:spPr>
+        <p:style>
+          <a:lnRef idx="1">
+            <a:schemeClr val="accent1"/>
+          </a:lnRef>
+          <a:fillRef idx="0">
+            <a:schemeClr val="accent1"/>
+          </a:fillRef>
+          <a:effectRef idx="0">
+            <a:schemeClr val="accent1"/>
+          </a:effectRef>
+          <a:fontRef idx="minor">
+            <a:schemeClr val="tx1"/>
+          </a:fontRef>
+        </p:style>
+      </p:cxnSp>
+      <p:sp>
+        <p:nvSpPr>
+          <p:cNvPr id="57" name="TextBox 56"/>
+          <p:cNvSpPr txBox="1"/>
+          <p:nvPr/>
+        </p:nvSpPr>
+        <p:spPr>
+          <a:xfrm>
+            <a:off x="1479847" y="2483311"/>
+            <a:ext cx="1170700" cy="246221"/>
+          </a:xfrm>
+          <a:prstGeom prst="rect">
+            <a:avLst/>
+          </a:prstGeom>
+          <a:ln w="19050">
+            <a:solidFill>
+              <a:schemeClr val="tx1"/>
+            </a:solidFill>
+          </a:ln>
+        </p:spPr>
+        <p:style>
+          <a:lnRef idx="2">
+            <a:schemeClr val="accent1"/>
+          </a:lnRef>
+          <a:fillRef idx="1">
+            <a:schemeClr val="lt1"/>
+          </a:fillRef>
+          <a:effectRef idx="0">
+            <a:schemeClr val="accent1"/>
+          </a:effectRef>
+          <a:fontRef idx="minor">
+            <a:schemeClr val="dk1"/>
+          </a:fontRef>
+        </p:style>
+        <p:txBody>
+          <a:bodyPr wrap="square" rtlCol="0">
+            <a:spAutoFit/>
+          </a:bodyPr>
+          <a:lstStyle/>
+          <a:p>
+            <a:r>
+              <a:rPr lang="en-US" sz="1000" dirty="0" smtClean="0"/>
+              <a:t>Client signature</a:t>
+            </a:r>
+            <a:endParaRPr lang="en-SG" sz="1000" dirty="0"/>
+          </a:p>
+        </p:txBody>
+      </p:sp>
+      <p:cxnSp>
+        <p:nvCxnSpPr>
+          <p:cNvPr id="59" name="Straight Arrow Connector 58"/>
+          <p:cNvCxnSpPr/>
+          <p:nvPr/>
+        </p:nvCxnSpPr>
+        <p:spPr>
+          <a:xfrm flipH="1">
+            <a:off x="904775" y="1678681"/>
+            <a:ext cx="0" cy="771006"/>
+          </a:xfrm>
+          <a:prstGeom prst="straightConnector1">
+            <a:avLst/>
+          </a:prstGeom>
+          <a:ln w="12700">
+            <a:solidFill>
+              <a:schemeClr val="tx1"/>
+            </a:solidFill>
+            <a:tailEnd type="triangle"/>
+          </a:ln>
+        </p:spPr>
+        <p:style>
+          <a:lnRef idx="1">
+            <a:schemeClr val="accent1"/>
+          </a:lnRef>
+          <a:fillRef idx="0">
+            <a:schemeClr val="accent1"/>
+          </a:fillRef>
+          <a:effectRef idx="0">
+            <a:schemeClr val="accent1"/>
+          </a:effectRef>
+          <a:fontRef idx="minor">
+            <a:schemeClr val="tx1"/>
+          </a:fontRef>
+        </p:style>
+      </p:cxnSp>
+      <p:sp>
+        <p:nvSpPr>
+          <p:cNvPr id="60" name="Rectangle 59"/>
+          <p:cNvSpPr/>
+          <p:nvPr/>
+        </p:nvSpPr>
+        <p:spPr>
+          <a:xfrm>
+            <a:off x="592948" y="2480975"/>
+            <a:ext cx="779867" cy="261610"/>
+          </a:xfrm>
+          <a:prstGeom prst="rect">
+            <a:avLst/>
+          </a:prstGeom>
+          <a:ln w="19050">
+            <a:solidFill>
+              <a:schemeClr val="tx1"/>
+            </a:solidFill>
+          </a:ln>
+        </p:spPr>
+        <p:style>
+          <a:lnRef idx="2">
+            <a:schemeClr val="accent1"/>
+          </a:lnRef>
+          <a:fillRef idx="1">
+            <a:schemeClr val="lt1"/>
+          </a:fillRef>
+          <a:effectRef idx="0">
+            <a:schemeClr val="accent1"/>
+          </a:effectRef>
+          <a:fontRef idx="minor">
+            <a:schemeClr val="dk1"/>
+          </a:fontRef>
+        </p:style>
+        <p:txBody>
+          <a:bodyPr rtlCol="0" anchor="ctr"/>
+          <a:lstStyle/>
+          <a:p>
+            <a:pPr algn="ctr"/>
+            <a:r>
+              <a:rPr lang="en-US" sz="1000" dirty="0" smtClean="0"/>
+              <a:t>IOT</a:t>
+            </a:r>
+            <a:r>
+              <a:rPr lang="en-US" sz="1000" dirty="0" smtClean="0"/>
+              <a:t> </a:t>
+            </a:r>
+            <a:r>
+              <a:rPr lang="en-US" sz="1000" dirty="0" smtClean="0"/>
+              <a:t>info</a:t>
+            </a:r>
+            <a:endParaRPr lang="en-SG" sz="1000" dirty="0"/>
+          </a:p>
+        </p:txBody>
+      </p:sp>
+      <p:sp>
+        <p:nvSpPr>
+          <p:cNvPr id="61" name="Rectangle 60"/>
+          <p:cNvSpPr/>
+          <p:nvPr/>
+        </p:nvSpPr>
+        <p:spPr>
+          <a:xfrm>
+            <a:off x="485916" y="2307970"/>
+            <a:ext cx="2352087" cy="490413"/>
+          </a:xfrm>
+          <a:prstGeom prst="rect">
+            <a:avLst/>
+          </a:prstGeom>
+          <a:noFill/>
+          <a:ln>
+            <a:solidFill>
+              <a:schemeClr val="tx1"/>
+            </a:solidFill>
+          </a:ln>
+        </p:spPr>
+        <p:style>
+          <a:lnRef idx="2">
+            <a:schemeClr val="accent1"/>
+          </a:lnRef>
+          <a:fillRef idx="1">
+            <a:schemeClr val="lt1"/>
+          </a:fillRef>
+          <a:effectRef idx="0">
+            <a:schemeClr val="accent1"/>
+          </a:effectRef>
+          <a:fontRef idx="minor">
+            <a:schemeClr val="dk1"/>
+          </a:fontRef>
+        </p:style>
+        <p:txBody>
+          <a:bodyPr rtlCol="0" anchor="ctr"/>
+          <a:lstStyle/>
+          <a:p>
+            <a:pPr algn="ctr"/>
+            <a:endParaRPr lang="en-SG"/>
+          </a:p>
+        </p:txBody>
+      </p:sp>
+      <p:pic>
+        <p:nvPicPr>
+          <p:cNvPr id="87" name="Picture 86"/>
+          <p:cNvPicPr>
+            <a:picLocks noChangeAspect="1"/>
+          </p:cNvPicPr>
+          <p:nvPr/>
+        </p:nvPicPr>
+        <p:blipFill>
+          <a:blip r:embed="rId2" cstate="print">
+            <a:extLst>
+              <a:ext uri="{28A0092B-C50C-407E-A947-70E740481C1C}">
+                <a14:useLocalDpi xmlns:a14="http://schemas.microsoft.com/office/drawing/2010/main" val="0"/>
+              </a:ext>
+            </a:extLst>
+          </a:blip>
+          <a:stretch>
+            <a:fillRect/>
+          </a:stretch>
+        </p:blipFill>
+        <p:spPr>
+          <a:xfrm>
+            <a:off x="3343851" y="1760396"/>
+            <a:ext cx="334183" cy="334183"/>
+          </a:xfrm>
+          <a:prstGeom prst="rect">
+            <a:avLst/>
+          </a:prstGeom>
+        </p:spPr>
+      </p:pic>
+      <p:sp>
+        <p:nvSpPr>
+          <p:cNvPr id="88" name="TextBox 87"/>
+          <p:cNvSpPr txBox="1"/>
+          <p:nvPr/>
+        </p:nvSpPr>
+        <p:spPr>
+          <a:xfrm>
+            <a:off x="3131135" y="2111473"/>
+            <a:ext cx="986821" cy="230832"/>
+          </a:xfrm>
+          <a:prstGeom prst="rect">
+            <a:avLst/>
+          </a:prstGeom>
+          <a:noFill/>
+        </p:spPr>
+        <p:txBody>
+          <a:bodyPr wrap="square" rtlCol="0">
+            <a:spAutoFit/>
+          </a:bodyPr>
+          <a:lstStyle/>
+          <a:p>
+            <a:r>
+              <a:rPr lang="en-SG" sz="900" dirty="0" smtClean="0"/>
+              <a:t>SSL client key</a:t>
+            </a:r>
+            <a:endParaRPr lang="en-SG" sz="900" dirty="0"/>
+          </a:p>
+        </p:txBody>
+      </p:sp>
+      <p:pic>
+        <p:nvPicPr>
+          <p:cNvPr id="91" name="Picture 90"/>
+          <p:cNvPicPr>
+            <a:picLocks noChangeAspect="1"/>
+          </p:cNvPicPr>
+          <p:nvPr/>
+        </p:nvPicPr>
+        <p:blipFill>
+          <a:blip r:embed="rId2" cstate="print">
+            <a:extLst>
+              <a:ext uri="{28A0092B-C50C-407E-A947-70E740481C1C}">
+                <a14:useLocalDpi xmlns:a14="http://schemas.microsoft.com/office/drawing/2010/main" val="0"/>
+              </a:ext>
+            </a:extLst>
+          </a:blip>
+          <a:stretch>
+            <a:fillRect/>
+          </a:stretch>
+        </p:blipFill>
+        <p:spPr>
+          <a:xfrm>
+            <a:off x="693654" y="777183"/>
+            <a:ext cx="334183" cy="334183"/>
+          </a:xfrm>
+          <a:prstGeom prst="rect">
+            <a:avLst/>
+          </a:prstGeom>
+        </p:spPr>
+      </p:pic>
+      <p:sp>
+        <p:nvSpPr>
+          <p:cNvPr id="92" name="TextBox 91"/>
+          <p:cNvSpPr txBox="1"/>
+          <p:nvPr/>
+        </p:nvSpPr>
+        <p:spPr>
+          <a:xfrm>
+            <a:off x="480938" y="1128260"/>
+            <a:ext cx="986821" cy="230832"/>
+          </a:xfrm>
+          <a:prstGeom prst="rect">
+            <a:avLst/>
+          </a:prstGeom>
+          <a:noFill/>
+        </p:spPr>
+        <p:txBody>
+          <a:bodyPr wrap="square" rtlCol="0">
+            <a:spAutoFit/>
+          </a:bodyPr>
+          <a:lstStyle/>
+          <a:p>
+            <a:r>
+              <a:rPr lang="en-US" sz="900" dirty="0" smtClean="0"/>
+              <a:t>Firmware file</a:t>
+            </a:r>
+            <a:endParaRPr lang="en-SG" sz="900" dirty="0"/>
+          </a:p>
+        </p:txBody>
+      </p:sp>
+      <p:cxnSp>
+        <p:nvCxnSpPr>
+          <p:cNvPr id="11" name="Straight Arrow Connector 10"/>
+          <p:cNvCxnSpPr/>
+          <p:nvPr/>
+        </p:nvCxnSpPr>
+        <p:spPr>
+          <a:xfrm flipV="1">
+            <a:off x="1027837" y="944274"/>
+            <a:ext cx="800963" cy="0"/>
+          </a:xfrm>
+          <a:prstGeom prst="straightConnector1">
+            <a:avLst/>
+          </a:prstGeom>
+          <a:ln>
+            <a:tailEnd type="triangle"/>
+          </a:ln>
+        </p:spPr>
+        <p:style>
+          <a:lnRef idx="1">
+            <a:schemeClr val="dk1"/>
+          </a:lnRef>
+          <a:fillRef idx="0">
+            <a:schemeClr val="dk1"/>
+          </a:fillRef>
+          <a:effectRef idx="0">
+            <a:schemeClr val="dk1"/>
+          </a:effectRef>
+          <a:fontRef idx="minor">
+            <a:schemeClr val="tx1"/>
+          </a:fontRef>
+        </p:style>
+      </p:cxnSp>
+      <p:sp>
+        <p:nvSpPr>
+          <p:cNvPr id="93" name="Rectangle 92"/>
+          <p:cNvSpPr/>
+          <p:nvPr/>
+        </p:nvSpPr>
+        <p:spPr>
+          <a:xfrm>
+            <a:off x="1870680" y="837036"/>
+            <a:ext cx="2152680" cy="261610"/>
+          </a:xfrm>
+          <a:prstGeom prst="rect">
+            <a:avLst/>
+          </a:prstGeom>
+          <a:ln w="19050">
+            <a:solidFill>
+              <a:schemeClr val="tx1"/>
+            </a:solidFill>
+          </a:ln>
+        </p:spPr>
+        <p:style>
+          <a:lnRef idx="2">
+            <a:schemeClr val="accent1"/>
+          </a:lnRef>
+          <a:fillRef idx="1">
+            <a:schemeClr val="lt1"/>
+          </a:fillRef>
+          <a:effectRef idx="0">
+            <a:schemeClr val="accent1"/>
+          </a:effectRef>
+          <a:fontRef idx="minor">
+            <a:schemeClr val="dk1"/>
+          </a:fontRef>
+        </p:style>
+        <p:txBody>
+          <a:bodyPr rtlCol="0" anchor="ctr"/>
+          <a:lstStyle/>
+          <a:p>
+            <a:pPr algn="ctr"/>
+            <a:r>
+              <a:rPr lang="en-US" sz="1000" dirty="0" smtClean="0"/>
+              <a:t>Calculate firmware file SWATT value</a:t>
+            </a:r>
+            <a:endParaRPr lang="en-SG" sz="1000" dirty="0"/>
+          </a:p>
+        </p:txBody>
+      </p:sp>
+      <p:cxnSp>
+        <p:nvCxnSpPr>
+          <p:cNvPr id="94" name="Straight Arrow Connector 93"/>
+          <p:cNvCxnSpPr/>
+          <p:nvPr/>
+        </p:nvCxnSpPr>
+        <p:spPr>
+          <a:xfrm>
+            <a:off x="2248043" y="1098389"/>
+            <a:ext cx="0" cy="318682"/>
+          </a:xfrm>
+          <a:prstGeom prst="straightConnector1">
+            <a:avLst/>
+          </a:prstGeom>
+          <a:ln w="12700">
+            <a:solidFill>
+              <a:schemeClr val="tx1"/>
+            </a:solidFill>
+            <a:tailEnd type="triangle"/>
+          </a:ln>
+        </p:spPr>
+        <p:style>
+          <a:lnRef idx="1">
+            <a:schemeClr val="accent1"/>
+          </a:lnRef>
+          <a:fillRef idx="0">
+            <a:schemeClr val="accent1"/>
+          </a:fillRef>
+          <a:effectRef idx="0">
+            <a:schemeClr val="accent1"/>
+          </a:effectRef>
+          <a:fontRef idx="minor">
+            <a:schemeClr val="tx1"/>
+          </a:fontRef>
+        </p:style>
+      </p:cxnSp>
+      <p:sp>
+        <p:nvSpPr>
+          <p:cNvPr id="95" name="Rectangle 94"/>
+          <p:cNvSpPr/>
+          <p:nvPr/>
+        </p:nvSpPr>
+        <p:spPr>
+          <a:xfrm>
+            <a:off x="6059738" y="700869"/>
+            <a:ext cx="4171918" cy="2519466"/>
+          </a:xfrm>
+          <a:prstGeom prst="rect">
+            <a:avLst/>
+          </a:prstGeom>
+          <a:ln>
+            <a:prstDash val="sysDot"/>
+          </a:ln>
+        </p:spPr>
+        <p:style>
+          <a:lnRef idx="2">
+            <a:schemeClr val="dk1"/>
+          </a:lnRef>
+          <a:fillRef idx="1">
+            <a:schemeClr val="lt1"/>
+          </a:fillRef>
+          <a:effectRef idx="0">
+            <a:schemeClr val="dk1"/>
+          </a:effectRef>
+          <a:fontRef idx="minor">
+            <a:schemeClr val="dk1"/>
+          </a:fontRef>
+        </p:style>
+        <p:txBody>
+          <a:bodyPr rtlCol="0" anchor="ctr"/>
+          <a:lstStyle/>
+          <a:p>
+            <a:pPr algn="ctr"/>
+            <a:endParaRPr lang="en-SG"/>
+          </a:p>
+        </p:txBody>
+      </p:sp>
+      <p:sp>
+        <p:nvSpPr>
+          <p:cNvPr id="96" name="TextBox 95"/>
+          <p:cNvSpPr txBox="1"/>
+          <p:nvPr/>
+        </p:nvSpPr>
+        <p:spPr>
+          <a:xfrm>
+            <a:off x="6443377" y="294018"/>
+            <a:ext cx="1878331" cy="369332"/>
+          </a:xfrm>
+          <a:prstGeom prst="rect">
+            <a:avLst/>
+          </a:prstGeom>
+          <a:noFill/>
+        </p:spPr>
+        <p:txBody>
+          <a:bodyPr wrap="square" rtlCol="0">
+            <a:spAutoFit/>
+          </a:bodyPr>
+          <a:lstStyle/>
+          <a:p>
+            <a:r>
+              <a:rPr lang="en-US" dirty="0" smtClean="0"/>
+              <a:t>Server Computer</a:t>
+            </a:r>
+            <a:endParaRPr lang="en-SG" dirty="0"/>
+          </a:p>
+        </p:txBody>
+      </p:sp>
+      <p:sp>
+        <p:nvSpPr>
+          <p:cNvPr id="97" name="TextBox 96"/>
+          <p:cNvSpPr txBox="1"/>
+          <p:nvPr/>
+        </p:nvSpPr>
+        <p:spPr>
+          <a:xfrm>
+            <a:off x="7114693" y="1496607"/>
+            <a:ext cx="1898875" cy="246221"/>
+          </a:xfrm>
+          <a:prstGeom prst="rect">
+            <a:avLst/>
+          </a:prstGeom>
+          <a:ln w="19050">
+            <a:solidFill>
+              <a:schemeClr val="tx1"/>
+            </a:solidFill>
+          </a:ln>
+        </p:spPr>
+        <p:style>
+          <a:lnRef idx="2">
+            <a:schemeClr val="accent1"/>
+          </a:lnRef>
+          <a:fillRef idx="1">
+            <a:schemeClr val="lt1"/>
+          </a:fillRef>
+          <a:effectRef idx="0">
+            <a:schemeClr val="accent1"/>
+          </a:effectRef>
+          <a:fontRef idx="minor">
+            <a:schemeClr val="dk1"/>
+          </a:fontRef>
+        </p:style>
+        <p:txBody>
+          <a:bodyPr wrap="square" rtlCol="0">
+            <a:spAutoFit/>
+          </a:bodyPr>
+          <a:lstStyle/>
+          <a:p>
+            <a:r>
+              <a:rPr lang="en-US" sz="1000" dirty="0" smtClean="0"/>
+              <a:t>Verify client signature correction</a:t>
+            </a:r>
+            <a:endParaRPr lang="en-SG" sz="1000" dirty="0"/>
+          </a:p>
+        </p:txBody>
+      </p:sp>
+      <p:pic>
+        <p:nvPicPr>
+          <p:cNvPr id="98" name="Picture 97"/>
+          <p:cNvPicPr>
+            <a:picLocks noChangeAspect="1"/>
+          </p:cNvPicPr>
+          <p:nvPr/>
+        </p:nvPicPr>
+        <p:blipFill>
+          <a:blip r:embed="rId2" cstate="print">
+            <a:extLst>
+              <a:ext uri="{28A0092B-C50C-407E-A947-70E740481C1C}">
+                <a14:useLocalDpi xmlns:a14="http://schemas.microsoft.com/office/drawing/2010/main" val="0"/>
+              </a:ext>
+            </a:extLst>
+          </a:blip>
+          <a:stretch>
+            <a:fillRect/>
+          </a:stretch>
+        </p:blipFill>
+        <p:spPr>
+          <a:xfrm>
+            <a:off x="6241329" y="799307"/>
+            <a:ext cx="334183" cy="334183"/>
+          </a:xfrm>
+          <a:prstGeom prst="rect">
+            <a:avLst/>
+          </a:prstGeom>
+        </p:spPr>
+      </p:pic>
+      <p:cxnSp>
+        <p:nvCxnSpPr>
+          <p:cNvPr id="99" name="Straight Arrow Connector 98"/>
+          <p:cNvCxnSpPr/>
+          <p:nvPr/>
+        </p:nvCxnSpPr>
+        <p:spPr>
+          <a:xfrm flipV="1">
+            <a:off x="6575512" y="966398"/>
+            <a:ext cx="800963" cy="0"/>
+          </a:xfrm>
+          <a:prstGeom prst="straightConnector1">
+            <a:avLst/>
+          </a:prstGeom>
+          <a:ln>
+            <a:tailEnd type="triangle"/>
+          </a:ln>
+        </p:spPr>
+        <p:style>
+          <a:lnRef idx="1">
+            <a:schemeClr val="dk1"/>
+          </a:lnRef>
+          <a:fillRef idx="0">
+            <a:schemeClr val="dk1"/>
+          </a:fillRef>
+          <a:effectRef idx="0">
+            <a:schemeClr val="dk1"/>
+          </a:effectRef>
+          <a:fontRef idx="minor">
+            <a:schemeClr val="tx1"/>
+          </a:fontRef>
+        </p:style>
+      </p:cxnSp>
+      <p:sp>
+        <p:nvSpPr>
+          <p:cNvPr id="100" name="Rectangle 99"/>
+          <p:cNvSpPr/>
+          <p:nvPr/>
+        </p:nvSpPr>
+        <p:spPr>
+          <a:xfrm>
+            <a:off x="7418355" y="859160"/>
+            <a:ext cx="2152680" cy="261610"/>
+          </a:xfrm>
+          <a:prstGeom prst="rect">
+            <a:avLst/>
+          </a:prstGeom>
+          <a:ln w="19050">
+            <a:solidFill>
+              <a:schemeClr val="tx1"/>
+            </a:solidFill>
+          </a:ln>
+        </p:spPr>
+        <p:style>
+          <a:lnRef idx="2">
+            <a:schemeClr val="accent1"/>
+          </a:lnRef>
+          <a:fillRef idx="1">
+            <a:schemeClr val="lt1"/>
+          </a:fillRef>
+          <a:effectRef idx="0">
+            <a:schemeClr val="accent1"/>
+          </a:effectRef>
+          <a:fontRef idx="minor">
+            <a:schemeClr val="dk1"/>
+          </a:fontRef>
+        </p:style>
+        <p:txBody>
+          <a:bodyPr rtlCol="0" anchor="ctr"/>
+          <a:lstStyle/>
+          <a:p>
+            <a:pPr algn="ctr"/>
+            <a:r>
+              <a:rPr lang="en-US" sz="1000" dirty="0" smtClean="0"/>
+              <a:t>Calculate firmware file SWATT value</a:t>
+            </a:r>
+            <a:endParaRPr lang="en-SG" sz="1000" dirty="0"/>
+          </a:p>
+        </p:txBody>
+      </p:sp>
+      <p:sp>
+        <p:nvSpPr>
+          <p:cNvPr id="107" name="TextBox 106"/>
+          <p:cNvSpPr txBox="1"/>
+          <p:nvPr/>
+        </p:nvSpPr>
+        <p:spPr>
+          <a:xfrm>
+            <a:off x="6093520" y="1164825"/>
+            <a:ext cx="986821" cy="230832"/>
+          </a:xfrm>
+          <a:prstGeom prst="rect">
+            <a:avLst/>
+          </a:prstGeom>
+          <a:noFill/>
+        </p:spPr>
+        <p:txBody>
+          <a:bodyPr wrap="square" rtlCol="0">
+            <a:spAutoFit/>
+          </a:bodyPr>
+          <a:lstStyle/>
+          <a:p>
+            <a:r>
+              <a:rPr lang="en-US" sz="900" dirty="0" smtClean="0"/>
+              <a:t>Firmware file</a:t>
+            </a:r>
+            <a:endParaRPr lang="en-SG" sz="900" dirty="0"/>
+          </a:p>
+        </p:txBody>
+      </p:sp>
+      <p:cxnSp>
+        <p:nvCxnSpPr>
+          <p:cNvPr id="108" name="Straight Arrow Connector 107"/>
+          <p:cNvCxnSpPr/>
+          <p:nvPr/>
+        </p:nvCxnSpPr>
+        <p:spPr>
+          <a:xfrm>
+            <a:off x="8194851" y="1164825"/>
+            <a:ext cx="0" cy="318682"/>
+          </a:xfrm>
+          <a:prstGeom prst="straightConnector1">
+            <a:avLst/>
+          </a:prstGeom>
+          <a:ln w="12700">
+            <a:solidFill>
+              <a:schemeClr val="tx1"/>
+            </a:solidFill>
+            <a:tailEnd type="triangle"/>
+          </a:ln>
+        </p:spPr>
+        <p:style>
+          <a:lnRef idx="1">
+            <a:schemeClr val="accent1"/>
+          </a:lnRef>
+          <a:fillRef idx="0">
+            <a:schemeClr val="accent1"/>
+          </a:fillRef>
+          <a:effectRef idx="0">
+            <a:schemeClr val="accent1"/>
+          </a:effectRef>
+          <a:fontRef idx="minor">
+            <a:schemeClr val="tx1"/>
+          </a:fontRef>
+        </p:style>
+      </p:cxnSp>
+      <p:cxnSp>
+        <p:nvCxnSpPr>
+          <p:cNvPr id="16" name="Elbow Connector 15"/>
+          <p:cNvCxnSpPr>
+            <a:stCxn id="61" idx="3"/>
+          </p:cNvCxnSpPr>
+          <p:nvPr/>
+        </p:nvCxnSpPr>
+        <p:spPr>
+          <a:xfrm flipV="1">
+            <a:off x="2838003" y="1678681"/>
+            <a:ext cx="4242338" cy="874496"/>
+          </a:xfrm>
+          <a:prstGeom prst="bentConnector3">
+            <a:avLst>
+              <a:gd name="adj1" fmla="val 64974"/>
+            </a:avLst>
+          </a:prstGeom>
+          <a:ln>
+            <a:tailEnd type="triangle"/>
+          </a:ln>
+        </p:spPr>
+        <p:style>
+          <a:lnRef idx="1">
+            <a:schemeClr val="dk1"/>
+          </a:lnRef>
+          <a:fillRef idx="0">
+            <a:schemeClr val="dk1"/>
+          </a:fillRef>
+          <a:effectRef idx="0">
+            <a:schemeClr val="dk1"/>
+          </a:effectRef>
+          <a:fontRef idx="minor">
+            <a:schemeClr val="tx1"/>
+          </a:fontRef>
+        </p:style>
+      </p:cxnSp>
+      <p:sp>
+        <p:nvSpPr>
+          <p:cNvPr id="112" name="TextBox 111"/>
+          <p:cNvSpPr txBox="1"/>
+          <p:nvPr/>
+        </p:nvSpPr>
+        <p:spPr>
+          <a:xfrm>
+            <a:off x="7433573" y="2057045"/>
+            <a:ext cx="1170700" cy="246221"/>
+          </a:xfrm>
+          <a:prstGeom prst="rect">
+            <a:avLst/>
+          </a:prstGeom>
+          <a:ln w="19050">
+            <a:solidFill>
+              <a:schemeClr val="tx1"/>
+            </a:solidFill>
+          </a:ln>
+        </p:spPr>
+        <p:style>
+          <a:lnRef idx="2">
+            <a:schemeClr val="accent1"/>
+          </a:lnRef>
+          <a:fillRef idx="1">
+            <a:schemeClr val="lt1"/>
+          </a:fillRef>
+          <a:effectRef idx="0">
+            <a:schemeClr val="accent1"/>
+          </a:effectRef>
+          <a:fontRef idx="minor">
+            <a:schemeClr val="dk1"/>
+          </a:fontRef>
+        </p:style>
+        <p:txBody>
+          <a:bodyPr wrap="square" rtlCol="0">
+            <a:spAutoFit/>
+          </a:bodyPr>
+          <a:lstStyle/>
+          <a:p>
+            <a:r>
+              <a:rPr lang="en-US" sz="1000" dirty="0" smtClean="0"/>
+              <a:t>Client signature</a:t>
+            </a:r>
+            <a:endParaRPr lang="en-SG" sz="1000" dirty="0"/>
+          </a:p>
+        </p:txBody>
+      </p:sp>
+      <p:sp>
+        <p:nvSpPr>
+          <p:cNvPr id="113" name="Rectangle 112"/>
+          <p:cNvSpPr/>
+          <p:nvPr/>
+        </p:nvSpPr>
+        <p:spPr>
+          <a:xfrm>
+            <a:off x="6546674" y="2064068"/>
+            <a:ext cx="779867" cy="221477"/>
+          </a:xfrm>
+          <a:prstGeom prst="rect">
+            <a:avLst/>
+          </a:prstGeom>
+          <a:ln w="19050">
+            <a:solidFill>
+              <a:schemeClr val="tx1"/>
+            </a:solidFill>
+          </a:ln>
+        </p:spPr>
+        <p:style>
+          <a:lnRef idx="2">
+            <a:schemeClr val="accent1"/>
+          </a:lnRef>
+          <a:fillRef idx="1">
+            <a:schemeClr val="lt1"/>
+          </a:fillRef>
+          <a:effectRef idx="0">
+            <a:schemeClr val="accent1"/>
+          </a:effectRef>
+          <a:fontRef idx="minor">
+            <a:schemeClr val="dk1"/>
+          </a:fontRef>
+        </p:style>
+        <p:txBody>
+          <a:bodyPr rtlCol="0" anchor="ctr"/>
+          <a:lstStyle/>
+          <a:p>
+            <a:pPr algn="ctr"/>
+            <a:r>
+              <a:rPr lang="en-US" sz="1000" dirty="0" smtClean="0"/>
+              <a:t>IOT</a:t>
+            </a:r>
+            <a:r>
+              <a:rPr lang="en-US" sz="1000" dirty="0" smtClean="0"/>
+              <a:t> </a:t>
+            </a:r>
+            <a:r>
+              <a:rPr lang="en-US" sz="1000" dirty="0" smtClean="0"/>
+              <a:t>info</a:t>
+            </a:r>
+            <a:endParaRPr lang="en-SG" sz="1000" dirty="0"/>
+          </a:p>
+        </p:txBody>
+      </p:sp>
+      <p:sp>
+        <p:nvSpPr>
+          <p:cNvPr id="114" name="Rectangle 113"/>
+          <p:cNvSpPr/>
+          <p:nvPr/>
+        </p:nvSpPr>
+        <p:spPr>
+          <a:xfrm>
+            <a:off x="6439642" y="1956937"/>
+            <a:ext cx="2352087" cy="415180"/>
+          </a:xfrm>
+          <a:prstGeom prst="rect">
+            <a:avLst/>
+          </a:prstGeom>
+          <a:noFill/>
+          <a:ln>
+            <a:solidFill>
+              <a:schemeClr val="tx1"/>
+            </a:solidFill>
+          </a:ln>
+        </p:spPr>
+        <p:style>
+          <a:lnRef idx="2">
+            <a:schemeClr val="accent1"/>
+          </a:lnRef>
+          <a:fillRef idx="1">
+            <a:schemeClr val="lt1"/>
+          </a:fillRef>
+          <a:effectRef idx="0">
+            <a:schemeClr val="accent1"/>
+          </a:effectRef>
+          <a:fontRef idx="minor">
+            <a:schemeClr val="dk1"/>
+          </a:fontRef>
+        </p:style>
+        <p:txBody>
+          <a:bodyPr rtlCol="0" anchor="ctr"/>
+          <a:lstStyle/>
+          <a:p>
+            <a:pPr algn="ctr"/>
+            <a:endParaRPr lang="en-SG"/>
+          </a:p>
+        </p:txBody>
+      </p:sp>
+      <p:cxnSp>
+        <p:nvCxnSpPr>
+          <p:cNvPr id="115" name="Straight Arrow Connector 114"/>
+          <p:cNvCxnSpPr/>
+          <p:nvPr/>
+        </p:nvCxnSpPr>
+        <p:spPr>
+          <a:xfrm flipH="1">
+            <a:off x="7477022" y="1760396"/>
+            <a:ext cx="0" cy="167091"/>
+          </a:xfrm>
+          <a:prstGeom prst="straightConnector1">
+            <a:avLst/>
+          </a:prstGeom>
+          <a:ln w="12700">
+            <a:solidFill>
+              <a:schemeClr val="tx1"/>
+            </a:solidFill>
+            <a:tailEnd type="triangle"/>
+          </a:ln>
+        </p:spPr>
+        <p:style>
+          <a:lnRef idx="1">
+            <a:schemeClr val="accent1"/>
+          </a:lnRef>
+          <a:fillRef idx="0">
+            <a:schemeClr val="accent1"/>
+          </a:fillRef>
+          <a:effectRef idx="0">
+            <a:schemeClr val="accent1"/>
+          </a:effectRef>
+          <a:fontRef idx="minor">
+            <a:schemeClr val="tx1"/>
+          </a:fontRef>
+        </p:style>
+      </p:cxnSp>
+      <p:sp>
+        <p:nvSpPr>
+          <p:cNvPr id="116" name="Rounded Rectangle 115"/>
+          <p:cNvSpPr/>
+          <p:nvPr/>
+        </p:nvSpPr>
+        <p:spPr>
+          <a:xfrm>
+            <a:off x="7071357" y="2597242"/>
+            <a:ext cx="976817" cy="254977"/>
+          </a:xfrm>
+          <a:prstGeom prst="roundRect">
+            <a:avLst/>
+          </a:prstGeom>
+          <a:ln w="19050">
+            <a:solidFill>
+              <a:schemeClr val="tx1"/>
+            </a:solidFill>
+          </a:ln>
+        </p:spPr>
+        <p:style>
+          <a:lnRef idx="2">
+            <a:schemeClr val="accent1"/>
+          </a:lnRef>
+          <a:fillRef idx="1">
+            <a:schemeClr val="lt1"/>
+          </a:fillRef>
+          <a:effectRef idx="0">
+            <a:schemeClr val="accent1"/>
+          </a:effectRef>
+          <a:fontRef idx="minor">
+            <a:schemeClr val="dk1"/>
+          </a:fontRef>
+        </p:style>
+        <p:txBody>
+          <a:bodyPr rtlCol="0" anchor="ctr"/>
+          <a:lstStyle/>
+          <a:p>
+            <a:pPr algn="ctr"/>
+            <a:r>
+              <a:rPr lang="en-SG" sz="1000" dirty="0" smtClean="0"/>
+              <a:t>SHA256 </a:t>
+            </a:r>
+            <a:r>
+              <a:rPr lang="en-US" sz="1000" dirty="0" smtClean="0"/>
+              <a:t>Sign</a:t>
+            </a:r>
+            <a:endParaRPr lang="en-SG" sz="1000" dirty="0"/>
+          </a:p>
+        </p:txBody>
+      </p:sp>
+      <p:cxnSp>
+        <p:nvCxnSpPr>
+          <p:cNvPr id="117" name="Straight Arrow Connector 116"/>
+          <p:cNvCxnSpPr/>
+          <p:nvPr/>
+        </p:nvCxnSpPr>
+        <p:spPr>
+          <a:xfrm>
+            <a:off x="7526360" y="2369303"/>
+            <a:ext cx="0" cy="217496"/>
+          </a:xfrm>
+          <a:prstGeom prst="straightConnector1">
+            <a:avLst/>
+          </a:prstGeom>
+          <a:ln w="12700">
+            <a:solidFill>
+              <a:schemeClr val="tx1"/>
+            </a:solidFill>
+            <a:tailEnd type="triangle"/>
+          </a:ln>
+        </p:spPr>
+        <p:style>
+          <a:lnRef idx="1">
+            <a:schemeClr val="accent1"/>
+          </a:lnRef>
+          <a:fillRef idx="0">
+            <a:schemeClr val="accent1"/>
+          </a:fillRef>
+          <a:effectRef idx="0">
+            <a:schemeClr val="accent1"/>
+          </a:effectRef>
+          <a:fontRef idx="minor">
+            <a:schemeClr val="tx1"/>
+          </a:fontRef>
+        </p:style>
+      </p:cxnSp>
+      <p:cxnSp>
+        <p:nvCxnSpPr>
+          <p:cNvPr id="118" name="Straight Arrow Connector 117"/>
+          <p:cNvCxnSpPr/>
+          <p:nvPr/>
+        </p:nvCxnSpPr>
+        <p:spPr>
+          <a:xfrm flipH="1" flipV="1">
+            <a:off x="8081767" y="2710418"/>
+            <a:ext cx="815696" cy="0"/>
+          </a:xfrm>
+          <a:prstGeom prst="straightConnector1">
+            <a:avLst/>
+          </a:prstGeom>
+          <a:ln>
+            <a:solidFill>
+              <a:schemeClr val="tx1"/>
+            </a:solidFill>
+            <a:tailEnd type="triangle"/>
+          </a:ln>
+        </p:spPr>
+        <p:style>
+          <a:lnRef idx="1">
+            <a:schemeClr val="accent1"/>
+          </a:lnRef>
+          <a:fillRef idx="0">
+            <a:schemeClr val="accent1"/>
+          </a:fillRef>
+          <a:effectRef idx="0">
+            <a:schemeClr val="accent1"/>
+          </a:effectRef>
+          <a:fontRef idx="minor">
+            <a:schemeClr val="tx1"/>
+          </a:fontRef>
+        </p:style>
+      </p:cxnSp>
+      <p:pic>
+        <p:nvPicPr>
+          <p:cNvPr id="119" name="Picture 118"/>
+          <p:cNvPicPr>
+            <a:picLocks noChangeAspect="1"/>
+          </p:cNvPicPr>
+          <p:nvPr/>
+        </p:nvPicPr>
+        <p:blipFill>
+          <a:blip r:embed="rId2" cstate="print">
+            <a:extLst>
+              <a:ext uri="{28A0092B-C50C-407E-A947-70E740481C1C}">
+                <a14:useLocalDpi xmlns:a14="http://schemas.microsoft.com/office/drawing/2010/main" val="0"/>
+              </a:ext>
+            </a:extLst>
+          </a:blip>
+          <a:stretch>
+            <a:fillRect/>
+          </a:stretch>
+        </p:blipFill>
+        <p:spPr>
+          <a:xfrm>
+            <a:off x="8880612" y="2443437"/>
+            <a:ext cx="334183" cy="334183"/>
+          </a:xfrm>
+          <a:prstGeom prst="rect">
+            <a:avLst/>
+          </a:prstGeom>
+        </p:spPr>
+      </p:pic>
+      <p:sp>
+        <p:nvSpPr>
+          <p:cNvPr id="120" name="TextBox 119"/>
+          <p:cNvSpPr txBox="1"/>
+          <p:nvPr/>
+        </p:nvSpPr>
+        <p:spPr>
+          <a:xfrm>
+            <a:off x="8667896" y="2794514"/>
+            <a:ext cx="986821" cy="230832"/>
+          </a:xfrm>
+          <a:prstGeom prst="rect">
+            <a:avLst/>
+          </a:prstGeom>
+          <a:noFill/>
+        </p:spPr>
+        <p:txBody>
+          <a:bodyPr wrap="square" rtlCol="0">
+            <a:spAutoFit/>
+          </a:bodyPr>
+          <a:lstStyle/>
+          <a:p>
+            <a:r>
+              <a:rPr lang="en-SG" sz="900" dirty="0" smtClean="0"/>
+              <a:t>SSL server key</a:t>
+            </a:r>
+            <a:endParaRPr lang="en-SG" sz="900" dirty="0"/>
+          </a:p>
+        </p:txBody>
+      </p:sp>
+      <p:sp>
+        <p:nvSpPr>
+          <p:cNvPr id="121" name="TextBox 120"/>
+          <p:cNvSpPr txBox="1"/>
+          <p:nvPr/>
+        </p:nvSpPr>
+        <p:spPr>
+          <a:xfrm>
+            <a:off x="6241329" y="2914372"/>
+            <a:ext cx="1085212" cy="246221"/>
+          </a:xfrm>
+          <a:prstGeom prst="rect">
+            <a:avLst/>
+          </a:prstGeom>
+          <a:ln w="19050">
+            <a:solidFill>
+              <a:schemeClr val="tx1"/>
+            </a:solidFill>
+          </a:ln>
+        </p:spPr>
+        <p:style>
+          <a:lnRef idx="2">
+            <a:schemeClr val="accent1"/>
+          </a:lnRef>
+          <a:fillRef idx="1">
+            <a:schemeClr val="lt1"/>
+          </a:fillRef>
+          <a:effectRef idx="0">
+            <a:schemeClr val="accent1"/>
+          </a:effectRef>
+          <a:fontRef idx="minor">
+            <a:schemeClr val="dk1"/>
+          </a:fontRef>
+        </p:style>
+        <p:txBody>
+          <a:bodyPr wrap="square" rtlCol="0">
+            <a:spAutoFit/>
+          </a:bodyPr>
+          <a:lstStyle/>
+          <a:p>
+            <a:r>
+              <a:rPr lang="en-US" sz="1000" dirty="0" smtClean="0"/>
+              <a:t>Server</a:t>
+            </a:r>
+            <a:r>
+              <a:rPr lang="en-US" sz="1000" dirty="0" smtClean="0"/>
+              <a:t> </a:t>
+            </a:r>
+            <a:r>
+              <a:rPr lang="en-US" sz="1000" dirty="0" smtClean="0"/>
+              <a:t>signature</a:t>
+            </a:r>
+            <a:endParaRPr lang="en-SG" sz="1000" dirty="0"/>
+          </a:p>
+        </p:txBody>
+      </p:sp>
+      <p:cxnSp>
+        <p:nvCxnSpPr>
+          <p:cNvPr id="24" name="Elbow Connector 23"/>
+          <p:cNvCxnSpPr>
+            <a:endCxn id="121" idx="3"/>
+          </p:cNvCxnSpPr>
+          <p:nvPr/>
+        </p:nvCxnSpPr>
+        <p:spPr>
+          <a:xfrm rot="10800000" flipV="1">
+            <a:off x="7326541" y="2852219"/>
+            <a:ext cx="289144" cy="185264"/>
+          </a:xfrm>
+          <a:prstGeom prst="bentConnector3">
+            <a:avLst>
+              <a:gd name="adj1" fmla="val 50000"/>
+            </a:avLst>
+          </a:prstGeom>
+          <a:ln>
+            <a:tailEnd type="triangle"/>
+          </a:ln>
+        </p:spPr>
+        <p:style>
+          <a:lnRef idx="1">
+            <a:schemeClr val="dk1"/>
+          </a:lnRef>
+          <a:fillRef idx="0">
+            <a:schemeClr val="dk1"/>
+          </a:fillRef>
+          <a:effectRef idx="0">
+            <a:schemeClr val="dk1"/>
+          </a:effectRef>
+          <a:fontRef idx="minor">
+            <a:schemeClr val="tx1"/>
+          </a:fontRef>
+        </p:style>
+      </p:cxnSp>
+      <p:cxnSp>
+        <p:nvCxnSpPr>
+          <p:cNvPr id="30" name="Straight Arrow Connector 29"/>
+          <p:cNvCxnSpPr>
+            <a:stCxn id="121" idx="1"/>
+          </p:cNvCxnSpPr>
+          <p:nvPr/>
+        </p:nvCxnSpPr>
+        <p:spPr>
+          <a:xfrm flipH="1" flipV="1">
+            <a:off x="3878981" y="3025346"/>
+            <a:ext cx="2362348" cy="0"/>
+          </a:xfrm>
+          <a:prstGeom prst="straightConnector1">
+            <a:avLst/>
+          </a:prstGeom>
+          <a:ln>
+            <a:tailEnd type="triangle"/>
+          </a:ln>
+        </p:spPr>
+        <p:style>
+          <a:lnRef idx="1">
+            <a:schemeClr val="dk1"/>
+          </a:lnRef>
+          <a:fillRef idx="0">
+            <a:schemeClr val="dk1"/>
+          </a:fillRef>
+          <a:effectRef idx="0">
+            <a:schemeClr val="dk1"/>
+          </a:effectRef>
+          <a:fontRef idx="minor">
+            <a:schemeClr val="tx1"/>
+          </a:fontRef>
+        </p:style>
+      </p:cxnSp>
+      <p:sp>
+        <p:nvSpPr>
+          <p:cNvPr id="122" name="TextBox 121"/>
+          <p:cNvSpPr txBox="1"/>
+          <p:nvPr/>
+        </p:nvSpPr>
+        <p:spPr>
+          <a:xfrm>
+            <a:off x="592948" y="2902235"/>
+            <a:ext cx="3207110" cy="246221"/>
+          </a:xfrm>
+          <a:prstGeom prst="rect">
+            <a:avLst/>
+          </a:prstGeom>
+          <a:ln w="19050">
+            <a:solidFill>
+              <a:schemeClr val="tx1"/>
+            </a:solidFill>
+          </a:ln>
+        </p:spPr>
+        <p:style>
+          <a:lnRef idx="2">
+            <a:schemeClr val="accent1"/>
+          </a:lnRef>
+          <a:fillRef idx="1">
+            <a:schemeClr val="lt1"/>
+          </a:fillRef>
+          <a:effectRef idx="0">
+            <a:schemeClr val="accent1"/>
+          </a:effectRef>
+          <a:fontRef idx="minor">
+            <a:schemeClr val="dk1"/>
+          </a:fontRef>
+        </p:style>
+        <p:txBody>
+          <a:bodyPr wrap="square" rtlCol="0">
+            <a:spAutoFit/>
+          </a:bodyPr>
+          <a:lstStyle/>
+          <a:p>
+            <a:r>
+              <a:rPr lang="en-US" sz="1000" dirty="0" smtClean="0"/>
+              <a:t>Flash the firmware and server signature to IOT ROM chip</a:t>
+            </a:r>
+            <a:endParaRPr lang="en-SG" sz="1000" dirty="0"/>
+          </a:p>
+        </p:txBody>
+      </p:sp>
+      <p:cxnSp>
+        <p:nvCxnSpPr>
+          <p:cNvPr id="123" name="Straight Connector 122"/>
+          <p:cNvCxnSpPr/>
+          <p:nvPr/>
+        </p:nvCxnSpPr>
+        <p:spPr>
+          <a:xfrm>
+            <a:off x="5510464" y="335894"/>
+            <a:ext cx="0" cy="3235079"/>
+          </a:xfrm>
+          <a:prstGeom prst="line">
+            <a:avLst/>
+          </a:prstGeom>
+          <a:ln>
+            <a:prstDash val="dash"/>
+          </a:ln>
+        </p:spPr>
+        <p:style>
+          <a:lnRef idx="1">
+            <a:schemeClr val="dk1"/>
+          </a:lnRef>
+          <a:fillRef idx="0">
+            <a:schemeClr val="dk1"/>
+          </a:fillRef>
+          <a:effectRef idx="0">
+            <a:schemeClr val="dk1"/>
+          </a:effectRef>
+          <a:fontRef idx="minor">
+            <a:schemeClr val="tx1"/>
+          </a:fontRef>
+        </p:style>
+      </p:cxnSp>
+      <p:sp>
+        <p:nvSpPr>
+          <p:cNvPr id="124" name="TextBox 123"/>
+          <p:cNvSpPr txBox="1"/>
+          <p:nvPr/>
+        </p:nvSpPr>
+        <p:spPr>
+          <a:xfrm>
+            <a:off x="5060155" y="3453930"/>
+            <a:ext cx="1087655" cy="369332"/>
+          </a:xfrm>
+          <a:prstGeom prst="rect">
+            <a:avLst/>
+          </a:prstGeom>
+          <a:noFill/>
+        </p:spPr>
+        <p:txBody>
+          <a:bodyPr wrap="square" rtlCol="0">
+            <a:spAutoFit/>
+          </a:bodyPr>
+          <a:lstStyle/>
+          <a:p>
+            <a:r>
+              <a:rPr lang="en-US" dirty="0" smtClean="0"/>
+              <a:t>Internet</a:t>
+            </a:r>
+            <a:endParaRPr lang="en-SG" dirty="0"/>
+          </a:p>
+        </p:txBody>
+      </p:sp>
+      <p:sp>
+        <p:nvSpPr>
+          <p:cNvPr id="125" name="Flowchart: Magnetic Disk 124"/>
+          <p:cNvSpPr/>
+          <p:nvPr/>
+        </p:nvSpPr>
+        <p:spPr>
+          <a:xfrm>
+            <a:off x="9654717" y="1917573"/>
+            <a:ext cx="392782" cy="380759"/>
+          </a:xfrm>
+          <a:prstGeom prst="flowChartMagneticDisk">
+            <a:avLst/>
+          </a:prstGeom>
+        </p:spPr>
+        <p:style>
+          <a:lnRef idx="2">
+            <a:schemeClr val="dk1"/>
+          </a:lnRef>
+          <a:fillRef idx="1">
+            <a:schemeClr val="lt1"/>
+          </a:fillRef>
+          <a:effectRef idx="0">
+            <a:schemeClr val="dk1"/>
+          </a:effectRef>
+          <a:fontRef idx="minor">
+            <a:schemeClr val="dk1"/>
+          </a:fontRef>
+        </p:style>
+        <p:txBody>
+          <a:bodyPr rtlCol="0" anchor="ctr"/>
+          <a:lstStyle/>
+          <a:p>
+            <a:pPr algn="ctr"/>
+            <a:endParaRPr lang="en-SG"/>
+          </a:p>
+        </p:txBody>
+      </p:sp>
+      <p:cxnSp>
+        <p:nvCxnSpPr>
+          <p:cNvPr id="38" name="Straight Arrow Connector 37"/>
+          <p:cNvCxnSpPr/>
+          <p:nvPr/>
+        </p:nvCxnSpPr>
+        <p:spPr>
+          <a:xfrm>
+            <a:off x="8834928" y="2123646"/>
+            <a:ext cx="774105" cy="0"/>
+          </a:xfrm>
+          <a:prstGeom prst="straightConnector1">
+            <a:avLst/>
+          </a:prstGeom>
+          <a:ln>
+            <a:tailEnd type="triangle"/>
+          </a:ln>
+        </p:spPr>
+        <p:style>
+          <a:lnRef idx="1">
+            <a:schemeClr val="dk1"/>
+          </a:lnRef>
+          <a:fillRef idx="0">
+            <a:schemeClr val="dk1"/>
+          </a:fillRef>
+          <a:effectRef idx="0">
+            <a:schemeClr val="dk1"/>
+          </a:effectRef>
+          <a:fontRef idx="minor">
+            <a:schemeClr val="tx1"/>
+          </a:fontRef>
+        </p:style>
+      </p:cxnSp>
+      <p:cxnSp>
+        <p:nvCxnSpPr>
+          <p:cNvPr id="126" name="Elbow Connector 125"/>
+          <p:cNvCxnSpPr/>
+          <p:nvPr/>
+        </p:nvCxnSpPr>
+        <p:spPr>
+          <a:xfrm flipV="1">
+            <a:off x="7376475" y="2342305"/>
+            <a:ext cx="2474633" cy="806151"/>
+          </a:xfrm>
+          <a:prstGeom prst="bentConnector3">
+            <a:avLst>
+              <a:gd name="adj1" fmla="val 100176"/>
+            </a:avLst>
+          </a:prstGeom>
+          <a:ln>
+            <a:tailEnd type="triangle"/>
+          </a:ln>
+        </p:spPr>
+        <p:style>
+          <a:lnRef idx="1">
+            <a:schemeClr val="dk1"/>
+          </a:lnRef>
+          <a:fillRef idx="0">
+            <a:schemeClr val="dk1"/>
+          </a:fillRef>
+          <a:effectRef idx="0">
+            <a:schemeClr val="dk1"/>
+          </a:effectRef>
+          <a:fontRef idx="minor">
+            <a:schemeClr val="tx1"/>
+          </a:fontRef>
+        </p:style>
+      </p:cxnSp>
+    </p:spTree>
+    <p:extLst>
+      <p:ext uri="{BB962C8B-B14F-4D97-AF65-F5344CB8AC3E}">
+        <p14:creationId xmlns:p14="http://schemas.microsoft.com/office/powerpoint/2010/main" val="44753149"/>
+      </p:ext>
+    </p:extLst>
+  </p:cSld>
+  <p:clrMapOvr>
+    <a:masterClrMapping/>
+  </p:clrMapOvr>
+</p:sld>
+</file>
+
+<file path=ppt/slides/slide15.xml><?xml version="1.0" encoding="utf-8"?>
+<p:sld xmlns:a="http://schemas.openxmlformats.org/drawingml/2006/main" xmlns:r="http://schemas.openxmlformats.org/officeDocument/2006/relationships" xmlns:p="http://schemas.openxmlformats.org/presentationml/2006/main">
+  <p:cSld>
+    <p:spTree>
+      <p:nvGrpSpPr>
+        <p:cNvPr id="1" name=""/>
+        <p:cNvGrpSpPr/>
+        <p:nvPr/>
+      </p:nvGrpSpPr>
+      <p:grpSpPr>
+        <a:xfrm>
+          <a:off x="0" y="0"/>
+          <a:ext cx="0" cy="0"/>
+          <a:chOff x="0" y="0"/>
+          <a:chExt cx="0" cy="0"/>
+        </a:xfrm>
+      </p:grpSpPr>
+      <p:sp>
+        <p:nvSpPr>
           <p:cNvPr id="4" name="Rectangle 3"/>
           <p:cNvSpPr/>
           <p:nvPr/>
@@ -13723,7 +15775,7 @@
 </p:sld>
 </file>
 
-<file path=ppt/slides/slide15.xml><?xml version="1.0" encoding="utf-8"?>
+<file path=ppt/slides/slide16.xml><?xml version="1.0" encoding="utf-8"?>
 <p:sld xmlns:a="http://schemas.openxmlformats.org/drawingml/2006/main" xmlns:r="http://schemas.openxmlformats.org/officeDocument/2006/relationships" xmlns:p="http://schemas.openxmlformats.org/presentationml/2006/main">
   <p:cSld>
     <p:spTree>

</xml_diff>

<commit_message>
Added the tello control design document.
</commit_message>
<xml_diff>
--- a/doc/firmwaresignWF.pptx
+++ b/doc/firmwaresignWF.pptx
@@ -5,7 +5,7 @@
     <p:sldMasterId id="2147483648" r:id="rId1"/>
   </p:sldMasterIdLst>
   <p:notesMasterIdLst>
-    <p:notesMasterId r:id="rId19"/>
+    <p:notesMasterId r:id="rId21"/>
   </p:notesMasterIdLst>
   <p:sldIdLst>
     <p:sldId id="256" r:id="rId2"/>
@@ -25,6 +25,8 @@
     <p:sldId id="268" r:id="rId16"/>
     <p:sldId id="271" r:id="rId17"/>
     <p:sldId id="273" r:id="rId18"/>
+    <p:sldId id="274" r:id="rId19"/>
+    <p:sldId id="275" r:id="rId20"/>
   </p:sldIdLst>
   <p:sldSz cx="12192000" cy="6858000"/>
   <p:notesSz cx="6858000" cy="9144000"/>
@@ -124,6 +126,36 @@
     </a:lvl9pPr>
   </p:defaultTextStyle>
   <p:extLst>
+    <p:ext uri="{521415D9-36F7-43E2-AB2F-B90AF26B5E84}">
+      <p14:sectionLst xmlns:p14="http://schemas.microsoft.com/office/powerpoint/2010/main">
+        <p14:section name="Default Section" id="{6EFE9E30-E434-4DED-9571-58227EAF36A1}">
+          <p14:sldIdLst>
+            <p14:sldId id="256"/>
+            <p14:sldId id="257"/>
+            <p14:sldId id="258"/>
+            <p14:sldId id="259"/>
+            <p14:sldId id="260"/>
+            <p14:sldId id="261"/>
+            <p14:sldId id="262"/>
+            <p14:sldId id="263"/>
+            <p14:sldId id="264"/>
+            <p14:sldId id="266"/>
+            <p14:sldId id="267"/>
+            <p14:sldId id="269"/>
+            <p14:sldId id="265"/>
+            <p14:sldId id="272"/>
+            <p14:sldId id="268"/>
+            <p14:sldId id="271"/>
+            <p14:sldId id="273"/>
+            <p14:sldId id="274"/>
+            <p14:sldId id="275"/>
+          </p14:sldIdLst>
+        </p14:section>
+        <p14:section name="Untitled Section" id="{AE9E3D3D-B6E7-4002-83A3-10D822FD789F}">
+          <p14:sldIdLst/>
+        </p14:section>
+      </p14:sectionLst>
+    </p:ext>
     <p:ext uri="{EFAFB233-063F-42B5-8137-9DF3F51BA10A}">
       <p15:sldGuideLst xmlns:p15="http://schemas.microsoft.com/office/powerpoint/2012/main"/>
     </p:ext>
@@ -213,7 +245,7 @@
           <a:p>
             <a:fld id="{32DA1F5A-E23E-4D9B-B8D0-40D8909182CC}" type="datetimeFigureOut">
               <a:rPr lang="en-SG" smtClean="0"/>
-              <a:t>3/10/2019</a:t>
+              <a:t>22/10/2019</a:t>
             </a:fld>
             <a:endParaRPr lang="en-SG"/>
           </a:p>
@@ -696,7 +728,7 @@
           <a:p>
             <a:fld id="{168FC4C3-6B25-48E2-93F9-24A255A41CA9}" type="datetimeFigureOut">
               <a:rPr lang="en-SG" smtClean="0"/>
-              <a:t>3/10/2019</a:t>
+              <a:t>22/10/2019</a:t>
             </a:fld>
             <a:endParaRPr lang="en-SG"/>
           </a:p>
@@ -866,7 +898,7 @@
           <a:p>
             <a:fld id="{168FC4C3-6B25-48E2-93F9-24A255A41CA9}" type="datetimeFigureOut">
               <a:rPr lang="en-SG" smtClean="0"/>
-              <a:t>3/10/2019</a:t>
+              <a:t>22/10/2019</a:t>
             </a:fld>
             <a:endParaRPr lang="en-SG"/>
           </a:p>
@@ -1046,7 +1078,7 @@
           <a:p>
             <a:fld id="{168FC4C3-6B25-48E2-93F9-24A255A41CA9}" type="datetimeFigureOut">
               <a:rPr lang="en-SG" smtClean="0"/>
-              <a:t>3/10/2019</a:t>
+              <a:t>22/10/2019</a:t>
             </a:fld>
             <a:endParaRPr lang="en-SG"/>
           </a:p>
@@ -1216,7 +1248,7 @@
           <a:p>
             <a:fld id="{168FC4C3-6B25-48E2-93F9-24A255A41CA9}" type="datetimeFigureOut">
               <a:rPr lang="en-SG" smtClean="0"/>
-              <a:t>3/10/2019</a:t>
+              <a:t>22/10/2019</a:t>
             </a:fld>
             <a:endParaRPr lang="en-SG"/>
           </a:p>
@@ -1462,7 +1494,7 @@
           <a:p>
             <a:fld id="{168FC4C3-6B25-48E2-93F9-24A255A41CA9}" type="datetimeFigureOut">
               <a:rPr lang="en-SG" smtClean="0"/>
-              <a:t>3/10/2019</a:t>
+              <a:t>22/10/2019</a:t>
             </a:fld>
             <a:endParaRPr lang="en-SG"/>
           </a:p>
@@ -1694,7 +1726,7 @@
           <a:p>
             <a:fld id="{168FC4C3-6B25-48E2-93F9-24A255A41CA9}" type="datetimeFigureOut">
               <a:rPr lang="en-SG" smtClean="0"/>
-              <a:t>3/10/2019</a:t>
+              <a:t>22/10/2019</a:t>
             </a:fld>
             <a:endParaRPr lang="en-SG"/>
           </a:p>
@@ -2061,7 +2093,7 @@
           <a:p>
             <a:fld id="{168FC4C3-6B25-48E2-93F9-24A255A41CA9}" type="datetimeFigureOut">
               <a:rPr lang="en-SG" smtClean="0"/>
-              <a:t>3/10/2019</a:t>
+              <a:t>22/10/2019</a:t>
             </a:fld>
             <a:endParaRPr lang="en-SG"/>
           </a:p>
@@ -2179,7 +2211,7 @@
           <a:p>
             <a:fld id="{168FC4C3-6B25-48E2-93F9-24A255A41CA9}" type="datetimeFigureOut">
               <a:rPr lang="en-SG" smtClean="0"/>
-              <a:t>3/10/2019</a:t>
+              <a:t>22/10/2019</a:t>
             </a:fld>
             <a:endParaRPr lang="en-SG"/>
           </a:p>
@@ -2274,7 +2306,7 @@
           <a:p>
             <a:fld id="{168FC4C3-6B25-48E2-93F9-24A255A41CA9}" type="datetimeFigureOut">
               <a:rPr lang="en-SG" smtClean="0"/>
-              <a:t>3/10/2019</a:t>
+              <a:t>22/10/2019</a:t>
             </a:fld>
             <a:endParaRPr lang="en-SG"/>
           </a:p>
@@ -2551,7 +2583,7 @@
           <a:p>
             <a:fld id="{168FC4C3-6B25-48E2-93F9-24A255A41CA9}" type="datetimeFigureOut">
               <a:rPr lang="en-SG" smtClean="0"/>
-              <a:t>3/10/2019</a:t>
+              <a:t>22/10/2019</a:t>
             </a:fld>
             <a:endParaRPr lang="en-SG"/>
           </a:p>
@@ -2804,7 +2836,7 @@
           <a:p>
             <a:fld id="{168FC4C3-6B25-48E2-93F9-24A255A41CA9}" type="datetimeFigureOut">
               <a:rPr lang="en-SG" smtClean="0"/>
-              <a:t>3/10/2019</a:t>
+              <a:t>22/10/2019</a:t>
             </a:fld>
             <a:endParaRPr lang="en-SG"/>
           </a:p>
@@ -3017,7 +3049,7 @@
           <a:p>
             <a:fld id="{168FC4C3-6B25-48E2-93F9-24A255A41CA9}" type="datetimeFigureOut">
               <a:rPr lang="en-SG" smtClean="0"/>
-              <a:t>3/10/2019</a:t>
+              <a:t>22/10/2019</a:t>
             </a:fld>
             <a:endParaRPr lang="en-SG"/>
           </a:p>
@@ -11232,6 +11264,13 @@
   <p:clrMapOvr>
     <a:masterClrMapping/>
   </p:clrMapOvr>
+  <p:timing>
+    <p:tnLst>
+      <p:par>
+        <p:cTn id="1" dur="indefinite" restart="never" nodeType="tmRoot"/>
+      </p:par>
+    </p:tnLst>
+  </p:timing>
 </p:sld>
 </file>
 
@@ -12663,6 +12702,421 @@
           </a:p>
         </p:txBody>
       </p:sp>
+      <p:pic>
+        <p:nvPicPr>
+          <p:cNvPr id="43" name="Picture 42"/>
+          <p:cNvPicPr>
+            <a:picLocks noChangeAspect="1"/>
+          </p:cNvPicPr>
+          <p:nvPr/>
+        </p:nvPicPr>
+        <p:blipFill>
+          <a:blip r:embed="rId3">
+            <a:extLst>
+              <a:ext uri="{28A0092B-C50C-407E-A947-70E740481C1C}">
+                <a14:useLocalDpi xmlns:a14="http://schemas.microsoft.com/office/drawing/2010/main" val="0"/>
+              </a:ext>
+            </a:extLst>
+          </a:blip>
+          <a:stretch>
+            <a:fillRect/>
+          </a:stretch>
+        </p:blipFill>
+        <p:spPr>
+          <a:xfrm>
+            <a:off x="9590177" y="4579999"/>
+            <a:ext cx="1580098" cy="1580098"/>
+          </a:xfrm>
+          <a:prstGeom prst="rect">
+            <a:avLst/>
+          </a:prstGeom>
+        </p:spPr>
+      </p:pic>
+      <p:pic>
+        <p:nvPicPr>
+          <p:cNvPr id="45" name="Picture 44"/>
+          <p:cNvPicPr>
+            <a:picLocks noChangeAspect="1"/>
+          </p:cNvPicPr>
+          <p:nvPr/>
+        </p:nvPicPr>
+        <p:blipFill>
+          <a:blip r:embed="rId4" cstate="print">
+            <a:extLst>
+              <a:ext uri="{28A0092B-C50C-407E-A947-70E740481C1C}">
+                <a14:useLocalDpi xmlns:a14="http://schemas.microsoft.com/office/drawing/2010/main" val="0"/>
+              </a:ext>
+            </a:extLst>
+          </a:blip>
+          <a:stretch>
+            <a:fillRect/>
+          </a:stretch>
+        </p:blipFill>
+        <p:spPr>
+          <a:xfrm>
+            <a:off x="1051615" y="4976073"/>
+            <a:ext cx="1061904" cy="1061904"/>
+          </a:xfrm>
+          <a:prstGeom prst="rect">
+            <a:avLst/>
+          </a:prstGeom>
+          <a:ln>
+            <a:noFill/>
+          </a:ln>
+          <a:effectLst>
+            <a:softEdge rad="112500"/>
+          </a:effectLst>
+        </p:spPr>
+      </p:pic>
+      <p:pic>
+        <p:nvPicPr>
+          <p:cNvPr id="47" name="Picture 46"/>
+          <p:cNvPicPr>
+            <a:picLocks noChangeAspect="1"/>
+          </p:cNvPicPr>
+          <p:nvPr/>
+        </p:nvPicPr>
+        <p:blipFill>
+          <a:blip r:embed="rId5">
+            <a:extLst>
+              <a:ext uri="{28A0092B-C50C-407E-A947-70E740481C1C}">
+                <a14:useLocalDpi xmlns:a14="http://schemas.microsoft.com/office/drawing/2010/main" val="0"/>
+              </a:ext>
+            </a:extLst>
+          </a:blip>
+          <a:stretch>
+            <a:fillRect/>
+          </a:stretch>
+        </p:blipFill>
+        <p:spPr>
+          <a:xfrm>
+            <a:off x="4386996" y="4435463"/>
+            <a:ext cx="2143125" cy="2143125"/>
+          </a:xfrm>
+          <a:prstGeom prst="rect">
+            <a:avLst/>
+          </a:prstGeom>
+        </p:spPr>
+      </p:pic>
+      <p:cxnSp>
+        <p:nvCxnSpPr>
+          <p:cNvPr id="9" name="Straight Arrow Connector 8"/>
+          <p:cNvCxnSpPr>
+            <a:stCxn id="45" idx="3"/>
+            <a:endCxn id="47" idx="1"/>
+          </p:cNvCxnSpPr>
+          <p:nvPr/>
+        </p:nvCxnSpPr>
+        <p:spPr>
+          <a:xfrm>
+            <a:off x="2113519" y="5507025"/>
+            <a:ext cx="2273477" cy="1"/>
+          </a:xfrm>
+          <a:prstGeom prst="straightConnector1">
+            <a:avLst/>
+          </a:prstGeom>
+          <a:ln w="28575">
+            <a:headEnd type="triangle"/>
+            <a:tailEnd type="triangle"/>
+          </a:ln>
+        </p:spPr>
+        <p:style>
+          <a:lnRef idx="1">
+            <a:schemeClr val="dk1"/>
+          </a:lnRef>
+          <a:fillRef idx="0">
+            <a:schemeClr val="dk1"/>
+          </a:fillRef>
+          <a:effectRef idx="0">
+            <a:schemeClr val="dk1"/>
+          </a:effectRef>
+          <a:fontRef idx="minor">
+            <a:schemeClr val="tx1"/>
+          </a:fontRef>
+        </p:style>
+      </p:cxnSp>
+      <p:sp>
+        <p:nvSpPr>
+          <p:cNvPr id="53" name="TextBox 52"/>
+          <p:cNvSpPr txBox="1"/>
+          <p:nvPr/>
+        </p:nvSpPr>
+        <p:spPr>
+          <a:xfrm>
+            <a:off x="1974751" y="5062271"/>
+            <a:ext cx="1764435" cy="307777"/>
+          </a:xfrm>
+          <a:prstGeom prst="rect">
+            <a:avLst/>
+          </a:prstGeom>
+          <a:noFill/>
+        </p:spPr>
+        <p:txBody>
+          <a:bodyPr wrap="square" rtlCol="0">
+            <a:spAutoFit/>
+          </a:bodyPr>
+          <a:lstStyle/>
+          <a:p>
+            <a:r>
+              <a:rPr lang="en-US" sz="1400" dirty="0" smtClean="0"/>
+              <a:t>TCP client, Port 4000</a:t>
+            </a:r>
+            <a:endParaRPr lang="en-SG" sz="1400" dirty="0"/>
+          </a:p>
+        </p:txBody>
+      </p:sp>
+      <p:sp>
+        <p:nvSpPr>
+          <p:cNvPr id="55" name="TextBox 54"/>
+          <p:cNvSpPr txBox="1"/>
+          <p:nvPr/>
+        </p:nvSpPr>
+        <p:spPr>
+          <a:xfrm>
+            <a:off x="3739186" y="5618613"/>
+            <a:ext cx="1090445" cy="307777"/>
+          </a:xfrm>
+          <a:prstGeom prst="rect">
+            <a:avLst/>
+          </a:prstGeom>
+          <a:noFill/>
+        </p:spPr>
+        <p:txBody>
+          <a:bodyPr wrap="square" rtlCol="0">
+            <a:spAutoFit/>
+          </a:bodyPr>
+          <a:lstStyle/>
+          <a:p>
+            <a:r>
+              <a:rPr lang="en-US" sz="1400" dirty="0" smtClean="0"/>
+              <a:t>TCP Server</a:t>
+            </a:r>
+            <a:endParaRPr lang="en-SG" sz="1400" dirty="0"/>
+          </a:p>
+        </p:txBody>
+      </p:sp>
+      <p:cxnSp>
+        <p:nvCxnSpPr>
+          <p:cNvPr id="57" name="Straight Arrow Connector 56"/>
+          <p:cNvCxnSpPr/>
+          <p:nvPr/>
+        </p:nvCxnSpPr>
+        <p:spPr>
+          <a:xfrm flipV="1">
+            <a:off x="6338471" y="4976073"/>
+            <a:ext cx="3040435" cy="3599"/>
+          </a:xfrm>
+          <a:prstGeom prst="straightConnector1">
+            <a:avLst/>
+          </a:prstGeom>
+          <a:ln w="28575">
+            <a:headEnd type="triangle"/>
+            <a:tailEnd type="triangle"/>
+          </a:ln>
+        </p:spPr>
+        <p:style>
+          <a:lnRef idx="1">
+            <a:schemeClr val="dk1"/>
+          </a:lnRef>
+          <a:fillRef idx="0">
+            <a:schemeClr val="dk1"/>
+          </a:fillRef>
+          <a:effectRef idx="0">
+            <a:schemeClr val="dk1"/>
+          </a:effectRef>
+          <a:fontRef idx="minor">
+            <a:schemeClr val="tx1"/>
+          </a:fontRef>
+        </p:style>
+      </p:cxnSp>
+      <p:sp>
+        <p:nvSpPr>
+          <p:cNvPr id="60" name="TextBox 59"/>
+          <p:cNvSpPr txBox="1"/>
+          <p:nvPr/>
+        </p:nvSpPr>
+        <p:spPr>
+          <a:xfrm>
+            <a:off x="6180565" y="4637794"/>
+            <a:ext cx="4147357" cy="276999"/>
+          </a:xfrm>
+          <a:prstGeom prst="rect">
+            <a:avLst/>
+          </a:prstGeom>
+          <a:noFill/>
+        </p:spPr>
+        <p:txBody>
+          <a:bodyPr wrap="square" rtlCol="0">
+            <a:spAutoFit/>
+          </a:bodyPr>
+          <a:lstStyle/>
+          <a:p>
+            <a:r>
+              <a:rPr lang="en-US" sz="1200" dirty="0"/>
+              <a:t>Send Command &amp; Receive Response  UDP, Port 8889</a:t>
+            </a:r>
+            <a:endParaRPr lang="en-SG" sz="1200" dirty="0"/>
+          </a:p>
+        </p:txBody>
+      </p:sp>
+      <p:cxnSp>
+        <p:nvCxnSpPr>
+          <p:cNvPr id="14" name="Straight Arrow Connector 13"/>
+          <p:cNvCxnSpPr/>
+          <p:nvPr/>
+        </p:nvCxnSpPr>
+        <p:spPr>
+          <a:xfrm flipH="1" flipV="1">
+            <a:off x="6338472" y="5359689"/>
+            <a:ext cx="3040434" cy="0"/>
+          </a:xfrm>
+          <a:prstGeom prst="straightConnector1">
+            <a:avLst/>
+          </a:prstGeom>
+          <a:ln w="28575">
+            <a:tailEnd type="triangle"/>
+          </a:ln>
+        </p:spPr>
+        <p:style>
+          <a:lnRef idx="1">
+            <a:schemeClr val="dk1"/>
+          </a:lnRef>
+          <a:fillRef idx="0">
+            <a:schemeClr val="dk1"/>
+          </a:fillRef>
+          <a:effectRef idx="0">
+            <a:schemeClr val="dk1"/>
+          </a:effectRef>
+          <a:fontRef idx="minor">
+            <a:schemeClr val="tx1"/>
+          </a:fontRef>
+        </p:style>
+      </p:cxnSp>
+      <p:sp>
+        <p:nvSpPr>
+          <p:cNvPr id="61" name="TextBox 60"/>
+          <p:cNvSpPr txBox="1"/>
+          <p:nvPr/>
+        </p:nvSpPr>
+        <p:spPr>
+          <a:xfrm>
+            <a:off x="6227408" y="5031181"/>
+            <a:ext cx="4147357" cy="276999"/>
+          </a:xfrm>
+          <a:prstGeom prst="rect">
+            <a:avLst/>
+          </a:prstGeom>
+          <a:noFill/>
+        </p:spPr>
+        <p:txBody>
+          <a:bodyPr wrap="square" rtlCol="0">
+            <a:spAutoFit/>
+          </a:bodyPr>
+          <a:lstStyle/>
+          <a:p>
+            <a:r>
+              <a:rPr lang="en-US" sz="1200" dirty="0"/>
+              <a:t>Receive </a:t>
+            </a:r>
+            <a:r>
+              <a:rPr lang="en-US" sz="1200" dirty="0" err="1"/>
+              <a:t>Tello</a:t>
+            </a:r>
+            <a:r>
+              <a:rPr lang="en-US" sz="1200" dirty="0"/>
+              <a:t> State  </a:t>
+            </a:r>
+            <a:r>
+              <a:rPr lang="en-US" sz="1200" dirty="0" smtClean="0"/>
+              <a:t>UDP</a:t>
+            </a:r>
+            <a:r>
+              <a:rPr lang="en-US" sz="1200" dirty="0"/>
+              <a:t>, Port 8890 </a:t>
+            </a:r>
+            <a:endParaRPr lang="en-SG" sz="1200" dirty="0"/>
+          </a:p>
+        </p:txBody>
+      </p:sp>
+      <p:cxnSp>
+        <p:nvCxnSpPr>
+          <p:cNvPr id="65" name="Straight Arrow Connector 64"/>
+          <p:cNvCxnSpPr/>
+          <p:nvPr/>
+        </p:nvCxnSpPr>
+        <p:spPr>
+          <a:xfrm flipH="1" flipV="1">
+            <a:off x="6365747" y="5781596"/>
+            <a:ext cx="3040434" cy="0"/>
+          </a:xfrm>
+          <a:prstGeom prst="straightConnector1">
+            <a:avLst/>
+          </a:prstGeom>
+          <a:ln w="28575">
+            <a:tailEnd type="triangle"/>
+          </a:ln>
+        </p:spPr>
+        <p:style>
+          <a:lnRef idx="1">
+            <a:schemeClr val="dk1"/>
+          </a:lnRef>
+          <a:fillRef idx="0">
+            <a:schemeClr val="dk1"/>
+          </a:fillRef>
+          <a:effectRef idx="0">
+            <a:schemeClr val="dk1"/>
+          </a:effectRef>
+          <a:fontRef idx="minor">
+            <a:schemeClr val="tx1"/>
+          </a:fontRef>
+        </p:style>
+      </p:cxnSp>
+      <p:sp>
+        <p:nvSpPr>
+          <p:cNvPr id="66" name="TextBox 65"/>
+          <p:cNvSpPr txBox="1"/>
+          <p:nvPr/>
+        </p:nvSpPr>
+        <p:spPr>
+          <a:xfrm>
+            <a:off x="6254683" y="5453088"/>
+            <a:ext cx="4147357" cy="276999"/>
+          </a:xfrm>
+          <a:prstGeom prst="rect">
+            <a:avLst/>
+          </a:prstGeom>
+          <a:noFill/>
+        </p:spPr>
+        <p:txBody>
+          <a:bodyPr wrap="square" rtlCol="0">
+            <a:spAutoFit/>
+          </a:bodyPr>
+          <a:lstStyle/>
+          <a:p>
+            <a:r>
+              <a:rPr lang="en-US" sz="1200" dirty="0"/>
+              <a:t>Receive </a:t>
+            </a:r>
+            <a:r>
+              <a:rPr lang="en-US" sz="1200" dirty="0" err="1"/>
+              <a:t>Tello</a:t>
+            </a:r>
+            <a:r>
+              <a:rPr lang="en-US" sz="1200" dirty="0"/>
+              <a:t> Video Stream </a:t>
+            </a:r>
+            <a:r>
+              <a:rPr lang="en-US" sz="1200" dirty="0" smtClean="0"/>
+              <a:t> UDP</a:t>
+            </a:r>
+            <a:r>
+              <a:rPr lang="en-US" sz="1200" dirty="0"/>
+              <a:t>, Port 11111  </a:t>
+            </a:r>
+            <a:endParaRPr lang="en-SG" sz="1200" dirty="0"/>
+          </a:p>
+        </p:txBody>
+      </p:sp>
     </p:spTree>
     <p:extLst>
       <p:ext uri="{BB962C8B-B14F-4D97-AF65-F5344CB8AC3E}">
@@ -12673,6 +13127,13 @@
   <p:clrMapOvr>
     <a:masterClrMapping/>
   </p:clrMapOvr>
+  <p:timing>
+    <p:tnLst>
+      <p:par>
+        <p:cTn id="1" dur="indefinite" restart="never" nodeType="tmRoot"/>
+      </p:par>
+    </p:tnLst>
+  </p:timing>
 </p:sld>
 </file>
 
@@ -14435,6 +14896,13 @@
   <p:clrMapOvr>
     <a:masterClrMapping/>
   </p:clrMapOvr>
+  <p:timing>
+    <p:tnLst>
+      <p:par>
+        <p:cTn id="1" dur="indefinite" restart="never" nodeType="tmRoot"/>
+      </p:par>
+    </p:tnLst>
+  </p:timing>
 </p:sld>
 </file>
 
@@ -17041,6 +17509,13 @@
   <p:clrMapOvr>
     <a:masterClrMapping/>
   </p:clrMapOvr>
+  <p:timing>
+    <p:tnLst>
+      <p:par>
+        <p:cTn id="1" dur="indefinite" restart="never" nodeType="tmRoot"/>
+      </p:par>
+    </p:tnLst>
+  </p:timing>
 </p:sld>
 </file>
 
@@ -17069,7 +17544,7 @@
         </p:nvSpPr>
         <p:spPr>
           <a:xfrm>
-            <a:off x="2025165" y="2759486"/>
+            <a:off x="0" y="1902837"/>
             <a:ext cx="1667826" cy="440618"/>
           </a:xfrm>
           <a:prstGeom prst="diamond">
@@ -17097,11 +17572,7 @@
             <a:pPr algn="ctr"/>
             <a:r>
               <a:rPr lang="en-US" sz="900" dirty="0" smtClean="0"/>
-              <a:t> Sensor feed back normal </a:t>
-            </a:r>
-            <a:r>
-              <a:rPr lang="en-US" sz="900" dirty="0" smtClean="0"/>
-              <a:t>?</a:t>
+              <a:t> Sensor feed back normal ?</a:t>
             </a:r>
             <a:endParaRPr lang="en-SG" sz="900" dirty="0"/>
           </a:p>
@@ -17115,7 +17586,7 @@
         </p:nvSpPr>
         <p:spPr>
           <a:xfrm>
-            <a:off x="2503321" y="1299404"/>
+            <a:off x="478156" y="442755"/>
             <a:ext cx="711517" cy="246221"/>
           </a:xfrm>
           <a:prstGeom prst="rect">
@@ -17165,7 +17636,7 @@
         </p:nvCxnSpPr>
         <p:spPr>
           <a:xfrm flipH="1">
-            <a:off x="2859079" y="1545625"/>
+            <a:off x="833914" y="688976"/>
             <a:ext cx="1" cy="408303"/>
           </a:xfrm>
           <a:prstGeom prst="straightConnector1">
@@ -17198,7 +17669,7 @@
         </p:nvSpPr>
         <p:spPr>
           <a:xfrm>
-            <a:off x="2503320" y="1953928"/>
+            <a:off x="478155" y="1097279"/>
             <a:ext cx="711517" cy="246221"/>
           </a:xfrm>
           <a:prstGeom prst="rect">
@@ -17249,7 +17720,7 @@
         </p:nvCxnSpPr>
         <p:spPr>
           <a:xfrm flipH="1">
-            <a:off x="2859078" y="2200149"/>
+            <a:off x="833913" y="1343500"/>
             <a:ext cx="1" cy="559337"/>
           </a:xfrm>
           <a:prstGeom prst="straightConnector1">
@@ -17284,7 +17755,7 @@
         </p:nvCxnSpPr>
         <p:spPr>
           <a:xfrm>
-            <a:off x="2859078" y="3200104"/>
+            <a:off x="833913" y="2343455"/>
             <a:ext cx="0" cy="447871"/>
           </a:xfrm>
           <a:prstGeom prst="straightConnector1">
@@ -17317,7 +17788,7 @@
         </p:nvSpPr>
         <p:spPr>
           <a:xfrm>
-            <a:off x="2859078" y="3298594"/>
+            <a:off x="833913" y="2441945"/>
             <a:ext cx="414258" cy="230832"/>
           </a:xfrm>
           <a:prstGeom prst="rect">
@@ -17347,7 +17818,7 @@
         </p:nvSpPr>
         <p:spPr>
           <a:xfrm>
-            <a:off x="2175685" y="3647975"/>
+            <a:off x="150520" y="2791326"/>
             <a:ext cx="1366785" cy="246221"/>
           </a:xfrm>
           <a:prstGeom prst="rect">
@@ -17395,7 +17866,7 @@
         </p:nvCxnSpPr>
         <p:spPr>
           <a:xfrm>
-            <a:off x="2859077" y="3894196"/>
+            <a:off x="833912" y="3037547"/>
             <a:ext cx="0" cy="822183"/>
           </a:xfrm>
           <a:prstGeom prst="straightConnector1">
@@ -17428,7 +17899,7 @@
         </p:nvCxnSpPr>
         <p:spPr>
           <a:xfrm flipH="1">
-            <a:off x="2917035" y="2979795"/>
+            <a:off x="891870" y="2123146"/>
             <a:ext cx="567477" cy="1515203"/>
           </a:xfrm>
           <a:prstGeom prst="bentConnector4">
@@ -17464,7 +17935,7 @@
         </p:nvSpPr>
         <p:spPr>
           <a:xfrm>
-            <a:off x="3697888" y="3298594"/>
+            <a:off x="1672723" y="2441945"/>
             <a:ext cx="414258" cy="230832"/>
           </a:xfrm>
           <a:prstGeom prst="rect">
@@ -17494,7 +17965,7 @@
         </p:nvSpPr>
         <p:spPr>
           <a:xfrm>
-            <a:off x="2598821" y="4747022"/>
+            <a:off x="573656" y="3890373"/>
             <a:ext cx="481264" cy="246221"/>
           </a:xfrm>
           <a:prstGeom prst="rect">
@@ -17534,6 +18005,338 @@
           </a:p>
         </p:txBody>
       </p:sp>
+      <p:sp>
+        <p:nvSpPr>
+          <p:cNvPr id="14" name="TextBox 13"/>
+          <p:cNvSpPr txBox="1"/>
+          <p:nvPr/>
+        </p:nvSpPr>
+        <p:spPr>
+          <a:xfrm>
+            <a:off x="3586363" y="373353"/>
+            <a:ext cx="1848051" cy="246221"/>
+          </a:xfrm>
+          <a:prstGeom prst="rect">
+            <a:avLst/>
+          </a:prstGeom>
+          <a:ln w="19050">
+            <a:solidFill>
+              <a:schemeClr val="tx1"/>
+            </a:solidFill>
+          </a:ln>
+        </p:spPr>
+        <p:style>
+          <a:lnRef idx="2">
+            <a:schemeClr val="accent1"/>
+          </a:lnRef>
+          <a:fillRef idx="1">
+            <a:schemeClr val="lt1"/>
+          </a:fillRef>
+          <a:effectRef idx="0">
+            <a:schemeClr val="accent1"/>
+          </a:effectRef>
+          <a:fontRef idx="minor">
+            <a:schemeClr val="dk1"/>
+          </a:fontRef>
+        </p:style>
+        <p:txBody>
+          <a:bodyPr wrap="square" rtlCol="0">
+            <a:spAutoFit/>
+          </a:bodyPr>
+          <a:lstStyle/>
+          <a:p>
+            <a:r>
+              <a:rPr lang="en-US" sz="1000" dirty="0" smtClean="0"/>
+              <a:t>Parse URL to get the Web link.</a:t>
+            </a:r>
+            <a:endParaRPr lang="en-SG" sz="1000" dirty="0"/>
+          </a:p>
+        </p:txBody>
+      </p:sp>
+      <p:cxnSp>
+        <p:nvCxnSpPr>
+          <p:cNvPr id="16" name="Straight Arrow Connector 15"/>
+          <p:cNvCxnSpPr/>
+          <p:nvPr/>
+        </p:nvCxnSpPr>
+        <p:spPr>
+          <a:xfrm flipH="1">
+            <a:off x="4510387" y="619574"/>
+            <a:ext cx="1" cy="408303"/>
+          </a:xfrm>
+          <a:prstGeom prst="straightConnector1">
+            <a:avLst/>
+          </a:prstGeom>
+          <a:ln>
+            <a:tailEnd type="triangle"/>
+          </a:ln>
+        </p:spPr>
+        <p:style>
+          <a:lnRef idx="1">
+            <a:schemeClr val="dk1"/>
+          </a:lnRef>
+          <a:fillRef idx="0">
+            <a:schemeClr val="dk1"/>
+          </a:fillRef>
+          <a:effectRef idx="0">
+            <a:schemeClr val="dk1"/>
+          </a:effectRef>
+          <a:fontRef idx="minor">
+            <a:schemeClr val="tx1"/>
+          </a:fontRef>
+        </p:style>
+      </p:cxnSp>
+      <p:sp>
+        <p:nvSpPr>
+          <p:cNvPr id="17" name="TextBox 16"/>
+          <p:cNvSpPr txBox="1"/>
+          <p:nvPr/>
+        </p:nvSpPr>
+        <p:spPr>
+          <a:xfrm>
+            <a:off x="3586363" y="1027877"/>
+            <a:ext cx="1848051" cy="246221"/>
+          </a:xfrm>
+          <a:prstGeom prst="rect">
+            <a:avLst/>
+          </a:prstGeom>
+          <a:ln w="19050">
+            <a:solidFill>
+              <a:schemeClr val="tx1"/>
+            </a:solidFill>
+          </a:ln>
+        </p:spPr>
+        <p:style>
+          <a:lnRef idx="2">
+            <a:schemeClr val="accent1"/>
+          </a:lnRef>
+          <a:fillRef idx="1">
+            <a:schemeClr val="lt1"/>
+          </a:fillRef>
+          <a:effectRef idx="0">
+            <a:schemeClr val="accent1"/>
+          </a:effectRef>
+          <a:fontRef idx="minor">
+            <a:schemeClr val="dk1"/>
+          </a:fontRef>
+        </p:style>
+        <p:txBody>
+          <a:bodyPr wrap="square" rtlCol="0">
+            <a:spAutoFit/>
+          </a:bodyPr>
+          <a:lstStyle/>
+          <a:p>
+            <a:r>
+              <a:rPr lang="en-US" sz="1000" dirty="0" smtClean="0"/>
+              <a:t>Convert web link to IP address.</a:t>
+            </a:r>
+            <a:endParaRPr lang="en-SG" sz="1000" dirty="0"/>
+          </a:p>
+        </p:txBody>
+      </p:sp>
+      <p:cxnSp>
+        <p:nvCxnSpPr>
+          <p:cNvPr id="18" name="Straight Arrow Connector 17"/>
+          <p:cNvCxnSpPr/>
+          <p:nvPr/>
+        </p:nvCxnSpPr>
+        <p:spPr>
+          <a:xfrm flipH="1">
+            <a:off x="4510387" y="1274098"/>
+            <a:ext cx="1" cy="408303"/>
+          </a:xfrm>
+          <a:prstGeom prst="straightConnector1">
+            <a:avLst/>
+          </a:prstGeom>
+          <a:ln>
+            <a:tailEnd type="triangle"/>
+          </a:ln>
+        </p:spPr>
+        <p:style>
+          <a:lnRef idx="1">
+            <a:schemeClr val="dk1"/>
+          </a:lnRef>
+          <a:fillRef idx="0">
+            <a:schemeClr val="dk1"/>
+          </a:fillRef>
+          <a:effectRef idx="0">
+            <a:schemeClr val="dk1"/>
+          </a:effectRef>
+          <a:fontRef idx="minor">
+            <a:schemeClr val="tx1"/>
+          </a:fontRef>
+        </p:style>
+      </p:cxnSp>
+      <p:sp>
+        <p:nvSpPr>
+          <p:cNvPr id="20" name="TextBox 19"/>
+          <p:cNvSpPr txBox="1"/>
+          <p:nvPr/>
+        </p:nvSpPr>
+        <p:spPr>
+          <a:xfrm>
+            <a:off x="3586363" y="1699633"/>
+            <a:ext cx="1848051" cy="400110"/>
+          </a:xfrm>
+          <a:prstGeom prst="rect">
+            <a:avLst/>
+          </a:prstGeom>
+          <a:ln w="19050">
+            <a:solidFill>
+              <a:schemeClr val="tx1"/>
+            </a:solidFill>
+          </a:ln>
+        </p:spPr>
+        <p:style>
+          <a:lnRef idx="2">
+            <a:schemeClr val="accent1"/>
+          </a:lnRef>
+          <a:fillRef idx="1">
+            <a:schemeClr val="lt1"/>
+          </a:fillRef>
+          <a:effectRef idx="0">
+            <a:schemeClr val="accent1"/>
+          </a:effectRef>
+          <a:fontRef idx="minor">
+            <a:schemeClr val="dk1"/>
+          </a:fontRef>
+        </p:style>
+        <p:txBody>
+          <a:bodyPr wrap="square" rtlCol="0">
+            <a:spAutoFit/>
+          </a:bodyPr>
+          <a:lstStyle/>
+          <a:p>
+            <a:r>
+              <a:rPr lang="en-US" sz="1000" dirty="0" smtClean="0"/>
+              <a:t>Call ipinfo.io API to convert IP to GPS position.</a:t>
+            </a:r>
+            <a:endParaRPr lang="en-SG" sz="1000" dirty="0"/>
+          </a:p>
+        </p:txBody>
+      </p:sp>
+      <p:cxnSp>
+        <p:nvCxnSpPr>
+          <p:cNvPr id="24" name="Straight Arrow Connector 23"/>
+          <p:cNvCxnSpPr/>
+          <p:nvPr/>
+        </p:nvCxnSpPr>
+        <p:spPr>
+          <a:xfrm flipH="1">
+            <a:off x="4510386" y="2107936"/>
+            <a:ext cx="1" cy="408303"/>
+          </a:xfrm>
+          <a:prstGeom prst="straightConnector1">
+            <a:avLst/>
+          </a:prstGeom>
+          <a:ln>
+            <a:tailEnd type="triangle"/>
+          </a:ln>
+        </p:spPr>
+        <p:style>
+          <a:lnRef idx="1">
+            <a:schemeClr val="dk1"/>
+          </a:lnRef>
+          <a:fillRef idx="0">
+            <a:schemeClr val="dk1"/>
+          </a:fillRef>
+          <a:effectRef idx="0">
+            <a:schemeClr val="dk1"/>
+          </a:effectRef>
+          <a:fontRef idx="minor">
+            <a:schemeClr val="tx1"/>
+          </a:fontRef>
+        </p:style>
+      </p:cxnSp>
+      <p:sp>
+        <p:nvSpPr>
+          <p:cNvPr id="26" name="TextBox 25"/>
+          <p:cNvSpPr txBox="1"/>
+          <p:nvPr/>
+        </p:nvSpPr>
+        <p:spPr>
+          <a:xfrm>
+            <a:off x="3595779" y="2537569"/>
+            <a:ext cx="1848051" cy="553998"/>
+          </a:xfrm>
+          <a:prstGeom prst="rect">
+            <a:avLst/>
+          </a:prstGeom>
+          <a:ln w="19050">
+            <a:solidFill>
+              <a:schemeClr val="tx1"/>
+            </a:solidFill>
+          </a:ln>
+        </p:spPr>
+        <p:style>
+          <a:lnRef idx="2">
+            <a:schemeClr val="accent1"/>
+          </a:lnRef>
+          <a:fillRef idx="1">
+            <a:schemeClr val="lt1"/>
+          </a:fillRef>
+          <a:effectRef idx="0">
+            <a:schemeClr val="accent1"/>
+          </a:effectRef>
+          <a:fontRef idx="minor">
+            <a:schemeClr val="dk1"/>
+          </a:fontRef>
+        </p:style>
+        <p:txBody>
+          <a:bodyPr wrap="square" rtlCol="0">
+            <a:spAutoFit/>
+          </a:bodyPr>
+          <a:lstStyle/>
+          <a:p>
+            <a:r>
+              <a:rPr lang="en-US" sz="1000" dirty="0" smtClean="0"/>
+              <a:t>Download map Tile based on the </a:t>
+            </a:r>
+            <a:r>
+              <a:rPr lang="en-US" sz="1000" dirty="0" err="1" smtClean="0"/>
+              <a:t>usr’s</a:t>
+            </a:r>
+            <a:r>
+              <a:rPr lang="en-US" sz="1000" dirty="0" smtClean="0"/>
+              <a:t> image size and zoom in level. </a:t>
+            </a:r>
+            <a:endParaRPr lang="en-SG" sz="1000" dirty="0"/>
+          </a:p>
+        </p:txBody>
+      </p:sp>
+      <p:cxnSp>
+        <p:nvCxnSpPr>
+          <p:cNvPr id="27" name="Straight Arrow Connector 26"/>
+          <p:cNvCxnSpPr/>
+          <p:nvPr/>
+        </p:nvCxnSpPr>
+        <p:spPr>
+          <a:xfrm flipH="1">
+            <a:off x="4510385" y="3091567"/>
+            <a:ext cx="1" cy="408303"/>
+          </a:xfrm>
+          <a:prstGeom prst="straightConnector1">
+            <a:avLst/>
+          </a:prstGeom>
+          <a:ln>
+            <a:tailEnd type="triangle"/>
+          </a:ln>
+        </p:spPr>
+        <p:style>
+          <a:lnRef idx="1">
+            <a:schemeClr val="dk1"/>
+          </a:lnRef>
+          <a:fillRef idx="0">
+            <a:schemeClr val="dk1"/>
+          </a:fillRef>
+          <a:effectRef idx="0">
+            <a:schemeClr val="dk1"/>
+          </a:effectRef>
+          <a:fontRef idx="minor">
+            <a:schemeClr val="tx1"/>
+          </a:fontRef>
+        </p:style>
+      </p:cxnSp>
     </p:spTree>
     <p:extLst>
       <p:ext uri="{BB962C8B-B14F-4D97-AF65-F5344CB8AC3E}">
@@ -17544,6 +18347,3212 @@
   <p:clrMapOvr>
     <a:masterClrMapping/>
   </p:clrMapOvr>
+  <p:timing>
+    <p:tnLst>
+      <p:par>
+        <p:cTn id="1" dur="indefinite" restart="never" nodeType="tmRoot"/>
+      </p:par>
+    </p:tnLst>
+  </p:timing>
+</p:sld>
+</file>
+
+<file path=ppt/slides/slide18.xml><?xml version="1.0" encoding="utf-8"?>
+<p:sld xmlns:a="http://schemas.openxmlformats.org/drawingml/2006/main" xmlns:r="http://schemas.openxmlformats.org/officeDocument/2006/relationships" xmlns:p="http://schemas.openxmlformats.org/presentationml/2006/main">
+  <p:cSld>
+    <p:spTree>
+      <p:nvGrpSpPr>
+        <p:cNvPr id="1" name=""/>
+        <p:cNvGrpSpPr/>
+        <p:nvPr/>
+      </p:nvGrpSpPr>
+      <p:grpSpPr>
+        <a:xfrm>
+          <a:off x="0" y="0"/>
+          <a:ext cx="0" cy="0"/>
+          <a:chOff x="0" y="0"/>
+          <a:chExt cx="0" cy="0"/>
+        </a:xfrm>
+      </p:grpSpPr>
+      <p:sp>
+        <p:nvSpPr>
+          <p:cNvPr id="4" name="AutoShape 2" descr="Image result for tello"/>
+          <p:cNvSpPr>
+            <a:spLocks noChangeAspect="1" noChangeArrowheads="1"/>
+          </p:cNvSpPr>
+          <p:nvPr/>
+        </p:nvSpPr>
+        <p:spPr bwMode="auto">
+          <a:xfrm>
+            <a:off x="155575" y="-144463"/>
+            <a:ext cx="304800" cy="304801"/>
+          </a:xfrm>
+          <a:prstGeom prst="rect">
+            <a:avLst/>
+          </a:prstGeom>
+          <a:noFill/>
+          <a:extLst>
+            <a:ext uri="{909E8E84-426E-40DD-AFC4-6F175D3DCCD1}">
+              <a14:hiddenFill xmlns:a14="http://schemas.microsoft.com/office/drawing/2010/main">
+                <a:solidFill>
+                  <a:srgbClr val="FFFFFF"/>
+                </a:solidFill>
+              </a14:hiddenFill>
+            </a:ext>
+          </a:extLst>
+        </p:spPr>
+        <p:txBody>
+          <a:bodyPr vert="horz" wrap="square" lIns="91440" tIns="45720" rIns="91440" bIns="45720" numCol="1" anchor="t" anchorCtr="0" compatLnSpc="1">
+            <a:prstTxWarp prst="textNoShape">
+              <a:avLst/>
+            </a:prstTxWarp>
+          </a:bodyPr>
+          <a:lstStyle/>
+          <a:p>
+            <a:endParaRPr lang="en-SG"/>
+          </a:p>
+        </p:txBody>
+      </p:sp>
+      <p:sp>
+        <p:nvSpPr>
+          <p:cNvPr id="5" name="AutoShape 4" descr="Image result for tello"/>
+          <p:cNvSpPr>
+            <a:spLocks noChangeAspect="1" noChangeArrowheads="1"/>
+          </p:cNvSpPr>
+          <p:nvPr/>
+        </p:nvSpPr>
+        <p:spPr bwMode="auto">
+          <a:xfrm>
+            <a:off x="307974" y="7937"/>
+            <a:ext cx="2666231" cy="2666240"/>
+          </a:xfrm>
+          <a:prstGeom prst="rect">
+            <a:avLst/>
+          </a:prstGeom>
+          <a:noFill/>
+          <a:extLst>
+            <a:ext uri="{909E8E84-426E-40DD-AFC4-6F175D3DCCD1}">
+              <a14:hiddenFill xmlns:a14="http://schemas.microsoft.com/office/drawing/2010/main">
+                <a:solidFill>
+                  <a:srgbClr val="FFFFFF"/>
+                </a:solidFill>
+              </a14:hiddenFill>
+            </a:ext>
+          </a:extLst>
+        </p:spPr>
+        <p:txBody>
+          <a:bodyPr vert="horz" wrap="square" lIns="91440" tIns="45720" rIns="91440" bIns="45720" numCol="1" anchor="t" anchorCtr="0" compatLnSpc="1">
+            <a:prstTxWarp prst="textNoShape">
+              <a:avLst/>
+            </a:prstTxWarp>
+          </a:bodyPr>
+          <a:lstStyle/>
+          <a:p>
+            <a:endParaRPr lang="en-SG"/>
+          </a:p>
+        </p:txBody>
+      </p:sp>
+      <p:pic>
+        <p:nvPicPr>
+          <p:cNvPr id="6" name="Picture 5"/>
+          <p:cNvPicPr>
+            <a:picLocks noChangeAspect="1"/>
+          </p:cNvPicPr>
+          <p:nvPr/>
+        </p:nvPicPr>
+        <p:blipFill>
+          <a:blip r:embed="rId2">
+            <a:extLst>
+              <a:ext uri="{28A0092B-C50C-407E-A947-70E740481C1C}">
+                <a14:useLocalDpi xmlns:a14="http://schemas.microsoft.com/office/drawing/2010/main" val="0"/>
+              </a:ext>
+            </a:extLst>
+          </a:blip>
+          <a:stretch>
+            <a:fillRect/>
+          </a:stretch>
+        </p:blipFill>
+        <p:spPr>
+          <a:xfrm>
+            <a:off x="1405338" y="54463"/>
+            <a:ext cx="2143125" cy="2143125"/>
+          </a:xfrm>
+          <a:prstGeom prst="rect">
+            <a:avLst/>
+          </a:prstGeom>
+        </p:spPr>
+      </p:pic>
+      <p:pic>
+        <p:nvPicPr>
+          <p:cNvPr id="7" name="Picture 6"/>
+          <p:cNvPicPr>
+            <a:picLocks noChangeAspect="1"/>
+          </p:cNvPicPr>
+          <p:nvPr/>
+        </p:nvPicPr>
+        <p:blipFill>
+          <a:blip r:embed="rId3">
+            <a:extLst>
+              <a:ext uri="{28A0092B-C50C-407E-A947-70E740481C1C}">
+                <a14:useLocalDpi xmlns:a14="http://schemas.microsoft.com/office/drawing/2010/main" val="0"/>
+              </a:ext>
+            </a:extLst>
+          </a:blip>
+          <a:stretch>
+            <a:fillRect/>
+          </a:stretch>
+        </p:blipFill>
+        <p:spPr>
+          <a:xfrm>
+            <a:off x="4053488" y="3108963"/>
+            <a:ext cx="2143125" cy="2143125"/>
+          </a:xfrm>
+          <a:prstGeom prst="rect">
+            <a:avLst/>
+          </a:prstGeom>
+        </p:spPr>
+      </p:pic>
+      <p:pic>
+        <p:nvPicPr>
+          <p:cNvPr id="10" name="Picture 9"/>
+          <p:cNvPicPr>
+            <a:picLocks noChangeAspect="1"/>
+          </p:cNvPicPr>
+          <p:nvPr/>
+        </p:nvPicPr>
+        <p:blipFill>
+          <a:blip r:embed="rId4" cstate="print">
+            <a:extLst>
+              <a:ext uri="{28A0092B-C50C-407E-A947-70E740481C1C}">
+                <a14:useLocalDpi xmlns:a14="http://schemas.microsoft.com/office/drawing/2010/main" val="0"/>
+              </a:ext>
+            </a:extLst>
+          </a:blip>
+          <a:stretch>
+            <a:fillRect/>
+          </a:stretch>
+        </p:blipFill>
+        <p:spPr>
+          <a:xfrm rot="10800000">
+            <a:off x="449993" y="1933608"/>
+            <a:ext cx="568351" cy="527960"/>
+          </a:xfrm>
+          <a:prstGeom prst="rect">
+            <a:avLst/>
+          </a:prstGeom>
+        </p:spPr>
+      </p:pic>
+      <p:pic>
+        <p:nvPicPr>
+          <p:cNvPr id="11" name="Picture 10"/>
+          <p:cNvPicPr>
+            <a:picLocks noChangeAspect="1"/>
+          </p:cNvPicPr>
+          <p:nvPr/>
+        </p:nvPicPr>
+        <p:blipFill>
+          <a:blip r:embed="rId5" cstate="print">
+            <a:extLst>
+              <a:ext uri="{28A0092B-C50C-407E-A947-70E740481C1C}">
+                <a14:useLocalDpi xmlns:a14="http://schemas.microsoft.com/office/drawing/2010/main" val="0"/>
+              </a:ext>
+            </a:extLst>
+          </a:blip>
+          <a:stretch>
+            <a:fillRect/>
+          </a:stretch>
+        </p:blipFill>
+        <p:spPr>
+          <a:xfrm>
+            <a:off x="1641089" y="1126025"/>
+            <a:ext cx="672024" cy="672024"/>
+          </a:xfrm>
+          <a:prstGeom prst="roundRect">
+            <a:avLst>
+              <a:gd name="adj" fmla="val 4167"/>
+            </a:avLst>
+          </a:prstGeom>
+          <a:solidFill>
+            <a:srgbClr val="FFFFFF"/>
+          </a:solidFill>
+          <a:ln w="9525" cap="sq">
+            <a:solidFill>
+              <a:srgbClr val="FF0000"/>
+            </a:solidFill>
+            <a:miter lim="800000"/>
+          </a:ln>
+          <a:effectLst>
+            <a:reflection blurRad="12700" stA="28000" endPos="28000" dist="5000" dir="5400000" sy="-100000" algn="bl" rotWithShape="0"/>
+          </a:effectLst>
+          <a:scene3d>
+            <a:camera prst="orthographicFront"/>
+            <a:lightRig rig="threePt" dir="t">
+              <a:rot lat="0" lon="0" rev="2700000"/>
+            </a:lightRig>
+          </a:scene3d>
+          <a:sp3d>
+            <a:bevelT h="38100"/>
+            <a:contourClr>
+              <a:srgbClr val="C0C0C0"/>
+            </a:contourClr>
+          </a:sp3d>
+        </p:spPr>
+      </p:pic>
+      <p:cxnSp>
+        <p:nvCxnSpPr>
+          <p:cNvPr id="13" name="Elbow Connector 12"/>
+          <p:cNvCxnSpPr>
+            <a:stCxn id="10" idx="2"/>
+            <a:endCxn id="11" idx="1"/>
+          </p:cNvCxnSpPr>
+          <p:nvPr/>
+        </p:nvCxnSpPr>
+        <p:spPr>
+          <a:xfrm rot="5400000" flipH="1" flipV="1">
+            <a:off x="951843" y="1244363"/>
+            <a:ext cx="471571" cy="906921"/>
+          </a:xfrm>
+          <a:prstGeom prst="bentConnector2">
+            <a:avLst/>
+          </a:prstGeom>
+        </p:spPr>
+        <p:style>
+          <a:lnRef idx="1">
+            <a:schemeClr val="dk1"/>
+          </a:lnRef>
+          <a:fillRef idx="0">
+            <a:schemeClr val="dk1"/>
+          </a:fillRef>
+          <a:effectRef idx="0">
+            <a:schemeClr val="dk1"/>
+          </a:effectRef>
+          <a:fontRef idx="minor">
+            <a:schemeClr val="tx1"/>
+          </a:fontRef>
+        </p:style>
+      </p:cxnSp>
+      <p:pic>
+        <p:nvPicPr>
+          <p:cNvPr id="14" name="Picture 13"/>
+          <p:cNvPicPr>
+            <a:picLocks noChangeAspect="1"/>
+          </p:cNvPicPr>
+          <p:nvPr/>
+        </p:nvPicPr>
+        <p:blipFill>
+          <a:blip r:embed="rId6">
+            <a:extLst>
+              <a:ext uri="{28A0092B-C50C-407E-A947-70E740481C1C}">
+                <a14:useLocalDpi xmlns:a14="http://schemas.microsoft.com/office/drawing/2010/main" val="0"/>
+              </a:ext>
+            </a:extLst>
+          </a:blip>
+          <a:stretch>
+            <a:fillRect/>
+          </a:stretch>
+        </p:blipFill>
+        <p:spPr>
+          <a:xfrm>
+            <a:off x="1656346" y="3409385"/>
+            <a:ext cx="1429753" cy="1542280"/>
+          </a:xfrm>
+          <a:prstGeom prst="rect">
+            <a:avLst/>
+          </a:prstGeom>
+        </p:spPr>
+      </p:pic>
+      <p:cxnSp>
+        <p:nvCxnSpPr>
+          <p:cNvPr id="18" name="Elbow Connector 17"/>
+          <p:cNvCxnSpPr>
+            <a:stCxn id="6" idx="3"/>
+            <a:endCxn id="7" idx="0"/>
+          </p:cNvCxnSpPr>
+          <p:nvPr/>
+        </p:nvCxnSpPr>
+        <p:spPr>
+          <a:xfrm>
+            <a:off x="3548463" y="1126026"/>
+            <a:ext cx="1576588" cy="1982937"/>
+          </a:xfrm>
+          <a:prstGeom prst="bentConnector2">
+            <a:avLst/>
+          </a:prstGeom>
+          <a:ln w="19050">
+            <a:prstDash val="sysDash"/>
+          </a:ln>
+        </p:spPr>
+        <p:style>
+          <a:lnRef idx="1">
+            <a:schemeClr val="accent1"/>
+          </a:lnRef>
+          <a:fillRef idx="0">
+            <a:schemeClr val="accent1"/>
+          </a:fillRef>
+          <a:effectRef idx="0">
+            <a:schemeClr val="accent1"/>
+          </a:effectRef>
+          <a:fontRef idx="minor">
+            <a:schemeClr val="tx1"/>
+          </a:fontRef>
+        </p:style>
+      </p:cxnSp>
+      <p:cxnSp>
+        <p:nvCxnSpPr>
+          <p:cNvPr id="20" name="Elbow Connector 19"/>
+          <p:cNvCxnSpPr>
+            <a:stCxn id="11" idx="2"/>
+            <a:endCxn id="14" idx="0"/>
+          </p:cNvCxnSpPr>
+          <p:nvPr/>
+        </p:nvCxnSpPr>
+        <p:spPr>
+          <a:xfrm rot="16200000" flipH="1">
+            <a:off x="1368494" y="2406656"/>
+            <a:ext cx="1611336" cy="394122"/>
+          </a:xfrm>
+          <a:prstGeom prst="bentConnector3">
+            <a:avLst/>
+          </a:prstGeom>
+          <a:ln w="19050">
+            <a:prstDash val="sysDash"/>
+          </a:ln>
+        </p:spPr>
+        <p:style>
+          <a:lnRef idx="1">
+            <a:schemeClr val="accent1"/>
+          </a:lnRef>
+          <a:fillRef idx="0">
+            <a:schemeClr val="accent1"/>
+          </a:fillRef>
+          <a:effectRef idx="0">
+            <a:schemeClr val="accent1"/>
+          </a:effectRef>
+          <a:fontRef idx="minor">
+            <a:schemeClr val="tx1"/>
+          </a:fontRef>
+        </p:style>
+      </p:cxnSp>
+      <p:cxnSp>
+        <p:nvCxnSpPr>
+          <p:cNvPr id="23" name="Straight Connector 22"/>
+          <p:cNvCxnSpPr>
+            <a:stCxn id="14" idx="3"/>
+            <a:endCxn id="7" idx="1"/>
+          </p:cNvCxnSpPr>
+          <p:nvPr/>
+        </p:nvCxnSpPr>
+        <p:spPr>
+          <a:xfrm>
+            <a:off x="3086099" y="4180525"/>
+            <a:ext cx="967389" cy="1"/>
+          </a:xfrm>
+          <a:prstGeom prst="line">
+            <a:avLst/>
+          </a:prstGeom>
+          <a:ln w="28575"/>
+        </p:spPr>
+        <p:style>
+          <a:lnRef idx="1">
+            <a:schemeClr val="dk1"/>
+          </a:lnRef>
+          <a:fillRef idx="0">
+            <a:schemeClr val="dk1"/>
+          </a:fillRef>
+          <a:effectRef idx="0">
+            <a:schemeClr val="dk1"/>
+          </a:effectRef>
+          <a:fontRef idx="minor">
+            <a:schemeClr val="tx1"/>
+          </a:fontRef>
+        </p:style>
+      </p:cxnSp>
+      <p:sp>
+        <p:nvSpPr>
+          <p:cNvPr id="27" name="TextBox 26"/>
+          <p:cNvSpPr txBox="1"/>
+          <p:nvPr/>
+        </p:nvSpPr>
+        <p:spPr>
+          <a:xfrm>
+            <a:off x="3629892" y="756693"/>
+            <a:ext cx="1868454" cy="307777"/>
+          </a:xfrm>
+          <a:prstGeom prst="rect">
+            <a:avLst/>
+          </a:prstGeom>
+          <a:noFill/>
+        </p:spPr>
+        <p:txBody>
+          <a:bodyPr wrap="square" rtlCol="0">
+            <a:spAutoFit/>
+          </a:bodyPr>
+          <a:lstStyle/>
+          <a:p>
+            <a:r>
+              <a:rPr lang="en-US" sz="1400" dirty="0" smtClean="0"/>
+              <a:t>Wi-Fi [ ID:TELLO-5XXX]</a:t>
+            </a:r>
+            <a:endParaRPr lang="en-SG" sz="1400" dirty="0"/>
+          </a:p>
+        </p:txBody>
+      </p:sp>
+      <p:sp>
+        <p:nvSpPr>
+          <p:cNvPr id="28" name="TextBox 27"/>
+          <p:cNvSpPr txBox="1"/>
+          <p:nvPr/>
+        </p:nvSpPr>
+        <p:spPr>
+          <a:xfrm>
+            <a:off x="1977101" y="2064409"/>
+            <a:ext cx="1384098" cy="307777"/>
+          </a:xfrm>
+          <a:prstGeom prst="rect">
+            <a:avLst/>
+          </a:prstGeom>
+          <a:noFill/>
+        </p:spPr>
+        <p:txBody>
+          <a:bodyPr wrap="square" rtlCol="0">
+            <a:spAutoFit/>
+          </a:bodyPr>
+          <a:lstStyle/>
+          <a:p>
+            <a:r>
+              <a:rPr lang="en-US" sz="1400" dirty="0" smtClean="0"/>
+              <a:t>Wi-Fi [ID :TBD]</a:t>
+            </a:r>
+            <a:endParaRPr lang="en-SG" sz="1400" dirty="0"/>
+          </a:p>
+        </p:txBody>
+      </p:sp>
+      <p:sp>
+        <p:nvSpPr>
+          <p:cNvPr id="29" name="TextBox 28"/>
+          <p:cNvSpPr txBox="1"/>
+          <p:nvPr/>
+        </p:nvSpPr>
+        <p:spPr>
+          <a:xfrm>
+            <a:off x="4555095" y="3108963"/>
+            <a:ext cx="1306690" cy="307777"/>
+          </a:xfrm>
+          <a:prstGeom prst="rect">
+            <a:avLst/>
+          </a:prstGeom>
+          <a:noFill/>
+        </p:spPr>
+        <p:txBody>
+          <a:bodyPr wrap="square" rtlCol="0">
+            <a:spAutoFit/>
+          </a:bodyPr>
+          <a:lstStyle/>
+          <a:p>
+            <a:r>
+              <a:rPr lang="en-US" sz="1400" dirty="0" smtClean="0"/>
+              <a:t>192.168.100.2</a:t>
+            </a:r>
+            <a:endParaRPr lang="en-SG" sz="1400" dirty="0"/>
+          </a:p>
+        </p:txBody>
+      </p:sp>
+      <p:sp>
+        <p:nvSpPr>
+          <p:cNvPr id="30" name="TextBox 29"/>
+          <p:cNvSpPr txBox="1"/>
+          <p:nvPr/>
+        </p:nvSpPr>
+        <p:spPr>
+          <a:xfrm>
+            <a:off x="1841572" y="3416740"/>
+            <a:ext cx="1306690" cy="307777"/>
+          </a:xfrm>
+          <a:prstGeom prst="rect">
+            <a:avLst/>
+          </a:prstGeom>
+          <a:noFill/>
+        </p:spPr>
+        <p:txBody>
+          <a:bodyPr wrap="square" rtlCol="0">
+            <a:spAutoFit/>
+          </a:bodyPr>
+          <a:lstStyle/>
+          <a:p>
+            <a:r>
+              <a:rPr lang="en-US" sz="1400" dirty="0" smtClean="0"/>
+              <a:t>192.168.1.1</a:t>
+            </a:r>
+            <a:endParaRPr lang="en-SG" sz="1400" dirty="0"/>
+          </a:p>
+        </p:txBody>
+      </p:sp>
+      <p:sp>
+        <p:nvSpPr>
+          <p:cNvPr id="31" name="TextBox 30"/>
+          <p:cNvSpPr txBox="1"/>
+          <p:nvPr/>
+        </p:nvSpPr>
+        <p:spPr>
+          <a:xfrm>
+            <a:off x="3238785" y="4183683"/>
+            <a:ext cx="1316310" cy="307777"/>
+          </a:xfrm>
+          <a:prstGeom prst="rect">
+            <a:avLst/>
+          </a:prstGeom>
+          <a:noFill/>
+        </p:spPr>
+        <p:txBody>
+          <a:bodyPr wrap="square" rtlCol="0">
+            <a:spAutoFit/>
+          </a:bodyPr>
+          <a:lstStyle/>
+          <a:p>
+            <a:r>
+              <a:rPr lang="en-US" sz="1400" dirty="0" smtClean="0"/>
+              <a:t>192.168.1.100</a:t>
+            </a:r>
+            <a:endParaRPr lang="en-SG" sz="1400" dirty="0"/>
+          </a:p>
+        </p:txBody>
+      </p:sp>
+      <p:sp>
+        <p:nvSpPr>
+          <p:cNvPr id="32" name="TextBox 31"/>
+          <p:cNvSpPr txBox="1"/>
+          <p:nvPr/>
+        </p:nvSpPr>
+        <p:spPr>
+          <a:xfrm>
+            <a:off x="948809" y="1776042"/>
+            <a:ext cx="1316310" cy="307777"/>
+          </a:xfrm>
+          <a:prstGeom prst="rect">
+            <a:avLst/>
+          </a:prstGeom>
+          <a:noFill/>
+        </p:spPr>
+        <p:txBody>
+          <a:bodyPr wrap="square" rtlCol="0">
+            <a:spAutoFit/>
+          </a:bodyPr>
+          <a:lstStyle/>
+          <a:p>
+            <a:r>
+              <a:rPr lang="en-US" sz="1400" dirty="0" smtClean="0"/>
+              <a:t>192.168.1.101</a:t>
+            </a:r>
+            <a:endParaRPr lang="en-SG" sz="1400" dirty="0"/>
+          </a:p>
+        </p:txBody>
+      </p:sp>
+      <p:sp>
+        <p:nvSpPr>
+          <p:cNvPr id="33" name="TextBox 32"/>
+          <p:cNvSpPr txBox="1"/>
+          <p:nvPr/>
+        </p:nvSpPr>
+        <p:spPr>
+          <a:xfrm>
+            <a:off x="3247809" y="3859244"/>
+            <a:ext cx="1316310" cy="307777"/>
+          </a:xfrm>
+          <a:prstGeom prst="rect">
+            <a:avLst/>
+          </a:prstGeom>
+          <a:noFill/>
+        </p:spPr>
+        <p:txBody>
+          <a:bodyPr wrap="square" rtlCol="0">
+            <a:spAutoFit/>
+          </a:bodyPr>
+          <a:lstStyle/>
+          <a:p>
+            <a:r>
+              <a:rPr lang="en-US" sz="1400" dirty="0" smtClean="0"/>
+              <a:t>CAT-5</a:t>
+            </a:r>
+            <a:endParaRPr lang="en-SG" sz="1400" dirty="0"/>
+          </a:p>
+        </p:txBody>
+      </p:sp>
+    </p:spTree>
+    <p:extLst>
+      <p:ext uri="{BB962C8B-B14F-4D97-AF65-F5344CB8AC3E}">
+        <p14:creationId xmlns:p14="http://schemas.microsoft.com/office/powerpoint/2010/main" val="1356631413"/>
+      </p:ext>
+    </p:extLst>
+  </p:cSld>
+  <p:clrMapOvr>
+    <a:masterClrMapping/>
+  </p:clrMapOvr>
+  <p:timing>
+    <p:tnLst>
+      <p:par>
+        <p:cTn id="1" dur="indefinite" restart="never" nodeType="tmRoot"/>
+      </p:par>
+    </p:tnLst>
+  </p:timing>
+</p:sld>
+</file>
+
+<file path=ppt/slides/slide19.xml><?xml version="1.0" encoding="utf-8"?>
+<p:sld xmlns:a="http://schemas.openxmlformats.org/drawingml/2006/main" xmlns:r="http://schemas.openxmlformats.org/officeDocument/2006/relationships" xmlns:p="http://schemas.openxmlformats.org/presentationml/2006/main">
+  <p:cSld>
+    <p:spTree>
+      <p:nvGrpSpPr>
+        <p:cNvPr id="1" name=""/>
+        <p:cNvGrpSpPr/>
+        <p:nvPr/>
+      </p:nvGrpSpPr>
+      <p:grpSpPr>
+        <a:xfrm>
+          <a:off x="0" y="0"/>
+          <a:ext cx="0" cy="0"/>
+          <a:chOff x="0" y="0"/>
+          <a:chExt cx="0" cy="0"/>
+        </a:xfrm>
+      </p:grpSpPr>
+      <p:sp>
+        <p:nvSpPr>
+          <p:cNvPr id="12" name="Rectangle 11"/>
+          <p:cNvSpPr/>
+          <p:nvPr/>
+        </p:nvSpPr>
+        <p:spPr>
+          <a:xfrm>
+            <a:off x="1052035" y="558135"/>
+            <a:ext cx="2521820" cy="5553907"/>
+          </a:xfrm>
+          <a:prstGeom prst="rect">
+            <a:avLst/>
+          </a:prstGeom>
+          <a:ln>
+            <a:prstDash val="sysDot"/>
+          </a:ln>
+        </p:spPr>
+        <p:style>
+          <a:lnRef idx="2">
+            <a:schemeClr val="dk1"/>
+          </a:lnRef>
+          <a:fillRef idx="1">
+            <a:schemeClr val="lt1"/>
+          </a:fillRef>
+          <a:effectRef idx="0">
+            <a:schemeClr val="dk1"/>
+          </a:effectRef>
+          <a:fontRef idx="minor">
+            <a:schemeClr val="dk1"/>
+          </a:fontRef>
+        </p:style>
+        <p:txBody>
+          <a:bodyPr rtlCol="0" anchor="ctr"/>
+          <a:lstStyle/>
+          <a:p>
+            <a:pPr algn="ctr"/>
+            <a:endParaRPr lang="en-SG"/>
+          </a:p>
+        </p:txBody>
+      </p:sp>
+      <p:sp>
+        <p:nvSpPr>
+          <p:cNvPr id="4" name="TextBox 3"/>
+          <p:cNvSpPr txBox="1"/>
+          <p:nvPr/>
+        </p:nvSpPr>
+        <p:spPr>
+          <a:xfrm>
+            <a:off x="1266674" y="1066440"/>
+            <a:ext cx="2188795" cy="246221"/>
+          </a:xfrm>
+          <a:prstGeom prst="rect">
+            <a:avLst/>
+          </a:prstGeom>
+          <a:ln w="19050">
+            <a:solidFill>
+              <a:schemeClr val="tx1"/>
+            </a:solidFill>
+          </a:ln>
+        </p:spPr>
+        <p:style>
+          <a:lnRef idx="2">
+            <a:schemeClr val="accent1"/>
+          </a:lnRef>
+          <a:fillRef idx="1">
+            <a:schemeClr val="lt1"/>
+          </a:fillRef>
+          <a:effectRef idx="0">
+            <a:schemeClr val="accent1"/>
+          </a:effectRef>
+          <a:fontRef idx="minor">
+            <a:schemeClr val="dk1"/>
+          </a:fontRef>
+        </p:style>
+        <p:txBody>
+          <a:bodyPr wrap="square" rtlCol="0">
+            <a:spAutoFit/>
+          </a:bodyPr>
+          <a:lstStyle/>
+          <a:p>
+            <a:r>
+              <a:rPr lang="en-US" sz="1000" dirty="0" err="1" smtClean="0"/>
+              <a:t>Init</a:t>
+            </a:r>
+            <a:r>
+              <a:rPr lang="en-US" sz="1000" dirty="0"/>
+              <a:t> </a:t>
+            </a:r>
+            <a:r>
+              <a:rPr lang="en-US" sz="1000" dirty="0" err="1" smtClean="0"/>
+              <a:t>ArduinoOTA</a:t>
+            </a:r>
+            <a:r>
+              <a:rPr lang="en-US" sz="1000" dirty="0" smtClean="0"/>
+              <a:t>, </a:t>
+            </a:r>
+            <a:r>
+              <a:rPr lang="en-US" sz="1000" dirty="0" err="1" smtClean="0"/>
+              <a:t>wifi</a:t>
+            </a:r>
+            <a:r>
+              <a:rPr lang="en-US" sz="1000" dirty="0" smtClean="0"/>
+              <a:t> </a:t>
+            </a:r>
+            <a:r>
+              <a:rPr lang="en-US" sz="1000" dirty="0" smtClean="0"/>
+              <a:t>and serial </a:t>
+            </a:r>
+            <a:r>
+              <a:rPr lang="en-US" sz="1000" dirty="0" err="1" smtClean="0"/>
+              <a:t>comm</a:t>
+            </a:r>
+            <a:endParaRPr lang="en-SG" sz="1000" dirty="0"/>
+          </a:p>
+        </p:txBody>
+      </p:sp>
+      <p:cxnSp>
+        <p:nvCxnSpPr>
+          <p:cNvPr id="5" name="Straight Arrow Connector 4"/>
+          <p:cNvCxnSpPr/>
+          <p:nvPr/>
+        </p:nvCxnSpPr>
+        <p:spPr>
+          <a:xfrm flipH="1">
+            <a:off x="2084820" y="1322063"/>
+            <a:ext cx="1" cy="408303"/>
+          </a:xfrm>
+          <a:prstGeom prst="straightConnector1">
+            <a:avLst/>
+          </a:prstGeom>
+          <a:ln>
+            <a:tailEnd type="triangle"/>
+          </a:ln>
+        </p:spPr>
+        <p:style>
+          <a:lnRef idx="1">
+            <a:schemeClr val="dk1"/>
+          </a:lnRef>
+          <a:fillRef idx="0">
+            <a:schemeClr val="dk1"/>
+          </a:fillRef>
+          <a:effectRef idx="0">
+            <a:schemeClr val="dk1"/>
+          </a:effectRef>
+          <a:fontRef idx="minor">
+            <a:schemeClr val="tx1"/>
+          </a:fontRef>
+        </p:style>
+      </p:cxnSp>
+      <p:sp>
+        <p:nvSpPr>
+          <p:cNvPr id="6" name="TextBox 5"/>
+          <p:cNvSpPr txBox="1"/>
+          <p:nvPr/>
+        </p:nvSpPr>
+        <p:spPr>
+          <a:xfrm>
+            <a:off x="1266674" y="1747598"/>
+            <a:ext cx="2092543" cy="246221"/>
+          </a:xfrm>
+          <a:prstGeom prst="rect">
+            <a:avLst/>
+          </a:prstGeom>
+          <a:ln w="19050">
+            <a:solidFill>
+              <a:schemeClr val="tx1"/>
+            </a:solidFill>
+          </a:ln>
+        </p:spPr>
+        <p:style>
+          <a:lnRef idx="2">
+            <a:schemeClr val="accent1"/>
+          </a:lnRef>
+          <a:fillRef idx="1">
+            <a:schemeClr val="lt1"/>
+          </a:fillRef>
+          <a:effectRef idx="0">
+            <a:schemeClr val="accent1"/>
+          </a:effectRef>
+          <a:fontRef idx="minor">
+            <a:schemeClr val="dk1"/>
+          </a:fontRef>
+        </p:style>
+        <p:txBody>
+          <a:bodyPr wrap="square" rtlCol="0">
+            <a:spAutoFit/>
+          </a:bodyPr>
+          <a:lstStyle/>
+          <a:p>
+            <a:r>
+              <a:rPr lang="en-US" sz="1000" dirty="0" smtClean="0"/>
+              <a:t>Connect to WIFI and start TCP Client</a:t>
+            </a:r>
+            <a:r>
+              <a:rPr lang="en-US" sz="1000" dirty="0" smtClean="0"/>
+              <a:t>.</a:t>
+            </a:r>
+            <a:endParaRPr lang="en-SG" sz="1000" dirty="0"/>
+          </a:p>
+        </p:txBody>
+      </p:sp>
+      <p:cxnSp>
+        <p:nvCxnSpPr>
+          <p:cNvPr id="7" name="Straight Arrow Connector 6"/>
+          <p:cNvCxnSpPr/>
+          <p:nvPr/>
+        </p:nvCxnSpPr>
+        <p:spPr>
+          <a:xfrm flipH="1">
+            <a:off x="2084819" y="1993819"/>
+            <a:ext cx="1" cy="408303"/>
+          </a:xfrm>
+          <a:prstGeom prst="straightConnector1">
+            <a:avLst/>
+          </a:prstGeom>
+          <a:ln>
+            <a:tailEnd type="triangle"/>
+          </a:ln>
+        </p:spPr>
+        <p:style>
+          <a:lnRef idx="1">
+            <a:schemeClr val="dk1"/>
+          </a:lnRef>
+          <a:fillRef idx="0">
+            <a:schemeClr val="dk1"/>
+          </a:fillRef>
+          <a:effectRef idx="0">
+            <a:schemeClr val="dk1"/>
+          </a:effectRef>
+          <a:fontRef idx="minor">
+            <a:schemeClr val="tx1"/>
+          </a:fontRef>
+        </p:style>
+      </p:cxnSp>
+      <p:sp>
+        <p:nvSpPr>
+          <p:cNvPr id="8" name="TextBox 7"/>
+          <p:cNvSpPr txBox="1"/>
+          <p:nvPr/>
+        </p:nvSpPr>
+        <p:spPr>
+          <a:xfrm>
+            <a:off x="1266674" y="2423452"/>
+            <a:ext cx="1332148" cy="246221"/>
+          </a:xfrm>
+          <a:prstGeom prst="rect">
+            <a:avLst/>
+          </a:prstGeom>
+          <a:ln w="19050">
+            <a:solidFill>
+              <a:schemeClr val="tx1"/>
+            </a:solidFill>
+          </a:ln>
+        </p:spPr>
+        <p:style>
+          <a:lnRef idx="2">
+            <a:schemeClr val="accent1"/>
+          </a:lnRef>
+          <a:fillRef idx="1">
+            <a:schemeClr val="lt1"/>
+          </a:fillRef>
+          <a:effectRef idx="0">
+            <a:schemeClr val="accent1"/>
+          </a:effectRef>
+          <a:fontRef idx="minor">
+            <a:schemeClr val="dk1"/>
+          </a:fontRef>
+        </p:style>
+        <p:txBody>
+          <a:bodyPr wrap="square" rtlCol="0">
+            <a:spAutoFit/>
+          </a:bodyPr>
+          <a:lstStyle/>
+          <a:p>
+            <a:r>
+              <a:rPr lang="en-US" sz="1000" dirty="0" smtClean="0"/>
+              <a:t>TCP hand shake loop.</a:t>
+            </a:r>
+            <a:endParaRPr lang="en-SG" sz="1000" dirty="0"/>
+          </a:p>
+        </p:txBody>
+      </p:sp>
+      <p:cxnSp>
+        <p:nvCxnSpPr>
+          <p:cNvPr id="9" name="Straight Arrow Connector 8"/>
+          <p:cNvCxnSpPr/>
+          <p:nvPr/>
+        </p:nvCxnSpPr>
+        <p:spPr>
+          <a:xfrm flipH="1">
+            <a:off x="2084819" y="2720873"/>
+            <a:ext cx="1" cy="239805"/>
+          </a:xfrm>
+          <a:prstGeom prst="straightConnector1">
+            <a:avLst/>
+          </a:prstGeom>
+          <a:ln>
+            <a:tailEnd type="triangle"/>
+          </a:ln>
+        </p:spPr>
+        <p:style>
+          <a:lnRef idx="1">
+            <a:schemeClr val="dk1"/>
+          </a:lnRef>
+          <a:fillRef idx="0">
+            <a:schemeClr val="dk1"/>
+          </a:fillRef>
+          <a:effectRef idx="0">
+            <a:schemeClr val="dk1"/>
+          </a:effectRef>
+          <a:fontRef idx="minor">
+            <a:schemeClr val="tx1"/>
+          </a:fontRef>
+        </p:style>
+      </p:cxnSp>
+      <p:sp>
+        <p:nvSpPr>
+          <p:cNvPr id="10" name="TextBox 9"/>
+          <p:cNvSpPr txBox="1"/>
+          <p:nvPr/>
+        </p:nvSpPr>
+        <p:spPr>
+          <a:xfrm>
+            <a:off x="1284970" y="3076269"/>
+            <a:ext cx="1721615" cy="246221"/>
+          </a:xfrm>
+          <a:prstGeom prst="rect">
+            <a:avLst/>
+          </a:prstGeom>
+          <a:ln w="19050">
+            <a:solidFill>
+              <a:schemeClr val="tx1"/>
+            </a:solidFill>
+          </a:ln>
+        </p:spPr>
+        <p:style>
+          <a:lnRef idx="2">
+            <a:schemeClr val="accent1"/>
+          </a:lnRef>
+          <a:fillRef idx="1">
+            <a:schemeClr val="lt1"/>
+          </a:fillRef>
+          <a:effectRef idx="0">
+            <a:schemeClr val="accent1"/>
+          </a:effectRef>
+          <a:fontRef idx="minor">
+            <a:schemeClr val="dk1"/>
+          </a:fontRef>
+        </p:style>
+        <p:txBody>
+          <a:bodyPr wrap="square" rtlCol="0">
+            <a:spAutoFit/>
+          </a:bodyPr>
+          <a:lstStyle/>
+          <a:p>
+            <a:r>
+              <a:rPr lang="en-US" sz="1000" dirty="0" smtClean="0"/>
+              <a:t>Check server control request</a:t>
+            </a:r>
+            <a:endParaRPr lang="en-SG" sz="1000" dirty="0"/>
+          </a:p>
+        </p:txBody>
+      </p:sp>
+      <p:cxnSp>
+        <p:nvCxnSpPr>
+          <p:cNvPr id="11" name="Straight Arrow Connector 10"/>
+          <p:cNvCxnSpPr/>
+          <p:nvPr/>
+        </p:nvCxnSpPr>
+        <p:spPr>
+          <a:xfrm flipH="1">
+            <a:off x="2172671" y="4032074"/>
+            <a:ext cx="1" cy="408303"/>
+          </a:xfrm>
+          <a:prstGeom prst="straightConnector1">
+            <a:avLst/>
+          </a:prstGeom>
+          <a:ln>
+            <a:tailEnd type="triangle"/>
+          </a:ln>
+        </p:spPr>
+        <p:style>
+          <a:lnRef idx="1">
+            <a:schemeClr val="dk1"/>
+          </a:lnRef>
+          <a:fillRef idx="0">
+            <a:schemeClr val="dk1"/>
+          </a:fillRef>
+          <a:effectRef idx="0">
+            <a:schemeClr val="dk1"/>
+          </a:effectRef>
+          <a:fontRef idx="minor">
+            <a:schemeClr val="tx1"/>
+          </a:fontRef>
+        </p:style>
+      </p:cxnSp>
+      <p:sp>
+        <p:nvSpPr>
+          <p:cNvPr id="13" name="Rectangle 12"/>
+          <p:cNvSpPr/>
+          <p:nvPr/>
+        </p:nvSpPr>
+        <p:spPr>
+          <a:xfrm>
+            <a:off x="3836583" y="86309"/>
+            <a:ext cx="4342598" cy="6025734"/>
+          </a:xfrm>
+          <a:prstGeom prst="rect">
+            <a:avLst/>
+          </a:prstGeom>
+          <a:ln>
+            <a:prstDash val="sysDot"/>
+          </a:ln>
+        </p:spPr>
+        <p:style>
+          <a:lnRef idx="2">
+            <a:schemeClr val="dk1"/>
+          </a:lnRef>
+          <a:fillRef idx="1">
+            <a:schemeClr val="lt1"/>
+          </a:fillRef>
+          <a:effectRef idx="0">
+            <a:schemeClr val="dk1"/>
+          </a:effectRef>
+          <a:fontRef idx="minor">
+            <a:schemeClr val="dk1"/>
+          </a:fontRef>
+        </p:style>
+        <p:txBody>
+          <a:bodyPr rtlCol="0" anchor="ctr"/>
+          <a:lstStyle/>
+          <a:p>
+            <a:pPr algn="ctr"/>
+            <a:endParaRPr lang="en-SG"/>
+          </a:p>
+        </p:txBody>
+      </p:sp>
+      <p:sp>
+        <p:nvSpPr>
+          <p:cNvPr id="14" name="Rectangle 13"/>
+          <p:cNvSpPr/>
+          <p:nvPr/>
+        </p:nvSpPr>
+        <p:spPr>
+          <a:xfrm>
+            <a:off x="8747762" y="475347"/>
+            <a:ext cx="1912281" cy="3579472"/>
+          </a:xfrm>
+          <a:prstGeom prst="rect">
+            <a:avLst/>
+          </a:prstGeom>
+          <a:ln>
+            <a:prstDash val="sysDot"/>
+          </a:ln>
+        </p:spPr>
+        <p:style>
+          <a:lnRef idx="2">
+            <a:schemeClr val="dk1"/>
+          </a:lnRef>
+          <a:fillRef idx="1">
+            <a:schemeClr val="lt1"/>
+          </a:fillRef>
+          <a:effectRef idx="0">
+            <a:schemeClr val="dk1"/>
+          </a:effectRef>
+          <a:fontRef idx="minor">
+            <a:schemeClr val="dk1"/>
+          </a:fontRef>
+        </p:style>
+        <p:txBody>
+          <a:bodyPr rtlCol="0" anchor="ctr"/>
+          <a:lstStyle/>
+          <a:p>
+            <a:pPr algn="ctr"/>
+            <a:endParaRPr lang="en-SG"/>
+          </a:p>
+        </p:txBody>
+      </p:sp>
+      <p:sp>
+        <p:nvSpPr>
+          <p:cNvPr id="16" name="TextBox 15"/>
+          <p:cNvSpPr txBox="1"/>
+          <p:nvPr/>
+        </p:nvSpPr>
+        <p:spPr>
+          <a:xfrm>
+            <a:off x="1087655" y="598613"/>
+            <a:ext cx="1787152" cy="307777"/>
+          </a:xfrm>
+          <a:prstGeom prst="rect">
+            <a:avLst/>
+          </a:prstGeom>
+          <a:noFill/>
+        </p:spPr>
+        <p:txBody>
+          <a:bodyPr wrap="square" rtlCol="0">
+            <a:spAutoFit/>
+          </a:bodyPr>
+          <a:lstStyle/>
+          <a:p>
+            <a:r>
+              <a:rPr lang="en-SG" sz="1400" dirty="0"/>
+              <a:t>ESP8266 Arduino</a:t>
+            </a:r>
+          </a:p>
+        </p:txBody>
+      </p:sp>
+      <p:cxnSp>
+        <p:nvCxnSpPr>
+          <p:cNvPr id="22" name="Straight Arrow Connector 21"/>
+          <p:cNvCxnSpPr/>
+          <p:nvPr/>
+        </p:nvCxnSpPr>
+        <p:spPr>
+          <a:xfrm flipH="1" flipV="1">
+            <a:off x="1588793" y="2944580"/>
+            <a:ext cx="496025" cy="0"/>
+          </a:xfrm>
+          <a:prstGeom prst="straightConnector1">
+            <a:avLst/>
+          </a:prstGeom>
+          <a:ln>
+            <a:tailEnd type="triangle"/>
+          </a:ln>
+        </p:spPr>
+        <p:style>
+          <a:lnRef idx="1">
+            <a:schemeClr val="dk1"/>
+          </a:lnRef>
+          <a:fillRef idx="0">
+            <a:schemeClr val="dk1"/>
+          </a:fillRef>
+          <a:effectRef idx="0">
+            <a:schemeClr val="dk1"/>
+          </a:effectRef>
+          <a:fontRef idx="minor">
+            <a:schemeClr val="tx1"/>
+          </a:fontRef>
+        </p:style>
+      </p:cxnSp>
+      <p:cxnSp>
+        <p:nvCxnSpPr>
+          <p:cNvPr id="25" name="Straight Arrow Connector 24"/>
+          <p:cNvCxnSpPr/>
+          <p:nvPr/>
+        </p:nvCxnSpPr>
+        <p:spPr>
+          <a:xfrm flipV="1">
+            <a:off x="1567254" y="2720873"/>
+            <a:ext cx="0" cy="203600"/>
+          </a:xfrm>
+          <a:prstGeom prst="straightConnector1">
+            <a:avLst/>
+          </a:prstGeom>
+          <a:ln>
+            <a:tailEnd type="triangle"/>
+          </a:ln>
+        </p:spPr>
+        <p:style>
+          <a:lnRef idx="1">
+            <a:schemeClr val="dk1"/>
+          </a:lnRef>
+          <a:fillRef idx="0">
+            <a:schemeClr val="dk1"/>
+          </a:fillRef>
+          <a:effectRef idx="0">
+            <a:schemeClr val="dk1"/>
+          </a:effectRef>
+          <a:fontRef idx="minor">
+            <a:schemeClr val="tx1"/>
+          </a:fontRef>
+        </p:style>
+      </p:cxnSp>
+      <p:sp>
+        <p:nvSpPr>
+          <p:cNvPr id="28" name="TextBox 27"/>
+          <p:cNvSpPr txBox="1"/>
+          <p:nvPr/>
+        </p:nvSpPr>
+        <p:spPr>
+          <a:xfrm>
+            <a:off x="4175878" y="1326159"/>
+            <a:ext cx="1248878" cy="400110"/>
+          </a:xfrm>
+          <a:prstGeom prst="rect">
+            <a:avLst/>
+          </a:prstGeom>
+          <a:ln w="19050">
+            <a:solidFill>
+              <a:schemeClr val="tx1"/>
+            </a:solidFill>
+          </a:ln>
+        </p:spPr>
+        <p:style>
+          <a:lnRef idx="2">
+            <a:schemeClr val="accent1"/>
+          </a:lnRef>
+          <a:fillRef idx="1">
+            <a:schemeClr val="lt1"/>
+          </a:fillRef>
+          <a:effectRef idx="0">
+            <a:schemeClr val="accent1"/>
+          </a:effectRef>
+          <a:fontRef idx="minor">
+            <a:schemeClr val="dk1"/>
+          </a:fontRef>
+        </p:style>
+        <p:txBody>
+          <a:bodyPr wrap="square" rtlCol="0">
+            <a:spAutoFit/>
+          </a:bodyPr>
+          <a:lstStyle/>
+          <a:p>
+            <a:r>
+              <a:rPr lang="en-US" sz="1000" dirty="0" err="1" smtClean="0"/>
+              <a:t>Init</a:t>
+            </a:r>
+            <a:r>
+              <a:rPr lang="en-US" sz="1000" dirty="0"/>
+              <a:t> </a:t>
+            </a:r>
+            <a:r>
+              <a:rPr lang="en-US" sz="1000" dirty="0" smtClean="0"/>
+              <a:t>sensor TCP com server thread</a:t>
+            </a:r>
+            <a:endParaRPr lang="en-SG" sz="1000" dirty="0"/>
+          </a:p>
+        </p:txBody>
+      </p:sp>
+      <p:sp>
+        <p:nvSpPr>
+          <p:cNvPr id="29" name="TextBox 28"/>
+          <p:cNvSpPr txBox="1"/>
+          <p:nvPr/>
+        </p:nvSpPr>
+        <p:spPr>
+          <a:xfrm>
+            <a:off x="4258614" y="2592379"/>
+            <a:ext cx="1248878" cy="400110"/>
+          </a:xfrm>
+          <a:prstGeom prst="rect">
+            <a:avLst/>
+          </a:prstGeom>
+          <a:ln w="19050">
+            <a:solidFill>
+              <a:schemeClr val="tx1"/>
+            </a:solidFill>
+          </a:ln>
+        </p:spPr>
+        <p:style>
+          <a:lnRef idx="2">
+            <a:schemeClr val="accent1"/>
+          </a:lnRef>
+          <a:fillRef idx="1">
+            <a:schemeClr val="lt1"/>
+          </a:fillRef>
+          <a:effectRef idx="0">
+            <a:schemeClr val="accent1"/>
+          </a:effectRef>
+          <a:fontRef idx="minor">
+            <a:schemeClr val="dk1"/>
+          </a:fontRef>
+        </p:style>
+        <p:txBody>
+          <a:bodyPr wrap="square" rtlCol="0">
+            <a:spAutoFit/>
+          </a:bodyPr>
+          <a:lstStyle/>
+          <a:p>
+            <a:r>
+              <a:rPr lang="en-US" sz="1000" dirty="0" smtClean="0"/>
+              <a:t>User control from the Main UI</a:t>
+            </a:r>
+            <a:endParaRPr lang="en-SG" sz="1000" dirty="0"/>
+          </a:p>
+        </p:txBody>
+      </p:sp>
+      <p:sp>
+        <p:nvSpPr>
+          <p:cNvPr id="30" name="TextBox 29"/>
+          <p:cNvSpPr txBox="1"/>
+          <p:nvPr/>
+        </p:nvSpPr>
+        <p:spPr>
+          <a:xfrm>
+            <a:off x="4258614" y="2032662"/>
+            <a:ext cx="1083407" cy="246221"/>
+          </a:xfrm>
+          <a:prstGeom prst="rect">
+            <a:avLst/>
+          </a:prstGeom>
+          <a:ln w="19050">
+            <a:solidFill>
+              <a:schemeClr val="tx1"/>
+            </a:solidFill>
+          </a:ln>
+        </p:spPr>
+        <p:style>
+          <a:lnRef idx="2">
+            <a:schemeClr val="accent1"/>
+          </a:lnRef>
+          <a:fillRef idx="1">
+            <a:schemeClr val="lt1"/>
+          </a:fillRef>
+          <a:effectRef idx="0">
+            <a:schemeClr val="accent1"/>
+          </a:effectRef>
+          <a:fontRef idx="minor">
+            <a:schemeClr val="dk1"/>
+          </a:fontRef>
+        </p:style>
+        <p:txBody>
+          <a:bodyPr wrap="square" rtlCol="0">
+            <a:spAutoFit/>
+          </a:bodyPr>
+          <a:lstStyle/>
+          <a:p>
+            <a:r>
+              <a:rPr lang="en-US" sz="1000" dirty="0" smtClean="0"/>
+              <a:t>Get sensor data</a:t>
+            </a:r>
+            <a:endParaRPr lang="en-SG" sz="1000" dirty="0"/>
+          </a:p>
+        </p:txBody>
+      </p:sp>
+      <p:cxnSp>
+        <p:nvCxnSpPr>
+          <p:cNvPr id="32" name="Elbow Connector 31"/>
+          <p:cNvCxnSpPr>
+            <a:stCxn id="8" idx="3"/>
+            <a:endCxn id="30" idx="1"/>
+          </p:cNvCxnSpPr>
+          <p:nvPr/>
+        </p:nvCxnSpPr>
+        <p:spPr>
+          <a:xfrm flipV="1">
+            <a:off x="2598822" y="2155773"/>
+            <a:ext cx="1659792" cy="390790"/>
+          </a:xfrm>
+          <a:prstGeom prst="bentConnector3">
+            <a:avLst/>
+          </a:prstGeom>
+          <a:ln>
+            <a:tailEnd type="triangle"/>
+          </a:ln>
+        </p:spPr>
+        <p:style>
+          <a:lnRef idx="1">
+            <a:schemeClr val="dk1"/>
+          </a:lnRef>
+          <a:fillRef idx="0">
+            <a:schemeClr val="dk1"/>
+          </a:fillRef>
+          <a:effectRef idx="0">
+            <a:schemeClr val="dk1"/>
+          </a:effectRef>
+          <a:fontRef idx="minor">
+            <a:schemeClr val="tx1"/>
+          </a:fontRef>
+        </p:style>
+      </p:cxnSp>
+      <p:cxnSp>
+        <p:nvCxnSpPr>
+          <p:cNvPr id="33" name="Straight Arrow Connector 32"/>
+          <p:cNvCxnSpPr>
+            <a:endCxn id="30" idx="0"/>
+          </p:cNvCxnSpPr>
+          <p:nvPr/>
+        </p:nvCxnSpPr>
+        <p:spPr>
+          <a:xfrm>
+            <a:off x="4794540" y="1732727"/>
+            <a:ext cx="0" cy="299935"/>
+          </a:xfrm>
+          <a:prstGeom prst="straightConnector1">
+            <a:avLst/>
+          </a:prstGeom>
+          <a:ln>
+            <a:tailEnd type="triangle"/>
+          </a:ln>
+        </p:spPr>
+        <p:style>
+          <a:lnRef idx="1">
+            <a:schemeClr val="dk1"/>
+          </a:lnRef>
+          <a:fillRef idx="0">
+            <a:schemeClr val="dk1"/>
+          </a:fillRef>
+          <a:effectRef idx="0">
+            <a:schemeClr val="dk1"/>
+          </a:effectRef>
+          <a:fontRef idx="minor">
+            <a:schemeClr val="tx1"/>
+          </a:fontRef>
+        </p:style>
+      </p:cxnSp>
+      <p:cxnSp>
+        <p:nvCxnSpPr>
+          <p:cNvPr id="35" name="Straight Arrow Connector 34"/>
+          <p:cNvCxnSpPr/>
+          <p:nvPr/>
+        </p:nvCxnSpPr>
+        <p:spPr>
+          <a:xfrm>
+            <a:off x="4794540" y="2278883"/>
+            <a:ext cx="0" cy="299935"/>
+          </a:xfrm>
+          <a:prstGeom prst="straightConnector1">
+            <a:avLst/>
+          </a:prstGeom>
+          <a:ln>
+            <a:tailEnd type="triangle"/>
+          </a:ln>
+        </p:spPr>
+        <p:style>
+          <a:lnRef idx="1">
+            <a:schemeClr val="dk1"/>
+          </a:lnRef>
+          <a:fillRef idx="0">
+            <a:schemeClr val="dk1"/>
+          </a:fillRef>
+          <a:effectRef idx="0">
+            <a:schemeClr val="dk1"/>
+          </a:effectRef>
+          <a:fontRef idx="minor">
+            <a:schemeClr val="tx1"/>
+          </a:fontRef>
+        </p:style>
+      </p:cxnSp>
+      <p:cxnSp>
+        <p:nvCxnSpPr>
+          <p:cNvPr id="37" name="Elbow Connector 36"/>
+          <p:cNvCxnSpPr>
+            <a:stCxn id="29" idx="1"/>
+          </p:cNvCxnSpPr>
+          <p:nvPr/>
+        </p:nvCxnSpPr>
+        <p:spPr>
+          <a:xfrm rot="10800000" flipV="1">
+            <a:off x="3006586" y="2792433"/>
+            <a:ext cx="1252029" cy="406945"/>
+          </a:xfrm>
+          <a:prstGeom prst="bentConnector3">
+            <a:avLst/>
+          </a:prstGeom>
+          <a:ln>
+            <a:tailEnd type="triangle"/>
+          </a:ln>
+        </p:spPr>
+        <p:style>
+          <a:lnRef idx="1">
+            <a:schemeClr val="dk1"/>
+          </a:lnRef>
+          <a:fillRef idx="0">
+            <a:schemeClr val="dk1"/>
+          </a:fillRef>
+          <a:effectRef idx="0">
+            <a:schemeClr val="dk1"/>
+          </a:effectRef>
+          <a:fontRef idx="minor">
+            <a:schemeClr val="tx1"/>
+          </a:fontRef>
+        </p:style>
+      </p:cxnSp>
+      <p:sp>
+        <p:nvSpPr>
+          <p:cNvPr id="39" name="Diamond 38"/>
+          <p:cNvSpPr/>
+          <p:nvPr/>
+        </p:nvSpPr>
+        <p:spPr>
+          <a:xfrm>
+            <a:off x="1338759" y="3591456"/>
+            <a:ext cx="1667826" cy="440618"/>
+          </a:xfrm>
+          <a:prstGeom prst="diamond">
+            <a:avLst/>
+          </a:prstGeom>
+        </p:spPr>
+        <p:style>
+          <a:lnRef idx="2">
+            <a:schemeClr val="dk1"/>
+          </a:lnRef>
+          <a:fillRef idx="1">
+            <a:schemeClr val="lt1"/>
+          </a:fillRef>
+          <a:effectRef idx="0">
+            <a:schemeClr val="dk1"/>
+          </a:effectRef>
+          <a:fontRef idx="minor">
+            <a:schemeClr val="dk1"/>
+          </a:fontRef>
+        </p:style>
+        <p:txBody>
+          <a:bodyPr rtlCol="0" anchor="ctr"/>
+          <a:lstStyle/>
+          <a:p>
+            <a:pPr algn="ctr"/>
+            <a:r>
+              <a:rPr lang="en-US" sz="900" dirty="0" smtClean="0"/>
+              <a:t> </a:t>
+            </a:r>
+            <a:r>
+              <a:rPr lang="en-US" sz="900" dirty="0" smtClean="0"/>
+              <a:t>PATT attestation</a:t>
+            </a:r>
+            <a:r>
+              <a:rPr lang="en-US" sz="900" dirty="0" smtClean="0"/>
+              <a:t> </a:t>
+            </a:r>
+            <a:r>
+              <a:rPr lang="en-US" sz="900" dirty="0" smtClean="0"/>
+              <a:t>?</a:t>
+            </a:r>
+            <a:endParaRPr lang="en-SG" sz="900" dirty="0"/>
+          </a:p>
+        </p:txBody>
+      </p:sp>
+      <p:cxnSp>
+        <p:nvCxnSpPr>
+          <p:cNvPr id="40" name="Straight Arrow Connector 39"/>
+          <p:cNvCxnSpPr/>
+          <p:nvPr/>
+        </p:nvCxnSpPr>
+        <p:spPr>
+          <a:xfrm>
+            <a:off x="2162600" y="3291521"/>
+            <a:ext cx="0" cy="299935"/>
+          </a:xfrm>
+          <a:prstGeom prst="straightConnector1">
+            <a:avLst/>
+          </a:prstGeom>
+          <a:ln>
+            <a:tailEnd type="triangle"/>
+          </a:ln>
+        </p:spPr>
+        <p:style>
+          <a:lnRef idx="1">
+            <a:schemeClr val="dk1"/>
+          </a:lnRef>
+          <a:fillRef idx="0">
+            <a:schemeClr val="dk1"/>
+          </a:fillRef>
+          <a:effectRef idx="0">
+            <a:schemeClr val="dk1"/>
+          </a:effectRef>
+          <a:fontRef idx="minor">
+            <a:schemeClr val="tx1"/>
+          </a:fontRef>
+        </p:style>
+      </p:cxnSp>
+      <p:cxnSp>
+        <p:nvCxnSpPr>
+          <p:cNvPr id="42" name="Straight Arrow Connector 41"/>
+          <p:cNvCxnSpPr>
+            <a:stCxn id="39" idx="3"/>
+          </p:cNvCxnSpPr>
+          <p:nvPr/>
+        </p:nvCxnSpPr>
+        <p:spPr>
+          <a:xfrm>
+            <a:off x="3006585" y="3811765"/>
+            <a:ext cx="1252028" cy="0"/>
+          </a:xfrm>
+          <a:prstGeom prst="straightConnector1">
+            <a:avLst/>
+          </a:prstGeom>
+          <a:ln>
+            <a:tailEnd type="triangle"/>
+          </a:ln>
+        </p:spPr>
+        <p:style>
+          <a:lnRef idx="1">
+            <a:schemeClr val="dk1"/>
+          </a:lnRef>
+          <a:fillRef idx="0">
+            <a:schemeClr val="dk1"/>
+          </a:fillRef>
+          <a:effectRef idx="0">
+            <a:schemeClr val="dk1"/>
+          </a:effectRef>
+          <a:fontRef idx="minor">
+            <a:schemeClr val="tx1"/>
+          </a:fontRef>
+        </p:style>
+      </p:cxnSp>
+      <p:sp>
+        <p:nvSpPr>
+          <p:cNvPr id="43" name="TextBox 42"/>
+          <p:cNvSpPr txBox="1"/>
+          <p:nvPr/>
+        </p:nvSpPr>
+        <p:spPr>
+          <a:xfrm>
+            <a:off x="4308727" y="3685428"/>
+            <a:ext cx="1083407" cy="246221"/>
+          </a:xfrm>
+          <a:prstGeom prst="rect">
+            <a:avLst/>
+          </a:prstGeom>
+          <a:ln w="19050">
+            <a:solidFill>
+              <a:schemeClr val="tx1"/>
+            </a:solidFill>
+          </a:ln>
+        </p:spPr>
+        <p:style>
+          <a:lnRef idx="2">
+            <a:schemeClr val="accent1"/>
+          </a:lnRef>
+          <a:fillRef idx="1">
+            <a:schemeClr val="lt1"/>
+          </a:fillRef>
+          <a:effectRef idx="0">
+            <a:schemeClr val="accent1"/>
+          </a:effectRef>
+          <a:fontRef idx="minor">
+            <a:schemeClr val="dk1"/>
+          </a:fontRef>
+        </p:style>
+        <p:txBody>
+          <a:bodyPr wrap="square" rtlCol="0">
+            <a:spAutoFit/>
+          </a:bodyPr>
+          <a:lstStyle/>
+          <a:p>
+            <a:r>
+              <a:rPr lang="en-US" sz="1000" dirty="0" smtClean="0"/>
+              <a:t>Get sensor data</a:t>
+            </a:r>
+            <a:endParaRPr lang="en-SG" sz="1000" dirty="0"/>
+          </a:p>
+        </p:txBody>
+      </p:sp>
+      <p:cxnSp>
+        <p:nvCxnSpPr>
+          <p:cNvPr id="44" name="Straight Arrow Connector 43"/>
+          <p:cNvCxnSpPr/>
+          <p:nvPr/>
+        </p:nvCxnSpPr>
+        <p:spPr>
+          <a:xfrm flipH="1">
+            <a:off x="4794540" y="2991586"/>
+            <a:ext cx="0" cy="693842"/>
+          </a:xfrm>
+          <a:prstGeom prst="straightConnector1">
+            <a:avLst/>
+          </a:prstGeom>
+          <a:ln>
+            <a:tailEnd type="triangle"/>
+          </a:ln>
+        </p:spPr>
+        <p:style>
+          <a:lnRef idx="1">
+            <a:schemeClr val="dk1"/>
+          </a:lnRef>
+          <a:fillRef idx="0">
+            <a:schemeClr val="dk1"/>
+          </a:fillRef>
+          <a:effectRef idx="0">
+            <a:schemeClr val="dk1"/>
+          </a:effectRef>
+          <a:fontRef idx="minor">
+            <a:schemeClr val="tx1"/>
+          </a:fontRef>
+        </p:style>
+      </p:cxnSp>
+      <p:sp>
+        <p:nvSpPr>
+          <p:cNvPr id="46" name="TextBox 45"/>
+          <p:cNvSpPr txBox="1"/>
+          <p:nvPr/>
+        </p:nvSpPr>
+        <p:spPr>
+          <a:xfrm>
+            <a:off x="3002670" y="3552589"/>
+            <a:ext cx="396041" cy="246221"/>
+          </a:xfrm>
+          <a:prstGeom prst="rect">
+            <a:avLst/>
+          </a:prstGeom>
+          <a:noFill/>
+        </p:spPr>
+        <p:txBody>
+          <a:bodyPr wrap="square" rtlCol="0">
+            <a:spAutoFit/>
+          </a:bodyPr>
+          <a:lstStyle/>
+          <a:p>
+            <a:r>
+              <a:rPr lang="en-US" sz="1000" dirty="0" smtClean="0"/>
+              <a:t>NO</a:t>
+            </a:r>
+            <a:endParaRPr lang="en-SG" sz="1000" dirty="0"/>
+          </a:p>
+        </p:txBody>
+      </p:sp>
+      <p:sp>
+        <p:nvSpPr>
+          <p:cNvPr id="47" name="TextBox 46"/>
+          <p:cNvSpPr txBox="1"/>
+          <p:nvPr/>
+        </p:nvSpPr>
+        <p:spPr>
+          <a:xfrm>
+            <a:off x="2163050" y="4054819"/>
+            <a:ext cx="396041" cy="246221"/>
+          </a:xfrm>
+          <a:prstGeom prst="rect">
+            <a:avLst/>
+          </a:prstGeom>
+          <a:noFill/>
+        </p:spPr>
+        <p:txBody>
+          <a:bodyPr wrap="square" rtlCol="0">
+            <a:spAutoFit/>
+          </a:bodyPr>
+          <a:lstStyle/>
+          <a:p>
+            <a:r>
+              <a:rPr lang="en-US" sz="1000" dirty="0" smtClean="0"/>
+              <a:t>Yes</a:t>
+            </a:r>
+            <a:endParaRPr lang="en-SG" sz="1000" dirty="0"/>
+          </a:p>
+        </p:txBody>
+      </p:sp>
+      <p:sp>
+        <p:nvSpPr>
+          <p:cNvPr id="48" name="TextBox 47"/>
+          <p:cNvSpPr txBox="1"/>
+          <p:nvPr/>
+        </p:nvSpPr>
+        <p:spPr>
+          <a:xfrm>
+            <a:off x="4135555" y="4199347"/>
+            <a:ext cx="1572226" cy="400110"/>
+          </a:xfrm>
+          <a:prstGeom prst="rect">
+            <a:avLst/>
+          </a:prstGeom>
+          <a:ln w="19050">
+            <a:solidFill>
+              <a:schemeClr val="tx1"/>
+            </a:solidFill>
+          </a:ln>
+        </p:spPr>
+        <p:style>
+          <a:lnRef idx="2">
+            <a:schemeClr val="accent1"/>
+          </a:lnRef>
+          <a:fillRef idx="1">
+            <a:schemeClr val="lt1"/>
+          </a:fillRef>
+          <a:effectRef idx="0">
+            <a:schemeClr val="accent1"/>
+          </a:effectRef>
+          <a:fontRef idx="minor">
+            <a:schemeClr val="dk1"/>
+          </a:fontRef>
+        </p:style>
+        <p:txBody>
+          <a:bodyPr wrap="square" rtlCol="0">
+            <a:spAutoFit/>
+          </a:bodyPr>
+          <a:lstStyle/>
+          <a:p>
+            <a:r>
+              <a:rPr lang="en-US" sz="1000" dirty="0" smtClean="0"/>
+              <a:t>Get PATT Check sum from Local firmware file. </a:t>
+            </a:r>
+            <a:endParaRPr lang="en-SG" sz="1000" dirty="0"/>
+          </a:p>
+        </p:txBody>
+      </p:sp>
+      <p:cxnSp>
+        <p:nvCxnSpPr>
+          <p:cNvPr id="51" name="Straight Arrow Connector 50"/>
+          <p:cNvCxnSpPr/>
+          <p:nvPr/>
+        </p:nvCxnSpPr>
+        <p:spPr>
+          <a:xfrm>
+            <a:off x="4794540" y="3904851"/>
+            <a:ext cx="0" cy="299935"/>
+          </a:xfrm>
+          <a:prstGeom prst="straightConnector1">
+            <a:avLst/>
+          </a:prstGeom>
+          <a:ln>
+            <a:tailEnd type="triangle"/>
+          </a:ln>
+        </p:spPr>
+        <p:style>
+          <a:lnRef idx="1">
+            <a:schemeClr val="dk1"/>
+          </a:lnRef>
+          <a:fillRef idx="0">
+            <a:schemeClr val="dk1"/>
+          </a:fillRef>
+          <a:effectRef idx="0">
+            <a:schemeClr val="dk1"/>
+          </a:effectRef>
+          <a:fontRef idx="minor">
+            <a:schemeClr val="tx1"/>
+          </a:fontRef>
+        </p:style>
+      </p:cxnSp>
+      <p:cxnSp>
+        <p:nvCxnSpPr>
+          <p:cNvPr id="52" name="Straight Arrow Connector 51"/>
+          <p:cNvCxnSpPr/>
+          <p:nvPr/>
+        </p:nvCxnSpPr>
+        <p:spPr>
+          <a:xfrm>
+            <a:off x="4794540" y="4599457"/>
+            <a:ext cx="0" cy="299935"/>
+          </a:xfrm>
+          <a:prstGeom prst="straightConnector1">
+            <a:avLst/>
+          </a:prstGeom>
+          <a:ln>
+            <a:tailEnd type="triangle"/>
+          </a:ln>
+        </p:spPr>
+        <p:style>
+          <a:lnRef idx="1">
+            <a:schemeClr val="dk1"/>
+          </a:lnRef>
+          <a:fillRef idx="0">
+            <a:schemeClr val="dk1"/>
+          </a:fillRef>
+          <a:effectRef idx="0">
+            <a:schemeClr val="dk1"/>
+          </a:effectRef>
+          <a:fontRef idx="minor">
+            <a:schemeClr val="tx1"/>
+          </a:fontRef>
+        </p:style>
+      </p:cxnSp>
+      <p:sp>
+        <p:nvSpPr>
+          <p:cNvPr id="53" name="TextBox 52"/>
+          <p:cNvSpPr txBox="1"/>
+          <p:nvPr/>
+        </p:nvSpPr>
+        <p:spPr>
+          <a:xfrm>
+            <a:off x="3912580" y="4899392"/>
+            <a:ext cx="1997331" cy="246221"/>
+          </a:xfrm>
+          <a:prstGeom prst="rect">
+            <a:avLst/>
+          </a:prstGeom>
+          <a:ln w="19050">
+            <a:solidFill>
+              <a:schemeClr val="tx1"/>
+            </a:solidFill>
+          </a:ln>
+        </p:spPr>
+        <p:style>
+          <a:lnRef idx="2">
+            <a:schemeClr val="accent1"/>
+          </a:lnRef>
+          <a:fillRef idx="1">
+            <a:schemeClr val="lt1"/>
+          </a:fillRef>
+          <a:effectRef idx="0">
+            <a:schemeClr val="accent1"/>
+          </a:effectRef>
+          <a:fontRef idx="minor">
+            <a:schemeClr val="dk1"/>
+          </a:fontRef>
+        </p:style>
+        <p:txBody>
+          <a:bodyPr wrap="square" rtlCol="0">
+            <a:spAutoFit/>
+          </a:bodyPr>
+          <a:lstStyle/>
+          <a:p>
+            <a:r>
+              <a:rPr lang="en-US" sz="1000" dirty="0" smtClean="0"/>
+              <a:t>Send PATT check memory </a:t>
+            </a:r>
+            <a:r>
+              <a:rPr lang="en-US" sz="1000" dirty="0" err="1" smtClean="0"/>
+              <a:t>addr</a:t>
+            </a:r>
+            <a:r>
+              <a:rPr lang="en-US" sz="1000" dirty="0" smtClean="0"/>
+              <a:t> list</a:t>
+            </a:r>
+            <a:endParaRPr lang="en-SG" sz="1000" dirty="0"/>
+          </a:p>
+        </p:txBody>
+      </p:sp>
+      <p:sp>
+        <p:nvSpPr>
+          <p:cNvPr id="54" name="TextBox 53"/>
+          <p:cNvSpPr txBox="1"/>
+          <p:nvPr/>
+        </p:nvSpPr>
+        <p:spPr>
+          <a:xfrm>
+            <a:off x="1266674" y="4463122"/>
+            <a:ext cx="2163955" cy="553998"/>
+          </a:xfrm>
+          <a:prstGeom prst="rect">
+            <a:avLst/>
+          </a:prstGeom>
+          <a:ln w="19050">
+            <a:solidFill>
+              <a:schemeClr val="tx1"/>
+            </a:solidFill>
+          </a:ln>
+        </p:spPr>
+        <p:style>
+          <a:lnRef idx="2">
+            <a:schemeClr val="accent1"/>
+          </a:lnRef>
+          <a:fillRef idx="1">
+            <a:schemeClr val="lt1"/>
+          </a:fillRef>
+          <a:effectRef idx="0">
+            <a:schemeClr val="accent1"/>
+          </a:effectRef>
+          <a:fontRef idx="minor">
+            <a:schemeClr val="dk1"/>
+          </a:fontRef>
+        </p:style>
+        <p:txBody>
+          <a:bodyPr wrap="square" rtlCol="0">
+            <a:spAutoFit/>
+          </a:bodyPr>
+          <a:lstStyle/>
+          <a:p>
+            <a:r>
+              <a:rPr lang="en-US" sz="1000" dirty="0" smtClean="0"/>
+              <a:t>Flash read the byte based on the address list and creat</a:t>
+            </a:r>
+            <a:r>
+              <a:rPr lang="en-US" sz="1000" dirty="0" smtClean="0"/>
+              <a:t>e the PATT checksum</a:t>
+            </a:r>
+            <a:endParaRPr lang="en-SG" sz="1000" dirty="0"/>
+          </a:p>
+        </p:txBody>
+      </p:sp>
+      <p:sp>
+        <p:nvSpPr>
+          <p:cNvPr id="55" name="TextBox 54"/>
+          <p:cNvSpPr txBox="1"/>
+          <p:nvPr/>
+        </p:nvSpPr>
+        <p:spPr>
+          <a:xfrm>
+            <a:off x="1245513" y="5333327"/>
+            <a:ext cx="2163955" cy="246221"/>
+          </a:xfrm>
+          <a:prstGeom prst="rect">
+            <a:avLst/>
+          </a:prstGeom>
+          <a:ln w="19050">
+            <a:solidFill>
+              <a:schemeClr val="tx1"/>
+            </a:solidFill>
+          </a:ln>
+        </p:spPr>
+        <p:style>
+          <a:lnRef idx="2">
+            <a:schemeClr val="accent1"/>
+          </a:lnRef>
+          <a:fillRef idx="1">
+            <a:schemeClr val="lt1"/>
+          </a:fillRef>
+          <a:effectRef idx="0">
+            <a:schemeClr val="accent1"/>
+          </a:effectRef>
+          <a:fontRef idx="minor">
+            <a:schemeClr val="dk1"/>
+          </a:fontRef>
+        </p:style>
+        <p:txBody>
+          <a:bodyPr wrap="square" rtlCol="0">
+            <a:spAutoFit/>
+          </a:bodyPr>
+          <a:lstStyle/>
+          <a:p>
+            <a:r>
+              <a:rPr lang="en-US" sz="1000" dirty="0" smtClean="0"/>
+              <a:t>Feed back checksum to server </a:t>
+            </a:r>
+            <a:endParaRPr lang="en-SG" sz="1000" dirty="0"/>
+          </a:p>
+        </p:txBody>
+      </p:sp>
+      <p:cxnSp>
+        <p:nvCxnSpPr>
+          <p:cNvPr id="56" name="Straight Arrow Connector 55"/>
+          <p:cNvCxnSpPr/>
+          <p:nvPr/>
+        </p:nvCxnSpPr>
+        <p:spPr>
+          <a:xfrm>
+            <a:off x="2135706" y="5017120"/>
+            <a:ext cx="0" cy="299935"/>
+          </a:xfrm>
+          <a:prstGeom prst="straightConnector1">
+            <a:avLst/>
+          </a:prstGeom>
+          <a:ln>
+            <a:tailEnd type="triangle"/>
+          </a:ln>
+        </p:spPr>
+        <p:style>
+          <a:lnRef idx="1">
+            <a:schemeClr val="dk1"/>
+          </a:lnRef>
+          <a:fillRef idx="0">
+            <a:schemeClr val="dk1"/>
+          </a:fillRef>
+          <a:effectRef idx="0">
+            <a:schemeClr val="dk1"/>
+          </a:effectRef>
+          <a:fontRef idx="minor">
+            <a:schemeClr val="tx1"/>
+          </a:fontRef>
+        </p:style>
+      </p:cxnSp>
+      <p:cxnSp>
+        <p:nvCxnSpPr>
+          <p:cNvPr id="57" name="Straight Arrow Connector 56"/>
+          <p:cNvCxnSpPr/>
+          <p:nvPr/>
+        </p:nvCxnSpPr>
+        <p:spPr>
+          <a:xfrm>
+            <a:off x="4803720" y="5167087"/>
+            <a:ext cx="0" cy="299935"/>
+          </a:xfrm>
+          <a:prstGeom prst="straightConnector1">
+            <a:avLst/>
+          </a:prstGeom>
+          <a:ln>
+            <a:tailEnd type="triangle"/>
+          </a:ln>
+        </p:spPr>
+        <p:style>
+          <a:lnRef idx="1">
+            <a:schemeClr val="dk1"/>
+          </a:lnRef>
+          <a:fillRef idx="0">
+            <a:schemeClr val="dk1"/>
+          </a:fillRef>
+          <a:effectRef idx="0">
+            <a:schemeClr val="dk1"/>
+          </a:effectRef>
+          <a:fontRef idx="minor">
+            <a:schemeClr val="tx1"/>
+          </a:fontRef>
+        </p:style>
+      </p:cxnSp>
+      <p:sp>
+        <p:nvSpPr>
+          <p:cNvPr id="59" name="TextBox 58"/>
+          <p:cNvSpPr txBox="1"/>
+          <p:nvPr/>
+        </p:nvSpPr>
+        <p:spPr>
+          <a:xfrm>
+            <a:off x="4010552" y="5488496"/>
+            <a:ext cx="1697230" cy="553998"/>
+          </a:xfrm>
+          <a:prstGeom prst="rect">
+            <a:avLst/>
+          </a:prstGeom>
+          <a:ln w="19050">
+            <a:solidFill>
+              <a:schemeClr val="tx1"/>
+            </a:solidFill>
+          </a:ln>
+        </p:spPr>
+        <p:style>
+          <a:lnRef idx="2">
+            <a:schemeClr val="accent1"/>
+          </a:lnRef>
+          <a:fillRef idx="1">
+            <a:schemeClr val="lt1"/>
+          </a:fillRef>
+          <a:effectRef idx="0">
+            <a:schemeClr val="accent1"/>
+          </a:effectRef>
+          <a:fontRef idx="minor">
+            <a:schemeClr val="dk1"/>
+          </a:fontRef>
+        </p:style>
+        <p:txBody>
+          <a:bodyPr wrap="square" rtlCol="0">
+            <a:spAutoFit/>
+          </a:bodyPr>
+          <a:lstStyle/>
+          <a:p>
+            <a:r>
+              <a:rPr lang="en-US" sz="1000" dirty="0" smtClean="0"/>
+              <a:t>Compare the sensor’s checksum and the local value.</a:t>
+            </a:r>
+            <a:endParaRPr lang="en-SG" sz="1000" dirty="0"/>
+          </a:p>
+        </p:txBody>
+      </p:sp>
+      <p:cxnSp>
+        <p:nvCxnSpPr>
+          <p:cNvPr id="61" name="Elbow Connector 60"/>
+          <p:cNvCxnSpPr>
+            <a:endCxn id="59" idx="1"/>
+          </p:cNvCxnSpPr>
+          <p:nvPr/>
+        </p:nvCxnSpPr>
+        <p:spPr>
+          <a:xfrm>
+            <a:off x="3428718" y="5411644"/>
+            <a:ext cx="581834" cy="353851"/>
+          </a:xfrm>
+          <a:prstGeom prst="bentConnector3">
+            <a:avLst/>
+          </a:prstGeom>
+          <a:ln>
+            <a:tailEnd type="triangle"/>
+          </a:ln>
+        </p:spPr>
+        <p:style>
+          <a:lnRef idx="1">
+            <a:schemeClr val="dk1"/>
+          </a:lnRef>
+          <a:fillRef idx="0">
+            <a:schemeClr val="dk1"/>
+          </a:fillRef>
+          <a:effectRef idx="0">
+            <a:schemeClr val="dk1"/>
+          </a:effectRef>
+          <a:fontRef idx="minor">
+            <a:schemeClr val="tx1"/>
+          </a:fontRef>
+        </p:style>
+      </p:cxnSp>
+      <p:sp>
+        <p:nvSpPr>
+          <p:cNvPr id="63" name="TextBox 62"/>
+          <p:cNvSpPr txBox="1"/>
+          <p:nvPr/>
+        </p:nvSpPr>
+        <p:spPr>
+          <a:xfrm>
+            <a:off x="3836583" y="125070"/>
+            <a:ext cx="1787152" cy="307777"/>
+          </a:xfrm>
+          <a:prstGeom prst="rect">
+            <a:avLst/>
+          </a:prstGeom>
+          <a:noFill/>
+        </p:spPr>
+        <p:txBody>
+          <a:bodyPr wrap="square" rtlCol="0">
+            <a:spAutoFit/>
+          </a:bodyPr>
+          <a:lstStyle/>
+          <a:p>
+            <a:r>
+              <a:rPr lang="en-US" sz="1400" dirty="0" smtClean="0"/>
+              <a:t>TelloRun.py</a:t>
+            </a:r>
+            <a:endParaRPr lang="en-SG" sz="1400" dirty="0"/>
+          </a:p>
+        </p:txBody>
+      </p:sp>
+      <p:sp>
+        <p:nvSpPr>
+          <p:cNvPr id="64" name="TextBox 63"/>
+          <p:cNvSpPr txBox="1"/>
+          <p:nvPr/>
+        </p:nvSpPr>
+        <p:spPr>
+          <a:xfrm>
+            <a:off x="8815137" y="598613"/>
+            <a:ext cx="1787152" cy="307777"/>
+          </a:xfrm>
+          <a:prstGeom prst="rect">
+            <a:avLst/>
+          </a:prstGeom>
+          <a:noFill/>
+        </p:spPr>
+        <p:txBody>
+          <a:bodyPr wrap="square" rtlCol="0">
+            <a:spAutoFit/>
+          </a:bodyPr>
+          <a:lstStyle/>
+          <a:p>
+            <a:r>
+              <a:rPr lang="en-US" sz="1400" dirty="0" smtClean="0"/>
+              <a:t>DJI </a:t>
+            </a:r>
+            <a:r>
+              <a:rPr lang="en-US" sz="1400" dirty="0" err="1" smtClean="0"/>
+              <a:t>tello</a:t>
+            </a:r>
+            <a:endParaRPr lang="en-SG" sz="1400" dirty="0"/>
+          </a:p>
+        </p:txBody>
+      </p:sp>
+      <p:sp>
+        <p:nvSpPr>
+          <p:cNvPr id="65" name="TextBox 64"/>
+          <p:cNvSpPr txBox="1"/>
+          <p:nvPr/>
+        </p:nvSpPr>
+        <p:spPr>
+          <a:xfrm>
+            <a:off x="4307565" y="475347"/>
+            <a:ext cx="3200140" cy="246221"/>
+          </a:xfrm>
+          <a:prstGeom prst="rect">
+            <a:avLst/>
+          </a:prstGeom>
+          <a:ln w="19050">
+            <a:solidFill>
+              <a:schemeClr val="tx1"/>
+            </a:solidFill>
+          </a:ln>
+        </p:spPr>
+        <p:style>
+          <a:lnRef idx="2">
+            <a:schemeClr val="accent1"/>
+          </a:lnRef>
+          <a:fillRef idx="1">
+            <a:schemeClr val="lt1"/>
+          </a:fillRef>
+          <a:effectRef idx="0">
+            <a:schemeClr val="accent1"/>
+          </a:effectRef>
+          <a:fontRef idx="minor">
+            <a:schemeClr val="dk1"/>
+          </a:fontRef>
+        </p:style>
+        <p:txBody>
+          <a:bodyPr wrap="square" rtlCol="0">
+            <a:spAutoFit/>
+          </a:bodyPr>
+          <a:lstStyle/>
+          <a:p>
+            <a:r>
+              <a:rPr lang="en-US" sz="1000" dirty="0" err="1" smtClean="0"/>
+              <a:t>Init</a:t>
+            </a:r>
+            <a:r>
+              <a:rPr lang="en-US" sz="1000" dirty="0" smtClean="0"/>
+              <a:t> program and load the configuration(such as tracks)</a:t>
+            </a:r>
+            <a:endParaRPr lang="en-SG" sz="1000" dirty="0"/>
+          </a:p>
+        </p:txBody>
+      </p:sp>
+      <p:cxnSp>
+        <p:nvCxnSpPr>
+          <p:cNvPr id="69" name="Straight Arrow Connector 68"/>
+          <p:cNvCxnSpPr/>
+          <p:nvPr/>
+        </p:nvCxnSpPr>
+        <p:spPr>
+          <a:xfrm>
+            <a:off x="4794540" y="721568"/>
+            <a:ext cx="0" cy="591093"/>
+          </a:xfrm>
+          <a:prstGeom prst="straightConnector1">
+            <a:avLst/>
+          </a:prstGeom>
+          <a:ln>
+            <a:tailEnd type="triangle"/>
+          </a:ln>
+        </p:spPr>
+        <p:style>
+          <a:lnRef idx="1">
+            <a:schemeClr val="dk1"/>
+          </a:lnRef>
+          <a:fillRef idx="0">
+            <a:schemeClr val="dk1"/>
+          </a:fillRef>
+          <a:effectRef idx="0">
+            <a:schemeClr val="dk1"/>
+          </a:effectRef>
+          <a:fontRef idx="minor">
+            <a:schemeClr val="tx1"/>
+          </a:fontRef>
+        </p:style>
+      </p:cxnSp>
+      <p:sp>
+        <p:nvSpPr>
+          <p:cNvPr id="70" name="TextBox 69"/>
+          <p:cNvSpPr txBox="1"/>
+          <p:nvPr/>
+        </p:nvSpPr>
+        <p:spPr>
+          <a:xfrm>
+            <a:off x="6620193" y="1035662"/>
+            <a:ext cx="1248878" cy="553998"/>
+          </a:xfrm>
+          <a:prstGeom prst="rect">
+            <a:avLst/>
+          </a:prstGeom>
+          <a:ln w="19050">
+            <a:solidFill>
+              <a:schemeClr val="tx1"/>
+            </a:solidFill>
+          </a:ln>
+        </p:spPr>
+        <p:style>
+          <a:lnRef idx="2">
+            <a:schemeClr val="accent1"/>
+          </a:lnRef>
+          <a:fillRef idx="1">
+            <a:schemeClr val="lt1"/>
+          </a:fillRef>
+          <a:effectRef idx="0">
+            <a:schemeClr val="accent1"/>
+          </a:effectRef>
+          <a:fontRef idx="minor">
+            <a:schemeClr val="dk1"/>
+          </a:fontRef>
+        </p:style>
+        <p:txBody>
+          <a:bodyPr wrap="square" rtlCol="0">
+            <a:spAutoFit/>
+          </a:bodyPr>
+          <a:lstStyle/>
+          <a:p>
+            <a:r>
+              <a:rPr lang="en-US" sz="1000" dirty="0" err="1" smtClean="0"/>
+              <a:t>Init</a:t>
+            </a:r>
+            <a:r>
+              <a:rPr lang="en-US" sz="1000" dirty="0"/>
+              <a:t> </a:t>
+            </a:r>
+            <a:r>
+              <a:rPr lang="en-US" sz="1000" dirty="0" err="1" smtClean="0"/>
+              <a:t>Tello</a:t>
+            </a:r>
+            <a:r>
+              <a:rPr lang="en-US" sz="1000" dirty="0" smtClean="0"/>
+              <a:t> state data receive UDP server thread</a:t>
+            </a:r>
+            <a:endParaRPr lang="en-SG" sz="1000" dirty="0"/>
+          </a:p>
+        </p:txBody>
+      </p:sp>
+      <p:cxnSp>
+        <p:nvCxnSpPr>
+          <p:cNvPr id="71" name="Straight Arrow Connector 70"/>
+          <p:cNvCxnSpPr/>
+          <p:nvPr/>
+        </p:nvCxnSpPr>
+        <p:spPr>
+          <a:xfrm>
+            <a:off x="7074123" y="721568"/>
+            <a:ext cx="0" cy="299935"/>
+          </a:xfrm>
+          <a:prstGeom prst="straightConnector1">
+            <a:avLst/>
+          </a:prstGeom>
+          <a:ln>
+            <a:tailEnd type="triangle"/>
+          </a:ln>
+        </p:spPr>
+        <p:style>
+          <a:lnRef idx="1">
+            <a:schemeClr val="dk1"/>
+          </a:lnRef>
+          <a:fillRef idx="0">
+            <a:schemeClr val="dk1"/>
+          </a:fillRef>
+          <a:effectRef idx="0">
+            <a:schemeClr val="dk1"/>
+          </a:effectRef>
+          <a:fontRef idx="minor">
+            <a:schemeClr val="tx1"/>
+          </a:fontRef>
+        </p:style>
+      </p:cxnSp>
+      <p:sp>
+        <p:nvSpPr>
+          <p:cNvPr id="72" name="TextBox 71"/>
+          <p:cNvSpPr txBox="1"/>
+          <p:nvPr/>
+        </p:nvSpPr>
+        <p:spPr>
+          <a:xfrm>
+            <a:off x="9137138" y="1126104"/>
+            <a:ext cx="1248878" cy="400110"/>
+          </a:xfrm>
+          <a:prstGeom prst="rect">
+            <a:avLst/>
+          </a:prstGeom>
+          <a:ln w="19050">
+            <a:solidFill>
+              <a:schemeClr val="tx1"/>
+            </a:solidFill>
+          </a:ln>
+        </p:spPr>
+        <p:style>
+          <a:lnRef idx="2">
+            <a:schemeClr val="accent1"/>
+          </a:lnRef>
+          <a:fillRef idx="1">
+            <a:schemeClr val="lt1"/>
+          </a:fillRef>
+          <a:effectRef idx="0">
+            <a:schemeClr val="accent1"/>
+          </a:effectRef>
+          <a:fontRef idx="minor">
+            <a:schemeClr val="dk1"/>
+          </a:fontRef>
+        </p:style>
+        <p:txBody>
+          <a:bodyPr wrap="square" rtlCol="0">
+            <a:spAutoFit/>
+          </a:bodyPr>
+          <a:lstStyle/>
+          <a:p>
+            <a:r>
+              <a:rPr lang="en-US" sz="1000" dirty="0" err="1" smtClean="0"/>
+              <a:t>Init</a:t>
+            </a:r>
+            <a:r>
+              <a:rPr lang="en-US" sz="1000" dirty="0"/>
+              <a:t> </a:t>
+            </a:r>
+            <a:r>
+              <a:rPr lang="en-US" sz="1000" dirty="0" err="1" smtClean="0"/>
+              <a:t>Tello</a:t>
+            </a:r>
+            <a:r>
+              <a:rPr lang="en-US" sz="1000" dirty="0" smtClean="0"/>
+              <a:t> state data sending UDP client</a:t>
+            </a:r>
+            <a:endParaRPr lang="en-SG" sz="1000" dirty="0"/>
+          </a:p>
+        </p:txBody>
+      </p:sp>
+      <p:cxnSp>
+        <p:nvCxnSpPr>
+          <p:cNvPr id="74" name="Straight Arrow Connector 73"/>
+          <p:cNvCxnSpPr/>
+          <p:nvPr/>
+        </p:nvCxnSpPr>
+        <p:spPr>
+          <a:xfrm flipH="1">
+            <a:off x="7869071" y="1312661"/>
+            <a:ext cx="1195437" cy="0"/>
+          </a:xfrm>
+          <a:prstGeom prst="straightConnector1">
+            <a:avLst/>
+          </a:prstGeom>
+          <a:ln>
+            <a:tailEnd type="triangle"/>
+          </a:ln>
+        </p:spPr>
+        <p:style>
+          <a:lnRef idx="1">
+            <a:schemeClr val="dk1"/>
+          </a:lnRef>
+          <a:fillRef idx="0">
+            <a:schemeClr val="dk1"/>
+          </a:fillRef>
+          <a:effectRef idx="0">
+            <a:schemeClr val="dk1"/>
+          </a:effectRef>
+          <a:fontRef idx="minor">
+            <a:schemeClr val="tx1"/>
+          </a:fontRef>
+        </p:style>
+      </p:cxnSp>
+      <p:sp>
+        <p:nvSpPr>
+          <p:cNvPr id="75" name="TextBox 74"/>
+          <p:cNvSpPr txBox="1"/>
+          <p:nvPr/>
+        </p:nvSpPr>
+        <p:spPr>
+          <a:xfrm>
+            <a:off x="6299978" y="1732727"/>
+            <a:ext cx="1248878" cy="553998"/>
+          </a:xfrm>
+          <a:prstGeom prst="rect">
+            <a:avLst/>
+          </a:prstGeom>
+          <a:ln w="19050">
+            <a:solidFill>
+              <a:schemeClr val="tx1"/>
+            </a:solidFill>
+          </a:ln>
+        </p:spPr>
+        <p:style>
+          <a:lnRef idx="2">
+            <a:schemeClr val="accent1"/>
+          </a:lnRef>
+          <a:fillRef idx="1">
+            <a:schemeClr val="lt1"/>
+          </a:fillRef>
+          <a:effectRef idx="0">
+            <a:schemeClr val="accent1"/>
+          </a:effectRef>
+          <a:fontRef idx="minor">
+            <a:schemeClr val="dk1"/>
+          </a:fontRef>
+        </p:style>
+        <p:txBody>
+          <a:bodyPr wrap="square" rtlCol="0">
+            <a:spAutoFit/>
+          </a:bodyPr>
+          <a:lstStyle/>
+          <a:p>
+            <a:r>
+              <a:rPr lang="en-US" sz="1000" dirty="0" err="1" smtClean="0"/>
+              <a:t>Init</a:t>
+            </a:r>
+            <a:r>
+              <a:rPr lang="en-US" sz="1000" dirty="0"/>
+              <a:t> </a:t>
+            </a:r>
+            <a:r>
+              <a:rPr lang="en-US" sz="1000" dirty="0" err="1" smtClean="0"/>
+              <a:t>Tello</a:t>
+            </a:r>
+            <a:r>
+              <a:rPr lang="en-US" sz="1000" dirty="0" smtClean="0"/>
+              <a:t> Video Stream receive UDP server thread</a:t>
+            </a:r>
+            <a:endParaRPr lang="en-SG" sz="1000" dirty="0"/>
+          </a:p>
+        </p:txBody>
+      </p:sp>
+      <p:sp>
+        <p:nvSpPr>
+          <p:cNvPr id="76" name="TextBox 75"/>
+          <p:cNvSpPr txBox="1"/>
+          <p:nvPr/>
+        </p:nvSpPr>
+        <p:spPr>
+          <a:xfrm>
+            <a:off x="9147243" y="1809671"/>
+            <a:ext cx="1248878" cy="400110"/>
+          </a:xfrm>
+          <a:prstGeom prst="rect">
+            <a:avLst/>
+          </a:prstGeom>
+          <a:ln w="19050">
+            <a:solidFill>
+              <a:schemeClr val="tx1"/>
+            </a:solidFill>
+          </a:ln>
+        </p:spPr>
+        <p:style>
+          <a:lnRef idx="2">
+            <a:schemeClr val="accent1"/>
+          </a:lnRef>
+          <a:fillRef idx="1">
+            <a:schemeClr val="lt1"/>
+          </a:fillRef>
+          <a:effectRef idx="0">
+            <a:schemeClr val="accent1"/>
+          </a:effectRef>
+          <a:fontRef idx="minor">
+            <a:schemeClr val="dk1"/>
+          </a:fontRef>
+        </p:style>
+        <p:txBody>
+          <a:bodyPr wrap="square" rtlCol="0">
+            <a:spAutoFit/>
+          </a:bodyPr>
+          <a:lstStyle/>
+          <a:p>
+            <a:r>
+              <a:rPr lang="en-US" sz="1000" dirty="0" err="1" smtClean="0"/>
+              <a:t>Init</a:t>
+            </a:r>
+            <a:r>
+              <a:rPr lang="en-US" sz="1000" dirty="0"/>
+              <a:t> </a:t>
+            </a:r>
+            <a:r>
+              <a:rPr lang="en-US" sz="1000" dirty="0" err="1" smtClean="0"/>
+              <a:t>Tello</a:t>
+            </a:r>
+            <a:r>
+              <a:rPr lang="en-US" sz="1000" dirty="0" smtClean="0"/>
+              <a:t> video data sending UDP client</a:t>
+            </a:r>
+            <a:endParaRPr lang="en-SG" sz="1000" dirty="0"/>
+          </a:p>
+        </p:txBody>
+      </p:sp>
+      <p:cxnSp>
+        <p:nvCxnSpPr>
+          <p:cNvPr id="77" name="Straight Arrow Connector 76"/>
+          <p:cNvCxnSpPr/>
+          <p:nvPr/>
+        </p:nvCxnSpPr>
+        <p:spPr>
+          <a:xfrm>
+            <a:off x="6449684" y="770893"/>
+            <a:ext cx="0" cy="955376"/>
+          </a:xfrm>
+          <a:prstGeom prst="straightConnector1">
+            <a:avLst/>
+          </a:prstGeom>
+          <a:ln>
+            <a:tailEnd type="triangle"/>
+          </a:ln>
+        </p:spPr>
+        <p:style>
+          <a:lnRef idx="1">
+            <a:schemeClr val="dk1"/>
+          </a:lnRef>
+          <a:fillRef idx="0">
+            <a:schemeClr val="dk1"/>
+          </a:fillRef>
+          <a:effectRef idx="0">
+            <a:schemeClr val="dk1"/>
+          </a:effectRef>
+          <a:fontRef idx="minor">
+            <a:schemeClr val="tx1"/>
+          </a:fontRef>
+        </p:style>
+      </p:cxnSp>
+      <p:cxnSp>
+        <p:nvCxnSpPr>
+          <p:cNvPr id="81" name="Straight Arrow Connector 80"/>
+          <p:cNvCxnSpPr>
+            <a:stCxn id="76" idx="1"/>
+          </p:cNvCxnSpPr>
+          <p:nvPr/>
+        </p:nvCxnSpPr>
+        <p:spPr>
+          <a:xfrm flipH="1" flipV="1">
+            <a:off x="7581463" y="1993819"/>
+            <a:ext cx="1565780" cy="0"/>
+          </a:xfrm>
+          <a:prstGeom prst="straightConnector1">
+            <a:avLst/>
+          </a:prstGeom>
+          <a:ln>
+            <a:tailEnd type="triangle"/>
+          </a:ln>
+        </p:spPr>
+        <p:style>
+          <a:lnRef idx="1">
+            <a:schemeClr val="dk1"/>
+          </a:lnRef>
+          <a:fillRef idx="0">
+            <a:schemeClr val="dk1"/>
+          </a:fillRef>
+          <a:effectRef idx="0">
+            <a:schemeClr val="dk1"/>
+          </a:effectRef>
+          <a:fontRef idx="minor">
+            <a:schemeClr val="tx1"/>
+          </a:fontRef>
+        </p:style>
+      </p:cxnSp>
+      <p:cxnSp>
+        <p:nvCxnSpPr>
+          <p:cNvPr id="83" name="Straight Arrow Connector 82"/>
+          <p:cNvCxnSpPr/>
+          <p:nvPr/>
+        </p:nvCxnSpPr>
+        <p:spPr>
+          <a:xfrm flipH="1">
+            <a:off x="6054291" y="721568"/>
+            <a:ext cx="0" cy="1824995"/>
+          </a:xfrm>
+          <a:prstGeom prst="straightConnector1">
+            <a:avLst/>
+          </a:prstGeom>
+          <a:ln>
+            <a:tailEnd type="triangle"/>
+          </a:ln>
+        </p:spPr>
+        <p:style>
+          <a:lnRef idx="1">
+            <a:schemeClr val="dk1"/>
+          </a:lnRef>
+          <a:fillRef idx="0">
+            <a:schemeClr val="dk1"/>
+          </a:fillRef>
+          <a:effectRef idx="0">
+            <a:schemeClr val="dk1"/>
+          </a:effectRef>
+          <a:fontRef idx="minor">
+            <a:schemeClr val="tx1"/>
+          </a:fontRef>
+        </p:style>
+      </p:cxnSp>
+      <p:sp>
+        <p:nvSpPr>
+          <p:cNvPr id="85" name="TextBox 84"/>
+          <p:cNvSpPr txBox="1"/>
+          <p:nvPr/>
+        </p:nvSpPr>
+        <p:spPr>
+          <a:xfrm>
+            <a:off x="5993304" y="2560722"/>
+            <a:ext cx="1360397" cy="400110"/>
+          </a:xfrm>
+          <a:prstGeom prst="rect">
+            <a:avLst/>
+          </a:prstGeom>
+          <a:ln w="19050">
+            <a:solidFill>
+              <a:schemeClr val="tx1"/>
+            </a:solidFill>
+          </a:ln>
+        </p:spPr>
+        <p:style>
+          <a:lnRef idx="2">
+            <a:schemeClr val="accent1"/>
+          </a:lnRef>
+          <a:fillRef idx="1">
+            <a:schemeClr val="lt1"/>
+          </a:fillRef>
+          <a:effectRef idx="0">
+            <a:schemeClr val="accent1"/>
+          </a:effectRef>
+          <a:fontRef idx="minor">
+            <a:schemeClr val="dk1"/>
+          </a:fontRef>
+        </p:style>
+        <p:txBody>
+          <a:bodyPr wrap="square" rtlCol="0">
+            <a:spAutoFit/>
+          </a:bodyPr>
+          <a:lstStyle/>
+          <a:p>
+            <a:r>
+              <a:rPr lang="en-US" sz="1000" dirty="0" err="1" smtClean="0"/>
+              <a:t>Init</a:t>
+            </a:r>
+            <a:r>
+              <a:rPr lang="en-US" sz="1000" dirty="0"/>
+              <a:t> </a:t>
+            </a:r>
+            <a:r>
+              <a:rPr lang="en-US" sz="1000" dirty="0" err="1" smtClean="0"/>
+              <a:t>Tello</a:t>
+            </a:r>
+            <a:r>
+              <a:rPr lang="en-US" sz="1000" dirty="0" smtClean="0"/>
+              <a:t> control main UI thread</a:t>
+            </a:r>
+            <a:endParaRPr lang="en-SG" sz="1000" dirty="0"/>
+          </a:p>
+        </p:txBody>
+      </p:sp>
+      <p:cxnSp>
+        <p:nvCxnSpPr>
+          <p:cNvPr id="87" name="Straight Arrow Connector 86"/>
+          <p:cNvCxnSpPr/>
+          <p:nvPr/>
+        </p:nvCxnSpPr>
+        <p:spPr>
+          <a:xfrm>
+            <a:off x="6629373" y="2991586"/>
+            <a:ext cx="0" cy="299935"/>
+          </a:xfrm>
+          <a:prstGeom prst="straightConnector1">
+            <a:avLst/>
+          </a:prstGeom>
+          <a:ln>
+            <a:tailEnd type="triangle"/>
+          </a:ln>
+        </p:spPr>
+        <p:style>
+          <a:lnRef idx="1">
+            <a:schemeClr val="dk1"/>
+          </a:lnRef>
+          <a:fillRef idx="0">
+            <a:schemeClr val="dk1"/>
+          </a:fillRef>
+          <a:effectRef idx="0">
+            <a:schemeClr val="dk1"/>
+          </a:effectRef>
+          <a:fontRef idx="minor">
+            <a:schemeClr val="tx1"/>
+          </a:fontRef>
+        </p:style>
+      </p:cxnSp>
+      <p:sp>
+        <p:nvSpPr>
+          <p:cNvPr id="88" name="TextBox 87"/>
+          <p:cNvSpPr txBox="1"/>
+          <p:nvPr/>
+        </p:nvSpPr>
+        <p:spPr>
+          <a:xfrm>
+            <a:off x="5926439" y="3297884"/>
+            <a:ext cx="1168921" cy="400110"/>
+          </a:xfrm>
+          <a:prstGeom prst="rect">
+            <a:avLst/>
+          </a:prstGeom>
+          <a:ln w="19050">
+            <a:solidFill>
+              <a:schemeClr val="tx1"/>
+            </a:solidFill>
+          </a:ln>
+        </p:spPr>
+        <p:style>
+          <a:lnRef idx="2">
+            <a:schemeClr val="accent1"/>
+          </a:lnRef>
+          <a:fillRef idx="1">
+            <a:schemeClr val="lt1"/>
+          </a:fillRef>
+          <a:effectRef idx="0">
+            <a:schemeClr val="accent1"/>
+          </a:effectRef>
+          <a:fontRef idx="minor">
+            <a:schemeClr val="dk1"/>
+          </a:fontRef>
+        </p:style>
+        <p:txBody>
+          <a:bodyPr wrap="square" rtlCol="0">
+            <a:spAutoFit/>
+          </a:bodyPr>
+          <a:lstStyle/>
+          <a:p>
+            <a:r>
+              <a:rPr lang="en-US" sz="1000" dirty="0" err="1" smtClean="0"/>
+              <a:t>Init</a:t>
+            </a:r>
+            <a:r>
+              <a:rPr lang="en-US" sz="1000" dirty="0" smtClean="0"/>
+              <a:t> the </a:t>
+            </a:r>
+            <a:r>
+              <a:rPr lang="en-US" sz="1000" dirty="0" err="1" smtClean="0"/>
+              <a:t>Tello</a:t>
+            </a:r>
+            <a:r>
+              <a:rPr lang="en-US" sz="1000" dirty="0" smtClean="0"/>
+              <a:t> control UDP client</a:t>
+            </a:r>
+            <a:endParaRPr lang="en-SG" sz="1000" dirty="0"/>
+          </a:p>
+        </p:txBody>
+      </p:sp>
+      <p:sp>
+        <p:nvSpPr>
+          <p:cNvPr id="89" name="TextBox 88"/>
+          <p:cNvSpPr txBox="1"/>
+          <p:nvPr/>
+        </p:nvSpPr>
+        <p:spPr>
+          <a:xfrm>
+            <a:off x="9100973" y="3297884"/>
+            <a:ext cx="1285043" cy="553998"/>
+          </a:xfrm>
+          <a:prstGeom prst="rect">
+            <a:avLst/>
+          </a:prstGeom>
+          <a:ln w="19050">
+            <a:solidFill>
+              <a:schemeClr val="tx1"/>
+            </a:solidFill>
+          </a:ln>
+        </p:spPr>
+        <p:style>
+          <a:lnRef idx="2">
+            <a:schemeClr val="accent1"/>
+          </a:lnRef>
+          <a:fillRef idx="1">
+            <a:schemeClr val="lt1"/>
+          </a:fillRef>
+          <a:effectRef idx="0">
+            <a:schemeClr val="accent1"/>
+          </a:effectRef>
+          <a:fontRef idx="minor">
+            <a:schemeClr val="dk1"/>
+          </a:fontRef>
+        </p:style>
+        <p:txBody>
+          <a:bodyPr wrap="square" rtlCol="0">
+            <a:spAutoFit/>
+          </a:bodyPr>
+          <a:lstStyle/>
+          <a:p>
+            <a:r>
+              <a:rPr lang="en-US" sz="1000" dirty="0" err="1" smtClean="0"/>
+              <a:t>Init</a:t>
+            </a:r>
+            <a:r>
+              <a:rPr lang="en-US" sz="1000" dirty="0"/>
+              <a:t> </a:t>
+            </a:r>
+            <a:r>
+              <a:rPr lang="en-US" sz="1000" dirty="0" err="1" smtClean="0"/>
+              <a:t>Tello</a:t>
+            </a:r>
+            <a:r>
+              <a:rPr lang="en-US" sz="1000" dirty="0" smtClean="0"/>
+              <a:t> control data sending UDP client</a:t>
+            </a:r>
+            <a:endParaRPr lang="en-SG" sz="1000" dirty="0"/>
+          </a:p>
+        </p:txBody>
+      </p:sp>
+      <p:cxnSp>
+        <p:nvCxnSpPr>
+          <p:cNvPr id="90" name="Straight Arrow Connector 89"/>
+          <p:cNvCxnSpPr>
+            <a:stCxn id="89" idx="1"/>
+          </p:cNvCxnSpPr>
+          <p:nvPr/>
+        </p:nvCxnSpPr>
+        <p:spPr>
+          <a:xfrm flipH="1" flipV="1">
+            <a:off x="7085257" y="3433397"/>
+            <a:ext cx="2015716" cy="0"/>
+          </a:xfrm>
+          <a:prstGeom prst="straightConnector1">
+            <a:avLst/>
+          </a:prstGeom>
+          <a:ln>
+            <a:tailEnd type="triangle"/>
+          </a:ln>
+        </p:spPr>
+        <p:style>
+          <a:lnRef idx="1">
+            <a:schemeClr val="dk1"/>
+          </a:lnRef>
+          <a:fillRef idx="0">
+            <a:schemeClr val="dk1"/>
+          </a:fillRef>
+          <a:effectRef idx="0">
+            <a:schemeClr val="dk1"/>
+          </a:effectRef>
+          <a:fontRef idx="minor">
+            <a:schemeClr val="tx1"/>
+          </a:fontRef>
+        </p:style>
+      </p:cxnSp>
+      <p:sp>
+        <p:nvSpPr>
+          <p:cNvPr id="94" name="TextBox 93"/>
+          <p:cNvSpPr txBox="1"/>
+          <p:nvPr/>
+        </p:nvSpPr>
+        <p:spPr>
+          <a:xfrm>
+            <a:off x="5993304" y="4031314"/>
+            <a:ext cx="1875767" cy="1785104"/>
+          </a:xfrm>
+          <a:prstGeom prst="rect">
+            <a:avLst/>
+          </a:prstGeom>
+          <a:ln w="19050">
+            <a:solidFill>
+              <a:schemeClr val="tx1"/>
+            </a:solidFill>
+          </a:ln>
+        </p:spPr>
+        <p:style>
+          <a:lnRef idx="2">
+            <a:schemeClr val="accent1"/>
+          </a:lnRef>
+          <a:fillRef idx="1">
+            <a:schemeClr val="lt1"/>
+          </a:fillRef>
+          <a:effectRef idx="0">
+            <a:schemeClr val="accent1"/>
+          </a:effectRef>
+          <a:fontRef idx="minor">
+            <a:schemeClr val="dk1"/>
+          </a:fontRef>
+        </p:style>
+        <p:txBody>
+          <a:bodyPr wrap="square" rtlCol="0">
+            <a:spAutoFit/>
+          </a:bodyPr>
+          <a:lstStyle/>
+          <a:p>
+            <a:r>
+              <a:rPr lang="en-US" sz="1000" dirty="0" smtClean="0"/>
+              <a:t>Main Periodic call back(10ms):</a:t>
+            </a:r>
+          </a:p>
+          <a:p>
+            <a:pPr marL="228600" indent="-228600">
+              <a:buAutoNum type="arabicPeriod"/>
+            </a:pPr>
+            <a:r>
+              <a:rPr lang="en-US" sz="1000" dirty="0" smtClean="0"/>
+              <a:t>Handle user control </a:t>
+            </a:r>
+          </a:p>
+          <a:p>
+            <a:pPr marL="228600" indent="-228600">
+              <a:buAutoNum type="arabicPeriod"/>
+            </a:pPr>
+            <a:r>
+              <a:rPr lang="en-US" sz="1000" dirty="0" smtClean="0"/>
+              <a:t>Send track </a:t>
+            </a:r>
+            <a:r>
+              <a:rPr lang="en-US" sz="1000" dirty="0" err="1" smtClean="0"/>
+              <a:t>cmd</a:t>
+            </a:r>
+            <a:r>
+              <a:rPr lang="en-US" sz="1000" dirty="0" smtClean="0"/>
+              <a:t> setting.</a:t>
+            </a:r>
+          </a:p>
+          <a:p>
+            <a:pPr marL="228600" indent="-228600">
+              <a:buAutoNum type="arabicPeriod"/>
+            </a:pPr>
+            <a:r>
+              <a:rPr lang="en-US" sz="1000" dirty="0" smtClean="0"/>
+              <a:t>Update UI panels.</a:t>
+            </a:r>
+          </a:p>
+          <a:p>
+            <a:pPr marL="228600" indent="-228600">
+              <a:buAutoNum type="arabicPeriod"/>
+            </a:pPr>
+            <a:r>
+              <a:rPr lang="en-US" sz="1000" dirty="0" smtClean="0"/>
+              <a:t>Update Video View.</a:t>
+            </a:r>
+          </a:p>
+          <a:p>
+            <a:pPr marL="228600" indent="-228600">
+              <a:buAutoNum type="arabicPeriod"/>
+            </a:pPr>
+            <a:r>
+              <a:rPr lang="en-US" sz="1000" dirty="0" smtClean="0"/>
+              <a:t>Updat</a:t>
+            </a:r>
+            <a:r>
+              <a:rPr lang="en-US" sz="1000" dirty="0" smtClean="0"/>
+              <a:t>e the drone detail state.</a:t>
+            </a:r>
+          </a:p>
+          <a:p>
+            <a:pPr marL="228600" indent="-228600">
+              <a:buAutoNum type="arabicPeriod"/>
+            </a:pPr>
+            <a:r>
+              <a:rPr lang="en-US" sz="1000" dirty="0" smtClean="0"/>
+              <a:t>Update sensor data. </a:t>
+            </a:r>
+          </a:p>
+          <a:p>
+            <a:pPr marL="228600" indent="-228600">
+              <a:buAutoNum type="arabicPeriod"/>
+            </a:pPr>
+            <a:r>
+              <a:rPr lang="en-US" sz="1000" dirty="0" smtClean="0"/>
+              <a:t>Send </a:t>
+            </a:r>
+            <a:r>
+              <a:rPr lang="en-US" sz="1000" dirty="0" err="1" smtClean="0"/>
+              <a:t>cmd</a:t>
+            </a:r>
+            <a:r>
+              <a:rPr lang="en-US" sz="1000" dirty="0" smtClean="0"/>
+              <a:t> to keep drone alive.</a:t>
+            </a:r>
+            <a:endParaRPr lang="en-US" sz="1000" dirty="0" smtClean="0"/>
+          </a:p>
+          <a:p>
+            <a:r>
+              <a:rPr lang="en-US" sz="1000" dirty="0" smtClean="0"/>
+              <a:t> </a:t>
+            </a:r>
+            <a:endParaRPr lang="en-SG" sz="1000" dirty="0"/>
+          </a:p>
+        </p:txBody>
+      </p:sp>
+      <p:cxnSp>
+        <p:nvCxnSpPr>
+          <p:cNvPr id="95" name="Straight Arrow Connector 94"/>
+          <p:cNvCxnSpPr/>
+          <p:nvPr/>
+        </p:nvCxnSpPr>
+        <p:spPr>
+          <a:xfrm>
+            <a:off x="6616155" y="3697994"/>
+            <a:ext cx="0" cy="299935"/>
+          </a:xfrm>
+          <a:prstGeom prst="straightConnector1">
+            <a:avLst/>
+          </a:prstGeom>
+          <a:ln>
+            <a:tailEnd type="triangle"/>
+          </a:ln>
+        </p:spPr>
+        <p:style>
+          <a:lnRef idx="1">
+            <a:schemeClr val="dk1"/>
+          </a:lnRef>
+          <a:fillRef idx="0">
+            <a:schemeClr val="dk1"/>
+          </a:fillRef>
+          <a:effectRef idx="0">
+            <a:schemeClr val="dk1"/>
+          </a:effectRef>
+          <a:fontRef idx="minor">
+            <a:schemeClr val="tx1"/>
+          </a:fontRef>
+        </p:style>
+      </p:cxnSp>
+    </p:spTree>
+    <p:extLst>
+      <p:ext uri="{BB962C8B-B14F-4D97-AF65-F5344CB8AC3E}">
+        <p14:creationId xmlns:p14="http://schemas.microsoft.com/office/powerpoint/2010/main" val="594819908"/>
+      </p:ext>
+    </p:extLst>
+  </p:cSld>
+  <p:clrMapOvr>
+    <a:masterClrMapping/>
+  </p:clrMapOvr>
+  <p:timing>
+    <p:tnLst>
+      <p:par>
+        <p:cTn id="1" dur="indefinite" restart="never" nodeType="tmRoot"/>
+      </p:par>
+    </p:tnLst>
+  </p:timing>
 </p:sld>
 </file>
 

</xml_diff>

<commit_message>
Added the black energy 3 attack.
</commit_message>
<xml_diff>
--- a/doc/firmwaresignWF.pptx
+++ b/doc/firmwaresignWF.pptx
@@ -5,7 +5,7 @@
     <p:sldMasterId id="2147483648" r:id="rId1"/>
   </p:sldMasterIdLst>
   <p:notesMasterIdLst>
-    <p:notesMasterId r:id="rId21"/>
+    <p:notesMasterId r:id="rId22"/>
   </p:notesMasterIdLst>
   <p:sldIdLst>
     <p:sldId id="256" r:id="rId2"/>
@@ -27,6 +27,7 @@
     <p:sldId id="273" r:id="rId18"/>
     <p:sldId id="274" r:id="rId19"/>
     <p:sldId id="275" r:id="rId20"/>
+    <p:sldId id="276" r:id="rId21"/>
   </p:sldIdLst>
   <p:sldSz cx="12192000" cy="6858000"/>
   <p:notesSz cx="6858000" cy="9144000"/>
@@ -149,6 +150,7 @@
             <p14:sldId id="273"/>
             <p14:sldId id="274"/>
             <p14:sldId id="275"/>
+            <p14:sldId id="276"/>
           </p14:sldIdLst>
         </p14:section>
         <p14:section name="Untitled Section" id="{AE9E3D3D-B6E7-4002-83A3-10D822FD789F}">
@@ -245,7 +247,7 @@
           <a:p>
             <a:fld id="{32DA1F5A-E23E-4D9B-B8D0-40D8909182CC}" type="datetimeFigureOut">
               <a:rPr lang="en-SG" smtClean="0"/>
-              <a:t>21/11/2019</a:t>
+              <a:t>10/12/2019</a:t>
             </a:fld>
             <a:endParaRPr lang="en-SG"/>
           </a:p>
@@ -728,7 +730,7 @@
           <a:p>
             <a:fld id="{168FC4C3-6B25-48E2-93F9-24A255A41CA9}" type="datetimeFigureOut">
               <a:rPr lang="en-SG" smtClean="0"/>
-              <a:t>21/11/2019</a:t>
+              <a:t>10/12/2019</a:t>
             </a:fld>
             <a:endParaRPr lang="en-SG"/>
           </a:p>
@@ -898,7 +900,7 @@
           <a:p>
             <a:fld id="{168FC4C3-6B25-48E2-93F9-24A255A41CA9}" type="datetimeFigureOut">
               <a:rPr lang="en-SG" smtClean="0"/>
-              <a:t>21/11/2019</a:t>
+              <a:t>10/12/2019</a:t>
             </a:fld>
             <a:endParaRPr lang="en-SG"/>
           </a:p>
@@ -1078,7 +1080,7 @@
           <a:p>
             <a:fld id="{168FC4C3-6B25-48E2-93F9-24A255A41CA9}" type="datetimeFigureOut">
               <a:rPr lang="en-SG" smtClean="0"/>
-              <a:t>21/11/2019</a:t>
+              <a:t>10/12/2019</a:t>
             </a:fld>
             <a:endParaRPr lang="en-SG"/>
           </a:p>
@@ -1248,7 +1250,7 @@
           <a:p>
             <a:fld id="{168FC4C3-6B25-48E2-93F9-24A255A41CA9}" type="datetimeFigureOut">
               <a:rPr lang="en-SG" smtClean="0"/>
-              <a:t>21/11/2019</a:t>
+              <a:t>10/12/2019</a:t>
             </a:fld>
             <a:endParaRPr lang="en-SG"/>
           </a:p>
@@ -1494,7 +1496,7 @@
           <a:p>
             <a:fld id="{168FC4C3-6B25-48E2-93F9-24A255A41CA9}" type="datetimeFigureOut">
               <a:rPr lang="en-SG" smtClean="0"/>
-              <a:t>21/11/2019</a:t>
+              <a:t>10/12/2019</a:t>
             </a:fld>
             <a:endParaRPr lang="en-SG"/>
           </a:p>
@@ -1726,7 +1728,7 @@
           <a:p>
             <a:fld id="{168FC4C3-6B25-48E2-93F9-24A255A41CA9}" type="datetimeFigureOut">
               <a:rPr lang="en-SG" smtClean="0"/>
-              <a:t>21/11/2019</a:t>
+              <a:t>10/12/2019</a:t>
             </a:fld>
             <a:endParaRPr lang="en-SG"/>
           </a:p>
@@ -2093,7 +2095,7 @@
           <a:p>
             <a:fld id="{168FC4C3-6B25-48E2-93F9-24A255A41CA9}" type="datetimeFigureOut">
               <a:rPr lang="en-SG" smtClean="0"/>
-              <a:t>21/11/2019</a:t>
+              <a:t>10/12/2019</a:t>
             </a:fld>
             <a:endParaRPr lang="en-SG"/>
           </a:p>
@@ -2211,7 +2213,7 @@
           <a:p>
             <a:fld id="{168FC4C3-6B25-48E2-93F9-24A255A41CA9}" type="datetimeFigureOut">
               <a:rPr lang="en-SG" smtClean="0"/>
-              <a:t>21/11/2019</a:t>
+              <a:t>10/12/2019</a:t>
             </a:fld>
             <a:endParaRPr lang="en-SG"/>
           </a:p>
@@ -2306,7 +2308,7 @@
           <a:p>
             <a:fld id="{168FC4C3-6B25-48E2-93F9-24A255A41CA9}" type="datetimeFigureOut">
               <a:rPr lang="en-SG" smtClean="0"/>
-              <a:t>21/11/2019</a:t>
+              <a:t>10/12/2019</a:t>
             </a:fld>
             <a:endParaRPr lang="en-SG"/>
           </a:p>
@@ -2583,7 +2585,7 @@
           <a:p>
             <a:fld id="{168FC4C3-6B25-48E2-93F9-24A255A41CA9}" type="datetimeFigureOut">
               <a:rPr lang="en-SG" smtClean="0"/>
-              <a:t>21/11/2019</a:t>
+              <a:t>10/12/2019</a:t>
             </a:fld>
             <a:endParaRPr lang="en-SG"/>
           </a:p>
@@ -2836,7 +2838,7 @@
           <a:p>
             <a:fld id="{168FC4C3-6B25-48E2-93F9-24A255A41CA9}" type="datetimeFigureOut">
               <a:rPr lang="en-SG" smtClean="0"/>
-              <a:t>21/11/2019</a:t>
+              <a:t>10/12/2019</a:t>
             </a:fld>
             <a:endParaRPr lang="en-SG"/>
           </a:p>
@@ -3049,7 +3051,7 @@
           <a:p>
             <a:fld id="{168FC4C3-6B25-48E2-93F9-24A255A41CA9}" type="datetimeFigureOut">
               <a:rPr lang="en-SG" smtClean="0"/>
-              <a:t>21/11/2019</a:t>
+              <a:t>10/12/2019</a:t>
             </a:fld>
             <a:endParaRPr lang="en-SG"/>
           </a:p>
@@ -10454,7 +10456,7 @@
         </p:blipFill>
         <p:spPr>
           <a:xfrm>
-            <a:off x="5688364" y="1691187"/>
+            <a:off x="5658877" y="1720395"/>
             <a:ext cx="372103" cy="464160"/>
           </a:xfrm>
           <a:prstGeom prst="rect">
@@ -26165,6 +26167,1064 @@
 </p:sld>
 </file>
 
+<file path=ppt/slides/slide20.xml><?xml version="1.0" encoding="utf-8"?>
+<p:sld xmlns:a="http://schemas.openxmlformats.org/drawingml/2006/main" xmlns:r="http://schemas.openxmlformats.org/officeDocument/2006/relationships" xmlns:p="http://schemas.openxmlformats.org/presentationml/2006/main">
+  <p:cSld>
+    <p:spTree>
+      <p:nvGrpSpPr>
+        <p:cNvPr id="1" name=""/>
+        <p:cNvGrpSpPr/>
+        <p:nvPr/>
+      </p:nvGrpSpPr>
+      <p:grpSpPr>
+        <a:xfrm>
+          <a:off x="0" y="0"/>
+          <a:ext cx="0" cy="0"/>
+          <a:chOff x="0" y="0"/>
+          <a:chExt cx="0" cy="0"/>
+        </a:xfrm>
+      </p:grpSpPr>
+      <p:sp>
+        <p:nvSpPr>
+          <p:cNvPr id="8" name="Rectangle 7"/>
+          <p:cNvSpPr/>
+          <p:nvPr/>
+        </p:nvSpPr>
+        <p:spPr>
+          <a:xfrm>
+            <a:off x="5263416" y="3353301"/>
+            <a:ext cx="4448476" cy="3008997"/>
+          </a:xfrm>
+          <a:prstGeom prst="rect">
+            <a:avLst/>
+          </a:prstGeom>
+          <a:noFill/>
+          <a:ln w="9525" cap="flat" cmpd="sng" algn="ctr">
+            <a:solidFill>
+              <a:schemeClr val="dk1"/>
+            </a:solidFill>
+            <a:prstDash val="solid"/>
+            <a:round/>
+            <a:headEnd type="none" w="med" len="med"/>
+            <a:tailEnd type="none" w="med" len="med"/>
+          </a:ln>
+        </p:spPr>
+        <p:style>
+          <a:lnRef idx="0">
+            <a:scrgbClr r="0" g="0" b="0"/>
+          </a:lnRef>
+          <a:fillRef idx="0">
+            <a:scrgbClr r="0" g="0" b="0"/>
+          </a:fillRef>
+          <a:effectRef idx="0">
+            <a:scrgbClr r="0" g="0" b="0"/>
+          </a:effectRef>
+          <a:fontRef idx="minor">
+            <a:schemeClr val="dk1"/>
+          </a:fontRef>
+        </p:style>
+        <p:txBody>
+          <a:bodyPr rtlCol="0" anchor="ctr"/>
+          <a:lstStyle/>
+          <a:p>
+            <a:r>
+              <a:rPr lang="en-US" sz="2000" dirty="0" smtClean="0">
+                <a:ln w="19050">
+                  <a:solidFill>
+                    <a:schemeClr val="tx1"/>
+                  </a:solidFill>
+                </a:ln>
+              </a:rPr>
+              <a:t>OT-PLC-Railway </a:t>
+            </a:r>
+            <a:r>
+              <a:rPr lang="en-US" sz="2000" dirty="0">
+                <a:ln w="19050">
+                  <a:solidFill>
+                    <a:schemeClr val="tx1"/>
+                  </a:solidFill>
+                </a:ln>
+              </a:rPr>
+              <a:t>system </a:t>
+            </a:r>
+            <a:endParaRPr lang="en-US" sz="2000" dirty="0" smtClean="0">
+              <a:ln w="19050">
+                <a:solidFill>
+                  <a:schemeClr val="tx1"/>
+                </a:solidFill>
+              </a:ln>
+            </a:endParaRPr>
+          </a:p>
+          <a:p>
+            <a:endParaRPr lang="en-US" dirty="0">
+              <a:ln w="19050">
+                <a:solidFill>
+                  <a:schemeClr val="tx1"/>
+                </a:solidFill>
+              </a:ln>
+            </a:endParaRPr>
+          </a:p>
+          <a:p>
+            <a:endParaRPr lang="en-US" dirty="0" smtClean="0">
+              <a:ln w="19050">
+                <a:solidFill>
+                  <a:schemeClr val="tx1"/>
+                </a:solidFill>
+              </a:ln>
+            </a:endParaRPr>
+          </a:p>
+          <a:p>
+            <a:endParaRPr lang="en-US" dirty="0">
+              <a:ln w="19050">
+                <a:solidFill>
+                  <a:schemeClr val="tx1"/>
+                </a:solidFill>
+              </a:ln>
+            </a:endParaRPr>
+          </a:p>
+          <a:p>
+            <a:endParaRPr lang="en-US" dirty="0" smtClean="0">
+              <a:ln w="19050">
+                <a:solidFill>
+                  <a:schemeClr val="tx1"/>
+                </a:solidFill>
+              </a:ln>
+            </a:endParaRPr>
+          </a:p>
+          <a:p>
+            <a:endParaRPr lang="en-US" dirty="0">
+              <a:ln w="19050">
+                <a:solidFill>
+                  <a:schemeClr val="tx1"/>
+                </a:solidFill>
+              </a:ln>
+            </a:endParaRPr>
+          </a:p>
+          <a:p>
+            <a:endParaRPr lang="en-US" dirty="0" smtClean="0">
+              <a:ln w="19050">
+                <a:solidFill>
+                  <a:schemeClr val="tx1"/>
+                </a:solidFill>
+              </a:ln>
+            </a:endParaRPr>
+          </a:p>
+          <a:p>
+            <a:endParaRPr lang="en-US" dirty="0">
+              <a:ln w="19050">
+                <a:solidFill>
+                  <a:schemeClr val="tx1"/>
+                </a:solidFill>
+              </a:ln>
+            </a:endParaRPr>
+          </a:p>
+          <a:p>
+            <a:endParaRPr lang="en-US" dirty="0" smtClean="0">
+              <a:ln w="19050">
+                <a:solidFill>
+                  <a:schemeClr val="tx1"/>
+                </a:solidFill>
+              </a:ln>
+            </a:endParaRPr>
+          </a:p>
+          <a:p>
+            <a:endParaRPr lang="en-SG" dirty="0">
+              <a:ln w="19050">
+                <a:solidFill>
+                  <a:schemeClr val="tx1"/>
+                </a:solidFill>
+              </a:ln>
+            </a:endParaRPr>
+          </a:p>
+        </p:txBody>
+      </p:sp>
+      <p:pic>
+        <p:nvPicPr>
+          <p:cNvPr id="4" name="Picture 3"/>
+          <p:cNvPicPr>
+            <a:picLocks noChangeAspect="1"/>
+          </p:cNvPicPr>
+          <p:nvPr/>
+        </p:nvPicPr>
+        <p:blipFill>
+          <a:blip r:embed="rId2">
+            <a:extLst>
+              <a:ext uri="{28A0092B-C50C-407E-A947-70E740481C1C}">
+                <a14:useLocalDpi xmlns:a14="http://schemas.microsoft.com/office/drawing/2010/main" val="0"/>
+              </a:ext>
+            </a:extLst>
+          </a:blip>
+          <a:stretch>
+            <a:fillRect/>
+          </a:stretch>
+        </p:blipFill>
+        <p:spPr>
+          <a:xfrm>
+            <a:off x="5384847" y="467926"/>
+            <a:ext cx="1808296" cy="1808296"/>
+          </a:xfrm>
+          <a:prstGeom prst="rect">
+            <a:avLst/>
+          </a:prstGeom>
+        </p:spPr>
+      </p:pic>
+      <p:pic>
+        <p:nvPicPr>
+          <p:cNvPr id="5" name="Picture 4"/>
+          <p:cNvPicPr>
+            <a:picLocks noChangeAspect="1"/>
+          </p:cNvPicPr>
+          <p:nvPr/>
+        </p:nvPicPr>
+        <p:blipFill>
+          <a:blip r:embed="rId2">
+            <a:extLst>
+              <a:ext uri="{28A0092B-C50C-407E-A947-70E740481C1C}">
+                <a14:useLocalDpi xmlns:a14="http://schemas.microsoft.com/office/drawing/2010/main" val="0"/>
+              </a:ext>
+            </a:extLst>
+          </a:blip>
+          <a:stretch>
+            <a:fillRect/>
+          </a:stretch>
+        </p:blipFill>
+        <p:spPr>
+          <a:xfrm>
+            <a:off x="7638626" y="480638"/>
+            <a:ext cx="1808296" cy="1808296"/>
+          </a:xfrm>
+          <a:prstGeom prst="rect">
+            <a:avLst/>
+          </a:prstGeom>
+        </p:spPr>
+      </p:pic>
+      <p:sp>
+        <p:nvSpPr>
+          <p:cNvPr id="6" name="TextBox 5"/>
+          <p:cNvSpPr txBox="1"/>
+          <p:nvPr/>
+        </p:nvSpPr>
+        <p:spPr>
+          <a:xfrm>
+            <a:off x="3268037" y="4488898"/>
+            <a:ext cx="1303964" cy="461665"/>
+          </a:xfrm>
+          <a:prstGeom prst="rect">
+            <a:avLst/>
+          </a:prstGeom>
+          <a:ln w="19050">
+            <a:solidFill>
+              <a:schemeClr val="tx1"/>
+            </a:solidFill>
+          </a:ln>
+        </p:spPr>
+        <p:style>
+          <a:lnRef idx="2">
+            <a:schemeClr val="accent1"/>
+          </a:lnRef>
+          <a:fillRef idx="1">
+            <a:schemeClr val="lt1"/>
+          </a:fillRef>
+          <a:effectRef idx="0">
+            <a:schemeClr val="accent1"/>
+          </a:effectRef>
+          <a:fontRef idx="minor">
+            <a:schemeClr val="dk1"/>
+          </a:fontRef>
+        </p:style>
+        <p:txBody>
+          <a:bodyPr wrap="square" rtlCol="0">
+            <a:spAutoFit/>
+          </a:bodyPr>
+          <a:lstStyle/>
+          <a:p>
+            <a:r>
+              <a:rPr lang="en-US" sz="1200" b="1" dirty="0" smtClean="0"/>
+              <a:t>Attack device: </a:t>
+            </a:r>
+          </a:p>
+          <a:p>
+            <a:r>
+              <a:rPr lang="en-US" sz="1200" b="1" dirty="0" smtClean="0"/>
+              <a:t>Raspberry PI</a:t>
+            </a:r>
+          </a:p>
+        </p:txBody>
+      </p:sp>
+      <p:pic>
+        <p:nvPicPr>
+          <p:cNvPr id="7" name="Picture 6"/>
+          <p:cNvPicPr>
+            <a:picLocks noChangeAspect="1"/>
+          </p:cNvPicPr>
+          <p:nvPr/>
+        </p:nvPicPr>
+        <p:blipFill>
+          <a:blip r:embed="rId3"/>
+          <a:stretch>
+            <a:fillRect/>
+          </a:stretch>
+        </p:blipFill>
+        <p:spPr>
+          <a:xfrm>
+            <a:off x="5414044" y="3859150"/>
+            <a:ext cx="4147219" cy="2391885"/>
+          </a:xfrm>
+          <a:prstGeom prst="rect">
+            <a:avLst/>
+          </a:prstGeom>
+        </p:spPr>
+      </p:pic>
+      <p:sp>
+        <p:nvSpPr>
+          <p:cNvPr id="11" name="TextBox 10"/>
+          <p:cNvSpPr txBox="1"/>
+          <p:nvPr/>
+        </p:nvSpPr>
+        <p:spPr>
+          <a:xfrm>
+            <a:off x="7924740" y="472438"/>
+            <a:ext cx="1787152" cy="307777"/>
+          </a:xfrm>
+          <a:prstGeom prst="rect">
+            <a:avLst/>
+          </a:prstGeom>
+          <a:noFill/>
+        </p:spPr>
+        <p:txBody>
+          <a:bodyPr wrap="square" rtlCol="0">
+            <a:spAutoFit/>
+          </a:bodyPr>
+          <a:lstStyle/>
+          <a:p>
+            <a:r>
+              <a:rPr lang="en-US" sz="1400" dirty="0" smtClean="0"/>
+              <a:t>HMI computer</a:t>
+            </a:r>
+            <a:endParaRPr lang="en-SG" sz="1400" dirty="0"/>
+          </a:p>
+        </p:txBody>
+      </p:sp>
+      <p:cxnSp>
+        <p:nvCxnSpPr>
+          <p:cNvPr id="13" name="Straight Connector 12"/>
+          <p:cNvCxnSpPr/>
+          <p:nvPr/>
+        </p:nvCxnSpPr>
+        <p:spPr>
+          <a:xfrm>
+            <a:off x="8525754" y="2021305"/>
+            <a:ext cx="0" cy="1331996"/>
+          </a:xfrm>
+          <a:prstGeom prst="line">
+            <a:avLst/>
+          </a:prstGeom>
+          <a:ln w="19050"/>
+        </p:spPr>
+        <p:style>
+          <a:lnRef idx="1">
+            <a:schemeClr val="accent1"/>
+          </a:lnRef>
+          <a:fillRef idx="0">
+            <a:schemeClr val="accent1"/>
+          </a:fillRef>
+          <a:effectRef idx="0">
+            <a:schemeClr val="accent1"/>
+          </a:effectRef>
+          <a:fontRef idx="minor">
+            <a:schemeClr val="tx1"/>
+          </a:fontRef>
+        </p:style>
+      </p:cxnSp>
+      <p:sp>
+        <p:nvSpPr>
+          <p:cNvPr id="14" name="TextBox 13"/>
+          <p:cNvSpPr txBox="1"/>
+          <p:nvPr/>
+        </p:nvSpPr>
+        <p:spPr>
+          <a:xfrm>
+            <a:off x="5341364" y="472437"/>
+            <a:ext cx="2280241" cy="307777"/>
+          </a:xfrm>
+          <a:prstGeom prst="rect">
+            <a:avLst/>
+          </a:prstGeom>
+          <a:noFill/>
+        </p:spPr>
+        <p:txBody>
+          <a:bodyPr wrap="square" rtlCol="0">
+            <a:spAutoFit/>
+          </a:bodyPr>
+          <a:lstStyle/>
+          <a:p>
+            <a:r>
+              <a:rPr lang="en-US" sz="1400" dirty="0" smtClean="0"/>
+              <a:t>Control Center </a:t>
+            </a:r>
+            <a:r>
+              <a:rPr lang="en-US" sz="1400" dirty="0" smtClean="0"/>
+              <a:t>Computer</a:t>
+            </a:r>
+            <a:endParaRPr lang="en-SG" sz="1400" dirty="0"/>
+          </a:p>
+        </p:txBody>
+      </p:sp>
+      <p:cxnSp>
+        <p:nvCxnSpPr>
+          <p:cNvPr id="15" name="Straight Connector 14"/>
+          <p:cNvCxnSpPr/>
+          <p:nvPr/>
+        </p:nvCxnSpPr>
+        <p:spPr>
+          <a:xfrm>
+            <a:off x="6034413" y="2021305"/>
+            <a:ext cx="0" cy="1331996"/>
+          </a:xfrm>
+          <a:prstGeom prst="line">
+            <a:avLst/>
+          </a:prstGeom>
+          <a:ln w="19050"/>
+        </p:spPr>
+        <p:style>
+          <a:lnRef idx="1">
+            <a:schemeClr val="accent1"/>
+          </a:lnRef>
+          <a:fillRef idx="0">
+            <a:schemeClr val="accent1"/>
+          </a:fillRef>
+          <a:effectRef idx="0">
+            <a:schemeClr val="accent1"/>
+          </a:effectRef>
+          <a:fontRef idx="minor">
+            <a:schemeClr val="tx1"/>
+          </a:fontRef>
+        </p:style>
+      </p:cxnSp>
+      <p:cxnSp>
+        <p:nvCxnSpPr>
+          <p:cNvPr id="18" name="Straight Connector 17"/>
+          <p:cNvCxnSpPr/>
+          <p:nvPr/>
+        </p:nvCxnSpPr>
+        <p:spPr>
+          <a:xfrm>
+            <a:off x="8525754" y="2318835"/>
+            <a:ext cx="0" cy="1034466"/>
+          </a:xfrm>
+          <a:prstGeom prst="line">
+            <a:avLst/>
+          </a:prstGeom>
+          <a:ln w="19050"/>
+        </p:spPr>
+        <p:style>
+          <a:lnRef idx="1">
+            <a:schemeClr val="accent1"/>
+          </a:lnRef>
+          <a:fillRef idx="0">
+            <a:schemeClr val="accent1"/>
+          </a:fillRef>
+          <a:effectRef idx="0">
+            <a:schemeClr val="accent1"/>
+          </a:effectRef>
+          <a:fontRef idx="minor">
+            <a:schemeClr val="tx1"/>
+          </a:fontRef>
+        </p:style>
+      </p:cxnSp>
+      <p:cxnSp>
+        <p:nvCxnSpPr>
+          <p:cNvPr id="19" name="Straight Connector 18"/>
+          <p:cNvCxnSpPr>
+            <a:stCxn id="6" idx="3"/>
+          </p:cNvCxnSpPr>
+          <p:nvPr/>
+        </p:nvCxnSpPr>
+        <p:spPr>
+          <a:xfrm flipV="1">
+            <a:off x="4572001" y="4719730"/>
+            <a:ext cx="651982" cy="1"/>
+          </a:xfrm>
+          <a:prstGeom prst="line">
+            <a:avLst/>
+          </a:prstGeom>
+          <a:ln>
+            <a:solidFill>
+              <a:srgbClr val="FF0000"/>
+            </a:solidFill>
+          </a:ln>
+        </p:spPr>
+        <p:style>
+          <a:lnRef idx="3">
+            <a:schemeClr val="accent2"/>
+          </a:lnRef>
+          <a:fillRef idx="0">
+            <a:schemeClr val="accent2"/>
+          </a:fillRef>
+          <a:effectRef idx="2">
+            <a:schemeClr val="accent2"/>
+          </a:effectRef>
+          <a:fontRef idx="minor">
+            <a:schemeClr val="tx1"/>
+          </a:fontRef>
+        </p:style>
+      </p:cxnSp>
+      <p:cxnSp>
+        <p:nvCxnSpPr>
+          <p:cNvPr id="23" name="Elbow Connector 22"/>
+          <p:cNvCxnSpPr>
+            <a:stCxn id="6" idx="3"/>
+          </p:cNvCxnSpPr>
+          <p:nvPr/>
+        </p:nvCxnSpPr>
+        <p:spPr>
+          <a:xfrm flipV="1">
+            <a:off x="4572001" y="2559923"/>
+            <a:ext cx="3691860" cy="2159808"/>
+          </a:xfrm>
+          <a:prstGeom prst="bentConnector3">
+            <a:avLst>
+              <a:gd name="adj1" fmla="val 12978"/>
+            </a:avLst>
+          </a:prstGeom>
+          <a:ln w="19050">
+            <a:solidFill>
+              <a:srgbClr val="FF0000"/>
+            </a:solidFill>
+            <a:tailEnd type="triangle"/>
+          </a:ln>
+        </p:spPr>
+        <p:style>
+          <a:lnRef idx="1">
+            <a:schemeClr val="accent2"/>
+          </a:lnRef>
+          <a:fillRef idx="0">
+            <a:schemeClr val="accent2"/>
+          </a:fillRef>
+          <a:effectRef idx="0">
+            <a:schemeClr val="accent2"/>
+          </a:effectRef>
+          <a:fontRef idx="minor">
+            <a:schemeClr val="tx1"/>
+          </a:fontRef>
+        </p:style>
+      </p:cxnSp>
+      <p:cxnSp>
+        <p:nvCxnSpPr>
+          <p:cNvPr id="26" name="Elbow Connector 25"/>
+          <p:cNvCxnSpPr>
+            <a:stCxn id="33" idx="1"/>
+            <a:endCxn id="6" idx="0"/>
+          </p:cNvCxnSpPr>
+          <p:nvPr/>
+        </p:nvCxnSpPr>
+        <p:spPr>
+          <a:xfrm rot="10800000" flipV="1">
+            <a:off x="3920020" y="1225276"/>
+            <a:ext cx="1082089" cy="3263622"/>
+          </a:xfrm>
+          <a:prstGeom prst="bentConnector2">
+            <a:avLst/>
+          </a:prstGeom>
+          <a:ln>
+            <a:tailEnd type="triangle"/>
+          </a:ln>
+        </p:spPr>
+        <p:style>
+          <a:lnRef idx="1">
+            <a:schemeClr val="accent1"/>
+          </a:lnRef>
+          <a:fillRef idx="0">
+            <a:schemeClr val="accent1"/>
+          </a:fillRef>
+          <a:effectRef idx="0">
+            <a:schemeClr val="accent1"/>
+          </a:effectRef>
+          <a:fontRef idx="minor">
+            <a:schemeClr val="tx1"/>
+          </a:fontRef>
+        </p:style>
+      </p:cxnSp>
+      <p:sp>
+        <p:nvSpPr>
+          <p:cNvPr id="27" name="TextBox 26"/>
+          <p:cNvSpPr txBox="1"/>
+          <p:nvPr/>
+        </p:nvSpPr>
+        <p:spPr>
+          <a:xfrm>
+            <a:off x="4518811" y="4762833"/>
+            <a:ext cx="1099052" cy="461665"/>
+          </a:xfrm>
+          <a:prstGeom prst="rect">
+            <a:avLst/>
+          </a:prstGeom>
+          <a:noFill/>
+        </p:spPr>
+        <p:txBody>
+          <a:bodyPr wrap="square" rtlCol="0">
+            <a:spAutoFit/>
+          </a:bodyPr>
+          <a:lstStyle/>
+          <a:p>
+            <a:r>
+              <a:rPr lang="en-US" sz="1200" dirty="0" smtClean="0"/>
+              <a:t>Turn off PLC output</a:t>
+            </a:r>
+            <a:endParaRPr lang="en-SG" sz="1200" dirty="0"/>
+          </a:p>
+        </p:txBody>
+      </p:sp>
+      <p:sp>
+        <p:nvSpPr>
+          <p:cNvPr id="28" name="TextBox 27"/>
+          <p:cNvSpPr txBox="1"/>
+          <p:nvPr/>
+        </p:nvSpPr>
+        <p:spPr>
+          <a:xfrm>
+            <a:off x="6578991" y="2337905"/>
+            <a:ext cx="1448478" cy="646331"/>
+          </a:xfrm>
+          <a:prstGeom prst="rect">
+            <a:avLst/>
+          </a:prstGeom>
+          <a:noFill/>
+        </p:spPr>
+        <p:txBody>
+          <a:bodyPr wrap="square" rtlCol="0">
+            <a:spAutoFit/>
+          </a:bodyPr>
+          <a:lstStyle/>
+          <a:p>
+            <a:r>
+              <a:rPr lang="en-US" sz="1200" dirty="0" smtClean="0"/>
+              <a:t>Block all the PLC feed back to HMI computer </a:t>
+            </a:r>
+            <a:endParaRPr lang="en-SG" sz="1200" dirty="0"/>
+          </a:p>
+        </p:txBody>
+      </p:sp>
+      <p:sp>
+        <p:nvSpPr>
+          <p:cNvPr id="29" name="Multiply 28"/>
+          <p:cNvSpPr/>
+          <p:nvPr/>
+        </p:nvSpPr>
+        <p:spPr>
+          <a:xfrm>
+            <a:off x="8263861" y="2298729"/>
+            <a:ext cx="519765" cy="522388"/>
+          </a:xfrm>
+          <a:prstGeom prst="mathMultiply">
+            <a:avLst/>
+          </a:prstGeom>
+          <a:noFill/>
+          <a:ln w="19050">
+            <a:solidFill>
+              <a:srgbClr val="FF0000"/>
+            </a:solidFill>
+          </a:ln>
+        </p:spPr>
+        <p:style>
+          <a:lnRef idx="2">
+            <a:schemeClr val="accent1">
+              <a:shade val="50000"/>
+            </a:schemeClr>
+          </a:lnRef>
+          <a:fillRef idx="1">
+            <a:schemeClr val="accent1"/>
+          </a:fillRef>
+          <a:effectRef idx="0">
+            <a:schemeClr val="accent1"/>
+          </a:effectRef>
+          <a:fontRef idx="minor">
+            <a:schemeClr val="lt1"/>
+          </a:fontRef>
+        </p:style>
+        <p:txBody>
+          <a:bodyPr rtlCol="0" anchor="ctr"/>
+          <a:lstStyle/>
+          <a:p>
+            <a:pPr algn="ctr"/>
+            <a:endParaRPr lang="en-SG"/>
+          </a:p>
+        </p:txBody>
+      </p:sp>
+      <p:pic>
+        <p:nvPicPr>
+          <p:cNvPr id="30" name="Picture 29"/>
+          <p:cNvPicPr>
+            <a:picLocks noChangeAspect="1"/>
+          </p:cNvPicPr>
+          <p:nvPr/>
+        </p:nvPicPr>
+        <p:blipFill rotWithShape="1">
+          <a:blip r:embed="rId4" cstate="print">
+            <a:extLst>
+              <a:ext uri="{28A0092B-C50C-407E-A947-70E740481C1C}">
+                <a14:useLocalDpi xmlns:a14="http://schemas.microsoft.com/office/drawing/2010/main" val="0"/>
+              </a:ext>
+            </a:extLst>
+          </a:blip>
+          <a:srcRect l="10749" r="11155"/>
+          <a:stretch/>
+        </p:blipFill>
+        <p:spPr>
+          <a:xfrm>
+            <a:off x="6374276" y="1012359"/>
+            <a:ext cx="372103" cy="464160"/>
+          </a:xfrm>
+          <a:prstGeom prst="rect">
+            <a:avLst/>
+          </a:prstGeom>
+        </p:spPr>
+      </p:pic>
+      <p:sp>
+        <p:nvSpPr>
+          <p:cNvPr id="32" name="TextBox 31"/>
+          <p:cNvSpPr txBox="1"/>
+          <p:nvPr/>
+        </p:nvSpPr>
+        <p:spPr>
+          <a:xfrm>
+            <a:off x="5897845" y="841897"/>
+            <a:ext cx="1324966" cy="461665"/>
+          </a:xfrm>
+          <a:prstGeom prst="rect">
+            <a:avLst/>
+          </a:prstGeom>
+          <a:noFill/>
+        </p:spPr>
+        <p:txBody>
+          <a:bodyPr wrap="square" rtlCol="0">
+            <a:spAutoFit/>
+          </a:bodyPr>
+          <a:lstStyle/>
+          <a:p>
+            <a:r>
+              <a:rPr lang="en-US" sz="1200" dirty="0" smtClean="0">
+                <a:solidFill>
+                  <a:srgbClr val="FF0000"/>
+                </a:solidFill>
+              </a:rPr>
+              <a:t>MS word with macro</a:t>
+            </a:r>
+            <a:endParaRPr lang="en-SG" sz="1200" dirty="0">
+              <a:solidFill>
+                <a:srgbClr val="FF0000"/>
+              </a:solidFill>
+            </a:endParaRPr>
+          </a:p>
+        </p:txBody>
+      </p:sp>
+      <p:sp>
+        <p:nvSpPr>
+          <p:cNvPr id="33" name="Rectangle 32"/>
+          <p:cNvSpPr/>
+          <p:nvPr/>
+        </p:nvSpPr>
+        <p:spPr>
+          <a:xfrm>
+            <a:off x="5002108" y="1137534"/>
+            <a:ext cx="812314" cy="175483"/>
+          </a:xfrm>
+          <a:prstGeom prst="rect">
+            <a:avLst/>
+          </a:prstGeom>
+          <a:ln>
+            <a:headEnd type="none" w="med" len="med"/>
+            <a:tailEnd type="none" w="med" len="med"/>
+          </a:ln>
+        </p:spPr>
+        <p:style>
+          <a:lnRef idx="2">
+            <a:schemeClr val="dk1"/>
+          </a:lnRef>
+          <a:fillRef idx="1">
+            <a:schemeClr val="lt1"/>
+          </a:fillRef>
+          <a:effectRef idx="0">
+            <a:schemeClr val="dk1"/>
+          </a:effectRef>
+          <a:fontRef idx="minor">
+            <a:schemeClr val="dk1"/>
+          </a:fontRef>
+        </p:style>
+        <p:txBody>
+          <a:bodyPr rtlCol="0" anchor="ctr"/>
+          <a:lstStyle/>
+          <a:p>
+            <a:pPr algn="ctr"/>
+            <a:r>
+              <a:rPr lang="en-US" sz="900" b="1" dirty="0" smtClean="0"/>
+              <a:t>Http server</a:t>
+            </a:r>
+            <a:endParaRPr lang="en-SG" sz="900" b="1" dirty="0"/>
+          </a:p>
+        </p:txBody>
+      </p:sp>
+      <p:cxnSp>
+        <p:nvCxnSpPr>
+          <p:cNvPr id="40" name="Straight Arrow Connector 39"/>
+          <p:cNvCxnSpPr/>
+          <p:nvPr/>
+        </p:nvCxnSpPr>
+        <p:spPr>
+          <a:xfrm flipH="1" flipV="1">
+            <a:off x="5814422" y="1225275"/>
+            <a:ext cx="389583" cy="1"/>
+          </a:xfrm>
+          <a:prstGeom prst="straightConnector1">
+            <a:avLst/>
+          </a:prstGeom>
+          <a:ln>
+            <a:tailEnd type="triangle"/>
+          </a:ln>
+        </p:spPr>
+        <p:style>
+          <a:lnRef idx="1">
+            <a:schemeClr val="accent1"/>
+          </a:lnRef>
+          <a:fillRef idx="0">
+            <a:schemeClr val="accent1"/>
+          </a:fillRef>
+          <a:effectRef idx="0">
+            <a:schemeClr val="accent1"/>
+          </a:effectRef>
+          <a:fontRef idx="minor">
+            <a:schemeClr val="tx1"/>
+          </a:fontRef>
+        </p:style>
+      </p:cxnSp>
+      <p:pic>
+        <p:nvPicPr>
+          <p:cNvPr id="49" name="Picture 48"/>
+          <p:cNvPicPr>
+            <a:picLocks noChangeAspect="1"/>
+          </p:cNvPicPr>
+          <p:nvPr/>
+        </p:nvPicPr>
+        <p:blipFill rotWithShape="1">
+          <a:blip r:embed="rId4" cstate="print">
+            <a:extLst>
+              <a:ext uri="{28A0092B-C50C-407E-A947-70E740481C1C}">
+                <a14:useLocalDpi xmlns:a14="http://schemas.microsoft.com/office/drawing/2010/main" val="0"/>
+              </a:ext>
+            </a:extLst>
+          </a:blip>
+          <a:srcRect l="10749" r="11155"/>
+          <a:stretch/>
+        </p:blipFill>
+        <p:spPr>
+          <a:xfrm>
+            <a:off x="4244149" y="1882989"/>
+            <a:ext cx="372103" cy="464160"/>
+          </a:xfrm>
+          <a:prstGeom prst="rect">
+            <a:avLst/>
+          </a:prstGeom>
+        </p:spPr>
+      </p:pic>
+      <p:sp>
+        <p:nvSpPr>
+          <p:cNvPr id="50" name="TextBox 49"/>
+          <p:cNvSpPr txBox="1"/>
+          <p:nvPr/>
+        </p:nvSpPr>
+        <p:spPr>
+          <a:xfrm>
+            <a:off x="4000911" y="2288934"/>
+            <a:ext cx="955474" cy="1015663"/>
+          </a:xfrm>
+          <a:prstGeom prst="rect">
+            <a:avLst/>
+          </a:prstGeom>
+          <a:noFill/>
+        </p:spPr>
+        <p:txBody>
+          <a:bodyPr wrap="square" rtlCol="0">
+            <a:spAutoFit/>
+          </a:bodyPr>
+          <a:lstStyle/>
+          <a:p>
+            <a:r>
+              <a:rPr lang="en-US" sz="1200" dirty="0" smtClean="0">
+                <a:solidFill>
+                  <a:srgbClr val="FF0000"/>
+                </a:solidFill>
+              </a:rPr>
+              <a:t>HTTP link in </a:t>
+            </a:r>
+          </a:p>
+          <a:p>
+            <a:r>
+              <a:rPr lang="en-US" sz="1200" dirty="0" smtClean="0">
+                <a:solidFill>
+                  <a:srgbClr val="FF0000"/>
+                </a:solidFill>
+              </a:rPr>
+              <a:t>PDF, </a:t>
+            </a:r>
+          </a:p>
+          <a:p>
+            <a:r>
+              <a:rPr lang="en-US" sz="1200" dirty="0" smtClean="0">
+                <a:solidFill>
+                  <a:srgbClr val="FF0000"/>
+                </a:solidFill>
+              </a:rPr>
+              <a:t>PPT, Word DOC, excel or webpage. </a:t>
+            </a:r>
+            <a:endParaRPr lang="en-SG" sz="1200" dirty="0">
+              <a:solidFill>
+                <a:srgbClr val="FF0000"/>
+              </a:solidFill>
+            </a:endParaRPr>
+          </a:p>
+        </p:txBody>
+      </p:sp>
+      <p:cxnSp>
+        <p:nvCxnSpPr>
+          <p:cNvPr id="52" name="Elbow Connector 51"/>
+          <p:cNvCxnSpPr>
+            <a:stCxn id="49" idx="3"/>
+            <a:endCxn id="4" idx="1"/>
+          </p:cNvCxnSpPr>
+          <p:nvPr/>
+        </p:nvCxnSpPr>
+        <p:spPr>
+          <a:xfrm flipV="1">
+            <a:off x="4616252" y="1372074"/>
+            <a:ext cx="768595" cy="742995"/>
+          </a:xfrm>
+          <a:prstGeom prst="bentConnector3">
+            <a:avLst>
+              <a:gd name="adj1" fmla="val 98840"/>
+            </a:avLst>
+          </a:prstGeom>
+          <a:ln>
+            <a:tailEnd type="triangle"/>
+          </a:ln>
+        </p:spPr>
+        <p:style>
+          <a:lnRef idx="1">
+            <a:schemeClr val="accent1"/>
+          </a:lnRef>
+          <a:fillRef idx="0">
+            <a:schemeClr val="accent1"/>
+          </a:fillRef>
+          <a:effectRef idx="0">
+            <a:schemeClr val="accent1"/>
+          </a:effectRef>
+          <a:fontRef idx="minor">
+            <a:schemeClr val="tx1"/>
+          </a:fontRef>
+        </p:style>
+      </p:cxnSp>
+      <p:pic>
+        <p:nvPicPr>
+          <p:cNvPr id="55" name="Picture 54"/>
+          <p:cNvPicPr>
+            <a:picLocks noChangeAspect="1"/>
+          </p:cNvPicPr>
+          <p:nvPr/>
+        </p:nvPicPr>
+        <p:blipFill>
+          <a:blip r:embed="rId5"/>
+          <a:stretch>
+            <a:fillRect/>
+          </a:stretch>
+        </p:blipFill>
+        <p:spPr>
+          <a:xfrm>
+            <a:off x="3422990" y="5552557"/>
+            <a:ext cx="994058" cy="976412"/>
+          </a:xfrm>
+          <a:prstGeom prst="rect">
+            <a:avLst/>
+          </a:prstGeom>
+        </p:spPr>
+      </p:pic>
+      <p:sp>
+        <p:nvSpPr>
+          <p:cNvPr id="56" name="TextBox 55"/>
+          <p:cNvSpPr txBox="1"/>
+          <p:nvPr/>
+        </p:nvSpPr>
+        <p:spPr>
+          <a:xfrm>
+            <a:off x="4144648" y="5595659"/>
+            <a:ext cx="1099052" cy="461665"/>
+          </a:xfrm>
+          <a:prstGeom prst="rect">
+            <a:avLst/>
+          </a:prstGeom>
+          <a:noFill/>
+        </p:spPr>
+        <p:txBody>
+          <a:bodyPr wrap="square" rtlCol="0">
+            <a:spAutoFit/>
+          </a:bodyPr>
+          <a:lstStyle/>
+          <a:p>
+            <a:r>
+              <a:rPr lang="en-US" sz="1200" dirty="0" smtClean="0"/>
+              <a:t>Attacker’s computer </a:t>
+            </a:r>
+            <a:endParaRPr lang="en-SG" sz="1200" dirty="0"/>
+          </a:p>
+        </p:txBody>
+      </p:sp>
+      <p:cxnSp>
+        <p:nvCxnSpPr>
+          <p:cNvPr id="58" name="Straight Arrow Connector 57"/>
+          <p:cNvCxnSpPr>
+            <a:stCxn id="55" idx="0"/>
+            <a:endCxn id="6" idx="2"/>
+          </p:cNvCxnSpPr>
+          <p:nvPr/>
+        </p:nvCxnSpPr>
+        <p:spPr>
+          <a:xfrm flipV="1">
+            <a:off x="3920019" y="4950563"/>
+            <a:ext cx="0" cy="601994"/>
+          </a:xfrm>
+          <a:prstGeom prst="straightConnector1">
+            <a:avLst/>
+          </a:prstGeom>
+          <a:ln>
+            <a:tailEnd type="triangle"/>
+          </a:ln>
+        </p:spPr>
+        <p:style>
+          <a:lnRef idx="1">
+            <a:schemeClr val="accent1"/>
+          </a:lnRef>
+          <a:fillRef idx="0">
+            <a:schemeClr val="accent1"/>
+          </a:fillRef>
+          <a:effectRef idx="0">
+            <a:schemeClr val="accent1"/>
+          </a:effectRef>
+          <a:fontRef idx="minor">
+            <a:schemeClr val="tx1"/>
+          </a:fontRef>
+        </p:style>
+      </p:cxnSp>
+    </p:spTree>
+    <p:extLst>
+      <p:ext uri="{BB962C8B-B14F-4D97-AF65-F5344CB8AC3E}">
+        <p14:creationId xmlns:p14="http://schemas.microsoft.com/office/powerpoint/2010/main" val="1441772647"/>
+      </p:ext>
+    </p:extLst>
+  </p:cSld>
+  <p:clrMapOvr>
+    <a:masterClrMapping/>
+  </p:clrMapOvr>
+</p:sld>
+</file>
+
 <file path=ppt/slides/slide3.xml><?xml version="1.0" encoding="utf-8"?>
 <p:sld xmlns:a="http://schemas.openxmlformats.org/drawingml/2006/main" xmlns:r="http://schemas.openxmlformats.org/officeDocument/2006/relationships" xmlns:p="http://schemas.openxmlformats.org/presentationml/2006/main">
   <p:cSld>

</xml_diff>

<commit_message>
Added the railway system attack file deployment diagram.
</commit_message>
<xml_diff>
--- a/doc/firmwaresignWF.pptx
+++ b/doc/firmwaresignWF.pptx
@@ -5,7 +5,7 @@
     <p:sldMasterId id="2147483648" r:id="rId1"/>
   </p:sldMasterIdLst>
   <p:notesMasterIdLst>
-    <p:notesMasterId r:id="rId22"/>
+    <p:notesMasterId r:id="rId23"/>
   </p:notesMasterIdLst>
   <p:sldIdLst>
     <p:sldId id="256" r:id="rId2"/>
@@ -28,6 +28,7 @@
     <p:sldId id="274" r:id="rId19"/>
     <p:sldId id="275" r:id="rId20"/>
     <p:sldId id="276" r:id="rId21"/>
+    <p:sldId id="277" r:id="rId22"/>
   </p:sldIdLst>
   <p:sldSz cx="12192000" cy="6858000"/>
   <p:notesSz cx="6858000" cy="9144000"/>
@@ -151,6 +152,7 @@
             <p14:sldId id="274"/>
             <p14:sldId id="275"/>
             <p14:sldId id="276"/>
+            <p14:sldId id="277"/>
           </p14:sldIdLst>
         </p14:section>
         <p14:section name="Untitled Section" id="{AE9E3D3D-B6E7-4002-83A3-10D822FD789F}">
@@ -247,7 +249,7 @@
           <a:p>
             <a:fld id="{32DA1F5A-E23E-4D9B-B8D0-40D8909182CC}" type="datetimeFigureOut">
               <a:rPr lang="en-SG" smtClean="0"/>
-              <a:t>10/12/2019</a:t>
+              <a:t>7/1/2020</a:t>
             </a:fld>
             <a:endParaRPr lang="en-SG"/>
           </a:p>
@@ -730,7 +732,7 @@
           <a:p>
             <a:fld id="{168FC4C3-6B25-48E2-93F9-24A255A41CA9}" type="datetimeFigureOut">
               <a:rPr lang="en-SG" smtClean="0"/>
-              <a:t>10/12/2019</a:t>
+              <a:t>7/1/2020</a:t>
             </a:fld>
             <a:endParaRPr lang="en-SG"/>
           </a:p>
@@ -900,7 +902,7 @@
           <a:p>
             <a:fld id="{168FC4C3-6B25-48E2-93F9-24A255A41CA9}" type="datetimeFigureOut">
               <a:rPr lang="en-SG" smtClean="0"/>
-              <a:t>10/12/2019</a:t>
+              <a:t>7/1/2020</a:t>
             </a:fld>
             <a:endParaRPr lang="en-SG"/>
           </a:p>
@@ -1080,7 +1082,7 @@
           <a:p>
             <a:fld id="{168FC4C3-6B25-48E2-93F9-24A255A41CA9}" type="datetimeFigureOut">
               <a:rPr lang="en-SG" smtClean="0"/>
-              <a:t>10/12/2019</a:t>
+              <a:t>7/1/2020</a:t>
             </a:fld>
             <a:endParaRPr lang="en-SG"/>
           </a:p>
@@ -1250,7 +1252,7 @@
           <a:p>
             <a:fld id="{168FC4C3-6B25-48E2-93F9-24A255A41CA9}" type="datetimeFigureOut">
               <a:rPr lang="en-SG" smtClean="0"/>
-              <a:t>10/12/2019</a:t>
+              <a:t>7/1/2020</a:t>
             </a:fld>
             <a:endParaRPr lang="en-SG"/>
           </a:p>
@@ -1496,7 +1498,7 @@
           <a:p>
             <a:fld id="{168FC4C3-6B25-48E2-93F9-24A255A41CA9}" type="datetimeFigureOut">
               <a:rPr lang="en-SG" smtClean="0"/>
-              <a:t>10/12/2019</a:t>
+              <a:t>7/1/2020</a:t>
             </a:fld>
             <a:endParaRPr lang="en-SG"/>
           </a:p>
@@ -1728,7 +1730,7 @@
           <a:p>
             <a:fld id="{168FC4C3-6B25-48E2-93F9-24A255A41CA9}" type="datetimeFigureOut">
               <a:rPr lang="en-SG" smtClean="0"/>
-              <a:t>10/12/2019</a:t>
+              <a:t>7/1/2020</a:t>
             </a:fld>
             <a:endParaRPr lang="en-SG"/>
           </a:p>
@@ -2095,7 +2097,7 @@
           <a:p>
             <a:fld id="{168FC4C3-6B25-48E2-93F9-24A255A41CA9}" type="datetimeFigureOut">
               <a:rPr lang="en-SG" smtClean="0"/>
-              <a:t>10/12/2019</a:t>
+              <a:t>7/1/2020</a:t>
             </a:fld>
             <a:endParaRPr lang="en-SG"/>
           </a:p>
@@ -2213,7 +2215,7 @@
           <a:p>
             <a:fld id="{168FC4C3-6B25-48E2-93F9-24A255A41CA9}" type="datetimeFigureOut">
               <a:rPr lang="en-SG" smtClean="0"/>
-              <a:t>10/12/2019</a:t>
+              <a:t>7/1/2020</a:t>
             </a:fld>
             <a:endParaRPr lang="en-SG"/>
           </a:p>
@@ -2308,7 +2310,7 @@
           <a:p>
             <a:fld id="{168FC4C3-6B25-48E2-93F9-24A255A41CA9}" type="datetimeFigureOut">
               <a:rPr lang="en-SG" smtClean="0"/>
-              <a:t>10/12/2019</a:t>
+              <a:t>7/1/2020</a:t>
             </a:fld>
             <a:endParaRPr lang="en-SG"/>
           </a:p>
@@ -2585,7 +2587,7 @@
           <a:p>
             <a:fld id="{168FC4C3-6B25-48E2-93F9-24A255A41CA9}" type="datetimeFigureOut">
               <a:rPr lang="en-SG" smtClean="0"/>
-              <a:t>10/12/2019</a:t>
+              <a:t>7/1/2020</a:t>
             </a:fld>
             <a:endParaRPr lang="en-SG"/>
           </a:p>
@@ -2838,7 +2840,7 @@
           <a:p>
             <a:fld id="{168FC4C3-6B25-48E2-93F9-24A255A41CA9}" type="datetimeFigureOut">
               <a:rPr lang="en-SG" smtClean="0"/>
-              <a:t>10/12/2019</a:t>
+              <a:t>7/1/2020</a:t>
             </a:fld>
             <a:endParaRPr lang="en-SG"/>
           </a:p>
@@ -3051,7 +3053,7 @@
           <a:p>
             <a:fld id="{168FC4C3-6B25-48E2-93F9-24A255A41CA9}" type="datetimeFigureOut">
               <a:rPr lang="en-SG" smtClean="0"/>
-              <a:t>10/12/2019</a:t>
+              <a:t>7/1/2020</a:t>
             </a:fld>
             <a:endParaRPr lang="en-SG"/>
           </a:p>
@@ -26390,7 +26392,7 @@
         </p:blipFill>
         <p:spPr>
           <a:xfrm>
-            <a:off x="7638626" y="480638"/>
+            <a:off x="7665088" y="510539"/>
             <a:ext cx="1808296" cy="1808296"/>
           </a:xfrm>
           <a:prstGeom prst="rect">
@@ -26560,11 +26562,7 @@
           <a:p>
             <a:r>
               <a:rPr lang="en-US" sz="1400" dirty="0" smtClean="0"/>
-              <a:t>Control Center </a:t>
-            </a:r>
-            <a:r>
-              <a:rPr lang="en-US" sz="1400" dirty="0" smtClean="0"/>
-              <a:t>Computer</a:t>
+              <a:t>Control Center Computer</a:t>
             </a:r>
             <a:endParaRPr lang="en-SG" sz="1400" dirty="0"/>
           </a:p>
@@ -27216,6 +27214,1670 @@
     <p:extLst>
       <p:ext uri="{BB962C8B-B14F-4D97-AF65-F5344CB8AC3E}">
         <p14:creationId xmlns:p14="http://schemas.microsoft.com/office/powerpoint/2010/main" val="1441772647"/>
+      </p:ext>
+    </p:extLst>
+  </p:cSld>
+  <p:clrMapOvr>
+    <a:masterClrMapping/>
+  </p:clrMapOvr>
+</p:sld>
+</file>
+
+<file path=ppt/slides/slide21.xml><?xml version="1.0" encoding="utf-8"?>
+<p:sld xmlns:a="http://schemas.openxmlformats.org/drawingml/2006/main" xmlns:r="http://schemas.openxmlformats.org/officeDocument/2006/relationships" xmlns:p="http://schemas.openxmlformats.org/presentationml/2006/main">
+  <p:cSld>
+    <p:spTree>
+      <p:nvGrpSpPr>
+        <p:cNvPr id="1" name=""/>
+        <p:cNvGrpSpPr/>
+        <p:nvPr/>
+      </p:nvGrpSpPr>
+      <p:grpSpPr>
+        <a:xfrm>
+          <a:off x="0" y="0"/>
+          <a:ext cx="0" cy="0"/>
+          <a:chOff x="0" y="0"/>
+          <a:chExt cx="0" cy="0"/>
+        </a:xfrm>
+      </p:grpSpPr>
+      <p:sp>
+        <p:nvSpPr>
+          <p:cNvPr id="4" name="Rectangle 3"/>
+          <p:cNvSpPr/>
+          <p:nvPr/>
+        </p:nvSpPr>
+        <p:spPr>
+          <a:xfrm>
+            <a:off x="3368842" y="1694045"/>
+            <a:ext cx="6477802" cy="4649003"/>
+          </a:xfrm>
+          <a:prstGeom prst="rect">
+            <a:avLst/>
+          </a:prstGeom>
+          <a:noFill/>
+          <a:ln w="19050" cap="flat" cmpd="sng" algn="ctr">
+            <a:solidFill>
+              <a:schemeClr val="dk1"/>
+            </a:solidFill>
+            <a:prstDash val="solid"/>
+            <a:round/>
+            <a:headEnd type="none" w="med" len="med"/>
+            <a:tailEnd type="none" w="med" len="med"/>
+          </a:ln>
+        </p:spPr>
+        <p:style>
+          <a:lnRef idx="0">
+            <a:scrgbClr r="0" g="0" b="0"/>
+          </a:lnRef>
+          <a:fillRef idx="0">
+            <a:scrgbClr r="0" g="0" b="0"/>
+          </a:fillRef>
+          <a:effectRef idx="0">
+            <a:scrgbClr r="0" g="0" b="0"/>
+          </a:effectRef>
+          <a:fontRef idx="minor">
+            <a:schemeClr val="dk1"/>
+          </a:fontRef>
+        </p:style>
+        <p:txBody>
+          <a:bodyPr rtlCol="0" anchor="ctr"/>
+          <a:lstStyle/>
+          <a:p>
+            <a:endParaRPr lang="en-US" dirty="0">
+              <a:ln w="19050">
+                <a:solidFill>
+                  <a:schemeClr val="tx1"/>
+                </a:solidFill>
+              </a:ln>
+              <a:latin typeface="+mj-lt"/>
+            </a:endParaRPr>
+          </a:p>
+        </p:txBody>
+      </p:sp>
+      <p:sp>
+        <p:nvSpPr>
+          <p:cNvPr id="5" name="Rectangle 4"/>
+          <p:cNvSpPr/>
+          <p:nvPr/>
+        </p:nvSpPr>
+        <p:spPr>
+          <a:xfrm>
+            <a:off x="5259309" y="1695026"/>
+            <a:ext cx="2146434" cy="338554"/>
+          </a:xfrm>
+          <a:prstGeom prst="rect">
+            <a:avLst/>
+          </a:prstGeom>
+        </p:spPr>
+        <p:txBody>
+          <a:bodyPr wrap="square">
+            <a:spAutoFit/>
+          </a:bodyPr>
+          <a:lstStyle/>
+          <a:p>
+            <a:r>
+              <a:rPr lang="en-US" sz="1600" dirty="0">
+                <a:ln w="19050">
+                  <a:solidFill>
+                    <a:schemeClr val="tx1"/>
+                  </a:solidFill>
+                </a:ln>
+                <a:latin typeface="+mj-lt"/>
+              </a:rPr>
+              <a:t>OT-PLC-Railway system </a:t>
+            </a:r>
+          </a:p>
+        </p:txBody>
+      </p:sp>
+      <p:pic>
+        <p:nvPicPr>
+          <p:cNvPr id="6" name="Picture 5"/>
+          <p:cNvPicPr>
+            <a:picLocks noChangeAspect="1"/>
+          </p:cNvPicPr>
+          <p:nvPr/>
+        </p:nvPicPr>
+        <p:blipFill>
+          <a:blip r:embed="rId2"/>
+          <a:stretch>
+            <a:fillRect/>
+          </a:stretch>
+        </p:blipFill>
+        <p:spPr>
+          <a:xfrm>
+            <a:off x="3450493" y="4686923"/>
+            <a:ext cx="2571106" cy="1482871"/>
+          </a:xfrm>
+          <a:prstGeom prst="rect">
+            <a:avLst/>
+          </a:prstGeom>
+          <a:ln w="12700">
+            <a:solidFill>
+              <a:schemeClr val="tx1"/>
+            </a:solidFill>
+            <a:prstDash val="dash"/>
+          </a:ln>
+        </p:spPr>
+      </p:pic>
+      <p:sp>
+        <p:nvSpPr>
+          <p:cNvPr id="8" name="AutoShape 2" descr="Image result for plc icon"/>
+          <p:cNvSpPr>
+            <a:spLocks noChangeAspect="1" noChangeArrowheads="1"/>
+          </p:cNvSpPr>
+          <p:nvPr/>
+        </p:nvSpPr>
+        <p:spPr bwMode="auto">
+          <a:xfrm>
+            <a:off x="521334" y="1389244"/>
+            <a:ext cx="1721351" cy="1721357"/>
+          </a:xfrm>
+          <a:prstGeom prst="rect">
+            <a:avLst/>
+          </a:prstGeom>
+          <a:noFill/>
+          <a:extLst>
+            <a:ext uri="{909E8E84-426E-40DD-AFC4-6F175D3DCCD1}">
+              <a14:hiddenFill xmlns:a14="http://schemas.microsoft.com/office/drawing/2010/main">
+                <a:solidFill>
+                  <a:srgbClr val="FFFFFF"/>
+                </a:solidFill>
+              </a14:hiddenFill>
+            </a:ext>
+          </a:extLst>
+        </p:spPr>
+        <p:txBody>
+          <a:bodyPr vert="horz" wrap="square" lIns="91440" tIns="45720" rIns="91440" bIns="45720" numCol="1" anchor="t" anchorCtr="0" compatLnSpc="1">
+            <a:prstTxWarp prst="textNoShape">
+              <a:avLst/>
+            </a:prstTxWarp>
+          </a:bodyPr>
+          <a:lstStyle/>
+          <a:p>
+            <a:endParaRPr lang="en-SG"/>
+          </a:p>
+        </p:txBody>
+      </p:sp>
+      <p:pic>
+        <p:nvPicPr>
+          <p:cNvPr id="10" name="Picture 9"/>
+          <p:cNvPicPr>
+            <a:picLocks noChangeAspect="1"/>
+          </p:cNvPicPr>
+          <p:nvPr/>
+        </p:nvPicPr>
+        <p:blipFill>
+          <a:blip r:embed="rId3" cstate="print">
+            <a:extLst>
+              <a:ext uri="{28A0092B-C50C-407E-A947-70E740481C1C}">
+                <a14:useLocalDpi xmlns:a14="http://schemas.microsoft.com/office/drawing/2010/main" val="0"/>
+              </a:ext>
+            </a:extLst>
+          </a:blip>
+          <a:stretch>
+            <a:fillRect/>
+          </a:stretch>
+        </p:blipFill>
+        <p:spPr>
+          <a:xfrm>
+            <a:off x="3583458" y="4018546"/>
+            <a:ext cx="429323" cy="429323"/>
+          </a:xfrm>
+          <a:prstGeom prst="rect">
+            <a:avLst/>
+          </a:prstGeom>
+        </p:spPr>
+      </p:pic>
+      <p:pic>
+        <p:nvPicPr>
+          <p:cNvPr id="11" name="Picture 10"/>
+          <p:cNvPicPr>
+            <a:picLocks noChangeAspect="1"/>
+          </p:cNvPicPr>
+          <p:nvPr/>
+        </p:nvPicPr>
+        <p:blipFill>
+          <a:blip r:embed="rId3" cstate="print">
+            <a:extLst>
+              <a:ext uri="{28A0092B-C50C-407E-A947-70E740481C1C}">
+                <a14:useLocalDpi xmlns:a14="http://schemas.microsoft.com/office/drawing/2010/main" val="0"/>
+              </a:ext>
+            </a:extLst>
+          </a:blip>
+          <a:stretch>
+            <a:fillRect/>
+          </a:stretch>
+        </p:blipFill>
+        <p:spPr>
+          <a:xfrm>
+            <a:off x="4325634" y="3998715"/>
+            <a:ext cx="429323" cy="429323"/>
+          </a:xfrm>
+          <a:prstGeom prst="rect">
+            <a:avLst/>
+          </a:prstGeom>
+        </p:spPr>
+      </p:pic>
+      <p:pic>
+        <p:nvPicPr>
+          <p:cNvPr id="12" name="Picture 11"/>
+          <p:cNvPicPr>
+            <a:picLocks noChangeAspect="1"/>
+          </p:cNvPicPr>
+          <p:nvPr/>
+        </p:nvPicPr>
+        <p:blipFill>
+          <a:blip r:embed="rId3" cstate="print">
+            <a:extLst>
+              <a:ext uri="{28A0092B-C50C-407E-A947-70E740481C1C}">
+                <a14:useLocalDpi xmlns:a14="http://schemas.microsoft.com/office/drawing/2010/main" val="0"/>
+              </a:ext>
+            </a:extLst>
+          </a:blip>
+          <a:stretch>
+            <a:fillRect/>
+          </a:stretch>
+        </p:blipFill>
+        <p:spPr>
+          <a:xfrm>
+            <a:off x="5099484" y="4018546"/>
+            <a:ext cx="429323" cy="429323"/>
+          </a:xfrm>
+          <a:prstGeom prst="rect">
+            <a:avLst/>
+          </a:prstGeom>
+        </p:spPr>
+      </p:pic>
+      <p:pic>
+        <p:nvPicPr>
+          <p:cNvPr id="13" name="Picture 12"/>
+          <p:cNvPicPr>
+            <a:picLocks noChangeAspect="1"/>
+          </p:cNvPicPr>
+          <p:nvPr/>
+        </p:nvPicPr>
+        <p:blipFill>
+          <a:blip r:embed="rId4" cstate="print">
+            <a:extLst>
+              <a:ext uri="{28A0092B-C50C-407E-A947-70E740481C1C}">
+                <a14:useLocalDpi xmlns:a14="http://schemas.microsoft.com/office/drawing/2010/main" val="0"/>
+              </a:ext>
+            </a:extLst>
+          </a:blip>
+          <a:stretch>
+            <a:fillRect/>
+          </a:stretch>
+        </p:blipFill>
+        <p:spPr>
+          <a:xfrm>
+            <a:off x="3870226" y="2031324"/>
+            <a:ext cx="874733" cy="874733"/>
+          </a:xfrm>
+          <a:prstGeom prst="rect">
+            <a:avLst/>
+          </a:prstGeom>
+        </p:spPr>
+      </p:pic>
+      <p:sp>
+        <p:nvSpPr>
+          <p:cNvPr id="14" name="Rectangle 13"/>
+          <p:cNvSpPr/>
+          <p:nvPr/>
+        </p:nvSpPr>
+        <p:spPr>
+          <a:xfrm>
+            <a:off x="3657144" y="4856200"/>
+            <a:ext cx="1347993" cy="307777"/>
+          </a:xfrm>
+          <a:prstGeom prst="rect">
+            <a:avLst/>
+          </a:prstGeom>
+          <a:solidFill>
+            <a:schemeClr val="bg1"/>
+          </a:solidFill>
+          <a:ln w="19050">
+            <a:solidFill>
+              <a:schemeClr val="tx1"/>
+            </a:solidFill>
+          </a:ln>
+        </p:spPr>
+        <p:txBody>
+          <a:bodyPr wrap="square">
+            <a:spAutoFit/>
+          </a:bodyPr>
+          <a:lstStyle/>
+          <a:p>
+            <a:r>
+              <a:rPr lang="en-US" sz="1400" dirty="0" smtClean="0">
+                <a:ln w="19050">
+                  <a:solidFill>
+                    <a:schemeClr val="tx1"/>
+                  </a:solidFill>
+                </a:ln>
+                <a:latin typeface="+mj-lt"/>
+              </a:rPr>
+              <a:t>Railway module</a:t>
+            </a:r>
+            <a:endParaRPr lang="en-US" sz="1400" dirty="0">
+              <a:ln w="19050">
+                <a:solidFill>
+                  <a:schemeClr val="tx1"/>
+                </a:solidFill>
+              </a:ln>
+              <a:latin typeface="+mj-lt"/>
+            </a:endParaRPr>
+          </a:p>
+        </p:txBody>
+      </p:sp>
+      <p:cxnSp>
+        <p:nvCxnSpPr>
+          <p:cNvPr id="16" name="Straight Connector 15"/>
+          <p:cNvCxnSpPr>
+            <a:stCxn id="10" idx="2"/>
+          </p:cNvCxnSpPr>
+          <p:nvPr/>
+        </p:nvCxnSpPr>
+        <p:spPr>
+          <a:xfrm flipH="1">
+            <a:off x="3798119" y="4447869"/>
+            <a:ext cx="1" cy="239054"/>
+          </a:xfrm>
+          <a:prstGeom prst="line">
+            <a:avLst/>
+          </a:prstGeom>
+          <a:ln w="19050"/>
+        </p:spPr>
+        <p:style>
+          <a:lnRef idx="1">
+            <a:schemeClr val="accent1"/>
+          </a:lnRef>
+          <a:fillRef idx="0">
+            <a:schemeClr val="accent1"/>
+          </a:fillRef>
+          <a:effectRef idx="0">
+            <a:schemeClr val="accent1"/>
+          </a:effectRef>
+          <a:fontRef idx="minor">
+            <a:schemeClr val="tx1"/>
+          </a:fontRef>
+        </p:style>
+      </p:cxnSp>
+      <p:cxnSp>
+        <p:nvCxnSpPr>
+          <p:cNvPr id="17" name="Straight Connector 16"/>
+          <p:cNvCxnSpPr/>
+          <p:nvPr/>
+        </p:nvCxnSpPr>
+        <p:spPr>
+          <a:xfrm flipH="1">
+            <a:off x="4553111" y="4437953"/>
+            <a:ext cx="1" cy="239054"/>
+          </a:xfrm>
+          <a:prstGeom prst="line">
+            <a:avLst/>
+          </a:prstGeom>
+          <a:ln w="19050"/>
+        </p:spPr>
+        <p:style>
+          <a:lnRef idx="1">
+            <a:schemeClr val="accent1"/>
+          </a:lnRef>
+          <a:fillRef idx="0">
+            <a:schemeClr val="accent1"/>
+          </a:fillRef>
+          <a:effectRef idx="0">
+            <a:schemeClr val="accent1"/>
+          </a:effectRef>
+          <a:fontRef idx="minor">
+            <a:schemeClr val="tx1"/>
+          </a:fontRef>
+        </p:style>
+      </p:cxnSp>
+      <p:cxnSp>
+        <p:nvCxnSpPr>
+          <p:cNvPr id="18" name="Straight Connector 17"/>
+          <p:cNvCxnSpPr/>
+          <p:nvPr/>
+        </p:nvCxnSpPr>
+        <p:spPr>
+          <a:xfrm flipH="1">
+            <a:off x="5308103" y="4467700"/>
+            <a:ext cx="1" cy="239054"/>
+          </a:xfrm>
+          <a:prstGeom prst="line">
+            <a:avLst/>
+          </a:prstGeom>
+          <a:ln w="19050"/>
+        </p:spPr>
+        <p:style>
+          <a:lnRef idx="1">
+            <a:schemeClr val="accent1"/>
+          </a:lnRef>
+          <a:fillRef idx="0">
+            <a:schemeClr val="accent1"/>
+          </a:fillRef>
+          <a:effectRef idx="0">
+            <a:schemeClr val="accent1"/>
+          </a:effectRef>
+          <a:fontRef idx="minor">
+            <a:schemeClr val="tx1"/>
+          </a:fontRef>
+        </p:style>
+      </p:cxnSp>
+      <p:sp>
+        <p:nvSpPr>
+          <p:cNvPr id="20" name="Rectangle 19"/>
+          <p:cNvSpPr/>
+          <p:nvPr/>
+        </p:nvSpPr>
+        <p:spPr>
+          <a:xfrm>
+            <a:off x="3977438" y="2813790"/>
+            <a:ext cx="690984" cy="307777"/>
+          </a:xfrm>
+          <a:prstGeom prst="rect">
+            <a:avLst/>
+          </a:prstGeom>
+          <a:noFill/>
+          <a:ln w="19050">
+            <a:noFill/>
+          </a:ln>
+        </p:spPr>
+        <p:txBody>
+          <a:bodyPr wrap="square">
+            <a:spAutoFit/>
+          </a:bodyPr>
+          <a:lstStyle/>
+          <a:p>
+            <a:r>
+              <a:rPr lang="en-US" sz="1400" dirty="0" smtClean="0">
+                <a:ln w="19050">
+                  <a:solidFill>
+                    <a:schemeClr val="tx1"/>
+                  </a:solidFill>
+                </a:ln>
+                <a:latin typeface="+mj-lt"/>
+              </a:rPr>
+              <a:t>Router</a:t>
+            </a:r>
+            <a:endParaRPr lang="en-US" sz="1400" dirty="0">
+              <a:ln w="19050">
+                <a:solidFill>
+                  <a:schemeClr val="tx1"/>
+                </a:solidFill>
+              </a:ln>
+              <a:latin typeface="+mj-lt"/>
+            </a:endParaRPr>
+          </a:p>
+        </p:txBody>
+      </p:sp>
+      <p:pic>
+        <p:nvPicPr>
+          <p:cNvPr id="21" name="Picture 20"/>
+          <p:cNvPicPr>
+            <a:picLocks noChangeAspect="1"/>
+          </p:cNvPicPr>
+          <p:nvPr/>
+        </p:nvPicPr>
+        <p:blipFill>
+          <a:blip r:embed="rId5" cstate="print">
+            <a:extLst>
+              <a:ext uri="{28A0092B-C50C-407E-A947-70E740481C1C}">
+                <a14:useLocalDpi xmlns:a14="http://schemas.microsoft.com/office/drawing/2010/main" val="0"/>
+              </a:ext>
+            </a:extLst>
+          </a:blip>
+          <a:stretch>
+            <a:fillRect/>
+          </a:stretch>
+        </p:blipFill>
+        <p:spPr>
+          <a:xfrm>
+            <a:off x="5761715" y="2910970"/>
+            <a:ext cx="691880" cy="691880"/>
+          </a:xfrm>
+          <a:prstGeom prst="rect">
+            <a:avLst/>
+          </a:prstGeom>
+        </p:spPr>
+      </p:pic>
+      <p:cxnSp>
+        <p:nvCxnSpPr>
+          <p:cNvPr id="25" name="Elbow Connector 24"/>
+          <p:cNvCxnSpPr>
+            <a:stCxn id="10" idx="0"/>
+          </p:cNvCxnSpPr>
+          <p:nvPr/>
+        </p:nvCxnSpPr>
+        <p:spPr>
+          <a:xfrm rot="5400000" flipH="1" flipV="1">
+            <a:off x="4386350" y="2652004"/>
+            <a:ext cx="778312" cy="1954773"/>
+          </a:xfrm>
+          <a:prstGeom prst="bentConnector2">
+            <a:avLst/>
+          </a:prstGeom>
+          <a:ln w="19050"/>
+        </p:spPr>
+        <p:style>
+          <a:lnRef idx="1">
+            <a:schemeClr val="accent5"/>
+          </a:lnRef>
+          <a:fillRef idx="0">
+            <a:schemeClr val="accent5"/>
+          </a:fillRef>
+          <a:effectRef idx="0">
+            <a:schemeClr val="accent5"/>
+          </a:effectRef>
+          <a:fontRef idx="minor">
+            <a:schemeClr val="tx1"/>
+          </a:fontRef>
+        </p:style>
+      </p:cxnSp>
+      <p:cxnSp>
+        <p:nvCxnSpPr>
+          <p:cNvPr id="26" name="Straight Connector 25"/>
+          <p:cNvCxnSpPr/>
+          <p:nvPr/>
+        </p:nvCxnSpPr>
+        <p:spPr>
+          <a:xfrm>
+            <a:off x="4553111" y="3240234"/>
+            <a:ext cx="2" cy="742023"/>
+          </a:xfrm>
+          <a:prstGeom prst="line">
+            <a:avLst/>
+          </a:prstGeom>
+          <a:ln w="19050"/>
+        </p:spPr>
+        <p:style>
+          <a:lnRef idx="1">
+            <a:schemeClr val="accent1"/>
+          </a:lnRef>
+          <a:fillRef idx="0">
+            <a:schemeClr val="accent1"/>
+          </a:fillRef>
+          <a:effectRef idx="0">
+            <a:schemeClr val="accent1"/>
+          </a:effectRef>
+          <a:fontRef idx="minor">
+            <a:schemeClr val="tx1"/>
+          </a:fontRef>
+        </p:style>
+      </p:cxnSp>
+      <p:sp>
+        <p:nvSpPr>
+          <p:cNvPr id="29" name="Rectangle 28"/>
+          <p:cNvSpPr/>
+          <p:nvPr/>
+        </p:nvSpPr>
+        <p:spPr>
+          <a:xfrm>
+            <a:off x="5467700" y="3471715"/>
+            <a:ext cx="1374821" cy="307777"/>
+          </a:xfrm>
+          <a:prstGeom prst="rect">
+            <a:avLst/>
+          </a:prstGeom>
+          <a:noFill/>
+          <a:ln w="19050">
+            <a:noFill/>
+          </a:ln>
+        </p:spPr>
+        <p:txBody>
+          <a:bodyPr wrap="square">
+            <a:spAutoFit/>
+          </a:bodyPr>
+          <a:lstStyle/>
+          <a:p>
+            <a:r>
+              <a:rPr lang="en-US" sz="1400" dirty="0" smtClean="0">
+                <a:ln w="19050">
+                  <a:solidFill>
+                    <a:schemeClr val="tx1"/>
+                  </a:solidFill>
+                </a:ln>
+                <a:latin typeface="+mj-lt"/>
+              </a:rPr>
+              <a:t>Network Switch</a:t>
+            </a:r>
+            <a:endParaRPr lang="en-US" sz="1400" dirty="0">
+              <a:ln w="19050">
+                <a:solidFill>
+                  <a:schemeClr val="tx1"/>
+                </a:solidFill>
+              </a:ln>
+              <a:latin typeface="+mj-lt"/>
+            </a:endParaRPr>
+          </a:p>
+        </p:txBody>
+      </p:sp>
+      <p:cxnSp>
+        <p:nvCxnSpPr>
+          <p:cNvPr id="35" name="Straight Connector 34"/>
+          <p:cNvCxnSpPr>
+            <a:endCxn id="12" idx="0"/>
+          </p:cNvCxnSpPr>
+          <p:nvPr/>
+        </p:nvCxnSpPr>
+        <p:spPr>
+          <a:xfrm flipH="1">
+            <a:off x="5314146" y="3240234"/>
+            <a:ext cx="0" cy="778312"/>
+          </a:xfrm>
+          <a:prstGeom prst="line">
+            <a:avLst/>
+          </a:prstGeom>
+          <a:ln w="19050"/>
+        </p:spPr>
+        <p:style>
+          <a:lnRef idx="1">
+            <a:schemeClr val="accent1"/>
+          </a:lnRef>
+          <a:fillRef idx="0">
+            <a:schemeClr val="accent1"/>
+          </a:fillRef>
+          <a:effectRef idx="0">
+            <a:schemeClr val="accent1"/>
+          </a:effectRef>
+          <a:fontRef idx="minor">
+            <a:schemeClr val="tx1"/>
+          </a:fontRef>
+        </p:style>
+      </p:cxnSp>
+      <p:pic>
+        <p:nvPicPr>
+          <p:cNvPr id="39" name="Picture 38"/>
+          <p:cNvPicPr>
+            <a:picLocks noChangeAspect="1"/>
+          </p:cNvPicPr>
+          <p:nvPr/>
+        </p:nvPicPr>
+        <p:blipFill>
+          <a:blip r:embed="rId6" cstate="print">
+            <a:extLst>
+              <a:ext uri="{28A0092B-C50C-407E-A947-70E740481C1C}">
+                <a14:useLocalDpi xmlns:a14="http://schemas.microsoft.com/office/drawing/2010/main" val="0"/>
+              </a:ext>
+            </a:extLst>
+          </a:blip>
+          <a:stretch>
+            <a:fillRect/>
+          </a:stretch>
+        </p:blipFill>
+        <p:spPr>
+          <a:xfrm>
+            <a:off x="7355196" y="1898136"/>
+            <a:ext cx="613999" cy="613999"/>
+          </a:xfrm>
+          <a:prstGeom prst="rect">
+            <a:avLst/>
+          </a:prstGeom>
+        </p:spPr>
+      </p:pic>
+      <p:cxnSp>
+        <p:nvCxnSpPr>
+          <p:cNvPr id="41" name="Elbow Connector 40"/>
+          <p:cNvCxnSpPr>
+            <a:stCxn id="39" idx="1"/>
+            <a:endCxn id="21" idx="3"/>
+          </p:cNvCxnSpPr>
+          <p:nvPr/>
+        </p:nvCxnSpPr>
+        <p:spPr>
+          <a:xfrm rot="10800000" flipV="1">
+            <a:off x="6453596" y="2205136"/>
+            <a:ext cx="901601" cy="1051774"/>
+          </a:xfrm>
+          <a:prstGeom prst="bentConnector3">
+            <a:avLst>
+              <a:gd name="adj1" fmla="val 50000"/>
+            </a:avLst>
+          </a:prstGeom>
+          <a:ln w="19050"/>
+        </p:spPr>
+        <p:style>
+          <a:lnRef idx="2">
+            <a:schemeClr val="accent2"/>
+          </a:lnRef>
+          <a:fillRef idx="0">
+            <a:schemeClr val="accent2"/>
+          </a:fillRef>
+          <a:effectRef idx="1">
+            <a:schemeClr val="accent2"/>
+          </a:effectRef>
+          <a:fontRef idx="minor">
+            <a:schemeClr val="tx1"/>
+          </a:fontRef>
+        </p:style>
+      </p:cxnSp>
+      <p:cxnSp>
+        <p:nvCxnSpPr>
+          <p:cNvPr id="46" name="Elbow Connector 45"/>
+          <p:cNvCxnSpPr>
+            <a:stCxn id="21" idx="0"/>
+            <a:endCxn id="13" idx="3"/>
+          </p:cNvCxnSpPr>
+          <p:nvPr/>
+        </p:nvCxnSpPr>
+        <p:spPr>
+          <a:xfrm rot="16200000" flipV="1">
+            <a:off x="5205168" y="2008483"/>
+            <a:ext cx="442279" cy="1362696"/>
+          </a:xfrm>
+          <a:prstGeom prst="bentConnector2">
+            <a:avLst/>
+          </a:prstGeom>
+          <a:ln w="19050"/>
+        </p:spPr>
+        <p:style>
+          <a:lnRef idx="1">
+            <a:schemeClr val="accent1"/>
+          </a:lnRef>
+          <a:fillRef idx="0">
+            <a:schemeClr val="accent1"/>
+          </a:fillRef>
+          <a:effectRef idx="0">
+            <a:schemeClr val="accent1"/>
+          </a:effectRef>
+          <a:fontRef idx="minor">
+            <a:schemeClr val="tx1"/>
+          </a:fontRef>
+        </p:style>
+      </p:cxnSp>
+      <p:pic>
+        <p:nvPicPr>
+          <p:cNvPr id="47" name="Picture 46"/>
+          <p:cNvPicPr>
+            <a:picLocks noChangeAspect="1"/>
+          </p:cNvPicPr>
+          <p:nvPr/>
+        </p:nvPicPr>
+        <p:blipFill>
+          <a:blip r:embed="rId7" cstate="print">
+            <a:extLst>
+              <a:ext uri="{28A0092B-C50C-407E-A947-70E740481C1C}">
+                <a14:useLocalDpi xmlns:a14="http://schemas.microsoft.com/office/drawing/2010/main" val="0"/>
+              </a:ext>
+            </a:extLst>
+          </a:blip>
+          <a:stretch>
+            <a:fillRect/>
+          </a:stretch>
+        </p:blipFill>
+        <p:spPr>
+          <a:xfrm>
+            <a:off x="7245330" y="3011277"/>
+            <a:ext cx="799286" cy="799286"/>
+          </a:xfrm>
+          <a:prstGeom prst="rect">
+            <a:avLst/>
+          </a:prstGeom>
+        </p:spPr>
+      </p:pic>
+      <p:sp>
+        <p:nvSpPr>
+          <p:cNvPr id="49" name="TextBox 48"/>
+          <p:cNvSpPr txBox="1"/>
+          <p:nvPr/>
+        </p:nvSpPr>
+        <p:spPr>
+          <a:xfrm>
+            <a:off x="7924740" y="1885165"/>
+            <a:ext cx="1787152" cy="646331"/>
+          </a:xfrm>
+          <a:prstGeom prst="rect">
+            <a:avLst/>
+          </a:prstGeom>
+          <a:noFill/>
+        </p:spPr>
+        <p:txBody>
+          <a:bodyPr wrap="square" rtlCol="0">
+            <a:spAutoFit/>
+          </a:bodyPr>
+          <a:lstStyle/>
+          <a:p>
+            <a:r>
+              <a:rPr lang="en-US" sz="1200" b="1" dirty="0" smtClean="0"/>
+              <a:t>-&gt; 192.168.10.244</a:t>
+            </a:r>
+          </a:p>
+          <a:p>
+            <a:r>
+              <a:rPr lang="en-US" sz="1200" b="1" dirty="0" smtClean="0"/>
+              <a:t>-&gt; Ettercap</a:t>
+            </a:r>
+          </a:p>
+          <a:p>
+            <a:r>
+              <a:rPr lang="en-US" sz="1200" b="1" dirty="0" smtClean="0"/>
+              <a:t>-&gt; attackServ.py</a:t>
+            </a:r>
+            <a:endParaRPr lang="en-SG" sz="1200" b="1" dirty="0"/>
+          </a:p>
+        </p:txBody>
+      </p:sp>
+      <p:sp>
+        <p:nvSpPr>
+          <p:cNvPr id="51" name="Rectangle 50"/>
+          <p:cNvSpPr/>
+          <p:nvPr/>
+        </p:nvSpPr>
+        <p:spPr>
+          <a:xfrm>
+            <a:off x="7098484" y="2508853"/>
+            <a:ext cx="1165379" cy="307777"/>
+          </a:xfrm>
+          <a:prstGeom prst="rect">
+            <a:avLst/>
+          </a:prstGeom>
+          <a:noFill/>
+          <a:ln w="19050">
+            <a:noFill/>
+          </a:ln>
+        </p:spPr>
+        <p:txBody>
+          <a:bodyPr wrap="square">
+            <a:spAutoFit/>
+          </a:bodyPr>
+          <a:lstStyle/>
+          <a:p>
+            <a:r>
+              <a:rPr lang="en-US" sz="1400" dirty="0" smtClean="0">
+                <a:ln w="19050">
+                  <a:solidFill>
+                    <a:schemeClr val="tx1"/>
+                  </a:solidFill>
+                </a:ln>
+                <a:latin typeface="+mj-lt"/>
+              </a:rPr>
+              <a:t>Attack device </a:t>
+            </a:r>
+            <a:endParaRPr lang="en-US" sz="1400" dirty="0">
+              <a:ln w="19050">
+                <a:solidFill>
+                  <a:schemeClr val="tx1"/>
+                </a:solidFill>
+              </a:ln>
+              <a:latin typeface="+mj-lt"/>
+            </a:endParaRPr>
+          </a:p>
+        </p:txBody>
+      </p:sp>
+      <p:sp>
+        <p:nvSpPr>
+          <p:cNvPr id="53" name="TextBox 52"/>
+          <p:cNvSpPr txBox="1"/>
+          <p:nvPr/>
+        </p:nvSpPr>
+        <p:spPr>
+          <a:xfrm>
+            <a:off x="7963014" y="3133921"/>
+            <a:ext cx="1787152" cy="461665"/>
+          </a:xfrm>
+          <a:prstGeom prst="rect">
+            <a:avLst/>
+          </a:prstGeom>
+          <a:noFill/>
+        </p:spPr>
+        <p:txBody>
+          <a:bodyPr wrap="square" rtlCol="0">
+            <a:spAutoFit/>
+          </a:bodyPr>
+          <a:lstStyle/>
+          <a:p>
+            <a:r>
+              <a:rPr lang="en-US" sz="1200" b="1" dirty="0" smtClean="0"/>
+              <a:t>-&gt; 192.168.10.21</a:t>
+            </a:r>
+          </a:p>
+          <a:p>
+            <a:r>
+              <a:rPr lang="en-US" sz="1200" b="1" dirty="0" smtClean="0"/>
+              <a:t>-&gt; Wonder-ware(R) HMI</a:t>
+            </a:r>
+            <a:endParaRPr lang="en-US" sz="1200" b="1" dirty="0" smtClean="0"/>
+          </a:p>
+        </p:txBody>
+      </p:sp>
+      <p:cxnSp>
+        <p:nvCxnSpPr>
+          <p:cNvPr id="55" name="Straight Connector 54"/>
+          <p:cNvCxnSpPr>
+            <a:stCxn id="47" idx="1"/>
+          </p:cNvCxnSpPr>
+          <p:nvPr/>
+        </p:nvCxnSpPr>
+        <p:spPr>
+          <a:xfrm flipH="1">
+            <a:off x="6470578" y="3410920"/>
+            <a:ext cx="774752" cy="0"/>
+          </a:xfrm>
+          <a:prstGeom prst="line">
+            <a:avLst/>
+          </a:prstGeom>
+          <a:ln w="19050"/>
+        </p:spPr>
+        <p:style>
+          <a:lnRef idx="1">
+            <a:schemeClr val="accent1"/>
+          </a:lnRef>
+          <a:fillRef idx="0">
+            <a:schemeClr val="accent1"/>
+          </a:fillRef>
+          <a:effectRef idx="0">
+            <a:schemeClr val="accent1"/>
+          </a:effectRef>
+          <a:fontRef idx="minor">
+            <a:schemeClr val="tx1"/>
+          </a:fontRef>
+        </p:style>
+      </p:cxnSp>
+      <p:sp>
+        <p:nvSpPr>
+          <p:cNvPr id="43" name="Rectangle 42"/>
+          <p:cNvSpPr/>
+          <p:nvPr/>
+        </p:nvSpPr>
+        <p:spPr>
+          <a:xfrm>
+            <a:off x="7187935" y="3687072"/>
+            <a:ext cx="948519" cy="307777"/>
+          </a:xfrm>
+          <a:prstGeom prst="rect">
+            <a:avLst/>
+          </a:prstGeom>
+          <a:noFill/>
+          <a:ln w="19050">
+            <a:noFill/>
+          </a:ln>
+        </p:spPr>
+        <p:txBody>
+          <a:bodyPr wrap="square">
+            <a:spAutoFit/>
+          </a:bodyPr>
+          <a:lstStyle/>
+          <a:p>
+            <a:r>
+              <a:rPr lang="en-US" sz="1400" dirty="0" smtClean="0">
+                <a:ln w="19050">
+                  <a:solidFill>
+                    <a:schemeClr val="tx1"/>
+                  </a:solidFill>
+                </a:ln>
+                <a:latin typeface="+mj-lt"/>
+              </a:rPr>
+              <a:t>SCADA PC</a:t>
+            </a:r>
+            <a:endParaRPr lang="en-US" sz="1400" dirty="0">
+              <a:ln w="19050">
+                <a:solidFill>
+                  <a:schemeClr val="tx1"/>
+                </a:solidFill>
+              </a:ln>
+              <a:latin typeface="+mj-lt"/>
+            </a:endParaRPr>
+          </a:p>
+        </p:txBody>
+      </p:sp>
+      <p:sp>
+        <p:nvSpPr>
+          <p:cNvPr id="60" name="TextBox 59"/>
+          <p:cNvSpPr txBox="1"/>
+          <p:nvPr/>
+        </p:nvSpPr>
+        <p:spPr>
+          <a:xfrm>
+            <a:off x="4701311" y="2506320"/>
+            <a:ext cx="1168029" cy="276999"/>
+          </a:xfrm>
+          <a:prstGeom prst="rect">
+            <a:avLst/>
+          </a:prstGeom>
+          <a:noFill/>
+        </p:spPr>
+        <p:txBody>
+          <a:bodyPr wrap="square" rtlCol="0">
+            <a:spAutoFit/>
+          </a:bodyPr>
+          <a:lstStyle/>
+          <a:p>
+            <a:r>
+              <a:rPr lang="en-US" sz="1200" b="1" dirty="0" smtClean="0"/>
+              <a:t>-&gt; 192.168.10.1</a:t>
+            </a:r>
+          </a:p>
+        </p:txBody>
+      </p:sp>
+      <p:pic>
+        <p:nvPicPr>
+          <p:cNvPr id="61" name="Picture 60"/>
+          <p:cNvPicPr>
+            <a:picLocks noChangeAspect="1"/>
+          </p:cNvPicPr>
+          <p:nvPr/>
+        </p:nvPicPr>
+        <p:blipFill>
+          <a:blip r:embed="rId7" cstate="print">
+            <a:extLst>
+              <a:ext uri="{28A0092B-C50C-407E-A947-70E740481C1C}">
+                <a14:useLocalDpi xmlns:a14="http://schemas.microsoft.com/office/drawing/2010/main" val="0"/>
+              </a:ext>
+            </a:extLst>
+          </a:blip>
+          <a:stretch>
+            <a:fillRect/>
+          </a:stretch>
+        </p:blipFill>
+        <p:spPr>
+          <a:xfrm>
+            <a:off x="7279877" y="4230092"/>
+            <a:ext cx="799286" cy="799286"/>
+          </a:xfrm>
+          <a:prstGeom prst="rect">
+            <a:avLst/>
+          </a:prstGeom>
+        </p:spPr>
+      </p:pic>
+      <p:sp>
+        <p:nvSpPr>
+          <p:cNvPr id="62" name="Rectangle 61"/>
+          <p:cNvSpPr/>
+          <p:nvPr/>
+        </p:nvSpPr>
+        <p:spPr>
+          <a:xfrm>
+            <a:off x="7187935" y="4918319"/>
+            <a:ext cx="1165308" cy="307777"/>
+          </a:xfrm>
+          <a:prstGeom prst="rect">
+            <a:avLst/>
+          </a:prstGeom>
+          <a:noFill/>
+          <a:ln w="19050">
+            <a:noFill/>
+          </a:ln>
+        </p:spPr>
+        <p:txBody>
+          <a:bodyPr wrap="square">
+            <a:spAutoFit/>
+          </a:bodyPr>
+          <a:lstStyle/>
+          <a:p>
+            <a:r>
+              <a:rPr lang="en-US" sz="1400" dirty="0" smtClean="0">
+                <a:ln w="19050">
+                  <a:solidFill>
+                    <a:schemeClr val="tx1"/>
+                  </a:solidFill>
+                </a:ln>
+                <a:latin typeface="+mj-lt"/>
+              </a:rPr>
+              <a:t>Technical  PC</a:t>
+            </a:r>
+            <a:endParaRPr lang="en-US" sz="1400" dirty="0">
+              <a:ln w="19050">
+                <a:solidFill>
+                  <a:schemeClr val="tx1"/>
+                </a:solidFill>
+              </a:ln>
+              <a:latin typeface="+mj-lt"/>
+            </a:endParaRPr>
+          </a:p>
+        </p:txBody>
+      </p:sp>
+      <p:sp>
+        <p:nvSpPr>
+          <p:cNvPr id="63" name="TextBox 62"/>
+          <p:cNvSpPr txBox="1"/>
+          <p:nvPr/>
+        </p:nvSpPr>
+        <p:spPr>
+          <a:xfrm>
+            <a:off x="3858043" y="4352724"/>
+            <a:ext cx="1609657" cy="276999"/>
+          </a:xfrm>
+          <a:prstGeom prst="rect">
+            <a:avLst/>
+          </a:prstGeom>
+          <a:noFill/>
+        </p:spPr>
+        <p:txBody>
+          <a:bodyPr wrap="square" rtlCol="0">
+            <a:spAutoFit/>
+          </a:bodyPr>
+          <a:lstStyle/>
+          <a:p>
+            <a:r>
+              <a:rPr lang="en-US" sz="1200" b="1" dirty="0" smtClean="0"/>
+              <a:t>-&gt; 192.168.10.71~73</a:t>
+            </a:r>
+          </a:p>
+        </p:txBody>
+      </p:sp>
+      <p:sp>
+        <p:nvSpPr>
+          <p:cNvPr id="64" name="TextBox 63"/>
+          <p:cNvSpPr txBox="1"/>
+          <p:nvPr/>
+        </p:nvSpPr>
+        <p:spPr>
+          <a:xfrm>
+            <a:off x="8005653" y="4262348"/>
+            <a:ext cx="2172802" cy="646331"/>
+          </a:xfrm>
+          <a:prstGeom prst="rect">
+            <a:avLst/>
+          </a:prstGeom>
+          <a:noFill/>
+        </p:spPr>
+        <p:txBody>
+          <a:bodyPr wrap="square" rtlCol="0">
+            <a:spAutoFit/>
+          </a:bodyPr>
+          <a:lstStyle/>
+          <a:p>
+            <a:r>
+              <a:rPr lang="en-US" sz="1200" b="1" dirty="0" smtClean="0"/>
+              <a:t>-&gt; 192.168.10.251</a:t>
+            </a:r>
+          </a:p>
+          <a:p>
+            <a:r>
+              <a:rPr lang="en-US" sz="1200" b="1" dirty="0" smtClean="0"/>
+              <a:t>-&gt; </a:t>
+            </a:r>
+            <a:r>
+              <a:rPr lang="en-SG" sz="1200" b="1" dirty="0" smtClean="0"/>
+              <a:t>operation </a:t>
+            </a:r>
+            <a:r>
+              <a:rPr lang="en-SG" sz="1200" b="1" dirty="0"/>
+              <a:t>manual.docm</a:t>
+            </a:r>
+            <a:endParaRPr lang="en-US" sz="1200" b="1" dirty="0" smtClean="0"/>
+          </a:p>
+          <a:p>
+            <a:r>
+              <a:rPr lang="en-US" sz="1200" b="1" dirty="0" smtClean="0"/>
+              <a:t>-&gt; </a:t>
+            </a:r>
+            <a:r>
+              <a:rPr lang="en-SG" sz="1200" b="1" dirty="0" smtClean="0"/>
+              <a:t>attackhost.py</a:t>
+            </a:r>
+            <a:endParaRPr lang="en-US" sz="1200" b="1" dirty="0" smtClean="0"/>
+          </a:p>
+        </p:txBody>
+      </p:sp>
+      <p:cxnSp>
+        <p:nvCxnSpPr>
+          <p:cNvPr id="66" name="Elbow Connector 65"/>
+          <p:cNvCxnSpPr>
+            <a:stCxn id="61" idx="1"/>
+            <a:endCxn id="29" idx="2"/>
+          </p:cNvCxnSpPr>
+          <p:nvPr/>
+        </p:nvCxnSpPr>
+        <p:spPr>
+          <a:xfrm rot="10800000">
+            <a:off x="6155111" y="3779493"/>
+            <a:ext cx="1124766" cy="850243"/>
+          </a:xfrm>
+          <a:prstGeom prst="bentConnector2">
+            <a:avLst/>
+          </a:prstGeom>
+          <a:ln w="19050"/>
+        </p:spPr>
+        <p:style>
+          <a:lnRef idx="1">
+            <a:schemeClr val="accent5"/>
+          </a:lnRef>
+          <a:fillRef idx="0">
+            <a:schemeClr val="accent5"/>
+          </a:fillRef>
+          <a:effectRef idx="0">
+            <a:schemeClr val="accent5"/>
+          </a:effectRef>
+          <a:fontRef idx="minor">
+            <a:schemeClr val="tx1"/>
+          </a:fontRef>
+        </p:style>
+      </p:cxnSp>
+      <p:cxnSp>
+        <p:nvCxnSpPr>
+          <p:cNvPr id="72" name="Elbow Connector 71"/>
+          <p:cNvCxnSpPr>
+            <a:stCxn id="74" idx="1"/>
+          </p:cNvCxnSpPr>
+          <p:nvPr/>
+        </p:nvCxnSpPr>
+        <p:spPr>
+          <a:xfrm rot="10800000">
+            <a:off x="6155111" y="4629723"/>
+            <a:ext cx="1120658" cy="1021442"/>
+          </a:xfrm>
+          <a:prstGeom prst="bentConnector3">
+            <a:avLst>
+              <a:gd name="adj1" fmla="val 100675"/>
+            </a:avLst>
+          </a:prstGeom>
+          <a:ln w="19050"/>
+        </p:spPr>
+        <p:style>
+          <a:lnRef idx="1">
+            <a:schemeClr val="accent1"/>
+          </a:lnRef>
+          <a:fillRef idx="0">
+            <a:schemeClr val="accent1"/>
+          </a:fillRef>
+          <a:effectRef idx="0">
+            <a:schemeClr val="accent1"/>
+          </a:effectRef>
+          <a:fontRef idx="minor">
+            <a:schemeClr val="tx1"/>
+          </a:fontRef>
+        </p:style>
+      </p:cxnSp>
+      <p:pic>
+        <p:nvPicPr>
+          <p:cNvPr id="74" name="Picture 73"/>
+          <p:cNvPicPr>
+            <a:picLocks noChangeAspect="1"/>
+          </p:cNvPicPr>
+          <p:nvPr/>
+        </p:nvPicPr>
+        <p:blipFill>
+          <a:blip r:embed="rId7" cstate="print">
+            <a:extLst>
+              <a:ext uri="{28A0092B-C50C-407E-A947-70E740481C1C}">
+                <a14:useLocalDpi xmlns:a14="http://schemas.microsoft.com/office/drawing/2010/main" val="0"/>
+              </a:ext>
+            </a:extLst>
+          </a:blip>
+          <a:stretch>
+            <a:fillRect/>
+          </a:stretch>
+        </p:blipFill>
+        <p:spPr>
+          <a:xfrm>
+            <a:off x="7275769" y="5251522"/>
+            <a:ext cx="799286" cy="799286"/>
+          </a:xfrm>
+          <a:prstGeom prst="rect">
+            <a:avLst/>
+          </a:prstGeom>
+        </p:spPr>
+      </p:pic>
+      <p:sp>
+        <p:nvSpPr>
+          <p:cNvPr id="79" name="Rectangle 78"/>
+          <p:cNvSpPr/>
+          <p:nvPr/>
+        </p:nvSpPr>
+        <p:spPr>
+          <a:xfrm>
+            <a:off x="6842521" y="5973219"/>
+            <a:ext cx="1454399" cy="307777"/>
+          </a:xfrm>
+          <a:prstGeom prst="rect">
+            <a:avLst/>
+          </a:prstGeom>
+          <a:noFill/>
+          <a:ln w="19050">
+            <a:noFill/>
+          </a:ln>
+        </p:spPr>
+        <p:txBody>
+          <a:bodyPr wrap="square">
+            <a:spAutoFit/>
+          </a:bodyPr>
+          <a:lstStyle/>
+          <a:p>
+            <a:r>
+              <a:rPr lang="en-US" sz="1400" dirty="0" smtClean="0">
+                <a:ln w="19050">
+                  <a:solidFill>
+                    <a:schemeClr val="tx1"/>
+                  </a:solidFill>
+                </a:ln>
+                <a:latin typeface="+mj-lt"/>
+              </a:rPr>
+              <a:t>Other user’s  PC</a:t>
+            </a:r>
+            <a:endParaRPr lang="en-US" sz="1400" dirty="0">
+              <a:ln w="19050">
+                <a:solidFill>
+                  <a:schemeClr val="tx1"/>
+                </a:solidFill>
+              </a:ln>
+              <a:latin typeface="+mj-lt"/>
+            </a:endParaRPr>
+          </a:p>
+        </p:txBody>
+      </p:sp>
+      <p:sp>
+        <p:nvSpPr>
+          <p:cNvPr id="80" name="TextBox 79"/>
+          <p:cNvSpPr txBox="1"/>
+          <p:nvPr/>
+        </p:nvSpPr>
+        <p:spPr>
+          <a:xfrm>
+            <a:off x="8031441" y="5342526"/>
+            <a:ext cx="2172802" cy="646331"/>
+          </a:xfrm>
+          <a:prstGeom prst="rect">
+            <a:avLst/>
+          </a:prstGeom>
+          <a:noFill/>
+        </p:spPr>
+        <p:txBody>
+          <a:bodyPr wrap="square" rtlCol="0">
+            <a:spAutoFit/>
+          </a:bodyPr>
+          <a:lstStyle/>
+          <a:p>
+            <a:r>
+              <a:rPr lang="en-US" sz="1200" b="1" dirty="0" smtClean="0"/>
+              <a:t>-&gt; 192.168.10.1XX</a:t>
+            </a:r>
+          </a:p>
+          <a:p>
+            <a:r>
+              <a:rPr lang="en-US" sz="1200" b="1" dirty="0" smtClean="0"/>
+              <a:t>-&gt; </a:t>
+            </a:r>
+            <a:r>
+              <a:rPr lang="en-SG" sz="1200" b="1" dirty="0" smtClean="0"/>
+              <a:t>operation </a:t>
+            </a:r>
+            <a:r>
+              <a:rPr lang="en-SG" sz="1200" b="1" dirty="0"/>
+              <a:t>manual.docm</a:t>
+            </a:r>
+            <a:endParaRPr lang="en-US" sz="1200" b="1" dirty="0" smtClean="0"/>
+          </a:p>
+          <a:p>
+            <a:r>
+              <a:rPr lang="en-US" sz="1200" b="1" dirty="0" smtClean="0"/>
+              <a:t>-&gt; </a:t>
+            </a:r>
+            <a:r>
+              <a:rPr lang="en-SG" sz="1200" b="1" dirty="0" smtClean="0"/>
+              <a:t>attackhost.py (optional)</a:t>
+            </a:r>
+            <a:endParaRPr lang="en-US" sz="1200" b="1" dirty="0" smtClean="0"/>
+          </a:p>
+        </p:txBody>
+      </p:sp>
+      <p:pic>
+        <p:nvPicPr>
+          <p:cNvPr id="81" name="Picture 80"/>
+          <p:cNvPicPr>
+            <a:picLocks noChangeAspect="1"/>
+          </p:cNvPicPr>
+          <p:nvPr/>
+        </p:nvPicPr>
+        <p:blipFill>
+          <a:blip r:embed="rId8"/>
+          <a:stretch>
+            <a:fillRect/>
+          </a:stretch>
+        </p:blipFill>
+        <p:spPr>
+          <a:xfrm>
+            <a:off x="5467700" y="590963"/>
+            <a:ext cx="779220" cy="765388"/>
+          </a:xfrm>
+          <a:prstGeom prst="rect">
+            <a:avLst/>
+          </a:prstGeom>
+        </p:spPr>
+      </p:pic>
+      <p:sp>
+        <p:nvSpPr>
+          <p:cNvPr id="82" name="Cloud 81"/>
+          <p:cNvSpPr/>
+          <p:nvPr/>
+        </p:nvSpPr>
+        <p:spPr>
+          <a:xfrm>
+            <a:off x="3546527" y="688228"/>
+            <a:ext cx="1537838" cy="702742"/>
+          </a:xfrm>
+          <a:prstGeom prst="cloud">
+            <a:avLst/>
+          </a:prstGeom>
+          <a:ln w="19050">
+            <a:prstDash val="sysDash"/>
+          </a:ln>
+        </p:spPr>
+        <p:style>
+          <a:lnRef idx="2">
+            <a:schemeClr val="dk1"/>
+          </a:lnRef>
+          <a:fillRef idx="1">
+            <a:schemeClr val="lt1"/>
+          </a:fillRef>
+          <a:effectRef idx="0">
+            <a:schemeClr val="dk1"/>
+          </a:effectRef>
+          <a:fontRef idx="minor">
+            <a:schemeClr val="dk1"/>
+          </a:fontRef>
+        </p:style>
+        <p:txBody>
+          <a:bodyPr rtlCol="0" anchor="ctr"/>
+          <a:lstStyle/>
+          <a:p>
+            <a:pPr algn="ctr"/>
+            <a:endParaRPr lang="en-SG"/>
+          </a:p>
+        </p:txBody>
+      </p:sp>
+      <p:sp>
+        <p:nvSpPr>
+          <p:cNvPr id="83" name="Rectangle 82"/>
+          <p:cNvSpPr/>
+          <p:nvPr/>
+        </p:nvSpPr>
+        <p:spPr>
+          <a:xfrm>
+            <a:off x="5331171" y="1322014"/>
+            <a:ext cx="1396888" cy="307777"/>
+          </a:xfrm>
+          <a:prstGeom prst="rect">
+            <a:avLst/>
+          </a:prstGeom>
+          <a:noFill/>
+          <a:ln w="19050">
+            <a:noFill/>
+          </a:ln>
+        </p:spPr>
+        <p:txBody>
+          <a:bodyPr wrap="square">
+            <a:spAutoFit/>
+          </a:bodyPr>
+          <a:lstStyle/>
+          <a:p>
+            <a:r>
+              <a:rPr lang="en-US" sz="1400" dirty="0" smtClean="0">
+                <a:ln w="19050">
+                  <a:solidFill>
+                    <a:schemeClr val="tx1"/>
+                  </a:solidFill>
+                </a:ln>
+                <a:latin typeface="+mj-lt"/>
+              </a:rPr>
+              <a:t>Attacker PC/Host</a:t>
+            </a:r>
+            <a:endParaRPr lang="en-US" sz="1400" dirty="0">
+              <a:ln w="19050">
+                <a:solidFill>
+                  <a:schemeClr val="tx1"/>
+                </a:solidFill>
+              </a:ln>
+              <a:latin typeface="+mj-lt"/>
+            </a:endParaRPr>
+          </a:p>
+        </p:txBody>
+      </p:sp>
+      <p:sp>
+        <p:nvSpPr>
+          <p:cNvPr id="85" name="Rectangle 84"/>
+          <p:cNvSpPr/>
+          <p:nvPr/>
+        </p:nvSpPr>
+        <p:spPr>
+          <a:xfrm>
+            <a:off x="4002126" y="825524"/>
+            <a:ext cx="1076337" cy="307777"/>
+          </a:xfrm>
+          <a:prstGeom prst="rect">
+            <a:avLst/>
+          </a:prstGeom>
+          <a:noFill/>
+          <a:ln w="19050">
+            <a:noFill/>
+          </a:ln>
+        </p:spPr>
+        <p:txBody>
+          <a:bodyPr wrap="square">
+            <a:spAutoFit/>
+          </a:bodyPr>
+          <a:lstStyle/>
+          <a:p>
+            <a:r>
+              <a:rPr lang="en-US" sz="1400" dirty="0" smtClean="0">
+                <a:ln w="19050">
+                  <a:solidFill>
+                    <a:schemeClr val="tx1"/>
+                  </a:solidFill>
+                </a:ln>
+                <a:latin typeface="+mj-lt"/>
+              </a:rPr>
+              <a:t>Internet</a:t>
+            </a:r>
+            <a:endParaRPr lang="en-US" sz="1400" dirty="0">
+              <a:ln w="19050">
+                <a:solidFill>
+                  <a:schemeClr val="tx1"/>
+                </a:solidFill>
+              </a:ln>
+              <a:latin typeface="+mj-lt"/>
+            </a:endParaRPr>
+          </a:p>
+        </p:txBody>
+      </p:sp>
+      <p:cxnSp>
+        <p:nvCxnSpPr>
+          <p:cNvPr id="86" name="Straight Connector 85"/>
+          <p:cNvCxnSpPr>
+            <a:stCxn id="82" idx="1"/>
+            <a:endCxn id="13" idx="0"/>
+          </p:cNvCxnSpPr>
+          <p:nvPr/>
+        </p:nvCxnSpPr>
+        <p:spPr>
+          <a:xfrm flipH="1">
+            <a:off x="4307593" y="1390222"/>
+            <a:ext cx="7853" cy="641102"/>
+          </a:xfrm>
+          <a:prstGeom prst="line">
+            <a:avLst/>
+          </a:prstGeom>
+          <a:ln w="19050"/>
+        </p:spPr>
+        <p:style>
+          <a:lnRef idx="1">
+            <a:schemeClr val="accent1"/>
+          </a:lnRef>
+          <a:fillRef idx="0">
+            <a:schemeClr val="accent1"/>
+          </a:fillRef>
+          <a:effectRef idx="0">
+            <a:schemeClr val="accent1"/>
+          </a:effectRef>
+          <a:fontRef idx="minor">
+            <a:schemeClr val="tx1"/>
+          </a:fontRef>
+        </p:style>
+      </p:cxnSp>
+      <p:cxnSp>
+        <p:nvCxnSpPr>
+          <p:cNvPr id="90" name="Straight Connector 89"/>
+          <p:cNvCxnSpPr>
+            <a:stCxn id="85" idx="3"/>
+            <a:endCxn id="81" idx="1"/>
+          </p:cNvCxnSpPr>
+          <p:nvPr/>
+        </p:nvCxnSpPr>
+        <p:spPr>
+          <a:xfrm flipV="1">
+            <a:off x="5078463" y="973657"/>
+            <a:ext cx="389237" cy="5756"/>
+          </a:xfrm>
+          <a:prstGeom prst="line">
+            <a:avLst/>
+          </a:prstGeom>
+          <a:ln w="19050"/>
+        </p:spPr>
+        <p:style>
+          <a:lnRef idx="1">
+            <a:schemeClr val="accent1"/>
+          </a:lnRef>
+          <a:fillRef idx="0">
+            <a:schemeClr val="accent1"/>
+          </a:fillRef>
+          <a:effectRef idx="0">
+            <a:schemeClr val="accent1"/>
+          </a:effectRef>
+          <a:fontRef idx="minor">
+            <a:schemeClr val="tx1"/>
+          </a:fontRef>
+        </p:style>
+      </p:cxnSp>
+      <p:sp>
+        <p:nvSpPr>
+          <p:cNvPr id="95" name="TextBox 94"/>
+          <p:cNvSpPr txBox="1"/>
+          <p:nvPr/>
+        </p:nvSpPr>
+        <p:spPr>
+          <a:xfrm>
+            <a:off x="6186633" y="681440"/>
+            <a:ext cx="2318016" cy="461665"/>
+          </a:xfrm>
+          <a:prstGeom prst="rect">
+            <a:avLst/>
+          </a:prstGeom>
+          <a:noFill/>
+        </p:spPr>
+        <p:txBody>
+          <a:bodyPr wrap="square" rtlCol="0">
+            <a:spAutoFit/>
+          </a:bodyPr>
+          <a:lstStyle/>
+          <a:p>
+            <a:r>
+              <a:rPr lang="en-US" sz="1200" b="1" dirty="0" smtClean="0"/>
+              <a:t>-&gt; 192.168.10.252(local mode)</a:t>
+            </a:r>
+          </a:p>
+          <a:p>
+            <a:r>
+              <a:rPr lang="en-US" sz="1200" b="1" dirty="0" smtClean="0"/>
+              <a:t>-&gt; attackHost.py</a:t>
+            </a:r>
+            <a:endParaRPr lang="en-SG" sz="1200" b="1" dirty="0"/>
+          </a:p>
+        </p:txBody>
+      </p:sp>
+    </p:spTree>
+    <p:extLst>
+      <p:ext uri="{BB962C8B-B14F-4D97-AF65-F5344CB8AC3E}">
+        <p14:creationId xmlns:p14="http://schemas.microsoft.com/office/powerpoint/2010/main" val="1517767570"/>
       </p:ext>
     </p:extLst>
   </p:cSld>

</xml_diff>

<commit_message>
Added the generator simulator program flow.
</commit_message>
<xml_diff>
--- a/doc/firmwaresignWF.pptx
+++ b/doc/firmwaresignWF.pptx
@@ -5,7 +5,7 @@
     <p:sldMasterId id="2147483648" r:id="rId1"/>
   </p:sldMasterIdLst>
   <p:notesMasterIdLst>
-    <p:notesMasterId r:id="rId23"/>
+    <p:notesMasterId r:id="rId24"/>
   </p:notesMasterIdLst>
   <p:sldIdLst>
     <p:sldId id="256" r:id="rId2"/>
@@ -29,6 +29,7 @@
     <p:sldId id="275" r:id="rId20"/>
     <p:sldId id="276" r:id="rId21"/>
     <p:sldId id="277" r:id="rId22"/>
+    <p:sldId id="278" r:id="rId23"/>
   </p:sldIdLst>
   <p:sldSz cx="12192000" cy="6858000"/>
   <p:notesSz cx="6858000" cy="9144000"/>
@@ -153,6 +154,7 @@
             <p14:sldId id="275"/>
             <p14:sldId id="276"/>
             <p14:sldId id="277"/>
+            <p14:sldId id="278"/>
           </p14:sldIdLst>
         </p14:section>
         <p14:section name="Untitled Section" id="{AE9E3D3D-B6E7-4002-83A3-10D822FD789F}">
@@ -249,7 +251,7 @@
           <a:p>
             <a:fld id="{32DA1F5A-E23E-4D9B-B8D0-40D8909182CC}" type="datetimeFigureOut">
               <a:rPr lang="en-SG" smtClean="0"/>
-              <a:t>7/1/2020</a:t>
+              <a:t>24/2/2020</a:t>
             </a:fld>
             <a:endParaRPr lang="en-SG"/>
           </a:p>
@@ -732,7 +734,7 @@
           <a:p>
             <a:fld id="{168FC4C3-6B25-48E2-93F9-24A255A41CA9}" type="datetimeFigureOut">
               <a:rPr lang="en-SG" smtClean="0"/>
-              <a:t>7/1/2020</a:t>
+              <a:t>24/2/2020</a:t>
             </a:fld>
             <a:endParaRPr lang="en-SG"/>
           </a:p>
@@ -902,7 +904,7 @@
           <a:p>
             <a:fld id="{168FC4C3-6B25-48E2-93F9-24A255A41CA9}" type="datetimeFigureOut">
               <a:rPr lang="en-SG" smtClean="0"/>
-              <a:t>7/1/2020</a:t>
+              <a:t>24/2/2020</a:t>
             </a:fld>
             <a:endParaRPr lang="en-SG"/>
           </a:p>
@@ -1082,7 +1084,7 @@
           <a:p>
             <a:fld id="{168FC4C3-6B25-48E2-93F9-24A255A41CA9}" type="datetimeFigureOut">
               <a:rPr lang="en-SG" smtClean="0"/>
-              <a:t>7/1/2020</a:t>
+              <a:t>24/2/2020</a:t>
             </a:fld>
             <a:endParaRPr lang="en-SG"/>
           </a:p>
@@ -1252,7 +1254,7 @@
           <a:p>
             <a:fld id="{168FC4C3-6B25-48E2-93F9-24A255A41CA9}" type="datetimeFigureOut">
               <a:rPr lang="en-SG" smtClean="0"/>
-              <a:t>7/1/2020</a:t>
+              <a:t>24/2/2020</a:t>
             </a:fld>
             <a:endParaRPr lang="en-SG"/>
           </a:p>
@@ -1498,7 +1500,7 @@
           <a:p>
             <a:fld id="{168FC4C3-6B25-48E2-93F9-24A255A41CA9}" type="datetimeFigureOut">
               <a:rPr lang="en-SG" smtClean="0"/>
-              <a:t>7/1/2020</a:t>
+              <a:t>24/2/2020</a:t>
             </a:fld>
             <a:endParaRPr lang="en-SG"/>
           </a:p>
@@ -1730,7 +1732,7 @@
           <a:p>
             <a:fld id="{168FC4C3-6B25-48E2-93F9-24A255A41CA9}" type="datetimeFigureOut">
               <a:rPr lang="en-SG" smtClean="0"/>
-              <a:t>7/1/2020</a:t>
+              <a:t>24/2/2020</a:t>
             </a:fld>
             <a:endParaRPr lang="en-SG"/>
           </a:p>
@@ -2097,7 +2099,7 @@
           <a:p>
             <a:fld id="{168FC4C3-6B25-48E2-93F9-24A255A41CA9}" type="datetimeFigureOut">
               <a:rPr lang="en-SG" smtClean="0"/>
-              <a:t>7/1/2020</a:t>
+              <a:t>24/2/2020</a:t>
             </a:fld>
             <a:endParaRPr lang="en-SG"/>
           </a:p>
@@ -2215,7 +2217,7 @@
           <a:p>
             <a:fld id="{168FC4C3-6B25-48E2-93F9-24A255A41CA9}" type="datetimeFigureOut">
               <a:rPr lang="en-SG" smtClean="0"/>
-              <a:t>7/1/2020</a:t>
+              <a:t>24/2/2020</a:t>
             </a:fld>
             <a:endParaRPr lang="en-SG"/>
           </a:p>
@@ -2310,7 +2312,7 @@
           <a:p>
             <a:fld id="{168FC4C3-6B25-48E2-93F9-24A255A41CA9}" type="datetimeFigureOut">
               <a:rPr lang="en-SG" smtClean="0"/>
-              <a:t>7/1/2020</a:t>
+              <a:t>24/2/2020</a:t>
             </a:fld>
             <a:endParaRPr lang="en-SG"/>
           </a:p>
@@ -2587,7 +2589,7 @@
           <a:p>
             <a:fld id="{168FC4C3-6B25-48E2-93F9-24A255A41CA9}" type="datetimeFigureOut">
               <a:rPr lang="en-SG" smtClean="0"/>
-              <a:t>7/1/2020</a:t>
+              <a:t>24/2/2020</a:t>
             </a:fld>
             <a:endParaRPr lang="en-SG"/>
           </a:p>
@@ -2840,7 +2842,7 @@
           <a:p>
             <a:fld id="{168FC4C3-6B25-48E2-93F9-24A255A41CA9}" type="datetimeFigureOut">
               <a:rPr lang="en-SG" smtClean="0"/>
-              <a:t>7/1/2020</a:t>
+              <a:t>24/2/2020</a:t>
             </a:fld>
             <a:endParaRPr lang="en-SG"/>
           </a:p>
@@ -3053,7 +3055,7 @@
           <a:p>
             <a:fld id="{168FC4C3-6B25-48E2-93F9-24A255A41CA9}" type="datetimeFigureOut">
               <a:rPr lang="en-SG" smtClean="0"/>
-              <a:t>7/1/2020</a:t>
+              <a:t>24/2/2020</a:t>
             </a:fld>
             <a:endParaRPr lang="en-SG"/>
           </a:p>
@@ -28136,7 +28138,6 @@
               <a:rPr lang="en-US" sz="1200" b="1" dirty="0" smtClean="0"/>
               <a:t>-&gt; Training HMI</a:t>
             </a:r>
-            <a:endParaRPr lang="en-US" sz="1200" b="1" dirty="0" smtClean="0"/>
           </a:p>
         </p:txBody>
       </p:sp>
@@ -28878,6 +28879,1750 @@
     <p:extLst>
       <p:ext uri="{BB962C8B-B14F-4D97-AF65-F5344CB8AC3E}">
         <p14:creationId xmlns:p14="http://schemas.microsoft.com/office/powerpoint/2010/main" val="1517767570"/>
+      </p:ext>
+    </p:extLst>
+  </p:cSld>
+  <p:clrMapOvr>
+    <a:masterClrMapping/>
+  </p:clrMapOvr>
+</p:sld>
+</file>
+
+<file path=ppt/slides/slide22.xml><?xml version="1.0" encoding="utf-8"?>
+<p:sld xmlns:a="http://schemas.openxmlformats.org/drawingml/2006/main" xmlns:r="http://schemas.openxmlformats.org/officeDocument/2006/relationships" xmlns:p="http://schemas.openxmlformats.org/presentationml/2006/main">
+  <p:cSld>
+    <p:spTree>
+      <p:nvGrpSpPr>
+        <p:cNvPr id="1" name=""/>
+        <p:cNvGrpSpPr/>
+        <p:nvPr/>
+      </p:nvGrpSpPr>
+      <p:grpSpPr>
+        <a:xfrm>
+          <a:off x="0" y="0"/>
+          <a:ext cx="0" cy="0"/>
+          <a:chOff x="0" y="0"/>
+          <a:chExt cx="0" cy="0"/>
+        </a:xfrm>
+      </p:grpSpPr>
+      <p:sp>
+        <p:nvSpPr>
+          <p:cNvPr id="4" name="TextBox 3"/>
+          <p:cNvSpPr txBox="1"/>
+          <p:nvPr/>
+        </p:nvSpPr>
+        <p:spPr>
+          <a:xfrm>
+            <a:off x="2546833" y="1210820"/>
+            <a:ext cx="1582403" cy="707886"/>
+          </a:xfrm>
+          <a:prstGeom prst="rect">
+            <a:avLst/>
+          </a:prstGeom>
+          <a:ln w="19050">
+            <a:solidFill>
+              <a:schemeClr val="tx1"/>
+            </a:solidFill>
+          </a:ln>
+        </p:spPr>
+        <p:style>
+          <a:lnRef idx="2">
+            <a:schemeClr val="accent1"/>
+          </a:lnRef>
+          <a:fillRef idx="1">
+            <a:schemeClr val="lt1"/>
+          </a:fillRef>
+          <a:effectRef idx="0">
+            <a:schemeClr val="accent1"/>
+          </a:effectRef>
+          <a:fontRef idx="minor">
+            <a:schemeClr val="dk1"/>
+          </a:fontRef>
+        </p:style>
+        <p:txBody>
+          <a:bodyPr wrap="square" rtlCol="0">
+            <a:spAutoFit/>
+          </a:bodyPr>
+          <a:lstStyle/>
+          <a:p>
+            <a:r>
+              <a:rPr lang="en-US" sz="1000" dirty="0" smtClean="0"/>
+              <a:t>Program start</a:t>
+            </a:r>
+          </a:p>
+          <a:p>
+            <a:r>
+              <a:rPr lang="en-US" sz="1000" dirty="0" smtClean="0"/>
+              <a:t>Load Setting : no Load</a:t>
+            </a:r>
+          </a:p>
+          <a:p>
+            <a:r>
+              <a:rPr lang="en-US" sz="1000" dirty="0" smtClean="0"/>
+              <a:t>Moto speed : 50</a:t>
+            </a:r>
+          </a:p>
+          <a:p>
+            <a:r>
+              <a:rPr lang="en-US" sz="1000" dirty="0" smtClean="0"/>
+              <a:t>Pump speed : Idle, </a:t>
+            </a:r>
+            <a:r>
+              <a:rPr lang="en-US" sz="1000" dirty="0" err="1" smtClean="0"/>
+              <a:t>val</a:t>
+            </a:r>
+            <a:r>
+              <a:rPr lang="en-US" sz="1000" dirty="0" smtClean="0"/>
+              <a:t> =0</a:t>
+            </a:r>
+            <a:endParaRPr lang="en-US" sz="1000" dirty="0"/>
+          </a:p>
+        </p:txBody>
+      </p:sp>
+      <p:cxnSp>
+        <p:nvCxnSpPr>
+          <p:cNvPr id="6" name="Straight Arrow Connector 5"/>
+          <p:cNvCxnSpPr>
+            <a:stCxn id="4" idx="2"/>
+          </p:cNvCxnSpPr>
+          <p:nvPr/>
+        </p:nvCxnSpPr>
+        <p:spPr>
+          <a:xfrm flipH="1">
+            <a:off x="3338034" y="1918706"/>
+            <a:ext cx="1" cy="631989"/>
+          </a:xfrm>
+          <a:prstGeom prst="straightConnector1">
+            <a:avLst/>
+          </a:prstGeom>
+          <a:ln>
+            <a:tailEnd type="triangle"/>
+          </a:ln>
+        </p:spPr>
+        <p:style>
+          <a:lnRef idx="1">
+            <a:schemeClr val="dk1"/>
+          </a:lnRef>
+          <a:fillRef idx="0">
+            <a:schemeClr val="dk1"/>
+          </a:fillRef>
+          <a:effectRef idx="0">
+            <a:schemeClr val="dk1"/>
+          </a:effectRef>
+          <a:fontRef idx="minor">
+            <a:schemeClr val="tx1"/>
+          </a:fontRef>
+        </p:style>
+      </p:cxnSp>
+      <p:sp>
+        <p:nvSpPr>
+          <p:cNvPr id="7" name="TextBox 6"/>
+          <p:cNvSpPr txBox="1"/>
+          <p:nvPr/>
+        </p:nvSpPr>
+        <p:spPr>
+          <a:xfrm>
+            <a:off x="4939689" y="2781527"/>
+            <a:ext cx="4406442" cy="1323439"/>
+          </a:xfrm>
+          <a:prstGeom prst="rect">
+            <a:avLst/>
+          </a:prstGeom>
+          <a:ln w="19050">
+            <a:solidFill>
+              <a:schemeClr val="tx1"/>
+            </a:solidFill>
+          </a:ln>
+        </p:spPr>
+        <p:style>
+          <a:lnRef idx="2">
+            <a:schemeClr val="accent1"/>
+          </a:lnRef>
+          <a:fillRef idx="1">
+            <a:schemeClr val="lt1"/>
+          </a:fillRef>
+          <a:effectRef idx="0">
+            <a:schemeClr val="accent1"/>
+          </a:effectRef>
+          <a:fontRef idx="minor">
+            <a:schemeClr val="dk1"/>
+          </a:fontRef>
+        </p:style>
+        <p:txBody>
+          <a:bodyPr wrap="square" rtlCol="0">
+            <a:spAutoFit/>
+          </a:bodyPr>
+          <a:lstStyle/>
+          <a:p>
+            <a:r>
+              <a:rPr lang="en-US" sz="1000" dirty="0" smtClean="0"/>
+              <a:t>Increase load</a:t>
+            </a:r>
+          </a:p>
+          <a:p>
+            <a:r>
+              <a:rPr lang="en-US" sz="1000" dirty="0" smtClean="0"/>
+              <a:t>Load Change : </a:t>
+            </a:r>
+            <a:r>
+              <a:rPr lang="en-US" sz="1000" dirty="0"/>
+              <a:t>Increase</a:t>
+            </a:r>
+            <a:r>
+              <a:rPr lang="en-US" sz="1000" dirty="0" smtClean="0"/>
+              <a:t> from 1  to  </a:t>
+            </a:r>
+            <a:r>
+              <a:rPr lang="en-US" sz="1000" dirty="0"/>
+              <a:t>3</a:t>
+            </a:r>
+            <a:endParaRPr lang="en-US" sz="1000" dirty="0" smtClean="0"/>
+          </a:p>
+          <a:p>
+            <a:endParaRPr lang="en-US" sz="1000" dirty="0"/>
+          </a:p>
+          <a:p>
+            <a:endParaRPr lang="en-US" sz="1000" dirty="0" smtClean="0"/>
+          </a:p>
+          <a:p>
+            <a:endParaRPr lang="en-US" sz="1000" dirty="0"/>
+          </a:p>
+          <a:p>
+            <a:endParaRPr lang="en-US" sz="1000" dirty="0" smtClean="0"/>
+          </a:p>
+          <a:p>
+            <a:endParaRPr lang="en-US" sz="1000" dirty="0"/>
+          </a:p>
+          <a:p>
+            <a:endParaRPr lang="en-US" sz="1000" dirty="0" smtClean="0"/>
+          </a:p>
+        </p:txBody>
+      </p:sp>
+      <p:sp>
+        <p:nvSpPr>
+          <p:cNvPr id="9" name="TextBox 8"/>
+          <p:cNvSpPr txBox="1"/>
+          <p:nvPr/>
+        </p:nvSpPr>
+        <p:spPr>
+          <a:xfrm>
+            <a:off x="2546833" y="2550695"/>
+            <a:ext cx="1697908" cy="1785104"/>
+          </a:xfrm>
+          <a:prstGeom prst="rect">
+            <a:avLst/>
+          </a:prstGeom>
+          <a:ln w="19050">
+            <a:solidFill>
+              <a:schemeClr val="tx1"/>
+            </a:solidFill>
+          </a:ln>
+        </p:spPr>
+        <p:style>
+          <a:lnRef idx="2">
+            <a:schemeClr val="accent1"/>
+          </a:lnRef>
+          <a:fillRef idx="1">
+            <a:schemeClr val="lt1"/>
+          </a:fillRef>
+          <a:effectRef idx="0">
+            <a:schemeClr val="accent1"/>
+          </a:effectRef>
+          <a:fontRef idx="minor">
+            <a:schemeClr val="dk1"/>
+          </a:fontRef>
+        </p:style>
+        <p:txBody>
+          <a:bodyPr wrap="square" rtlCol="0">
+            <a:spAutoFit/>
+          </a:bodyPr>
+          <a:lstStyle/>
+          <a:p>
+            <a:r>
+              <a:rPr lang="en-US" sz="1000" dirty="0" smtClean="0"/>
+              <a:t>Stable state</a:t>
+            </a:r>
+            <a:endParaRPr lang="en-US" sz="1000" dirty="0" smtClean="0"/>
+          </a:p>
+          <a:p>
+            <a:r>
+              <a:rPr lang="en-US" sz="1000" dirty="0" smtClean="0"/>
+              <a:t>Moto speed : 50</a:t>
+            </a:r>
+          </a:p>
+          <a:p>
+            <a:r>
+              <a:rPr lang="en-US" sz="1000" dirty="0" smtClean="0"/>
+              <a:t>Pump speed :</a:t>
+            </a:r>
+          </a:p>
+          <a:p>
+            <a:endParaRPr lang="en-US" sz="1000" dirty="0"/>
+          </a:p>
+          <a:p>
+            <a:endParaRPr lang="en-US" sz="1000" dirty="0" smtClean="0"/>
+          </a:p>
+          <a:p>
+            <a:endParaRPr lang="en-US" sz="1000" dirty="0" smtClean="0"/>
+          </a:p>
+          <a:p>
+            <a:endParaRPr lang="en-US" sz="1000" dirty="0"/>
+          </a:p>
+          <a:p>
+            <a:endParaRPr lang="en-US" sz="1000" dirty="0" smtClean="0"/>
+          </a:p>
+          <a:p>
+            <a:endParaRPr lang="en-US" sz="1000" dirty="0"/>
+          </a:p>
+          <a:p>
+            <a:endParaRPr lang="en-US" sz="1000" dirty="0" smtClean="0"/>
+          </a:p>
+          <a:p>
+            <a:endParaRPr lang="en-US" sz="1000" dirty="0"/>
+          </a:p>
+        </p:txBody>
+      </p:sp>
+      <p:graphicFrame>
+        <p:nvGraphicFramePr>
+          <p:cNvPr id="11" name="Table 10"/>
+          <p:cNvGraphicFramePr>
+            <a:graphicFrameLocks noGrp="1"/>
+          </p:cNvGraphicFramePr>
+          <p:nvPr>
+            <p:extLst>
+              <p:ext uri="{D42A27DB-BD31-4B8C-83A1-F6EECF244321}">
+                <p14:modId xmlns:p14="http://schemas.microsoft.com/office/powerpoint/2010/main" val="2184073391"/>
+              </p:ext>
+            </p:extLst>
+          </p:nvPr>
+        </p:nvGraphicFramePr>
+        <p:xfrm>
+          <a:off x="2666196" y="3142061"/>
+          <a:ext cx="1463040" cy="1066800"/>
+        </p:xfrm>
+        <a:graphic>
+          <a:graphicData uri="http://schemas.openxmlformats.org/drawingml/2006/table">
+            <a:tbl>
+              <a:tblPr firstRow="1" bandRow="1">
+                <a:tableStyleId>{F5AB1C69-6EDB-4FF4-983F-18BD219EF322}</a:tableStyleId>
+              </a:tblPr>
+              <a:tblGrid>
+                <a:gridCol w="731520">
+                  <a:extLst>
+                    <a:ext uri="{9D8B030D-6E8A-4147-A177-3AD203B41FA5}">
+                      <a16:colId xmlns:a16="http://schemas.microsoft.com/office/drawing/2014/main" val="431475933"/>
+                    </a:ext>
+                  </a:extLst>
+                </a:gridCol>
+                <a:gridCol w="731520">
+                  <a:extLst>
+                    <a:ext uri="{9D8B030D-6E8A-4147-A177-3AD203B41FA5}">
+                      <a16:colId xmlns:a16="http://schemas.microsoft.com/office/drawing/2014/main" val="2016844069"/>
+                    </a:ext>
+                  </a:extLst>
+                </a:gridCol>
+              </a:tblGrid>
+              <a:tr h="177192">
+                <a:tc>
+                  <a:txBody>
+                    <a:bodyPr/>
+                    <a:lstStyle/>
+                    <a:p>
+                      <a:r>
+                        <a:rPr lang="en-US" sz="800" dirty="0" smtClean="0"/>
+                        <a:t>Load </a:t>
+                      </a:r>
+                      <a:r>
+                        <a:rPr lang="en-US" sz="800" dirty="0" err="1" smtClean="0"/>
+                        <a:t>Num</a:t>
+                      </a:r>
+                      <a:endParaRPr lang="en-SG" sz="800" dirty="0"/>
+                    </a:p>
+                  </a:txBody>
+                  <a:tcPr/>
+                </a:tc>
+                <a:tc>
+                  <a:txBody>
+                    <a:bodyPr/>
+                    <a:lstStyle/>
+                    <a:p>
+                      <a:r>
+                        <a:rPr lang="en-US" sz="800" dirty="0" smtClean="0"/>
+                        <a:t>Pump Speed</a:t>
+                      </a:r>
+                      <a:endParaRPr lang="en-SG" sz="800" dirty="0"/>
+                    </a:p>
+                  </a:txBody>
+                  <a:tcPr/>
+                </a:tc>
+                <a:extLst>
+                  <a:ext uri="{0D108BD9-81ED-4DB2-BD59-A6C34878D82A}">
+                    <a16:rowId xmlns:a16="http://schemas.microsoft.com/office/drawing/2014/main" val="3691079994"/>
+                  </a:ext>
+                </a:extLst>
+              </a:tr>
+              <a:tr h="177192">
+                <a:tc>
+                  <a:txBody>
+                    <a:bodyPr/>
+                    <a:lstStyle/>
+                    <a:p>
+                      <a:r>
+                        <a:rPr lang="en-US" sz="800" dirty="0" smtClean="0"/>
+                        <a:t>== 0 </a:t>
+                      </a:r>
+                      <a:endParaRPr lang="en-SG" sz="800" dirty="0"/>
+                    </a:p>
+                  </a:txBody>
+                  <a:tcPr/>
+                </a:tc>
+                <a:tc>
+                  <a:txBody>
+                    <a:bodyPr/>
+                    <a:lstStyle/>
+                    <a:p>
+                      <a:r>
+                        <a:rPr lang="en-US" sz="800" dirty="0" smtClean="0"/>
+                        <a:t>Idle</a:t>
+                      </a:r>
+                      <a:endParaRPr lang="en-SG" sz="800" dirty="0"/>
+                    </a:p>
+                  </a:txBody>
+                  <a:tcPr/>
+                </a:tc>
+                <a:extLst>
+                  <a:ext uri="{0D108BD9-81ED-4DB2-BD59-A6C34878D82A}">
+                    <a16:rowId xmlns:a16="http://schemas.microsoft.com/office/drawing/2014/main" val="114174402"/>
+                  </a:ext>
+                </a:extLst>
+              </a:tr>
+              <a:tr h="177192">
+                <a:tc>
+                  <a:txBody>
+                    <a:bodyPr/>
+                    <a:lstStyle/>
+                    <a:p>
+                      <a:r>
+                        <a:rPr lang="en-US" sz="800" dirty="0" smtClean="0"/>
+                        <a:t>&lt; 3</a:t>
+                      </a:r>
+                      <a:endParaRPr lang="en-SG" sz="800" dirty="0"/>
+                    </a:p>
+                  </a:txBody>
+                  <a:tcPr/>
+                </a:tc>
+                <a:tc>
+                  <a:txBody>
+                    <a:bodyPr/>
+                    <a:lstStyle/>
+                    <a:p>
+                      <a:r>
+                        <a:rPr lang="en-US" sz="800" dirty="0" smtClean="0"/>
+                        <a:t>Lower </a:t>
+                      </a:r>
+                      <a:endParaRPr lang="en-SG" sz="800" dirty="0"/>
+                    </a:p>
+                  </a:txBody>
+                  <a:tcPr/>
+                </a:tc>
+                <a:extLst>
+                  <a:ext uri="{0D108BD9-81ED-4DB2-BD59-A6C34878D82A}">
+                    <a16:rowId xmlns:a16="http://schemas.microsoft.com/office/drawing/2014/main" val="2904185499"/>
+                  </a:ext>
+                </a:extLst>
+              </a:tr>
+              <a:tr h="177192">
+                <a:tc>
+                  <a:txBody>
+                    <a:bodyPr/>
+                    <a:lstStyle/>
+                    <a:p>
+                      <a:r>
+                        <a:rPr lang="en-US" sz="800" dirty="0" smtClean="0"/>
+                        <a:t>== 3</a:t>
+                      </a:r>
+                      <a:endParaRPr lang="en-SG" sz="800" dirty="0"/>
+                    </a:p>
+                  </a:txBody>
+                  <a:tcPr/>
+                </a:tc>
+                <a:tc>
+                  <a:txBody>
+                    <a:bodyPr/>
+                    <a:lstStyle/>
+                    <a:p>
+                      <a:r>
+                        <a:rPr lang="en-US" sz="800" dirty="0" smtClean="0"/>
+                        <a:t>Medium </a:t>
+                      </a:r>
+                      <a:endParaRPr lang="en-SG" sz="800" dirty="0"/>
+                    </a:p>
+                  </a:txBody>
+                  <a:tcPr/>
+                </a:tc>
+                <a:extLst>
+                  <a:ext uri="{0D108BD9-81ED-4DB2-BD59-A6C34878D82A}">
+                    <a16:rowId xmlns:a16="http://schemas.microsoft.com/office/drawing/2014/main" val="2106050552"/>
+                  </a:ext>
+                </a:extLst>
+              </a:tr>
+              <a:tr h="177192">
+                <a:tc>
+                  <a:txBody>
+                    <a:bodyPr/>
+                    <a:lstStyle/>
+                    <a:p>
+                      <a:r>
+                        <a:rPr lang="en-US" sz="800" dirty="0" smtClean="0"/>
+                        <a:t>&gt; 3 </a:t>
+                      </a:r>
+                      <a:endParaRPr lang="en-SG" sz="800" dirty="0"/>
+                    </a:p>
+                  </a:txBody>
+                  <a:tcPr/>
+                </a:tc>
+                <a:tc>
+                  <a:txBody>
+                    <a:bodyPr/>
+                    <a:lstStyle/>
+                    <a:p>
+                      <a:r>
+                        <a:rPr lang="en-US" sz="800" dirty="0" smtClean="0"/>
+                        <a:t>Higher </a:t>
+                      </a:r>
+                      <a:endParaRPr lang="en-SG" sz="800" dirty="0"/>
+                    </a:p>
+                  </a:txBody>
+                  <a:tcPr/>
+                </a:tc>
+                <a:extLst>
+                  <a:ext uri="{0D108BD9-81ED-4DB2-BD59-A6C34878D82A}">
+                    <a16:rowId xmlns:a16="http://schemas.microsoft.com/office/drawing/2014/main" val="1344339946"/>
+                  </a:ext>
+                </a:extLst>
+              </a:tr>
+            </a:tbl>
+          </a:graphicData>
+        </a:graphic>
+      </p:graphicFrame>
+      <p:cxnSp>
+        <p:nvCxnSpPr>
+          <p:cNvPr id="13" name="Straight Arrow Connector 12"/>
+          <p:cNvCxnSpPr>
+            <a:stCxn id="9" idx="3"/>
+            <a:endCxn id="7" idx="1"/>
+          </p:cNvCxnSpPr>
+          <p:nvPr/>
+        </p:nvCxnSpPr>
+        <p:spPr>
+          <a:xfrm>
+            <a:off x="4244741" y="3443247"/>
+            <a:ext cx="694948" cy="0"/>
+          </a:xfrm>
+          <a:prstGeom prst="straightConnector1">
+            <a:avLst/>
+          </a:prstGeom>
+          <a:ln>
+            <a:tailEnd type="triangle"/>
+          </a:ln>
+        </p:spPr>
+        <p:style>
+          <a:lnRef idx="1">
+            <a:schemeClr val="dk1"/>
+          </a:lnRef>
+          <a:fillRef idx="0">
+            <a:schemeClr val="dk1"/>
+          </a:fillRef>
+          <a:effectRef idx="0">
+            <a:schemeClr val="dk1"/>
+          </a:effectRef>
+          <a:fontRef idx="minor">
+            <a:schemeClr val="tx1"/>
+          </a:fontRef>
+        </p:style>
+      </p:cxnSp>
+      <p:graphicFrame>
+        <p:nvGraphicFramePr>
+          <p:cNvPr id="24" name="Table 23"/>
+          <p:cNvGraphicFramePr>
+            <a:graphicFrameLocks noGrp="1"/>
+          </p:cNvGraphicFramePr>
+          <p:nvPr>
+            <p:extLst>
+              <p:ext uri="{D42A27DB-BD31-4B8C-83A1-F6EECF244321}">
+                <p14:modId xmlns:p14="http://schemas.microsoft.com/office/powerpoint/2010/main" val="102826230"/>
+              </p:ext>
+            </p:extLst>
+          </p:nvPr>
+        </p:nvGraphicFramePr>
+        <p:xfrm>
+          <a:off x="5007063" y="3224464"/>
+          <a:ext cx="4290942" cy="640080"/>
+        </p:xfrm>
+        <a:graphic>
+          <a:graphicData uri="http://schemas.openxmlformats.org/drawingml/2006/table">
+            <a:tbl>
+              <a:tblPr firstRow="1" bandRow="1">
+                <a:tableStyleId>{F5AB1C69-6EDB-4FF4-983F-18BD219EF322}</a:tableStyleId>
+              </a:tblPr>
+              <a:tblGrid>
+                <a:gridCol w="715157">
+                  <a:extLst>
+                    <a:ext uri="{9D8B030D-6E8A-4147-A177-3AD203B41FA5}">
+                      <a16:colId xmlns:a16="http://schemas.microsoft.com/office/drawing/2014/main" val="431475933"/>
+                    </a:ext>
+                  </a:extLst>
+                </a:gridCol>
+                <a:gridCol w="715157">
+                  <a:extLst>
+                    <a:ext uri="{9D8B030D-6E8A-4147-A177-3AD203B41FA5}">
+                      <a16:colId xmlns:a16="http://schemas.microsoft.com/office/drawing/2014/main" val="2016844069"/>
+                    </a:ext>
+                  </a:extLst>
+                </a:gridCol>
+                <a:gridCol w="715157">
+                  <a:extLst>
+                    <a:ext uri="{9D8B030D-6E8A-4147-A177-3AD203B41FA5}">
+                      <a16:colId xmlns:a16="http://schemas.microsoft.com/office/drawing/2014/main" val="1183612969"/>
+                    </a:ext>
+                  </a:extLst>
+                </a:gridCol>
+                <a:gridCol w="715157">
+                  <a:extLst>
+                    <a:ext uri="{9D8B030D-6E8A-4147-A177-3AD203B41FA5}">
+                      <a16:colId xmlns:a16="http://schemas.microsoft.com/office/drawing/2014/main" val="722931774"/>
+                    </a:ext>
+                  </a:extLst>
+                </a:gridCol>
+                <a:gridCol w="715157">
+                  <a:extLst>
+                    <a:ext uri="{9D8B030D-6E8A-4147-A177-3AD203B41FA5}">
+                      <a16:colId xmlns:a16="http://schemas.microsoft.com/office/drawing/2014/main" val="3293546614"/>
+                    </a:ext>
+                  </a:extLst>
+                </a:gridCol>
+                <a:gridCol w="715157">
+                  <a:extLst>
+                    <a:ext uri="{9D8B030D-6E8A-4147-A177-3AD203B41FA5}">
+                      <a16:colId xmlns:a16="http://schemas.microsoft.com/office/drawing/2014/main" val="1478904492"/>
+                    </a:ext>
+                  </a:extLst>
+                </a:gridCol>
+              </a:tblGrid>
+              <a:tr h="155450">
+                <a:tc>
+                  <a:txBody>
+                    <a:bodyPr/>
+                    <a:lstStyle/>
+                    <a:p>
+                      <a:r>
+                        <a:rPr lang="en-US" sz="800" dirty="0" smtClean="0"/>
+                        <a:t>\time</a:t>
+                      </a:r>
+                      <a:endParaRPr lang="en-SG" sz="800" dirty="0"/>
+                    </a:p>
+                  </a:txBody>
+                  <a:tcPr/>
+                </a:tc>
+                <a:tc>
+                  <a:txBody>
+                    <a:bodyPr/>
+                    <a:lstStyle/>
+                    <a:p>
+                      <a:r>
+                        <a:rPr lang="en-US" sz="800" dirty="0" smtClean="0"/>
+                        <a:t>t1</a:t>
+                      </a:r>
+                      <a:endParaRPr lang="en-SG" sz="800" dirty="0"/>
+                    </a:p>
+                  </a:txBody>
+                  <a:tcPr/>
+                </a:tc>
+                <a:tc>
+                  <a:txBody>
+                    <a:bodyPr/>
+                    <a:lstStyle/>
+                    <a:p>
+                      <a:r>
+                        <a:rPr lang="en-US" sz="800" dirty="0" smtClean="0"/>
+                        <a:t>t2</a:t>
+                      </a:r>
+                      <a:endParaRPr lang="en-SG" sz="800" dirty="0"/>
+                    </a:p>
+                  </a:txBody>
+                  <a:tcPr/>
+                </a:tc>
+                <a:tc>
+                  <a:txBody>
+                    <a:bodyPr/>
+                    <a:lstStyle/>
+                    <a:p>
+                      <a:r>
+                        <a:rPr lang="en-US" sz="800" dirty="0" smtClean="0"/>
+                        <a:t>t3</a:t>
+                      </a:r>
+                      <a:endParaRPr lang="en-SG" sz="800" dirty="0"/>
+                    </a:p>
+                  </a:txBody>
+                  <a:tcPr/>
+                </a:tc>
+                <a:tc>
+                  <a:txBody>
+                    <a:bodyPr/>
+                    <a:lstStyle/>
+                    <a:p>
+                      <a:r>
+                        <a:rPr lang="en-US" sz="800" dirty="0" smtClean="0"/>
+                        <a:t>t4</a:t>
+                      </a:r>
+                      <a:endParaRPr lang="en-SG" sz="800" dirty="0"/>
+                    </a:p>
+                  </a:txBody>
+                  <a:tcPr/>
+                </a:tc>
+                <a:tc>
+                  <a:txBody>
+                    <a:bodyPr/>
+                    <a:lstStyle/>
+                    <a:p>
+                      <a:r>
+                        <a:rPr lang="en-US" sz="800" dirty="0" smtClean="0"/>
+                        <a:t>t5</a:t>
+                      </a:r>
+                      <a:endParaRPr lang="en-SG" sz="800" dirty="0"/>
+                    </a:p>
+                  </a:txBody>
+                  <a:tcPr/>
+                </a:tc>
+                <a:extLst>
+                  <a:ext uri="{0D108BD9-81ED-4DB2-BD59-A6C34878D82A}">
+                    <a16:rowId xmlns:a16="http://schemas.microsoft.com/office/drawing/2014/main" val="3691079994"/>
+                  </a:ext>
+                </a:extLst>
+              </a:tr>
+              <a:tr h="177192">
+                <a:tc>
+                  <a:txBody>
+                    <a:bodyPr/>
+                    <a:lstStyle/>
+                    <a:p>
+                      <a:r>
+                        <a:rPr lang="en-US" sz="800" dirty="0" smtClean="0"/>
+                        <a:t>Moto speed</a:t>
+                      </a:r>
+                      <a:endParaRPr lang="en-SG" sz="800" dirty="0"/>
+                    </a:p>
+                  </a:txBody>
+                  <a:tcPr/>
+                </a:tc>
+                <a:tc>
+                  <a:txBody>
+                    <a:bodyPr/>
+                    <a:lstStyle/>
+                    <a:p>
+                      <a:r>
+                        <a:rPr lang="en-US" sz="800" dirty="0" smtClean="0"/>
+                        <a:t>46</a:t>
+                      </a:r>
+                      <a:endParaRPr lang="en-SG" sz="800" dirty="0"/>
+                    </a:p>
+                  </a:txBody>
+                  <a:tcPr/>
+                </a:tc>
+                <a:tc>
+                  <a:txBody>
+                    <a:bodyPr/>
+                    <a:lstStyle/>
+                    <a:p>
+                      <a:r>
+                        <a:rPr lang="en-US" sz="800" dirty="0" smtClean="0"/>
+                        <a:t>47</a:t>
+                      </a:r>
+                      <a:endParaRPr lang="en-SG" sz="800" dirty="0"/>
+                    </a:p>
+                  </a:txBody>
+                  <a:tcPr/>
+                </a:tc>
+                <a:tc>
+                  <a:txBody>
+                    <a:bodyPr/>
+                    <a:lstStyle/>
+                    <a:p>
+                      <a:r>
+                        <a:rPr lang="en-US" sz="800" dirty="0" smtClean="0"/>
+                        <a:t>48</a:t>
+                      </a:r>
+                      <a:endParaRPr lang="en-SG" sz="800" dirty="0"/>
+                    </a:p>
+                  </a:txBody>
+                  <a:tcPr/>
+                </a:tc>
+                <a:tc>
+                  <a:txBody>
+                    <a:bodyPr/>
+                    <a:lstStyle/>
+                    <a:p>
+                      <a:r>
+                        <a:rPr lang="en-US" sz="800" dirty="0" smtClean="0"/>
+                        <a:t>49</a:t>
+                      </a:r>
+                      <a:endParaRPr lang="en-SG" sz="800" dirty="0"/>
+                    </a:p>
+                  </a:txBody>
+                  <a:tcPr/>
+                </a:tc>
+                <a:tc>
+                  <a:txBody>
+                    <a:bodyPr/>
+                    <a:lstStyle/>
+                    <a:p>
+                      <a:r>
+                        <a:rPr lang="en-US" sz="800" dirty="0" smtClean="0"/>
+                        <a:t>50</a:t>
+                      </a:r>
+                      <a:endParaRPr lang="en-SG" sz="800" dirty="0"/>
+                    </a:p>
+                  </a:txBody>
+                  <a:tcPr/>
+                </a:tc>
+                <a:extLst>
+                  <a:ext uri="{0D108BD9-81ED-4DB2-BD59-A6C34878D82A}">
+                    <a16:rowId xmlns:a16="http://schemas.microsoft.com/office/drawing/2014/main" val="114174402"/>
+                  </a:ext>
+                </a:extLst>
+              </a:tr>
+              <a:tr h="177192">
+                <a:tc>
+                  <a:txBody>
+                    <a:bodyPr/>
+                    <a:lstStyle/>
+                    <a:p>
+                      <a:r>
+                        <a:rPr lang="en-US" sz="800" dirty="0" smtClean="0"/>
+                        <a:t>Pump Speed</a:t>
+                      </a:r>
+                      <a:endParaRPr lang="en-SG" sz="800" dirty="0"/>
+                    </a:p>
+                  </a:txBody>
+                  <a:tcPr/>
+                </a:tc>
+                <a:tc>
+                  <a:txBody>
+                    <a:bodyPr/>
+                    <a:lstStyle/>
+                    <a:p>
+                      <a:r>
+                        <a:rPr lang="en-US" sz="800" dirty="0" smtClean="0"/>
+                        <a:t>Lower </a:t>
+                      </a:r>
+                      <a:endParaRPr lang="en-SG" sz="800" dirty="0"/>
+                    </a:p>
+                  </a:txBody>
+                  <a:tcPr/>
+                </a:tc>
+                <a:tc>
+                  <a:txBody>
+                    <a:bodyPr/>
+                    <a:lstStyle/>
+                    <a:p>
+                      <a:pPr marL="0" marR="0" lvl="0" indent="0" algn="l" defTabSz="914400" rtl="0" eaLnBrk="1" fontAlgn="auto" latinLnBrk="0" hangingPunct="1">
+                        <a:lnSpc>
+                          <a:spcPct val="100000"/>
+                        </a:lnSpc>
+                        <a:spcBef>
+                          <a:spcPts val="0"/>
+                        </a:spcBef>
+                        <a:spcAft>
+                          <a:spcPts val="0"/>
+                        </a:spcAft>
+                        <a:buClrTx/>
+                        <a:buSzTx/>
+                        <a:buFontTx/>
+                        <a:buNone/>
+                        <a:tabLst/>
+                        <a:defRPr/>
+                      </a:pPr>
+                      <a:r>
+                        <a:rPr lang="en-US" sz="800" dirty="0" smtClean="0"/>
+                        <a:t>Medium </a:t>
+                      </a:r>
+                      <a:endParaRPr lang="en-SG" sz="800" dirty="0" smtClean="0"/>
+                    </a:p>
+                  </a:txBody>
+                  <a:tcPr/>
+                </a:tc>
+                <a:tc>
+                  <a:txBody>
+                    <a:bodyPr/>
+                    <a:lstStyle/>
+                    <a:p>
+                      <a:pPr marL="0" marR="0" lvl="0" indent="0" algn="l" defTabSz="914400" rtl="0" eaLnBrk="1" fontAlgn="auto" latinLnBrk="0" hangingPunct="1">
+                        <a:lnSpc>
+                          <a:spcPct val="100000"/>
+                        </a:lnSpc>
+                        <a:spcBef>
+                          <a:spcPts val="0"/>
+                        </a:spcBef>
+                        <a:spcAft>
+                          <a:spcPts val="0"/>
+                        </a:spcAft>
+                        <a:buClrTx/>
+                        <a:buSzTx/>
+                        <a:buFontTx/>
+                        <a:buNone/>
+                        <a:tabLst/>
+                        <a:defRPr/>
+                      </a:pPr>
+                      <a:r>
+                        <a:rPr lang="en-US" sz="800" dirty="0" smtClean="0"/>
+                        <a:t>Medium </a:t>
+                      </a:r>
+                      <a:endParaRPr lang="en-SG" sz="800" dirty="0" smtClean="0"/>
+                    </a:p>
+                  </a:txBody>
+                  <a:tcPr/>
+                </a:tc>
+                <a:tc>
+                  <a:txBody>
+                    <a:bodyPr/>
+                    <a:lstStyle/>
+                    <a:p>
+                      <a:pPr marL="0" marR="0" lvl="0" indent="0" algn="l" defTabSz="914400" rtl="0" eaLnBrk="1" fontAlgn="auto" latinLnBrk="0" hangingPunct="1">
+                        <a:lnSpc>
+                          <a:spcPct val="100000"/>
+                        </a:lnSpc>
+                        <a:spcBef>
+                          <a:spcPts val="0"/>
+                        </a:spcBef>
+                        <a:spcAft>
+                          <a:spcPts val="0"/>
+                        </a:spcAft>
+                        <a:buClrTx/>
+                        <a:buSzTx/>
+                        <a:buFontTx/>
+                        <a:buNone/>
+                        <a:tabLst/>
+                        <a:defRPr/>
+                      </a:pPr>
+                      <a:r>
+                        <a:rPr lang="en-US" sz="800" dirty="0" smtClean="0"/>
+                        <a:t>Medium </a:t>
+                      </a:r>
+                      <a:endParaRPr lang="en-SG" sz="800" dirty="0" smtClean="0"/>
+                    </a:p>
+                  </a:txBody>
+                  <a:tcPr/>
+                </a:tc>
+                <a:tc>
+                  <a:txBody>
+                    <a:bodyPr/>
+                    <a:lstStyle/>
+                    <a:p>
+                      <a:pPr marL="0" marR="0" lvl="0" indent="0" algn="l" defTabSz="914400" rtl="0" eaLnBrk="1" fontAlgn="auto" latinLnBrk="0" hangingPunct="1">
+                        <a:lnSpc>
+                          <a:spcPct val="100000"/>
+                        </a:lnSpc>
+                        <a:spcBef>
+                          <a:spcPts val="0"/>
+                        </a:spcBef>
+                        <a:spcAft>
+                          <a:spcPts val="0"/>
+                        </a:spcAft>
+                        <a:buClrTx/>
+                        <a:buSzTx/>
+                        <a:buFontTx/>
+                        <a:buNone/>
+                        <a:tabLst/>
+                        <a:defRPr/>
+                      </a:pPr>
+                      <a:r>
+                        <a:rPr lang="en-US" sz="800" dirty="0" smtClean="0"/>
+                        <a:t>Medium </a:t>
+                      </a:r>
+                      <a:endParaRPr lang="en-SG" sz="800" dirty="0" smtClean="0"/>
+                    </a:p>
+                  </a:txBody>
+                  <a:tcPr/>
+                </a:tc>
+                <a:extLst>
+                  <a:ext uri="{0D108BD9-81ED-4DB2-BD59-A6C34878D82A}">
+                    <a16:rowId xmlns:a16="http://schemas.microsoft.com/office/drawing/2014/main" val="2904185499"/>
+                  </a:ext>
+                </a:extLst>
+              </a:tr>
+            </a:tbl>
+          </a:graphicData>
+        </a:graphic>
+      </p:graphicFrame>
+      <p:cxnSp>
+        <p:nvCxnSpPr>
+          <p:cNvPr id="32" name="Elbow Connector 31"/>
+          <p:cNvCxnSpPr/>
+          <p:nvPr/>
+        </p:nvCxnSpPr>
+        <p:spPr>
+          <a:xfrm rot="10800000" flipV="1">
+            <a:off x="4244741" y="3864543"/>
+            <a:ext cx="4726004" cy="344317"/>
+          </a:xfrm>
+          <a:prstGeom prst="bentConnector3">
+            <a:avLst>
+              <a:gd name="adj1" fmla="val 102"/>
+            </a:avLst>
+          </a:prstGeom>
+          <a:ln>
+            <a:tailEnd type="triangle"/>
+          </a:ln>
+        </p:spPr>
+        <p:style>
+          <a:lnRef idx="1">
+            <a:schemeClr val="dk1"/>
+          </a:lnRef>
+          <a:fillRef idx="0">
+            <a:schemeClr val="dk1"/>
+          </a:fillRef>
+          <a:effectRef idx="0">
+            <a:schemeClr val="dk1"/>
+          </a:effectRef>
+          <a:fontRef idx="minor">
+            <a:schemeClr val="tx1"/>
+          </a:fontRef>
+        </p:style>
+      </p:cxnSp>
+      <p:sp>
+        <p:nvSpPr>
+          <p:cNvPr id="34" name="TextBox 33"/>
+          <p:cNvSpPr txBox="1"/>
+          <p:nvPr/>
+        </p:nvSpPr>
+        <p:spPr>
+          <a:xfrm>
+            <a:off x="4891563" y="4547903"/>
+            <a:ext cx="4406442" cy="1323439"/>
+          </a:xfrm>
+          <a:prstGeom prst="rect">
+            <a:avLst/>
+          </a:prstGeom>
+          <a:ln w="19050">
+            <a:solidFill>
+              <a:schemeClr val="tx1"/>
+            </a:solidFill>
+          </a:ln>
+        </p:spPr>
+        <p:style>
+          <a:lnRef idx="2">
+            <a:schemeClr val="accent1"/>
+          </a:lnRef>
+          <a:fillRef idx="1">
+            <a:schemeClr val="lt1"/>
+          </a:fillRef>
+          <a:effectRef idx="0">
+            <a:schemeClr val="accent1"/>
+          </a:effectRef>
+          <a:fontRef idx="minor">
+            <a:schemeClr val="dk1"/>
+          </a:fontRef>
+        </p:style>
+        <p:txBody>
+          <a:bodyPr wrap="square" rtlCol="0">
+            <a:spAutoFit/>
+          </a:bodyPr>
+          <a:lstStyle/>
+          <a:p>
+            <a:r>
+              <a:rPr lang="en-US" sz="1000" dirty="0" smtClean="0"/>
+              <a:t>Decrease load</a:t>
+            </a:r>
+          </a:p>
+          <a:p>
+            <a:r>
+              <a:rPr lang="en-US" sz="1000" dirty="0" smtClean="0"/>
+              <a:t>Load Change </a:t>
+            </a:r>
+            <a:r>
+              <a:rPr lang="en-US" sz="1000" smtClean="0"/>
+              <a:t>: </a:t>
+            </a:r>
+            <a:r>
+              <a:rPr lang="en-US" sz="1000"/>
+              <a:t>Decrease</a:t>
+            </a:r>
+            <a:r>
+              <a:rPr lang="en-US" sz="1000" smtClean="0"/>
+              <a:t> </a:t>
+            </a:r>
+            <a:r>
+              <a:rPr lang="en-US" sz="1000" dirty="0" smtClean="0"/>
+              <a:t>from 5  to  </a:t>
+            </a:r>
+            <a:r>
+              <a:rPr lang="en-US" sz="1000" dirty="0"/>
+              <a:t>3</a:t>
+            </a:r>
+            <a:endParaRPr lang="en-US" sz="1000" dirty="0" smtClean="0"/>
+          </a:p>
+          <a:p>
+            <a:endParaRPr lang="en-US" sz="1000" dirty="0"/>
+          </a:p>
+          <a:p>
+            <a:endParaRPr lang="en-US" sz="1000" dirty="0" smtClean="0"/>
+          </a:p>
+          <a:p>
+            <a:endParaRPr lang="en-US" sz="1000" dirty="0" smtClean="0"/>
+          </a:p>
+          <a:p>
+            <a:endParaRPr lang="en-US" sz="1000" dirty="0" smtClean="0"/>
+          </a:p>
+          <a:p>
+            <a:endParaRPr lang="en-US" sz="1000" dirty="0"/>
+          </a:p>
+          <a:p>
+            <a:endParaRPr lang="en-US" sz="1000" dirty="0" smtClean="0"/>
+          </a:p>
+        </p:txBody>
+      </p:sp>
+      <p:graphicFrame>
+        <p:nvGraphicFramePr>
+          <p:cNvPr id="35" name="Table 34"/>
+          <p:cNvGraphicFramePr>
+            <a:graphicFrameLocks noGrp="1"/>
+          </p:cNvGraphicFramePr>
+          <p:nvPr>
+            <p:extLst>
+              <p:ext uri="{D42A27DB-BD31-4B8C-83A1-F6EECF244321}">
+                <p14:modId xmlns:p14="http://schemas.microsoft.com/office/powerpoint/2010/main" val="2765331980"/>
+              </p:ext>
+            </p:extLst>
+          </p:nvPr>
+        </p:nvGraphicFramePr>
+        <p:xfrm>
+          <a:off x="4939689" y="4997518"/>
+          <a:ext cx="4290942" cy="640080"/>
+        </p:xfrm>
+        <a:graphic>
+          <a:graphicData uri="http://schemas.openxmlformats.org/drawingml/2006/table">
+            <a:tbl>
+              <a:tblPr firstRow="1" bandRow="1">
+                <a:tableStyleId>{F5AB1C69-6EDB-4FF4-983F-18BD219EF322}</a:tableStyleId>
+              </a:tblPr>
+              <a:tblGrid>
+                <a:gridCol w="715157">
+                  <a:extLst>
+                    <a:ext uri="{9D8B030D-6E8A-4147-A177-3AD203B41FA5}">
+                      <a16:colId xmlns:a16="http://schemas.microsoft.com/office/drawing/2014/main" val="431475933"/>
+                    </a:ext>
+                  </a:extLst>
+                </a:gridCol>
+                <a:gridCol w="715157">
+                  <a:extLst>
+                    <a:ext uri="{9D8B030D-6E8A-4147-A177-3AD203B41FA5}">
+                      <a16:colId xmlns:a16="http://schemas.microsoft.com/office/drawing/2014/main" val="2016844069"/>
+                    </a:ext>
+                  </a:extLst>
+                </a:gridCol>
+                <a:gridCol w="715157">
+                  <a:extLst>
+                    <a:ext uri="{9D8B030D-6E8A-4147-A177-3AD203B41FA5}">
+                      <a16:colId xmlns:a16="http://schemas.microsoft.com/office/drawing/2014/main" val="1183612969"/>
+                    </a:ext>
+                  </a:extLst>
+                </a:gridCol>
+                <a:gridCol w="715157">
+                  <a:extLst>
+                    <a:ext uri="{9D8B030D-6E8A-4147-A177-3AD203B41FA5}">
+                      <a16:colId xmlns:a16="http://schemas.microsoft.com/office/drawing/2014/main" val="722931774"/>
+                    </a:ext>
+                  </a:extLst>
+                </a:gridCol>
+                <a:gridCol w="715157">
+                  <a:extLst>
+                    <a:ext uri="{9D8B030D-6E8A-4147-A177-3AD203B41FA5}">
+                      <a16:colId xmlns:a16="http://schemas.microsoft.com/office/drawing/2014/main" val="3293546614"/>
+                    </a:ext>
+                  </a:extLst>
+                </a:gridCol>
+                <a:gridCol w="715157">
+                  <a:extLst>
+                    <a:ext uri="{9D8B030D-6E8A-4147-A177-3AD203B41FA5}">
+                      <a16:colId xmlns:a16="http://schemas.microsoft.com/office/drawing/2014/main" val="1478904492"/>
+                    </a:ext>
+                  </a:extLst>
+                </a:gridCol>
+              </a:tblGrid>
+              <a:tr h="155450">
+                <a:tc>
+                  <a:txBody>
+                    <a:bodyPr/>
+                    <a:lstStyle/>
+                    <a:p>
+                      <a:r>
+                        <a:rPr lang="en-US" sz="800" dirty="0" smtClean="0"/>
+                        <a:t>\time</a:t>
+                      </a:r>
+                      <a:endParaRPr lang="en-SG" sz="800" dirty="0"/>
+                    </a:p>
+                  </a:txBody>
+                  <a:tcPr/>
+                </a:tc>
+                <a:tc>
+                  <a:txBody>
+                    <a:bodyPr/>
+                    <a:lstStyle/>
+                    <a:p>
+                      <a:r>
+                        <a:rPr lang="en-US" sz="800" dirty="0" smtClean="0"/>
+                        <a:t>t1</a:t>
+                      </a:r>
+                      <a:endParaRPr lang="en-SG" sz="800" dirty="0"/>
+                    </a:p>
+                  </a:txBody>
+                  <a:tcPr/>
+                </a:tc>
+                <a:tc>
+                  <a:txBody>
+                    <a:bodyPr/>
+                    <a:lstStyle/>
+                    <a:p>
+                      <a:r>
+                        <a:rPr lang="en-US" sz="800" dirty="0" smtClean="0"/>
+                        <a:t>t2</a:t>
+                      </a:r>
+                      <a:endParaRPr lang="en-SG" sz="800" dirty="0"/>
+                    </a:p>
+                  </a:txBody>
+                  <a:tcPr/>
+                </a:tc>
+                <a:tc>
+                  <a:txBody>
+                    <a:bodyPr/>
+                    <a:lstStyle/>
+                    <a:p>
+                      <a:r>
+                        <a:rPr lang="en-US" sz="800" dirty="0" smtClean="0"/>
+                        <a:t>t3</a:t>
+                      </a:r>
+                      <a:endParaRPr lang="en-SG" sz="800" dirty="0"/>
+                    </a:p>
+                  </a:txBody>
+                  <a:tcPr/>
+                </a:tc>
+                <a:tc>
+                  <a:txBody>
+                    <a:bodyPr/>
+                    <a:lstStyle/>
+                    <a:p>
+                      <a:r>
+                        <a:rPr lang="en-US" sz="800" dirty="0" smtClean="0"/>
+                        <a:t>t4</a:t>
+                      </a:r>
+                      <a:endParaRPr lang="en-SG" sz="800" dirty="0"/>
+                    </a:p>
+                  </a:txBody>
+                  <a:tcPr/>
+                </a:tc>
+                <a:tc>
+                  <a:txBody>
+                    <a:bodyPr/>
+                    <a:lstStyle/>
+                    <a:p>
+                      <a:r>
+                        <a:rPr lang="en-US" sz="800" dirty="0" smtClean="0"/>
+                        <a:t>t5</a:t>
+                      </a:r>
+                      <a:endParaRPr lang="en-SG" sz="800" dirty="0"/>
+                    </a:p>
+                  </a:txBody>
+                  <a:tcPr/>
+                </a:tc>
+                <a:extLst>
+                  <a:ext uri="{0D108BD9-81ED-4DB2-BD59-A6C34878D82A}">
+                    <a16:rowId xmlns:a16="http://schemas.microsoft.com/office/drawing/2014/main" val="3691079994"/>
+                  </a:ext>
+                </a:extLst>
+              </a:tr>
+              <a:tr h="177192">
+                <a:tc>
+                  <a:txBody>
+                    <a:bodyPr/>
+                    <a:lstStyle/>
+                    <a:p>
+                      <a:r>
+                        <a:rPr lang="en-US" sz="800" dirty="0" smtClean="0"/>
+                        <a:t>Moto speed</a:t>
+                      </a:r>
+                      <a:endParaRPr lang="en-SG" sz="800" dirty="0"/>
+                    </a:p>
+                  </a:txBody>
+                  <a:tcPr/>
+                </a:tc>
+                <a:tc>
+                  <a:txBody>
+                    <a:bodyPr/>
+                    <a:lstStyle/>
+                    <a:p>
+                      <a:r>
+                        <a:rPr lang="en-US" sz="800" dirty="0" smtClean="0"/>
+                        <a:t>54</a:t>
+                      </a:r>
+                      <a:endParaRPr lang="en-SG" sz="800" dirty="0"/>
+                    </a:p>
+                  </a:txBody>
+                  <a:tcPr/>
+                </a:tc>
+                <a:tc>
+                  <a:txBody>
+                    <a:bodyPr/>
+                    <a:lstStyle/>
+                    <a:p>
+                      <a:r>
+                        <a:rPr lang="en-US" sz="800" dirty="0" smtClean="0"/>
+                        <a:t>53</a:t>
+                      </a:r>
+                      <a:endParaRPr lang="en-SG" sz="800" dirty="0"/>
+                    </a:p>
+                  </a:txBody>
+                  <a:tcPr/>
+                </a:tc>
+                <a:tc>
+                  <a:txBody>
+                    <a:bodyPr/>
+                    <a:lstStyle/>
+                    <a:p>
+                      <a:r>
+                        <a:rPr lang="en-US" sz="800" dirty="0" smtClean="0"/>
+                        <a:t>52</a:t>
+                      </a:r>
+                      <a:endParaRPr lang="en-SG" sz="800" dirty="0"/>
+                    </a:p>
+                  </a:txBody>
+                  <a:tcPr/>
+                </a:tc>
+                <a:tc>
+                  <a:txBody>
+                    <a:bodyPr/>
+                    <a:lstStyle/>
+                    <a:p>
+                      <a:r>
+                        <a:rPr lang="en-US" sz="800" dirty="0" smtClean="0"/>
+                        <a:t>51</a:t>
+                      </a:r>
+                      <a:endParaRPr lang="en-SG" sz="800" dirty="0"/>
+                    </a:p>
+                  </a:txBody>
+                  <a:tcPr/>
+                </a:tc>
+                <a:tc>
+                  <a:txBody>
+                    <a:bodyPr/>
+                    <a:lstStyle/>
+                    <a:p>
+                      <a:r>
+                        <a:rPr lang="en-US" sz="800" dirty="0" smtClean="0"/>
+                        <a:t>50</a:t>
+                      </a:r>
+                      <a:endParaRPr lang="en-SG" sz="800" dirty="0"/>
+                    </a:p>
+                  </a:txBody>
+                  <a:tcPr/>
+                </a:tc>
+                <a:extLst>
+                  <a:ext uri="{0D108BD9-81ED-4DB2-BD59-A6C34878D82A}">
+                    <a16:rowId xmlns:a16="http://schemas.microsoft.com/office/drawing/2014/main" val="114174402"/>
+                  </a:ext>
+                </a:extLst>
+              </a:tr>
+              <a:tr h="177192">
+                <a:tc>
+                  <a:txBody>
+                    <a:bodyPr/>
+                    <a:lstStyle/>
+                    <a:p>
+                      <a:r>
+                        <a:rPr lang="en-US" sz="800" dirty="0" smtClean="0"/>
+                        <a:t>Pump Speed</a:t>
+                      </a:r>
+                      <a:endParaRPr lang="en-SG" sz="800" dirty="0"/>
+                    </a:p>
+                  </a:txBody>
+                  <a:tcPr/>
+                </a:tc>
+                <a:tc>
+                  <a:txBody>
+                    <a:bodyPr/>
+                    <a:lstStyle/>
+                    <a:p>
+                      <a:r>
+                        <a:rPr lang="en-US" sz="800" dirty="0" smtClean="0"/>
+                        <a:t>Higher</a:t>
+                      </a:r>
+                      <a:r>
+                        <a:rPr lang="en-US" sz="800" baseline="0" dirty="0" smtClean="0"/>
+                        <a:t> </a:t>
+                      </a:r>
+                      <a:endParaRPr lang="en-SG" sz="800" dirty="0"/>
+                    </a:p>
+                  </a:txBody>
+                  <a:tcPr/>
+                </a:tc>
+                <a:tc>
+                  <a:txBody>
+                    <a:bodyPr/>
+                    <a:lstStyle/>
+                    <a:p>
+                      <a:pPr marL="0" marR="0" lvl="0" indent="0" algn="l" defTabSz="914400" rtl="0" eaLnBrk="1" fontAlgn="auto" latinLnBrk="0" hangingPunct="1">
+                        <a:lnSpc>
+                          <a:spcPct val="100000"/>
+                        </a:lnSpc>
+                        <a:spcBef>
+                          <a:spcPts val="0"/>
+                        </a:spcBef>
+                        <a:spcAft>
+                          <a:spcPts val="0"/>
+                        </a:spcAft>
+                        <a:buClrTx/>
+                        <a:buSzTx/>
+                        <a:buFontTx/>
+                        <a:buNone/>
+                        <a:tabLst/>
+                        <a:defRPr/>
+                      </a:pPr>
+                      <a:r>
+                        <a:rPr lang="en-US" sz="800" dirty="0" smtClean="0"/>
+                        <a:t>Medium </a:t>
+                      </a:r>
+                      <a:endParaRPr lang="en-SG" sz="800" dirty="0" smtClean="0"/>
+                    </a:p>
+                  </a:txBody>
+                  <a:tcPr/>
+                </a:tc>
+                <a:tc>
+                  <a:txBody>
+                    <a:bodyPr/>
+                    <a:lstStyle/>
+                    <a:p>
+                      <a:pPr marL="0" marR="0" lvl="0" indent="0" algn="l" defTabSz="914400" rtl="0" eaLnBrk="1" fontAlgn="auto" latinLnBrk="0" hangingPunct="1">
+                        <a:lnSpc>
+                          <a:spcPct val="100000"/>
+                        </a:lnSpc>
+                        <a:spcBef>
+                          <a:spcPts val="0"/>
+                        </a:spcBef>
+                        <a:spcAft>
+                          <a:spcPts val="0"/>
+                        </a:spcAft>
+                        <a:buClrTx/>
+                        <a:buSzTx/>
+                        <a:buFontTx/>
+                        <a:buNone/>
+                        <a:tabLst/>
+                        <a:defRPr/>
+                      </a:pPr>
+                      <a:r>
+                        <a:rPr lang="en-US" sz="800" dirty="0" smtClean="0"/>
+                        <a:t>Medium </a:t>
+                      </a:r>
+                      <a:endParaRPr lang="en-SG" sz="800" dirty="0" smtClean="0"/>
+                    </a:p>
+                  </a:txBody>
+                  <a:tcPr/>
+                </a:tc>
+                <a:tc>
+                  <a:txBody>
+                    <a:bodyPr/>
+                    <a:lstStyle/>
+                    <a:p>
+                      <a:pPr marL="0" marR="0" lvl="0" indent="0" algn="l" defTabSz="914400" rtl="0" eaLnBrk="1" fontAlgn="auto" latinLnBrk="0" hangingPunct="1">
+                        <a:lnSpc>
+                          <a:spcPct val="100000"/>
+                        </a:lnSpc>
+                        <a:spcBef>
+                          <a:spcPts val="0"/>
+                        </a:spcBef>
+                        <a:spcAft>
+                          <a:spcPts val="0"/>
+                        </a:spcAft>
+                        <a:buClrTx/>
+                        <a:buSzTx/>
+                        <a:buFontTx/>
+                        <a:buNone/>
+                        <a:tabLst/>
+                        <a:defRPr/>
+                      </a:pPr>
+                      <a:r>
+                        <a:rPr lang="en-US" sz="800" dirty="0" smtClean="0"/>
+                        <a:t>Medium </a:t>
+                      </a:r>
+                      <a:endParaRPr lang="en-SG" sz="800" dirty="0" smtClean="0"/>
+                    </a:p>
+                  </a:txBody>
+                  <a:tcPr/>
+                </a:tc>
+                <a:tc>
+                  <a:txBody>
+                    <a:bodyPr/>
+                    <a:lstStyle/>
+                    <a:p>
+                      <a:pPr marL="0" marR="0" lvl="0" indent="0" algn="l" defTabSz="914400" rtl="0" eaLnBrk="1" fontAlgn="auto" latinLnBrk="0" hangingPunct="1">
+                        <a:lnSpc>
+                          <a:spcPct val="100000"/>
+                        </a:lnSpc>
+                        <a:spcBef>
+                          <a:spcPts val="0"/>
+                        </a:spcBef>
+                        <a:spcAft>
+                          <a:spcPts val="0"/>
+                        </a:spcAft>
+                        <a:buClrTx/>
+                        <a:buSzTx/>
+                        <a:buFontTx/>
+                        <a:buNone/>
+                        <a:tabLst/>
+                        <a:defRPr/>
+                      </a:pPr>
+                      <a:r>
+                        <a:rPr lang="en-US" sz="800" dirty="0" smtClean="0"/>
+                        <a:t>Medium </a:t>
+                      </a:r>
+                      <a:endParaRPr lang="en-SG" sz="800" dirty="0" smtClean="0"/>
+                    </a:p>
+                  </a:txBody>
+                  <a:tcPr/>
+                </a:tc>
+                <a:extLst>
+                  <a:ext uri="{0D108BD9-81ED-4DB2-BD59-A6C34878D82A}">
+                    <a16:rowId xmlns:a16="http://schemas.microsoft.com/office/drawing/2014/main" val="2904185499"/>
+                  </a:ext>
+                </a:extLst>
+              </a:tr>
+            </a:tbl>
+          </a:graphicData>
+        </a:graphic>
+      </p:graphicFrame>
+      <p:cxnSp>
+        <p:nvCxnSpPr>
+          <p:cNvPr id="37" name="Elbow Connector 36"/>
+          <p:cNvCxnSpPr>
+            <a:stCxn id="9" idx="2"/>
+            <a:endCxn id="35" idx="1"/>
+          </p:cNvCxnSpPr>
+          <p:nvPr/>
+        </p:nvCxnSpPr>
+        <p:spPr>
+          <a:xfrm rot="16200000" flipH="1">
+            <a:off x="3676859" y="4054727"/>
+            <a:ext cx="981759" cy="1543902"/>
+          </a:xfrm>
+          <a:prstGeom prst="bentConnector2">
+            <a:avLst/>
+          </a:prstGeom>
+          <a:ln>
+            <a:tailEnd type="triangle"/>
+          </a:ln>
+        </p:spPr>
+        <p:style>
+          <a:lnRef idx="1">
+            <a:schemeClr val="dk1"/>
+          </a:lnRef>
+          <a:fillRef idx="0">
+            <a:schemeClr val="dk1"/>
+          </a:fillRef>
+          <a:effectRef idx="0">
+            <a:schemeClr val="dk1"/>
+          </a:effectRef>
+          <a:fontRef idx="minor">
+            <a:schemeClr val="tx1"/>
+          </a:fontRef>
+        </p:style>
+      </p:cxnSp>
+      <p:cxnSp>
+        <p:nvCxnSpPr>
+          <p:cNvPr id="50" name="Straight Connector 49"/>
+          <p:cNvCxnSpPr/>
+          <p:nvPr/>
+        </p:nvCxnSpPr>
+        <p:spPr>
+          <a:xfrm>
+            <a:off x="8845617" y="5637598"/>
+            <a:ext cx="0" cy="503320"/>
+          </a:xfrm>
+          <a:prstGeom prst="line">
+            <a:avLst/>
+          </a:prstGeom>
+        </p:spPr>
+        <p:style>
+          <a:lnRef idx="1">
+            <a:schemeClr val="dk1"/>
+          </a:lnRef>
+          <a:fillRef idx="0">
+            <a:schemeClr val="dk1"/>
+          </a:fillRef>
+          <a:effectRef idx="0">
+            <a:schemeClr val="dk1"/>
+          </a:effectRef>
+          <a:fontRef idx="minor">
+            <a:schemeClr val="tx1"/>
+          </a:fontRef>
+        </p:style>
+      </p:cxnSp>
+      <p:cxnSp>
+        <p:nvCxnSpPr>
+          <p:cNvPr id="52" name="Elbow Connector 51"/>
+          <p:cNvCxnSpPr/>
+          <p:nvPr/>
+        </p:nvCxnSpPr>
+        <p:spPr>
+          <a:xfrm rot="10800000">
+            <a:off x="2877955" y="4335798"/>
+            <a:ext cx="5967663" cy="1805120"/>
+          </a:xfrm>
+          <a:prstGeom prst="bentConnector3">
+            <a:avLst>
+              <a:gd name="adj1" fmla="val 100000"/>
+            </a:avLst>
+          </a:prstGeom>
+          <a:ln>
+            <a:tailEnd type="triangle"/>
+          </a:ln>
+        </p:spPr>
+        <p:style>
+          <a:lnRef idx="1">
+            <a:schemeClr val="dk1"/>
+          </a:lnRef>
+          <a:fillRef idx="0">
+            <a:schemeClr val="dk1"/>
+          </a:fillRef>
+          <a:effectRef idx="0">
+            <a:schemeClr val="dk1"/>
+          </a:effectRef>
+          <a:fontRef idx="minor">
+            <a:schemeClr val="tx1"/>
+          </a:fontRef>
+        </p:style>
+      </p:cxnSp>
+      <p:sp>
+        <p:nvSpPr>
+          <p:cNvPr id="54" name="TextBox 53"/>
+          <p:cNvSpPr txBox="1"/>
+          <p:nvPr/>
+        </p:nvSpPr>
+        <p:spPr>
+          <a:xfrm>
+            <a:off x="4456497" y="3142061"/>
+            <a:ext cx="269507" cy="370376"/>
+          </a:xfrm>
+          <a:prstGeom prst="rect">
+            <a:avLst/>
+          </a:prstGeom>
+          <a:noFill/>
+        </p:spPr>
+        <p:txBody>
+          <a:bodyPr wrap="square" rtlCol="0">
+            <a:spAutoFit/>
+          </a:bodyPr>
+          <a:lstStyle/>
+          <a:p>
+            <a:r>
+              <a:rPr lang="en-US" dirty="0" smtClean="0"/>
+              <a:t>1</a:t>
+            </a:r>
+            <a:endParaRPr lang="en-SG" dirty="0"/>
+          </a:p>
+        </p:txBody>
+      </p:sp>
+      <p:sp>
+        <p:nvSpPr>
+          <p:cNvPr id="56" name="TextBox 55"/>
+          <p:cNvSpPr txBox="1"/>
+          <p:nvPr/>
+        </p:nvSpPr>
+        <p:spPr>
+          <a:xfrm>
+            <a:off x="4456496" y="3901953"/>
+            <a:ext cx="269507" cy="370376"/>
+          </a:xfrm>
+          <a:prstGeom prst="rect">
+            <a:avLst/>
+          </a:prstGeom>
+          <a:noFill/>
+        </p:spPr>
+        <p:txBody>
+          <a:bodyPr wrap="square" rtlCol="0">
+            <a:spAutoFit/>
+          </a:bodyPr>
+          <a:lstStyle/>
+          <a:p>
+            <a:r>
+              <a:rPr lang="en-US" dirty="0"/>
+              <a:t>2</a:t>
+            </a:r>
+            <a:endParaRPr lang="en-SG" dirty="0"/>
+          </a:p>
+        </p:txBody>
+      </p:sp>
+      <p:sp>
+        <p:nvSpPr>
+          <p:cNvPr id="57" name="TextBox 56"/>
+          <p:cNvSpPr txBox="1"/>
+          <p:nvPr/>
+        </p:nvSpPr>
+        <p:spPr>
+          <a:xfrm>
+            <a:off x="3898231" y="4997518"/>
+            <a:ext cx="269507" cy="370376"/>
+          </a:xfrm>
+          <a:prstGeom prst="rect">
+            <a:avLst/>
+          </a:prstGeom>
+          <a:noFill/>
+        </p:spPr>
+        <p:txBody>
+          <a:bodyPr wrap="square" rtlCol="0">
+            <a:spAutoFit/>
+          </a:bodyPr>
+          <a:lstStyle/>
+          <a:p>
+            <a:r>
+              <a:rPr lang="en-US" dirty="0"/>
+              <a:t>3</a:t>
+            </a:r>
+            <a:endParaRPr lang="en-SG" dirty="0"/>
+          </a:p>
+        </p:txBody>
+      </p:sp>
+      <p:sp>
+        <p:nvSpPr>
+          <p:cNvPr id="58" name="TextBox 57"/>
+          <p:cNvSpPr txBox="1"/>
+          <p:nvPr/>
+        </p:nvSpPr>
+        <p:spPr>
+          <a:xfrm>
+            <a:off x="3874168" y="5770542"/>
+            <a:ext cx="269507" cy="370376"/>
+          </a:xfrm>
+          <a:prstGeom prst="rect">
+            <a:avLst/>
+          </a:prstGeom>
+          <a:noFill/>
+        </p:spPr>
+        <p:txBody>
+          <a:bodyPr wrap="square" rtlCol="0">
+            <a:spAutoFit/>
+          </a:bodyPr>
+          <a:lstStyle/>
+          <a:p>
+            <a:r>
+              <a:rPr lang="en-US" dirty="0" smtClean="0"/>
+              <a:t>4</a:t>
+            </a:r>
+            <a:endParaRPr lang="en-SG" dirty="0"/>
+          </a:p>
+        </p:txBody>
+      </p:sp>
+    </p:spTree>
+    <p:extLst>
+      <p:ext uri="{BB962C8B-B14F-4D97-AF65-F5344CB8AC3E}">
+        <p14:creationId xmlns:p14="http://schemas.microsoft.com/office/powerpoint/2010/main" val="167518506"/>
       </p:ext>
     </p:extLst>
   </p:cSld>

</xml_diff>

<commit_message>
Added the camera attestation diagram.
</commit_message>
<xml_diff>
--- a/doc/firmwaresignWF.pptx
+++ b/doc/firmwaresignWF.pptx
@@ -5,7 +5,7 @@
     <p:sldMasterId id="2147483648" r:id="rId1"/>
   </p:sldMasterIdLst>
   <p:notesMasterIdLst>
-    <p:notesMasterId r:id="rId24"/>
+    <p:notesMasterId r:id="rId25"/>
   </p:notesMasterIdLst>
   <p:sldIdLst>
     <p:sldId id="256" r:id="rId2"/>
@@ -30,6 +30,7 @@
     <p:sldId id="276" r:id="rId21"/>
     <p:sldId id="277" r:id="rId22"/>
     <p:sldId id="278" r:id="rId23"/>
+    <p:sldId id="279" r:id="rId24"/>
   </p:sldIdLst>
   <p:sldSz cx="12192000" cy="6858000"/>
   <p:notesSz cx="6858000" cy="9144000"/>
@@ -155,6 +156,7 @@
             <p14:sldId id="276"/>
             <p14:sldId id="277"/>
             <p14:sldId id="278"/>
+            <p14:sldId id="279"/>
           </p14:sldIdLst>
         </p14:section>
         <p14:section name="Untitled Section" id="{AE9E3D3D-B6E7-4002-83A3-10D822FD789F}">
@@ -251,7 +253,7 @@
           <a:p>
             <a:fld id="{32DA1F5A-E23E-4D9B-B8D0-40D8909182CC}" type="datetimeFigureOut">
               <a:rPr lang="en-SG" smtClean="0"/>
-              <a:t>24/2/2020</a:t>
+              <a:t>26/3/2020</a:t>
             </a:fld>
             <a:endParaRPr lang="en-SG"/>
           </a:p>
@@ -734,7 +736,7 @@
           <a:p>
             <a:fld id="{168FC4C3-6B25-48E2-93F9-24A255A41CA9}" type="datetimeFigureOut">
               <a:rPr lang="en-SG" smtClean="0"/>
-              <a:t>24/2/2020</a:t>
+              <a:t>26/3/2020</a:t>
             </a:fld>
             <a:endParaRPr lang="en-SG"/>
           </a:p>
@@ -904,7 +906,7 @@
           <a:p>
             <a:fld id="{168FC4C3-6B25-48E2-93F9-24A255A41CA9}" type="datetimeFigureOut">
               <a:rPr lang="en-SG" smtClean="0"/>
-              <a:t>24/2/2020</a:t>
+              <a:t>26/3/2020</a:t>
             </a:fld>
             <a:endParaRPr lang="en-SG"/>
           </a:p>
@@ -1084,7 +1086,7 @@
           <a:p>
             <a:fld id="{168FC4C3-6B25-48E2-93F9-24A255A41CA9}" type="datetimeFigureOut">
               <a:rPr lang="en-SG" smtClean="0"/>
-              <a:t>24/2/2020</a:t>
+              <a:t>26/3/2020</a:t>
             </a:fld>
             <a:endParaRPr lang="en-SG"/>
           </a:p>
@@ -1254,7 +1256,7 @@
           <a:p>
             <a:fld id="{168FC4C3-6B25-48E2-93F9-24A255A41CA9}" type="datetimeFigureOut">
               <a:rPr lang="en-SG" smtClean="0"/>
-              <a:t>24/2/2020</a:t>
+              <a:t>26/3/2020</a:t>
             </a:fld>
             <a:endParaRPr lang="en-SG"/>
           </a:p>
@@ -1500,7 +1502,7 @@
           <a:p>
             <a:fld id="{168FC4C3-6B25-48E2-93F9-24A255A41CA9}" type="datetimeFigureOut">
               <a:rPr lang="en-SG" smtClean="0"/>
-              <a:t>24/2/2020</a:t>
+              <a:t>26/3/2020</a:t>
             </a:fld>
             <a:endParaRPr lang="en-SG"/>
           </a:p>
@@ -1732,7 +1734,7 @@
           <a:p>
             <a:fld id="{168FC4C3-6B25-48E2-93F9-24A255A41CA9}" type="datetimeFigureOut">
               <a:rPr lang="en-SG" smtClean="0"/>
-              <a:t>24/2/2020</a:t>
+              <a:t>26/3/2020</a:t>
             </a:fld>
             <a:endParaRPr lang="en-SG"/>
           </a:p>
@@ -2099,7 +2101,7 @@
           <a:p>
             <a:fld id="{168FC4C3-6B25-48E2-93F9-24A255A41CA9}" type="datetimeFigureOut">
               <a:rPr lang="en-SG" smtClean="0"/>
-              <a:t>24/2/2020</a:t>
+              <a:t>26/3/2020</a:t>
             </a:fld>
             <a:endParaRPr lang="en-SG"/>
           </a:p>
@@ -2217,7 +2219,7 @@
           <a:p>
             <a:fld id="{168FC4C3-6B25-48E2-93F9-24A255A41CA9}" type="datetimeFigureOut">
               <a:rPr lang="en-SG" smtClean="0"/>
-              <a:t>24/2/2020</a:t>
+              <a:t>26/3/2020</a:t>
             </a:fld>
             <a:endParaRPr lang="en-SG"/>
           </a:p>
@@ -2312,7 +2314,7 @@
           <a:p>
             <a:fld id="{168FC4C3-6B25-48E2-93F9-24A255A41CA9}" type="datetimeFigureOut">
               <a:rPr lang="en-SG" smtClean="0"/>
-              <a:t>24/2/2020</a:t>
+              <a:t>26/3/2020</a:t>
             </a:fld>
             <a:endParaRPr lang="en-SG"/>
           </a:p>
@@ -2589,7 +2591,7 @@
           <a:p>
             <a:fld id="{168FC4C3-6B25-48E2-93F9-24A255A41CA9}" type="datetimeFigureOut">
               <a:rPr lang="en-SG" smtClean="0"/>
-              <a:t>24/2/2020</a:t>
+              <a:t>26/3/2020</a:t>
             </a:fld>
             <a:endParaRPr lang="en-SG"/>
           </a:p>
@@ -2842,7 +2844,7 @@
           <a:p>
             <a:fld id="{168FC4C3-6B25-48E2-93F9-24A255A41CA9}" type="datetimeFigureOut">
               <a:rPr lang="en-SG" smtClean="0"/>
-              <a:t>24/2/2020</a:t>
+              <a:t>26/3/2020</a:t>
             </a:fld>
             <a:endParaRPr lang="en-SG"/>
           </a:p>
@@ -3055,7 +3057,7 @@
           <a:p>
             <a:fld id="{168FC4C3-6B25-48E2-93F9-24A255A41CA9}" type="datetimeFigureOut">
               <a:rPr lang="en-SG" smtClean="0"/>
-              <a:t>24/2/2020</a:t>
+              <a:t>26/3/2020</a:t>
             </a:fld>
             <a:endParaRPr lang="en-SG"/>
           </a:p>
@@ -21631,7 +21633,11 @@
           <a:p>
             <a:r>
               <a:rPr lang="en-US" sz="1000" dirty="0" smtClean="0"/>
-              <a:t>Flash read the byte based on the address list and create the PATT checksum</a:t>
+              <a:t>Flash read the byte based on the address list and create the PATT </a:t>
+            </a:r>
+            <a:r>
+              <a:rPr lang="en-US" sz="1000" dirty="0" err="1" smtClean="0"/>
+              <a:t>checksumddddd</a:t>
             </a:r>
             <a:endParaRPr lang="en-SG" sz="1000" dirty="0"/>
           </a:p>
@@ -29142,7 +29148,6 @@
               <a:rPr lang="en-US" sz="1000" dirty="0" smtClean="0"/>
               <a:t>Stable state</a:t>
             </a:r>
-            <a:endParaRPr lang="en-US" sz="1000" dirty="0" smtClean="0"/>
           </a:p>
           <a:p>
             <a:r>
@@ -30623,6 +30628,932 @@
     <p:extLst>
       <p:ext uri="{BB962C8B-B14F-4D97-AF65-F5344CB8AC3E}">
         <p14:creationId xmlns:p14="http://schemas.microsoft.com/office/powerpoint/2010/main" val="167518506"/>
+      </p:ext>
+    </p:extLst>
+  </p:cSld>
+  <p:clrMapOvr>
+    <a:masterClrMapping/>
+  </p:clrMapOvr>
+</p:sld>
+</file>
+
+<file path=ppt/slides/slide23.xml><?xml version="1.0" encoding="utf-8"?>
+<p:sld xmlns:a="http://schemas.openxmlformats.org/drawingml/2006/main" xmlns:r="http://schemas.openxmlformats.org/officeDocument/2006/relationships" xmlns:p="http://schemas.openxmlformats.org/presentationml/2006/main">
+  <p:cSld>
+    <p:spTree>
+      <p:nvGrpSpPr>
+        <p:cNvPr id="1" name=""/>
+        <p:cNvGrpSpPr/>
+        <p:nvPr/>
+      </p:nvGrpSpPr>
+      <p:grpSpPr>
+        <a:xfrm>
+          <a:off x="0" y="0"/>
+          <a:ext cx="0" cy="0"/>
+          <a:chOff x="0" y="0"/>
+          <a:chExt cx="0" cy="0"/>
+        </a:xfrm>
+      </p:grpSpPr>
+      <p:sp>
+        <p:nvSpPr>
+          <p:cNvPr id="6" name="Rectangle 5"/>
+          <p:cNvSpPr/>
+          <p:nvPr/>
+        </p:nvSpPr>
+        <p:spPr>
+          <a:xfrm>
+            <a:off x="1422842" y="1305010"/>
+            <a:ext cx="2456139" cy="1305471"/>
+          </a:xfrm>
+          <a:prstGeom prst="rect">
+            <a:avLst/>
+          </a:prstGeom>
+          <a:ln>
+            <a:prstDash val="sysDot"/>
+          </a:ln>
+        </p:spPr>
+        <p:style>
+          <a:lnRef idx="2">
+            <a:schemeClr val="dk1"/>
+          </a:lnRef>
+          <a:fillRef idx="1">
+            <a:schemeClr val="lt1"/>
+          </a:fillRef>
+          <a:effectRef idx="0">
+            <a:schemeClr val="dk1"/>
+          </a:effectRef>
+          <a:fontRef idx="minor">
+            <a:schemeClr val="dk1"/>
+          </a:fontRef>
+        </p:style>
+        <p:txBody>
+          <a:bodyPr rtlCol="0" anchor="ctr"/>
+          <a:lstStyle/>
+          <a:p>
+            <a:pPr algn="ctr"/>
+            <a:endParaRPr lang="en-SG"/>
+          </a:p>
+        </p:txBody>
+      </p:sp>
+      <p:sp>
+        <p:nvSpPr>
+          <p:cNvPr id="7" name="TextBox 6"/>
+          <p:cNvSpPr txBox="1"/>
+          <p:nvPr/>
+        </p:nvSpPr>
+        <p:spPr>
+          <a:xfrm>
+            <a:off x="1355465" y="908974"/>
+            <a:ext cx="1590576" cy="369332"/>
+          </a:xfrm>
+          <a:prstGeom prst="rect">
+            <a:avLst/>
+          </a:prstGeom>
+          <a:noFill/>
+        </p:spPr>
+        <p:txBody>
+          <a:bodyPr wrap="square" rtlCol="0">
+            <a:spAutoFit/>
+          </a:bodyPr>
+          <a:lstStyle/>
+          <a:p>
+            <a:r>
+              <a:rPr lang="en-US" dirty="0" smtClean="0"/>
+              <a:t>Raspberry PI </a:t>
+            </a:r>
+            <a:endParaRPr lang="en-SG" dirty="0"/>
+          </a:p>
+        </p:txBody>
+      </p:sp>
+      <p:sp>
+        <p:nvSpPr>
+          <p:cNvPr id="5" name="TextBox 4"/>
+          <p:cNvSpPr txBox="1"/>
+          <p:nvPr/>
+        </p:nvSpPr>
+        <p:spPr>
+          <a:xfrm>
+            <a:off x="2076364" y="1466833"/>
+            <a:ext cx="1346531" cy="400110"/>
+          </a:xfrm>
+          <a:prstGeom prst="rect">
+            <a:avLst/>
+          </a:prstGeom>
+          <a:ln w="19050">
+            <a:solidFill>
+              <a:schemeClr val="tx1"/>
+            </a:solidFill>
+          </a:ln>
+        </p:spPr>
+        <p:style>
+          <a:lnRef idx="2">
+            <a:schemeClr val="accent1"/>
+          </a:lnRef>
+          <a:fillRef idx="1">
+            <a:schemeClr val="lt1"/>
+          </a:fillRef>
+          <a:effectRef idx="0">
+            <a:schemeClr val="accent1"/>
+          </a:effectRef>
+          <a:fontRef idx="minor">
+            <a:schemeClr val="dk1"/>
+          </a:fontRef>
+        </p:style>
+        <p:txBody>
+          <a:bodyPr wrap="square" rtlCol="0">
+            <a:spAutoFit/>
+          </a:bodyPr>
+          <a:lstStyle/>
+          <a:p>
+            <a:r>
+              <a:rPr lang="en-US" sz="1000" dirty="0" smtClean="0"/>
+              <a:t>Camera client </a:t>
+            </a:r>
+          </a:p>
+          <a:p>
+            <a:r>
+              <a:rPr lang="en-US" sz="1000" dirty="0" smtClean="0"/>
+              <a:t>UDP server port 5005 </a:t>
+            </a:r>
+            <a:endParaRPr lang="en-US" sz="1000" dirty="0" smtClean="0"/>
+          </a:p>
+        </p:txBody>
+      </p:sp>
+      <p:sp>
+        <p:nvSpPr>
+          <p:cNvPr id="8" name="TextBox 7"/>
+          <p:cNvSpPr txBox="1"/>
+          <p:nvPr/>
+        </p:nvSpPr>
+        <p:spPr>
+          <a:xfrm>
+            <a:off x="507710" y="1546025"/>
+            <a:ext cx="1045191" cy="246221"/>
+          </a:xfrm>
+          <a:prstGeom prst="rect">
+            <a:avLst/>
+          </a:prstGeom>
+          <a:ln w="19050">
+            <a:solidFill>
+              <a:schemeClr val="tx1"/>
+            </a:solidFill>
+          </a:ln>
+        </p:spPr>
+        <p:style>
+          <a:lnRef idx="2">
+            <a:schemeClr val="accent1"/>
+          </a:lnRef>
+          <a:fillRef idx="1">
+            <a:schemeClr val="lt1"/>
+          </a:fillRef>
+          <a:effectRef idx="0">
+            <a:schemeClr val="accent1"/>
+          </a:effectRef>
+          <a:fontRef idx="minor">
+            <a:schemeClr val="dk1"/>
+          </a:fontRef>
+        </p:style>
+        <p:txBody>
+          <a:bodyPr wrap="square" rtlCol="0">
+            <a:spAutoFit/>
+          </a:bodyPr>
+          <a:lstStyle/>
+          <a:p>
+            <a:r>
+              <a:rPr lang="en-US" sz="1000" dirty="0" smtClean="0"/>
+              <a:t>Camera Module</a:t>
+            </a:r>
+            <a:endParaRPr lang="en-US" sz="1000" dirty="0" smtClean="0"/>
+          </a:p>
+        </p:txBody>
+      </p:sp>
+      <p:cxnSp>
+        <p:nvCxnSpPr>
+          <p:cNvPr id="9" name="Straight Arrow Connector 8"/>
+          <p:cNvCxnSpPr>
+            <a:stCxn id="8" idx="3"/>
+            <a:endCxn id="5" idx="1"/>
+          </p:cNvCxnSpPr>
+          <p:nvPr/>
+        </p:nvCxnSpPr>
+        <p:spPr>
+          <a:xfrm flipV="1">
+            <a:off x="1552901" y="1666888"/>
+            <a:ext cx="523463" cy="0"/>
+          </a:xfrm>
+          <a:prstGeom prst="straightConnector1">
+            <a:avLst/>
+          </a:prstGeom>
+          <a:ln>
+            <a:tailEnd type="triangle"/>
+          </a:ln>
+        </p:spPr>
+        <p:style>
+          <a:lnRef idx="1">
+            <a:schemeClr val="dk1"/>
+          </a:lnRef>
+          <a:fillRef idx="0">
+            <a:schemeClr val="dk1"/>
+          </a:fillRef>
+          <a:effectRef idx="0">
+            <a:schemeClr val="dk1"/>
+          </a:effectRef>
+          <a:fontRef idx="minor">
+            <a:schemeClr val="tx1"/>
+          </a:fontRef>
+        </p:style>
+      </p:cxnSp>
+      <p:sp>
+        <p:nvSpPr>
+          <p:cNvPr id="14" name="Cloud 13"/>
+          <p:cNvSpPr/>
+          <p:nvPr/>
+        </p:nvSpPr>
+        <p:spPr>
+          <a:xfrm>
+            <a:off x="4335067" y="1383768"/>
+            <a:ext cx="1788012" cy="993672"/>
+          </a:xfrm>
+          <a:prstGeom prst="cloud">
+            <a:avLst/>
+          </a:prstGeom>
+          <a:ln w="19050">
+            <a:prstDash val="sysDash"/>
+          </a:ln>
+        </p:spPr>
+        <p:style>
+          <a:lnRef idx="2">
+            <a:schemeClr val="dk1"/>
+          </a:lnRef>
+          <a:fillRef idx="1">
+            <a:schemeClr val="lt1"/>
+          </a:fillRef>
+          <a:effectRef idx="0">
+            <a:schemeClr val="dk1"/>
+          </a:effectRef>
+          <a:fontRef idx="minor">
+            <a:schemeClr val="dk1"/>
+          </a:fontRef>
+        </p:style>
+        <p:txBody>
+          <a:bodyPr rtlCol="0" anchor="ctr"/>
+          <a:lstStyle/>
+          <a:p>
+            <a:pPr algn="ctr"/>
+            <a:endParaRPr lang="en-SG"/>
+          </a:p>
+        </p:txBody>
+      </p:sp>
+      <p:sp>
+        <p:nvSpPr>
+          <p:cNvPr id="16" name="TextBox 15"/>
+          <p:cNvSpPr txBox="1"/>
+          <p:nvPr/>
+        </p:nvSpPr>
+        <p:spPr>
+          <a:xfrm>
+            <a:off x="4766741" y="1659134"/>
+            <a:ext cx="1590576" cy="369332"/>
+          </a:xfrm>
+          <a:prstGeom prst="rect">
+            <a:avLst/>
+          </a:prstGeom>
+          <a:noFill/>
+        </p:spPr>
+        <p:txBody>
+          <a:bodyPr wrap="square" rtlCol="0">
+            <a:spAutoFit/>
+          </a:bodyPr>
+          <a:lstStyle/>
+          <a:p>
+            <a:r>
+              <a:rPr lang="en-US" sz="1400" b="1" dirty="0" smtClean="0"/>
+              <a:t>Network</a:t>
+            </a:r>
+            <a:r>
+              <a:rPr lang="en-US" dirty="0" smtClean="0"/>
+              <a:t> </a:t>
+            </a:r>
+            <a:endParaRPr lang="en-SG" dirty="0"/>
+          </a:p>
+        </p:txBody>
+      </p:sp>
+      <p:sp>
+        <p:nvSpPr>
+          <p:cNvPr id="17" name="TextBox 16"/>
+          <p:cNvSpPr txBox="1"/>
+          <p:nvPr/>
+        </p:nvSpPr>
+        <p:spPr>
+          <a:xfrm>
+            <a:off x="2076364" y="2136512"/>
+            <a:ext cx="1346531" cy="400110"/>
+          </a:xfrm>
+          <a:prstGeom prst="rect">
+            <a:avLst/>
+          </a:prstGeom>
+          <a:ln w="19050">
+            <a:solidFill>
+              <a:schemeClr val="tx1"/>
+            </a:solidFill>
+          </a:ln>
+        </p:spPr>
+        <p:style>
+          <a:lnRef idx="2">
+            <a:schemeClr val="accent1"/>
+          </a:lnRef>
+          <a:fillRef idx="1">
+            <a:schemeClr val="lt1"/>
+          </a:fillRef>
+          <a:effectRef idx="0">
+            <a:schemeClr val="accent1"/>
+          </a:effectRef>
+          <a:fontRef idx="minor">
+            <a:schemeClr val="dk1"/>
+          </a:fontRef>
+        </p:style>
+        <p:txBody>
+          <a:bodyPr wrap="square" rtlCol="0">
+            <a:spAutoFit/>
+          </a:bodyPr>
+          <a:lstStyle/>
+          <a:p>
+            <a:r>
+              <a:rPr lang="en-US" sz="1000" dirty="0" smtClean="0"/>
+              <a:t>File PATT calculator </a:t>
+            </a:r>
+          </a:p>
+          <a:p>
+            <a:r>
+              <a:rPr lang="en-US" sz="1000" dirty="0" smtClean="0"/>
+              <a:t>UDP server port 5006</a:t>
+            </a:r>
+            <a:endParaRPr lang="en-US" sz="1000" dirty="0" smtClean="0"/>
+          </a:p>
+        </p:txBody>
+      </p:sp>
+      <p:cxnSp>
+        <p:nvCxnSpPr>
+          <p:cNvPr id="18" name="Straight Arrow Connector 17"/>
+          <p:cNvCxnSpPr/>
+          <p:nvPr/>
+        </p:nvCxnSpPr>
+        <p:spPr>
+          <a:xfrm flipV="1">
+            <a:off x="2213811" y="1866943"/>
+            <a:ext cx="0" cy="269569"/>
+          </a:xfrm>
+          <a:prstGeom prst="straightConnector1">
+            <a:avLst/>
+          </a:prstGeom>
+          <a:ln>
+            <a:tailEnd type="triangle"/>
+          </a:ln>
+        </p:spPr>
+        <p:style>
+          <a:lnRef idx="1">
+            <a:schemeClr val="dk1"/>
+          </a:lnRef>
+          <a:fillRef idx="0">
+            <a:schemeClr val="dk1"/>
+          </a:fillRef>
+          <a:effectRef idx="0">
+            <a:schemeClr val="dk1"/>
+          </a:effectRef>
+          <a:fontRef idx="minor">
+            <a:schemeClr val="tx1"/>
+          </a:fontRef>
+        </p:style>
+      </p:cxnSp>
+      <p:sp>
+        <p:nvSpPr>
+          <p:cNvPr id="22" name="TextBox 21"/>
+          <p:cNvSpPr txBox="1"/>
+          <p:nvPr/>
+        </p:nvSpPr>
+        <p:spPr>
+          <a:xfrm>
+            <a:off x="2209455" y="1846161"/>
+            <a:ext cx="882911" cy="276999"/>
+          </a:xfrm>
+          <a:prstGeom prst="rect">
+            <a:avLst/>
+          </a:prstGeom>
+          <a:noFill/>
+        </p:spPr>
+        <p:txBody>
+          <a:bodyPr wrap="square" rtlCol="0">
+            <a:spAutoFit/>
+          </a:bodyPr>
+          <a:lstStyle/>
+          <a:p>
+            <a:r>
+              <a:rPr lang="en-US" sz="1200" dirty="0" smtClean="0"/>
+              <a:t>Read bytes</a:t>
+            </a:r>
+            <a:r>
+              <a:rPr lang="en-US" sz="1200" dirty="0" smtClean="0"/>
+              <a:t> </a:t>
+            </a:r>
+            <a:endParaRPr lang="en-SG" sz="1200" dirty="0"/>
+          </a:p>
+        </p:txBody>
+      </p:sp>
+      <p:sp>
+        <p:nvSpPr>
+          <p:cNvPr id="23" name="Rectangle 22"/>
+          <p:cNvSpPr/>
+          <p:nvPr/>
+        </p:nvSpPr>
+        <p:spPr>
+          <a:xfrm>
+            <a:off x="6334918" y="1278306"/>
+            <a:ext cx="2591565" cy="1407142"/>
+          </a:xfrm>
+          <a:prstGeom prst="rect">
+            <a:avLst/>
+          </a:prstGeom>
+          <a:ln>
+            <a:prstDash val="sysDot"/>
+          </a:ln>
+        </p:spPr>
+        <p:style>
+          <a:lnRef idx="2">
+            <a:schemeClr val="dk1"/>
+          </a:lnRef>
+          <a:fillRef idx="1">
+            <a:schemeClr val="lt1"/>
+          </a:fillRef>
+          <a:effectRef idx="0">
+            <a:schemeClr val="dk1"/>
+          </a:effectRef>
+          <a:fontRef idx="minor">
+            <a:schemeClr val="dk1"/>
+          </a:fontRef>
+        </p:style>
+        <p:txBody>
+          <a:bodyPr rtlCol="0" anchor="ctr"/>
+          <a:lstStyle/>
+          <a:p>
+            <a:pPr algn="ctr"/>
+            <a:endParaRPr lang="en-SG"/>
+          </a:p>
+        </p:txBody>
+      </p:sp>
+      <p:sp>
+        <p:nvSpPr>
+          <p:cNvPr id="24" name="TextBox 23"/>
+          <p:cNvSpPr txBox="1"/>
+          <p:nvPr/>
+        </p:nvSpPr>
+        <p:spPr>
+          <a:xfrm>
+            <a:off x="6253120" y="935678"/>
+            <a:ext cx="1590576" cy="369332"/>
+          </a:xfrm>
+          <a:prstGeom prst="rect">
+            <a:avLst/>
+          </a:prstGeom>
+          <a:noFill/>
+        </p:spPr>
+        <p:txBody>
+          <a:bodyPr wrap="square" rtlCol="0">
+            <a:spAutoFit/>
+          </a:bodyPr>
+          <a:lstStyle/>
+          <a:p>
+            <a:r>
+              <a:rPr lang="en-US" dirty="0" smtClean="0"/>
+              <a:t>Computer</a:t>
+            </a:r>
+            <a:endParaRPr lang="en-SG" dirty="0"/>
+          </a:p>
+        </p:txBody>
+      </p:sp>
+      <p:sp>
+        <p:nvSpPr>
+          <p:cNvPr id="25" name="TextBox 24"/>
+          <p:cNvSpPr txBox="1"/>
+          <p:nvPr/>
+        </p:nvSpPr>
+        <p:spPr>
+          <a:xfrm>
+            <a:off x="6585554" y="1397715"/>
+            <a:ext cx="1346531" cy="400110"/>
+          </a:xfrm>
+          <a:prstGeom prst="rect">
+            <a:avLst/>
+          </a:prstGeom>
+          <a:ln w="19050">
+            <a:solidFill>
+              <a:schemeClr val="tx1"/>
+            </a:solidFill>
+          </a:ln>
+        </p:spPr>
+        <p:style>
+          <a:lnRef idx="2">
+            <a:schemeClr val="accent1"/>
+          </a:lnRef>
+          <a:fillRef idx="1">
+            <a:schemeClr val="lt1"/>
+          </a:fillRef>
+          <a:effectRef idx="0">
+            <a:schemeClr val="accent1"/>
+          </a:effectRef>
+          <a:fontRef idx="minor">
+            <a:schemeClr val="dk1"/>
+          </a:fontRef>
+        </p:style>
+        <p:txBody>
+          <a:bodyPr wrap="square" rtlCol="0">
+            <a:spAutoFit/>
+          </a:bodyPr>
+          <a:lstStyle/>
+          <a:p>
+            <a:r>
+              <a:rPr lang="en-US" sz="1000" dirty="0" smtClean="0"/>
+              <a:t>Camera server[motion detection ] </a:t>
+            </a:r>
+            <a:endParaRPr lang="en-US" sz="1000" dirty="0" smtClean="0"/>
+          </a:p>
+        </p:txBody>
+      </p:sp>
+      <p:cxnSp>
+        <p:nvCxnSpPr>
+          <p:cNvPr id="26" name="Straight Arrow Connector 25"/>
+          <p:cNvCxnSpPr/>
+          <p:nvPr/>
+        </p:nvCxnSpPr>
+        <p:spPr>
+          <a:xfrm>
+            <a:off x="3422895" y="1666888"/>
+            <a:ext cx="3162659" cy="0"/>
+          </a:xfrm>
+          <a:prstGeom prst="straightConnector1">
+            <a:avLst/>
+          </a:prstGeom>
+          <a:ln>
+            <a:tailEnd type="triangle"/>
+          </a:ln>
+        </p:spPr>
+        <p:style>
+          <a:lnRef idx="1">
+            <a:schemeClr val="dk1"/>
+          </a:lnRef>
+          <a:fillRef idx="0">
+            <a:schemeClr val="dk1"/>
+          </a:fillRef>
+          <a:effectRef idx="0">
+            <a:schemeClr val="dk1"/>
+          </a:effectRef>
+          <a:fontRef idx="minor">
+            <a:schemeClr val="tx1"/>
+          </a:fontRef>
+        </p:style>
+      </p:cxnSp>
+      <p:sp>
+        <p:nvSpPr>
+          <p:cNvPr id="30" name="TextBox 29"/>
+          <p:cNvSpPr txBox="1"/>
+          <p:nvPr/>
+        </p:nvSpPr>
+        <p:spPr>
+          <a:xfrm>
+            <a:off x="3372592" y="1652950"/>
+            <a:ext cx="1070887" cy="276999"/>
+          </a:xfrm>
+          <a:prstGeom prst="rect">
+            <a:avLst/>
+          </a:prstGeom>
+          <a:noFill/>
+        </p:spPr>
+        <p:txBody>
+          <a:bodyPr wrap="square" rtlCol="0">
+            <a:spAutoFit/>
+          </a:bodyPr>
+          <a:lstStyle/>
+          <a:p>
+            <a:r>
+              <a:rPr lang="en-US" sz="1200" dirty="0" smtClean="0"/>
+              <a:t>Image stream</a:t>
+            </a:r>
+            <a:endParaRPr lang="en-SG" sz="1200" dirty="0"/>
+          </a:p>
+        </p:txBody>
+      </p:sp>
+      <p:sp>
+        <p:nvSpPr>
+          <p:cNvPr id="31" name="TextBox 30"/>
+          <p:cNvSpPr txBox="1"/>
+          <p:nvPr/>
+        </p:nvSpPr>
+        <p:spPr>
+          <a:xfrm>
+            <a:off x="6585554" y="1984660"/>
+            <a:ext cx="1480417" cy="553998"/>
+          </a:xfrm>
+          <a:prstGeom prst="rect">
+            <a:avLst/>
+          </a:prstGeom>
+          <a:ln w="19050">
+            <a:solidFill>
+              <a:schemeClr val="tx1"/>
+            </a:solidFill>
+          </a:ln>
+        </p:spPr>
+        <p:style>
+          <a:lnRef idx="2">
+            <a:schemeClr val="accent1"/>
+          </a:lnRef>
+          <a:fillRef idx="1">
+            <a:schemeClr val="lt1"/>
+          </a:fillRef>
+          <a:effectRef idx="0">
+            <a:schemeClr val="accent1"/>
+          </a:effectRef>
+          <a:fontRef idx="minor">
+            <a:schemeClr val="dk1"/>
+          </a:fontRef>
+        </p:style>
+        <p:txBody>
+          <a:bodyPr wrap="square" rtlCol="0">
+            <a:spAutoFit/>
+          </a:bodyPr>
+          <a:lstStyle/>
+          <a:p>
+            <a:r>
+              <a:rPr lang="en-US" sz="1000" dirty="0" smtClean="0"/>
+              <a:t>File PATT </a:t>
+            </a:r>
+            <a:r>
+              <a:rPr lang="en-US" sz="1000" dirty="0" smtClean="0"/>
+              <a:t>server[ random address generate and feed back value verify] </a:t>
+            </a:r>
+            <a:endParaRPr lang="en-US" sz="1000" dirty="0" smtClean="0"/>
+          </a:p>
+        </p:txBody>
+      </p:sp>
+      <p:pic>
+        <p:nvPicPr>
+          <p:cNvPr id="32" name="Picture 31"/>
+          <p:cNvPicPr>
+            <a:picLocks noChangeAspect="1"/>
+          </p:cNvPicPr>
+          <p:nvPr/>
+        </p:nvPicPr>
+        <p:blipFill>
+          <a:blip r:embed="rId2" cstate="print">
+            <a:extLst>
+              <a:ext uri="{28A0092B-C50C-407E-A947-70E740481C1C}">
+                <a14:useLocalDpi xmlns:a14="http://schemas.microsoft.com/office/drawing/2010/main" val="0"/>
+              </a:ext>
+            </a:extLst>
+          </a:blip>
+          <a:stretch>
+            <a:fillRect/>
+          </a:stretch>
+        </p:blipFill>
+        <p:spPr>
+          <a:xfrm>
+            <a:off x="8277810" y="1652950"/>
+            <a:ext cx="334183" cy="334183"/>
+          </a:xfrm>
+          <a:prstGeom prst="rect">
+            <a:avLst/>
+          </a:prstGeom>
+        </p:spPr>
+      </p:pic>
+      <p:sp>
+        <p:nvSpPr>
+          <p:cNvPr id="33" name="TextBox 32"/>
+          <p:cNvSpPr txBox="1"/>
+          <p:nvPr/>
+        </p:nvSpPr>
+        <p:spPr>
+          <a:xfrm>
+            <a:off x="8043572" y="1354484"/>
+            <a:ext cx="1071552" cy="261610"/>
+          </a:xfrm>
+          <a:prstGeom prst="rect">
+            <a:avLst/>
+          </a:prstGeom>
+          <a:noFill/>
+        </p:spPr>
+        <p:txBody>
+          <a:bodyPr wrap="square" rtlCol="0">
+            <a:spAutoFit/>
+          </a:bodyPr>
+          <a:lstStyle/>
+          <a:p>
+            <a:r>
+              <a:rPr lang="en-US" sz="1100" dirty="0"/>
+              <a:t>Camera client </a:t>
+            </a:r>
+          </a:p>
+        </p:txBody>
+      </p:sp>
+      <p:cxnSp>
+        <p:nvCxnSpPr>
+          <p:cNvPr id="35" name="Elbow Connector 34"/>
+          <p:cNvCxnSpPr>
+            <a:stCxn id="31" idx="3"/>
+            <a:endCxn id="32" idx="2"/>
+          </p:cNvCxnSpPr>
+          <p:nvPr/>
+        </p:nvCxnSpPr>
+        <p:spPr>
+          <a:xfrm flipV="1">
+            <a:off x="8065971" y="1987133"/>
+            <a:ext cx="378931" cy="274526"/>
+          </a:xfrm>
+          <a:prstGeom prst="bentConnector2">
+            <a:avLst/>
+          </a:prstGeom>
+          <a:ln>
+            <a:tailEnd type="triangle"/>
+          </a:ln>
+        </p:spPr>
+        <p:style>
+          <a:lnRef idx="1">
+            <a:schemeClr val="dk1"/>
+          </a:lnRef>
+          <a:fillRef idx="0">
+            <a:schemeClr val="dk1"/>
+          </a:fillRef>
+          <a:effectRef idx="0">
+            <a:schemeClr val="dk1"/>
+          </a:effectRef>
+          <a:fontRef idx="minor">
+            <a:schemeClr val="tx1"/>
+          </a:fontRef>
+        </p:style>
+      </p:cxnSp>
+      <p:sp>
+        <p:nvSpPr>
+          <p:cNvPr id="36" name="TextBox 35"/>
+          <p:cNvSpPr txBox="1"/>
+          <p:nvPr/>
+        </p:nvSpPr>
+        <p:spPr>
+          <a:xfrm>
+            <a:off x="8043572" y="1929949"/>
+            <a:ext cx="882911" cy="276999"/>
+          </a:xfrm>
+          <a:prstGeom prst="rect">
+            <a:avLst/>
+          </a:prstGeom>
+          <a:noFill/>
+        </p:spPr>
+        <p:txBody>
+          <a:bodyPr wrap="square" rtlCol="0">
+            <a:spAutoFit/>
+          </a:bodyPr>
+          <a:lstStyle/>
+          <a:p>
+            <a:r>
+              <a:rPr lang="en-US" sz="1200" dirty="0" smtClean="0"/>
+              <a:t>Read bytes</a:t>
+            </a:r>
+            <a:r>
+              <a:rPr lang="en-US" sz="1200" dirty="0" smtClean="0"/>
+              <a:t> </a:t>
+            </a:r>
+            <a:endParaRPr lang="en-SG" sz="1200" dirty="0"/>
+          </a:p>
+        </p:txBody>
+      </p:sp>
+      <p:cxnSp>
+        <p:nvCxnSpPr>
+          <p:cNvPr id="38" name="Elbow Connector 37"/>
+          <p:cNvCxnSpPr/>
+          <p:nvPr/>
+        </p:nvCxnSpPr>
+        <p:spPr>
+          <a:xfrm rot="10800000" flipV="1">
+            <a:off x="3422895" y="2136511"/>
+            <a:ext cx="3093408" cy="125147"/>
+          </a:xfrm>
+          <a:prstGeom prst="bentConnector3">
+            <a:avLst>
+              <a:gd name="adj1" fmla="val 79248"/>
+            </a:avLst>
+          </a:prstGeom>
+          <a:ln>
+            <a:tailEnd type="triangle"/>
+          </a:ln>
+        </p:spPr>
+        <p:style>
+          <a:lnRef idx="1">
+            <a:schemeClr val="dk1"/>
+          </a:lnRef>
+          <a:fillRef idx="0">
+            <a:schemeClr val="dk1"/>
+          </a:fillRef>
+          <a:effectRef idx="0">
+            <a:schemeClr val="dk1"/>
+          </a:effectRef>
+          <a:fontRef idx="minor">
+            <a:schemeClr val="tx1"/>
+          </a:fontRef>
+        </p:style>
+      </p:cxnSp>
+      <p:sp>
+        <p:nvSpPr>
+          <p:cNvPr id="40" name="TextBox 39"/>
+          <p:cNvSpPr txBox="1"/>
+          <p:nvPr/>
+        </p:nvSpPr>
+        <p:spPr>
+          <a:xfrm>
+            <a:off x="4631978" y="1910352"/>
+            <a:ext cx="1079481" cy="276999"/>
+          </a:xfrm>
+          <a:prstGeom prst="rect">
+            <a:avLst/>
+          </a:prstGeom>
+          <a:noFill/>
+        </p:spPr>
+        <p:txBody>
+          <a:bodyPr wrap="square" rtlCol="0">
+            <a:spAutoFit/>
+          </a:bodyPr>
+          <a:lstStyle/>
+          <a:p>
+            <a:r>
+              <a:rPr lang="en-US" sz="1200" dirty="0" smtClean="0"/>
+              <a:t>Address List</a:t>
+            </a:r>
+            <a:endParaRPr lang="en-SG" sz="1200" dirty="0"/>
+          </a:p>
+        </p:txBody>
+      </p:sp>
+      <p:cxnSp>
+        <p:nvCxnSpPr>
+          <p:cNvPr id="41" name="Straight Arrow Connector 40"/>
+          <p:cNvCxnSpPr/>
+          <p:nvPr/>
+        </p:nvCxnSpPr>
+        <p:spPr>
+          <a:xfrm>
+            <a:off x="3422895" y="2377440"/>
+            <a:ext cx="3162659" cy="0"/>
+          </a:xfrm>
+          <a:prstGeom prst="straightConnector1">
+            <a:avLst/>
+          </a:prstGeom>
+          <a:ln>
+            <a:tailEnd type="triangle"/>
+          </a:ln>
+        </p:spPr>
+        <p:style>
+          <a:lnRef idx="1">
+            <a:schemeClr val="dk1"/>
+          </a:lnRef>
+          <a:fillRef idx="0">
+            <a:schemeClr val="dk1"/>
+          </a:fillRef>
+          <a:effectRef idx="0">
+            <a:schemeClr val="dk1"/>
+          </a:effectRef>
+          <a:fontRef idx="minor">
+            <a:schemeClr val="tx1"/>
+          </a:fontRef>
+        </p:style>
+      </p:cxnSp>
+      <p:sp>
+        <p:nvSpPr>
+          <p:cNvPr id="42" name="TextBox 41"/>
+          <p:cNvSpPr txBox="1"/>
+          <p:nvPr/>
+        </p:nvSpPr>
+        <p:spPr>
+          <a:xfrm>
+            <a:off x="4766741" y="2360672"/>
+            <a:ext cx="1079481" cy="276999"/>
+          </a:xfrm>
+          <a:prstGeom prst="rect">
+            <a:avLst/>
+          </a:prstGeom>
+          <a:noFill/>
+        </p:spPr>
+        <p:txBody>
+          <a:bodyPr wrap="square" rtlCol="0">
+            <a:spAutoFit/>
+          </a:bodyPr>
+          <a:lstStyle/>
+          <a:p>
+            <a:r>
+              <a:rPr lang="en-US" sz="1200" dirty="0" smtClean="0"/>
+              <a:t>PATT value</a:t>
+            </a:r>
+            <a:endParaRPr lang="en-SG" sz="1200" dirty="0"/>
+          </a:p>
+        </p:txBody>
+      </p:sp>
+    </p:spTree>
+    <p:extLst>
+      <p:ext uri="{BB962C8B-B14F-4D97-AF65-F5344CB8AC3E}">
+        <p14:creationId xmlns:p14="http://schemas.microsoft.com/office/powerpoint/2010/main" val="4125287355"/>
       </p:ext>
     </p:extLst>
   </p:cSld>

</xml_diff>